<commit_message>
20210817 2300 tlw87 file updates for today.
</commit_message>
<xml_diff>
--- a/docs/ERS.pptx
+++ b/docs/ERS.pptx
@@ -144,7 +144,7 @@
           <p:cNvPr id="2" name="Title 1">
             <a:extLst>
               <a:ext uri="{FF2B5EF4-FFF2-40B4-BE49-F238E27FC236}">
-                <a16:creationId xmlns="" xmlns:a16="http://schemas.microsoft.com/office/drawing/2014/main" id="{67106D7E-D400-44F1-9A1A-D68CE501C73D}"/>
+                <a16:creationId xmlns:a16="http://schemas.microsoft.com/office/drawing/2014/main" id="{67106D7E-D400-44F1-9A1A-D68CE501C73D}"/>
               </a:ext>
             </a:extLst>
           </p:cNvPr>
@@ -181,7 +181,7 @@
           <p:cNvPr id="3" name="Subtitle 2">
             <a:extLst>
               <a:ext uri="{FF2B5EF4-FFF2-40B4-BE49-F238E27FC236}">
-                <a16:creationId xmlns="" xmlns:a16="http://schemas.microsoft.com/office/drawing/2014/main" id="{A5FDE527-E621-4639-A0C7-E1E9B0DFBCEC}"/>
+                <a16:creationId xmlns:a16="http://schemas.microsoft.com/office/drawing/2014/main" id="{A5FDE527-E621-4639-A0C7-E1E9B0DFBCEC}"/>
               </a:ext>
             </a:extLst>
           </p:cNvPr>
@@ -251,7 +251,7 @@
           <p:cNvPr id="4" name="Date Placeholder 3">
             <a:extLst>
               <a:ext uri="{FF2B5EF4-FFF2-40B4-BE49-F238E27FC236}">
-                <a16:creationId xmlns="" xmlns:a16="http://schemas.microsoft.com/office/drawing/2014/main" id="{E109CE88-B989-4109-89C8-36F7C245DB1C}"/>
+                <a16:creationId xmlns:a16="http://schemas.microsoft.com/office/drawing/2014/main" id="{E109CE88-B989-4109-89C8-36F7C245DB1C}"/>
               </a:ext>
             </a:extLst>
           </p:cNvPr>
@@ -280,7 +280,7 @@
           <p:cNvPr id="5" name="Footer Placeholder 4">
             <a:extLst>
               <a:ext uri="{FF2B5EF4-FFF2-40B4-BE49-F238E27FC236}">
-                <a16:creationId xmlns="" xmlns:a16="http://schemas.microsoft.com/office/drawing/2014/main" id="{0841498F-B991-43D3-B408-CC35D8EFCF37}"/>
+                <a16:creationId xmlns:a16="http://schemas.microsoft.com/office/drawing/2014/main" id="{0841498F-B991-43D3-B408-CC35D8EFCF37}"/>
               </a:ext>
             </a:extLst>
           </p:cNvPr>
@@ -305,7 +305,7 @@
           <p:cNvPr id="6" name="Slide Number Placeholder 5">
             <a:extLst>
               <a:ext uri="{FF2B5EF4-FFF2-40B4-BE49-F238E27FC236}">
-                <a16:creationId xmlns="" xmlns:a16="http://schemas.microsoft.com/office/drawing/2014/main" id="{01754CB8-17B1-45A0-AE7D-755EAA1B69D8}"/>
+                <a16:creationId xmlns:a16="http://schemas.microsoft.com/office/drawing/2014/main" id="{01754CB8-17B1-45A0-AE7D-755EAA1B69D8}"/>
               </a:ext>
             </a:extLst>
           </p:cNvPr>
@@ -364,7 +364,7 @@
           <p:cNvPr id="2" name="Title 1">
             <a:extLst>
               <a:ext uri="{FF2B5EF4-FFF2-40B4-BE49-F238E27FC236}">
-                <a16:creationId xmlns="" xmlns:a16="http://schemas.microsoft.com/office/drawing/2014/main" id="{E7A7B055-5DC2-440D-83C1-CAAE8E9A8E14}"/>
+                <a16:creationId xmlns:a16="http://schemas.microsoft.com/office/drawing/2014/main" id="{E7A7B055-5DC2-440D-83C1-CAAE8E9A8E14}"/>
               </a:ext>
             </a:extLst>
           </p:cNvPr>
@@ -392,7 +392,7 @@
           <p:cNvPr id="3" name="Vertical Text Placeholder 2">
             <a:extLst>
               <a:ext uri="{FF2B5EF4-FFF2-40B4-BE49-F238E27FC236}">
-                <a16:creationId xmlns="" xmlns:a16="http://schemas.microsoft.com/office/drawing/2014/main" id="{65710707-423D-4F9D-A49D-6C764C562553}"/>
+                <a16:creationId xmlns:a16="http://schemas.microsoft.com/office/drawing/2014/main" id="{65710707-423D-4F9D-A49D-6C764C562553}"/>
               </a:ext>
             </a:extLst>
           </p:cNvPr>
@@ -449,7 +449,7 @@
           <p:cNvPr id="4" name="Date Placeholder 3">
             <a:extLst>
               <a:ext uri="{FF2B5EF4-FFF2-40B4-BE49-F238E27FC236}">
-                <a16:creationId xmlns="" xmlns:a16="http://schemas.microsoft.com/office/drawing/2014/main" id="{98B6F7EF-D1BE-4437-85F3-99626E37E4EF}"/>
+                <a16:creationId xmlns:a16="http://schemas.microsoft.com/office/drawing/2014/main" id="{98B6F7EF-D1BE-4437-85F3-99626E37E4EF}"/>
               </a:ext>
             </a:extLst>
           </p:cNvPr>
@@ -478,7 +478,7 @@
           <p:cNvPr id="5" name="Footer Placeholder 4">
             <a:extLst>
               <a:ext uri="{FF2B5EF4-FFF2-40B4-BE49-F238E27FC236}">
-                <a16:creationId xmlns="" xmlns:a16="http://schemas.microsoft.com/office/drawing/2014/main" id="{D890AA9B-E479-4209-B245-83608F3D4013}"/>
+                <a16:creationId xmlns:a16="http://schemas.microsoft.com/office/drawing/2014/main" id="{D890AA9B-E479-4209-B245-83608F3D4013}"/>
               </a:ext>
             </a:extLst>
           </p:cNvPr>
@@ -503,7 +503,7 @@
           <p:cNvPr id="6" name="Slide Number Placeholder 5">
             <a:extLst>
               <a:ext uri="{FF2B5EF4-FFF2-40B4-BE49-F238E27FC236}">
-                <a16:creationId xmlns="" xmlns:a16="http://schemas.microsoft.com/office/drawing/2014/main" id="{0E4976E4-E15A-4296-A430-633D2BB9142B}"/>
+                <a16:creationId xmlns:a16="http://schemas.microsoft.com/office/drawing/2014/main" id="{0E4976E4-E15A-4296-A430-633D2BB9142B}"/>
               </a:ext>
             </a:extLst>
           </p:cNvPr>
@@ -562,7 +562,7 @@
           <p:cNvPr id="2" name="Vertical Title 1">
             <a:extLst>
               <a:ext uri="{FF2B5EF4-FFF2-40B4-BE49-F238E27FC236}">
-                <a16:creationId xmlns="" xmlns:a16="http://schemas.microsoft.com/office/drawing/2014/main" id="{66F63CF5-8DEE-4BB2-A2A5-5C16FEBE1AD5}"/>
+                <a16:creationId xmlns:a16="http://schemas.microsoft.com/office/drawing/2014/main" id="{66F63CF5-8DEE-4BB2-A2A5-5C16FEBE1AD5}"/>
               </a:ext>
             </a:extLst>
           </p:cNvPr>
@@ -595,7 +595,7 @@
           <p:cNvPr id="3" name="Vertical Text Placeholder 2">
             <a:extLst>
               <a:ext uri="{FF2B5EF4-FFF2-40B4-BE49-F238E27FC236}">
-                <a16:creationId xmlns="" xmlns:a16="http://schemas.microsoft.com/office/drawing/2014/main" id="{E0D5EBA5-94AF-4373-B032-A40FF73C7575}"/>
+                <a16:creationId xmlns:a16="http://schemas.microsoft.com/office/drawing/2014/main" id="{E0D5EBA5-94AF-4373-B032-A40FF73C7575}"/>
               </a:ext>
             </a:extLst>
           </p:cNvPr>
@@ -657,7 +657,7 @@
           <p:cNvPr id="4" name="Date Placeholder 3">
             <a:extLst>
               <a:ext uri="{FF2B5EF4-FFF2-40B4-BE49-F238E27FC236}">
-                <a16:creationId xmlns="" xmlns:a16="http://schemas.microsoft.com/office/drawing/2014/main" id="{7426B8E1-6758-4F5E-B618-96641332600B}"/>
+                <a16:creationId xmlns:a16="http://schemas.microsoft.com/office/drawing/2014/main" id="{7426B8E1-6758-4F5E-B618-96641332600B}"/>
               </a:ext>
             </a:extLst>
           </p:cNvPr>
@@ -686,7 +686,7 @@
           <p:cNvPr id="5" name="Footer Placeholder 4">
             <a:extLst>
               <a:ext uri="{FF2B5EF4-FFF2-40B4-BE49-F238E27FC236}">
-                <a16:creationId xmlns="" xmlns:a16="http://schemas.microsoft.com/office/drawing/2014/main" id="{F65E330E-2A7E-482D-AE0F-70EA5A29958B}"/>
+                <a16:creationId xmlns:a16="http://schemas.microsoft.com/office/drawing/2014/main" id="{F65E330E-2A7E-482D-AE0F-70EA5A29958B}"/>
               </a:ext>
             </a:extLst>
           </p:cNvPr>
@@ -711,7 +711,7 @@
           <p:cNvPr id="6" name="Slide Number Placeholder 5">
             <a:extLst>
               <a:ext uri="{FF2B5EF4-FFF2-40B4-BE49-F238E27FC236}">
-                <a16:creationId xmlns="" xmlns:a16="http://schemas.microsoft.com/office/drawing/2014/main" id="{B8000005-FC38-4A6C-9D09-7945EFA08160}"/>
+                <a16:creationId xmlns:a16="http://schemas.microsoft.com/office/drawing/2014/main" id="{B8000005-FC38-4A6C-9D09-7945EFA08160}"/>
               </a:ext>
             </a:extLst>
           </p:cNvPr>
@@ -770,7 +770,7 @@
           <p:cNvPr id="2" name="Title 1">
             <a:extLst>
               <a:ext uri="{FF2B5EF4-FFF2-40B4-BE49-F238E27FC236}">
-                <a16:creationId xmlns="" xmlns:a16="http://schemas.microsoft.com/office/drawing/2014/main" id="{91D0002C-766B-44B4-A24C-BE6DE6C7BA4C}"/>
+                <a16:creationId xmlns:a16="http://schemas.microsoft.com/office/drawing/2014/main" id="{91D0002C-766B-44B4-A24C-BE6DE6C7BA4C}"/>
               </a:ext>
             </a:extLst>
           </p:cNvPr>
@@ -798,7 +798,7 @@
           <p:cNvPr id="3" name="Content Placeholder 2">
             <a:extLst>
               <a:ext uri="{FF2B5EF4-FFF2-40B4-BE49-F238E27FC236}">
-                <a16:creationId xmlns="" xmlns:a16="http://schemas.microsoft.com/office/drawing/2014/main" id="{3455BAA9-6C7B-4874-AD76-BD466F64802D}"/>
+                <a16:creationId xmlns:a16="http://schemas.microsoft.com/office/drawing/2014/main" id="{3455BAA9-6C7B-4874-AD76-BD466F64802D}"/>
               </a:ext>
             </a:extLst>
           </p:cNvPr>
@@ -855,7 +855,7 @@
           <p:cNvPr id="4" name="Date Placeholder 3">
             <a:extLst>
               <a:ext uri="{FF2B5EF4-FFF2-40B4-BE49-F238E27FC236}">
-                <a16:creationId xmlns="" xmlns:a16="http://schemas.microsoft.com/office/drawing/2014/main" id="{8776BDAF-D8F2-4A61-904D-094BB4545702}"/>
+                <a16:creationId xmlns:a16="http://schemas.microsoft.com/office/drawing/2014/main" id="{8776BDAF-D8F2-4A61-904D-094BB4545702}"/>
               </a:ext>
             </a:extLst>
           </p:cNvPr>
@@ -884,7 +884,7 @@
           <p:cNvPr id="5" name="Footer Placeholder 4">
             <a:extLst>
               <a:ext uri="{FF2B5EF4-FFF2-40B4-BE49-F238E27FC236}">
-                <a16:creationId xmlns="" xmlns:a16="http://schemas.microsoft.com/office/drawing/2014/main" id="{F89C5665-4384-4706-9BD2-9F42B05C96BC}"/>
+                <a16:creationId xmlns:a16="http://schemas.microsoft.com/office/drawing/2014/main" id="{F89C5665-4384-4706-9BD2-9F42B05C96BC}"/>
               </a:ext>
             </a:extLst>
           </p:cNvPr>
@@ -909,7 +909,7 @@
           <p:cNvPr id="6" name="Slide Number Placeholder 5">
             <a:extLst>
               <a:ext uri="{FF2B5EF4-FFF2-40B4-BE49-F238E27FC236}">
-                <a16:creationId xmlns="" xmlns:a16="http://schemas.microsoft.com/office/drawing/2014/main" id="{7DCAD73E-CAB3-4BA7-905E-D203691D0418}"/>
+                <a16:creationId xmlns:a16="http://schemas.microsoft.com/office/drawing/2014/main" id="{7DCAD73E-CAB3-4BA7-905E-D203691D0418}"/>
               </a:ext>
             </a:extLst>
           </p:cNvPr>
@@ -968,7 +968,7 @@
           <p:cNvPr id="2" name="Title 1">
             <a:extLst>
               <a:ext uri="{FF2B5EF4-FFF2-40B4-BE49-F238E27FC236}">
-                <a16:creationId xmlns="" xmlns:a16="http://schemas.microsoft.com/office/drawing/2014/main" id="{A9880706-F7FA-4EC3-A022-9D6C7CEC3692}"/>
+                <a16:creationId xmlns:a16="http://schemas.microsoft.com/office/drawing/2014/main" id="{A9880706-F7FA-4EC3-A022-9D6C7CEC3692}"/>
               </a:ext>
             </a:extLst>
           </p:cNvPr>
@@ -1005,7 +1005,7 @@
           <p:cNvPr id="3" name="Text Placeholder 2">
             <a:extLst>
               <a:ext uri="{FF2B5EF4-FFF2-40B4-BE49-F238E27FC236}">
-                <a16:creationId xmlns="" xmlns:a16="http://schemas.microsoft.com/office/drawing/2014/main" id="{FA8A65D0-3DF5-448D-82EC-A967682A0DED}"/>
+                <a16:creationId xmlns:a16="http://schemas.microsoft.com/office/drawing/2014/main" id="{FA8A65D0-3DF5-448D-82EC-A967682A0DED}"/>
               </a:ext>
             </a:extLst>
           </p:cNvPr>
@@ -1130,7 +1130,7 @@
           <p:cNvPr id="4" name="Date Placeholder 3">
             <a:extLst>
               <a:ext uri="{FF2B5EF4-FFF2-40B4-BE49-F238E27FC236}">
-                <a16:creationId xmlns="" xmlns:a16="http://schemas.microsoft.com/office/drawing/2014/main" id="{600EA68C-01A6-487D-9D6E-1D1B4EAC0440}"/>
+                <a16:creationId xmlns:a16="http://schemas.microsoft.com/office/drawing/2014/main" id="{600EA68C-01A6-487D-9D6E-1D1B4EAC0440}"/>
               </a:ext>
             </a:extLst>
           </p:cNvPr>
@@ -1159,7 +1159,7 @@
           <p:cNvPr id="5" name="Footer Placeholder 4">
             <a:extLst>
               <a:ext uri="{FF2B5EF4-FFF2-40B4-BE49-F238E27FC236}">
-                <a16:creationId xmlns="" xmlns:a16="http://schemas.microsoft.com/office/drawing/2014/main" id="{6E6527CB-4FFD-4569-A82C-5EDC311B2CF6}"/>
+                <a16:creationId xmlns:a16="http://schemas.microsoft.com/office/drawing/2014/main" id="{6E6527CB-4FFD-4569-A82C-5EDC311B2CF6}"/>
               </a:ext>
             </a:extLst>
           </p:cNvPr>
@@ -1184,7 +1184,7 @@
           <p:cNvPr id="6" name="Slide Number Placeholder 5">
             <a:extLst>
               <a:ext uri="{FF2B5EF4-FFF2-40B4-BE49-F238E27FC236}">
-                <a16:creationId xmlns="" xmlns:a16="http://schemas.microsoft.com/office/drawing/2014/main" id="{24B19E5B-5A98-4381-A01D-01F81FD65792}"/>
+                <a16:creationId xmlns:a16="http://schemas.microsoft.com/office/drawing/2014/main" id="{24B19E5B-5A98-4381-A01D-01F81FD65792}"/>
               </a:ext>
             </a:extLst>
           </p:cNvPr>
@@ -1243,7 +1243,7 @@
           <p:cNvPr id="2" name="Title 1">
             <a:extLst>
               <a:ext uri="{FF2B5EF4-FFF2-40B4-BE49-F238E27FC236}">
-                <a16:creationId xmlns="" xmlns:a16="http://schemas.microsoft.com/office/drawing/2014/main" id="{63228B71-E923-4431-B8D2-FAE724678940}"/>
+                <a16:creationId xmlns:a16="http://schemas.microsoft.com/office/drawing/2014/main" id="{63228B71-E923-4431-B8D2-FAE724678940}"/>
               </a:ext>
             </a:extLst>
           </p:cNvPr>
@@ -1271,7 +1271,7 @@
           <p:cNvPr id="3" name="Content Placeholder 2">
             <a:extLst>
               <a:ext uri="{FF2B5EF4-FFF2-40B4-BE49-F238E27FC236}">
-                <a16:creationId xmlns="" xmlns:a16="http://schemas.microsoft.com/office/drawing/2014/main" id="{B18895E9-B7FF-4A00-955B-206CF8C73E43}"/>
+                <a16:creationId xmlns:a16="http://schemas.microsoft.com/office/drawing/2014/main" id="{B18895E9-B7FF-4A00-955B-206CF8C73E43}"/>
               </a:ext>
             </a:extLst>
           </p:cNvPr>
@@ -1333,7 +1333,7 @@
           <p:cNvPr id="4" name="Content Placeholder 3">
             <a:extLst>
               <a:ext uri="{FF2B5EF4-FFF2-40B4-BE49-F238E27FC236}">
-                <a16:creationId xmlns="" xmlns:a16="http://schemas.microsoft.com/office/drawing/2014/main" id="{DA813955-E3B9-44BC-8E1D-139269C8B48A}"/>
+                <a16:creationId xmlns:a16="http://schemas.microsoft.com/office/drawing/2014/main" id="{DA813955-E3B9-44BC-8E1D-139269C8B48A}"/>
               </a:ext>
             </a:extLst>
           </p:cNvPr>
@@ -1395,7 +1395,7 @@
           <p:cNvPr id="5" name="Date Placeholder 4">
             <a:extLst>
               <a:ext uri="{FF2B5EF4-FFF2-40B4-BE49-F238E27FC236}">
-                <a16:creationId xmlns="" xmlns:a16="http://schemas.microsoft.com/office/drawing/2014/main" id="{7E9B8EF5-28D5-4C4E-A2AB-EEA30D75DAFE}"/>
+                <a16:creationId xmlns:a16="http://schemas.microsoft.com/office/drawing/2014/main" id="{7E9B8EF5-28D5-4C4E-A2AB-EEA30D75DAFE}"/>
               </a:ext>
             </a:extLst>
           </p:cNvPr>
@@ -1424,7 +1424,7 @@
           <p:cNvPr id="6" name="Footer Placeholder 5">
             <a:extLst>
               <a:ext uri="{FF2B5EF4-FFF2-40B4-BE49-F238E27FC236}">
-                <a16:creationId xmlns="" xmlns:a16="http://schemas.microsoft.com/office/drawing/2014/main" id="{5723E678-8CB4-4335-AA04-6BD391748717}"/>
+                <a16:creationId xmlns:a16="http://schemas.microsoft.com/office/drawing/2014/main" id="{5723E678-8CB4-4335-AA04-6BD391748717}"/>
               </a:ext>
             </a:extLst>
           </p:cNvPr>
@@ -1449,7 +1449,7 @@
           <p:cNvPr id="7" name="Slide Number Placeholder 6">
             <a:extLst>
               <a:ext uri="{FF2B5EF4-FFF2-40B4-BE49-F238E27FC236}">
-                <a16:creationId xmlns="" xmlns:a16="http://schemas.microsoft.com/office/drawing/2014/main" id="{887B5567-9F4D-4AE1-92D8-769C9F7EA4F0}"/>
+                <a16:creationId xmlns:a16="http://schemas.microsoft.com/office/drawing/2014/main" id="{887B5567-9F4D-4AE1-92D8-769C9F7EA4F0}"/>
               </a:ext>
             </a:extLst>
           </p:cNvPr>
@@ -1508,7 +1508,7 @@
           <p:cNvPr id="2" name="Title 1">
             <a:extLst>
               <a:ext uri="{FF2B5EF4-FFF2-40B4-BE49-F238E27FC236}">
-                <a16:creationId xmlns="" xmlns:a16="http://schemas.microsoft.com/office/drawing/2014/main" id="{A40320A9-7C0C-45B4-BF2B-3B53B5686EBB}"/>
+                <a16:creationId xmlns:a16="http://schemas.microsoft.com/office/drawing/2014/main" id="{A40320A9-7C0C-45B4-BF2B-3B53B5686EBB}"/>
               </a:ext>
             </a:extLst>
           </p:cNvPr>
@@ -1541,7 +1541,7 @@
           <p:cNvPr id="3" name="Text Placeholder 2">
             <a:extLst>
               <a:ext uri="{FF2B5EF4-FFF2-40B4-BE49-F238E27FC236}">
-                <a16:creationId xmlns="" xmlns:a16="http://schemas.microsoft.com/office/drawing/2014/main" id="{8C440DE1-7DD6-4B1C-B961-CD2079B51F03}"/>
+                <a16:creationId xmlns:a16="http://schemas.microsoft.com/office/drawing/2014/main" id="{8C440DE1-7DD6-4B1C-B961-CD2079B51F03}"/>
               </a:ext>
             </a:extLst>
           </p:cNvPr>
@@ -1612,7 +1612,7 @@
           <p:cNvPr id="4" name="Content Placeholder 3">
             <a:extLst>
               <a:ext uri="{FF2B5EF4-FFF2-40B4-BE49-F238E27FC236}">
-                <a16:creationId xmlns="" xmlns:a16="http://schemas.microsoft.com/office/drawing/2014/main" id="{6FAFE840-CC9A-4D89-B05F-159EF756B427}"/>
+                <a16:creationId xmlns:a16="http://schemas.microsoft.com/office/drawing/2014/main" id="{6FAFE840-CC9A-4D89-B05F-159EF756B427}"/>
               </a:ext>
             </a:extLst>
           </p:cNvPr>
@@ -1674,7 +1674,7 @@
           <p:cNvPr id="5" name="Text Placeholder 4">
             <a:extLst>
               <a:ext uri="{FF2B5EF4-FFF2-40B4-BE49-F238E27FC236}">
-                <a16:creationId xmlns="" xmlns:a16="http://schemas.microsoft.com/office/drawing/2014/main" id="{4B87AADC-3401-48C6-98F6-0AB60F6DF9BE}"/>
+                <a16:creationId xmlns:a16="http://schemas.microsoft.com/office/drawing/2014/main" id="{4B87AADC-3401-48C6-98F6-0AB60F6DF9BE}"/>
               </a:ext>
             </a:extLst>
           </p:cNvPr>
@@ -1745,7 +1745,7 @@
           <p:cNvPr id="6" name="Content Placeholder 5">
             <a:extLst>
               <a:ext uri="{FF2B5EF4-FFF2-40B4-BE49-F238E27FC236}">
-                <a16:creationId xmlns="" xmlns:a16="http://schemas.microsoft.com/office/drawing/2014/main" id="{34BCF1A4-FB52-4DCD-80BC-324BA41C33CD}"/>
+                <a16:creationId xmlns:a16="http://schemas.microsoft.com/office/drawing/2014/main" id="{34BCF1A4-FB52-4DCD-80BC-324BA41C33CD}"/>
               </a:ext>
             </a:extLst>
           </p:cNvPr>
@@ -1807,7 +1807,7 @@
           <p:cNvPr id="7" name="Date Placeholder 6">
             <a:extLst>
               <a:ext uri="{FF2B5EF4-FFF2-40B4-BE49-F238E27FC236}">
-                <a16:creationId xmlns="" xmlns:a16="http://schemas.microsoft.com/office/drawing/2014/main" id="{8CFD4208-60E7-48B1-8CD0-717D5E26B827}"/>
+                <a16:creationId xmlns:a16="http://schemas.microsoft.com/office/drawing/2014/main" id="{8CFD4208-60E7-48B1-8CD0-717D5E26B827}"/>
               </a:ext>
             </a:extLst>
           </p:cNvPr>
@@ -1836,7 +1836,7 @@
           <p:cNvPr id="8" name="Footer Placeholder 7">
             <a:extLst>
               <a:ext uri="{FF2B5EF4-FFF2-40B4-BE49-F238E27FC236}">
-                <a16:creationId xmlns="" xmlns:a16="http://schemas.microsoft.com/office/drawing/2014/main" id="{94E429D1-BEB1-4D8A-91F2-CD4F80157F8D}"/>
+                <a16:creationId xmlns:a16="http://schemas.microsoft.com/office/drawing/2014/main" id="{94E429D1-BEB1-4D8A-91F2-CD4F80157F8D}"/>
               </a:ext>
             </a:extLst>
           </p:cNvPr>
@@ -1861,7 +1861,7 @@
           <p:cNvPr id="9" name="Slide Number Placeholder 8">
             <a:extLst>
               <a:ext uri="{FF2B5EF4-FFF2-40B4-BE49-F238E27FC236}">
-                <a16:creationId xmlns="" xmlns:a16="http://schemas.microsoft.com/office/drawing/2014/main" id="{6F17C19C-8370-4118-A8FC-5DDA6F84230F}"/>
+                <a16:creationId xmlns:a16="http://schemas.microsoft.com/office/drawing/2014/main" id="{6F17C19C-8370-4118-A8FC-5DDA6F84230F}"/>
               </a:ext>
             </a:extLst>
           </p:cNvPr>
@@ -1920,7 +1920,7 @@
           <p:cNvPr id="2" name="Title 1">
             <a:extLst>
               <a:ext uri="{FF2B5EF4-FFF2-40B4-BE49-F238E27FC236}">
-                <a16:creationId xmlns="" xmlns:a16="http://schemas.microsoft.com/office/drawing/2014/main" id="{252CBF36-7F99-45A9-BC35-BD2EC260CBF0}"/>
+                <a16:creationId xmlns:a16="http://schemas.microsoft.com/office/drawing/2014/main" id="{252CBF36-7F99-45A9-BC35-BD2EC260CBF0}"/>
               </a:ext>
             </a:extLst>
           </p:cNvPr>
@@ -1948,7 +1948,7 @@
           <p:cNvPr id="3" name="Date Placeholder 2">
             <a:extLst>
               <a:ext uri="{FF2B5EF4-FFF2-40B4-BE49-F238E27FC236}">
-                <a16:creationId xmlns="" xmlns:a16="http://schemas.microsoft.com/office/drawing/2014/main" id="{0D6F5F83-F07E-4501-B86B-9F96CD43993C}"/>
+                <a16:creationId xmlns:a16="http://schemas.microsoft.com/office/drawing/2014/main" id="{0D6F5F83-F07E-4501-B86B-9F96CD43993C}"/>
               </a:ext>
             </a:extLst>
           </p:cNvPr>
@@ -1977,7 +1977,7 @@
           <p:cNvPr id="4" name="Footer Placeholder 3">
             <a:extLst>
               <a:ext uri="{FF2B5EF4-FFF2-40B4-BE49-F238E27FC236}">
-                <a16:creationId xmlns="" xmlns:a16="http://schemas.microsoft.com/office/drawing/2014/main" id="{2861989B-F8E9-41FD-8E16-687424BCC266}"/>
+                <a16:creationId xmlns:a16="http://schemas.microsoft.com/office/drawing/2014/main" id="{2861989B-F8E9-41FD-8E16-687424BCC266}"/>
               </a:ext>
             </a:extLst>
           </p:cNvPr>
@@ -2002,7 +2002,7 @@
           <p:cNvPr id="5" name="Slide Number Placeholder 4">
             <a:extLst>
               <a:ext uri="{FF2B5EF4-FFF2-40B4-BE49-F238E27FC236}">
-                <a16:creationId xmlns="" xmlns:a16="http://schemas.microsoft.com/office/drawing/2014/main" id="{2026B6D7-7832-4815-95CE-5CEC39502825}"/>
+                <a16:creationId xmlns:a16="http://schemas.microsoft.com/office/drawing/2014/main" id="{2026B6D7-7832-4815-95CE-5CEC39502825}"/>
               </a:ext>
             </a:extLst>
           </p:cNvPr>
@@ -2061,7 +2061,7 @@
           <p:cNvPr id="2" name="Date Placeholder 1">
             <a:extLst>
               <a:ext uri="{FF2B5EF4-FFF2-40B4-BE49-F238E27FC236}">
-                <a16:creationId xmlns="" xmlns:a16="http://schemas.microsoft.com/office/drawing/2014/main" id="{9877919A-C4B6-46FD-A08A-9A4B867FE01A}"/>
+                <a16:creationId xmlns:a16="http://schemas.microsoft.com/office/drawing/2014/main" id="{9877919A-C4B6-46FD-A08A-9A4B867FE01A}"/>
               </a:ext>
             </a:extLst>
           </p:cNvPr>
@@ -2090,7 +2090,7 @@
           <p:cNvPr id="3" name="Footer Placeholder 2">
             <a:extLst>
               <a:ext uri="{FF2B5EF4-FFF2-40B4-BE49-F238E27FC236}">
-                <a16:creationId xmlns="" xmlns:a16="http://schemas.microsoft.com/office/drawing/2014/main" id="{9118539E-383C-4F1C-86F2-14C533A7E9FB}"/>
+                <a16:creationId xmlns:a16="http://schemas.microsoft.com/office/drawing/2014/main" id="{9118539E-383C-4F1C-86F2-14C533A7E9FB}"/>
               </a:ext>
             </a:extLst>
           </p:cNvPr>
@@ -2115,7 +2115,7 @@
           <p:cNvPr id="4" name="Slide Number Placeholder 3">
             <a:extLst>
               <a:ext uri="{FF2B5EF4-FFF2-40B4-BE49-F238E27FC236}">
-                <a16:creationId xmlns="" xmlns:a16="http://schemas.microsoft.com/office/drawing/2014/main" id="{C9A6D4E1-CA83-4214-9942-9E4617AA89BF}"/>
+                <a16:creationId xmlns:a16="http://schemas.microsoft.com/office/drawing/2014/main" id="{C9A6D4E1-CA83-4214-9942-9E4617AA89BF}"/>
               </a:ext>
             </a:extLst>
           </p:cNvPr>
@@ -2174,7 +2174,7 @@
           <p:cNvPr id="2" name="Title 1">
             <a:extLst>
               <a:ext uri="{FF2B5EF4-FFF2-40B4-BE49-F238E27FC236}">
-                <a16:creationId xmlns="" xmlns:a16="http://schemas.microsoft.com/office/drawing/2014/main" id="{046EF9B5-7A2A-4225-8817-86D028D6950C}"/>
+                <a16:creationId xmlns:a16="http://schemas.microsoft.com/office/drawing/2014/main" id="{046EF9B5-7A2A-4225-8817-86D028D6950C}"/>
               </a:ext>
             </a:extLst>
           </p:cNvPr>
@@ -2211,7 +2211,7 @@
           <p:cNvPr id="3" name="Content Placeholder 2">
             <a:extLst>
               <a:ext uri="{FF2B5EF4-FFF2-40B4-BE49-F238E27FC236}">
-                <a16:creationId xmlns="" xmlns:a16="http://schemas.microsoft.com/office/drawing/2014/main" id="{8667C390-5297-41E8-A403-22856007B051}"/>
+                <a16:creationId xmlns:a16="http://schemas.microsoft.com/office/drawing/2014/main" id="{8667C390-5297-41E8-A403-22856007B051}"/>
               </a:ext>
             </a:extLst>
           </p:cNvPr>
@@ -2301,7 +2301,7 @@
           <p:cNvPr id="4" name="Text Placeholder 3">
             <a:extLst>
               <a:ext uri="{FF2B5EF4-FFF2-40B4-BE49-F238E27FC236}">
-                <a16:creationId xmlns="" xmlns:a16="http://schemas.microsoft.com/office/drawing/2014/main" id="{8D0D2F7D-D6CD-4AB1-A3EA-CBFD2A2B3703}"/>
+                <a16:creationId xmlns:a16="http://schemas.microsoft.com/office/drawing/2014/main" id="{8D0D2F7D-D6CD-4AB1-A3EA-CBFD2A2B3703}"/>
               </a:ext>
             </a:extLst>
           </p:cNvPr>
@@ -2372,7 +2372,7 @@
           <p:cNvPr id="5" name="Date Placeholder 4">
             <a:extLst>
               <a:ext uri="{FF2B5EF4-FFF2-40B4-BE49-F238E27FC236}">
-                <a16:creationId xmlns="" xmlns:a16="http://schemas.microsoft.com/office/drawing/2014/main" id="{E17A441D-4FA7-4110-BF24-165CD3C3DAD7}"/>
+                <a16:creationId xmlns:a16="http://schemas.microsoft.com/office/drawing/2014/main" id="{E17A441D-4FA7-4110-BF24-165CD3C3DAD7}"/>
               </a:ext>
             </a:extLst>
           </p:cNvPr>
@@ -2401,7 +2401,7 @@
           <p:cNvPr id="6" name="Footer Placeholder 5">
             <a:extLst>
               <a:ext uri="{FF2B5EF4-FFF2-40B4-BE49-F238E27FC236}">
-                <a16:creationId xmlns="" xmlns:a16="http://schemas.microsoft.com/office/drawing/2014/main" id="{346102C5-5AE3-43CF-A686-1AB72B0790AB}"/>
+                <a16:creationId xmlns:a16="http://schemas.microsoft.com/office/drawing/2014/main" id="{346102C5-5AE3-43CF-A686-1AB72B0790AB}"/>
               </a:ext>
             </a:extLst>
           </p:cNvPr>
@@ -2426,7 +2426,7 @@
           <p:cNvPr id="7" name="Slide Number Placeholder 6">
             <a:extLst>
               <a:ext uri="{FF2B5EF4-FFF2-40B4-BE49-F238E27FC236}">
-                <a16:creationId xmlns="" xmlns:a16="http://schemas.microsoft.com/office/drawing/2014/main" id="{5528B3F7-462C-4500-8836-B3E5CD8DA61A}"/>
+                <a16:creationId xmlns:a16="http://schemas.microsoft.com/office/drawing/2014/main" id="{5528B3F7-462C-4500-8836-B3E5CD8DA61A}"/>
               </a:ext>
             </a:extLst>
           </p:cNvPr>
@@ -2485,7 +2485,7 @@
           <p:cNvPr id="2" name="Title 1">
             <a:extLst>
               <a:ext uri="{FF2B5EF4-FFF2-40B4-BE49-F238E27FC236}">
-                <a16:creationId xmlns="" xmlns:a16="http://schemas.microsoft.com/office/drawing/2014/main" id="{4BA10E59-DA48-4690-A956-9EB8E4E11EE5}"/>
+                <a16:creationId xmlns:a16="http://schemas.microsoft.com/office/drawing/2014/main" id="{4BA10E59-DA48-4690-A956-9EB8E4E11EE5}"/>
               </a:ext>
             </a:extLst>
           </p:cNvPr>
@@ -2522,7 +2522,7 @@
           <p:cNvPr id="3" name="Picture Placeholder 2">
             <a:extLst>
               <a:ext uri="{FF2B5EF4-FFF2-40B4-BE49-F238E27FC236}">
-                <a16:creationId xmlns="" xmlns:a16="http://schemas.microsoft.com/office/drawing/2014/main" id="{AC7AFE1E-67D1-4106-97CA-98302D42CC4D}"/>
+                <a16:creationId xmlns:a16="http://schemas.microsoft.com/office/drawing/2014/main" id="{AC7AFE1E-67D1-4106-97CA-98302D42CC4D}"/>
               </a:ext>
             </a:extLst>
           </p:cNvPr>
@@ -2589,7 +2589,7 @@
           <p:cNvPr id="4" name="Text Placeholder 3">
             <a:extLst>
               <a:ext uri="{FF2B5EF4-FFF2-40B4-BE49-F238E27FC236}">
-                <a16:creationId xmlns="" xmlns:a16="http://schemas.microsoft.com/office/drawing/2014/main" id="{67D8D73B-3D4D-42A7-9A3C-1D508E8A9B45}"/>
+                <a16:creationId xmlns:a16="http://schemas.microsoft.com/office/drawing/2014/main" id="{67D8D73B-3D4D-42A7-9A3C-1D508E8A9B45}"/>
               </a:ext>
             </a:extLst>
           </p:cNvPr>
@@ -2660,7 +2660,7 @@
           <p:cNvPr id="5" name="Date Placeholder 4">
             <a:extLst>
               <a:ext uri="{FF2B5EF4-FFF2-40B4-BE49-F238E27FC236}">
-                <a16:creationId xmlns="" xmlns:a16="http://schemas.microsoft.com/office/drawing/2014/main" id="{48C8945E-A47A-42A2-9DF6-CA6D5002F65F}"/>
+                <a16:creationId xmlns:a16="http://schemas.microsoft.com/office/drawing/2014/main" id="{48C8945E-A47A-42A2-9DF6-CA6D5002F65F}"/>
               </a:ext>
             </a:extLst>
           </p:cNvPr>
@@ -2689,7 +2689,7 @@
           <p:cNvPr id="6" name="Footer Placeholder 5">
             <a:extLst>
               <a:ext uri="{FF2B5EF4-FFF2-40B4-BE49-F238E27FC236}">
-                <a16:creationId xmlns="" xmlns:a16="http://schemas.microsoft.com/office/drawing/2014/main" id="{EB000DB4-2747-4297-B400-42A539FBDB42}"/>
+                <a16:creationId xmlns:a16="http://schemas.microsoft.com/office/drawing/2014/main" id="{EB000DB4-2747-4297-B400-42A539FBDB42}"/>
               </a:ext>
             </a:extLst>
           </p:cNvPr>
@@ -2714,7 +2714,7 @@
           <p:cNvPr id="7" name="Slide Number Placeholder 6">
             <a:extLst>
               <a:ext uri="{FF2B5EF4-FFF2-40B4-BE49-F238E27FC236}">
-                <a16:creationId xmlns="" xmlns:a16="http://schemas.microsoft.com/office/drawing/2014/main" id="{5BAD9222-F141-4803-AF73-E2DD92E2ABBC}"/>
+                <a16:creationId xmlns:a16="http://schemas.microsoft.com/office/drawing/2014/main" id="{5BAD9222-F141-4803-AF73-E2DD92E2ABBC}"/>
               </a:ext>
             </a:extLst>
           </p:cNvPr>
@@ -2778,7 +2778,7 @@
           <p:cNvPr id="2" name="Title Placeholder 1">
             <a:extLst>
               <a:ext uri="{FF2B5EF4-FFF2-40B4-BE49-F238E27FC236}">
-                <a16:creationId xmlns="" xmlns:a16="http://schemas.microsoft.com/office/drawing/2014/main" id="{5BF9D404-795C-4EA4-AD01-26740519239C}"/>
+                <a16:creationId xmlns:a16="http://schemas.microsoft.com/office/drawing/2014/main" id="{5BF9D404-795C-4EA4-AD01-26740519239C}"/>
               </a:ext>
             </a:extLst>
           </p:cNvPr>
@@ -2816,7 +2816,7 @@
           <p:cNvPr id="3" name="Text Placeholder 2">
             <a:extLst>
               <a:ext uri="{FF2B5EF4-FFF2-40B4-BE49-F238E27FC236}">
-                <a16:creationId xmlns="" xmlns:a16="http://schemas.microsoft.com/office/drawing/2014/main" id="{DE3FEC7B-48F8-4348-9BC6-68F83B859EE9}"/>
+                <a16:creationId xmlns:a16="http://schemas.microsoft.com/office/drawing/2014/main" id="{DE3FEC7B-48F8-4348-9BC6-68F83B859EE9}"/>
               </a:ext>
             </a:extLst>
           </p:cNvPr>
@@ -2883,7 +2883,7 @@
           <p:cNvPr id="4" name="Date Placeholder 3">
             <a:extLst>
               <a:ext uri="{FF2B5EF4-FFF2-40B4-BE49-F238E27FC236}">
-                <a16:creationId xmlns="" xmlns:a16="http://schemas.microsoft.com/office/drawing/2014/main" id="{31CA1A1D-E2F5-4161-A025-7B911965C2FE}"/>
+                <a16:creationId xmlns:a16="http://schemas.microsoft.com/office/drawing/2014/main" id="{31CA1A1D-E2F5-4161-A025-7B911965C2FE}"/>
               </a:ext>
             </a:extLst>
           </p:cNvPr>
@@ -2930,7 +2930,7 @@
           <p:cNvPr id="5" name="Footer Placeholder 4">
             <a:extLst>
               <a:ext uri="{FF2B5EF4-FFF2-40B4-BE49-F238E27FC236}">
-                <a16:creationId xmlns="" xmlns:a16="http://schemas.microsoft.com/office/drawing/2014/main" id="{43C7B926-18F3-4C13-AB92-764E10D324FB}"/>
+                <a16:creationId xmlns:a16="http://schemas.microsoft.com/office/drawing/2014/main" id="{43C7B926-18F3-4C13-AB92-764E10D324FB}"/>
               </a:ext>
             </a:extLst>
           </p:cNvPr>
@@ -2973,7 +2973,7 @@
           <p:cNvPr id="6" name="Slide Number Placeholder 5">
             <a:extLst>
               <a:ext uri="{FF2B5EF4-FFF2-40B4-BE49-F238E27FC236}">
-                <a16:creationId xmlns="" xmlns:a16="http://schemas.microsoft.com/office/drawing/2014/main" id="{734FA846-3BF6-46FD-80CF-34B300D244C0}"/>
+                <a16:creationId xmlns:a16="http://schemas.microsoft.com/office/drawing/2014/main" id="{734FA846-3BF6-46FD-80CF-34B300D244C0}"/>
               </a:ext>
             </a:extLst>
           </p:cNvPr>
@@ -3927,7 +3927,7 @@
           <p:cNvPr id="11" name="TextBox 10">
             <a:extLst>
               <a:ext uri="{FF2B5EF4-FFF2-40B4-BE49-F238E27FC236}">
-                <a16:creationId xmlns="" xmlns:a16="http://schemas.microsoft.com/office/drawing/2014/main" id="{E0BBD6C8-C8F2-40C5-AA64-85961A11ADC2}"/>
+                <a16:creationId xmlns:a16="http://schemas.microsoft.com/office/drawing/2014/main" id="{E0BBD6C8-C8F2-40C5-AA64-85961A11ADC2}"/>
               </a:ext>
             </a:extLst>
           </p:cNvPr>
@@ -4055,7 +4055,7 @@
           <p:cNvPr id="19" name="TextBox 18">
             <a:extLst>
               <a:ext uri="{FF2B5EF4-FFF2-40B4-BE49-F238E27FC236}">
-                <a16:creationId xmlns="" xmlns:a16="http://schemas.microsoft.com/office/drawing/2014/main" id="{E0BBD6C8-C8F2-40C5-AA64-85961A11ADC2}"/>
+                <a16:creationId xmlns:a16="http://schemas.microsoft.com/office/drawing/2014/main" id="{E0BBD6C8-C8F2-40C5-AA64-85961A11ADC2}"/>
               </a:ext>
             </a:extLst>
           </p:cNvPr>
@@ -4177,7 +4177,7 @@
           <p:cNvPr id="23" name="TextBox 22">
             <a:extLst>
               <a:ext uri="{FF2B5EF4-FFF2-40B4-BE49-F238E27FC236}">
-                <a16:creationId xmlns="" xmlns:a16="http://schemas.microsoft.com/office/drawing/2014/main" id="{E0BBD6C8-C8F2-40C5-AA64-85961A11ADC2}"/>
+                <a16:creationId xmlns:a16="http://schemas.microsoft.com/office/drawing/2014/main" id="{E0BBD6C8-C8F2-40C5-AA64-85961A11ADC2}"/>
               </a:ext>
             </a:extLst>
           </p:cNvPr>
@@ -4297,7 +4297,7 @@
           <p:cNvPr id="28" name="TextBox 27">
             <a:extLst>
               <a:ext uri="{FF2B5EF4-FFF2-40B4-BE49-F238E27FC236}">
-                <a16:creationId xmlns="" xmlns:a16="http://schemas.microsoft.com/office/drawing/2014/main" id="{E0BBD6C8-C8F2-40C5-AA64-85961A11ADC2}"/>
+                <a16:creationId xmlns:a16="http://schemas.microsoft.com/office/drawing/2014/main" id="{E0BBD6C8-C8F2-40C5-AA64-85961A11ADC2}"/>
               </a:ext>
             </a:extLst>
           </p:cNvPr>
@@ -4426,7 +4426,7 @@
           <p:cNvPr id="34" name="TextBox 33">
             <a:extLst>
               <a:ext uri="{FF2B5EF4-FFF2-40B4-BE49-F238E27FC236}">
-                <a16:creationId xmlns="" xmlns:a16="http://schemas.microsoft.com/office/drawing/2014/main" id="{E0BBD6C8-C8F2-40C5-AA64-85961A11ADC2}"/>
+                <a16:creationId xmlns:a16="http://schemas.microsoft.com/office/drawing/2014/main" id="{E0BBD6C8-C8F2-40C5-AA64-85961A11ADC2}"/>
               </a:ext>
             </a:extLst>
           </p:cNvPr>
@@ -4558,7 +4558,7 @@
           <p:cNvPr id="38" name="TextBox 37">
             <a:extLst>
               <a:ext uri="{FF2B5EF4-FFF2-40B4-BE49-F238E27FC236}">
-                <a16:creationId xmlns="" xmlns:a16="http://schemas.microsoft.com/office/drawing/2014/main" id="{E0BBD6C8-C8F2-40C5-AA64-85961A11ADC2}"/>
+                <a16:creationId xmlns:a16="http://schemas.microsoft.com/office/drawing/2014/main" id="{E0BBD6C8-C8F2-40C5-AA64-85961A11ADC2}"/>
               </a:ext>
             </a:extLst>
           </p:cNvPr>
@@ -4728,7 +4728,7 @@
           <p:cNvPr id="44" name="TextBox 43">
             <a:extLst>
               <a:ext uri="{FF2B5EF4-FFF2-40B4-BE49-F238E27FC236}">
-                <a16:creationId xmlns="" xmlns:a16="http://schemas.microsoft.com/office/drawing/2014/main" id="{E0BBD6C8-C8F2-40C5-AA64-85961A11ADC2}"/>
+                <a16:creationId xmlns:a16="http://schemas.microsoft.com/office/drawing/2014/main" id="{E0BBD6C8-C8F2-40C5-AA64-85961A11ADC2}"/>
               </a:ext>
             </a:extLst>
           </p:cNvPr>
@@ -4763,7 +4763,7 @@
           <p:cNvPr id="45" name="TextBox 44">
             <a:extLst>
               <a:ext uri="{FF2B5EF4-FFF2-40B4-BE49-F238E27FC236}">
-                <a16:creationId xmlns="" xmlns:a16="http://schemas.microsoft.com/office/drawing/2014/main" id="{E0BBD6C8-C8F2-40C5-AA64-85961A11ADC2}"/>
+                <a16:creationId xmlns:a16="http://schemas.microsoft.com/office/drawing/2014/main" id="{E0BBD6C8-C8F2-40C5-AA64-85961A11ADC2}"/>
               </a:ext>
             </a:extLst>
           </p:cNvPr>
@@ -4798,7 +4798,7 @@
           <p:cNvPr id="26" name="TextBox 25">
             <a:extLst>
               <a:ext uri="{FF2B5EF4-FFF2-40B4-BE49-F238E27FC236}">
-                <a16:creationId xmlns="" xmlns:a16="http://schemas.microsoft.com/office/drawing/2014/main" id="{70BF22D6-D5A2-4CCC-8E2D-329E25668556}"/>
+                <a16:creationId xmlns:a16="http://schemas.microsoft.com/office/drawing/2014/main" id="{70BF22D6-D5A2-4CCC-8E2D-329E25668556}"/>
               </a:ext>
             </a:extLst>
           </p:cNvPr>
@@ -5007,7 +5007,7 @@
           <p:cNvPr id="11" name="TextBox 10">
             <a:extLst>
               <a:ext uri="{FF2B5EF4-FFF2-40B4-BE49-F238E27FC236}">
-                <a16:creationId xmlns="" xmlns:a16="http://schemas.microsoft.com/office/drawing/2014/main" id="{E0BBD6C8-C8F2-40C5-AA64-85961A11ADC2}"/>
+                <a16:creationId xmlns:a16="http://schemas.microsoft.com/office/drawing/2014/main" id="{E0BBD6C8-C8F2-40C5-AA64-85961A11ADC2}"/>
               </a:ext>
             </a:extLst>
           </p:cNvPr>
@@ -5420,7 +5420,7 @@
           <p:cNvPr id="19" name="TextBox 18">
             <a:extLst>
               <a:ext uri="{FF2B5EF4-FFF2-40B4-BE49-F238E27FC236}">
-                <a16:creationId xmlns="" xmlns:a16="http://schemas.microsoft.com/office/drawing/2014/main" id="{E0BBD6C8-C8F2-40C5-AA64-85961A11ADC2}"/>
+                <a16:creationId xmlns:a16="http://schemas.microsoft.com/office/drawing/2014/main" id="{E0BBD6C8-C8F2-40C5-AA64-85961A11ADC2}"/>
               </a:ext>
             </a:extLst>
           </p:cNvPr>
@@ -5550,7 +5550,7 @@
           <p:cNvPr id="23" name="TextBox 22">
             <a:extLst>
               <a:ext uri="{FF2B5EF4-FFF2-40B4-BE49-F238E27FC236}">
-                <a16:creationId xmlns="" xmlns:a16="http://schemas.microsoft.com/office/drawing/2014/main" id="{E0BBD6C8-C8F2-40C5-AA64-85961A11ADC2}"/>
+                <a16:creationId xmlns:a16="http://schemas.microsoft.com/office/drawing/2014/main" id="{E0BBD6C8-C8F2-40C5-AA64-85961A11ADC2}"/>
               </a:ext>
             </a:extLst>
           </p:cNvPr>
@@ -5667,7 +5667,7 @@
           <p:cNvPr id="28" name="TextBox 27">
             <a:extLst>
               <a:ext uri="{FF2B5EF4-FFF2-40B4-BE49-F238E27FC236}">
-                <a16:creationId xmlns="" xmlns:a16="http://schemas.microsoft.com/office/drawing/2014/main" id="{E0BBD6C8-C8F2-40C5-AA64-85961A11ADC2}"/>
+                <a16:creationId xmlns:a16="http://schemas.microsoft.com/office/drawing/2014/main" id="{E0BBD6C8-C8F2-40C5-AA64-85961A11ADC2}"/>
               </a:ext>
             </a:extLst>
           </p:cNvPr>
@@ -5791,7 +5791,7 @@
           <p:cNvPr id="34" name="TextBox 33">
             <a:extLst>
               <a:ext uri="{FF2B5EF4-FFF2-40B4-BE49-F238E27FC236}">
-                <a16:creationId xmlns="" xmlns:a16="http://schemas.microsoft.com/office/drawing/2014/main" id="{E0BBD6C8-C8F2-40C5-AA64-85961A11ADC2}"/>
+                <a16:creationId xmlns:a16="http://schemas.microsoft.com/office/drawing/2014/main" id="{E0BBD6C8-C8F2-40C5-AA64-85961A11ADC2}"/>
               </a:ext>
             </a:extLst>
           </p:cNvPr>
@@ -5917,7 +5917,7 @@
           <p:cNvPr id="38" name="TextBox 37">
             <a:extLst>
               <a:ext uri="{FF2B5EF4-FFF2-40B4-BE49-F238E27FC236}">
-                <a16:creationId xmlns="" xmlns:a16="http://schemas.microsoft.com/office/drawing/2014/main" id="{E0BBD6C8-C8F2-40C5-AA64-85961A11ADC2}"/>
+                <a16:creationId xmlns:a16="http://schemas.microsoft.com/office/drawing/2014/main" id="{E0BBD6C8-C8F2-40C5-AA64-85961A11ADC2}"/>
               </a:ext>
             </a:extLst>
           </p:cNvPr>
@@ -6087,7 +6087,7 @@
           <p:cNvPr id="44" name="TextBox 43">
             <a:extLst>
               <a:ext uri="{FF2B5EF4-FFF2-40B4-BE49-F238E27FC236}">
-                <a16:creationId xmlns="" xmlns:a16="http://schemas.microsoft.com/office/drawing/2014/main" id="{E0BBD6C8-C8F2-40C5-AA64-85961A11ADC2}"/>
+                <a16:creationId xmlns:a16="http://schemas.microsoft.com/office/drawing/2014/main" id="{E0BBD6C8-C8F2-40C5-AA64-85961A11ADC2}"/>
               </a:ext>
             </a:extLst>
           </p:cNvPr>
@@ -6122,7 +6122,7 @@
           <p:cNvPr id="45" name="TextBox 44">
             <a:extLst>
               <a:ext uri="{FF2B5EF4-FFF2-40B4-BE49-F238E27FC236}">
-                <a16:creationId xmlns="" xmlns:a16="http://schemas.microsoft.com/office/drawing/2014/main" id="{E0BBD6C8-C8F2-40C5-AA64-85961A11ADC2}"/>
+                <a16:creationId xmlns:a16="http://schemas.microsoft.com/office/drawing/2014/main" id="{E0BBD6C8-C8F2-40C5-AA64-85961A11ADC2}"/>
               </a:ext>
             </a:extLst>
           </p:cNvPr>
@@ -6157,7 +6157,7 @@
           <p:cNvPr id="26" name="TextBox 25">
             <a:extLst>
               <a:ext uri="{FF2B5EF4-FFF2-40B4-BE49-F238E27FC236}">
-                <a16:creationId xmlns="" xmlns:a16="http://schemas.microsoft.com/office/drawing/2014/main" id="{6C45E26E-8FEE-4439-A34B-789237C9C62C}"/>
+                <a16:creationId xmlns:a16="http://schemas.microsoft.com/office/drawing/2014/main" id="{6C45E26E-8FEE-4439-A34B-789237C9C62C}"/>
               </a:ext>
             </a:extLst>
           </p:cNvPr>
@@ -6192,7 +6192,7 @@
           <p:cNvPr id="31" name="Rectangle 30">
             <a:extLst>
               <a:ext uri="{FF2B5EF4-FFF2-40B4-BE49-F238E27FC236}">
-                <a16:creationId xmlns="" xmlns:a16="http://schemas.microsoft.com/office/drawing/2014/main" id="{6D396BFC-10E0-4935-903B-EDC457BD1755}"/>
+                <a16:creationId xmlns:a16="http://schemas.microsoft.com/office/drawing/2014/main" id="{6D396BFC-10E0-4935-903B-EDC457BD1755}"/>
               </a:ext>
             </a:extLst>
           </p:cNvPr>
@@ -6252,7 +6252,7 @@
           <p:cNvPr id="32" name="Rectangle 31">
             <a:extLst>
               <a:ext uri="{FF2B5EF4-FFF2-40B4-BE49-F238E27FC236}">
-                <a16:creationId xmlns="" xmlns:a16="http://schemas.microsoft.com/office/drawing/2014/main" id="{02A645C8-F11F-438D-92DC-F6FCCA5ECFB8}"/>
+                <a16:creationId xmlns:a16="http://schemas.microsoft.com/office/drawing/2014/main" id="{02A645C8-F11F-438D-92DC-F6FCCA5ECFB8}"/>
               </a:ext>
             </a:extLst>
           </p:cNvPr>
@@ -6316,7 +6316,7 @@
           <p:cNvPr id="12" name="Straight Arrow Connector 11">
             <a:extLst>
               <a:ext uri="{FF2B5EF4-FFF2-40B4-BE49-F238E27FC236}">
-                <a16:creationId xmlns="" xmlns:a16="http://schemas.microsoft.com/office/drawing/2014/main" id="{FF2076CA-F897-4293-B6CD-7408EB452156}"/>
+                <a16:creationId xmlns:a16="http://schemas.microsoft.com/office/drawing/2014/main" id="{FF2076CA-F897-4293-B6CD-7408EB452156}"/>
               </a:ext>
             </a:extLst>
           </p:cNvPr>
@@ -6359,7 +6359,7 @@
           <p:cNvPr id="14" name="Straight Arrow Connector 13">
             <a:extLst>
               <a:ext uri="{FF2B5EF4-FFF2-40B4-BE49-F238E27FC236}">
-                <a16:creationId xmlns="" xmlns:a16="http://schemas.microsoft.com/office/drawing/2014/main" id="{5C625B7B-4A1E-46C5-9082-4FEC89B30DA9}"/>
+                <a16:creationId xmlns:a16="http://schemas.microsoft.com/office/drawing/2014/main" id="{5C625B7B-4A1E-46C5-9082-4FEC89B30DA9}"/>
               </a:ext>
             </a:extLst>
           </p:cNvPr>
@@ -6402,7 +6402,7 @@
           <p:cNvPr id="65" name="Straight Arrow Connector 64">
             <a:extLst>
               <a:ext uri="{FF2B5EF4-FFF2-40B4-BE49-F238E27FC236}">
-                <a16:creationId xmlns="" xmlns:a16="http://schemas.microsoft.com/office/drawing/2014/main" id="{C1C9B843-1D11-4D9F-8CBF-AE00E90AA070}"/>
+                <a16:creationId xmlns:a16="http://schemas.microsoft.com/office/drawing/2014/main" id="{C1C9B843-1D11-4D9F-8CBF-AE00E90AA070}"/>
               </a:ext>
             </a:extLst>
           </p:cNvPr>
@@ -6444,7 +6444,7 @@
           <p:cNvPr id="66" name="TextBox 65">
             <a:extLst>
               <a:ext uri="{FF2B5EF4-FFF2-40B4-BE49-F238E27FC236}">
-                <a16:creationId xmlns="" xmlns:a16="http://schemas.microsoft.com/office/drawing/2014/main" id="{5E4B2700-0522-40EF-B035-166AA1C17D76}"/>
+                <a16:creationId xmlns:a16="http://schemas.microsoft.com/office/drawing/2014/main" id="{5E4B2700-0522-40EF-B035-166AA1C17D76}"/>
               </a:ext>
             </a:extLst>
           </p:cNvPr>
@@ -6533,7 +6533,7 @@
           <p:cNvPr id="40" name="TextBox 39">
             <a:extLst>
               <a:ext uri="{FF2B5EF4-FFF2-40B4-BE49-F238E27FC236}">
-                <a16:creationId xmlns="" xmlns:a16="http://schemas.microsoft.com/office/drawing/2014/main" id="{E0BBD6C8-C8F2-40C5-AA64-85961A11ADC2}"/>
+                <a16:creationId xmlns:a16="http://schemas.microsoft.com/office/drawing/2014/main" id="{E0BBD6C8-C8F2-40C5-AA64-85961A11ADC2}"/>
               </a:ext>
             </a:extLst>
           </p:cNvPr>
@@ -6657,7 +6657,7 @@
           <p:cNvPr id="48" name="TextBox 47">
             <a:extLst>
               <a:ext uri="{FF2B5EF4-FFF2-40B4-BE49-F238E27FC236}">
-                <a16:creationId xmlns="" xmlns:a16="http://schemas.microsoft.com/office/drawing/2014/main" id="{E0BBD6C8-C8F2-40C5-AA64-85961A11ADC2}"/>
+                <a16:creationId xmlns:a16="http://schemas.microsoft.com/office/drawing/2014/main" id="{E0BBD6C8-C8F2-40C5-AA64-85961A11ADC2}"/>
               </a:ext>
             </a:extLst>
           </p:cNvPr>
@@ -6692,7 +6692,7 @@
           <p:cNvPr id="52" name="Rectangle 51">
             <a:extLst>
               <a:ext uri="{FF2B5EF4-FFF2-40B4-BE49-F238E27FC236}">
-                <a16:creationId xmlns="" xmlns:a16="http://schemas.microsoft.com/office/drawing/2014/main" id="{21B869D6-66CB-4B38-975F-B7FEB6AA9B13}"/>
+                <a16:creationId xmlns:a16="http://schemas.microsoft.com/office/drawing/2014/main" id="{21B869D6-66CB-4B38-975F-B7FEB6AA9B13}"/>
               </a:ext>
             </a:extLst>
           </p:cNvPr>
@@ -6813,7 +6813,7 @@
           <p:cNvPr id="58" name="TextBox 57">
             <a:extLst>
               <a:ext uri="{FF2B5EF4-FFF2-40B4-BE49-F238E27FC236}">
-                <a16:creationId xmlns="" xmlns:a16="http://schemas.microsoft.com/office/drawing/2014/main" id="{E0BBD6C8-C8F2-40C5-AA64-85961A11ADC2}"/>
+                <a16:creationId xmlns:a16="http://schemas.microsoft.com/office/drawing/2014/main" id="{E0BBD6C8-C8F2-40C5-AA64-85961A11ADC2}"/>
               </a:ext>
             </a:extLst>
           </p:cNvPr>
@@ -6921,7 +6921,7 @@
           <p:cNvPr id="94" name="TextBox 93">
             <a:extLst>
               <a:ext uri="{FF2B5EF4-FFF2-40B4-BE49-F238E27FC236}">
-                <a16:creationId xmlns="" xmlns:a16="http://schemas.microsoft.com/office/drawing/2014/main" id="{E0BBD6C8-C8F2-40C5-AA64-85961A11ADC2}"/>
+                <a16:creationId xmlns:a16="http://schemas.microsoft.com/office/drawing/2014/main" id="{E0BBD6C8-C8F2-40C5-AA64-85961A11ADC2}"/>
               </a:ext>
             </a:extLst>
           </p:cNvPr>
@@ -6956,7 +6956,7 @@
           <p:cNvPr id="95" name="TextBox 94">
             <a:extLst>
               <a:ext uri="{FF2B5EF4-FFF2-40B4-BE49-F238E27FC236}">
-                <a16:creationId xmlns="" xmlns:a16="http://schemas.microsoft.com/office/drawing/2014/main" id="{E0BBD6C8-C8F2-40C5-AA64-85961A11ADC2}"/>
+                <a16:creationId xmlns:a16="http://schemas.microsoft.com/office/drawing/2014/main" id="{E0BBD6C8-C8F2-40C5-AA64-85961A11ADC2}"/>
               </a:ext>
             </a:extLst>
           </p:cNvPr>
@@ -7027,7 +7027,7 @@
           <p:cNvPr id="49" name="Rectangle 48">
             <a:extLst>
               <a:ext uri="{FF2B5EF4-FFF2-40B4-BE49-F238E27FC236}">
-                <a16:creationId xmlns="" xmlns:a16="http://schemas.microsoft.com/office/drawing/2014/main" id="{02A645C8-F11F-438D-92DC-F6FCCA5ECFB8}"/>
+                <a16:creationId xmlns:a16="http://schemas.microsoft.com/office/drawing/2014/main" id="{02A645C8-F11F-438D-92DC-F6FCCA5ECFB8}"/>
               </a:ext>
             </a:extLst>
           </p:cNvPr>
@@ -7123,7 +7123,7 @@
           <p:cNvPr id="56" name="TextBox 55">
             <a:extLst>
               <a:ext uri="{FF2B5EF4-FFF2-40B4-BE49-F238E27FC236}">
-                <a16:creationId xmlns="" xmlns:a16="http://schemas.microsoft.com/office/drawing/2014/main" id="{E0BBD6C8-C8F2-40C5-AA64-85961A11ADC2}"/>
+                <a16:creationId xmlns:a16="http://schemas.microsoft.com/office/drawing/2014/main" id="{E0BBD6C8-C8F2-40C5-AA64-85961A11ADC2}"/>
               </a:ext>
             </a:extLst>
           </p:cNvPr>
@@ -7158,7 +7158,7 @@
           <p:cNvPr id="57" name="Rectangle 56">
             <a:extLst>
               <a:ext uri="{FF2B5EF4-FFF2-40B4-BE49-F238E27FC236}">
-                <a16:creationId xmlns="" xmlns:a16="http://schemas.microsoft.com/office/drawing/2014/main" id="{93FBA679-F71B-47BD-BE29-21E7C2262CEB}"/>
+                <a16:creationId xmlns:a16="http://schemas.microsoft.com/office/drawing/2014/main" id="{93FBA679-F71B-47BD-BE29-21E7C2262CEB}"/>
               </a:ext>
             </a:extLst>
           </p:cNvPr>
@@ -7276,7 +7276,7 @@
           <p:cNvPr id="59" name="TextBox 58">
             <a:extLst>
               <a:ext uri="{FF2B5EF4-FFF2-40B4-BE49-F238E27FC236}">
-                <a16:creationId xmlns="" xmlns:a16="http://schemas.microsoft.com/office/drawing/2014/main" id="{5E4B2700-0522-40EF-B035-166AA1C17D76}"/>
+                <a16:creationId xmlns:a16="http://schemas.microsoft.com/office/drawing/2014/main" id="{5E4B2700-0522-40EF-B035-166AA1C17D76}"/>
               </a:ext>
             </a:extLst>
           </p:cNvPr>
@@ -7607,7 +7607,7 @@
           <p:cNvPr id="19" name="TextBox 18">
             <a:extLst>
               <a:ext uri="{FF2B5EF4-FFF2-40B4-BE49-F238E27FC236}">
-                <a16:creationId xmlns="" xmlns:a16="http://schemas.microsoft.com/office/drawing/2014/main" id="{E0BBD6C8-C8F2-40C5-AA64-85961A11ADC2}"/>
+                <a16:creationId xmlns:a16="http://schemas.microsoft.com/office/drawing/2014/main" id="{E0BBD6C8-C8F2-40C5-AA64-85961A11ADC2}"/>
               </a:ext>
             </a:extLst>
           </p:cNvPr>
@@ -7733,7 +7733,7 @@
           <p:cNvPr id="23" name="TextBox 22">
             <a:extLst>
               <a:ext uri="{FF2B5EF4-FFF2-40B4-BE49-F238E27FC236}">
-                <a16:creationId xmlns="" xmlns:a16="http://schemas.microsoft.com/office/drawing/2014/main" id="{E0BBD6C8-C8F2-40C5-AA64-85961A11ADC2}"/>
+                <a16:creationId xmlns:a16="http://schemas.microsoft.com/office/drawing/2014/main" id="{E0BBD6C8-C8F2-40C5-AA64-85961A11ADC2}"/>
               </a:ext>
             </a:extLst>
           </p:cNvPr>
@@ -7850,7 +7850,7 @@
           <p:cNvPr id="28" name="TextBox 27">
             <a:extLst>
               <a:ext uri="{FF2B5EF4-FFF2-40B4-BE49-F238E27FC236}">
-                <a16:creationId xmlns="" xmlns:a16="http://schemas.microsoft.com/office/drawing/2014/main" id="{E0BBD6C8-C8F2-40C5-AA64-85961A11ADC2}"/>
+                <a16:creationId xmlns:a16="http://schemas.microsoft.com/office/drawing/2014/main" id="{E0BBD6C8-C8F2-40C5-AA64-85961A11ADC2}"/>
               </a:ext>
             </a:extLst>
           </p:cNvPr>
@@ -7975,7 +7975,7 @@
           <p:cNvPr id="34" name="TextBox 33">
             <a:extLst>
               <a:ext uri="{FF2B5EF4-FFF2-40B4-BE49-F238E27FC236}">
-                <a16:creationId xmlns="" xmlns:a16="http://schemas.microsoft.com/office/drawing/2014/main" id="{E0BBD6C8-C8F2-40C5-AA64-85961A11ADC2}"/>
+                <a16:creationId xmlns:a16="http://schemas.microsoft.com/office/drawing/2014/main" id="{E0BBD6C8-C8F2-40C5-AA64-85961A11ADC2}"/>
               </a:ext>
             </a:extLst>
           </p:cNvPr>
@@ -8101,7 +8101,7 @@
           <p:cNvPr id="38" name="TextBox 37">
             <a:extLst>
               <a:ext uri="{FF2B5EF4-FFF2-40B4-BE49-F238E27FC236}">
-                <a16:creationId xmlns="" xmlns:a16="http://schemas.microsoft.com/office/drawing/2014/main" id="{E0BBD6C8-C8F2-40C5-AA64-85961A11ADC2}"/>
+                <a16:creationId xmlns:a16="http://schemas.microsoft.com/office/drawing/2014/main" id="{E0BBD6C8-C8F2-40C5-AA64-85961A11ADC2}"/>
               </a:ext>
             </a:extLst>
           </p:cNvPr>
@@ -8271,7 +8271,7 @@
           <p:cNvPr id="44" name="TextBox 43">
             <a:extLst>
               <a:ext uri="{FF2B5EF4-FFF2-40B4-BE49-F238E27FC236}">
-                <a16:creationId xmlns="" xmlns:a16="http://schemas.microsoft.com/office/drawing/2014/main" id="{E0BBD6C8-C8F2-40C5-AA64-85961A11ADC2}"/>
+                <a16:creationId xmlns:a16="http://schemas.microsoft.com/office/drawing/2014/main" id="{E0BBD6C8-C8F2-40C5-AA64-85961A11ADC2}"/>
               </a:ext>
             </a:extLst>
           </p:cNvPr>
@@ -8306,7 +8306,7 @@
           <p:cNvPr id="45" name="TextBox 44">
             <a:extLst>
               <a:ext uri="{FF2B5EF4-FFF2-40B4-BE49-F238E27FC236}">
-                <a16:creationId xmlns="" xmlns:a16="http://schemas.microsoft.com/office/drawing/2014/main" id="{E0BBD6C8-C8F2-40C5-AA64-85961A11ADC2}"/>
+                <a16:creationId xmlns:a16="http://schemas.microsoft.com/office/drawing/2014/main" id="{E0BBD6C8-C8F2-40C5-AA64-85961A11ADC2}"/>
               </a:ext>
             </a:extLst>
           </p:cNvPr>
@@ -8341,7 +8341,7 @@
           <p:cNvPr id="26" name="TextBox 25">
             <a:extLst>
               <a:ext uri="{FF2B5EF4-FFF2-40B4-BE49-F238E27FC236}">
-                <a16:creationId xmlns="" xmlns:a16="http://schemas.microsoft.com/office/drawing/2014/main" id="{6C45E26E-8FEE-4439-A34B-789237C9C62C}"/>
+                <a16:creationId xmlns:a16="http://schemas.microsoft.com/office/drawing/2014/main" id="{6C45E26E-8FEE-4439-A34B-789237C9C62C}"/>
               </a:ext>
             </a:extLst>
           </p:cNvPr>
@@ -8376,7 +8376,7 @@
           <p:cNvPr id="31" name="Rectangle 30">
             <a:extLst>
               <a:ext uri="{FF2B5EF4-FFF2-40B4-BE49-F238E27FC236}">
-                <a16:creationId xmlns="" xmlns:a16="http://schemas.microsoft.com/office/drawing/2014/main" id="{6D396BFC-10E0-4935-903B-EDC457BD1755}"/>
+                <a16:creationId xmlns:a16="http://schemas.microsoft.com/office/drawing/2014/main" id="{6D396BFC-10E0-4935-903B-EDC457BD1755}"/>
               </a:ext>
             </a:extLst>
           </p:cNvPr>
@@ -8436,7 +8436,7 @@
           <p:cNvPr id="32" name="Rectangle 31">
             <a:extLst>
               <a:ext uri="{FF2B5EF4-FFF2-40B4-BE49-F238E27FC236}">
-                <a16:creationId xmlns="" xmlns:a16="http://schemas.microsoft.com/office/drawing/2014/main" id="{02A645C8-F11F-438D-92DC-F6FCCA5ECFB8}"/>
+                <a16:creationId xmlns:a16="http://schemas.microsoft.com/office/drawing/2014/main" id="{02A645C8-F11F-438D-92DC-F6FCCA5ECFB8}"/>
               </a:ext>
             </a:extLst>
           </p:cNvPr>
@@ -8496,7 +8496,7 @@
           <p:cNvPr id="12" name="Straight Arrow Connector 11">
             <a:extLst>
               <a:ext uri="{FF2B5EF4-FFF2-40B4-BE49-F238E27FC236}">
-                <a16:creationId xmlns="" xmlns:a16="http://schemas.microsoft.com/office/drawing/2014/main" id="{FF2076CA-F897-4293-B6CD-7408EB452156}"/>
+                <a16:creationId xmlns:a16="http://schemas.microsoft.com/office/drawing/2014/main" id="{FF2076CA-F897-4293-B6CD-7408EB452156}"/>
               </a:ext>
             </a:extLst>
           </p:cNvPr>
@@ -8539,7 +8539,7 @@
           <p:cNvPr id="14" name="Straight Arrow Connector 13">
             <a:extLst>
               <a:ext uri="{FF2B5EF4-FFF2-40B4-BE49-F238E27FC236}">
-                <a16:creationId xmlns="" xmlns:a16="http://schemas.microsoft.com/office/drawing/2014/main" id="{5C625B7B-4A1E-46C5-9082-4FEC89B30DA9}"/>
+                <a16:creationId xmlns:a16="http://schemas.microsoft.com/office/drawing/2014/main" id="{5C625B7B-4A1E-46C5-9082-4FEC89B30DA9}"/>
               </a:ext>
             </a:extLst>
           </p:cNvPr>
@@ -8582,7 +8582,7 @@
           <p:cNvPr id="65" name="Straight Arrow Connector 64">
             <a:extLst>
               <a:ext uri="{FF2B5EF4-FFF2-40B4-BE49-F238E27FC236}">
-                <a16:creationId xmlns="" xmlns:a16="http://schemas.microsoft.com/office/drawing/2014/main" id="{C1C9B843-1D11-4D9F-8CBF-AE00E90AA070}"/>
+                <a16:creationId xmlns:a16="http://schemas.microsoft.com/office/drawing/2014/main" id="{C1C9B843-1D11-4D9F-8CBF-AE00E90AA070}"/>
               </a:ext>
             </a:extLst>
           </p:cNvPr>
@@ -8624,7 +8624,7 @@
           <p:cNvPr id="66" name="TextBox 65">
             <a:extLst>
               <a:ext uri="{FF2B5EF4-FFF2-40B4-BE49-F238E27FC236}">
-                <a16:creationId xmlns="" xmlns:a16="http://schemas.microsoft.com/office/drawing/2014/main" id="{5E4B2700-0522-40EF-B035-166AA1C17D76}"/>
+                <a16:creationId xmlns:a16="http://schemas.microsoft.com/office/drawing/2014/main" id="{5E4B2700-0522-40EF-B035-166AA1C17D76}"/>
               </a:ext>
             </a:extLst>
           </p:cNvPr>
@@ -8712,7 +8712,7 @@
           <p:cNvPr id="40" name="TextBox 39">
             <a:extLst>
               <a:ext uri="{FF2B5EF4-FFF2-40B4-BE49-F238E27FC236}">
-                <a16:creationId xmlns="" xmlns:a16="http://schemas.microsoft.com/office/drawing/2014/main" id="{E0BBD6C8-C8F2-40C5-AA64-85961A11ADC2}"/>
+                <a16:creationId xmlns:a16="http://schemas.microsoft.com/office/drawing/2014/main" id="{E0BBD6C8-C8F2-40C5-AA64-85961A11ADC2}"/>
               </a:ext>
             </a:extLst>
           </p:cNvPr>
@@ -8839,7 +8839,7 @@
           <p:cNvPr id="48" name="TextBox 47">
             <a:extLst>
               <a:ext uri="{FF2B5EF4-FFF2-40B4-BE49-F238E27FC236}">
-                <a16:creationId xmlns="" xmlns:a16="http://schemas.microsoft.com/office/drawing/2014/main" id="{E0BBD6C8-C8F2-40C5-AA64-85961A11ADC2}"/>
+                <a16:creationId xmlns:a16="http://schemas.microsoft.com/office/drawing/2014/main" id="{E0BBD6C8-C8F2-40C5-AA64-85961A11ADC2}"/>
               </a:ext>
             </a:extLst>
           </p:cNvPr>
@@ -8874,7 +8874,7 @@
           <p:cNvPr id="52" name="Rectangle 51">
             <a:extLst>
               <a:ext uri="{FF2B5EF4-FFF2-40B4-BE49-F238E27FC236}">
-                <a16:creationId xmlns="" xmlns:a16="http://schemas.microsoft.com/office/drawing/2014/main" id="{21B869D6-66CB-4B38-975F-B7FEB6AA9B13}"/>
+                <a16:creationId xmlns:a16="http://schemas.microsoft.com/office/drawing/2014/main" id="{21B869D6-66CB-4B38-975F-B7FEB6AA9B13}"/>
               </a:ext>
             </a:extLst>
           </p:cNvPr>
@@ -8995,7 +8995,7 @@
           <p:cNvPr id="58" name="TextBox 57">
             <a:extLst>
               <a:ext uri="{FF2B5EF4-FFF2-40B4-BE49-F238E27FC236}">
-                <a16:creationId xmlns="" xmlns:a16="http://schemas.microsoft.com/office/drawing/2014/main" id="{E0BBD6C8-C8F2-40C5-AA64-85961A11ADC2}"/>
+                <a16:creationId xmlns:a16="http://schemas.microsoft.com/office/drawing/2014/main" id="{E0BBD6C8-C8F2-40C5-AA64-85961A11ADC2}"/>
               </a:ext>
             </a:extLst>
           </p:cNvPr>
@@ -9103,7 +9103,7 @@
           <p:cNvPr id="94" name="TextBox 93">
             <a:extLst>
               <a:ext uri="{FF2B5EF4-FFF2-40B4-BE49-F238E27FC236}">
-                <a16:creationId xmlns="" xmlns:a16="http://schemas.microsoft.com/office/drawing/2014/main" id="{E0BBD6C8-C8F2-40C5-AA64-85961A11ADC2}"/>
+                <a16:creationId xmlns:a16="http://schemas.microsoft.com/office/drawing/2014/main" id="{E0BBD6C8-C8F2-40C5-AA64-85961A11ADC2}"/>
               </a:ext>
             </a:extLst>
           </p:cNvPr>
@@ -9138,7 +9138,7 @@
           <p:cNvPr id="95" name="TextBox 94">
             <a:extLst>
               <a:ext uri="{FF2B5EF4-FFF2-40B4-BE49-F238E27FC236}">
-                <a16:creationId xmlns="" xmlns:a16="http://schemas.microsoft.com/office/drawing/2014/main" id="{E0BBD6C8-C8F2-40C5-AA64-85961A11ADC2}"/>
+                <a16:creationId xmlns:a16="http://schemas.microsoft.com/office/drawing/2014/main" id="{E0BBD6C8-C8F2-40C5-AA64-85961A11ADC2}"/>
               </a:ext>
             </a:extLst>
           </p:cNvPr>
@@ -9209,7 +9209,7 @@
           <p:cNvPr id="53" name="Rectangle 52">
             <a:extLst>
               <a:ext uri="{FF2B5EF4-FFF2-40B4-BE49-F238E27FC236}">
-                <a16:creationId xmlns="" xmlns:a16="http://schemas.microsoft.com/office/drawing/2014/main" id="{6C40FF0E-1998-4874-BE17-1A4E9B40553E}"/>
+                <a16:creationId xmlns:a16="http://schemas.microsoft.com/office/drawing/2014/main" id="{6C40FF0E-1998-4874-BE17-1A4E9B40553E}"/>
               </a:ext>
             </a:extLst>
           </p:cNvPr>
@@ -9275,7 +9275,7 @@
           <p:cNvPr id="8" name="Straight Arrow Connector 7">
             <a:extLst>
               <a:ext uri="{FF2B5EF4-FFF2-40B4-BE49-F238E27FC236}">
-                <a16:creationId xmlns="" xmlns:a16="http://schemas.microsoft.com/office/drawing/2014/main" id="{ADE97499-DD4F-4E76-9405-EEDBB792874E}"/>
+                <a16:creationId xmlns:a16="http://schemas.microsoft.com/office/drawing/2014/main" id="{ADE97499-DD4F-4E76-9405-EEDBB792874E}"/>
               </a:ext>
             </a:extLst>
           </p:cNvPr>
@@ -9317,7 +9317,7 @@
           <p:cNvPr id="54" name="TextBox 53">
             <a:extLst>
               <a:ext uri="{FF2B5EF4-FFF2-40B4-BE49-F238E27FC236}">
-                <a16:creationId xmlns="" xmlns:a16="http://schemas.microsoft.com/office/drawing/2014/main" id="{342D31C0-1790-4E50-9650-E15403FD6F1F}"/>
+                <a16:creationId xmlns:a16="http://schemas.microsoft.com/office/drawing/2014/main" id="{342D31C0-1790-4E50-9650-E15403FD6F1F}"/>
               </a:ext>
             </a:extLst>
           </p:cNvPr>
@@ -9352,7 +9352,7 @@
           <p:cNvPr id="49" name="Rectangle 48">
             <a:extLst>
               <a:ext uri="{FF2B5EF4-FFF2-40B4-BE49-F238E27FC236}">
-                <a16:creationId xmlns="" xmlns:a16="http://schemas.microsoft.com/office/drawing/2014/main" id="{02A645C8-F11F-438D-92DC-F6FCCA5ECFB8}"/>
+                <a16:creationId xmlns:a16="http://schemas.microsoft.com/office/drawing/2014/main" id="{02A645C8-F11F-438D-92DC-F6FCCA5ECFB8}"/>
               </a:ext>
             </a:extLst>
           </p:cNvPr>
@@ -9447,7 +9447,7 @@
           <p:cNvPr id="56" name="TextBox 55">
             <a:extLst>
               <a:ext uri="{FF2B5EF4-FFF2-40B4-BE49-F238E27FC236}">
-                <a16:creationId xmlns="" xmlns:a16="http://schemas.microsoft.com/office/drawing/2014/main" id="{E0BBD6C8-C8F2-40C5-AA64-85961A11ADC2}"/>
+                <a16:creationId xmlns:a16="http://schemas.microsoft.com/office/drawing/2014/main" id="{E0BBD6C8-C8F2-40C5-AA64-85961A11ADC2}"/>
               </a:ext>
             </a:extLst>
           </p:cNvPr>
@@ -9579,7 +9579,7 @@
           <p:cNvPr id="59" name="TextBox 58">
             <a:extLst>
               <a:ext uri="{FF2B5EF4-FFF2-40B4-BE49-F238E27FC236}">
-                <a16:creationId xmlns="" xmlns:a16="http://schemas.microsoft.com/office/drawing/2014/main" id="{342D31C0-1790-4E50-9650-E15403FD6F1F}"/>
+                <a16:creationId xmlns:a16="http://schemas.microsoft.com/office/drawing/2014/main" id="{342D31C0-1790-4E50-9650-E15403FD6F1F}"/>
               </a:ext>
             </a:extLst>
           </p:cNvPr>
@@ -9614,7 +9614,7 @@
           <p:cNvPr id="63" name="Rectangle 62">
             <a:extLst>
               <a:ext uri="{FF2B5EF4-FFF2-40B4-BE49-F238E27FC236}">
-                <a16:creationId xmlns="" xmlns:a16="http://schemas.microsoft.com/office/drawing/2014/main" id="{6D396BFC-10E0-4935-903B-EDC457BD1755}"/>
+                <a16:creationId xmlns:a16="http://schemas.microsoft.com/office/drawing/2014/main" id="{6D396BFC-10E0-4935-903B-EDC457BD1755}"/>
               </a:ext>
             </a:extLst>
           </p:cNvPr>
@@ -9943,30 +9943,21 @@
           <a:p>
             <a:pPr algn="ctr"/>
             <a:r>
-              <a:rPr lang="en-US" sz="1000" dirty="0" smtClean="0"/>
+              <a:rPr lang="en-US" sz="1000" dirty="0"/>
               <a:t>com.tlw8253.dto</a:t>
             </a:r>
-            <a:endParaRPr lang="en-US" sz="1000" dirty="0"/>
           </a:p>
           <a:p>
             <a:pPr algn="ctr"/>
             <a:r>
               <a:rPr lang="en-US" sz="1200" dirty="0"/>
-              <a:t>Data </a:t>
-            </a:r>
-            <a:r>
-              <a:rPr lang="en-US" sz="1200" dirty="0" smtClean="0"/>
-              <a:t>Transfer </a:t>
-            </a:r>
-            <a:r>
-              <a:rPr lang="en-US" sz="1200" dirty="0"/>
-              <a:t>Object</a:t>
-            </a:r>
-          </a:p>
-          <a:p>
-            <a:pPr algn="ctr"/>
-            <a:r>
-              <a:rPr lang="en-US" dirty="0" err="1" smtClean="0"/>
+              <a:t>Data Transfer Object</a:t>
+            </a:r>
+          </a:p>
+          <a:p>
+            <a:pPr algn="ctr"/>
+            <a:r>
+              <a:rPr lang="en-US" dirty="0" err="1"/>
               <a:t>GeneralDTO</a:t>
             </a:r>
             <a:endParaRPr lang="en-US" sz="1200" dirty="0"/>
@@ -10015,7 +10006,7 @@
           <p:cNvPr id="19" name="TextBox 18">
             <a:extLst>
               <a:ext uri="{FF2B5EF4-FFF2-40B4-BE49-F238E27FC236}">
-                <a16:creationId xmlns="" xmlns:a16="http://schemas.microsoft.com/office/drawing/2014/main" id="{E0BBD6C8-C8F2-40C5-AA64-85961A11ADC2}"/>
+                <a16:creationId xmlns:a16="http://schemas.microsoft.com/office/drawing/2014/main" id="{E0BBD6C8-C8F2-40C5-AA64-85961A11ADC2}"/>
               </a:ext>
             </a:extLst>
           </p:cNvPr>
@@ -10141,7 +10132,7 @@
           <p:cNvPr id="23" name="TextBox 22">
             <a:extLst>
               <a:ext uri="{FF2B5EF4-FFF2-40B4-BE49-F238E27FC236}">
-                <a16:creationId xmlns="" xmlns:a16="http://schemas.microsoft.com/office/drawing/2014/main" id="{E0BBD6C8-C8F2-40C5-AA64-85961A11ADC2}"/>
+                <a16:creationId xmlns:a16="http://schemas.microsoft.com/office/drawing/2014/main" id="{E0BBD6C8-C8F2-40C5-AA64-85961A11ADC2}"/>
               </a:ext>
             </a:extLst>
           </p:cNvPr>
@@ -10258,7 +10249,7 @@
           <p:cNvPr id="28" name="TextBox 27">
             <a:extLst>
               <a:ext uri="{FF2B5EF4-FFF2-40B4-BE49-F238E27FC236}">
-                <a16:creationId xmlns="" xmlns:a16="http://schemas.microsoft.com/office/drawing/2014/main" id="{E0BBD6C8-C8F2-40C5-AA64-85961A11ADC2}"/>
+                <a16:creationId xmlns:a16="http://schemas.microsoft.com/office/drawing/2014/main" id="{E0BBD6C8-C8F2-40C5-AA64-85961A11ADC2}"/>
               </a:ext>
             </a:extLst>
           </p:cNvPr>
@@ -10383,7 +10374,7 @@
           <p:cNvPr id="34" name="TextBox 33">
             <a:extLst>
               <a:ext uri="{FF2B5EF4-FFF2-40B4-BE49-F238E27FC236}">
-                <a16:creationId xmlns="" xmlns:a16="http://schemas.microsoft.com/office/drawing/2014/main" id="{E0BBD6C8-C8F2-40C5-AA64-85961A11ADC2}"/>
+                <a16:creationId xmlns:a16="http://schemas.microsoft.com/office/drawing/2014/main" id="{E0BBD6C8-C8F2-40C5-AA64-85961A11ADC2}"/>
               </a:ext>
             </a:extLst>
           </p:cNvPr>
@@ -10509,7 +10500,7 @@
           <p:cNvPr id="38" name="TextBox 37">
             <a:extLst>
               <a:ext uri="{FF2B5EF4-FFF2-40B4-BE49-F238E27FC236}">
-                <a16:creationId xmlns="" xmlns:a16="http://schemas.microsoft.com/office/drawing/2014/main" id="{E0BBD6C8-C8F2-40C5-AA64-85961A11ADC2}"/>
+                <a16:creationId xmlns:a16="http://schemas.microsoft.com/office/drawing/2014/main" id="{E0BBD6C8-C8F2-40C5-AA64-85961A11ADC2}"/>
               </a:ext>
             </a:extLst>
           </p:cNvPr>
@@ -10679,7 +10670,7 @@
           <p:cNvPr id="44" name="TextBox 43">
             <a:extLst>
               <a:ext uri="{FF2B5EF4-FFF2-40B4-BE49-F238E27FC236}">
-                <a16:creationId xmlns="" xmlns:a16="http://schemas.microsoft.com/office/drawing/2014/main" id="{E0BBD6C8-C8F2-40C5-AA64-85961A11ADC2}"/>
+                <a16:creationId xmlns:a16="http://schemas.microsoft.com/office/drawing/2014/main" id="{E0BBD6C8-C8F2-40C5-AA64-85961A11ADC2}"/>
               </a:ext>
             </a:extLst>
           </p:cNvPr>
@@ -10714,7 +10705,7 @@
           <p:cNvPr id="45" name="TextBox 44">
             <a:extLst>
               <a:ext uri="{FF2B5EF4-FFF2-40B4-BE49-F238E27FC236}">
-                <a16:creationId xmlns="" xmlns:a16="http://schemas.microsoft.com/office/drawing/2014/main" id="{E0BBD6C8-C8F2-40C5-AA64-85961A11ADC2}"/>
+                <a16:creationId xmlns:a16="http://schemas.microsoft.com/office/drawing/2014/main" id="{E0BBD6C8-C8F2-40C5-AA64-85961A11ADC2}"/>
               </a:ext>
             </a:extLst>
           </p:cNvPr>
@@ -10749,7 +10740,7 @@
           <p:cNvPr id="26" name="TextBox 25">
             <a:extLst>
               <a:ext uri="{FF2B5EF4-FFF2-40B4-BE49-F238E27FC236}">
-                <a16:creationId xmlns="" xmlns:a16="http://schemas.microsoft.com/office/drawing/2014/main" id="{6C45E26E-8FEE-4439-A34B-789237C9C62C}"/>
+                <a16:creationId xmlns:a16="http://schemas.microsoft.com/office/drawing/2014/main" id="{6C45E26E-8FEE-4439-A34B-789237C9C62C}"/>
               </a:ext>
             </a:extLst>
           </p:cNvPr>
@@ -10774,13 +10765,8 @@
           <a:p>
             <a:r>
               <a:rPr lang="en-US" dirty="0"/>
-              <a:t>Shell Project </a:t>
-            </a:r>
-            <a:r>
-              <a:rPr lang="en-US" dirty="0" smtClean="0"/>
-              <a:t>JUnit Test Model</a:t>
-            </a:r>
-            <a:endParaRPr lang="en-US" dirty="0"/>
+              <a:t>Shell Project JUnit Test Model</a:t>
+            </a:r>
           </a:p>
         </p:txBody>
       </p:sp>
@@ -10789,7 +10775,7 @@
           <p:cNvPr id="31" name="Rectangle 30">
             <a:extLst>
               <a:ext uri="{FF2B5EF4-FFF2-40B4-BE49-F238E27FC236}">
-                <a16:creationId xmlns="" xmlns:a16="http://schemas.microsoft.com/office/drawing/2014/main" id="{6D396BFC-10E0-4935-903B-EDC457BD1755}"/>
+                <a16:creationId xmlns:a16="http://schemas.microsoft.com/office/drawing/2014/main" id="{6D396BFC-10E0-4935-903B-EDC457BD1755}"/>
               </a:ext>
             </a:extLst>
           </p:cNvPr>
@@ -10849,7 +10835,7 @@
           <p:cNvPr id="32" name="Rectangle 31">
             <a:extLst>
               <a:ext uri="{FF2B5EF4-FFF2-40B4-BE49-F238E27FC236}">
-                <a16:creationId xmlns="" xmlns:a16="http://schemas.microsoft.com/office/drawing/2014/main" id="{02A645C8-F11F-438D-92DC-F6FCCA5ECFB8}"/>
+                <a16:creationId xmlns:a16="http://schemas.microsoft.com/office/drawing/2014/main" id="{02A645C8-F11F-438D-92DC-F6FCCA5ECFB8}"/>
               </a:ext>
             </a:extLst>
           </p:cNvPr>
@@ -10909,7 +10895,7 @@
           <p:cNvPr id="12" name="Straight Arrow Connector 11">
             <a:extLst>
               <a:ext uri="{FF2B5EF4-FFF2-40B4-BE49-F238E27FC236}">
-                <a16:creationId xmlns="" xmlns:a16="http://schemas.microsoft.com/office/drawing/2014/main" id="{FF2076CA-F897-4293-B6CD-7408EB452156}"/>
+                <a16:creationId xmlns:a16="http://schemas.microsoft.com/office/drawing/2014/main" id="{FF2076CA-F897-4293-B6CD-7408EB452156}"/>
               </a:ext>
             </a:extLst>
           </p:cNvPr>
@@ -10952,7 +10938,7 @@
           <p:cNvPr id="14" name="Straight Arrow Connector 13">
             <a:extLst>
               <a:ext uri="{FF2B5EF4-FFF2-40B4-BE49-F238E27FC236}">
-                <a16:creationId xmlns="" xmlns:a16="http://schemas.microsoft.com/office/drawing/2014/main" id="{5C625B7B-4A1E-46C5-9082-4FEC89B30DA9}"/>
+                <a16:creationId xmlns:a16="http://schemas.microsoft.com/office/drawing/2014/main" id="{5C625B7B-4A1E-46C5-9082-4FEC89B30DA9}"/>
               </a:ext>
             </a:extLst>
           </p:cNvPr>
@@ -10995,7 +10981,7 @@
           <p:cNvPr id="65" name="Straight Arrow Connector 64">
             <a:extLst>
               <a:ext uri="{FF2B5EF4-FFF2-40B4-BE49-F238E27FC236}">
-                <a16:creationId xmlns="" xmlns:a16="http://schemas.microsoft.com/office/drawing/2014/main" id="{C1C9B843-1D11-4D9F-8CBF-AE00E90AA070}"/>
+                <a16:creationId xmlns:a16="http://schemas.microsoft.com/office/drawing/2014/main" id="{C1C9B843-1D11-4D9F-8CBF-AE00E90AA070}"/>
               </a:ext>
             </a:extLst>
           </p:cNvPr>
@@ -11037,7 +11023,7 @@
           <p:cNvPr id="66" name="TextBox 65">
             <a:extLst>
               <a:ext uri="{FF2B5EF4-FFF2-40B4-BE49-F238E27FC236}">
-                <a16:creationId xmlns="" xmlns:a16="http://schemas.microsoft.com/office/drawing/2014/main" id="{5E4B2700-0522-40EF-B035-166AA1C17D76}"/>
+                <a16:creationId xmlns:a16="http://schemas.microsoft.com/office/drawing/2014/main" id="{5E4B2700-0522-40EF-B035-166AA1C17D76}"/>
               </a:ext>
             </a:extLst>
           </p:cNvPr>
@@ -11072,7 +11058,7 @@
           <p:cNvPr id="40" name="TextBox 39">
             <a:extLst>
               <a:ext uri="{FF2B5EF4-FFF2-40B4-BE49-F238E27FC236}">
-                <a16:creationId xmlns="" xmlns:a16="http://schemas.microsoft.com/office/drawing/2014/main" id="{E0BBD6C8-C8F2-40C5-AA64-85961A11ADC2}"/>
+                <a16:creationId xmlns:a16="http://schemas.microsoft.com/office/drawing/2014/main" id="{E0BBD6C8-C8F2-40C5-AA64-85961A11ADC2}"/>
               </a:ext>
             </a:extLst>
           </p:cNvPr>
@@ -11142,10 +11128,9 @@
           <a:p>
             <a:pPr algn="ctr"/>
             <a:r>
-              <a:rPr lang="en-US" sz="1000" dirty="0" smtClean="0"/>
+              <a:rPr lang="en-US" sz="1000" dirty="0"/>
               <a:t>test/com.tlw8253.service</a:t>
             </a:r>
-            <a:endParaRPr lang="en-US" sz="1000" dirty="0"/>
           </a:p>
           <a:p>
             <a:pPr algn="ctr"/>
@@ -11198,7 +11183,7 @@
           <p:cNvPr id="48" name="TextBox 47">
             <a:extLst>
               <a:ext uri="{FF2B5EF4-FFF2-40B4-BE49-F238E27FC236}">
-                <a16:creationId xmlns="" xmlns:a16="http://schemas.microsoft.com/office/drawing/2014/main" id="{E0BBD6C8-C8F2-40C5-AA64-85961A11ADC2}"/>
+                <a16:creationId xmlns:a16="http://schemas.microsoft.com/office/drawing/2014/main" id="{E0BBD6C8-C8F2-40C5-AA64-85961A11ADC2}"/>
               </a:ext>
             </a:extLst>
           </p:cNvPr>
@@ -11233,7 +11218,7 @@
           <p:cNvPr id="52" name="Rectangle 51">
             <a:extLst>
               <a:ext uri="{FF2B5EF4-FFF2-40B4-BE49-F238E27FC236}">
-                <a16:creationId xmlns="" xmlns:a16="http://schemas.microsoft.com/office/drawing/2014/main" id="{21B869D6-66CB-4B38-975F-B7FEB6AA9B13}"/>
+                <a16:creationId xmlns:a16="http://schemas.microsoft.com/office/drawing/2014/main" id="{21B869D6-66CB-4B38-975F-B7FEB6AA9B13}"/>
               </a:ext>
             </a:extLst>
           </p:cNvPr>
@@ -11354,7 +11339,7 @@
           <p:cNvPr id="58" name="TextBox 57">
             <a:extLst>
               <a:ext uri="{FF2B5EF4-FFF2-40B4-BE49-F238E27FC236}">
-                <a16:creationId xmlns="" xmlns:a16="http://schemas.microsoft.com/office/drawing/2014/main" id="{E0BBD6C8-C8F2-40C5-AA64-85961A11ADC2}"/>
+                <a16:creationId xmlns:a16="http://schemas.microsoft.com/office/drawing/2014/main" id="{E0BBD6C8-C8F2-40C5-AA64-85961A11ADC2}"/>
               </a:ext>
             </a:extLst>
           </p:cNvPr>
@@ -11378,10 +11363,9 @@
           <a:lstStyle/>
           <a:p>
             <a:r>
-              <a:rPr lang="en-US" sz="1200" dirty="0" smtClean="0"/>
+              <a:rPr lang="en-US" sz="1200" dirty="0"/>
               <a:t>simulates</a:t>
             </a:r>
-            <a:endParaRPr lang="en-US" sz="1200" dirty="0"/>
           </a:p>
         </p:txBody>
       </p:sp>
@@ -11463,7 +11447,7 @@
           <p:cNvPr id="94" name="TextBox 93">
             <a:extLst>
               <a:ext uri="{FF2B5EF4-FFF2-40B4-BE49-F238E27FC236}">
-                <a16:creationId xmlns="" xmlns:a16="http://schemas.microsoft.com/office/drawing/2014/main" id="{E0BBD6C8-C8F2-40C5-AA64-85961A11ADC2}"/>
+                <a16:creationId xmlns:a16="http://schemas.microsoft.com/office/drawing/2014/main" id="{E0BBD6C8-C8F2-40C5-AA64-85961A11ADC2}"/>
               </a:ext>
             </a:extLst>
           </p:cNvPr>
@@ -11498,7 +11482,7 @@
           <p:cNvPr id="95" name="TextBox 94">
             <a:extLst>
               <a:ext uri="{FF2B5EF4-FFF2-40B4-BE49-F238E27FC236}">
-                <a16:creationId xmlns="" xmlns:a16="http://schemas.microsoft.com/office/drawing/2014/main" id="{E0BBD6C8-C8F2-40C5-AA64-85961A11ADC2}"/>
+                <a16:creationId xmlns:a16="http://schemas.microsoft.com/office/drawing/2014/main" id="{E0BBD6C8-C8F2-40C5-AA64-85961A11ADC2}"/>
               </a:ext>
             </a:extLst>
           </p:cNvPr>
@@ -11533,7 +11517,7 @@
           <p:cNvPr id="53" name="Rectangle 52">
             <a:extLst>
               <a:ext uri="{FF2B5EF4-FFF2-40B4-BE49-F238E27FC236}">
-                <a16:creationId xmlns="" xmlns:a16="http://schemas.microsoft.com/office/drawing/2014/main" id="{6C40FF0E-1998-4874-BE17-1A4E9B40553E}"/>
+                <a16:creationId xmlns:a16="http://schemas.microsoft.com/office/drawing/2014/main" id="{6C40FF0E-1998-4874-BE17-1A4E9B40553E}"/>
               </a:ext>
             </a:extLst>
           </p:cNvPr>
@@ -11599,7 +11583,7 @@
           <p:cNvPr id="8" name="Straight Arrow Connector 7">
             <a:extLst>
               <a:ext uri="{FF2B5EF4-FFF2-40B4-BE49-F238E27FC236}">
-                <a16:creationId xmlns="" xmlns:a16="http://schemas.microsoft.com/office/drawing/2014/main" id="{ADE97499-DD4F-4E76-9405-EEDBB792874E}"/>
+                <a16:creationId xmlns:a16="http://schemas.microsoft.com/office/drawing/2014/main" id="{ADE97499-DD4F-4E76-9405-EEDBB792874E}"/>
               </a:ext>
             </a:extLst>
           </p:cNvPr>
@@ -11641,7 +11625,7 @@
           <p:cNvPr id="54" name="TextBox 53">
             <a:extLst>
               <a:ext uri="{FF2B5EF4-FFF2-40B4-BE49-F238E27FC236}">
-                <a16:creationId xmlns="" xmlns:a16="http://schemas.microsoft.com/office/drawing/2014/main" id="{342D31C0-1790-4E50-9650-E15403FD6F1F}"/>
+                <a16:creationId xmlns:a16="http://schemas.microsoft.com/office/drawing/2014/main" id="{342D31C0-1790-4E50-9650-E15403FD6F1F}"/>
               </a:ext>
             </a:extLst>
           </p:cNvPr>
@@ -11773,7 +11757,7 @@
           <p:cNvPr id="59" name="TextBox 58">
             <a:extLst>
               <a:ext uri="{FF2B5EF4-FFF2-40B4-BE49-F238E27FC236}">
-                <a16:creationId xmlns="" xmlns:a16="http://schemas.microsoft.com/office/drawing/2014/main" id="{342D31C0-1790-4E50-9650-E15403FD6F1F}"/>
+                <a16:creationId xmlns:a16="http://schemas.microsoft.com/office/drawing/2014/main" id="{342D31C0-1790-4E50-9650-E15403FD6F1F}"/>
               </a:ext>
             </a:extLst>
           </p:cNvPr>
@@ -11808,7 +11792,7 @@
           <p:cNvPr id="63" name="Rectangle 62">
             <a:extLst>
               <a:ext uri="{FF2B5EF4-FFF2-40B4-BE49-F238E27FC236}">
-                <a16:creationId xmlns="" xmlns:a16="http://schemas.microsoft.com/office/drawing/2014/main" id="{6D396BFC-10E0-4935-903B-EDC457BD1755}"/>
+                <a16:creationId xmlns:a16="http://schemas.microsoft.com/office/drawing/2014/main" id="{6D396BFC-10E0-4935-903B-EDC457BD1755}"/>
               </a:ext>
             </a:extLst>
           </p:cNvPr>
@@ -12317,7 +12301,7 @@
           <p:cNvPr id="19" name="TextBox 18">
             <a:extLst>
               <a:ext uri="{FF2B5EF4-FFF2-40B4-BE49-F238E27FC236}">
-                <a16:creationId xmlns="" xmlns:a16="http://schemas.microsoft.com/office/drawing/2014/main" id="{E0BBD6C8-C8F2-40C5-AA64-85961A11ADC2}"/>
+                <a16:creationId xmlns:a16="http://schemas.microsoft.com/office/drawing/2014/main" id="{E0BBD6C8-C8F2-40C5-AA64-85961A11ADC2}"/>
               </a:ext>
             </a:extLst>
           </p:cNvPr>
@@ -12443,7 +12427,7 @@
           <p:cNvPr id="23" name="TextBox 22">
             <a:extLst>
               <a:ext uri="{FF2B5EF4-FFF2-40B4-BE49-F238E27FC236}">
-                <a16:creationId xmlns="" xmlns:a16="http://schemas.microsoft.com/office/drawing/2014/main" id="{E0BBD6C8-C8F2-40C5-AA64-85961A11ADC2}"/>
+                <a16:creationId xmlns:a16="http://schemas.microsoft.com/office/drawing/2014/main" id="{E0BBD6C8-C8F2-40C5-AA64-85961A11ADC2}"/>
               </a:ext>
             </a:extLst>
           </p:cNvPr>
@@ -12560,7 +12544,7 @@
           <p:cNvPr id="28" name="TextBox 27">
             <a:extLst>
               <a:ext uri="{FF2B5EF4-FFF2-40B4-BE49-F238E27FC236}">
-                <a16:creationId xmlns="" xmlns:a16="http://schemas.microsoft.com/office/drawing/2014/main" id="{E0BBD6C8-C8F2-40C5-AA64-85961A11ADC2}"/>
+                <a16:creationId xmlns:a16="http://schemas.microsoft.com/office/drawing/2014/main" id="{E0BBD6C8-C8F2-40C5-AA64-85961A11ADC2}"/>
               </a:ext>
             </a:extLst>
           </p:cNvPr>
@@ -12685,7 +12669,7 @@
           <p:cNvPr id="34" name="TextBox 33">
             <a:extLst>
               <a:ext uri="{FF2B5EF4-FFF2-40B4-BE49-F238E27FC236}">
-                <a16:creationId xmlns="" xmlns:a16="http://schemas.microsoft.com/office/drawing/2014/main" id="{E0BBD6C8-C8F2-40C5-AA64-85961A11ADC2}"/>
+                <a16:creationId xmlns:a16="http://schemas.microsoft.com/office/drawing/2014/main" id="{E0BBD6C8-C8F2-40C5-AA64-85961A11ADC2}"/>
               </a:ext>
             </a:extLst>
           </p:cNvPr>
@@ -12811,7 +12795,7 @@
           <p:cNvPr id="38" name="TextBox 37">
             <a:extLst>
               <a:ext uri="{FF2B5EF4-FFF2-40B4-BE49-F238E27FC236}">
-                <a16:creationId xmlns="" xmlns:a16="http://schemas.microsoft.com/office/drawing/2014/main" id="{E0BBD6C8-C8F2-40C5-AA64-85961A11ADC2}"/>
+                <a16:creationId xmlns:a16="http://schemas.microsoft.com/office/drawing/2014/main" id="{E0BBD6C8-C8F2-40C5-AA64-85961A11ADC2}"/>
               </a:ext>
             </a:extLst>
           </p:cNvPr>
@@ -12981,7 +12965,7 @@
           <p:cNvPr id="44" name="TextBox 43">
             <a:extLst>
               <a:ext uri="{FF2B5EF4-FFF2-40B4-BE49-F238E27FC236}">
-                <a16:creationId xmlns="" xmlns:a16="http://schemas.microsoft.com/office/drawing/2014/main" id="{E0BBD6C8-C8F2-40C5-AA64-85961A11ADC2}"/>
+                <a16:creationId xmlns:a16="http://schemas.microsoft.com/office/drawing/2014/main" id="{E0BBD6C8-C8F2-40C5-AA64-85961A11ADC2}"/>
               </a:ext>
             </a:extLst>
           </p:cNvPr>
@@ -13016,7 +13000,7 @@
           <p:cNvPr id="45" name="TextBox 44">
             <a:extLst>
               <a:ext uri="{FF2B5EF4-FFF2-40B4-BE49-F238E27FC236}">
-                <a16:creationId xmlns="" xmlns:a16="http://schemas.microsoft.com/office/drawing/2014/main" id="{E0BBD6C8-C8F2-40C5-AA64-85961A11ADC2}"/>
+                <a16:creationId xmlns:a16="http://schemas.microsoft.com/office/drawing/2014/main" id="{E0BBD6C8-C8F2-40C5-AA64-85961A11ADC2}"/>
               </a:ext>
             </a:extLst>
           </p:cNvPr>
@@ -13051,7 +13035,7 @@
           <p:cNvPr id="26" name="TextBox 25">
             <a:extLst>
               <a:ext uri="{FF2B5EF4-FFF2-40B4-BE49-F238E27FC236}">
-                <a16:creationId xmlns="" xmlns:a16="http://schemas.microsoft.com/office/drawing/2014/main" id="{6C45E26E-8FEE-4439-A34B-789237C9C62C}"/>
+                <a16:creationId xmlns:a16="http://schemas.microsoft.com/office/drawing/2014/main" id="{6C45E26E-8FEE-4439-A34B-789237C9C62C}"/>
               </a:ext>
             </a:extLst>
           </p:cNvPr>
@@ -13086,7 +13070,7 @@
           <p:cNvPr id="31" name="Rectangle 30">
             <a:extLst>
               <a:ext uri="{FF2B5EF4-FFF2-40B4-BE49-F238E27FC236}">
-                <a16:creationId xmlns="" xmlns:a16="http://schemas.microsoft.com/office/drawing/2014/main" id="{6D396BFC-10E0-4935-903B-EDC457BD1755}"/>
+                <a16:creationId xmlns:a16="http://schemas.microsoft.com/office/drawing/2014/main" id="{6D396BFC-10E0-4935-903B-EDC457BD1755}"/>
               </a:ext>
             </a:extLst>
           </p:cNvPr>
@@ -13146,7 +13130,7 @@
           <p:cNvPr id="32" name="Rectangle 31">
             <a:extLst>
               <a:ext uri="{FF2B5EF4-FFF2-40B4-BE49-F238E27FC236}">
-                <a16:creationId xmlns="" xmlns:a16="http://schemas.microsoft.com/office/drawing/2014/main" id="{02A645C8-F11F-438D-92DC-F6FCCA5ECFB8}"/>
+                <a16:creationId xmlns:a16="http://schemas.microsoft.com/office/drawing/2014/main" id="{02A645C8-F11F-438D-92DC-F6FCCA5ECFB8}"/>
               </a:ext>
             </a:extLst>
           </p:cNvPr>
@@ -13206,7 +13190,7 @@
           <p:cNvPr id="12" name="Straight Arrow Connector 11">
             <a:extLst>
               <a:ext uri="{FF2B5EF4-FFF2-40B4-BE49-F238E27FC236}">
-                <a16:creationId xmlns="" xmlns:a16="http://schemas.microsoft.com/office/drawing/2014/main" id="{FF2076CA-F897-4293-B6CD-7408EB452156}"/>
+                <a16:creationId xmlns:a16="http://schemas.microsoft.com/office/drawing/2014/main" id="{FF2076CA-F897-4293-B6CD-7408EB452156}"/>
               </a:ext>
             </a:extLst>
           </p:cNvPr>
@@ -13249,7 +13233,7 @@
           <p:cNvPr id="14" name="Straight Arrow Connector 13">
             <a:extLst>
               <a:ext uri="{FF2B5EF4-FFF2-40B4-BE49-F238E27FC236}">
-                <a16:creationId xmlns="" xmlns:a16="http://schemas.microsoft.com/office/drawing/2014/main" id="{5C625B7B-4A1E-46C5-9082-4FEC89B30DA9}"/>
+                <a16:creationId xmlns:a16="http://schemas.microsoft.com/office/drawing/2014/main" id="{5C625B7B-4A1E-46C5-9082-4FEC89B30DA9}"/>
               </a:ext>
             </a:extLst>
           </p:cNvPr>
@@ -13292,7 +13276,7 @@
           <p:cNvPr id="65" name="Straight Arrow Connector 64">
             <a:extLst>
               <a:ext uri="{FF2B5EF4-FFF2-40B4-BE49-F238E27FC236}">
-                <a16:creationId xmlns="" xmlns:a16="http://schemas.microsoft.com/office/drawing/2014/main" id="{C1C9B843-1D11-4D9F-8CBF-AE00E90AA070}"/>
+                <a16:creationId xmlns:a16="http://schemas.microsoft.com/office/drawing/2014/main" id="{C1C9B843-1D11-4D9F-8CBF-AE00E90AA070}"/>
               </a:ext>
             </a:extLst>
           </p:cNvPr>
@@ -13334,7 +13318,7 @@
           <p:cNvPr id="66" name="TextBox 65">
             <a:extLst>
               <a:ext uri="{FF2B5EF4-FFF2-40B4-BE49-F238E27FC236}">
-                <a16:creationId xmlns="" xmlns:a16="http://schemas.microsoft.com/office/drawing/2014/main" id="{5E4B2700-0522-40EF-B035-166AA1C17D76}"/>
+                <a16:creationId xmlns:a16="http://schemas.microsoft.com/office/drawing/2014/main" id="{5E4B2700-0522-40EF-B035-166AA1C17D76}"/>
               </a:ext>
             </a:extLst>
           </p:cNvPr>
@@ -13461,7 +13445,7 @@
           <p:cNvPr id="48" name="TextBox 47">
             <a:extLst>
               <a:ext uri="{FF2B5EF4-FFF2-40B4-BE49-F238E27FC236}">
-                <a16:creationId xmlns="" xmlns:a16="http://schemas.microsoft.com/office/drawing/2014/main" id="{E0BBD6C8-C8F2-40C5-AA64-85961A11ADC2}"/>
+                <a16:creationId xmlns:a16="http://schemas.microsoft.com/office/drawing/2014/main" id="{E0BBD6C8-C8F2-40C5-AA64-85961A11ADC2}"/>
               </a:ext>
             </a:extLst>
           </p:cNvPr>
@@ -13496,7 +13480,7 @@
           <p:cNvPr id="52" name="Rectangle 51">
             <a:extLst>
               <a:ext uri="{FF2B5EF4-FFF2-40B4-BE49-F238E27FC236}">
-                <a16:creationId xmlns="" xmlns:a16="http://schemas.microsoft.com/office/drawing/2014/main" id="{21B869D6-66CB-4B38-975F-B7FEB6AA9B13}"/>
+                <a16:creationId xmlns:a16="http://schemas.microsoft.com/office/drawing/2014/main" id="{21B869D6-66CB-4B38-975F-B7FEB6AA9B13}"/>
               </a:ext>
             </a:extLst>
           </p:cNvPr>
@@ -13617,7 +13601,7 @@
           <p:cNvPr id="58" name="TextBox 57">
             <a:extLst>
               <a:ext uri="{FF2B5EF4-FFF2-40B4-BE49-F238E27FC236}">
-                <a16:creationId xmlns="" xmlns:a16="http://schemas.microsoft.com/office/drawing/2014/main" id="{E0BBD6C8-C8F2-40C5-AA64-85961A11ADC2}"/>
+                <a16:creationId xmlns:a16="http://schemas.microsoft.com/office/drawing/2014/main" id="{E0BBD6C8-C8F2-40C5-AA64-85961A11ADC2}"/>
               </a:ext>
             </a:extLst>
           </p:cNvPr>
@@ -13725,7 +13709,7 @@
           <p:cNvPr id="94" name="TextBox 93">
             <a:extLst>
               <a:ext uri="{FF2B5EF4-FFF2-40B4-BE49-F238E27FC236}">
-                <a16:creationId xmlns="" xmlns:a16="http://schemas.microsoft.com/office/drawing/2014/main" id="{E0BBD6C8-C8F2-40C5-AA64-85961A11ADC2}"/>
+                <a16:creationId xmlns:a16="http://schemas.microsoft.com/office/drawing/2014/main" id="{E0BBD6C8-C8F2-40C5-AA64-85961A11ADC2}"/>
               </a:ext>
             </a:extLst>
           </p:cNvPr>
@@ -13760,7 +13744,7 @@
           <p:cNvPr id="95" name="TextBox 94">
             <a:extLst>
               <a:ext uri="{FF2B5EF4-FFF2-40B4-BE49-F238E27FC236}">
-                <a16:creationId xmlns="" xmlns:a16="http://schemas.microsoft.com/office/drawing/2014/main" id="{E0BBD6C8-C8F2-40C5-AA64-85961A11ADC2}"/>
+                <a16:creationId xmlns:a16="http://schemas.microsoft.com/office/drawing/2014/main" id="{E0BBD6C8-C8F2-40C5-AA64-85961A11ADC2}"/>
               </a:ext>
             </a:extLst>
           </p:cNvPr>
@@ -13795,7 +13779,7 @@
           <p:cNvPr id="50" name="TextBox 49">
             <a:extLst>
               <a:ext uri="{FF2B5EF4-FFF2-40B4-BE49-F238E27FC236}">
-                <a16:creationId xmlns="" xmlns:a16="http://schemas.microsoft.com/office/drawing/2014/main" id="{6C45E26E-8FEE-4439-A34B-789237C9C62C}"/>
+                <a16:creationId xmlns:a16="http://schemas.microsoft.com/office/drawing/2014/main" id="{6C45E26E-8FEE-4439-A34B-789237C9C62C}"/>
               </a:ext>
             </a:extLst>
           </p:cNvPr>
@@ -13866,7 +13850,7 @@
           <p:cNvPr id="53" name="Rectangle 52">
             <a:extLst>
               <a:ext uri="{FF2B5EF4-FFF2-40B4-BE49-F238E27FC236}">
-                <a16:creationId xmlns="" xmlns:a16="http://schemas.microsoft.com/office/drawing/2014/main" id="{93FBA679-F71B-47BD-BE29-21E7C2262CEB}"/>
+                <a16:creationId xmlns:a16="http://schemas.microsoft.com/office/drawing/2014/main" id="{93FBA679-F71B-47BD-BE29-21E7C2262CEB}"/>
               </a:ext>
             </a:extLst>
           </p:cNvPr>
@@ -13983,7 +13967,7 @@
           <p:cNvPr id="57" name="TextBox 56">
             <a:extLst>
               <a:ext uri="{FF2B5EF4-FFF2-40B4-BE49-F238E27FC236}">
-                <a16:creationId xmlns="" xmlns:a16="http://schemas.microsoft.com/office/drawing/2014/main" id="{5E4B2700-0522-40EF-B035-166AA1C17D76}"/>
+                <a16:creationId xmlns:a16="http://schemas.microsoft.com/office/drawing/2014/main" id="{5E4B2700-0522-40EF-B035-166AA1C17D76}"/>
               </a:ext>
             </a:extLst>
           </p:cNvPr>
@@ -14029,6 +14013,14 @@
 <file path=ppt/slides/slide6.xml><?xml version="1.0" encoding="utf-8"?>
 <p:sld xmlns:a="http://schemas.openxmlformats.org/drawingml/2006/main" xmlns:r="http://schemas.openxmlformats.org/officeDocument/2006/relationships" xmlns:p="http://schemas.openxmlformats.org/presentationml/2006/main">
   <p:cSld>
+    <p:bg>
+      <p:bgPr>
+        <a:solidFill>
+          <a:schemeClr val="bg1"/>
+        </a:solidFill>
+        <a:effectLst/>
+      </p:bgPr>
+    </p:bg>
     <p:spTree>
       <p:nvGrpSpPr>
         <p:cNvPr id="1" name=""/>
@@ -14043,9 +14035,201 @@
           <a:chExt cx="0" cy="0"/>
         </a:xfrm>
       </p:grpSpPr>
+      <p:sp>
+        <p:nvSpPr>
+          <p:cNvPr id="12" name="Rectangle 11">
+            <a:extLst>
+              <a:ext uri="{FF2B5EF4-FFF2-40B4-BE49-F238E27FC236}">
+                <a16:creationId xmlns:a16="http://schemas.microsoft.com/office/drawing/2014/main" id="{6753252F-4873-4F63-801D-CC719279A7D5}"/>
+              </a:ext>
+              <a:ext uri="{C183D7F6-B498-43B3-948B-1728B52AA6E4}">
+                <adec:decorative xmlns:adec="http://schemas.microsoft.com/office/drawing/2017/decorative" val="1"/>
+              </a:ext>
+            </a:extLst>
+          </p:cNvPr>
+          <p:cNvSpPr>
+            <a:spLocks noGrp="1" noRot="1" noChangeAspect="1" noMove="1" noResize="1" noEditPoints="1" noAdjustHandles="1" noChangeArrowheads="1" noChangeShapeType="1" noTextEdit="1"/>
+          </p:cNvSpPr>
+          <p:nvPr>
+            <p:extLst>
+              <p:ext uri="{386F3935-93C4-4BCD-93E2-E3B085C9AB24}">
+                <p16:designElem xmlns:p16="http://schemas.microsoft.com/office/powerpoint/2015/main" val="1"/>
+              </p:ext>
+            </p:extLst>
+          </p:nvPr>
+        </p:nvSpPr>
+        <p:spPr>
+          <a:xfrm>
+            <a:off x="0" y="0"/>
+            <a:ext cx="12192000" cy="6858000"/>
+          </a:xfrm>
+          <a:prstGeom prst="rect">
+            <a:avLst/>
+          </a:prstGeom>
+          <a:solidFill>
+            <a:srgbClr val="FFFFFF"/>
+          </a:solidFill>
+          <a:ln>
+            <a:noFill/>
+          </a:ln>
+        </p:spPr>
+        <p:style>
+          <a:lnRef idx="2">
+            <a:schemeClr val="accent1">
+              <a:shade val="50000"/>
+            </a:schemeClr>
+          </a:lnRef>
+          <a:fillRef idx="1">
+            <a:schemeClr val="accent1"/>
+          </a:fillRef>
+          <a:effectRef idx="0">
+            <a:schemeClr val="accent1"/>
+          </a:effectRef>
+          <a:fontRef idx="minor">
+            <a:schemeClr val="lt1"/>
+          </a:fontRef>
+        </p:style>
+        <p:txBody>
+          <a:bodyPr rtlCol="0" anchor="ctr"/>
+          <a:lstStyle/>
+          <a:p>
+            <a:pPr algn="ctr"/>
+            <a:endParaRPr lang="en-US"/>
+          </a:p>
+        </p:txBody>
+      </p:sp>
+      <p:sp>
+        <p:nvSpPr>
+          <p:cNvPr id="14" name="Rectangle 13">
+            <a:extLst>
+              <a:ext uri="{FF2B5EF4-FFF2-40B4-BE49-F238E27FC236}">
+                <a16:creationId xmlns:a16="http://schemas.microsoft.com/office/drawing/2014/main" id="{047C8CCB-F95D-4249-92DD-651249D3535A}"/>
+              </a:ext>
+              <a:ext uri="{C183D7F6-B498-43B3-948B-1728B52AA6E4}">
+                <adec:decorative xmlns:adec="http://schemas.microsoft.com/office/drawing/2017/decorative" val="1"/>
+              </a:ext>
+            </a:extLst>
+          </p:cNvPr>
+          <p:cNvSpPr>
+            <a:spLocks noGrp="1" noRot="1" noChangeAspect="1" noMove="1" noResize="1" noEditPoints="1" noAdjustHandles="1" noChangeArrowheads="1" noChangeShapeType="1" noTextEdit="1"/>
+          </p:cNvSpPr>
+          <p:nvPr>
+            <p:extLst>
+              <p:ext uri="{386F3935-93C4-4BCD-93E2-E3B085C9AB24}">
+                <p16:designElem xmlns:p16="http://schemas.microsoft.com/office/powerpoint/2015/main" val="1"/>
+              </p:ext>
+            </p:extLst>
+          </p:nvPr>
+        </p:nvSpPr>
+        <p:spPr>
+          <a:xfrm>
+            <a:off x="0" y="0"/>
+            <a:ext cx="2013557" cy="6858000"/>
+          </a:xfrm>
+          <a:prstGeom prst="rect">
+            <a:avLst/>
+          </a:prstGeom>
+          <a:solidFill>
+            <a:srgbClr val="542D4B"/>
+          </a:solidFill>
+          <a:ln>
+            <a:noFill/>
+          </a:ln>
+        </p:spPr>
+        <p:style>
+          <a:lnRef idx="2">
+            <a:schemeClr val="accent1">
+              <a:shade val="50000"/>
+            </a:schemeClr>
+          </a:lnRef>
+          <a:fillRef idx="1">
+            <a:schemeClr val="accent1"/>
+          </a:fillRef>
+          <a:effectRef idx="0">
+            <a:schemeClr val="accent1"/>
+          </a:effectRef>
+          <a:fontRef idx="minor">
+            <a:schemeClr val="lt1"/>
+          </a:fontRef>
+        </p:style>
+        <p:txBody>
+          <a:bodyPr rtlCol="0" anchor="ctr"/>
+          <a:lstStyle/>
+          <a:p>
+            <a:pPr algn="ctr"/>
+            <a:endParaRPr lang="en-US"/>
+          </a:p>
+        </p:txBody>
+      </p:sp>
+      <p:sp>
+        <p:nvSpPr>
+          <p:cNvPr id="5" name="TextBox 4">
+            <a:extLst>
+              <a:ext uri="{FF2B5EF4-FFF2-40B4-BE49-F238E27FC236}">
+                <a16:creationId xmlns:a16="http://schemas.microsoft.com/office/drawing/2014/main" id="{6C45E26E-8FEE-4439-A34B-789237C9C62C}"/>
+              </a:ext>
+            </a:extLst>
+          </p:cNvPr>
+          <p:cNvSpPr txBox="1"/>
+          <p:nvPr/>
+        </p:nvSpPr>
+        <p:spPr>
+          <a:xfrm>
+            <a:off x="640080" y="2074363"/>
+            <a:ext cx="2752354" cy="2709275"/>
+          </a:xfrm>
+          <a:prstGeom prst="ellipse">
+            <a:avLst/>
+          </a:prstGeom>
+          <a:solidFill>
+            <a:srgbClr val="262626"/>
+          </a:solidFill>
+          <a:ln w="174625" cmpd="thinThick">
+            <a:solidFill>
+              <a:srgbClr val="262626"/>
+            </a:solidFill>
+          </a:ln>
+        </p:spPr>
+        <p:txBody>
+          <a:bodyPr vert="horz" lIns="91440" tIns="45720" rIns="91440" bIns="45720" rtlCol="0" anchor="ctr">
+            <a:normAutofit/>
+          </a:bodyPr>
+          <a:lstStyle/>
+          <a:p>
+            <a:pPr algn="ctr">
+              <a:lnSpc>
+                <a:spcPct val="90000"/>
+              </a:lnSpc>
+              <a:spcBef>
+                <a:spcPct val="0"/>
+              </a:spcBef>
+              <a:spcAft>
+                <a:spcPts val="600"/>
+              </a:spcAft>
+            </a:pPr>
+            <a:r>
+              <a:rPr lang="en-US" sz="2600" kern="1200">
+                <a:solidFill>
+                  <a:srgbClr val="FFFFFF"/>
+                </a:solidFill>
+                <a:latin typeface="+mj-lt"/>
+                <a:ea typeface="+mj-ea"/>
+                <a:cs typeface="+mj-cs"/>
+              </a:rPr>
+              <a:t>ERS Physical Database Model</a:t>
+            </a:r>
+          </a:p>
+        </p:txBody>
+      </p:sp>
       <p:pic>
         <p:nvPicPr>
-          <p:cNvPr id="4" name="Picture 3"/>
+          <p:cNvPr id="7" name="Picture 6" descr="Diagram&#10;&#10;Description automatically generated">
+            <a:extLst>
+              <a:ext uri="{FF2B5EF4-FFF2-40B4-BE49-F238E27FC236}">
+                <a16:creationId xmlns:a16="http://schemas.microsoft.com/office/drawing/2014/main" id="{3A21505E-B4A2-4FAE-BE38-B1162B93BEA6}"/>
+              </a:ext>
+            </a:extLst>
+          </p:cNvPr>
           <p:cNvPicPr>
             <a:picLocks noChangeAspect="1"/>
           </p:cNvPicPr>
@@ -14059,53 +14243,14 @@
         </p:blipFill>
         <p:spPr>
           <a:xfrm>
-            <a:off x="940550" y="1067940"/>
-            <a:ext cx="8810625" cy="5105400"/>
+            <a:off x="4323312" y="961812"/>
+            <a:ext cx="6618775" cy="4930987"/>
           </a:xfrm>
           <a:prstGeom prst="rect">
             <a:avLst/>
           </a:prstGeom>
         </p:spPr>
       </p:pic>
-      <p:sp>
-        <p:nvSpPr>
-          <p:cNvPr id="5" name="TextBox 4">
-            <a:extLst>
-              <a:ext uri="{FF2B5EF4-FFF2-40B4-BE49-F238E27FC236}">
-                <a16:creationId xmlns="" xmlns:a16="http://schemas.microsoft.com/office/drawing/2014/main" id="{6C45E26E-8FEE-4439-A34B-789237C9C62C}"/>
-              </a:ext>
-            </a:extLst>
-          </p:cNvPr>
-          <p:cNvSpPr txBox="1"/>
-          <p:nvPr/>
-        </p:nvSpPr>
-        <p:spPr>
-          <a:xfrm>
-            <a:off x="0" y="30549"/>
-            <a:ext cx="4675518" cy="369332"/>
-          </a:xfrm>
-          <a:prstGeom prst="rect">
-            <a:avLst/>
-          </a:prstGeom>
-          <a:noFill/>
-        </p:spPr>
-        <p:txBody>
-          <a:bodyPr wrap="square" rtlCol="0">
-            <a:spAutoFit/>
-          </a:bodyPr>
-          <a:lstStyle/>
-          <a:p>
-            <a:r>
-              <a:rPr lang="en-US" dirty="0" smtClean="0"/>
-              <a:t>ERS Physical Database </a:t>
-            </a:r>
-            <a:r>
-              <a:rPr lang="en-US" dirty="0"/>
-              <a:t>Model</a:t>
-            </a:r>
-          </a:p>
-        </p:txBody>
-      </p:sp>
     </p:spTree>
     <p:extLst>
       <p:ext uri="{BB962C8B-B14F-4D97-AF65-F5344CB8AC3E}">
@@ -14818,7 +14963,7 @@
           <p:cNvPr id="23" name="TextBox 22">
             <a:extLst>
               <a:ext uri="{FF2B5EF4-FFF2-40B4-BE49-F238E27FC236}">
-                <a16:creationId xmlns="" xmlns:a16="http://schemas.microsoft.com/office/drawing/2014/main" id="{E0BBD6C8-C8F2-40C5-AA64-85961A11ADC2}"/>
+                <a16:creationId xmlns:a16="http://schemas.microsoft.com/office/drawing/2014/main" id="{E0BBD6C8-C8F2-40C5-AA64-85961A11ADC2}"/>
               </a:ext>
             </a:extLst>
           </p:cNvPr>
@@ -14932,7 +15077,7 @@
           <p:cNvPr id="28" name="TextBox 27">
             <a:extLst>
               <a:ext uri="{FF2B5EF4-FFF2-40B4-BE49-F238E27FC236}">
-                <a16:creationId xmlns="" xmlns:a16="http://schemas.microsoft.com/office/drawing/2014/main" id="{E0BBD6C8-C8F2-40C5-AA64-85961A11ADC2}"/>
+                <a16:creationId xmlns:a16="http://schemas.microsoft.com/office/drawing/2014/main" id="{E0BBD6C8-C8F2-40C5-AA64-85961A11ADC2}"/>
               </a:ext>
             </a:extLst>
           </p:cNvPr>
@@ -15053,7 +15198,7 @@
           <p:cNvPr id="34" name="TextBox 33">
             <a:extLst>
               <a:ext uri="{FF2B5EF4-FFF2-40B4-BE49-F238E27FC236}">
-                <a16:creationId xmlns="" xmlns:a16="http://schemas.microsoft.com/office/drawing/2014/main" id="{E0BBD6C8-C8F2-40C5-AA64-85961A11ADC2}"/>
+                <a16:creationId xmlns:a16="http://schemas.microsoft.com/office/drawing/2014/main" id="{E0BBD6C8-C8F2-40C5-AA64-85961A11ADC2}"/>
               </a:ext>
             </a:extLst>
           </p:cNvPr>
@@ -15174,7 +15319,7 @@
           <p:cNvPr id="38" name="TextBox 37">
             <a:extLst>
               <a:ext uri="{FF2B5EF4-FFF2-40B4-BE49-F238E27FC236}">
-                <a16:creationId xmlns="" xmlns:a16="http://schemas.microsoft.com/office/drawing/2014/main" id="{E0BBD6C8-C8F2-40C5-AA64-85961A11ADC2}"/>
+                <a16:creationId xmlns:a16="http://schemas.microsoft.com/office/drawing/2014/main" id="{E0BBD6C8-C8F2-40C5-AA64-85961A11ADC2}"/>
               </a:ext>
             </a:extLst>
           </p:cNvPr>
@@ -15338,7 +15483,7 @@
           <p:cNvPr id="44" name="TextBox 43">
             <a:extLst>
               <a:ext uri="{FF2B5EF4-FFF2-40B4-BE49-F238E27FC236}">
-                <a16:creationId xmlns="" xmlns:a16="http://schemas.microsoft.com/office/drawing/2014/main" id="{E0BBD6C8-C8F2-40C5-AA64-85961A11ADC2}"/>
+                <a16:creationId xmlns:a16="http://schemas.microsoft.com/office/drawing/2014/main" id="{E0BBD6C8-C8F2-40C5-AA64-85961A11ADC2}"/>
               </a:ext>
             </a:extLst>
           </p:cNvPr>
@@ -15373,7 +15518,7 @@
           <p:cNvPr id="45" name="TextBox 44">
             <a:extLst>
               <a:ext uri="{FF2B5EF4-FFF2-40B4-BE49-F238E27FC236}">
-                <a16:creationId xmlns="" xmlns:a16="http://schemas.microsoft.com/office/drawing/2014/main" id="{E0BBD6C8-C8F2-40C5-AA64-85961A11ADC2}"/>
+                <a16:creationId xmlns:a16="http://schemas.microsoft.com/office/drawing/2014/main" id="{E0BBD6C8-C8F2-40C5-AA64-85961A11ADC2}"/>
               </a:ext>
             </a:extLst>
           </p:cNvPr>
@@ -15408,7 +15553,7 @@
           <p:cNvPr id="26" name="TextBox 25">
             <a:extLst>
               <a:ext uri="{FF2B5EF4-FFF2-40B4-BE49-F238E27FC236}">
-                <a16:creationId xmlns="" xmlns:a16="http://schemas.microsoft.com/office/drawing/2014/main" id="{70BF22D6-D5A2-4CCC-8E2D-329E25668556}"/>
+                <a16:creationId xmlns:a16="http://schemas.microsoft.com/office/drawing/2014/main" id="{70BF22D6-D5A2-4CCC-8E2D-329E25668556}"/>
               </a:ext>
             </a:extLst>
           </p:cNvPr>
@@ -15443,7 +15588,7 @@
           <p:cNvPr id="40" name="TextBox 39">
             <a:extLst>
               <a:ext uri="{FF2B5EF4-FFF2-40B4-BE49-F238E27FC236}">
-                <a16:creationId xmlns="" xmlns:a16="http://schemas.microsoft.com/office/drawing/2014/main" id="{BF7734B1-6C1B-4ADB-BBA4-2510EE97BB9D}"/>
+                <a16:creationId xmlns:a16="http://schemas.microsoft.com/office/drawing/2014/main" id="{BF7734B1-6C1B-4ADB-BBA4-2510EE97BB9D}"/>
               </a:ext>
             </a:extLst>
           </p:cNvPr>
@@ -15478,7 +15623,7 @@
           <p:cNvPr id="32" name="Straight Arrow Connector 31">
             <a:extLst>
               <a:ext uri="{FF2B5EF4-FFF2-40B4-BE49-F238E27FC236}">
-                <a16:creationId xmlns="" xmlns:a16="http://schemas.microsoft.com/office/drawing/2014/main" id="{5BC5C957-DD00-47FE-A727-262A8F90A864}"/>
+                <a16:creationId xmlns:a16="http://schemas.microsoft.com/office/drawing/2014/main" id="{5BC5C957-DD00-47FE-A727-262A8F90A864}"/>
               </a:ext>
             </a:extLst>
           </p:cNvPr>
@@ -15606,7 +15751,7 @@
           <p:cNvPr id="36" name="TextBox 35">
             <a:extLst>
               <a:ext uri="{FF2B5EF4-FFF2-40B4-BE49-F238E27FC236}">
-                <a16:creationId xmlns="" xmlns:a16="http://schemas.microsoft.com/office/drawing/2014/main" id="{BF7734B1-6C1B-4ADB-BBA4-2510EE97BB9D}"/>
+                <a16:creationId xmlns:a16="http://schemas.microsoft.com/office/drawing/2014/main" id="{BF7734B1-6C1B-4ADB-BBA4-2510EE97BB9D}"/>
               </a:ext>
             </a:extLst>
           </p:cNvPr>
@@ -15713,7 +15858,7 @@
           <p:cNvPr id="42" name="TextBox 41">
             <a:extLst>
               <a:ext uri="{FF2B5EF4-FFF2-40B4-BE49-F238E27FC236}">
-                <a16:creationId xmlns="" xmlns:a16="http://schemas.microsoft.com/office/drawing/2014/main" id="{E0BBD6C8-C8F2-40C5-AA64-85961A11ADC2}"/>
+                <a16:creationId xmlns:a16="http://schemas.microsoft.com/office/drawing/2014/main" id="{E0BBD6C8-C8F2-40C5-AA64-85961A11ADC2}"/>
               </a:ext>
             </a:extLst>
           </p:cNvPr>
@@ -15748,7 +15893,7 @@
           <p:cNvPr id="46" name="TextBox 45">
             <a:extLst>
               <a:ext uri="{FF2B5EF4-FFF2-40B4-BE49-F238E27FC236}">
-                <a16:creationId xmlns="" xmlns:a16="http://schemas.microsoft.com/office/drawing/2014/main" id="{E0BBD6C8-C8F2-40C5-AA64-85961A11ADC2}"/>
+                <a16:creationId xmlns:a16="http://schemas.microsoft.com/office/drawing/2014/main" id="{E0BBD6C8-C8F2-40C5-AA64-85961A11ADC2}"/>
               </a:ext>
             </a:extLst>
           </p:cNvPr>
@@ -15783,7 +15928,7 @@
           <p:cNvPr id="47" name="TextBox 46">
             <a:extLst>
               <a:ext uri="{FF2B5EF4-FFF2-40B4-BE49-F238E27FC236}">
-                <a16:creationId xmlns="" xmlns:a16="http://schemas.microsoft.com/office/drawing/2014/main" id="{E0BBD6C8-C8F2-40C5-AA64-85961A11ADC2}"/>
+                <a16:creationId xmlns:a16="http://schemas.microsoft.com/office/drawing/2014/main" id="{E0BBD6C8-C8F2-40C5-AA64-85961A11ADC2}"/>
               </a:ext>
             </a:extLst>
           </p:cNvPr>
@@ -15848,7 +15993,7 @@
           <p:cNvPr id="4" name="Rectangle 3">
             <a:extLst>
               <a:ext uri="{FF2B5EF4-FFF2-40B4-BE49-F238E27FC236}">
-                <a16:creationId xmlns="" xmlns:a16="http://schemas.microsoft.com/office/drawing/2014/main" id="{0A71868C-EF96-4004-8116-DFD1FCCEE6C3}"/>
+                <a16:creationId xmlns:a16="http://schemas.microsoft.com/office/drawing/2014/main" id="{0A71868C-EF96-4004-8116-DFD1FCCEE6C3}"/>
               </a:ext>
             </a:extLst>
           </p:cNvPr>
@@ -15904,7 +16049,7 @@
           <p:cNvPr id="5" name="Rectangle 4">
             <a:extLst>
               <a:ext uri="{FF2B5EF4-FFF2-40B4-BE49-F238E27FC236}">
-                <a16:creationId xmlns="" xmlns:a16="http://schemas.microsoft.com/office/drawing/2014/main" id="{67A88ADC-D070-420B-9A88-FDBA4865856A}"/>
+                <a16:creationId xmlns:a16="http://schemas.microsoft.com/office/drawing/2014/main" id="{67A88ADC-D070-420B-9A88-FDBA4865856A}"/>
               </a:ext>
             </a:extLst>
           </p:cNvPr>
@@ -15964,7 +16109,7 @@
           <p:cNvPr id="7" name="Straight Arrow Connector 6">
             <a:extLst>
               <a:ext uri="{FF2B5EF4-FFF2-40B4-BE49-F238E27FC236}">
-                <a16:creationId xmlns="" xmlns:a16="http://schemas.microsoft.com/office/drawing/2014/main" id="{45AD00B6-B022-4C7F-A523-E16E6292918D}"/>
+                <a16:creationId xmlns:a16="http://schemas.microsoft.com/office/drawing/2014/main" id="{45AD00B6-B022-4C7F-A523-E16E6292918D}"/>
               </a:ext>
             </a:extLst>
           </p:cNvPr>
@@ -16006,7 +16151,7 @@
           <p:cNvPr id="8" name="Rectangle 7">
             <a:extLst>
               <a:ext uri="{FF2B5EF4-FFF2-40B4-BE49-F238E27FC236}">
-                <a16:creationId xmlns="" xmlns:a16="http://schemas.microsoft.com/office/drawing/2014/main" id="{3C7A2B3E-B0CA-48CD-A6CB-935EF9D71843}"/>
+                <a16:creationId xmlns:a16="http://schemas.microsoft.com/office/drawing/2014/main" id="{3C7A2B3E-B0CA-48CD-A6CB-935EF9D71843}"/>
               </a:ext>
             </a:extLst>
           </p:cNvPr>
@@ -16066,7 +16211,7 @@
           <p:cNvPr id="9" name="TextBox 8">
             <a:extLst>
               <a:ext uri="{FF2B5EF4-FFF2-40B4-BE49-F238E27FC236}">
-                <a16:creationId xmlns="" xmlns:a16="http://schemas.microsoft.com/office/drawing/2014/main" id="{ABD7B54F-357C-489B-ADE1-DFA04BEA1686}"/>
+                <a16:creationId xmlns:a16="http://schemas.microsoft.com/office/drawing/2014/main" id="{ABD7B54F-357C-489B-ADE1-DFA04BEA1686}"/>
               </a:ext>
             </a:extLst>
           </p:cNvPr>
@@ -16101,7 +16246,7 @@
           <p:cNvPr id="10" name="Rectangle 9">
             <a:extLst>
               <a:ext uri="{FF2B5EF4-FFF2-40B4-BE49-F238E27FC236}">
-                <a16:creationId xmlns="" xmlns:a16="http://schemas.microsoft.com/office/drawing/2014/main" id="{21B869D6-66CB-4B38-975F-B7FEB6AA9B13}"/>
+                <a16:creationId xmlns:a16="http://schemas.microsoft.com/office/drawing/2014/main" id="{21B869D6-66CB-4B38-975F-B7FEB6AA9B13}"/>
               </a:ext>
             </a:extLst>
           </p:cNvPr>
@@ -16150,7 +16295,7 @@
           <p:cNvPr id="12" name="Straight Arrow Connector 11">
             <a:extLst>
               <a:ext uri="{FF2B5EF4-FFF2-40B4-BE49-F238E27FC236}">
-                <a16:creationId xmlns="" xmlns:a16="http://schemas.microsoft.com/office/drawing/2014/main" id="{78CBB1AB-C0E2-40F2-828D-F209304958AC}"/>
+                <a16:creationId xmlns:a16="http://schemas.microsoft.com/office/drawing/2014/main" id="{78CBB1AB-C0E2-40F2-828D-F209304958AC}"/>
               </a:ext>
             </a:extLst>
           </p:cNvPr>
@@ -16193,7 +16338,7 @@
           <p:cNvPr id="14" name="TextBox 13">
             <a:extLst>
               <a:ext uri="{FF2B5EF4-FFF2-40B4-BE49-F238E27FC236}">
-                <a16:creationId xmlns="" xmlns:a16="http://schemas.microsoft.com/office/drawing/2014/main" id="{E0BBD6C8-C8F2-40C5-AA64-85961A11ADC2}"/>
+                <a16:creationId xmlns:a16="http://schemas.microsoft.com/office/drawing/2014/main" id="{E0BBD6C8-C8F2-40C5-AA64-85961A11ADC2}"/>
               </a:ext>
             </a:extLst>
           </p:cNvPr>
@@ -16228,7 +16373,7 @@
           <p:cNvPr id="16" name="Straight Arrow Connector 15">
             <a:extLst>
               <a:ext uri="{FF2B5EF4-FFF2-40B4-BE49-F238E27FC236}">
-                <a16:creationId xmlns="" xmlns:a16="http://schemas.microsoft.com/office/drawing/2014/main" id="{22509349-F226-482F-AC14-E28C2411C4C3}"/>
+                <a16:creationId xmlns:a16="http://schemas.microsoft.com/office/drawing/2014/main" id="{22509349-F226-482F-AC14-E28C2411C4C3}"/>
               </a:ext>
             </a:extLst>
           </p:cNvPr>
@@ -16271,7 +16416,7 @@
           <p:cNvPr id="18" name="TextBox 17">
             <a:extLst>
               <a:ext uri="{FF2B5EF4-FFF2-40B4-BE49-F238E27FC236}">
-                <a16:creationId xmlns="" xmlns:a16="http://schemas.microsoft.com/office/drawing/2014/main" id="{E2DE2503-050C-47C3-BC73-C61D89CEB131}"/>
+                <a16:creationId xmlns:a16="http://schemas.microsoft.com/office/drawing/2014/main" id="{E2DE2503-050C-47C3-BC73-C61D89CEB131}"/>
               </a:ext>
             </a:extLst>
           </p:cNvPr>
@@ -16306,7 +16451,7 @@
           <p:cNvPr id="23" name="Straight Arrow Connector 22">
             <a:extLst>
               <a:ext uri="{FF2B5EF4-FFF2-40B4-BE49-F238E27FC236}">
-                <a16:creationId xmlns="" xmlns:a16="http://schemas.microsoft.com/office/drawing/2014/main" id="{5D314D83-3A56-4BD7-B215-19DEE4ED8C0B}"/>
+                <a16:creationId xmlns:a16="http://schemas.microsoft.com/office/drawing/2014/main" id="{5D314D83-3A56-4BD7-B215-19DEE4ED8C0B}"/>
               </a:ext>
             </a:extLst>
           </p:cNvPr>
@@ -16349,7 +16494,7 @@
           <p:cNvPr id="24" name="Straight Arrow Connector 23">
             <a:extLst>
               <a:ext uri="{FF2B5EF4-FFF2-40B4-BE49-F238E27FC236}">
-                <a16:creationId xmlns="" xmlns:a16="http://schemas.microsoft.com/office/drawing/2014/main" id="{874E7075-4C88-4378-99B9-DC474BE0CE65}"/>
+                <a16:creationId xmlns:a16="http://schemas.microsoft.com/office/drawing/2014/main" id="{874E7075-4C88-4378-99B9-DC474BE0CE65}"/>
               </a:ext>
             </a:extLst>
           </p:cNvPr>
@@ -16392,7 +16537,7 @@
           <p:cNvPr id="25" name="TextBox 24">
             <a:extLst>
               <a:ext uri="{FF2B5EF4-FFF2-40B4-BE49-F238E27FC236}">
-                <a16:creationId xmlns="" xmlns:a16="http://schemas.microsoft.com/office/drawing/2014/main" id="{171D93A1-C181-4F9C-8D75-C106DB531AB7}"/>
+                <a16:creationId xmlns:a16="http://schemas.microsoft.com/office/drawing/2014/main" id="{171D93A1-C181-4F9C-8D75-C106DB531AB7}"/>
               </a:ext>
             </a:extLst>
           </p:cNvPr>
@@ -16427,7 +16572,7 @@
           <p:cNvPr id="26" name="TextBox 25">
             <a:extLst>
               <a:ext uri="{FF2B5EF4-FFF2-40B4-BE49-F238E27FC236}">
-                <a16:creationId xmlns="" xmlns:a16="http://schemas.microsoft.com/office/drawing/2014/main" id="{03EAB749-77B2-435B-A0A3-02060FD4A06F}"/>
+                <a16:creationId xmlns:a16="http://schemas.microsoft.com/office/drawing/2014/main" id="{03EAB749-77B2-435B-A0A3-02060FD4A06F}"/>
               </a:ext>
             </a:extLst>
           </p:cNvPr>
@@ -16462,7 +16607,7 @@
           <p:cNvPr id="27" name="TextBox 26">
             <a:extLst>
               <a:ext uri="{FF2B5EF4-FFF2-40B4-BE49-F238E27FC236}">
-                <a16:creationId xmlns="" xmlns:a16="http://schemas.microsoft.com/office/drawing/2014/main" id="{7D8414B9-747D-41E7-A06D-8BBA5042C15C}"/>
+                <a16:creationId xmlns:a16="http://schemas.microsoft.com/office/drawing/2014/main" id="{7D8414B9-747D-41E7-A06D-8BBA5042C15C}"/>
               </a:ext>
             </a:extLst>
           </p:cNvPr>
@@ -16497,7 +16642,7 @@
           <p:cNvPr id="28" name="TextBox 27">
             <a:extLst>
               <a:ext uri="{FF2B5EF4-FFF2-40B4-BE49-F238E27FC236}">
-                <a16:creationId xmlns="" xmlns:a16="http://schemas.microsoft.com/office/drawing/2014/main" id="{F559714E-416D-4742-9901-ADC4D8BAC5FA}"/>
+                <a16:creationId xmlns:a16="http://schemas.microsoft.com/office/drawing/2014/main" id="{F559714E-416D-4742-9901-ADC4D8BAC5FA}"/>
               </a:ext>
             </a:extLst>
           </p:cNvPr>
@@ -16532,7 +16677,7 @@
           <p:cNvPr id="31" name="Rectangle 30">
             <a:extLst>
               <a:ext uri="{FF2B5EF4-FFF2-40B4-BE49-F238E27FC236}">
-                <a16:creationId xmlns="" xmlns:a16="http://schemas.microsoft.com/office/drawing/2014/main" id="{9061AF07-38B9-4B05-B6B2-1A74D7C0C618}"/>
+                <a16:creationId xmlns:a16="http://schemas.microsoft.com/office/drawing/2014/main" id="{9061AF07-38B9-4B05-B6B2-1A74D7C0C618}"/>
               </a:ext>
             </a:extLst>
           </p:cNvPr>
@@ -16592,7 +16737,7 @@
           <p:cNvPr id="33" name="Connector: Elbow 32">
             <a:extLst>
               <a:ext uri="{FF2B5EF4-FFF2-40B4-BE49-F238E27FC236}">
-                <a16:creationId xmlns="" xmlns:a16="http://schemas.microsoft.com/office/drawing/2014/main" id="{B367C937-E98B-4009-B48E-DBF7102DCFD1}"/>
+                <a16:creationId xmlns:a16="http://schemas.microsoft.com/office/drawing/2014/main" id="{B367C937-E98B-4009-B48E-DBF7102DCFD1}"/>
               </a:ext>
             </a:extLst>
           </p:cNvPr>
@@ -16634,7 +16779,7 @@
           <p:cNvPr id="34" name="TextBox 33">
             <a:extLst>
               <a:ext uri="{FF2B5EF4-FFF2-40B4-BE49-F238E27FC236}">
-                <a16:creationId xmlns="" xmlns:a16="http://schemas.microsoft.com/office/drawing/2014/main" id="{7FC33359-8BE1-4CD9-AD98-06C75CE8FF08}"/>
+                <a16:creationId xmlns:a16="http://schemas.microsoft.com/office/drawing/2014/main" id="{7FC33359-8BE1-4CD9-AD98-06C75CE8FF08}"/>
               </a:ext>
             </a:extLst>
           </p:cNvPr>
@@ -16669,7 +16814,7 @@
           <p:cNvPr id="35" name="Rectangle 34">
             <a:extLst>
               <a:ext uri="{FF2B5EF4-FFF2-40B4-BE49-F238E27FC236}">
-                <a16:creationId xmlns="" xmlns:a16="http://schemas.microsoft.com/office/drawing/2014/main" id="{85531841-C806-4F00-B17D-D19E7CE1C155}"/>
+                <a16:creationId xmlns:a16="http://schemas.microsoft.com/office/drawing/2014/main" id="{85531841-C806-4F00-B17D-D19E7CE1C155}"/>
               </a:ext>
             </a:extLst>
           </p:cNvPr>
@@ -16728,7 +16873,7 @@
           <p:cNvPr id="37" name="Connector: Elbow 36">
             <a:extLst>
               <a:ext uri="{FF2B5EF4-FFF2-40B4-BE49-F238E27FC236}">
-                <a16:creationId xmlns="" xmlns:a16="http://schemas.microsoft.com/office/drawing/2014/main" id="{1BFE62EC-0F5D-4135-832D-63D5DC95509C}"/>
+                <a16:creationId xmlns:a16="http://schemas.microsoft.com/office/drawing/2014/main" id="{1BFE62EC-0F5D-4135-832D-63D5DC95509C}"/>
               </a:ext>
             </a:extLst>
           </p:cNvPr>
@@ -16773,7 +16918,7 @@
           <p:cNvPr id="38" name="TextBox 37">
             <a:extLst>
               <a:ext uri="{FF2B5EF4-FFF2-40B4-BE49-F238E27FC236}">
-                <a16:creationId xmlns="" xmlns:a16="http://schemas.microsoft.com/office/drawing/2014/main" id="{892D5E6B-E445-4560-9C01-6D3C52FFC5AA}"/>
+                <a16:creationId xmlns:a16="http://schemas.microsoft.com/office/drawing/2014/main" id="{892D5E6B-E445-4560-9C01-6D3C52FFC5AA}"/>
               </a:ext>
             </a:extLst>
           </p:cNvPr>
@@ -16808,7 +16953,7 @@
           <p:cNvPr id="39" name="Rectangle 38">
             <a:extLst>
               <a:ext uri="{FF2B5EF4-FFF2-40B4-BE49-F238E27FC236}">
-                <a16:creationId xmlns="" xmlns:a16="http://schemas.microsoft.com/office/drawing/2014/main" id="{2F2BC059-EF97-4BEE-8F18-133838E3F2D8}"/>
+                <a16:creationId xmlns:a16="http://schemas.microsoft.com/office/drawing/2014/main" id="{2F2BC059-EF97-4BEE-8F18-133838E3F2D8}"/>
               </a:ext>
             </a:extLst>
           </p:cNvPr>
@@ -16857,7 +17002,7 @@
           <p:cNvPr id="44" name="TextBox 43">
             <a:extLst>
               <a:ext uri="{FF2B5EF4-FFF2-40B4-BE49-F238E27FC236}">
-                <a16:creationId xmlns="" xmlns:a16="http://schemas.microsoft.com/office/drawing/2014/main" id="{48B10C1F-BA7F-40E8-B79A-E87D7A3A66AB}"/>
+                <a16:creationId xmlns:a16="http://schemas.microsoft.com/office/drawing/2014/main" id="{48B10C1F-BA7F-40E8-B79A-E87D7A3A66AB}"/>
               </a:ext>
             </a:extLst>
           </p:cNvPr>

</xml_diff>

<commit_message>
20210818 2339 tlw87 file updates for today.
</commit_message>
<xml_diff>
--- a/docs/ERS.pptx
+++ b/docs/ERS.pptx
@@ -269,7 +269,7 @@
           <a:p>
             <a:fld id="{6C733091-19F0-4DD7-90FE-000B4789B4CF}" type="datetimeFigureOut">
               <a:rPr lang="en-US" smtClean="0"/>
-              <a:t>8/17/2021</a:t>
+              <a:t>8/18/2021</a:t>
             </a:fld>
             <a:endParaRPr lang="en-US"/>
           </a:p>
@@ -467,7 +467,7 @@
           <a:p>
             <a:fld id="{6C733091-19F0-4DD7-90FE-000B4789B4CF}" type="datetimeFigureOut">
               <a:rPr lang="en-US" smtClean="0"/>
-              <a:t>8/17/2021</a:t>
+              <a:t>8/18/2021</a:t>
             </a:fld>
             <a:endParaRPr lang="en-US"/>
           </a:p>
@@ -675,7 +675,7 @@
           <a:p>
             <a:fld id="{6C733091-19F0-4DD7-90FE-000B4789B4CF}" type="datetimeFigureOut">
               <a:rPr lang="en-US" smtClean="0"/>
-              <a:t>8/17/2021</a:t>
+              <a:t>8/18/2021</a:t>
             </a:fld>
             <a:endParaRPr lang="en-US"/>
           </a:p>
@@ -873,7 +873,7 @@
           <a:p>
             <a:fld id="{6C733091-19F0-4DD7-90FE-000B4789B4CF}" type="datetimeFigureOut">
               <a:rPr lang="en-US" smtClean="0"/>
-              <a:t>8/17/2021</a:t>
+              <a:t>8/18/2021</a:t>
             </a:fld>
             <a:endParaRPr lang="en-US"/>
           </a:p>
@@ -1148,7 +1148,7 @@
           <a:p>
             <a:fld id="{6C733091-19F0-4DD7-90FE-000B4789B4CF}" type="datetimeFigureOut">
               <a:rPr lang="en-US" smtClean="0"/>
-              <a:t>8/17/2021</a:t>
+              <a:t>8/18/2021</a:t>
             </a:fld>
             <a:endParaRPr lang="en-US"/>
           </a:p>
@@ -1413,7 +1413,7 @@
           <a:p>
             <a:fld id="{6C733091-19F0-4DD7-90FE-000B4789B4CF}" type="datetimeFigureOut">
               <a:rPr lang="en-US" smtClean="0"/>
-              <a:t>8/17/2021</a:t>
+              <a:t>8/18/2021</a:t>
             </a:fld>
             <a:endParaRPr lang="en-US"/>
           </a:p>
@@ -1825,7 +1825,7 @@
           <a:p>
             <a:fld id="{6C733091-19F0-4DD7-90FE-000B4789B4CF}" type="datetimeFigureOut">
               <a:rPr lang="en-US" smtClean="0"/>
-              <a:t>8/17/2021</a:t>
+              <a:t>8/18/2021</a:t>
             </a:fld>
             <a:endParaRPr lang="en-US"/>
           </a:p>
@@ -1966,7 +1966,7 @@
           <a:p>
             <a:fld id="{6C733091-19F0-4DD7-90FE-000B4789B4CF}" type="datetimeFigureOut">
               <a:rPr lang="en-US" smtClean="0"/>
-              <a:t>8/17/2021</a:t>
+              <a:t>8/18/2021</a:t>
             </a:fld>
             <a:endParaRPr lang="en-US"/>
           </a:p>
@@ -2079,7 +2079,7 @@
           <a:p>
             <a:fld id="{6C733091-19F0-4DD7-90FE-000B4789B4CF}" type="datetimeFigureOut">
               <a:rPr lang="en-US" smtClean="0"/>
-              <a:t>8/17/2021</a:t>
+              <a:t>8/18/2021</a:t>
             </a:fld>
             <a:endParaRPr lang="en-US"/>
           </a:p>
@@ -2390,7 +2390,7 @@
           <a:p>
             <a:fld id="{6C733091-19F0-4DD7-90FE-000B4789B4CF}" type="datetimeFigureOut">
               <a:rPr lang="en-US" smtClean="0"/>
-              <a:t>8/17/2021</a:t>
+              <a:t>8/18/2021</a:t>
             </a:fld>
             <a:endParaRPr lang="en-US"/>
           </a:p>
@@ -2678,7 +2678,7 @@
           <a:p>
             <a:fld id="{6C733091-19F0-4DD7-90FE-000B4789B4CF}" type="datetimeFigureOut">
               <a:rPr lang="en-US" smtClean="0"/>
-              <a:t>8/17/2021</a:t>
+              <a:t>8/18/2021</a:t>
             </a:fld>
             <a:endParaRPr lang="en-US"/>
           </a:p>
@@ -2919,7 +2919,7 @@
           <a:p>
             <a:fld id="{6C733091-19F0-4DD7-90FE-000B4789B4CF}" type="datetimeFigureOut">
               <a:rPr lang="en-US" smtClean="0"/>
-              <a:t>8/17/2021</a:t>
+              <a:t>8/18/2021</a:t>
             </a:fld>
             <a:endParaRPr lang="en-US"/>
           </a:p>
@@ -5126,6 +5126,319 @@
       </p:grpSpPr>
       <p:sp>
         <p:nvSpPr>
+          <p:cNvPr id="89" name="Rectangle 88">
+            <a:extLst>
+              <a:ext uri="{FF2B5EF4-FFF2-40B4-BE49-F238E27FC236}">
+                <a16:creationId xmlns:a16="http://schemas.microsoft.com/office/drawing/2014/main" id="{EED827AB-78FC-41AC-8676-30DA25D7C5FC}"/>
+              </a:ext>
+            </a:extLst>
+          </p:cNvPr>
+          <p:cNvSpPr/>
+          <p:nvPr/>
+        </p:nvSpPr>
+        <p:spPr>
+          <a:xfrm>
+            <a:off x="7545891" y="2973761"/>
+            <a:ext cx="1494797" cy="991056"/>
+          </a:xfrm>
+          <a:prstGeom prst="rect">
+            <a:avLst/>
+          </a:prstGeom>
+          <a:solidFill>
+            <a:schemeClr val="accent6"/>
+          </a:solidFill>
+        </p:spPr>
+        <p:style>
+          <a:lnRef idx="2">
+            <a:schemeClr val="accent1">
+              <a:shade val="50000"/>
+            </a:schemeClr>
+          </a:lnRef>
+          <a:fillRef idx="1">
+            <a:schemeClr val="accent1"/>
+          </a:fillRef>
+          <a:effectRef idx="0">
+            <a:schemeClr val="accent1"/>
+          </a:effectRef>
+          <a:fontRef idx="minor">
+            <a:schemeClr val="lt1"/>
+          </a:fontRef>
+        </p:style>
+        <p:txBody>
+          <a:bodyPr rtlCol="0" anchor="ctr"/>
+          <a:lstStyle/>
+          <a:p>
+            <a:pPr algn="ctr"/>
+            <a:r>
+              <a:rPr lang="en-US" sz="1000" dirty="0"/>
+              <a:t>com.tlw8253.dto</a:t>
+            </a:r>
+          </a:p>
+          <a:p>
+            <a:pPr algn="ctr"/>
+            <a:r>
+              <a:rPr lang="en-US" sz="1200" dirty="0"/>
+              <a:t>Data Transfer Object</a:t>
+            </a:r>
+          </a:p>
+          <a:p>
+            <a:pPr algn="ctr"/>
+            <a:r>
+              <a:rPr lang="en-US" dirty="0"/>
+              <a:t>&lt;Tn&gt;DTO</a:t>
+            </a:r>
+          </a:p>
+          <a:p>
+            <a:pPr algn="ctr"/>
+            <a:r>
+              <a:rPr lang="en-US" sz="1200" dirty="0"/>
+              <a:t>&lt;Tn&gt;</a:t>
+            </a:r>
+            <a:r>
+              <a:rPr lang="en-US" sz="1200" dirty="0" err="1"/>
+              <a:t>AddOrEditDTO</a:t>
+            </a:r>
+            <a:endParaRPr lang="en-US" sz="1200" dirty="0"/>
+          </a:p>
+        </p:txBody>
+      </p:sp>
+      <p:sp>
+        <p:nvSpPr>
+          <p:cNvPr id="62" name="Rectangle 61">
+            <a:extLst>
+              <a:ext uri="{FF2B5EF4-FFF2-40B4-BE49-F238E27FC236}">
+                <a16:creationId xmlns:a16="http://schemas.microsoft.com/office/drawing/2014/main" id="{C3FE7107-D2B1-4448-B03A-F2CE9B45CFD6}"/>
+              </a:ext>
+            </a:extLst>
+          </p:cNvPr>
+          <p:cNvSpPr/>
+          <p:nvPr/>
+        </p:nvSpPr>
+        <p:spPr>
+          <a:xfrm>
+            <a:off x="4733154" y="2531096"/>
+            <a:ext cx="1589922" cy="991056"/>
+          </a:xfrm>
+          <a:prstGeom prst="rect">
+            <a:avLst/>
+          </a:prstGeom>
+          <a:solidFill>
+            <a:schemeClr val="accent6"/>
+          </a:solidFill>
+        </p:spPr>
+        <p:style>
+          <a:lnRef idx="2">
+            <a:schemeClr val="accent1">
+              <a:shade val="50000"/>
+            </a:schemeClr>
+          </a:lnRef>
+          <a:fillRef idx="1">
+            <a:schemeClr val="accent1"/>
+          </a:fillRef>
+          <a:effectRef idx="0">
+            <a:schemeClr val="accent1"/>
+          </a:effectRef>
+          <a:fontRef idx="minor">
+            <a:schemeClr val="lt1"/>
+          </a:fontRef>
+        </p:style>
+        <p:txBody>
+          <a:bodyPr rtlCol="0" anchor="ctr"/>
+          <a:lstStyle/>
+          <a:p>
+            <a:pPr algn="ctr"/>
+            <a:r>
+              <a:rPr lang="en-US" sz="1000" dirty="0"/>
+              <a:t>com.tlw8253.dao</a:t>
+            </a:r>
+          </a:p>
+          <a:p>
+            <a:pPr algn="ctr"/>
+            <a:r>
+              <a:rPr lang="en-US" dirty="0"/>
+              <a:t>&lt;Tn&gt;</a:t>
+            </a:r>
+            <a:r>
+              <a:rPr lang="en-US" dirty="0" err="1"/>
+              <a:t>DAOImpl</a:t>
+            </a:r>
+            <a:endParaRPr lang="en-US" dirty="0"/>
+          </a:p>
+        </p:txBody>
+      </p:sp>
+      <p:sp>
+        <p:nvSpPr>
+          <p:cNvPr id="61" name="Rectangle 60">
+            <a:extLst>
+              <a:ext uri="{FF2B5EF4-FFF2-40B4-BE49-F238E27FC236}">
+                <a16:creationId xmlns:a16="http://schemas.microsoft.com/office/drawing/2014/main" id="{2F7B40FD-C5BA-431D-AE99-1CB70F1BAB88}"/>
+              </a:ext>
+            </a:extLst>
+          </p:cNvPr>
+          <p:cNvSpPr/>
+          <p:nvPr/>
+        </p:nvSpPr>
+        <p:spPr>
+          <a:xfrm>
+            <a:off x="8566966" y="1339049"/>
+            <a:ext cx="1494797" cy="991056"/>
+          </a:xfrm>
+          <a:prstGeom prst="rect">
+            <a:avLst/>
+          </a:prstGeom>
+          <a:solidFill>
+            <a:schemeClr val="accent6"/>
+          </a:solidFill>
+        </p:spPr>
+        <p:style>
+          <a:lnRef idx="2">
+            <a:schemeClr val="accent1">
+              <a:shade val="50000"/>
+            </a:schemeClr>
+          </a:lnRef>
+          <a:fillRef idx="1">
+            <a:schemeClr val="accent1"/>
+          </a:fillRef>
+          <a:effectRef idx="0">
+            <a:schemeClr val="accent1"/>
+          </a:effectRef>
+          <a:fontRef idx="minor">
+            <a:schemeClr val="lt1"/>
+          </a:fontRef>
+        </p:style>
+        <p:txBody>
+          <a:bodyPr rtlCol="0" anchor="ctr"/>
+          <a:lstStyle/>
+          <a:p>
+            <a:pPr algn="ctr"/>
+            <a:r>
+              <a:rPr lang="en-US" sz="1000" dirty="0"/>
+              <a:t>com.tlw8253.model</a:t>
+            </a:r>
+          </a:p>
+          <a:p>
+            <a:pPr algn="ctr"/>
+            <a:r>
+              <a:rPr lang="en-US" dirty="0"/>
+              <a:t>&lt;Tn&gt;Model</a:t>
+            </a:r>
+          </a:p>
+        </p:txBody>
+      </p:sp>
+      <p:sp>
+        <p:nvSpPr>
+          <p:cNvPr id="60" name="Rectangle 59">
+            <a:extLst>
+              <a:ext uri="{FF2B5EF4-FFF2-40B4-BE49-F238E27FC236}">
+                <a16:creationId xmlns:a16="http://schemas.microsoft.com/office/drawing/2014/main" id="{CF3E4DE9-C6F2-4C11-BE7F-2753CDEFE535}"/>
+              </a:ext>
+            </a:extLst>
+          </p:cNvPr>
+          <p:cNvSpPr/>
+          <p:nvPr/>
+        </p:nvSpPr>
+        <p:spPr>
+          <a:xfrm>
+            <a:off x="7493462" y="5088577"/>
+            <a:ext cx="1678916" cy="991056"/>
+          </a:xfrm>
+          <a:prstGeom prst="rect">
+            <a:avLst/>
+          </a:prstGeom>
+          <a:solidFill>
+            <a:schemeClr val="accent6"/>
+          </a:solidFill>
+        </p:spPr>
+        <p:style>
+          <a:lnRef idx="2">
+            <a:schemeClr val="accent1">
+              <a:shade val="50000"/>
+            </a:schemeClr>
+          </a:lnRef>
+          <a:fillRef idx="1">
+            <a:schemeClr val="accent1"/>
+          </a:fillRef>
+          <a:effectRef idx="0">
+            <a:schemeClr val="accent1"/>
+          </a:effectRef>
+          <a:fontRef idx="minor">
+            <a:schemeClr val="lt1"/>
+          </a:fontRef>
+        </p:style>
+        <p:txBody>
+          <a:bodyPr rtlCol="0" anchor="ctr"/>
+          <a:lstStyle/>
+          <a:p>
+            <a:pPr algn="ctr"/>
+            <a:r>
+              <a:rPr lang="en-US" sz="1000" dirty="0"/>
+              <a:t>com.tlw8253.controller</a:t>
+            </a:r>
+          </a:p>
+          <a:p>
+            <a:pPr algn="ctr"/>
+            <a:r>
+              <a:rPr lang="en-US" dirty="0"/>
+              <a:t>&lt;Tn&gt;Controller</a:t>
+            </a:r>
+          </a:p>
+        </p:txBody>
+      </p:sp>
+      <p:sp>
+        <p:nvSpPr>
+          <p:cNvPr id="36" name="Rectangle 35"/>
+          <p:cNvSpPr/>
+          <p:nvPr/>
+        </p:nvSpPr>
+        <p:spPr>
+          <a:xfrm>
+            <a:off x="4779362" y="4590037"/>
+            <a:ext cx="1519176" cy="991056"/>
+          </a:xfrm>
+          <a:prstGeom prst="rect">
+            <a:avLst/>
+          </a:prstGeom>
+          <a:solidFill>
+            <a:schemeClr val="accent6"/>
+          </a:solidFill>
+        </p:spPr>
+        <p:style>
+          <a:lnRef idx="2">
+            <a:schemeClr val="accent1">
+              <a:shade val="50000"/>
+            </a:schemeClr>
+          </a:lnRef>
+          <a:fillRef idx="1">
+            <a:schemeClr val="accent1"/>
+          </a:fillRef>
+          <a:effectRef idx="0">
+            <a:schemeClr val="accent1"/>
+          </a:effectRef>
+          <a:fontRef idx="minor">
+            <a:schemeClr val="lt1"/>
+          </a:fontRef>
+        </p:style>
+        <p:txBody>
+          <a:bodyPr rtlCol="0" anchor="ctr"/>
+          <a:lstStyle/>
+          <a:p>
+            <a:pPr algn="ctr"/>
+            <a:r>
+              <a:rPr lang="en-US" sz="1000" dirty="0"/>
+              <a:t>com.tlw8253.service</a:t>
+            </a:r>
+          </a:p>
+          <a:p>
+            <a:pPr algn="ctr"/>
+            <a:r>
+              <a:rPr lang="en-US" sz="1600" dirty="0"/>
+              <a:t>&lt;Tn&gt;Service</a:t>
+            </a:r>
+          </a:p>
+        </p:txBody>
+      </p:sp>
+      <p:sp>
+        <p:nvSpPr>
           <p:cNvPr id="4" name="Rectangle 3"/>
           <p:cNvSpPr/>
           <p:nvPr/>
@@ -5205,7 +5518,7 @@
         </p:nvSpPr>
         <p:spPr>
           <a:xfrm>
-            <a:off x="8978642" y="1136267"/>
+            <a:off x="8471841" y="796577"/>
             <a:ext cx="1494797" cy="991056"/>
           </a:xfrm>
           <a:prstGeom prst="rect">
@@ -5245,14 +5558,7 @@
             <a:pPr algn="ctr"/>
             <a:r>
               <a:rPr lang="en-US" dirty="0"/>
-              <a:t>Model</a:t>
-            </a:r>
-          </a:p>
-          <a:p>
-            <a:pPr algn="ctr"/>
-            <a:r>
-              <a:rPr lang="en-US" sz="1000" dirty="0"/>
-              <a:t>&lt;T&gt;</a:t>
+              <a:t>&lt;T&gt;Model</a:t>
             </a:r>
           </a:p>
         </p:txBody>
@@ -5269,8 +5575,8 @@
         </p:nvCxnSpPr>
         <p:spPr>
           <a:xfrm flipV="1">
-            <a:off x="6258426" y="1631795"/>
-            <a:ext cx="2720216" cy="836092"/>
+            <a:off x="6258426" y="1292105"/>
+            <a:ext cx="2213415" cy="1175782"/>
           </a:xfrm>
           <a:prstGeom prst="straightConnector1">
             <a:avLst/>
@@ -5302,7 +5608,7 @@
         </p:nvSpPr>
         <p:spPr>
           <a:xfrm>
-            <a:off x="7404749" y="2760251"/>
+            <a:off x="7421377" y="2396457"/>
             <a:ext cx="1494797" cy="991056"/>
           </a:xfrm>
           <a:prstGeom prst="rect">
@@ -5360,19 +5666,7 @@
             </a:r>
             <a:r>
               <a:rPr lang="en-US" sz="1200" dirty="0" err="1"/>
-              <a:t>AddDTO</a:t>
-            </a:r>
-            <a:endParaRPr lang="en-US" sz="1200" dirty="0"/>
-          </a:p>
-          <a:p>
-            <a:pPr algn="ctr"/>
-            <a:r>
-              <a:rPr lang="en-US" sz="1200" dirty="0"/>
-              <a:t>&lt;T&gt;</a:t>
-            </a:r>
-            <a:r>
-              <a:rPr lang="en-US" sz="1200" dirty="0" err="1"/>
-              <a:t>EditDTO</a:t>
+              <a:t>AddOrEditDTO</a:t>
             </a:r>
             <a:endParaRPr lang="en-US" sz="1200" dirty="0"/>
           </a:p>
@@ -5391,7 +5685,7 @@
         <p:spPr>
           <a:xfrm>
             <a:off x="6258426" y="2467887"/>
-            <a:ext cx="1146323" cy="787892"/>
+            <a:ext cx="1162951" cy="424098"/>
           </a:xfrm>
           <a:prstGeom prst="straightConnector1">
             <a:avLst/>
@@ -5705,7 +5999,7 @@
         </p:nvSpPr>
         <p:spPr>
           <a:xfrm>
-            <a:off x="4725206" y="3751959"/>
+            <a:off x="4717928" y="4051852"/>
             <a:ext cx="1494797" cy="991056"/>
           </a:xfrm>
           <a:prstGeom prst="rect">
@@ -5762,7 +6056,7 @@
         <p:spPr>
           <a:xfrm flipH="1" flipV="1">
             <a:off x="5463465" y="2963415"/>
-            <a:ext cx="9140" cy="788544"/>
+            <a:ext cx="1862" cy="1088437"/>
           </a:xfrm>
           <a:prstGeom prst="straightConnector1">
             <a:avLst/>
@@ -5800,7 +6094,7 @@
         </p:nvSpPr>
         <p:spPr>
           <a:xfrm>
-            <a:off x="4944934" y="3108328"/>
+            <a:off x="5001782" y="3652968"/>
             <a:ext cx="538098" cy="276999"/>
           </a:xfrm>
           <a:prstGeom prst="rect">
@@ -5888,7 +6182,7 @@
         <p:spPr>
           <a:xfrm flipH="1" flipV="1">
             <a:off x="2948058" y="2621557"/>
-            <a:ext cx="1777148" cy="1625930"/>
+            <a:ext cx="1769870" cy="1925823"/>
           </a:xfrm>
           <a:prstGeom prst="straightConnector1">
             <a:avLst/>
@@ -5994,17 +6288,10 @@
           <a:p>
             <a:pPr algn="ctr"/>
             <a:r>
-              <a:rPr lang="en-US" sz="1000" dirty="0"/>
-              <a:t>Utility</a:t>
-            </a:r>
-          </a:p>
-          <a:p>
-            <a:pPr algn="ctr"/>
-            <a:r>
-              <a:rPr lang="en-US" dirty="0" err="1"/>
-              <a:t>ConnectionUtility</a:t>
-            </a:r>
-            <a:endParaRPr lang="en-US" dirty="0"/>
+              <a:rPr lang="en-US" sz="1200" dirty="0" err="1"/>
+              <a:t>SessionFactorySingleton</a:t>
+            </a:r>
+            <a:endParaRPr lang="en-US" sz="1200" dirty="0"/>
           </a:p>
         </p:txBody>
       </p:sp>
@@ -6300,14 +6587,10 @@
           <a:p>
             <a:pPr algn="ctr"/>
             <a:r>
-              <a:rPr lang="en-US" sz="1400" dirty="0"/>
-              <a:t>&lt;T&gt;</a:t>
-            </a:r>
-            <a:r>
-              <a:rPr lang="en-US" sz="1400" dirty="0" err="1"/>
-              <a:t>NotFoundException</a:t>
-            </a:r>
-            <a:endParaRPr lang="en-US" sz="1400" dirty="0"/>
+              <a:rPr lang="en-US" sz="1300" dirty="0" err="1"/>
+              <a:t>RecordNotFoundException</a:t>
+            </a:r>
+            <a:endParaRPr lang="en-US" sz="1300" dirty="0"/>
           </a:p>
         </p:txBody>
       </p:sp>
@@ -6330,7 +6613,7 @@
         <p:spPr>
           <a:xfrm flipH="1" flipV="1">
             <a:off x="2519583" y="3739128"/>
-            <a:ext cx="2205623" cy="508359"/>
+            <a:ext cx="2198345" cy="808252"/>
           </a:xfrm>
           <a:prstGeom prst="straightConnector1">
             <a:avLst/>
@@ -6372,8 +6655,8 @@
         </p:nvCxnSpPr>
         <p:spPr>
           <a:xfrm flipH="1">
-            <a:off x="2326523" y="4247487"/>
-            <a:ext cx="2398683" cy="359078"/>
+            <a:off x="2326523" y="4547380"/>
+            <a:ext cx="2391405" cy="59185"/>
           </a:xfrm>
           <a:prstGeom prst="straightConnector1">
             <a:avLst/>
@@ -6453,7 +6736,7 @@
         </p:nvSpPr>
         <p:spPr>
           <a:xfrm>
-            <a:off x="7934122" y="1839196"/>
+            <a:off x="7618534" y="1640699"/>
             <a:ext cx="728932" cy="276999"/>
           </a:xfrm>
           <a:prstGeom prst="rect">
@@ -6476,102 +6759,13 @@
       </p:sp>
       <p:sp>
         <p:nvSpPr>
-          <p:cNvPr id="36" name="Rectangle 35"/>
-          <p:cNvSpPr/>
-          <p:nvPr/>
-        </p:nvSpPr>
-        <p:spPr>
-          <a:xfrm>
-            <a:off x="4743028" y="5213271"/>
-            <a:ext cx="1494797" cy="991056"/>
-          </a:xfrm>
-          <a:prstGeom prst="rect">
-            <a:avLst/>
-          </a:prstGeom>
-          <a:solidFill>
-            <a:schemeClr val="accent6"/>
-          </a:solidFill>
-        </p:spPr>
-        <p:style>
-          <a:lnRef idx="2">
-            <a:schemeClr val="accent1">
-              <a:shade val="50000"/>
-            </a:schemeClr>
-          </a:lnRef>
-          <a:fillRef idx="1">
-            <a:schemeClr val="accent1"/>
-          </a:fillRef>
-          <a:effectRef idx="0">
-            <a:schemeClr val="accent1"/>
-          </a:effectRef>
-          <a:fontRef idx="minor">
-            <a:schemeClr val="lt1"/>
-          </a:fontRef>
-        </p:style>
-        <p:txBody>
-          <a:bodyPr rtlCol="0" anchor="ctr"/>
-          <a:lstStyle/>
-          <a:p>
-            <a:pPr algn="ctr"/>
-            <a:r>
-              <a:rPr lang="en-US" sz="1000" dirty="0"/>
-              <a:t>com.tlw8253.service</a:t>
-            </a:r>
-          </a:p>
-          <a:p>
-            <a:pPr algn="ctr"/>
-            <a:r>
-              <a:rPr lang="en-US" sz="1600" dirty="0" err="1"/>
-              <a:t>AccountService</a:t>
-            </a:r>
-            <a:endParaRPr lang="en-US" sz="1600" dirty="0"/>
-          </a:p>
-        </p:txBody>
-      </p:sp>
-      <p:sp>
-        <p:nvSpPr>
-          <p:cNvPr id="40" name="TextBox 39">
-            <a:extLst>
-              <a:ext uri="{FF2B5EF4-FFF2-40B4-BE49-F238E27FC236}">
-                <a16:creationId xmlns:a16="http://schemas.microsoft.com/office/drawing/2014/main" id="{E0BBD6C8-C8F2-40C5-AA64-85961A11ADC2}"/>
-              </a:ext>
-            </a:extLst>
-          </p:cNvPr>
-          <p:cNvSpPr txBox="1"/>
-          <p:nvPr/>
-        </p:nvSpPr>
-        <p:spPr>
-          <a:xfrm>
-            <a:off x="6348941" y="5022915"/>
-            <a:ext cx="728932" cy="276999"/>
-          </a:xfrm>
-          <a:prstGeom prst="rect">
-            <a:avLst/>
-          </a:prstGeom>
-          <a:noFill/>
-        </p:spPr>
-        <p:txBody>
-          <a:bodyPr wrap="square" rtlCol="0">
-            <a:spAutoFit/>
-          </a:bodyPr>
-          <a:lstStyle/>
-          <a:p>
-            <a:r>
-              <a:rPr lang="en-US" sz="1200" dirty="0"/>
-              <a:t>uses</a:t>
-            </a:r>
-          </a:p>
-        </p:txBody>
-      </p:sp>
-      <p:sp>
-        <p:nvSpPr>
           <p:cNvPr id="46" name="Rectangle 45"/>
           <p:cNvSpPr/>
           <p:nvPr/>
         </p:nvSpPr>
         <p:spPr>
           <a:xfrm>
-            <a:off x="7302262" y="4272562"/>
+            <a:off x="7321837" y="4539199"/>
             <a:ext cx="1678916" cy="991056"/>
           </a:xfrm>
           <a:prstGeom prst="rect">
@@ -6627,8 +6821,8 @@
         </p:nvCxnSpPr>
         <p:spPr>
           <a:xfrm flipH="1" flipV="1">
-            <a:off x="6220003" y="4247487"/>
-            <a:ext cx="1082259" cy="520603"/>
+            <a:off x="6212725" y="4547380"/>
+            <a:ext cx="1109112" cy="487347"/>
           </a:xfrm>
           <a:prstGeom prst="straightConnector1">
             <a:avLst/>
@@ -6666,8 +6860,8 @@
         </p:nvSpPr>
         <p:spPr>
           <a:xfrm>
-            <a:off x="6316885" y="4108988"/>
-            <a:ext cx="1062021" cy="276999"/>
+            <a:off x="6444271" y="4320994"/>
+            <a:ext cx="728932" cy="276999"/>
           </a:xfrm>
           <a:prstGeom prst="rect">
             <a:avLst/>
@@ -6701,7 +6895,7 @@
         </p:nvSpPr>
         <p:spPr>
           <a:xfrm>
-            <a:off x="6713407" y="6274732"/>
+            <a:off x="6739095" y="6481041"/>
             <a:ext cx="2844400" cy="224286"/>
           </a:xfrm>
           <a:prstGeom prst="rect">
@@ -6746,9 +6940,9 @@
           <p:nvPr/>
         </p:nvCxnSpPr>
         <p:spPr>
-          <a:xfrm flipH="1">
-            <a:off x="8135607" y="5263618"/>
-            <a:ext cx="6113" cy="1011114"/>
+          <a:xfrm>
+            <a:off x="8161295" y="5530255"/>
+            <a:ext cx="0" cy="950786"/>
           </a:xfrm>
           <a:prstGeom prst="straightConnector1">
             <a:avLst/>
@@ -6783,8 +6977,8 @@
         </p:nvCxnSpPr>
         <p:spPr>
           <a:xfrm flipV="1">
-            <a:off x="8135607" y="5263618"/>
-            <a:ext cx="6113" cy="1011114"/>
+            <a:off x="8161295" y="5530255"/>
+            <a:ext cx="0" cy="950786"/>
           </a:xfrm>
           <a:prstGeom prst="straightConnector1">
             <a:avLst/>
@@ -6822,8 +7016,8 @@
         </p:nvSpPr>
         <p:spPr>
           <a:xfrm>
-            <a:off x="8162483" y="5615842"/>
-            <a:ext cx="1063847" cy="276999"/>
+            <a:off x="8110103" y="6118255"/>
+            <a:ext cx="843694" cy="276999"/>
           </a:xfrm>
           <a:prstGeom prst="rect">
             <a:avLst/>
@@ -6855,8 +7049,8 @@
         </p:nvCxnSpPr>
         <p:spPr>
           <a:xfrm flipV="1">
-            <a:off x="6220003" y="3255779"/>
-            <a:ext cx="1184746" cy="991708"/>
+            <a:off x="6212725" y="2891985"/>
+            <a:ext cx="1208652" cy="1655395"/>
           </a:xfrm>
           <a:prstGeom prst="straightConnector1">
             <a:avLst/>
@@ -6891,8 +7085,8 @@
         </p:nvCxnSpPr>
         <p:spPr>
           <a:xfrm flipV="1">
-            <a:off x="8141720" y="3751307"/>
-            <a:ext cx="10428" cy="521255"/>
+            <a:off x="8161295" y="3387513"/>
+            <a:ext cx="7481" cy="1151686"/>
           </a:xfrm>
           <a:prstGeom prst="straightConnector1">
             <a:avLst/>
@@ -6930,7 +7124,7 @@
         </p:nvSpPr>
         <p:spPr>
           <a:xfrm>
-            <a:off x="8121633" y="3766672"/>
+            <a:off x="8156789" y="4166594"/>
             <a:ext cx="728932" cy="276999"/>
           </a:xfrm>
           <a:prstGeom prst="rect">
@@ -6986,42 +7180,6 @@
           </a:p>
         </p:txBody>
       </p:sp>
-      <p:cxnSp>
-        <p:nvCxnSpPr>
-          <p:cNvPr id="3" name="Straight Arrow Connector 2"/>
-          <p:cNvCxnSpPr>
-            <a:stCxn id="46" idx="1"/>
-            <a:endCxn id="36" idx="3"/>
-          </p:cNvCxnSpPr>
-          <p:nvPr/>
-        </p:nvCxnSpPr>
-        <p:spPr>
-          <a:xfrm flipH="1">
-            <a:off x="6237825" y="4768090"/>
-            <a:ext cx="1064437" cy="940709"/>
-          </a:xfrm>
-          <a:prstGeom prst="straightConnector1">
-            <a:avLst/>
-          </a:prstGeom>
-          <a:ln>
-            <a:tailEnd type="triangle"/>
-          </a:ln>
-        </p:spPr>
-        <p:style>
-          <a:lnRef idx="1">
-            <a:schemeClr val="accent1"/>
-          </a:lnRef>
-          <a:fillRef idx="0">
-            <a:schemeClr val="accent1"/>
-          </a:fillRef>
-          <a:effectRef idx="0">
-            <a:schemeClr val="accent1"/>
-          </a:effectRef>
-          <a:fontRef idx="minor">
-            <a:schemeClr val="tx1"/>
-          </a:fontRef>
-        </p:style>
-      </p:cxnSp>
       <p:sp>
         <p:nvSpPr>
           <p:cNvPr id="49" name="Rectangle 48">
@@ -7075,10 +7233,10 @@
           <a:p>
             <a:pPr algn="ctr"/>
             <a:r>
-              <a:rPr lang="en-US" sz="1400" dirty="0" err="1"/>
-              <a:t>AccountNotFoundException</a:t>
-            </a:r>
-            <a:endParaRPr lang="en-US" sz="1400" dirty="0"/>
+              <a:rPr lang="en-US" sz="1200" dirty="0" err="1"/>
+              <a:t>AuthenticationFailureException</a:t>
+            </a:r>
+            <a:endParaRPr lang="en-US" sz="1200" dirty="0"/>
           </a:p>
         </p:txBody>
       </p:sp>
@@ -7086,15 +7244,16 @@
         <p:nvCxnSpPr>
           <p:cNvPr id="6" name="Straight Arrow Connector 5"/>
           <p:cNvCxnSpPr>
-            <a:stCxn id="36" idx="1"/>
+            <a:cxnSpLocks/>
+            <a:stCxn id="29" idx="1"/>
             <a:endCxn id="49" idx="3"/>
           </p:cNvCxnSpPr>
           <p:nvPr/>
         </p:nvCxnSpPr>
         <p:spPr>
           <a:xfrm flipH="1">
-            <a:off x="3794137" y="5708799"/>
-            <a:ext cx="948891" cy="422257"/>
+            <a:off x="3794137" y="4547380"/>
+            <a:ext cx="923791" cy="1583676"/>
           </a:xfrm>
           <a:prstGeom prst="straightConnector1">
             <a:avLst/>
@@ -7118,41 +7277,6 @@
           </a:fontRef>
         </p:style>
       </p:cxnSp>
-      <p:sp>
-        <p:nvSpPr>
-          <p:cNvPr id="56" name="TextBox 55">
-            <a:extLst>
-              <a:ext uri="{FF2B5EF4-FFF2-40B4-BE49-F238E27FC236}">
-                <a16:creationId xmlns:a16="http://schemas.microsoft.com/office/drawing/2014/main" id="{E0BBD6C8-C8F2-40C5-AA64-85961A11ADC2}"/>
-              </a:ext>
-            </a:extLst>
-          </p:cNvPr>
-          <p:cNvSpPr txBox="1"/>
-          <p:nvPr/>
-        </p:nvSpPr>
-        <p:spPr>
-          <a:xfrm>
-            <a:off x="3895777" y="5500072"/>
-            <a:ext cx="728932" cy="276999"/>
-          </a:xfrm>
-          <a:prstGeom prst="rect">
-            <a:avLst/>
-          </a:prstGeom>
-          <a:noFill/>
-        </p:spPr>
-        <p:txBody>
-          <a:bodyPr wrap="square" rtlCol="0">
-            <a:spAutoFit/>
-          </a:bodyPr>
-          <a:lstStyle/>
-          <a:p>
-            <a:r>
-              <a:rPr lang="en-US" sz="1200" dirty="0"/>
-              <a:t>throws</a:t>
-            </a:r>
-          </a:p>
-        </p:txBody>
-      </p:sp>
       <p:sp>
         <p:nvSpPr>
           <p:cNvPr id="57" name="Rectangle 56">
@@ -7221,15 +7345,7 @@
             <a:pPr algn="ctr"/>
             <a:r>
               <a:rPr lang="en-US" sz="1200" dirty="0" err="1"/>
-              <a:t>AddDTO</a:t>
-            </a:r>
-            <a:endParaRPr lang="en-US" sz="1200" dirty="0"/>
-          </a:p>
-          <a:p>
-            <a:pPr algn="ctr"/>
-            <a:r>
-              <a:rPr lang="en-US" sz="1200" dirty="0" err="1"/>
-              <a:t>EditDTO</a:t>
+              <a:t>AddOrEditDTO</a:t>
             </a:r>
             <a:endParaRPr lang="en-US" sz="1200" dirty="0"/>
           </a:p>
@@ -7245,9 +7361,9 @@
           <p:nvPr/>
         </p:nvCxnSpPr>
         <p:spPr>
-          <a:xfrm flipV="1">
-            <a:off x="8899546" y="3243599"/>
-            <a:ext cx="1031348" cy="12180"/>
+          <a:xfrm>
+            <a:off x="8916174" y="2891985"/>
+            <a:ext cx="1014720" cy="351614"/>
           </a:xfrm>
           <a:prstGeom prst="straightConnector1">
             <a:avLst/>

</xml_diff>

<commit_message>
20210819 1554 tlw8748253: file updates for today.
</commit_message>
<xml_diff>
--- a/docs/ERS.pptx
+++ b/docs/ERS.pptx
@@ -144,7 +144,7 @@
           <p:cNvPr id="2" name="Title 1">
             <a:extLst>
               <a:ext uri="{FF2B5EF4-FFF2-40B4-BE49-F238E27FC236}">
-                <a16:creationId xmlns:a16="http://schemas.microsoft.com/office/drawing/2014/main" id="{67106D7E-D400-44F1-9A1A-D68CE501C73D}"/>
+                <a16:creationId xmlns:a16="http://schemas.microsoft.com/office/drawing/2014/main" xmlns="" id="{67106D7E-D400-44F1-9A1A-D68CE501C73D}"/>
               </a:ext>
             </a:extLst>
           </p:cNvPr>
@@ -181,7 +181,7 @@
           <p:cNvPr id="3" name="Subtitle 2">
             <a:extLst>
               <a:ext uri="{FF2B5EF4-FFF2-40B4-BE49-F238E27FC236}">
-                <a16:creationId xmlns:a16="http://schemas.microsoft.com/office/drawing/2014/main" id="{A5FDE527-E621-4639-A0C7-E1E9B0DFBCEC}"/>
+                <a16:creationId xmlns:a16="http://schemas.microsoft.com/office/drawing/2014/main" xmlns="" id="{A5FDE527-E621-4639-A0C7-E1E9B0DFBCEC}"/>
               </a:ext>
             </a:extLst>
           </p:cNvPr>
@@ -251,7 +251,7 @@
           <p:cNvPr id="4" name="Date Placeholder 3">
             <a:extLst>
               <a:ext uri="{FF2B5EF4-FFF2-40B4-BE49-F238E27FC236}">
-                <a16:creationId xmlns:a16="http://schemas.microsoft.com/office/drawing/2014/main" id="{E109CE88-B989-4109-89C8-36F7C245DB1C}"/>
+                <a16:creationId xmlns:a16="http://schemas.microsoft.com/office/drawing/2014/main" xmlns="" id="{E109CE88-B989-4109-89C8-36F7C245DB1C}"/>
               </a:ext>
             </a:extLst>
           </p:cNvPr>
@@ -269,7 +269,7 @@
           <a:p>
             <a:fld id="{6C733091-19F0-4DD7-90FE-000B4789B4CF}" type="datetimeFigureOut">
               <a:rPr lang="en-US" smtClean="0"/>
-              <a:t>8/18/2021</a:t>
+              <a:t>8/19/2021</a:t>
             </a:fld>
             <a:endParaRPr lang="en-US"/>
           </a:p>
@@ -280,7 +280,7 @@
           <p:cNvPr id="5" name="Footer Placeholder 4">
             <a:extLst>
               <a:ext uri="{FF2B5EF4-FFF2-40B4-BE49-F238E27FC236}">
-                <a16:creationId xmlns:a16="http://schemas.microsoft.com/office/drawing/2014/main" id="{0841498F-B991-43D3-B408-CC35D8EFCF37}"/>
+                <a16:creationId xmlns:a16="http://schemas.microsoft.com/office/drawing/2014/main" xmlns="" id="{0841498F-B991-43D3-B408-CC35D8EFCF37}"/>
               </a:ext>
             </a:extLst>
           </p:cNvPr>
@@ -305,7 +305,7 @@
           <p:cNvPr id="6" name="Slide Number Placeholder 5">
             <a:extLst>
               <a:ext uri="{FF2B5EF4-FFF2-40B4-BE49-F238E27FC236}">
-                <a16:creationId xmlns:a16="http://schemas.microsoft.com/office/drawing/2014/main" id="{01754CB8-17B1-45A0-AE7D-755EAA1B69D8}"/>
+                <a16:creationId xmlns:a16="http://schemas.microsoft.com/office/drawing/2014/main" xmlns="" id="{01754CB8-17B1-45A0-AE7D-755EAA1B69D8}"/>
               </a:ext>
             </a:extLst>
           </p:cNvPr>
@@ -364,7 +364,7 @@
           <p:cNvPr id="2" name="Title 1">
             <a:extLst>
               <a:ext uri="{FF2B5EF4-FFF2-40B4-BE49-F238E27FC236}">
-                <a16:creationId xmlns:a16="http://schemas.microsoft.com/office/drawing/2014/main" id="{E7A7B055-5DC2-440D-83C1-CAAE8E9A8E14}"/>
+                <a16:creationId xmlns:a16="http://schemas.microsoft.com/office/drawing/2014/main" xmlns="" id="{E7A7B055-5DC2-440D-83C1-CAAE8E9A8E14}"/>
               </a:ext>
             </a:extLst>
           </p:cNvPr>
@@ -392,7 +392,7 @@
           <p:cNvPr id="3" name="Vertical Text Placeholder 2">
             <a:extLst>
               <a:ext uri="{FF2B5EF4-FFF2-40B4-BE49-F238E27FC236}">
-                <a16:creationId xmlns:a16="http://schemas.microsoft.com/office/drawing/2014/main" id="{65710707-423D-4F9D-A49D-6C764C562553}"/>
+                <a16:creationId xmlns:a16="http://schemas.microsoft.com/office/drawing/2014/main" xmlns="" id="{65710707-423D-4F9D-A49D-6C764C562553}"/>
               </a:ext>
             </a:extLst>
           </p:cNvPr>
@@ -449,7 +449,7 @@
           <p:cNvPr id="4" name="Date Placeholder 3">
             <a:extLst>
               <a:ext uri="{FF2B5EF4-FFF2-40B4-BE49-F238E27FC236}">
-                <a16:creationId xmlns:a16="http://schemas.microsoft.com/office/drawing/2014/main" id="{98B6F7EF-D1BE-4437-85F3-99626E37E4EF}"/>
+                <a16:creationId xmlns:a16="http://schemas.microsoft.com/office/drawing/2014/main" xmlns="" id="{98B6F7EF-D1BE-4437-85F3-99626E37E4EF}"/>
               </a:ext>
             </a:extLst>
           </p:cNvPr>
@@ -467,7 +467,7 @@
           <a:p>
             <a:fld id="{6C733091-19F0-4DD7-90FE-000B4789B4CF}" type="datetimeFigureOut">
               <a:rPr lang="en-US" smtClean="0"/>
-              <a:t>8/18/2021</a:t>
+              <a:t>8/19/2021</a:t>
             </a:fld>
             <a:endParaRPr lang="en-US"/>
           </a:p>
@@ -478,7 +478,7 @@
           <p:cNvPr id="5" name="Footer Placeholder 4">
             <a:extLst>
               <a:ext uri="{FF2B5EF4-FFF2-40B4-BE49-F238E27FC236}">
-                <a16:creationId xmlns:a16="http://schemas.microsoft.com/office/drawing/2014/main" id="{D890AA9B-E479-4209-B245-83608F3D4013}"/>
+                <a16:creationId xmlns:a16="http://schemas.microsoft.com/office/drawing/2014/main" xmlns="" id="{D890AA9B-E479-4209-B245-83608F3D4013}"/>
               </a:ext>
             </a:extLst>
           </p:cNvPr>
@@ -503,7 +503,7 @@
           <p:cNvPr id="6" name="Slide Number Placeholder 5">
             <a:extLst>
               <a:ext uri="{FF2B5EF4-FFF2-40B4-BE49-F238E27FC236}">
-                <a16:creationId xmlns:a16="http://schemas.microsoft.com/office/drawing/2014/main" id="{0E4976E4-E15A-4296-A430-633D2BB9142B}"/>
+                <a16:creationId xmlns:a16="http://schemas.microsoft.com/office/drawing/2014/main" xmlns="" id="{0E4976E4-E15A-4296-A430-633D2BB9142B}"/>
               </a:ext>
             </a:extLst>
           </p:cNvPr>
@@ -562,7 +562,7 @@
           <p:cNvPr id="2" name="Vertical Title 1">
             <a:extLst>
               <a:ext uri="{FF2B5EF4-FFF2-40B4-BE49-F238E27FC236}">
-                <a16:creationId xmlns:a16="http://schemas.microsoft.com/office/drawing/2014/main" id="{66F63CF5-8DEE-4BB2-A2A5-5C16FEBE1AD5}"/>
+                <a16:creationId xmlns:a16="http://schemas.microsoft.com/office/drawing/2014/main" xmlns="" id="{66F63CF5-8DEE-4BB2-A2A5-5C16FEBE1AD5}"/>
               </a:ext>
             </a:extLst>
           </p:cNvPr>
@@ -595,7 +595,7 @@
           <p:cNvPr id="3" name="Vertical Text Placeholder 2">
             <a:extLst>
               <a:ext uri="{FF2B5EF4-FFF2-40B4-BE49-F238E27FC236}">
-                <a16:creationId xmlns:a16="http://schemas.microsoft.com/office/drawing/2014/main" id="{E0D5EBA5-94AF-4373-B032-A40FF73C7575}"/>
+                <a16:creationId xmlns:a16="http://schemas.microsoft.com/office/drawing/2014/main" xmlns="" id="{E0D5EBA5-94AF-4373-B032-A40FF73C7575}"/>
               </a:ext>
             </a:extLst>
           </p:cNvPr>
@@ -657,7 +657,7 @@
           <p:cNvPr id="4" name="Date Placeholder 3">
             <a:extLst>
               <a:ext uri="{FF2B5EF4-FFF2-40B4-BE49-F238E27FC236}">
-                <a16:creationId xmlns:a16="http://schemas.microsoft.com/office/drawing/2014/main" id="{7426B8E1-6758-4F5E-B618-96641332600B}"/>
+                <a16:creationId xmlns:a16="http://schemas.microsoft.com/office/drawing/2014/main" xmlns="" id="{7426B8E1-6758-4F5E-B618-96641332600B}"/>
               </a:ext>
             </a:extLst>
           </p:cNvPr>
@@ -675,7 +675,7 @@
           <a:p>
             <a:fld id="{6C733091-19F0-4DD7-90FE-000B4789B4CF}" type="datetimeFigureOut">
               <a:rPr lang="en-US" smtClean="0"/>
-              <a:t>8/18/2021</a:t>
+              <a:t>8/19/2021</a:t>
             </a:fld>
             <a:endParaRPr lang="en-US"/>
           </a:p>
@@ -686,7 +686,7 @@
           <p:cNvPr id="5" name="Footer Placeholder 4">
             <a:extLst>
               <a:ext uri="{FF2B5EF4-FFF2-40B4-BE49-F238E27FC236}">
-                <a16:creationId xmlns:a16="http://schemas.microsoft.com/office/drawing/2014/main" id="{F65E330E-2A7E-482D-AE0F-70EA5A29958B}"/>
+                <a16:creationId xmlns:a16="http://schemas.microsoft.com/office/drawing/2014/main" xmlns="" id="{F65E330E-2A7E-482D-AE0F-70EA5A29958B}"/>
               </a:ext>
             </a:extLst>
           </p:cNvPr>
@@ -711,7 +711,7 @@
           <p:cNvPr id="6" name="Slide Number Placeholder 5">
             <a:extLst>
               <a:ext uri="{FF2B5EF4-FFF2-40B4-BE49-F238E27FC236}">
-                <a16:creationId xmlns:a16="http://schemas.microsoft.com/office/drawing/2014/main" id="{B8000005-FC38-4A6C-9D09-7945EFA08160}"/>
+                <a16:creationId xmlns:a16="http://schemas.microsoft.com/office/drawing/2014/main" xmlns="" id="{B8000005-FC38-4A6C-9D09-7945EFA08160}"/>
               </a:ext>
             </a:extLst>
           </p:cNvPr>
@@ -770,7 +770,7 @@
           <p:cNvPr id="2" name="Title 1">
             <a:extLst>
               <a:ext uri="{FF2B5EF4-FFF2-40B4-BE49-F238E27FC236}">
-                <a16:creationId xmlns:a16="http://schemas.microsoft.com/office/drawing/2014/main" id="{91D0002C-766B-44B4-A24C-BE6DE6C7BA4C}"/>
+                <a16:creationId xmlns:a16="http://schemas.microsoft.com/office/drawing/2014/main" xmlns="" id="{91D0002C-766B-44B4-A24C-BE6DE6C7BA4C}"/>
               </a:ext>
             </a:extLst>
           </p:cNvPr>
@@ -798,7 +798,7 @@
           <p:cNvPr id="3" name="Content Placeholder 2">
             <a:extLst>
               <a:ext uri="{FF2B5EF4-FFF2-40B4-BE49-F238E27FC236}">
-                <a16:creationId xmlns:a16="http://schemas.microsoft.com/office/drawing/2014/main" id="{3455BAA9-6C7B-4874-AD76-BD466F64802D}"/>
+                <a16:creationId xmlns:a16="http://schemas.microsoft.com/office/drawing/2014/main" xmlns="" id="{3455BAA9-6C7B-4874-AD76-BD466F64802D}"/>
               </a:ext>
             </a:extLst>
           </p:cNvPr>
@@ -855,7 +855,7 @@
           <p:cNvPr id="4" name="Date Placeholder 3">
             <a:extLst>
               <a:ext uri="{FF2B5EF4-FFF2-40B4-BE49-F238E27FC236}">
-                <a16:creationId xmlns:a16="http://schemas.microsoft.com/office/drawing/2014/main" id="{8776BDAF-D8F2-4A61-904D-094BB4545702}"/>
+                <a16:creationId xmlns:a16="http://schemas.microsoft.com/office/drawing/2014/main" xmlns="" id="{8776BDAF-D8F2-4A61-904D-094BB4545702}"/>
               </a:ext>
             </a:extLst>
           </p:cNvPr>
@@ -873,7 +873,7 @@
           <a:p>
             <a:fld id="{6C733091-19F0-4DD7-90FE-000B4789B4CF}" type="datetimeFigureOut">
               <a:rPr lang="en-US" smtClean="0"/>
-              <a:t>8/18/2021</a:t>
+              <a:t>8/19/2021</a:t>
             </a:fld>
             <a:endParaRPr lang="en-US"/>
           </a:p>
@@ -884,7 +884,7 @@
           <p:cNvPr id="5" name="Footer Placeholder 4">
             <a:extLst>
               <a:ext uri="{FF2B5EF4-FFF2-40B4-BE49-F238E27FC236}">
-                <a16:creationId xmlns:a16="http://schemas.microsoft.com/office/drawing/2014/main" id="{F89C5665-4384-4706-9BD2-9F42B05C96BC}"/>
+                <a16:creationId xmlns:a16="http://schemas.microsoft.com/office/drawing/2014/main" xmlns="" id="{F89C5665-4384-4706-9BD2-9F42B05C96BC}"/>
               </a:ext>
             </a:extLst>
           </p:cNvPr>
@@ -909,7 +909,7 @@
           <p:cNvPr id="6" name="Slide Number Placeholder 5">
             <a:extLst>
               <a:ext uri="{FF2B5EF4-FFF2-40B4-BE49-F238E27FC236}">
-                <a16:creationId xmlns:a16="http://schemas.microsoft.com/office/drawing/2014/main" id="{7DCAD73E-CAB3-4BA7-905E-D203691D0418}"/>
+                <a16:creationId xmlns:a16="http://schemas.microsoft.com/office/drawing/2014/main" xmlns="" id="{7DCAD73E-CAB3-4BA7-905E-D203691D0418}"/>
               </a:ext>
             </a:extLst>
           </p:cNvPr>
@@ -968,7 +968,7 @@
           <p:cNvPr id="2" name="Title 1">
             <a:extLst>
               <a:ext uri="{FF2B5EF4-FFF2-40B4-BE49-F238E27FC236}">
-                <a16:creationId xmlns:a16="http://schemas.microsoft.com/office/drawing/2014/main" id="{A9880706-F7FA-4EC3-A022-9D6C7CEC3692}"/>
+                <a16:creationId xmlns:a16="http://schemas.microsoft.com/office/drawing/2014/main" xmlns="" id="{A9880706-F7FA-4EC3-A022-9D6C7CEC3692}"/>
               </a:ext>
             </a:extLst>
           </p:cNvPr>
@@ -1005,7 +1005,7 @@
           <p:cNvPr id="3" name="Text Placeholder 2">
             <a:extLst>
               <a:ext uri="{FF2B5EF4-FFF2-40B4-BE49-F238E27FC236}">
-                <a16:creationId xmlns:a16="http://schemas.microsoft.com/office/drawing/2014/main" id="{FA8A65D0-3DF5-448D-82EC-A967682A0DED}"/>
+                <a16:creationId xmlns:a16="http://schemas.microsoft.com/office/drawing/2014/main" xmlns="" id="{FA8A65D0-3DF5-448D-82EC-A967682A0DED}"/>
               </a:ext>
             </a:extLst>
           </p:cNvPr>
@@ -1130,7 +1130,7 @@
           <p:cNvPr id="4" name="Date Placeholder 3">
             <a:extLst>
               <a:ext uri="{FF2B5EF4-FFF2-40B4-BE49-F238E27FC236}">
-                <a16:creationId xmlns:a16="http://schemas.microsoft.com/office/drawing/2014/main" id="{600EA68C-01A6-487D-9D6E-1D1B4EAC0440}"/>
+                <a16:creationId xmlns:a16="http://schemas.microsoft.com/office/drawing/2014/main" xmlns="" id="{600EA68C-01A6-487D-9D6E-1D1B4EAC0440}"/>
               </a:ext>
             </a:extLst>
           </p:cNvPr>
@@ -1148,7 +1148,7 @@
           <a:p>
             <a:fld id="{6C733091-19F0-4DD7-90FE-000B4789B4CF}" type="datetimeFigureOut">
               <a:rPr lang="en-US" smtClean="0"/>
-              <a:t>8/18/2021</a:t>
+              <a:t>8/19/2021</a:t>
             </a:fld>
             <a:endParaRPr lang="en-US"/>
           </a:p>
@@ -1159,7 +1159,7 @@
           <p:cNvPr id="5" name="Footer Placeholder 4">
             <a:extLst>
               <a:ext uri="{FF2B5EF4-FFF2-40B4-BE49-F238E27FC236}">
-                <a16:creationId xmlns:a16="http://schemas.microsoft.com/office/drawing/2014/main" id="{6E6527CB-4FFD-4569-A82C-5EDC311B2CF6}"/>
+                <a16:creationId xmlns:a16="http://schemas.microsoft.com/office/drawing/2014/main" xmlns="" id="{6E6527CB-4FFD-4569-A82C-5EDC311B2CF6}"/>
               </a:ext>
             </a:extLst>
           </p:cNvPr>
@@ -1184,7 +1184,7 @@
           <p:cNvPr id="6" name="Slide Number Placeholder 5">
             <a:extLst>
               <a:ext uri="{FF2B5EF4-FFF2-40B4-BE49-F238E27FC236}">
-                <a16:creationId xmlns:a16="http://schemas.microsoft.com/office/drawing/2014/main" id="{24B19E5B-5A98-4381-A01D-01F81FD65792}"/>
+                <a16:creationId xmlns:a16="http://schemas.microsoft.com/office/drawing/2014/main" xmlns="" id="{24B19E5B-5A98-4381-A01D-01F81FD65792}"/>
               </a:ext>
             </a:extLst>
           </p:cNvPr>
@@ -1243,7 +1243,7 @@
           <p:cNvPr id="2" name="Title 1">
             <a:extLst>
               <a:ext uri="{FF2B5EF4-FFF2-40B4-BE49-F238E27FC236}">
-                <a16:creationId xmlns:a16="http://schemas.microsoft.com/office/drawing/2014/main" id="{63228B71-E923-4431-B8D2-FAE724678940}"/>
+                <a16:creationId xmlns:a16="http://schemas.microsoft.com/office/drawing/2014/main" xmlns="" id="{63228B71-E923-4431-B8D2-FAE724678940}"/>
               </a:ext>
             </a:extLst>
           </p:cNvPr>
@@ -1271,7 +1271,7 @@
           <p:cNvPr id="3" name="Content Placeholder 2">
             <a:extLst>
               <a:ext uri="{FF2B5EF4-FFF2-40B4-BE49-F238E27FC236}">
-                <a16:creationId xmlns:a16="http://schemas.microsoft.com/office/drawing/2014/main" id="{B18895E9-B7FF-4A00-955B-206CF8C73E43}"/>
+                <a16:creationId xmlns:a16="http://schemas.microsoft.com/office/drawing/2014/main" xmlns="" id="{B18895E9-B7FF-4A00-955B-206CF8C73E43}"/>
               </a:ext>
             </a:extLst>
           </p:cNvPr>
@@ -1333,7 +1333,7 @@
           <p:cNvPr id="4" name="Content Placeholder 3">
             <a:extLst>
               <a:ext uri="{FF2B5EF4-FFF2-40B4-BE49-F238E27FC236}">
-                <a16:creationId xmlns:a16="http://schemas.microsoft.com/office/drawing/2014/main" id="{DA813955-E3B9-44BC-8E1D-139269C8B48A}"/>
+                <a16:creationId xmlns:a16="http://schemas.microsoft.com/office/drawing/2014/main" xmlns="" id="{DA813955-E3B9-44BC-8E1D-139269C8B48A}"/>
               </a:ext>
             </a:extLst>
           </p:cNvPr>
@@ -1395,7 +1395,7 @@
           <p:cNvPr id="5" name="Date Placeholder 4">
             <a:extLst>
               <a:ext uri="{FF2B5EF4-FFF2-40B4-BE49-F238E27FC236}">
-                <a16:creationId xmlns:a16="http://schemas.microsoft.com/office/drawing/2014/main" id="{7E9B8EF5-28D5-4C4E-A2AB-EEA30D75DAFE}"/>
+                <a16:creationId xmlns:a16="http://schemas.microsoft.com/office/drawing/2014/main" xmlns="" id="{7E9B8EF5-28D5-4C4E-A2AB-EEA30D75DAFE}"/>
               </a:ext>
             </a:extLst>
           </p:cNvPr>
@@ -1413,7 +1413,7 @@
           <a:p>
             <a:fld id="{6C733091-19F0-4DD7-90FE-000B4789B4CF}" type="datetimeFigureOut">
               <a:rPr lang="en-US" smtClean="0"/>
-              <a:t>8/18/2021</a:t>
+              <a:t>8/19/2021</a:t>
             </a:fld>
             <a:endParaRPr lang="en-US"/>
           </a:p>
@@ -1424,7 +1424,7 @@
           <p:cNvPr id="6" name="Footer Placeholder 5">
             <a:extLst>
               <a:ext uri="{FF2B5EF4-FFF2-40B4-BE49-F238E27FC236}">
-                <a16:creationId xmlns:a16="http://schemas.microsoft.com/office/drawing/2014/main" id="{5723E678-8CB4-4335-AA04-6BD391748717}"/>
+                <a16:creationId xmlns:a16="http://schemas.microsoft.com/office/drawing/2014/main" xmlns="" id="{5723E678-8CB4-4335-AA04-6BD391748717}"/>
               </a:ext>
             </a:extLst>
           </p:cNvPr>
@@ -1449,7 +1449,7 @@
           <p:cNvPr id="7" name="Slide Number Placeholder 6">
             <a:extLst>
               <a:ext uri="{FF2B5EF4-FFF2-40B4-BE49-F238E27FC236}">
-                <a16:creationId xmlns:a16="http://schemas.microsoft.com/office/drawing/2014/main" id="{887B5567-9F4D-4AE1-92D8-769C9F7EA4F0}"/>
+                <a16:creationId xmlns:a16="http://schemas.microsoft.com/office/drawing/2014/main" xmlns="" id="{887B5567-9F4D-4AE1-92D8-769C9F7EA4F0}"/>
               </a:ext>
             </a:extLst>
           </p:cNvPr>
@@ -1508,7 +1508,7 @@
           <p:cNvPr id="2" name="Title 1">
             <a:extLst>
               <a:ext uri="{FF2B5EF4-FFF2-40B4-BE49-F238E27FC236}">
-                <a16:creationId xmlns:a16="http://schemas.microsoft.com/office/drawing/2014/main" id="{A40320A9-7C0C-45B4-BF2B-3B53B5686EBB}"/>
+                <a16:creationId xmlns:a16="http://schemas.microsoft.com/office/drawing/2014/main" xmlns="" id="{A40320A9-7C0C-45B4-BF2B-3B53B5686EBB}"/>
               </a:ext>
             </a:extLst>
           </p:cNvPr>
@@ -1541,7 +1541,7 @@
           <p:cNvPr id="3" name="Text Placeholder 2">
             <a:extLst>
               <a:ext uri="{FF2B5EF4-FFF2-40B4-BE49-F238E27FC236}">
-                <a16:creationId xmlns:a16="http://schemas.microsoft.com/office/drawing/2014/main" id="{8C440DE1-7DD6-4B1C-B961-CD2079B51F03}"/>
+                <a16:creationId xmlns:a16="http://schemas.microsoft.com/office/drawing/2014/main" xmlns="" id="{8C440DE1-7DD6-4B1C-B961-CD2079B51F03}"/>
               </a:ext>
             </a:extLst>
           </p:cNvPr>
@@ -1612,7 +1612,7 @@
           <p:cNvPr id="4" name="Content Placeholder 3">
             <a:extLst>
               <a:ext uri="{FF2B5EF4-FFF2-40B4-BE49-F238E27FC236}">
-                <a16:creationId xmlns:a16="http://schemas.microsoft.com/office/drawing/2014/main" id="{6FAFE840-CC9A-4D89-B05F-159EF756B427}"/>
+                <a16:creationId xmlns:a16="http://schemas.microsoft.com/office/drawing/2014/main" xmlns="" id="{6FAFE840-CC9A-4D89-B05F-159EF756B427}"/>
               </a:ext>
             </a:extLst>
           </p:cNvPr>
@@ -1674,7 +1674,7 @@
           <p:cNvPr id="5" name="Text Placeholder 4">
             <a:extLst>
               <a:ext uri="{FF2B5EF4-FFF2-40B4-BE49-F238E27FC236}">
-                <a16:creationId xmlns:a16="http://schemas.microsoft.com/office/drawing/2014/main" id="{4B87AADC-3401-48C6-98F6-0AB60F6DF9BE}"/>
+                <a16:creationId xmlns:a16="http://schemas.microsoft.com/office/drawing/2014/main" xmlns="" id="{4B87AADC-3401-48C6-98F6-0AB60F6DF9BE}"/>
               </a:ext>
             </a:extLst>
           </p:cNvPr>
@@ -1745,7 +1745,7 @@
           <p:cNvPr id="6" name="Content Placeholder 5">
             <a:extLst>
               <a:ext uri="{FF2B5EF4-FFF2-40B4-BE49-F238E27FC236}">
-                <a16:creationId xmlns:a16="http://schemas.microsoft.com/office/drawing/2014/main" id="{34BCF1A4-FB52-4DCD-80BC-324BA41C33CD}"/>
+                <a16:creationId xmlns:a16="http://schemas.microsoft.com/office/drawing/2014/main" xmlns="" id="{34BCF1A4-FB52-4DCD-80BC-324BA41C33CD}"/>
               </a:ext>
             </a:extLst>
           </p:cNvPr>
@@ -1807,7 +1807,7 @@
           <p:cNvPr id="7" name="Date Placeholder 6">
             <a:extLst>
               <a:ext uri="{FF2B5EF4-FFF2-40B4-BE49-F238E27FC236}">
-                <a16:creationId xmlns:a16="http://schemas.microsoft.com/office/drawing/2014/main" id="{8CFD4208-60E7-48B1-8CD0-717D5E26B827}"/>
+                <a16:creationId xmlns:a16="http://schemas.microsoft.com/office/drawing/2014/main" xmlns="" id="{8CFD4208-60E7-48B1-8CD0-717D5E26B827}"/>
               </a:ext>
             </a:extLst>
           </p:cNvPr>
@@ -1825,7 +1825,7 @@
           <a:p>
             <a:fld id="{6C733091-19F0-4DD7-90FE-000B4789B4CF}" type="datetimeFigureOut">
               <a:rPr lang="en-US" smtClean="0"/>
-              <a:t>8/18/2021</a:t>
+              <a:t>8/19/2021</a:t>
             </a:fld>
             <a:endParaRPr lang="en-US"/>
           </a:p>
@@ -1836,7 +1836,7 @@
           <p:cNvPr id="8" name="Footer Placeholder 7">
             <a:extLst>
               <a:ext uri="{FF2B5EF4-FFF2-40B4-BE49-F238E27FC236}">
-                <a16:creationId xmlns:a16="http://schemas.microsoft.com/office/drawing/2014/main" id="{94E429D1-BEB1-4D8A-91F2-CD4F80157F8D}"/>
+                <a16:creationId xmlns:a16="http://schemas.microsoft.com/office/drawing/2014/main" xmlns="" id="{94E429D1-BEB1-4D8A-91F2-CD4F80157F8D}"/>
               </a:ext>
             </a:extLst>
           </p:cNvPr>
@@ -1861,7 +1861,7 @@
           <p:cNvPr id="9" name="Slide Number Placeholder 8">
             <a:extLst>
               <a:ext uri="{FF2B5EF4-FFF2-40B4-BE49-F238E27FC236}">
-                <a16:creationId xmlns:a16="http://schemas.microsoft.com/office/drawing/2014/main" id="{6F17C19C-8370-4118-A8FC-5DDA6F84230F}"/>
+                <a16:creationId xmlns:a16="http://schemas.microsoft.com/office/drawing/2014/main" xmlns="" id="{6F17C19C-8370-4118-A8FC-5DDA6F84230F}"/>
               </a:ext>
             </a:extLst>
           </p:cNvPr>
@@ -1920,7 +1920,7 @@
           <p:cNvPr id="2" name="Title 1">
             <a:extLst>
               <a:ext uri="{FF2B5EF4-FFF2-40B4-BE49-F238E27FC236}">
-                <a16:creationId xmlns:a16="http://schemas.microsoft.com/office/drawing/2014/main" id="{252CBF36-7F99-45A9-BC35-BD2EC260CBF0}"/>
+                <a16:creationId xmlns:a16="http://schemas.microsoft.com/office/drawing/2014/main" xmlns="" id="{252CBF36-7F99-45A9-BC35-BD2EC260CBF0}"/>
               </a:ext>
             </a:extLst>
           </p:cNvPr>
@@ -1948,7 +1948,7 @@
           <p:cNvPr id="3" name="Date Placeholder 2">
             <a:extLst>
               <a:ext uri="{FF2B5EF4-FFF2-40B4-BE49-F238E27FC236}">
-                <a16:creationId xmlns:a16="http://schemas.microsoft.com/office/drawing/2014/main" id="{0D6F5F83-F07E-4501-B86B-9F96CD43993C}"/>
+                <a16:creationId xmlns:a16="http://schemas.microsoft.com/office/drawing/2014/main" xmlns="" id="{0D6F5F83-F07E-4501-B86B-9F96CD43993C}"/>
               </a:ext>
             </a:extLst>
           </p:cNvPr>
@@ -1966,7 +1966,7 @@
           <a:p>
             <a:fld id="{6C733091-19F0-4DD7-90FE-000B4789B4CF}" type="datetimeFigureOut">
               <a:rPr lang="en-US" smtClean="0"/>
-              <a:t>8/18/2021</a:t>
+              <a:t>8/19/2021</a:t>
             </a:fld>
             <a:endParaRPr lang="en-US"/>
           </a:p>
@@ -1977,7 +1977,7 @@
           <p:cNvPr id="4" name="Footer Placeholder 3">
             <a:extLst>
               <a:ext uri="{FF2B5EF4-FFF2-40B4-BE49-F238E27FC236}">
-                <a16:creationId xmlns:a16="http://schemas.microsoft.com/office/drawing/2014/main" id="{2861989B-F8E9-41FD-8E16-687424BCC266}"/>
+                <a16:creationId xmlns:a16="http://schemas.microsoft.com/office/drawing/2014/main" xmlns="" id="{2861989B-F8E9-41FD-8E16-687424BCC266}"/>
               </a:ext>
             </a:extLst>
           </p:cNvPr>
@@ -2002,7 +2002,7 @@
           <p:cNvPr id="5" name="Slide Number Placeholder 4">
             <a:extLst>
               <a:ext uri="{FF2B5EF4-FFF2-40B4-BE49-F238E27FC236}">
-                <a16:creationId xmlns:a16="http://schemas.microsoft.com/office/drawing/2014/main" id="{2026B6D7-7832-4815-95CE-5CEC39502825}"/>
+                <a16:creationId xmlns:a16="http://schemas.microsoft.com/office/drawing/2014/main" xmlns="" id="{2026B6D7-7832-4815-95CE-5CEC39502825}"/>
               </a:ext>
             </a:extLst>
           </p:cNvPr>
@@ -2061,7 +2061,7 @@
           <p:cNvPr id="2" name="Date Placeholder 1">
             <a:extLst>
               <a:ext uri="{FF2B5EF4-FFF2-40B4-BE49-F238E27FC236}">
-                <a16:creationId xmlns:a16="http://schemas.microsoft.com/office/drawing/2014/main" id="{9877919A-C4B6-46FD-A08A-9A4B867FE01A}"/>
+                <a16:creationId xmlns:a16="http://schemas.microsoft.com/office/drawing/2014/main" xmlns="" id="{9877919A-C4B6-46FD-A08A-9A4B867FE01A}"/>
               </a:ext>
             </a:extLst>
           </p:cNvPr>
@@ -2079,7 +2079,7 @@
           <a:p>
             <a:fld id="{6C733091-19F0-4DD7-90FE-000B4789B4CF}" type="datetimeFigureOut">
               <a:rPr lang="en-US" smtClean="0"/>
-              <a:t>8/18/2021</a:t>
+              <a:t>8/19/2021</a:t>
             </a:fld>
             <a:endParaRPr lang="en-US"/>
           </a:p>
@@ -2090,7 +2090,7 @@
           <p:cNvPr id="3" name="Footer Placeholder 2">
             <a:extLst>
               <a:ext uri="{FF2B5EF4-FFF2-40B4-BE49-F238E27FC236}">
-                <a16:creationId xmlns:a16="http://schemas.microsoft.com/office/drawing/2014/main" id="{9118539E-383C-4F1C-86F2-14C533A7E9FB}"/>
+                <a16:creationId xmlns:a16="http://schemas.microsoft.com/office/drawing/2014/main" xmlns="" id="{9118539E-383C-4F1C-86F2-14C533A7E9FB}"/>
               </a:ext>
             </a:extLst>
           </p:cNvPr>
@@ -2115,7 +2115,7 @@
           <p:cNvPr id="4" name="Slide Number Placeholder 3">
             <a:extLst>
               <a:ext uri="{FF2B5EF4-FFF2-40B4-BE49-F238E27FC236}">
-                <a16:creationId xmlns:a16="http://schemas.microsoft.com/office/drawing/2014/main" id="{C9A6D4E1-CA83-4214-9942-9E4617AA89BF}"/>
+                <a16:creationId xmlns:a16="http://schemas.microsoft.com/office/drawing/2014/main" xmlns="" id="{C9A6D4E1-CA83-4214-9942-9E4617AA89BF}"/>
               </a:ext>
             </a:extLst>
           </p:cNvPr>
@@ -2174,7 +2174,7 @@
           <p:cNvPr id="2" name="Title 1">
             <a:extLst>
               <a:ext uri="{FF2B5EF4-FFF2-40B4-BE49-F238E27FC236}">
-                <a16:creationId xmlns:a16="http://schemas.microsoft.com/office/drawing/2014/main" id="{046EF9B5-7A2A-4225-8817-86D028D6950C}"/>
+                <a16:creationId xmlns:a16="http://schemas.microsoft.com/office/drawing/2014/main" xmlns="" id="{046EF9B5-7A2A-4225-8817-86D028D6950C}"/>
               </a:ext>
             </a:extLst>
           </p:cNvPr>
@@ -2211,7 +2211,7 @@
           <p:cNvPr id="3" name="Content Placeholder 2">
             <a:extLst>
               <a:ext uri="{FF2B5EF4-FFF2-40B4-BE49-F238E27FC236}">
-                <a16:creationId xmlns:a16="http://schemas.microsoft.com/office/drawing/2014/main" id="{8667C390-5297-41E8-A403-22856007B051}"/>
+                <a16:creationId xmlns:a16="http://schemas.microsoft.com/office/drawing/2014/main" xmlns="" id="{8667C390-5297-41E8-A403-22856007B051}"/>
               </a:ext>
             </a:extLst>
           </p:cNvPr>
@@ -2301,7 +2301,7 @@
           <p:cNvPr id="4" name="Text Placeholder 3">
             <a:extLst>
               <a:ext uri="{FF2B5EF4-FFF2-40B4-BE49-F238E27FC236}">
-                <a16:creationId xmlns:a16="http://schemas.microsoft.com/office/drawing/2014/main" id="{8D0D2F7D-D6CD-4AB1-A3EA-CBFD2A2B3703}"/>
+                <a16:creationId xmlns:a16="http://schemas.microsoft.com/office/drawing/2014/main" xmlns="" id="{8D0D2F7D-D6CD-4AB1-A3EA-CBFD2A2B3703}"/>
               </a:ext>
             </a:extLst>
           </p:cNvPr>
@@ -2372,7 +2372,7 @@
           <p:cNvPr id="5" name="Date Placeholder 4">
             <a:extLst>
               <a:ext uri="{FF2B5EF4-FFF2-40B4-BE49-F238E27FC236}">
-                <a16:creationId xmlns:a16="http://schemas.microsoft.com/office/drawing/2014/main" id="{E17A441D-4FA7-4110-BF24-165CD3C3DAD7}"/>
+                <a16:creationId xmlns:a16="http://schemas.microsoft.com/office/drawing/2014/main" xmlns="" id="{E17A441D-4FA7-4110-BF24-165CD3C3DAD7}"/>
               </a:ext>
             </a:extLst>
           </p:cNvPr>
@@ -2390,7 +2390,7 @@
           <a:p>
             <a:fld id="{6C733091-19F0-4DD7-90FE-000B4789B4CF}" type="datetimeFigureOut">
               <a:rPr lang="en-US" smtClean="0"/>
-              <a:t>8/18/2021</a:t>
+              <a:t>8/19/2021</a:t>
             </a:fld>
             <a:endParaRPr lang="en-US"/>
           </a:p>
@@ -2401,7 +2401,7 @@
           <p:cNvPr id="6" name="Footer Placeholder 5">
             <a:extLst>
               <a:ext uri="{FF2B5EF4-FFF2-40B4-BE49-F238E27FC236}">
-                <a16:creationId xmlns:a16="http://schemas.microsoft.com/office/drawing/2014/main" id="{346102C5-5AE3-43CF-A686-1AB72B0790AB}"/>
+                <a16:creationId xmlns:a16="http://schemas.microsoft.com/office/drawing/2014/main" xmlns="" id="{346102C5-5AE3-43CF-A686-1AB72B0790AB}"/>
               </a:ext>
             </a:extLst>
           </p:cNvPr>
@@ -2426,7 +2426,7 @@
           <p:cNvPr id="7" name="Slide Number Placeholder 6">
             <a:extLst>
               <a:ext uri="{FF2B5EF4-FFF2-40B4-BE49-F238E27FC236}">
-                <a16:creationId xmlns:a16="http://schemas.microsoft.com/office/drawing/2014/main" id="{5528B3F7-462C-4500-8836-B3E5CD8DA61A}"/>
+                <a16:creationId xmlns:a16="http://schemas.microsoft.com/office/drawing/2014/main" xmlns="" id="{5528B3F7-462C-4500-8836-B3E5CD8DA61A}"/>
               </a:ext>
             </a:extLst>
           </p:cNvPr>
@@ -2485,7 +2485,7 @@
           <p:cNvPr id="2" name="Title 1">
             <a:extLst>
               <a:ext uri="{FF2B5EF4-FFF2-40B4-BE49-F238E27FC236}">
-                <a16:creationId xmlns:a16="http://schemas.microsoft.com/office/drawing/2014/main" id="{4BA10E59-DA48-4690-A956-9EB8E4E11EE5}"/>
+                <a16:creationId xmlns:a16="http://schemas.microsoft.com/office/drawing/2014/main" xmlns="" id="{4BA10E59-DA48-4690-A956-9EB8E4E11EE5}"/>
               </a:ext>
             </a:extLst>
           </p:cNvPr>
@@ -2522,7 +2522,7 @@
           <p:cNvPr id="3" name="Picture Placeholder 2">
             <a:extLst>
               <a:ext uri="{FF2B5EF4-FFF2-40B4-BE49-F238E27FC236}">
-                <a16:creationId xmlns:a16="http://schemas.microsoft.com/office/drawing/2014/main" id="{AC7AFE1E-67D1-4106-97CA-98302D42CC4D}"/>
+                <a16:creationId xmlns:a16="http://schemas.microsoft.com/office/drawing/2014/main" xmlns="" id="{AC7AFE1E-67D1-4106-97CA-98302D42CC4D}"/>
               </a:ext>
             </a:extLst>
           </p:cNvPr>
@@ -2589,7 +2589,7 @@
           <p:cNvPr id="4" name="Text Placeholder 3">
             <a:extLst>
               <a:ext uri="{FF2B5EF4-FFF2-40B4-BE49-F238E27FC236}">
-                <a16:creationId xmlns:a16="http://schemas.microsoft.com/office/drawing/2014/main" id="{67D8D73B-3D4D-42A7-9A3C-1D508E8A9B45}"/>
+                <a16:creationId xmlns:a16="http://schemas.microsoft.com/office/drawing/2014/main" xmlns="" id="{67D8D73B-3D4D-42A7-9A3C-1D508E8A9B45}"/>
               </a:ext>
             </a:extLst>
           </p:cNvPr>
@@ -2660,7 +2660,7 @@
           <p:cNvPr id="5" name="Date Placeholder 4">
             <a:extLst>
               <a:ext uri="{FF2B5EF4-FFF2-40B4-BE49-F238E27FC236}">
-                <a16:creationId xmlns:a16="http://schemas.microsoft.com/office/drawing/2014/main" id="{48C8945E-A47A-42A2-9DF6-CA6D5002F65F}"/>
+                <a16:creationId xmlns:a16="http://schemas.microsoft.com/office/drawing/2014/main" xmlns="" id="{48C8945E-A47A-42A2-9DF6-CA6D5002F65F}"/>
               </a:ext>
             </a:extLst>
           </p:cNvPr>
@@ -2678,7 +2678,7 @@
           <a:p>
             <a:fld id="{6C733091-19F0-4DD7-90FE-000B4789B4CF}" type="datetimeFigureOut">
               <a:rPr lang="en-US" smtClean="0"/>
-              <a:t>8/18/2021</a:t>
+              <a:t>8/19/2021</a:t>
             </a:fld>
             <a:endParaRPr lang="en-US"/>
           </a:p>
@@ -2689,7 +2689,7 @@
           <p:cNvPr id="6" name="Footer Placeholder 5">
             <a:extLst>
               <a:ext uri="{FF2B5EF4-FFF2-40B4-BE49-F238E27FC236}">
-                <a16:creationId xmlns:a16="http://schemas.microsoft.com/office/drawing/2014/main" id="{EB000DB4-2747-4297-B400-42A539FBDB42}"/>
+                <a16:creationId xmlns:a16="http://schemas.microsoft.com/office/drawing/2014/main" xmlns="" id="{EB000DB4-2747-4297-B400-42A539FBDB42}"/>
               </a:ext>
             </a:extLst>
           </p:cNvPr>
@@ -2714,7 +2714,7 @@
           <p:cNvPr id="7" name="Slide Number Placeholder 6">
             <a:extLst>
               <a:ext uri="{FF2B5EF4-FFF2-40B4-BE49-F238E27FC236}">
-                <a16:creationId xmlns:a16="http://schemas.microsoft.com/office/drawing/2014/main" id="{5BAD9222-F141-4803-AF73-E2DD92E2ABBC}"/>
+                <a16:creationId xmlns:a16="http://schemas.microsoft.com/office/drawing/2014/main" xmlns="" id="{5BAD9222-F141-4803-AF73-E2DD92E2ABBC}"/>
               </a:ext>
             </a:extLst>
           </p:cNvPr>
@@ -2778,7 +2778,7 @@
           <p:cNvPr id="2" name="Title Placeholder 1">
             <a:extLst>
               <a:ext uri="{FF2B5EF4-FFF2-40B4-BE49-F238E27FC236}">
-                <a16:creationId xmlns:a16="http://schemas.microsoft.com/office/drawing/2014/main" id="{5BF9D404-795C-4EA4-AD01-26740519239C}"/>
+                <a16:creationId xmlns:a16="http://schemas.microsoft.com/office/drawing/2014/main" xmlns="" id="{5BF9D404-795C-4EA4-AD01-26740519239C}"/>
               </a:ext>
             </a:extLst>
           </p:cNvPr>
@@ -2816,7 +2816,7 @@
           <p:cNvPr id="3" name="Text Placeholder 2">
             <a:extLst>
               <a:ext uri="{FF2B5EF4-FFF2-40B4-BE49-F238E27FC236}">
-                <a16:creationId xmlns:a16="http://schemas.microsoft.com/office/drawing/2014/main" id="{DE3FEC7B-48F8-4348-9BC6-68F83B859EE9}"/>
+                <a16:creationId xmlns:a16="http://schemas.microsoft.com/office/drawing/2014/main" xmlns="" id="{DE3FEC7B-48F8-4348-9BC6-68F83B859EE9}"/>
               </a:ext>
             </a:extLst>
           </p:cNvPr>
@@ -2883,7 +2883,7 @@
           <p:cNvPr id="4" name="Date Placeholder 3">
             <a:extLst>
               <a:ext uri="{FF2B5EF4-FFF2-40B4-BE49-F238E27FC236}">
-                <a16:creationId xmlns:a16="http://schemas.microsoft.com/office/drawing/2014/main" id="{31CA1A1D-E2F5-4161-A025-7B911965C2FE}"/>
+                <a16:creationId xmlns:a16="http://schemas.microsoft.com/office/drawing/2014/main" xmlns="" id="{31CA1A1D-E2F5-4161-A025-7B911965C2FE}"/>
               </a:ext>
             </a:extLst>
           </p:cNvPr>
@@ -2919,7 +2919,7 @@
           <a:p>
             <a:fld id="{6C733091-19F0-4DD7-90FE-000B4789B4CF}" type="datetimeFigureOut">
               <a:rPr lang="en-US" smtClean="0"/>
-              <a:t>8/18/2021</a:t>
+              <a:t>8/19/2021</a:t>
             </a:fld>
             <a:endParaRPr lang="en-US"/>
           </a:p>
@@ -2930,7 +2930,7 @@
           <p:cNvPr id="5" name="Footer Placeholder 4">
             <a:extLst>
               <a:ext uri="{FF2B5EF4-FFF2-40B4-BE49-F238E27FC236}">
-                <a16:creationId xmlns:a16="http://schemas.microsoft.com/office/drawing/2014/main" id="{43C7B926-18F3-4C13-AB92-764E10D324FB}"/>
+                <a16:creationId xmlns:a16="http://schemas.microsoft.com/office/drawing/2014/main" xmlns="" id="{43C7B926-18F3-4C13-AB92-764E10D324FB}"/>
               </a:ext>
             </a:extLst>
           </p:cNvPr>
@@ -2973,7 +2973,7 @@
           <p:cNvPr id="6" name="Slide Number Placeholder 5">
             <a:extLst>
               <a:ext uri="{FF2B5EF4-FFF2-40B4-BE49-F238E27FC236}">
-                <a16:creationId xmlns:a16="http://schemas.microsoft.com/office/drawing/2014/main" id="{734FA846-3BF6-46FD-80CF-34B300D244C0}"/>
+                <a16:creationId xmlns:a16="http://schemas.microsoft.com/office/drawing/2014/main" xmlns="" id="{734FA846-3BF6-46FD-80CF-34B300D244C0}"/>
               </a:ext>
             </a:extLst>
           </p:cNvPr>
@@ -3927,7 +3927,7 @@
           <p:cNvPr id="11" name="TextBox 10">
             <a:extLst>
               <a:ext uri="{FF2B5EF4-FFF2-40B4-BE49-F238E27FC236}">
-                <a16:creationId xmlns:a16="http://schemas.microsoft.com/office/drawing/2014/main" id="{E0BBD6C8-C8F2-40C5-AA64-85961A11ADC2}"/>
+                <a16:creationId xmlns:a16="http://schemas.microsoft.com/office/drawing/2014/main" xmlns="" id="{E0BBD6C8-C8F2-40C5-AA64-85961A11ADC2}"/>
               </a:ext>
             </a:extLst>
           </p:cNvPr>
@@ -4055,7 +4055,7 @@
           <p:cNvPr id="19" name="TextBox 18">
             <a:extLst>
               <a:ext uri="{FF2B5EF4-FFF2-40B4-BE49-F238E27FC236}">
-                <a16:creationId xmlns:a16="http://schemas.microsoft.com/office/drawing/2014/main" id="{E0BBD6C8-C8F2-40C5-AA64-85961A11ADC2}"/>
+                <a16:creationId xmlns:a16="http://schemas.microsoft.com/office/drawing/2014/main" xmlns="" id="{E0BBD6C8-C8F2-40C5-AA64-85961A11ADC2}"/>
               </a:ext>
             </a:extLst>
           </p:cNvPr>
@@ -4177,7 +4177,7 @@
           <p:cNvPr id="23" name="TextBox 22">
             <a:extLst>
               <a:ext uri="{FF2B5EF4-FFF2-40B4-BE49-F238E27FC236}">
-                <a16:creationId xmlns:a16="http://schemas.microsoft.com/office/drawing/2014/main" id="{E0BBD6C8-C8F2-40C5-AA64-85961A11ADC2}"/>
+                <a16:creationId xmlns:a16="http://schemas.microsoft.com/office/drawing/2014/main" xmlns="" id="{E0BBD6C8-C8F2-40C5-AA64-85961A11ADC2}"/>
               </a:ext>
             </a:extLst>
           </p:cNvPr>
@@ -4297,7 +4297,7 @@
           <p:cNvPr id="28" name="TextBox 27">
             <a:extLst>
               <a:ext uri="{FF2B5EF4-FFF2-40B4-BE49-F238E27FC236}">
-                <a16:creationId xmlns:a16="http://schemas.microsoft.com/office/drawing/2014/main" id="{E0BBD6C8-C8F2-40C5-AA64-85961A11ADC2}"/>
+                <a16:creationId xmlns:a16="http://schemas.microsoft.com/office/drawing/2014/main" xmlns="" id="{E0BBD6C8-C8F2-40C5-AA64-85961A11ADC2}"/>
               </a:ext>
             </a:extLst>
           </p:cNvPr>
@@ -4426,7 +4426,7 @@
           <p:cNvPr id="34" name="TextBox 33">
             <a:extLst>
               <a:ext uri="{FF2B5EF4-FFF2-40B4-BE49-F238E27FC236}">
-                <a16:creationId xmlns:a16="http://schemas.microsoft.com/office/drawing/2014/main" id="{E0BBD6C8-C8F2-40C5-AA64-85961A11ADC2}"/>
+                <a16:creationId xmlns:a16="http://schemas.microsoft.com/office/drawing/2014/main" xmlns="" id="{E0BBD6C8-C8F2-40C5-AA64-85961A11ADC2}"/>
               </a:ext>
             </a:extLst>
           </p:cNvPr>
@@ -4558,7 +4558,7 @@
           <p:cNvPr id="38" name="TextBox 37">
             <a:extLst>
               <a:ext uri="{FF2B5EF4-FFF2-40B4-BE49-F238E27FC236}">
-                <a16:creationId xmlns:a16="http://schemas.microsoft.com/office/drawing/2014/main" id="{E0BBD6C8-C8F2-40C5-AA64-85961A11ADC2}"/>
+                <a16:creationId xmlns:a16="http://schemas.microsoft.com/office/drawing/2014/main" xmlns="" id="{E0BBD6C8-C8F2-40C5-AA64-85961A11ADC2}"/>
               </a:ext>
             </a:extLst>
           </p:cNvPr>
@@ -4728,7 +4728,7 @@
           <p:cNvPr id="44" name="TextBox 43">
             <a:extLst>
               <a:ext uri="{FF2B5EF4-FFF2-40B4-BE49-F238E27FC236}">
-                <a16:creationId xmlns:a16="http://schemas.microsoft.com/office/drawing/2014/main" id="{E0BBD6C8-C8F2-40C5-AA64-85961A11ADC2}"/>
+                <a16:creationId xmlns:a16="http://schemas.microsoft.com/office/drawing/2014/main" xmlns="" id="{E0BBD6C8-C8F2-40C5-AA64-85961A11ADC2}"/>
               </a:ext>
             </a:extLst>
           </p:cNvPr>
@@ -4763,7 +4763,7 @@
           <p:cNvPr id="45" name="TextBox 44">
             <a:extLst>
               <a:ext uri="{FF2B5EF4-FFF2-40B4-BE49-F238E27FC236}">
-                <a16:creationId xmlns:a16="http://schemas.microsoft.com/office/drawing/2014/main" id="{E0BBD6C8-C8F2-40C5-AA64-85961A11ADC2}"/>
+                <a16:creationId xmlns:a16="http://schemas.microsoft.com/office/drawing/2014/main" xmlns="" id="{E0BBD6C8-C8F2-40C5-AA64-85961A11ADC2}"/>
               </a:ext>
             </a:extLst>
           </p:cNvPr>
@@ -4798,7 +4798,7 @@
           <p:cNvPr id="26" name="TextBox 25">
             <a:extLst>
               <a:ext uri="{FF2B5EF4-FFF2-40B4-BE49-F238E27FC236}">
-                <a16:creationId xmlns:a16="http://schemas.microsoft.com/office/drawing/2014/main" id="{70BF22D6-D5A2-4CCC-8E2D-329E25668556}"/>
+                <a16:creationId xmlns:a16="http://schemas.microsoft.com/office/drawing/2014/main" xmlns="" id="{70BF22D6-D5A2-4CCC-8E2D-329E25668556}"/>
               </a:ext>
             </a:extLst>
           </p:cNvPr>
@@ -5007,7 +5007,7 @@
           <p:cNvPr id="11" name="TextBox 10">
             <a:extLst>
               <a:ext uri="{FF2B5EF4-FFF2-40B4-BE49-F238E27FC236}">
-                <a16:creationId xmlns:a16="http://schemas.microsoft.com/office/drawing/2014/main" id="{E0BBD6C8-C8F2-40C5-AA64-85961A11ADC2}"/>
+                <a16:creationId xmlns:a16="http://schemas.microsoft.com/office/drawing/2014/main" xmlns="" id="{E0BBD6C8-C8F2-40C5-AA64-85961A11ADC2}"/>
               </a:ext>
             </a:extLst>
           </p:cNvPr>
@@ -5129,7 +5129,7 @@
           <p:cNvPr id="89" name="Rectangle 88">
             <a:extLst>
               <a:ext uri="{FF2B5EF4-FFF2-40B4-BE49-F238E27FC236}">
-                <a16:creationId xmlns:a16="http://schemas.microsoft.com/office/drawing/2014/main" id="{EED827AB-78FC-41AC-8676-30DA25D7C5FC}"/>
+                <a16:creationId xmlns:a16="http://schemas.microsoft.com/office/drawing/2014/main" xmlns="" id="{EED827AB-78FC-41AC-8676-30DA25D7C5FC}"/>
               </a:ext>
             </a:extLst>
           </p:cNvPr>
@@ -5207,7 +5207,7 @@
           <p:cNvPr id="62" name="Rectangle 61">
             <a:extLst>
               <a:ext uri="{FF2B5EF4-FFF2-40B4-BE49-F238E27FC236}">
-                <a16:creationId xmlns:a16="http://schemas.microsoft.com/office/drawing/2014/main" id="{C3FE7107-D2B1-4448-B03A-F2CE9B45CFD6}"/>
+                <a16:creationId xmlns:a16="http://schemas.microsoft.com/office/drawing/2014/main" xmlns="" id="{C3FE7107-D2B1-4448-B03A-F2CE9B45CFD6}"/>
               </a:ext>
             </a:extLst>
           </p:cNvPr>
@@ -5271,7 +5271,7 @@
           <p:cNvPr id="61" name="Rectangle 60">
             <a:extLst>
               <a:ext uri="{FF2B5EF4-FFF2-40B4-BE49-F238E27FC236}">
-                <a16:creationId xmlns:a16="http://schemas.microsoft.com/office/drawing/2014/main" id="{2F7B40FD-C5BA-431D-AE99-1CB70F1BAB88}"/>
+                <a16:creationId xmlns:a16="http://schemas.microsoft.com/office/drawing/2014/main" xmlns="" id="{2F7B40FD-C5BA-431D-AE99-1CB70F1BAB88}"/>
               </a:ext>
             </a:extLst>
           </p:cNvPr>
@@ -5330,7 +5330,7 @@
           <p:cNvPr id="60" name="Rectangle 59">
             <a:extLst>
               <a:ext uri="{FF2B5EF4-FFF2-40B4-BE49-F238E27FC236}">
-                <a16:creationId xmlns:a16="http://schemas.microsoft.com/office/drawing/2014/main" id="{CF3E4DE9-C6F2-4C11-BE7F-2753CDEFE535}"/>
+                <a16:creationId xmlns:a16="http://schemas.microsoft.com/office/drawing/2014/main" xmlns="" id="{CF3E4DE9-C6F2-4C11-BE7F-2753CDEFE535}"/>
               </a:ext>
             </a:extLst>
           </p:cNvPr>
@@ -5714,7 +5714,7 @@
           <p:cNvPr id="19" name="TextBox 18">
             <a:extLst>
               <a:ext uri="{FF2B5EF4-FFF2-40B4-BE49-F238E27FC236}">
-                <a16:creationId xmlns:a16="http://schemas.microsoft.com/office/drawing/2014/main" id="{E0BBD6C8-C8F2-40C5-AA64-85961A11ADC2}"/>
+                <a16:creationId xmlns:a16="http://schemas.microsoft.com/office/drawing/2014/main" xmlns="" id="{E0BBD6C8-C8F2-40C5-AA64-85961A11ADC2}"/>
               </a:ext>
             </a:extLst>
           </p:cNvPr>
@@ -5844,7 +5844,7 @@
           <p:cNvPr id="23" name="TextBox 22">
             <a:extLst>
               <a:ext uri="{FF2B5EF4-FFF2-40B4-BE49-F238E27FC236}">
-                <a16:creationId xmlns:a16="http://schemas.microsoft.com/office/drawing/2014/main" id="{E0BBD6C8-C8F2-40C5-AA64-85961A11ADC2}"/>
+                <a16:creationId xmlns:a16="http://schemas.microsoft.com/office/drawing/2014/main" xmlns="" id="{E0BBD6C8-C8F2-40C5-AA64-85961A11ADC2}"/>
               </a:ext>
             </a:extLst>
           </p:cNvPr>
@@ -5961,7 +5961,7 @@
           <p:cNvPr id="28" name="TextBox 27">
             <a:extLst>
               <a:ext uri="{FF2B5EF4-FFF2-40B4-BE49-F238E27FC236}">
-                <a16:creationId xmlns:a16="http://schemas.microsoft.com/office/drawing/2014/main" id="{E0BBD6C8-C8F2-40C5-AA64-85961A11ADC2}"/>
+                <a16:creationId xmlns:a16="http://schemas.microsoft.com/office/drawing/2014/main" xmlns="" id="{E0BBD6C8-C8F2-40C5-AA64-85961A11ADC2}"/>
               </a:ext>
             </a:extLst>
           </p:cNvPr>
@@ -6085,7 +6085,7 @@
           <p:cNvPr id="34" name="TextBox 33">
             <a:extLst>
               <a:ext uri="{FF2B5EF4-FFF2-40B4-BE49-F238E27FC236}">
-                <a16:creationId xmlns:a16="http://schemas.microsoft.com/office/drawing/2014/main" id="{E0BBD6C8-C8F2-40C5-AA64-85961A11ADC2}"/>
+                <a16:creationId xmlns:a16="http://schemas.microsoft.com/office/drawing/2014/main" xmlns="" id="{E0BBD6C8-C8F2-40C5-AA64-85961A11ADC2}"/>
               </a:ext>
             </a:extLst>
           </p:cNvPr>
@@ -6211,7 +6211,7 @@
           <p:cNvPr id="38" name="TextBox 37">
             <a:extLst>
               <a:ext uri="{FF2B5EF4-FFF2-40B4-BE49-F238E27FC236}">
-                <a16:creationId xmlns:a16="http://schemas.microsoft.com/office/drawing/2014/main" id="{E0BBD6C8-C8F2-40C5-AA64-85961A11ADC2}"/>
+                <a16:creationId xmlns:a16="http://schemas.microsoft.com/office/drawing/2014/main" xmlns="" id="{E0BBD6C8-C8F2-40C5-AA64-85961A11ADC2}"/>
               </a:ext>
             </a:extLst>
           </p:cNvPr>
@@ -6374,7 +6374,7 @@
           <p:cNvPr id="44" name="TextBox 43">
             <a:extLst>
               <a:ext uri="{FF2B5EF4-FFF2-40B4-BE49-F238E27FC236}">
-                <a16:creationId xmlns:a16="http://schemas.microsoft.com/office/drawing/2014/main" id="{E0BBD6C8-C8F2-40C5-AA64-85961A11ADC2}"/>
+                <a16:creationId xmlns:a16="http://schemas.microsoft.com/office/drawing/2014/main" xmlns="" id="{E0BBD6C8-C8F2-40C5-AA64-85961A11ADC2}"/>
               </a:ext>
             </a:extLst>
           </p:cNvPr>
@@ -6409,7 +6409,7 @@
           <p:cNvPr id="45" name="TextBox 44">
             <a:extLst>
               <a:ext uri="{FF2B5EF4-FFF2-40B4-BE49-F238E27FC236}">
-                <a16:creationId xmlns:a16="http://schemas.microsoft.com/office/drawing/2014/main" id="{E0BBD6C8-C8F2-40C5-AA64-85961A11ADC2}"/>
+                <a16:creationId xmlns:a16="http://schemas.microsoft.com/office/drawing/2014/main" xmlns="" id="{E0BBD6C8-C8F2-40C5-AA64-85961A11ADC2}"/>
               </a:ext>
             </a:extLst>
           </p:cNvPr>
@@ -6444,7 +6444,7 @@
           <p:cNvPr id="26" name="TextBox 25">
             <a:extLst>
               <a:ext uri="{FF2B5EF4-FFF2-40B4-BE49-F238E27FC236}">
-                <a16:creationId xmlns:a16="http://schemas.microsoft.com/office/drawing/2014/main" id="{6C45E26E-8FEE-4439-A34B-789237C9C62C}"/>
+                <a16:creationId xmlns:a16="http://schemas.microsoft.com/office/drawing/2014/main" xmlns="" id="{6C45E26E-8FEE-4439-A34B-789237C9C62C}"/>
               </a:ext>
             </a:extLst>
           </p:cNvPr>
@@ -6479,7 +6479,7 @@
           <p:cNvPr id="31" name="Rectangle 30">
             <a:extLst>
               <a:ext uri="{FF2B5EF4-FFF2-40B4-BE49-F238E27FC236}">
-                <a16:creationId xmlns:a16="http://schemas.microsoft.com/office/drawing/2014/main" id="{6D396BFC-10E0-4935-903B-EDC457BD1755}"/>
+                <a16:creationId xmlns:a16="http://schemas.microsoft.com/office/drawing/2014/main" xmlns="" id="{6D396BFC-10E0-4935-903B-EDC457BD1755}"/>
               </a:ext>
             </a:extLst>
           </p:cNvPr>
@@ -6539,7 +6539,7 @@
           <p:cNvPr id="32" name="Rectangle 31">
             <a:extLst>
               <a:ext uri="{FF2B5EF4-FFF2-40B4-BE49-F238E27FC236}">
-                <a16:creationId xmlns:a16="http://schemas.microsoft.com/office/drawing/2014/main" id="{02A645C8-F11F-438D-92DC-F6FCCA5ECFB8}"/>
+                <a16:creationId xmlns:a16="http://schemas.microsoft.com/office/drawing/2014/main" xmlns="" id="{02A645C8-F11F-438D-92DC-F6FCCA5ECFB8}"/>
               </a:ext>
             </a:extLst>
           </p:cNvPr>
@@ -6599,7 +6599,7 @@
           <p:cNvPr id="12" name="Straight Arrow Connector 11">
             <a:extLst>
               <a:ext uri="{FF2B5EF4-FFF2-40B4-BE49-F238E27FC236}">
-                <a16:creationId xmlns:a16="http://schemas.microsoft.com/office/drawing/2014/main" id="{FF2076CA-F897-4293-B6CD-7408EB452156}"/>
+                <a16:creationId xmlns:a16="http://schemas.microsoft.com/office/drawing/2014/main" xmlns="" id="{FF2076CA-F897-4293-B6CD-7408EB452156}"/>
               </a:ext>
             </a:extLst>
           </p:cNvPr>
@@ -6642,7 +6642,7 @@
           <p:cNvPr id="14" name="Straight Arrow Connector 13">
             <a:extLst>
               <a:ext uri="{FF2B5EF4-FFF2-40B4-BE49-F238E27FC236}">
-                <a16:creationId xmlns:a16="http://schemas.microsoft.com/office/drawing/2014/main" id="{5C625B7B-4A1E-46C5-9082-4FEC89B30DA9}"/>
+                <a16:creationId xmlns:a16="http://schemas.microsoft.com/office/drawing/2014/main" xmlns="" id="{5C625B7B-4A1E-46C5-9082-4FEC89B30DA9}"/>
               </a:ext>
             </a:extLst>
           </p:cNvPr>
@@ -6685,7 +6685,7 @@
           <p:cNvPr id="65" name="Straight Arrow Connector 64">
             <a:extLst>
               <a:ext uri="{FF2B5EF4-FFF2-40B4-BE49-F238E27FC236}">
-                <a16:creationId xmlns:a16="http://schemas.microsoft.com/office/drawing/2014/main" id="{C1C9B843-1D11-4D9F-8CBF-AE00E90AA070}"/>
+                <a16:creationId xmlns:a16="http://schemas.microsoft.com/office/drawing/2014/main" xmlns="" id="{C1C9B843-1D11-4D9F-8CBF-AE00E90AA070}"/>
               </a:ext>
             </a:extLst>
           </p:cNvPr>
@@ -6727,7 +6727,7 @@
           <p:cNvPr id="66" name="TextBox 65">
             <a:extLst>
               <a:ext uri="{FF2B5EF4-FFF2-40B4-BE49-F238E27FC236}">
-                <a16:creationId xmlns:a16="http://schemas.microsoft.com/office/drawing/2014/main" id="{5E4B2700-0522-40EF-B035-166AA1C17D76}"/>
+                <a16:creationId xmlns:a16="http://schemas.microsoft.com/office/drawing/2014/main" xmlns="" id="{5E4B2700-0522-40EF-B035-166AA1C17D76}"/>
               </a:ext>
             </a:extLst>
           </p:cNvPr>
@@ -6851,7 +6851,7 @@
           <p:cNvPr id="48" name="TextBox 47">
             <a:extLst>
               <a:ext uri="{FF2B5EF4-FFF2-40B4-BE49-F238E27FC236}">
-                <a16:creationId xmlns:a16="http://schemas.microsoft.com/office/drawing/2014/main" id="{E0BBD6C8-C8F2-40C5-AA64-85961A11ADC2}"/>
+                <a16:creationId xmlns:a16="http://schemas.microsoft.com/office/drawing/2014/main" xmlns="" id="{E0BBD6C8-C8F2-40C5-AA64-85961A11ADC2}"/>
               </a:ext>
             </a:extLst>
           </p:cNvPr>
@@ -6886,7 +6886,7 @@
           <p:cNvPr id="52" name="Rectangle 51">
             <a:extLst>
               <a:ext uri="{FF2B5EF4-FFF2-40B4-BE49-F238E27FC236}">
-                <a16:creationId xmlns:a16="http://schemas.microsoft.com/office/drawing/2014/main" id="{21B869D6-66CB-4B38-975F-B7FEB6AA9B13}"/>
+                <a16:creationId xmlns:a16="http://schemas.microsoft.com/office/drawing/2014/main" xmlns="" id="{21B869D6-66CB-4B38-975F-B7FEB6AA9B13}"/>
               </a:ext>
             </a:extLst>
           </p:cNvPr>
@@ -7007,7 +7007,7 @@
           <p:cNvPr id="58" name="TextBox 57">
             <a:extLst>
               <a:ext uri="{FF2B5EF4-FFF2-40B4-BE49-F238E27FC236}">
-                <a16:creationId xmlns:a16="http://schemas.microsoft.com/office/drawing/2014/main" id="{E0BBD6C8-C8F2-40C5-AA64-85961A11ADC2}"/>
+                <a16:creationId xmlns:a16="http://schemas.microsoft.com/office/drawing/2014/main" xmlns="" id="{E0BBD6C8-C8F2-40C5-AA64-85961A11ADC2}"/>
               </a:ext>
             </a:extLst>
           </p:cNvPr>
@@ -7115,7 +7115,7 @@
           <p:cNvPr id="94" name="TextBox 93">
             <a:extLst>
               <a:ext uri="{FF2B5EF4-FFF2-40B4-BE49-F238E27FC236}">
-                <a16:creationId xmlns:a16="http://schemas.microsoft.com/office/drawing/2014/main" id="{E0BBD6C8-C8F2-40C5-AA64-85961A11ADC2}"/>
+                <a16:creationId xmlns:a16="http://schemas.microsoft.com/office/drawing/2014/main" xmlns="" id="{E0BBD6C8-C8F2-40C5-AA64-85961A11ADC2}"/>
               </a:ext>
             </a:extLst>
           </p:cNvPr>
@@ -7150,7 +7150,7 @@
           <p:cNvPr id="95" name="TextBox 94">
             <a:extLst>
               <a:ext uri="{FF2B5EF4-FFF2-40B4-BE49-F238E27FC236}">
-                <a16:creationId xmlns:a16="http://schemas.microsoft.com/office/drawing/2014/main" id="{E0BBD6C8-C8F2-40C5-AA64-85961A11ADC2}"/>
+                <a16:creationId xmlns:a16="http://schemas.microsoft.com/office/drawing/2014/main" xmlns="" id="{E0BBD6C8-C8F2-40C5-AA64-85961A11ADC2}"/>
               </a:ext>
             </a:extLst>
           </p:cNvPr>
@@ -7185,7 +7185,7 @@
           <p:cNvPr id="49" name="Rectangle 48">
             <a:extLst>
               <a:ext uri="{FF2B5EF4-FFF2-40B4-BE49-F238E27FC236}">
-                <a16:creationId xmlns:a16="http://schemas.microsoft.com/office/drawing/2014/main" id="{02A645C8-F11F-438D-92DC-F6FCCA5ECFB8}"/>
+                <a16:creationId xmlns:a16="http://schemas.microsoft.com/office/drawing/2014/main" xmlns="" id="{02A645C8-F11F-438D-92DC-F6FCCA5ECFB8}"/>
               </a:ext>
             </a:extLst>
           </p:cNvPr>
@@ -7282,7 +7282,7 @@
           <p:cNvPr id="57" name="Rectangle 56">
             <a:extLst>
               <a:ext uri="{FF2B5EF4-FFF2-40B4-BE49-F238E27FC236}">
-                <a16:creationId xmlns:a16="http://schemas.microsoft.com/office/drawing/2014/main" id="{93FBA679-F71B-47BD-BE29-21E7C2262CEB}"/>
+                <a16:creationId xmlns:a16="http://schemas.microsoft.com/office/drawing/2014/main" xmlns="" id="{93FBA679-F71B-47BD-BE29-21E7C2262CEB}"/>
               </a:ext>
             </a:extLst>
           </p:cNvPr>
@@ -7392,7 +7392,7 @@
           <p:cNvPr id="59" name="TextBox 58">
             <a:extLst>
               <a:ext uri="{FF2B5EF4-FFF2-40B4-BE49-F238E27FC236}">
-                <a16:creationId xmlns:a16="http://schemas.microsoft.com/office/drawing/2014/main" id="{5E4B2700-0522-40EF-B035-166AA1C17D76}"/>
+                <a16:creationId xmlns:a16="http://schemas.microsoft.com/office/drawing/2014/main" xmlns="" id="{5E4B2700-0522-40EF-B035-166AA1C17D76}"/>
               </a:ext>
             </a:extLst>
           </p:cNvPr>
@@ -7723,7 +7723,7 @@
           <p:cNvPr id="19" name="TextBox 18">
             <a:extLst>
               <a:ext uri="{FF2B5EF4-FFF2-40B4-BE49-F238E27FC236}">
-                <a16:creationId xmlns:a16="http://schemas.microsoft.com/office/drawing/2014/main" id="{E0BBD6C8-C8F2-40C5-AA64-85961A11ADC2}"/>
+                <a16:creationId xmlns:a16="http://schemas.microsoft.com/office/drawing/2014/main" xmlns="" id="{E0BBD6C8-C8F2-40C5-AA64-85961A11ADC2}"/>
               </a:ext>
             </a:extLst>
           </p:cNvPr>
@@ -7849,7 +7849,7 @@
           <p:cNvPr id="23" name="TextBox 22">
             <a:extLst>
               <a:ext uri="{FF2B5EF4-FFF2-40B4-BE49-F238E27FC236}">
-                <a16:creationId xmlns:a16="http://schemas.microsoft.com/office/drawing/2014/main" id="{E0BBD6C8-C8F2-40C5-AA64-85961A11ADC2}"/>
+                <a16:creationId xmlns:a16="http://schemas.microsoft.com/office/drawing/2014/main" xmlns="" id="{E0BBD6C8-C8F2-40C5-AA64-85961A11ADC2}"/>
               </a:ext>
             </a:extLst>
           </p:cNvPr>
@@ -7966,7 +7966,7 @@
           <p:cNvPr id="28" name="TextBox 27">
             <a:extLst>
               <a:ext uri="{FF2B5EF4-FFF2-40B4-BE49-F238E27FC236}">
-                <a16:creationId xmlns:a16="http://schemas.microsoft.com/office/drawing/2014/main" id="{E0BBD6C8-C8F2-40C5-AA64-85961A11ADC2}"/>
+                <a16:creationId xmlns:a16="http://schemas.microsoft.com/office/drawing/2014/main" xmlns="" id="{E0BBD6C8-C8F2-40C5-AA64-85961A11ADC2}"/>
               </a:ext>
             </a:extLst>
           </p:cNvPr>
@@ -8091,7 +8091,7 @@
           <p:cNvPr id="34" name="TextBox 33">
             <a:extLst>
               <a:ext uri="{FF2B5EF4-FFF2-40B4-BE49-F238E27FC236}">
-                <a16:creationId xmlns:a16="http://schemas.microsoft.com/office/drawing/2014/main" id="{E0BBD6C8-C8F2-40C5-AA64-85961A11ADC2}"/>
+                <a16:creationId xmlns:a16="http://schemas.microsoft.com/office/drawing/2014/main" xmlns="" id="{E0BBD6C8-C8F2-40C5-AA64-85961A11ADC2}"/>
               </a:ext>
             </a:extLst>
           </p:cNvPr>
@@ -8217,7 +8217,7 @@
           <p:cNvPr id="38" name="TextBox 37">
             <a:extLst>
               <a:ext uri="{FF2B5EF4-FFF2-40B4-BE49-F238E27FC236}">
-                <a16:creationId xmlns:a16="http://schemas.microsoft.com/office/drawing/2014/main" id="{E0BBD6C8-C8F2-40C5-AA64-85961A11ADC2}"/>
+                <a16:creationId xmlns:a16="http://schemas.microsoft.com/office/drawing/2014/main" xmlns="" id="{E0BBD6C8-C8F2-40C5-AA64-85961A11ADC2}"/>
               </a:ext>
             </a:extLst>
           </p:cNvPr>
@@ -8387,7 +8387,7 @@
           <p:cNvPr id="44" name="TextBox 43">
             <a:extLst>
               <a:ext uri="{FF2B5EF4-FFF2-40B4-BE49-F238E27FC236}">
-                <a16:creationId xmlns:a16="http://schemas.microsoft.com/office/drawing/2014/main" id="{E0BBD6C8-C8F2-40C5-AA64-85961A11ADC2}"/>
+                <a16:creationId xmlns:a16="http://schemas.microsoft.com/office/drawing/2014/main" xmlns="" id="{E0BBD6C8-C8F2-40C5-AA64-85961A11ADC2}"/>
               </a:ext>
             </a:extLst>
           </p:cNvPr>
@@ -8422,7 +8422,7 @@
           <p:cNvPr id="45" name="TextBox 44">
             <a:extLst>
               <a:ext uri="{FF2B5EF4-FFF2-40B4-BE49-F238E27FC236}">
-                <a16:creationId xmlns:a16="http://schemas.microsoft.com/office/drawing/2014/main" id="{E0BBD6C8-C8F2-40C5-AA64-85961A11ADC2}"/>
+                <a16:creationId xmlns:a16="http://schemas.microsoft.com/office/drawing/2014/main" xmlns="" id="{E0BBD6C8-C8F2-40C5-AA64-85961A11ADC2}"/>
               </a:ext>
             </a:extLst>
           </p:cNvPr>
@@ -8457,7 +8457,7 @@
           <p:cNvPr id="26" name="TextBox 25">
             <a:extLst>
               <a:ext uri="{FF2B5EF4-FFF2-40B4-BE49-F238E27FC236}">
-                <a16:creationId xmlns:a16="http://schemas.microsoft.com/office/drawing/2014/main" id="{6C45E26E-8FEE-4439-A34B-789237C9C62C}"/>
+                <a16:creationId xmlns:a16="http://schemas.microsoft.com/office/drawing/2014/main" xmlns="" id="{6C45E26E-8FEE-4439-A34B-789237C9C62C}"/>
               </a:ext>
             </a:extLst>
           </p:cNvPr>
@@ -8492,7 +8492,7 @@
           <p:cNvPr id="31" name="Rectangle 30">
             <a:extLst>
               <a:ext uri="{FF2B5EF4-FFF2-40B4-BE49-F238E27FC236}">
-                <a16:creationId xmlns:a16="http://schemas.microsoft.com/office/drawing/2014/main" id="{6D396BFC-10E0-4935-903B-EDC457BD1755}"/>
+                <a16:creationId xmlns:a16="http://schemas.microsoft.com/office/drawing/2014/main" xmlns="" id="{6D396BFC-10E0-4935-903B-EDC457BD1755}"/>
               </a:ext>
             </a:extLst>
           </p:cNvPr>
@@ -8552,7 +8552,7 @@
           <p:cNvPr id="32" name="Rectangle 31">
             <a:extLst>
               <a:ext uri="{FF2B5EF4-FFF2-40B4-BE49-F238E27FC236}">
-                <a16:creationId xmlns:a16="http://schemas.microsoft.com/office/drawing/2014/main" id="{02A645C8-F11F-438D-92DC-F6FCCA5ECFB8}"/>
+                <a16:creationId xmlns:a16="http://schemas.microsoft.com/office/drawing/2014/main" xmlns="" id="{02A645C8-F11F-438D-92DC-F6FCCA5ECFB8}"/>
               </a:ext>
             </a:extLst>
           </p:cNvPr>
@@ -8612,7 +8612,7 @@
           <p:cNvPr id="12" name="Straight Arrow Connector 11">
             <a:extLst>
               <a:ext uri="{FF2B5EF4-FFF2-40B4-BE49-F238E27FC236}">
-                <a16:creationId xmlns:a16="http://schemas.microsoft.com/office/drawing/2014/main" id="{FF2076CA-F897-4293-B6CD-7408EB452156}"/>
+                <a16:creationId xmlns:a16="http://schemas.microsoft.com/office/drawing/2014/main" xmlns="" id="{FF2076CA-F897-4293-B6CD-7408EB452156}"/>
               </a:ext>
             </a:extLst>
           </p:cNvPr>
@@ -8655,7 +8655,7 @@
           <p:cNvPr id="14" name="Straight Arrow Connector 13">
             <a:extLst>
               <a:ext uri="{FF2B5EF4-FFF2-40B4-BE49-F238E27FC236}">
-                <a16:creationId xmlns:a16="http://schemas.microsoft.com/office/drawing/2014/main" id="{5C625B7B-4A1E-46C5-9082-4FEC89B30DA9}"/>
+                <a16:creationId xmlns:a16="http://schemas.microsoft.com/office/drawing/2014/main" xmlns="" id="{5C625B7B-4A1E-46C5-9082-4FEC89B30DA9}"/>
               </a:ext>
             </a:extLst>
           </p:cNvPr>
@@ -8698,7 +8698,7 @@
           <p:cNvPr id="65" name="Straight Arrow Connector 64">
             <a:extLst>
               <a:ext uri="{FF2B5EF4-FFF2-40B4-BE49-F238E27FC236}">
-                <a16:creationId xmlns:a16="http://schemas.microsoft.com/office/drawing/2014/main" id="{C1C9B843-1D11-4D9F-8CBF-AE00E90AA070}"/>
+                <a16:creationId xmlns:a16="http://schemas.microsoft.com/office/drawing/2014/main" xmlns="" id="{C1C9B843-1D11-4D9F-8CBF-AE00E90AA070}"/>
               </a:ext>
             </a:extLst>
           </p:cNvPr>
@@ -8740,7 +8740,7 @@
           <p:cNvPr id="66" name="TextBox 65">
             <a:extLst>
               <a:ext uri="{FF2B5EF4-FFF2-40B4-BE49-F238E27FC236}">
-                <a16:creationId xmlns:a16="http://schemas.microsoft.com/office/drawing/2014/main" id="{5E4B2700-0522-40EF-B035-166AA1C17D76}"/>
+                <a16:creationId xmlns:a16="http://schemas.microsoft.com/office/drawing/2014/main" xmlns="" id="{5E4B2700-0522-40EF-B035-166AA1C17D76}"/>
               </a:ext>
             </a:extLst>
           </p:cNvPr>
@@ -8828,7 +8828,7 @@
           <p:cNvPr id="40" name="TextBox 39">
             <a:extLst>
               <a:ext uri="{FF2B5EF4-FFF2-40B4-BE49-F238E27FC236}">
-                <a16:creationId xmlns:a16="http://schemas.microsoft.com/office/drawing/2014/main" id="{E0BBD6C8-C8F2-40C5-AA64-85961A11ADC2}"/>
+                <a16:creationId xmlns:a16="http://schemas.microsoft.com/office/drawing/2014/main" xmlns="" id="{E0BBD6C8-C8F2-40C5-AA64-85961A11ADC2}"/>
               </a:ext>
             </a:extLst>
           </p:cNvPr>
@@ -8955,7 +8955,7 @@
           <p:cNvPr id="48" name="TextBox 47">
             <a:extLst>
               <a:ext uri="{FF2B5EF4-FFF2-40B4-BE49-F238E27FC236}">
-                <a16:creationId xmlns:a16="http://schemas.microsoft.com/office/drawing/2014/main" id="{E0BBD6C8-C8F2-40C5-AA64-85961A11ADC2}"/>
+                <a16:creationId xmlns:a16="http://schemas.microsoft.com/office/drawing/2014/main" xmlns="" id="{E0BBD6C8-C8F2-40C5-AA64-85961A11ADC2}"/>
               </a:ext>
             </a:extLst>
           </p:cNvPr>
@@ -8990,7 +8990,7 @@
           <p:cNvPr id="52" name="Rectangle 51">
             <a:extLst>
               <a:ext uri="{FF2B5EF4-FFF2-40B4-BE49-F238E27FC236}">
-                <a16:creationId xmlns:a16="http://schemas.microsoft.com/office/drawing/2014/main" id="{21B869D6-66CB-4B38-975F-B7FEB6AA9B13}"/>
+                <a16:creationId xmlns:a16="http://schemas.microsoft.com/office/drawing/2014/main" xmlns="" id="{21B869D6-66CB-4B38-975F-B7FEB6AA9B13}"/>
               </a:ext>
             </a:extLst>
           </p:cNvPr>
@@ -9111,7 +9111,7 @@
           <p:cNvPr id="58" name="TextBox 57">
             <a:extLst>
               <a:ext uri="{FF2B5EF4-FFF2-40B4-BE49-F238E27FC236}">
-                <a16:creationId xmlns:a16="http://schemas.microsoft.com/office/drawing/2014/main" id="{E0BBD6C8-C8F2-40C5-AA64-85961A11ADC2}"/>
+                <a16:creationId xmlns:a16="http://schemas.microsoft.com/office/drawing/2014/main" xmlns="" id="{E0BBD6C8-C8F2-40C5-AA64-85961A11ADC2}"/>
               </a:ext>
             </a:extLst>
           </p:cNvPr>
@@ -9219,7 +9219,7 @@
           <p:cNvPr id="94" name="TextBox 93">
             <a:extLst>
               <a:ext uri="{FF2B5EF4-FFF2-40B4-BE49-F238E27FC236}">
-                <a16:creationId xmlns:a16="http://schemas.microsoft.com/office/drawing/2014/main" id="{E0BBD6C8-C8F2-40C5-AA64-85961A11ADC2}"/>
+                <a16:creationId xmlns:a16="http://schemas.microsoft.com/office/drawing/2014/main" xmlns="" id="{E0BBD6C8-C8F2-40C5-AA64-85961A11ADC2}"/>
               </a:ext>
             </a:extLst>
           </p:cNvPr>
@@ -9254,7 +9254,7 @@
           <p:cNvPr id="95" name="TextBox 94">
             <a:extLst>
               <a:ext uri="{FF2B5EF4-FFF2-40B4-BE49-F238E27FC236}">
-                <a16:creationId xmlns:a16="http://schemas.microsoft.com/office/drawing/2014/main" id="{E0BBD6C8-C8F2-40C5-AA64-85961A11ADC2}"/>
+                <a16:creationId xmlns:a16="http://schemas.microsoft.com/office/drawing/2014/main" xmlns="" id="{E0BBD6C8-C8F2-40C5-AA64-85961A11ADC2}"/>
               </a:ext>
             </a:extLst>
           </p:cNvPr>
@@ -9325,7 +9325,7 @@
           <p:cNvPr id="53" name="Rectangle 52">
             <a:extLst>
               <a:ext uri="{FF2B5EF4-FFF2-40B4-BE49-F238E27FC236}">
-                <a16:creationId xmlns:a16="http://schemas.microsoft.com/office/drawing/2014/main" id="{6C40FF0E-1998-4874-BE17-1A4E9B40553E}"/>
+                <a16:creationId xmlns:a16="http://schemas.microsoft.com/office/drawing/2014/main" xmlns="" id="{6C40FF0E-1998-4874-BE17-1A4E9B40553E}"/>
               </a:ext>
             </a:extLst>
           </p:cNvPr>
@@ -9391,7 +9391,7 @@
           <p:cNvPr id="8" name="Straight Arrow Connector 7">
             <a:extLst>
               <a:ext uri="{FF2B5EF4-FFF2-40B4-BE49-F238E27FC236}">
-                <a16:creationId xmlns:a16="http://schemas.microsoft.com/office/drawing/2014/main" id="{ADE97499-DD4F-4E76-9405-EEDBB792874E}"/>
+                <a16:creationId xmlns:a16="http://schemas.microsoft.com/office/drawing/2014/main" xmlns="" id="{ADE97499-DD4F-4E76-9405-EEDBB792874E}"/>
               </a:ext>
             </a:extLst>
           </p:cNvPr>
@@ -9433,7 +9433,7 @@
           <p:cNvPr id="54" name="TextBox 53">
             <a:extLst>
               <a:ext uri="{FF2B5EF4-FFF2-40B4-BE49-F238E27FC236}">
-                <a16:creationId xmlns:a16="http://schemas.microsoft.com/office/drawing/2014/main" id="{342D31C0-1790-4E50-9650-E15403FD6F1F}"/>
+                <a16:creationId xmlns:a16="http://schemas.microsoft.com/office/drawing/2014/main" xmlns="" id="{342D31C0-1790-4E50-9650-E15403FD6F1F}"/>
               </a:ext>
             </a:extLst>
           </p:cNvPr>
@@ -9468,7 +9468,7 @@
           <p:cNvPr id="49" name="Rectangle 48">
             <a:extLst>
               <a:ext uri="{FF2B5EF4-FFF2-40B4-BE49-F238E27FC236}">
-                <a16:creationId xmlns:a16="http://schemas.microsoft.com/office/drawing/2014/main" id="{02A645C8-F11F-438D-92DC-F6FCCA5ECFB8}"/>
+                <a16:creationId xmlns:a16="http://schemas.microsoft.com/office/drawing/2014/main" xmlns="" id="{02A645C8-F11F-438D-92DC-F6FCCA5ECFB8}"/>
               </a:ext>
             </a:extLst>
           </p:cNvPr>
@@ -9563,7 +9563,7 @@
           <p:cNvPr id="56" name="TextBox 55">
             <a:extLst>
               <a:ext uri="{FF2B5EF4-FFF2-40B4-BE49-F238E27FC236}">
-                <a16:creationId xmlns:a16="http://schemas.microsoft.com/office/drawing/2014/main" id="{E0BBD6C8-C8F2-40C5-AA64-85961A11ADC2}"/>
+                <a16:creationId xmlns:a16="http://schemas.microsoft.com/office/drawing/2014/main" xmlns="" id="{E0BBD6C8-C8F2-40C5-AA64-85961A11ADC2}"/>
               </a:ext>
             </a:extLst>
           </p:cNvPr>
@@ -9695,7 +9695,7 @@
           <p:cNvPr id="59" name="TextBox 58">
             <a:extLst>
               <a:ext uri="{FF2B5EF4-FFF2-40B4-BE49-F238E27FC236}">
-                <a16:creationId xmlns:a16="http://schemas.microsoft.com/office/drawing/2014/main" id="{342D31C0-1790-4E50-9650-E15403FD6F1F}"/>
+                <a16:creationId xmlns:a16="http://schemas.microsoft.com/office/drawing/2014/main" xmlns="" id="{342D31C0-1790-4E50-9650-E15403FD6F1F}"/>
               </a:ext>
             </a:extLst>
           </p:cNvPr>
@@ -9730,7 +9730,7 @@
           <p:cNvPr id="63" name="Rectangle 62">
             <a:extLst>
               <a:ext uri="{FF2B5EF4-FFF2-40B4-BE49-F238E27FC236}">
-                <a16:creationId xmlns:a16="http://schemas.microsoft.com/office/drawing/2014/main" id="{6D396BFC-10E0-4935-903B-EDC457BD1755}"/>
+                <a16:creationId xmlns:a16="http://schemas.microsoft.com/office/drawing/2014/main" xmlns="" id="{6D396BFC-10E0-4935-903B-EDC457BD1755}"/>
               </a:ext>
             </a:extLst>
           </p:cNvPr>
@@ -10122,7 +10122,7 @@
           <p:cNvPr id="19" name="TextBox 18">
             <a:extLst>
               <a:ext uri="{FF2B5EF4-FFF2-40B4-BE49-F238E27FC236}">
-                <a16:creationId xmlns:a16="http://schemas.microsoft.com/office/drawing/2014/main" id="{E0BBD6C8-C8F2-40C5-AA64-85961A11ADC2}"/>
+                <a16:creationId xmlns:a16="http://schemas.microsoft.com/office/drawing/2014/main" xmlns="" id="{E0BBD6C8-C8F2-40C5-AA64-85961A11ADC2}"/>
               </a:ext>
             </a:extLst>
           </p:cNvPr>
@@ -10248,7 +10248,7 @@
           <p:cNvPr id="23" name="TextBox 22">
             <a:extLst>
               <a:ext uri="{FF2B5EF4-FFF2-40B4-BE49-F238E27FC236}">
-                <a16:creationId xmlns:a16="http://schemas.microsoft.com/office/drawing/2014/main" id="{E0BBD6C8-C8F2-40C5-AA64-85961A11ADC2}"/>
+                <a16:creationId xmlns:a16="http://schemas.microsoft.com/office/drawing/2014/main" xmlns="" id="{E0BBD6C8-C8F2-40C5-AA64-85961A11ADC2}"/>
               </a:ext>
             </a:extLst>
           </p:cNvPr>
@@ -10365,7 +10365,7 @@
           <p:cNvPr id="28" name="TextBox 27">
             <a:extLst>
               <a:ext uri="{FF2B5EF4-FFF2-40B4-BE49-F238E27FC236}">
-                <a16:creationId xmlns:a16="http://schemas.microsoft.com/office/drawing/2014/main" id="{E0BBD6C8-C8F2-40C5-AA64-85961A11ADC2}"/>
+                <a16:creationId xmlns:a16="http://schemas.microsoft.com/office/drawing/2014/main" xmlns="" id="{E0BBD6C8-C8F2-40C5-AA64-85961A11ADC2}"/>
               </a:ext>
             </a:extLst>
           </p:cNvPr>
@@ -10490,7 +10490,7 @@
           <p:cNvPr id="34" name="TextBox 33">
             <a:extLst>
               <a:ext uri="{FF2B5EF4-FFF2-40B4-BE49-F238E27FC236}">
-                <a16:creationId xmlns:a16="http://schemas.microsoft.com/office/drawing/2014/main" id="{E0BBD6C8-C8F2-40C5-AA64-85961A11ADC2}"/>
+                <a16:creationId xmlns:a16="http://schemas.microsoft.com/office/drawing/2014/main" xmlns="" id="{E0BBD6C8-C8F2-40C5-AA64-85961A11ADC2}"/>
               </a:ext>
             </a:extLst>
           </p:cNvPr>
@@ -10616,7 +10616,7 @@
           <p:cNvPr id="38" name="TextBox 37">
             <a:extLst>
               <a:ext uri="{FF2B5EF4-FFF2-40B4-BE49-F238E27FC236}">
-                <a16:creationId xmlns:a16="http://schemas.microsoft.com/office/drawing/2014/main" id="{E0BBD6C8-C8F2-40C5-AA64-85961A11ADC2}"/>
+                <a16:creationId xmlns:a16="http://schemas.microsoft.com/office/drawing/2014/main" xmlns="" id="{E0BBD6C8-C8F2-40C5-AA64-85961A11ADC2}"/>
               </a:ext>
             </a:extLst>
           </p:cNvPr>
@@ -10786,7 +10786,7 @@
           <p:cNvPr id="44" name="TextBox 43">
             <a:extLst>
               <a:ext uri="{FF2B5EF4-FFF2-40B4-BE49-F238E27FC236}">
-                <a16:creationId xmlns:a16="http://schemas.microsoft.com/office/drawing/2014/main" id="{E0BBD6C8-C8F2-40C5-AA64-85961A11ADC2}"/>
+                <a16:creationId xmlns:a16="http://schemas.microsoft.com/office/drawing/2014/main" xmlns="" id="{E0BBD6C8-C8F2-40C5-AA64-85961A11ADC2}"/>
               </a:ext>
             </a:extLst>
           </p:cNvPr>
@@ -10821,7 +10821,7 @@
           <p:cNvPr id="45" name="TextBox 44">
             <a:extLst>
               <a:ext uri="{FF2B5EF4-FFF2-40B4-BE49-F238E27FC236}">
-                <a16:creationId xmlns:a16="http://schemas.microsoft.com/office/drawing/2014/main" id="{E0BBD6C8-C8F2-40C5-AA64-85961A11ADC2}"/>
+                <a16:creationId xmlns:a16="http://schemas.microsoft.com/office/drawing/2014/main" xmlns="" id="{E0BBD6C8-C8F2-40C5-AA64-85961A11ADC2}"/>
               </a:ext>
             </a:extLst>
           </p:cNvPr>
@@ -10856,7 +10856,7 @@
           <p:cNvPr id="26" name="TextBox 25">
             <a:extLst>
               <a:ext uri="{FF2B5EF4-FFF2-40B4-BE49-F238E27FC236}">
-                <a16:creationId xmlns:a16="http://schemas.microsoft.com/office/drawing/2014/main" id="{6C45E26E-8FEE-4439-A34B-789237C9C62C}"/>
+                <a16:creationId xmlns:a16="http://schemas.microsoft.com/office/drawing/2014/main" xmlns="" id="{6C45E26E-8FEE-4439-A34B-789237C9C62C}"/>
               </a:ext>
             </a:extLst>
           </p:cNvPr>
@@ -10891,7 +10891,7 @@
           <p:cNvPr id="31" name="Rectangle 30">
             <a:extLst>
               <a:ext uri="{FF2B5EF4-FFF2-40B4-BE49-F238E27FC236}">
-                <a16:creationId xmlns:a16="http://schemas.microsoft.com/office/drawing/2014/main" id="{6D396BFC-10E0-4935-903B-EDC457BD1755}"/>
+                <a16:creationId xmlns:a16="http://schemas.microsoft.com/office/drawing/2014/main" xmlns="" id="{6D396BFC-10E0-4935-903B-EDC457BD1755}"/>
               </a:ext>
             </a:extLst>
           </p:cNvPr>
@@ -10951,7 +10951,7 @@
           <p:cNvPr id="32" name="Rectangle 31">
             <a:extLst>
               <a:ext uri="{FF2B5EF4-FFF2-40B4-BE49-F238E27FC236}">
-                <a16:creationId xmlns:a16="http://schemas.microsoft.com/office/drawing/2014/main" id="{02A645C8-F11F-438D-92DC-F6FCCA5ECFB8}"/>
+                <a16:creationId xmlns:a16="http://schemas.microsoft.com/office/drawing/2014/main" xmlns="" id="{02A645C8-F11F-438D-92DC-F6FCCA5ECFB8}"/>
               </a:ext>
             </a:extLst>
           </p:cNvPr>
@@ -11011,7 +11011,7 @@
           <p:cNvPr id="12" name="Straight Arrow Connector 11">
             <a:extLst>
               <a:ext uri="{FF2B5EF4-FFF2-40B4-BE49-F238E27FC236}">
-                <a16:creationId xmlns:a16="http://schemas.microsoft.com/office/drawing/2014/main" id="{FF2076CA-F897-4293-B6CD-7408EB452156}"/>
+                <a16:creationId xmlns:a16="http://schemas.microsoft.com/office/drawing/2014/main" xmlns="" id="{FF2076CA-F897-4293-B6CD-7408EB452156}"/>
               </a:ext>
             </a:extLst>
           </p:cNvPr>
@@ -11054,7 +11054,7 @@
           <p:cNvPr id="14" name="Straight Arrow Connector 13">
             <a:extLst>
               <a:ext uri="{FF2B5EF4-FFF2-40B4-BE49-F238E27FC236}">
-                <a16:creationId xmlns:a16="http://schemas.microsoft.com/office/drawing/2014/main" id="{5C625B7B-4A1E-46C5-9082-4FEC89B30DA9}"/>
+                <a16:creationId xmlns:a16="http://schemas.microsoft.com/office/drawing/2014/main" xmlns="" id="{5C625B7B-4A1E-46C5-9082-4FEC89B30DA9}"/>
               </a:ext>
             </a:extLst>
           </p:cNvPr>
@@ -11097,7 +11097,7 @@
           <p:cNvPr id="65" name="Straight Arrow Connector 64">
             <a:extLst>
               <a:ext uri="{FF2B5EF4-FFF2-40B4-BE49-F238E27FC236}">
-                <a16:creationId xmlns:a16="http://schemas.microsoft.com/office/drawing/2014/main" id="{C1C9B843-1D11-4D9F-8CBF-AE00E90AA070}"/>
+                <a16:creationId xmlns:a16="http://schemas.microsoft.com/office/drawing/2014/main" xmlns="" id="{C1C9B843-1D11-4D9F-8CBF-AE00E90AA070}"/>
               </a:ext>
             </a:extLst>
           </p:cNvPr>
@@ -11139,7 +11139,7 @@
           <p:cNvPr id="66" name="TextBox 65">
             <a:extLst>
               <a:ext uri="{FF2B5EF4-FFF2-40B4-BE49-F238E27FC236}">
-                <a16:creationId xmlns:a16="http://schemas.microsoft.com/office/drawing/2014/main" id="{5E4B2700-0522-40EF-B035-166AA1C17D76}"/>
+                <a16:creationId xmlns:a16="http://schemas.microsoft.com/office/drawing/2014/main" xmlns="" id="{5E4B2700-0522-40EF-B035-166AA1C17D76}"/>
               </a:ext>
             </a:extLst>
           </p:cNvPr>
@@ -11174,7 +11174,7 @@
           <p:cNvPr id="40" name="TextBox 39">
             <a:extLst>
               <a:ext uri="{FF2B5EF4-FFF2-40B4-BE49-F238E27FC236}">
-                <a16:creationId xmlns:a16="http://schemas.microsoft.com/office/drawing/2014/main" id="{E0BBD6C8-C8F2-40C5-AA64-85961A11ADC2}"/>
+                <a16:creationId xmlns:a16="http://schemas.microsoft.com/office/drawing/2014/main" xmlns="" id="{E0BBD6C8-C8F2-40C5-AA64-85961A11ADC2}"/>
               </a:ext>
             </a:extLst>
           </p:cNvPr>
@@ -11299,7 +11299,7 @@
           <p:cNvPr id="48" name="TextBox 47">
             <a:extLst>
               <a:ext uri="{FF2B5EF4-FFF2-40B4-BE49-F238E27FC236}">
-                <a16:creationId xmlns:a16="http://schemas.microsoft.com/office/drawing/2014/main" id="{E0BBD6C8-C8F2-40C5-AA64-85961A11ADC2}"/>
+                <a16:creationId xmlns:a16="http://schemas.microsoft.com/office/drawing/2014/main" xmlns="" id="{E0BBD6C8-C8F2-40C5-AA64-85961A11ADC2}"/>
               </a:ext>
             </a:extLst>
           </p:cNvPr>
@@ -11334,7 +11334,7 @@
           <p:cNvPr id="52" name="Rectangle 51">
             <a:extLst>
               <a:ext uri="{FF2B5EF4-FFF2-40B4-BE49-F238E27FC236}">
-                <a16:creationId xmlns:a16="http://schemas.microsoft.com/office/drawing/2014/main" id="{21B869D6-66CB-4B38-975F-B7FEB6AA9B13}"/>
+                <a16:creationId xmlns:a16="http://schemas.microsoft.com/office/drawing/2014/main" xmlns="" id="{21B869D6-66CB-4B38-975F-B7FEB6AA9B13}"/>
               </a:ext>
             </a:extLst>
           </p:cNvPr>
@@ -11455,7 +11455,7 @@
           <p:cNvPr id="58" name="TextBox 57">
             <a:extLst>
               <a:ext uri="{FF2B5EF4-FFF2-40B4-BE49-F238E27FC236}">
-                <a16:creationId xmlns:a16="http://schemas.microsoft.com/office/drawing/2014/main" id="{E0BBD6C8-C8F2-40C5-AA64-85961A11ADC2}"/>
+                <a16:creationId xmlns:a16="http://schemas.microsoft.com/office/drawing/2014/main" xmlns="" id="{E0BBD6C8-C8F2-40C5-AA64-85961A11ADC2}"/>
               </a:ext>
             </a:extLst>
           </p:cNvPr>
@@ -11563,7 +11563,7 @@
           <p:cNvPr id="94" name="TextBox 93">
             <a:extLst>
               <a:ext uri="{FF2B5EF4-FFF2-40B4-BE49-F238E27FC236}">
-                <a16:creationId xmlns:a16="http://schemas.microsoft.com/office/drawing/2014/main" id="{E0BBD6C8-C8F2-40C5-AA64-85961A11ADC2}"/>
+                <a16:creationId xmlns:a16="http://schemas.microsoft.com/office/drawing/2014/main" xmlns="" id="{E0BBD6C8-C8F2-40C5-AA64-85961A11ADC2}"/>
               </a:ext>
             </a:extLst>
           </p:cNvPr>
@@ -11598,7 +11598,7 @@
           <p:cNvPr id="95" name="TextBox 94">
             <a:extLst>
               <a:ext uri="{FF2B5EF4-FFF2-40B4-BE49-F238E27FC236}">
-                <a16:creationId xmlns:a16="http://schemas.microsoft.com/office/drawing/2014/main" id="{E0BBD6C8-C8F2-40C5-AA64-85961A11ADC2}"/>
+                <a16:creationId xmlns:a16="http://schemas.microsoft.com/office/drawing/2014/main" xmlns="" id="{E0BBD6C8-C8F2-40C5-AA64-85961A11ADC2}"/>
               </a:ext>
             </a:extLst>
           </p:cNvPr>
@@ -11633,7 +11633,7 @@
           <p:cNvPr id="53" name="Rectangle 52">
             <a:extLst>
               <a:ext uri="{FF2B5EF4-FFF2-40B4-BE49-F238E27FC236}">
-                <a16:creationId xmlns:a16="http://schemas.microsoft.com/office/drawing/2014/main" id="{6C40FF0E-1998-4874-BE17-1A4E9B40553E}"/>
+                <a16:creationId xmlns:a16="http://schemas.microsoft.com/office/drawing/2014/main" xmlns="" id="{6C40FF0E-1998-4874-BE17-1A4E9B40553E}"/>
               </a:ext>
             </a:extLst>
           </p:cNvPr>
@@ -11699,7 +11699,7 @@
           <p:cNvPr id="8" name="Straight Arrow Connector 7">
             <a:extLst>
               <a:ext uri="{FF2B5EF4-FFF2-40B4-BE49-F238E27FC236}">
-                <a16:creationId xmlns:a16="http://schemas.microsoft.com/office/drawing/2014/main" id="{ADE97499-DD4F-4E76-9405-EEDBB792874E}"/>
+                <a16:creationId xmlns:a16="http://schemas.microsoft.com/office/drawing/2014/main" xmlns="" id="{ADE97499-DD4F-4E76-9405-EEDBB792874E}"/>
               </a:ext>
             </a:extLst>
           </p:cNvPr>
@@ -11741,7 +11741,7 @@
           <p:cNvPr id="54" name="TextBox 53">
             <a:extLst>
               <a:ext uri="{FF2B5EF4-FFF2-40B4-BE49-F238E27FC236}">
-                <a16:creationId xmlns:a16="http://schemas.microsoft.com/office/drawing/2014/main" id="{342D31C0-1790-4E50-9650-E15403FD6F1F}"/>
+                <a16:creationId xmlns:a16="http://schemas.microsoft.com/office/drawing/2014/main" xmlns="" id="{342D31C0-1790-4E50-9650-E15403FD6F1F}"/>
               </a:ext>
             </a:extLst>
           </p:cNvPr>
@@ -11873,7 +11873,7 @@
           <p:cNvPr id="59" name="TextBox 58">
             <a:extLst>
               <a:ext uri="{FF2B5EF4-FFF2-40B4-BE49-F238E27FC236}">
-                <a16:creationId xmlns:a16="http://schemas.microsoft.com/office/drawing/2014/main" id="{342D31C0-1790-4E50-9650-E15403FD6F1F}"/>
+                <a16:creationId xmlns:a16="http://schemas.microsoft.com/office/drawing/2014/main" xmlns="" id="{342D31C0-1790-4E50-9650-E15403FD6F1F}"/>
               </a:ext>
             </a:extLst>
           </p:cNvPr>
@@ -11908,7 +11908,7 @@
           <p:cNvPr id="63" name="Rectangle 62">
             <a:extLst>
               <a:ext uri="{FF2B5EF4-FFF2-40B4-BE49-F238E27FC236}">
-                <a16:creationId xmlns:a16="http://schemas.microsoft.com/office/drawing/2014/main" id="{6D396BFC-10E0-4935-903B-EDC457BD1755}"/>
+                <a16:creationId xmlns:a16="http://schemas.microsoft.com/office/drawing/2014/main" xmlns="" id="{6D396BFC-10E0-4935-903B-EDC457BD1755}"/>
               </a:ext>
             </a:extLst>
           </p:cNvPr>
@@ -12417,7 +12417,7 @@
           <p:cNvPr id="19" name="TextBox 18">
             <a:extLst>
               <a:ext uri="{FF2B5EF4-FFF2-40B4-BE49-F238E27FC236}">
-                <a16:creationId xmlns:a16="http://schemas.microsoft.com/office/drawing/2014/main" id="{E0BBD6C8-C8F2-40C5-AA64-85961A11ADC2}"/>
+                <a16:creationId xmlns:a16="http://schemas.microsoft.com/office/drawing/2014/main" xmlns="" id="{E0BBD6C8-C8F2-40C5-AA64-85961A11ADC2}"/>
               </a:ext>
             </a:extLst>
           </p:cNvPr>
@@ -12543,7 +12543,7 @@
           <p:cNvPr id="23" name="TextBox 22">
             <a:extLst>
               <a:ext uri="{FF2B5EF4-FFF2-40B4-BE49-F238E27FC236}">
-                <a16:creationId xmlns:a16="http://schemas.microsoft.com/office/drawing/2014/main" id="{E0BBD6C8-C8F2-40C5-AA64-85961A11ADC2}"/>
+                <a16:creationId xmlns:a16="http://schemas.microsoft.com/office/drawing/2014/main" xmlns="" id="{E0BBD6C8-C8F2-40C5-AA64-85961A11ADC2}"/>
               </a:ext>
             </a:extLst>
           </p:cNvPr>
@@ -12660,7 +12660,7 @@
           <p:cNvPr id="28" name="TextBox 27">
             <a:extLst>
               <a:ext uri="{FF2B5EF4-FFF2-40B4-BE49-F238E27FC236}">
-                <a16:creationId xmlns:a16="http://schemas.microsoft.com/office/drawing/2014/main" id="{E0BBD6C8-C8F2-40C5-AA64-85961A11ADC2}"/>
+                <a16:creationId xmlns:a16="http://schemas.microsoft.com/office/drawing/2014/main" xmlns="" id="{E0BBD6C8-C8F2-40C5-AA64-85961A11ADC2}"/>
               </a:ext>
             </a:extLst>
           </p:cNvPr>
@@ -12785,7 +12785,7 @@
           <p:cNvPr id="34" name="TextBox 33">
             <a:extLst>
               <a:ext uri="{FF2B5EF4-FFF2-40B4-BE49-F238E27FC236}">
-                <a16:creationId xmlns:a16="http://schemas.microsoft.com/office/drawing/2014/main" id="{E0BBD6C8-C8F2-40C5-AA64-85961A11ADC2}"/>
+                <a16:creationId xmlns:a16="http://schemas.microsoft.com/office/drawing/2014/main" xmlns="" id="{E0BBD6C8-C8F2-40C5-AA64-85961A11ADC2}"/>
               </a:ext>
             </a:extLst>
           </p:cNvPr>
@@ -12911,7 +12911,7 @@
           <p:cNvPr id="38" name="TextBox 37">
             <a:extLst>
               <a:ext uri="{FF2B5EF4-FFF2-40B4-BE49-F238E27FC236}">
-                <a16:creationId xmlns:a16="http://schemas.microsoft.com/office/drawing/2014/main" id="{E0BBD6C8-C8F2-40C5-AA64-85961A11ADC2}"/>
+                <a16:creationId xmlns:a16="http://schemas.microsoft.com/office/drawing/2014/main" xmlns="" id="{E0BBD6C8-C8F2-40C5-AA64-85961A11ADC2}"/>
               </a:ext>
             </a:extLst>
           </p:cNvPr>
@@ -13081,7 +13081,7 @@
           <p:cNvPr id="44" name="TextBox 43">
             <a:extLst>
               <a:ext uri="{FF2B5EF4-FFF2-40B4-BE49-F238E27FC236}">
-                <a16:creationId xmlns:a16="http://schemas.microsoft.com/office/drawing/2014/main" id="{E0BBD6C8-C8F2-40C5-AA64-85961A11ADC2}"/>
+                <a16:creationId xmlns:a16="http://schemas.microsoft.com/office/drawing/2014/main" xmlns="" id="{E0BBD6C8-C8F2-40C5-AA64-85961A11ADC2}"/>
               </a:ext>
             </a:extLst>
           </p:cNvPr>
@@ -13116,7 +13116,7 @@
           <p:cNvPr id="45" name="TextBox 44">
             <a:extLst>
               <a:ext uri="{FF2B5EF4-FFF2-40B4-BE49-F238E27FC236}">
-                <a16:creationId xmlns:a16="http://schemas.microsoft.com/office/drawing/2014/main" id="{E0BBD6C8-C8F2-40C5-AA64-85961A11ADC2}"/>
+                <a16:creationId xmlns:a16="http://schemas.microsoft.com/office/drawing/2014/main" xmlns="" id="{E0BBD6C8-C8F2-40C5-AA64-85961A11ADC2}"/>
               </a:ext>
             </a:extLst>
           </p:cNvPr>
@@ -13151,7 +13151,7 @@
           <p:cNvPr id="26" name="TextBox 25">
             <a:extLst>
               <a:ext uri="{FF2B5EF4-FFF2-40B4-BE49-F238E27FC236}">
-                <a16:creationId xmlns:a16="http://schemas.microsoft.com/office/drawing/2014/main" id="{6C45E26E-8FEE-4439-A34B-789237C9C62C}"/>
+                <a16:creationId xmlns:a16="http://schemas.microsoft.com/office/drawing/2014/main" xmlns="" id="{6C45E26E-8FEE-4439-A34B-789237C9C62C}"/>
               </a:ext>
             </a:extLst>
           </p:cNvPr>
@@ -13186,7 +13186,7 @@
           <p:cNvPr id="31" name="Rectangle 30">
             <a:extLst>
               <a:ext uri="{FF2B5EF4-FFF2-40B4-BE49-F238E27FC236}">
-                <a16:creationId xmlns:a16="http://schemas.microsoft.com/office/drawing/2014/main" id="{6D396BFC-10E0-4935-903B-EDC457BD1755}"/>
+                <a16:creationId xmlns:a16="http://schemas.microsoft.com/office/drawing/2014/main" xmlns="" id="{6D396BFC-10E0-4935-903B-EDC457BD1755}"/>
               </a:ext>
             </a:extLst>
           </p:cNvPr>
@@ -13246,7 +13246,7 @@
           <p:cNvPr id="32" name="Rectangle 31">
             <a:extLst>
               <a:ext uri="{FF2B5EF4-FFF2-40B4-BE49-F238E27FC236}">
-                <a16:creationId xmlns:a16="http://schemas.microsoft.com/office/drawing/2014/main" id="{02A645C8-F11F-438D-92DC-F6FCCA5ECFB8}"/>
+                <a16:creationId xmlns:a16="http://schemas.microsoft.com/office/drawing/2014/main" xmlns="" id="{02A645C8-F11F-438D-92DC-F6FCCA5ECFB8}"/>
               </a:ext>
             </a:extLst>
           </p:cNvPr>
@@ -13306,7 +13306,7 @@
           <p:cNvPr id="12" name="Straight Arrow Connector 11">
             <a:extLst>
               <a:ext uri="{FF2B5EF4-FFF2-40B4-BE49-F238E27FC236}">
-                <a16:creationId xmlns:a16="http://schemas.microsoft.com/office/drawing/2014/main" id="{FF2076CA-F897-4293-B6CD-7408EB452156}"/>
+                <a16:creationId xmlns:a16="http://schemas.microsoft.com/office/drawing/2014/main" xmlns="" id="{FF2076CA-F897-4293-B6CD-7408EB452156}"/>
               </a:ext>
             </a:extLst>
           </p:cNvPr>
@@ -13349,7 +13349,7 @@
           <p:cNvPr id="14" name="Straight Arrow Connector 13">
             <a:extLst>
               <a:ext uri="{FF2B5EF4-FFF2-40B4-BE49-F238E27FC236}">
-                <a16:creationId xmlns:a16="http://schemas.microsoft.com/office/drawing/2014/main" id="{5C625B7B-4A1E-46C5-9082-4FEC89B30DA9}"/>
+                <a16:creationId xmlns:a16="http://schemas.microsoft.com/office/drawing/2014/main" xmlns="" id="{5C625B7B-4A1E-46C5-9082-4FEC89B30DA9}"/>
               </a:ext>
             </a:extLst>
           </p:cNvPr>
@@ -13392,7 +13392,7 @@
           <p:cNvPr id="65" name="Straight Arrow Connector 64">
             <a:extLst>
               <a:ext uri="{FF2B5EF4-FFF2-40B4-BE49-F238E27FC236}">
-                <a16:creationId xmlns:a16="http://schemas.microsoft.com/office/drawing/2014/main" id="{C1C9B843-1D11-4D9F-8CBF-AE00E90AA070}"/>
+                <a16:creationId xmlns:a16="http://schemas.microsoft.com/office/drawing/2014/main" xmlns="" id="{C1C9B843-1D11-4D9F-8CBF-AE00E90AA070}"/>
               </a:ext>
             </a:extLst>
           </p:cNvPr>
@@ -13434,7 +13434,7 @@
           <p:cNvPr id="66" name="TextBox 65">
             <a:extLst>
               <a:ext uri="{FF2B5EF4-FFF2-40B4-BE49-F238E27FC236}">
-                <a16:creationId xmlns:a16="http://schemas.microsoft.com/office/drawing/2014/main" id="{5E4B2700-0522-40EF-B035-166AA1C17D76}"/>
+                <a16:creationId xmlns:a16="http://schemas.microsoft.com/office/drawing/2014/main" xmlns="" id="{5E4B2700-0522-40EF-B035-166AA1C17D76}"/>
               </a:ext>
             </a:extLst>
           </p:cNvPr>
@@ -13561,7 +13561,7 @@
           <p:cNvPr id="48" name="TextBox 47">
             <a:extLst>
               <a:ext uri="{FF2B5EF4-FFF2-40B4-BE49-F238E27FC236}">
-                <a16:creationId xmlns:a16="http://schemas.microsoft.com/office/drawing/2014/main" id="{E0BBD6C8-C8F2-40C5-AA64-85961A11ADC2}"/>
+                <a16:creationId xmlns:a16="http://schemas.microsoft.com/office/drawing/2014/main" xmlns="" id="{E0BBD6C8-C8F2-40C5-AA64-85961A11ADC2}"/>
               </a:ext>
             </a:extLst>
           </p:cNvPr>
@@ -13596,7 +13596,7 @@
           <p:cNvPr id="52" name="Rectangle 51">
             <a:extLst>
               <a:ext uri="{FF2B5EF4-FFF2-40B4-BE49-F238E27FC236}">
-                <a16:creationId xmlns:a16="http://schemas.microsoft.com/office/drawing/2014/main" id="{21B869D6-66CB-4B38-975F-B7FEB6AA9B13}"/>
+                <a16:creationId xmlns:a16="http://schemas.microsoft.com/office/drawing/2014/main" xmlns="" id="{21B869D6-66CB-4B38-975F-B7FEB6AA9B13}"/>
               </a:ext>
             </a:extLst>
           </p:cNvPr>
@@ -13717,7 +13717,7 @@
           <p:cNvPr id="58" name="TextBox 57">
             <a:extLst>
               <a:ext uri="{FF2B5EF4-FFF2-40B4-BE49-F238E27FC236}">
-                <a16:creationId xmlns:a16="http://schemas.microsoft.com/office/drawing/2014/main" id="{E0BBD6C8-C8F2-40C5-AA64-85961A11ADC2}"/>
+                <a16:creationId xmlns:a16="http://schemas.microsoft.com/office/drawing/2014/main" xmlns="" id="{E0BBD6C8-C8F2-40C5-AA64-85961A11ADC2}"/>
               </a:ext>
             </a:extLst>
           </p:cNvPr>
@@ -13825,7 +13825,7 @@
           <p:cNvPr id="94" name="TextBox 93">
             <a:extLst>
               <a:ext uri="{FF2B5EF4-FFF2-40B4-BE49-F238E27FC236}">
-                <a16:creationId xmlns:a16="http://schemas.microsoft.com/office/drawing/2014/main" id="{E0BBD6C8-C8F2-40C5-AA64-85961A11ADC2}"/>
+                <a16:creationId xmlns:a16="http://schemas.microsoft.com/office/drawing/2014/main" xmlns="" id="{E0BBD6C8-C8F2-40C5-AA64-85961A11ADC2}"/>
               </a:ext>
             </a:extLst>
           </p:cNvPr>
@@ -13860,7 +13860,7 @@
           <p:cNvPr id="95" name="TextBox 94">
             <a:extLst>
               <a:ext uri="{FF2B5EF4-FFF2-40B4-BE49-F238E27FC236}">
-                <a16:creationId xmlns:a16="http://schemas.microsoft.com/office/drawing/2014/main" id="{E0BBD6C8-C8F2-40C5-AA64-85961A11ADC2}"/>
+                <a16:creationId xmlns:a16="http://schemas.microsoft.com/office/drawing/2014/main" xmlns="" id="{E0BBD6C8-C8F2-40C5-AA64-85961A11ADC2}"/>
               </a:ext>
             </a:extLst>
           </p:cNvPr>
@@ -13895,7 +13895,7 @@
           <p:cNvPr id="50" name="TextBox 49">
             <a:extLst>
               <a:ext uri="{FF2B5EF4-FFF2-40B4-BE49-F238E27FC236}">
-                <a16:creationId xmlns:a16="http://schemas.microsoft.com/office/drawing/2014/main" id="{6C45E26E-8FEE-4439-A34B-789237C9C62C}"/>
+                <a16:creationId xmlns:a16="http://schemas.microsoft.com/office/drawing/2014/main" xmlns="" id="{6C45E26E-8FEE-4439-A34B-789237C9C62C}"/>
               </a:ext>
             </a:extLst>
           </p:cNvPr>
@@ -13966,7 +13966,7 @@
           <p:cNvPr id="53" name="Rectangle 52">
             <a:extLst>
               <a:ext uri="{FF2B5EF4-FFF2-40B4-BE49-F238E27FC236}">
-                <a16:creationId xmlns:a16="http://schemas.microsoft.com/office/drawing/2014/main" id="{93FBA679-F71B-47BD-BE29-21E7C2262CEB}"/>
+                <a16:creationId xmlns:a16="http://schemas.microsoft.com/office/drawing/2014/main" xmlns="" id="{93FBA679-F71B-47BD-BE29-21E7C2262CEB}"/>
               </a:ext>
             </a:extLst>
           </p:cNvPr>
@@ -14083,7 +14083,7 @@
           <p:cNvPr id="57" name="TextBox 56">
             <a:extLst>
               <a:ext uri="{FF2B5EF4-FFF2-40B4-BE49-F238E27FC236}">
-                <a16:creationId xmlns:a16="http://schemas.microsoft.com/office/drawing/2014/main" id="{5E4B2700-0522-40EF-B035-166AA1C17D76}"/>
+                <a16:creationId xmlns:a16="http://schemas.microsoft.com/office/drawing/2014/main" xmlns="" id="{5E4B2700-0522-40EF-B035-166AA1C17D76}"/>
               </a:ext>
             </a:extLst>
           </p:cNvPr>
@@ -14156,10 +14156,10 @@
           <p:cNvPr id="12" name="Rectangle 11">
             <a:extLst>
               <a:ext uri="{FF2B5EF4-FFF2-40B4-BE49-F238E27FC236}">
-                <a16:creationId xmlns:a16="http://schemas.microsoft.com/office/drawing/2014/main" id="{6753252F-4873-4F63-801D-CC719279A7D5}"/>
+                <a16:creationId xmlns:a16="http://schemas.microsoft.com/office/drawing/2014/main" xmlns="" id="{6753252F-4873-4F63-801D-CC719279A7D5}"/>
               </a:ext>
               <a:ext uri="{C183D7F6-B498-43B3-948B-1728B52AA6E4}">
-                <adec:decorative xmlns:adec="http://schemas.microsoft.com/office/drawing/2017/decorative" val="1"/>
+                <adec:decorative xmlns:adec="http://schemas.microsoft.com/office/drawing/2017/decorative" xmlns="" val="1"/>
               </a:ext>
             </a:extLst>
           </p:cNvPr>
@@ -14169,7 +14169,7 @@
           <p:nvPr>
             <p:extLst>
               <p:ext uri="{386F3935-93C4-4BCD-93E2-E3B085C9AB24}">
-                <p16:designElem xmlns:p16="http://schemas.microsoft.com/office/powerpoint/2015/main" val="1"/>
+                <p16:designElem xmlns:p16="http://schemas.microsoft.com/office/powerpoint/2015/main" xmlns="" val="1"/>
               </p:ext>
             </p:extLst>
           </p:nvPr>
@@ -14219,10 +14219,10 @@
           <p:cNvPr id="14" name="Rectangle 13">
             <a:extLst>
               <a:ext uri="{FF2B5EF4-FFF2-40B4-BE49-F238E27FC236}">
-                <a16:creationId xmlns:a16="http://schemas.microsoft.com/office/drawing/2014/main" id="{047C8CCB-F95D-4249-92DD-651249D3535A}"/>
+                <a16:creationId xmlns:a16="http://schemas.microsoft.com/office/drawing/2014/main" xmlns="" id="{047C8CCB-F95D-4249-92DD-651249D3535A}"/>
               </a:ext>
               <a:ext uri="{C183D7F6-B498-43B3-948B-1728B52AA6E4}">
-                <adec:decorative xmlns:adec="http://schemas.microsoft.com/office/drawing/2017/decorative" val="1"/>
+                <adec:decorative xmlns:adec="http://schemas.microsoft.com/office/drawing/2017/decorative" xmlns="" val="1"/>
               </a:ext>
             </a:extLst>
           </p:cNvPr>
@@ -14232,7 +14232,7 @@
           <p:nvPr>
             <p:extLst>
               <p:ext uri="{386F3935-93C4-4BCD-93E2-E3B085C9AB24}">
-                <p16:designElem xmlns:p16="http://schemas.microsoft.com/office/powerpoint/2015/main" val="1"/>
+                <p16:designElem xmlns:p16="http://schemas.microsoft.com/office/powerpoint/2015/main" xmlns="" val="1"/>
               </p:ext>
             </p:extLst>
           </p:nvPr>
@@ -14282,7 +14282,7 @@
           <p:cNvPr id="5" name="TextBox 4">
             <a:extLst>
               <a:ext uri="{FF2B5EF4-FFF2-40B4-BE49-F238E27FC236}">
-                <a16:creationId xmlns:a16="http://schemas.microsoft.com/office/drawing/2014/main" id="{6C45E26E-8FEE-4439-A34B-789237C9C62C}"/>
+                <a16:creationId xmlns:a16="http://schemas.microsoft.com/office/drawing/2014/main" xmlns="" id="{6C45E26E-8FEE-4439-A34B-789237C9C62C}"/>
               </a:ext>
             </a:extLst>
           </p:cNvPr>
@@ -14339,13 +14339,7 @@
       </p:sp>
       <p:pic>
         <p:nvPicPr>
-          <p:cNvPr id="7" name="Picture 6" descr="Diagram&#10;&#10;Description automatically generated">
-            <a:extLst>
-              <a:ext uri="{FF2B5EF4-FFF2-40B4-BE49-F238E27FC236}">
-                <a16:creationId xmlns:a16="http://schemas.microsoft.com/office/drawing/2014/main" id="{3A21505E-B4A2-4FAE-BE38-B1162B93BEA6}"/>
-              </a:ext>
-            </a:extLst>
-          </p:cNvPr>
+          <p:cNvPr id="2" name="Picture 1"/>
           <p:cNvPicPr>
             <a:picLocks noChangeAspect="1"/>
           </p:cNvPicPr>
@@ -14359,8 +14353,8 @@
         </p:blipFill>
         <p:spPr>
           <a:xfrm>
-            <a:off x="4323312" y="961812"/>
-            <a:ext cx="6618775" cy="4930987"/>
+            <a:off x="3800161" y="1033462"/>
+            <a:ext cx="7000875" cy="4791075"/>
           </a:xfrm>
           <a:prstGeom prst="rect">
             <a:avLst/>
@@ -15079,7 +15073,7 @@
           <p:cNvPr id="23" name="TextBox 22">
             <a:extLst>
               <a:ext uri="{FF2B5EF4-FFF2-40B4-BE49-F238E27FC236}">
-                <a16:creationId xmlns:a16="http://schemas.microsoft.com/office/drawing/2014/main" id="{E0BBD6C8-C8F2-40C5-AA64-85961A11ADC2}"/>
+                <a16:creationId xmlns:a16="http://schemas.microsoft.com/office/drawing/2014/main" xmlns="" id="{E0BBD6C8-C8F2-40C5-AA64-85961A11ADC2}"/>
               </a:ext>
             </a:extLst>
           </p:cNvPr>
@@ -15193,7 +15187,7 @@
           <p:cNvPr id="28" name="TextBox 27">
             <a:extLst>
               <a:ext uri="{FF2B5EF4-FFF2-40B4-BE49-F238E27FC236}">
-                <a16:creationId xmlns:a16="http://schemas.microsoft.com/office/drawing/2014/main" id="{E0BBD6C8-C8F2-40C5-AA64-85961A11ADC2}"/>
+                <a16:creationId xmlns:a16="http://schemas.microsoft.com/office/drawing/2014/main" xmlns="" id="{E0BBD6C8-C8F2-40C5-AA64-85961A11ADC2}"/>
               </a:ext>
             </a:extLst>
           </p:cNvPr>
@@ -15314,7 +15308,7 @@
           <p:cNvPr id="34" name="TextBox 33">
             <a:extLst>
               <a:ext uri="{FF2B5EF4-FFF2-40B4-BE49-F238E27FC236}">
-                <a16:creationId xmlns:a16="http://schemas.microsoft.com/office/drawing/2014/main" id="{E0BBD6C8-C8F2-40C5-AA64-85961A11ADC2}"/>
+                <a16:creationId xmlns:a16="http://schemas.microsoft.com/office/drawing/2014/main" xmlns="" id="{E0BBD6C8-C8F2-40C5-AA64-85961A11ADC2}"/>
               </a:ext>
             </a:extLst>
           </p:cNvPr>
@@ -15435,7 +15429,7 @@
           <p:cNvPr id="38" name="TextBox 37">
             <a:extLst>
               <a:ext uri="{FF2B5EF4-FFF2-40B4-BE49-F238E27FC236}">
-                <a16:creationId xmlns:a16="http://schemas.microsoft.com/office/drawing/2014/main" id="{E0BBD6C8-C8F2-40C5-AA64-85961A11ADC2}"/>
+                <a16:creationId xmlns:a16="http://schemas.microsoft.com/office/drawing/2014/main" xmlns="" id="{E0BBD6C8-C8F2-40C5-AA64-85961A11ADC2}"/>
               </a:ext>
             </a:extLst>
           </p:cNvPr>
@@ -15599,7 +15593,7 @@
           <p:cNvPr id="44" name="TextBox 43">
             <a:extLst>
               <a:ext uri="{FF2B5EF4-FFF2-40B4-BE49-F238E27FC236}">
-                <a16:creationId xmlns:a16="http://schemas.microsoft.com/office/drawing/2014/main" id="{E0BBD6C8-C8F2-40C5-AA64-85961A11ADC2}"/>
+                <a16:creationId xmlns:a16="http://schemas.microsoft.com/office/drawing/2014/main" xmlns="" id="{E0BBD6C8-C8F2-40C5-AA64-85961A11ADC2}"/>
               </a:ext>
             </a:extLst>
           </p:cNvPr>
@@ -15634,7 +15628,7 @@
           <p:cNvPr id="45" name="TextBox 44">
             <a:extLst>
               <a:ext uri="{FF2B5EF4-FFF2-40B4-BE49-F238E27FC236}">
-                <a16:creationId xmlns:a16="http://schemas.microsoft.com/office/drawing/2014/main" id="{E0BBD6C8-C8F2-40C5-AA64-85961A11ADC2}"/>
+                <a16:creationId xmlns:a16="http://schemas.microsoft.com/office/drawing/2014/main" xmlns="" id="{E0BBD6C8-C8F2-40C5-AA64-85961A11ADC2}"/>
               </a:ext>
             </a:extLst>
           </p:cNvPr>
@@ -15669,7 +15663,7 @@
           <p:cNvPr id="26" name="TextBox 25">
             <a:extLst>
               <a:ext uri="{FF2B5EF4-FFF2-40B4-BE49-F238E27FC236}">
-                <a16:creationId xmlns:a16="http://schemas.microsoft.com/office/drawing/2014/main" id="{70BF22D6-D5A2-4CCC-8E2D-329E25668556}"/>
+                <a16:creationId xmlns:a16="http://schemas.microsoft.com/office/drawing/2014/main" xmlns="" id="{70BF22D6-D5A2-4CCC-8E2D-329E25668556}"/>
               </a:ext>
             </a:extLst>
           </p:cNvPr>
@@ -15704,7 +15698,7 @@
           <p:cNvPr id="40" name="TextBox 39">
             <a:extLst>
               <a:ext uri="{FF2B5EF4-FFF2-40B4-BE49-F238E27FC236}">
-                <a16:creationId xmlns:a16="http://schemas.microsoft.com/office/drawing/2014/main" id="{BF7734B1-6C1B-4ADB-BBA4-2510EE97BB9D}"/>
+                <a16:creationId xmlns:a16="http://schemas.microsoft.com/office/drawing/2014/main" xmlns="" id="{BF7734B1-6C1B-4ADB-BBA4-2510EE97BB9D}"/>
               </a:ext>
             </a:extLst>
           </p:cNvPr>
@@ -15739,7 +15733,7 @@
           <p:cNvPr id="32" name="Straight Arrow Connector 31">
             <a:extLst>
               <a:ext uri="{FF2B5EF4-FFF2-40B4-BE49-F238E27FC236}">
-                <a16:creationId xmlns:a16="http://schemas.microsoft.com/office/drawing/2014/main" id="{5BC5C957-DD00-47FE-A727-262A8F90A864}"/>
+                <a16:creationId xmlns:a16="http://schemas.microsoft.com/office/drawing/2014/main" xmlns="" id="{5BC5C957-DD00-47FE-A727-262A8F90A864}"/>
               </a:ext>
             </a:extLst>
           </p:cNvPr>
@@ -15867,7 +15861,7 @@
           <p:cNvPr id="36" name="TextBox 35">
             <a:extLst>
               <a:ext uri="{FF2B5EF4-FFF2-40B4-BE49-F238E27FC236}">
-                <a16:creationId xmlns:a16="http://schemas.microsoft.com/office/drawing/2014/main" id="{BF7734B1-6C1B-4ADB-BBA4-2510EE97BB9D}"/>
+                <a16:creationId xmlns:a16="http://schemas.microsoft.com/office/drawing/2014/main" xmlns="" id="{BF7734B1-6C1B-4ADB-BBA4-2510EE97BB9D}"/>
               </a:ext>
             </a:extLst>
           </p:cNvPr>
@@ -15974,7 +15968,7 @@
           <p:cNvPr id="42" name="TextBox 41">
             <a:extLst>
               <a:ext uri="{FF2B5EF4-FFF2-40B4-BE49-F238E27FC236}">
-                <a16:creationId xmlns:a16="http://schemas.microsoft.com/office/drawing/2014/main" id="{E0BBD6C8-C8F2-40C5-AA64-85961A11ADC2}"/>
+                <a16:creationId xmlns:a16="http://schemas.microsoft.com/office/drawing/2014/main" xmlns="" id="{E0BBD6C8-C8F2-40C5-AA64-85961A11ADC2}"/>
               </a:ext>
             </a:extLst>
           </p:cNvPr>
@@ -16009,7 +16003,7 @@
           <p:cNvPr id="46" name="TextBox 45">
             <a:extLst>
               <a:ext uri="{FF2B5EF4-FFF2-40B4-BE49-F238E27FC236}">
-                <a16:creationId xmlns:a16="http://schemas.microsoft.com/office/drawing/2014/main" id="{E0BBD6C8-C8F2-40C5-AA64-85961A11ADC2}"/>
+                <a16:creationId xmlns:a16="http://schemas.microsoft.com/office/drawing/2014/main" xmlns="" id="{E0BBD6C8-C8F2-40C5-AA64-85961A11ADC2}"/>
               </a:ext>
             </a:extLst>
           </p:cNvPr>
@@ -16044,7 +16038,7 @@
           <p:cNvPr id="47" name="TextBox 46">
             <a:extLst>
               <a:ext uri="{FF2B5EF4-FFF2-40B4-BE49-F238E27FC236}">
-                <a16:creationId xmlns:a16="http://schemas.microsoft.com/office/drawing/2014/main" id="{E0BBD6C8-C8F2-40C5-AA64-85961A11ADC2}"/>
+                <a16:creationId xmlns:a16="http://schemas.microsoft.com/office/drawing/2014/main" xmlns="" id="{E0BBD6C8-C8F2-40C5-AA64-85961A11ADC2}"/>
               </a:ext>
             </a:extLst>
           </p:cNvPr>
@@ -16109,7 +16103,7 @@
           <p:cNvPr id="4" name="Rectangle 3">
             <a:extLst>
               <a:ext uri="{FF2B5EF4-FFF2-40B4-BE49-F238E27FC236}">
-                <a16:creationId xmlns:a16="http://schemas.microsoft.com/office/drawing/2014/main" id="{0A71868C-EF96-4004-8116-DFD1FCCEE6C3}"/>
+                <a16:creationId xmlns:a16="http://schemas.microsoft.com/office/drawing/2014/main" xmlns="" id="{0A71868C-EF96-4004-8116-DFD1FCCEE6C3}"/>
               </a:ext>
             </a:extLst>
           </p:cNvPr>
@@ -16165,7 +16159,7 @@
           <p:cNvPr id="5" name="Rectangle 4">
             <a:extLst>
               <a:ext uri="{FF2B5EF4-FFF2-40B4-BE49-F238E27FC236}">
-                <a16:creationId xmlns:a16="http://schemas.microsoft.com/office/drawing/2014/main" id="{67A88ADC-D070-420B-9A88-FDBA4865856A}"/>
+                <a16:creationId xmlns:a16="http://schemas.microsoft.com/office/drawing/2014/main" xmlns="" id="{67A88ADC-D070-420B-9A88-FDBA4865856A}"/>
               </a:ext>
             </a:extLst>
           </p:cNvPr>
@@ -16225,7 +16219,7 @@
           <p:cNvPr id="7" name="Straight Arrow Connector 6">
             <a:extLst>
               <a:ext uri="{FF2B5EF4-FFF2-40B4-BE49-F238E27FC236}">
-                <a16:creationId xmlns:a16="http://schemas.microsoft.com/office/drawing/2014/main" id="{45AD00B6-B022-4C7F-A523-E16E6292918D}"/>
+                <a16:creationId xmlns:a16="http://schemas.microsoft.com/office/drawing/2014/main" xmlns="" id="{45AD00B6-B022-4C7F-A523-E16E6292918D}"/>
               </a:ext>
             </a:extLst>
           </p:cNvPr>
@@ -16267,7 +16261,7 @@
           <p:cNvPr id="8" name="Rectangle 7">
             <a:extLst>
               <a:ext uri="{FF2B5EF4-FFF2-40B4-BE49-F238E27FC236}">
-                <a16:creationId xmlns:a16="http://schemas.microsoft.com/office/drawing/2014/main" id="{3C7A2B3E-B0CA-48CD-A6CB-935EF9D71843}"/>
+                <a16:creationId xmlns:a16="http://schemas.microsoft.com/office/drawing/2014/main" xmlns="" id="{3C7A2B3E-B0CA-48CD-A6CB-935EF9D71843}"/>
               </a:ext>
             </a:extLst>
           </p:cNvPr>
@@ -16327,7 +16321,7 @@
           <p:cNvPr id="9" name="TextBox 8">
             <a:extLst>
               <a:ext uri="{FF2B5EF4-FFF2-40B4-BE49-F238E27FC236}">
-                <a16:creationId xmlns:a16="http://schemas.microsoft.com/office/drawing/2014/main" id="{ABD7B54F-357C-489B-ADE1-DFA04BEA1686}"/>
+                <a16:creationId xmlns:a16="http://schemas.microsoft.com/office/drawing/2014/main" xmlns="" id="{ABD7B54F-357C-489B-ADE1-DFA04BEA1686}"/>
               </a:ext>
             </a:extLst>
           </p:cNvPr>
@@ -16362,7 +16356,7 @@
           <p:cNvPr id="10" name="Rectangle 9">
             <a:extLst>
               <a:ext uri="{FF2B5EF4-FFF2-40B4-BE49-F238E27FC236}">
-                <a16:creationId xmlns:a16="http://schemas.microsoft.com/office/drawing/2014/main" id="{21B869D6-66CB-4B38-975F-B7FEB6AA9B13}"/>
+                <a16:creationId xmlns:a16="http://schemas.microsoft.com/office/drawing/2014/main" xmlns="" id="{21B869D6-66CB-4B38-975F-B7FEB6AA9B13}"/>
               </a:ext>
             </a:extLst>
           </p:cNvPr>
@@ -16411,7 +16405,7 @@
           <p:cNvPr id="12" name="Straight Arrow Connector 11">
             <a:extLst>
               <a:ext uri="{FF2B5EF4-FFF2-40B4-BE49-F238E27FC236}">
-                <a16:creationId xmlns:a16="http://schemas.microsoft.com/office/drawing/2014/main" id="{78CBB1AB-C0E2-40F2-828D-F209304958AC}"/>
+                <a16:creationId xmlns:a16="http://schemas.microsoft.com/office/drawing/2014/main" xmlns="" id="{78CBB1AB-C0E2-40F2-828D-F209304958AC}"/>
               </a:ext>
             </a:extLst>
           </p:cNvPr>
@@ -16454,7 +16448,7 @@
           <p:cNvPr id="14" name="TextBox 13">
             <a:extLst>
               <a:ext uri="{FF2B5EF4-FFF2-40B4-BE49-F238E27FC236}">
-                <a16:creationId xmlns:a16="http://schemas.microsoft.com/office/drawing/2014/main" id="{E0BBD6C8-C8F2-40C5-AA64-85961A11ADC2}"/>
+                <a16:creationId xmlns:a16="http://schemas.microsoft.com/office/drawing/2014/main" xmlns="" id="{E0BBD6C8-C8F2-40C5-AA64-85961A11ADC2}"/>
               </a:ext>
             </a:extLst>
           </p:cNvPr>
@@ -16489,7 +16483,7 @@
           <p:cNvPr id="16" name="Straight Arrow Connector 15">
             <a:extLst>
               <a:ext uri="{FF2B5EF4-FFF2-40B4-BE49-F238E27FC236}">
-                <a16:creationId xmlns:a16="http://schemas.microsoft.com/office/drawing/2014/main" id="{22509349-F226-482F-AC14-E28C2411C4C3}"/>
+                <a16:creationId xmlns:a16="http://schemas.microsoft.com/office/drawing/2014/main" xmlns="" id="{22509349-F226-482F-AC14-E28C2411C4C3}"/>
               </a:ext>
             </a:extLst>
           </p:cNvPr>
@@ -16532,7 +16526,7 @@
           <p:cNvPr id="18" name="TextBox 17">
             <a:extLst>
               <a:ext uri="{FF2B5EF4-FFF2-40B4-BE49-F238E27FC236}">
-                <a16:creationId xmlns:a16="http://schemas.microsoft.com/office/drawing/2014/main" id="{E2DE2503-050C-47C3-BC73-C61D89CEB131}"/>
+                <a16:creationId xmlns:a16="http://schemas.microsoft.com/office/drawing/2014/main" xmlns="" id="{E2DE2503-050C-47C3-BC73-C61D89CEB131}"/>
               </a:ext>
             </a:extLst>
           </p:cNvPr>
@@ -16567,7 +16561,7 @@
           <p:cNvPr id="23" name="Straight Arrow Connector 22">
             <a:extLst>
               <a:ext uri="{FF2B5EF4-FFF2-40B4-BE49-F238E27FC236}">
-                <a16:creationId xmlns:a16="http://schemas.microsoft.com/office/drawing/2014/main" id="{5D314D83-3A56-4BD7-B215-19DEE4ED8C0B}"/>
+                <a16:creationId xmlns:a16="http://schemas.microsoft.com/office/drawing/2014/main" xmlns="" id="{5D314D83-3A56-4BD7-B215-19DEE4ED8C0B}"/>
               </a:ext>
             </a:extLst>
           </p:cNvPr>
@@ -16610,7 +16604,7 @@
           <p:cNvPr id="24" name="Straight Arrow Connector 23">
             <a:extLst>
               <a:ext uri="{FF2B5EF4-FFF2-40B4-BE49-F238E27FC236}">
-                <a16:creationId xmlns:a16="http://schemas.microsoft.com/office/drawing/2014/main" id="{874E7075-4C88-4378-99B9-DC474BE0CE65}"/>
+                <a16:creationId xmlns:a16="http://schemas.microsoft.com/office/drawing/2014/main" xmlns="" id="{874E7075-4C88-4378-99B9-DC474BE0CE65}"/>
               </a:ext>
             </a:extLst>
           </p:cNvPr>
@@ -16653,7 +16647,7 @@
           <p:cNvPr id="25" name="TextBox 24">
             <a:extLst>
               <a:ext uri="{FF2B5EF4-FFF2-40B4-BE49-F238E27FC236}">
-                <a16:creationId xmlns:a16="http://schemas.microsoft.com/office/drawing/2014/main" id="{171D93A1-C181-4F9C-8D75-C106DB531AB7}"/>
+                <a16:creationId xmlns:a16="http://schemas.microsoft.com/office/drawing/2014/main" xmlns="" id="{171D93A1-C181-4F9C-8D75-C106DB531AB7}"/>
               </a:ext>
             </a:extLst>
           </p:cNvPr>
@@ -16688,7 +16682,7 @@
           <p:cNvPr id="26" name="TextBox 25">
             <a:extLst>
               <a:ext uri="{FF2B5EF4-FFF2-40B4-BE49-F238E27FC236}">
-                <a16:creationId xmlns:a16="http://schemas.microsoft.com/office/drawing/2014/main" id="{03EAB749-77B2-435B-A0A3-02060FD4A06F}"/>
+                <a16:creationId xmlns:a16="http://schemas.microsoft.com/office/drawing/2014/main" xmlns="" id="{03EAB749-77B2-435B-A0A3-02060FD4A06F}"/>
               </a:ext>
             </a:extLst>
           </p:cNvPr>
@@ -16723,7 +16717,7 @@
           <p:cNvPr id="27" name="TextBox 26">
             <a:extLst>
               <a:ext uri="{FF2B5EF4-FFF2-40B4-BE49-F238E27FC236}">
-                <a16:creationId xmlns:a16="http://schemas.microsoft.com/office/drawing/2014/main" id="{7D8414B9-747D-41E7-A06D-8BBA5042C15C}"/>
+                <a16:creationId xmlns:a16="http://schemas.microsoft.com/office/drawing/2014/main" xmlns="" id="{7D8414B9-747D-41E7-A06D-8BBA5042C15C}"/>
               </a:ext>
             </a:extLst>
           </p:cNvPr>
@@ -16758,7 +16752,7 @@
           <p:cNvPr id="28" name="TextBox 27">
             <a:extLst>
               <a:ext uri="{FF2B5EF4-FFF2-40B4-BE49-F238E27FC236}">
-                <a16:creationId xmlns:a16="http://schemas.microsoft.com/office/drawing/2014/main" id="{F559714E-416D-4742-9901-ADC4D8BAC5FA}"/>
+                <a16:creationId xmlns:a16="http://schemas.microsoft.com/office/drawing/2014/main" xmlns="" id="{F559714E-416D-4742-9901-ADC4D8BAC5FA}"/>
               </a:ext>
             </a:extLst>
           </p:cNvPr>
@@ -16793,7 +16787,7 @@
           <p:cNvPr id="31" name="Rectangle 30">
             <a:extLst>
               <a:ext uri="{FF2B5EF4-FFF2-40B4-BE49-F238E27FC236}">
-                <a16:creationId xmlns:a16="http://schemas.microsoft.com/office/drawing/2014/main" id="{9061AF07-38B9-4B05-B6B2-1A74D7C0C618}"/>
+                <a16:creationId xmlns:a16="http://schemas.microsoft.com/office/drawing/2014/main" xmlns="" id="{9061AF07-38B9-4B05-B6B2-1A74D7C0C618}"/>
               </a:ext>
             </a:extLst>
           </p:cNvPr>
@@ -16853,7 +16847,7 @@
           <p:cNvPr id="33" name="Connector: Elbow 32">
             <a:extLst>
               <a:ext uri="{FF2B5EF4-FFF2-40B4-BE49-F238E27FC236}">
-                <a16:creationId xmlns:a16="http://schemas.microsoft.com/office/drawing/2014/main" id="{B367C937-E98B-4009-B48E-DBF7102DCFD1}"/>
+                <a16:creationId xmlns:a16="http://schemas.microsoft.com/office/drawing/2014/main" xmlns="" id="{B367C937-E98B-4009-B48E-DBF7102DCFD1}"/>
               </a:ext>
             </a:extLst>
           </p:cNvPr>
@@ -16895,7 +16889,7 @@
           <p:cNvPr id="34" name="TextBox 33">
             <a:extLst>
               <a:ext uri="{FF2B5EF4-FFF2-40B4-BE49-F238E27FC236}">
-                <a16:creationId xmlns:a16="http://schemas.microsoft.com/office/drawing/2014/main" id="{7FC33359-8BE1-4CD9-AD98-06C75CE8FF08}"/>
+                <a16:creationId xmlns:a16="http://schemas.microsoft.com/office/drawing/2014/main" xmlns="" id="{7FC33359-8BE1-4CD9-AD98-06C75CE8FF08}"/>
               </a:ext>
             </a:extLst>
           </p:cNvPr>
@@ -16930,7 +16924,7 @@
           <p:cNvPr id="35" name="Rectangle 34">
             <a:extLst>
               <a:ext uri="{FF2B5EF4-FFF2-40B4-BE49-F238E27FC236}">
-                <a16:creationId xmlns:a16="http://schemas.microsoft.com/office/drawing/2014/main" id="{85531841-C806-4F00-B17D-D19E7CE1C155}"/>
+                <a16:creationId xmlns:a16="http://schemas.microsoft.com/office/drawing/2014/main" xmlns="" id="{85531841-C806-4F00-B17D-D19E7CE1C155}"/>
               </a:ext>
             </a:extLst>
           </p:cNvPr>
@@ -16989,7 +16983,7 @@
           <p:cNvPr id="37" name="Connector: Elbow 36">
             <a:extLst>
               <a:ext uri="{FF2B5EF4-FFF2-40B4-BE49-F238E27FC236}">
-                <a16:creationId xmlns:a16="http://schemas.microsoft.com/office/drawing/2014/main" id="{1BFE62EC-0F5D-4135-832D-63D5DC95509C}"/>
+                <a16:creationId xmlns:a16="http://schemas.microsoft.com/office/drawing/2014/main" xmlns="" id="{1BFE62EC-0F5D-4135-832D-63D5DC95509C}"/>
               </a:ext>
             </a:extLst>
           </p:cNvPr>
@@ -17034,7 +17028,7 @@
           <p:cNvPr id="38" name="TextBox 37">
             <a:extLst>
               <a:ext uri="{FF2B5EF4-FFF2-40B4-BE49-F238E27FC236}">
-                <a16:creationId xmlns:a16="http://schemas.microsoft.com/office/drawing/2014/main" id="{892D5E6B-E445-4560-9C01-6D3C52FFC5AA}"/>
+                <a16:creationId xmlns:a16="http://schemas.microsoft.com/office/drawing/2014/main" xmlns="" id="{892D5E6B-E445-4560-9C01-6D3C52FFC5AA}"/>
               </a:ext>
             </a:extLst>
           </p:cNvPr>
@@ -17069,7 +17063,7 @@
           <p:cNvPr id="39" name="Rectangle 38">
             <a:extLst>
               <a:ext uri="{FF2B5EF4-FFF2-40B4-BE49-F238E27FC236}">
-                <a16:creationId xmlns:a16="http://schemas.microsoft.com/office/drawing/2014/main" id="{2F2BC059-EF97-4BEE-8F18-133838E3F2D8}"/>
+                <a16:creationId xmlns:a16="http://schemas.microsoft.com/office/drawing/2014/main" xmlns="" id="{2F2BC059-EF97-4BEE-8F18-133838E3F2D8}"/>
               </a:ext>
             </a:extLst>
           </p:cNvPr>
@@ -17118,7 +17112,7 @@
           <p:cNvPr id="44" name="TextBox 43">
             <a:extLst>
               <a:ext uri="{FF2B5EF4-FFF2-40B4-BE49-F238E27FC236}">
-                <a16:creationId xmlns:a16="http://schemas.microsoft.com/office/drawing/2014/main" id="{48B10C1F-BA7F-40E8-B79A-E87D7A3A66AB}"/>
+                <a16:creationId xmlns:a16="http://schemas.microsoft.com/office/drawing/2014/main" xmlns="" id="{48B10C1F-BA7F-40E8-B79A-E87D7A3A66AB}"/>
               </a:ext>
             </a:extLst>
           </p:cNvPr>

</xml_diff>

<commit_message>
20210822 1056 tlw87 file updates for checkpoint, middle-layer complete with minimum edit capability.
</commit_message>
<xml_diff>
--- a/docs/ERS.pptx
+++ b/docs/ERS.pptx
@@ -262,7 +262,7 @@
           <a:p>
             <a:fld id="{6C733091-19F0-4DD7-90FE-000B4789B4CF}" type="datetimeFigureOut">
               <a:rPr lang="en-US" smtClean="0"/>
-              <a:t>8/19/2021</a:t>
+              <a:t>8/20/2021</a:t>
             </a:fld>
             <a:endParaRPr lang="en-US"/>
           </a:p>
@@ -460,7 +460,7 @@
           <a:p>
             <a:fld id="{6C733091-19F0-4DD7-90FE-000B4789B4CF}" type="datetimeFigureOut">
               <a:rPr lang="en-US" smtClean="0"/>
-              <a:t>8/19/2021</a:t>
+              <a:t>8/20/2021</a:t>
             </a:fld>
             <a:endParaRPr lang="en-US"/>
           </a:p>
@@ -668,7 +668,7 @@
           <a:p>
             <a:fld id="{6C733091-19F0-4DD7-90FE-000B4789B4CF}" type="datetimeFigureOut">
               <a:rPr lang="en-US" smtClean="0"/>
-              <a:t>8/19/2021</a:t>
+              <a:t>8/20/2021</a:t>
             </a:fld>
             <a:endParaRPr lang="en-US"/>
           </a:p>
@@ -866,7 +866,7 @@
           <a:p>
             <a:fld id="{6C733091-19F0-4DD7-90FE-000B4789B4CF}" type="datetimeFigureOut">
               <a:rPr lang="en-US" smtClean="0"/>
-              <a:t>8/19/2021</a:t>
+              <a:t>8/20/2021</a:t>
             </a:fld>
             <a:endParaRPr lang="en-US"/>
           </a:p>
@@ -1141,7 +1141,7 @@
           <a:p>
             <a:fld id="{6C733091-19F0-4DD7-90FE-000B4789B4CF}" type="datetimeFigureOut">
               <a:rPr lang="en-US" smtClean="0"/>
-              <a:t>8/19/2021</a:t>
+              <a:t>8/20/2021</a:t>
             </a:fld>
             <a:endParaRPr lang="en-US"/>
           </a:p>
@@ -1406,7 +1406,7 @@
           <a:p>
             <a:fld id="{6C733091-19F0-4DD7-90FE-000B4789B4CF}" type="datetimeFigureOut">
               <a:rPr lang="en-US" smtClean="0"/>
-              <a:t>8/19/2021</a:t>
+              <a:t>8/20/2021</a:t>
             </a:fld>
             <a:endParaRPr lang="en-US"/>
           </a:p>
@@ -1818,7 +1818,7 @@
           <a:p>
             <a:fld id="{6C733091-19F0-4DD7-90FE-000B4789B4CF}" type="datetimeFigureOut">
               <a:rPr lang="en-US" smtClean="0"/>
-              <a:t>8/19/2021</a:t>
+              <a:t>8/20/2021</a:t>
             </a:fld>
             <a:endParaRPr lang="en-US"/>
           </a:p>
@@ -1959,7 +1959,7 @@
           <a:p>
             <a:fld id="{6C733091-19F0-4DD7-90FE-000B4789B4CF}" type="datetimeFigureOut">
               <a:rPr lang="en-US" smtClean="0"/>
-              <a:t>8/19/2021</a:t>
+              <a:t>8/20/2021</a:t>
             </a:fld>
             <a:endParaRPr lang="en-US"/>
           </a:p>
@@ -2072,7 +2072,7 @@
           <a:p>
             <a:fld id="{6C733091-19F0-4DD7-90FE-000B4789B4CF}" type="datetimeFigureOut">
               <a:rPr lang="en-US" smtClean="0"/>
-              <a:t>8/19/2021</a:t>
+              <a:t>8/20/2021</a:t>
             </a:fld>
             <a:endParaRPr lang="en-US"/>
           </a:p>
@@ -2383,7 +2383,7 @@
           <a:p>
             <a:fld id="{6C733091-19F0-4DD7-90FE-000B4789B4CF}" type="datetimeFigureOut">
               <a:rPr lang="en-US" smtClean="0"/>
-              <a:t>8/19/2021</a:t>
+              <a:t>8/20/2021</a:t>
             </a:fld>
             <a:endParaRPr lang="en-US"/>
           </a:p>
@@ -2671,7 +2671,7 @@
           <a:p>
             <a:fld id="{6C733091-19F0-4DD7-90FE-000B4789B4CF}" type="datetimeFigureOut">
               <a:rPr lang="en-US" smtClean="0"/>
-              <a:t>8/19/2021</a:t>
+              <a:t>8/20/2021</a:t>
             </a:fld>
             <a:endParaRPr lang="en-US"/>
           </a:p>
@@ -2912,7 +2912,7 @@
           <a:p>
             <a:fld id="{6C733091-19F0-4DD7-90FE-000B4789B4CF}" type="datetimeFigureOut">
               <a:rPr lang="en-US" smtClean="0"/>
-              <a:t>8/19/2021</a:t>
+              <a:t>8/20/2021</a:t>
             </a:fld>
             <a:endParaRPr lang="en-US"/>
           </a:p>
@@ -3779,7 +3779,7 @@
         </p:nvSpPr>
         <p:spPr>
           <a:xfrm>
-            <a:off x="7545891" y="2973761"/>
+            <a:off x="7571927" y="3266915"/>
             <a:ext cx="1494797" cy="991056"/>
           </a:xfrm>
           <a:prstGeom prst="rect">
@@ -3921,7 +3921,7 @@
         </p:nvSpPr>
         <p:spPr>
           <a:xfrm>
-            <a:off x="8566966" y="1339049"/>
+            <a:off x="8635143" y="972118"/>
             <a:ext cx="1494797" cy="991056"/>
           </a:xfrm>
           <a:prstGeom prst="rect">
@@ -3980,7 +3980,7 @@
         </p:nvSpPr>
         <p:spPr>
           <a:xfrm>
-            <a:off x="7493462" y="5088577"/>
+            <a:off x="7508008" y="5195357"/>
             <a:ext cx="1678916" cy="991056"/>
           </a:xfrm>
           <a:prstGeom prst="rect">
@@ -4093,9 +4093,7 @@
             <a:avLst/>
           </a:prstGeom>
           <a:solidFill>
-            <a:schemeClr val="accent6">
-              <a:lumMod val="75000"/>
-            </a:schemeClr>
+            <a:schemeClr val="accent5"/>
           </a:solidFill>
         </p:spPr>
         <p:style>
@@ -4159,7 +4157,7 @@
         </p:nvSpPr>
         <p:spPr>
           <a:xfrm>
-            <a:off x="8471841" y="796577"/>
+            <a:off x="8499897" y="417543"/>
             <a:ext cx="1494797" cy="991056"/>
           </a:xfrm>
           <a:prstGeom prst="rect">
@@ -4216,8 +4214,8 @@
         </p:nvCxnSpPr>
         <p:spPr>
           <a:xfrm flipV="1">
-            <a:off x="6258426" y="1292105"/>
-            <a:ext cx="2213415" cy="1175782"/>
+            <a:off x="6258426" y="913071"/>
+            <a:ext cx="2241471" cy="1554816"/>
           </a:xfrm>
           <a:prstGeom prst="straightConnector1">
             <a:avLst/>
@@ -4249,7 +4247,7 @@
         </p:nvSpPr>
         <p:spPr>
           <a:xfrm>
-            <a:off x="7421377" y="2396457"/>
+            <a:off x="7433863" y="2809248"/>
             <a:ext cx="1494797" cy="991056"/>
           </a:xfrm>
           <a:prstGeom prst="rect">
@@ -4319,14 +4317,14 @@
           <p:cNvCxnSpPr>
             <a:cxnSpLocks/>
             <a:stCxn id="20" idx="3"/>
-            <a:endCxn id="15" idx="1"/>
+            <a:endCxn id="57" idx="1"/>
           </p:cNvCxnSpPr>
           <p:nvPr/>
         </p:nvCxnSpPr>
         <p:spPr>
-          <a:xfrm>
-            <a:off x="6258426" y="2467887"/>
-            <a:ext cx="1162951" cy="424098"/>
+          <a:xfrm flipV="1">
+            <a:off x="6258426" y="2308389"/>
+            <a:ext cx="4048574" cy="159498"/>
           </a:xfrm>
           <a:prstGeom prst="straightConnector1">
             <a:avLst/>
@@ -4364,7 +4362,7 @@
         </p:nvSpPr>
         <p:spPr>
           <a:xfrm>
-            <a:off x="6541895" y="2477333"/>
+            <a:off x="7207461" y="2088153"/>
             <a:ext cx="728932" cy="276999"/>
           </a:xfrm>
           <a:prstGeom prst="rect">
@@ -4523,7 +4521,7 @@
         </p:nvSpPr>
         <p:spPr>
           <a:xfrm>
-            <a:off x="7388720" y="294807"/>
+            <a:off x="7400487" y="158383"/>
             <a:ext cx="653404" cy="1018434"/>
           </a:xfrm>
           <a:prstGeom prst="flowChartMagneticDisk">
@@ -4572,8 +4570,8 @@
         </p:nvCxnSpPr>
         <p:spPr>
           <a:xfrm flipV="1">
-            <a:off x="6258426" y="804024"/>
-            <a:ext cx="1130294" cy="1663863"/>
+            <a:off x="6258426" y="667600"/>
+            <a:ext cx="1142061" cy="1800287"/>
           </a:xfrm>
           <a:prstGeom prst="straightConnector1">
             <a:avLst/>
@@ -4992,8 +4990,8 @@
         </p:nvCxnSpPr>
         <p:spPr>
           <a:xfrm flipV="1">
-            <a:off x="6372930" y="804024"/>
-            <a:ext cx="1015790" cy="52058"/>
+            <a:off x="6372930" y="667600"/>
+            <a:ext cx="1027557" cy="188482"/>
           </a:xfrm>
           <a:prstGeom prst="straightConnector1">
             <a:avLst/>
@@ -5357,8 +5355,8 @@
         </p:nvCxnSpPr>
         <p:spPr>
           <a:xfrm flipH="1">
-            <a:off x="6258426" y="804024"/>
-            <a:ext cx="1130294" cy="1663863"/>
+            <a:off x="6258426" y="667600"/>
+            <a:ext cx="1142061" cy="1800287"/>
           </a:xfrm>
           <a:prstGeom prst="straightConnector1">
             <a:avLst/>
@@ -5425,7 +5423,7 @@
         </p:nvSpPr>
         <p:spPr>
           <a:xfrm>
-            <a:off x="7321837" y="4539199"/>
+            <a:off x="7361772" y="4678197"/>
             <a:ext cx="1678916" cy="991056"/>
           </a:xfrm>
           <a:prstGeom prst="rect">
@@ -5482,7 +5480,7 @@
         <p:spPr>
           <a:xfrm flipH="1" flipV="1">
             <a:off x="6212725" y="4547380"/>
-            <a:ext cx="1109112" cy="487347"/>
+            <a:ext cx="1149047" cy="626345"/>
           </a:xfrm>
           <a:prstGeom prst="straightConnector1">
             <a:avLst/>
@@ -5555,7 +5553,7 @@
         </p:nvSpPr>
         <p:spPr>
           <a:xfrm>
-            <a:off x="6739095" y="6481041"/>
+            <a:off x="9186924" y="4643673"/>
             <a:ext cx="2844400" cy="224286"/>
           </a:xfrm>
           <a:prstGeom prst="rect">
@@ -5594,15 +5592,16 @@
         <p:nvCxnSpPr>
           <p:cNvPr id="51" name="Straight Arrow Connector 50"/>
           <p:cNvCxnSpPr>
-            <a:stCxn id="46" idx="2"/>
-            <a:endCxn id="52" idx="0"/>
+            <a:cxnSpLocks/>
+            <a:stCxn id="46" idx="3"/>
+            <a:endCxn id="52" idx="2"/>
           </p:cNvCxnSpPr>
           <p:nvPr/>
         </p:nvCxnSpPr>
         <p:spPr>
-          <a:xfrm>
-            <a:off x="8161295" y="5530255"/>
-            <a:ext cx="0" cy="950786"/>
+          <a:xfrm flipV="1">
+            <a:off x="9040688" y="4867959"/>
+            <a:ext cx="1568436" cy="305766"/>
           </a:xfrm>
           <a:prstGeom prst="straightConnector1">
             <a:avLst/>
@@ -5630,15 +5629,16 @@
         <p:nvCxnSpPr>
           <p:cNvPr id="55" name="Straight Arrow Connector 54"/>
           <p:cNvCxnSpPr>
-            <a:stCxn id="52" idx="0"/>
-            <a:endCxn id="46" idx="2"/>
+            <a:cxnSpLocks/>
+            <a:stCxn id="52" idx="2"/>
+            <a:endCxn id="46" idx="3"/>
           </p:cNvCxnSpPr>
           <p:nvPr/>
         </p:nvCxnSpPr>
         <p:spPr>
-          <a:xfrm flipV="1">
-            <a:off x="8161295" y="5530255"/>
-            <a:ext cx="0" cy="950786"/>
+          <a:xfrm flipH="1">
+            <a:off x="9040688" y="4867959"/>
+            <a:ext cx="1568436" cy="305766"/>
           </a:xfrm>
           <a:prstGeom prst="straightConnector1">
             <a:avLst/>
@@ -5676,7 +5676,7 @@
         </p:nvSpPr>
         <p:spPr>
           <a:xfrm>
-            <a:off x="8110103" y="6118255"/>
+            <a:off x="9572847" y="5006032"/>
             <a:ext cx="843694" cy="276999"/>
           </a:xfrm>
           <a:prstGeom prst="rect">
@@ -5709,8 +5709,8 @@
         </p:nvCxnSpPr>
         <p:spPr>
           <a:xfrm flipV="1">
-            <a:off x="6212725" y="2891985"/>
-            <a:ext cx="1208652" cy="1655395"/>
+            <a:off x="6212725" y="3304776"/>
+            <a:ext cx="1221138" cy="1242604"/>
           </a:xfrm>
           <a:prstGeom prst="straightConnector1">
             <a:avLst/>
@@ -5744,9 +5744,9 @@
           <p:nvPr/>
         </p:nvCxnSpPr>
         <p:spPr>
-          <a:xfrm flipV="1">
-            <a:off x="8161295" y="3387513"/>
-            <a:ext cx="7481" cy="1151686"/>
+          <a:xfrm flipH="1" flipV="1">
+            <a:off x="8181262" y="3800304"/>
+            <a:ext cx="19968" cy="877893"/>
           </a:xfrm>
           <a:prstGeom prst="straightConnector1">
             <a:avLst/>
@@ -5784,8 +5784,8 @@
         </p:nvSpPr>
         <p:spPr>
           <a:xfrm>
-            <a:off x="8156789" y="4166594"/>
-            <a:ext cx="728932" cy="276999"/>
+            <a:off x="8161295" y="4358304"/>
+            <a:ext cx="490999" cy="276999"/>
           </a:xfrm>
           <a:prstGeom prst="rect">
             <a:avLst/>
@@ -5951,14 +5951,14 @@
         </p:nvSpPr>
         <p:spPr>
           <a:xfrm>
-            <a:off x="9930894" y="2748071"/>
+            <a:off x="10307000" y="1812861"/>
             <a:ext cx="1494797" cy="991056"/>
           </a:xfrm>
           <a:prstGeom prst="rect">
             <a:avLst/>
           </a:prstGeom>
           <a:solidFill>
-            <a:schemeClr val="accent6"/>
+            <a:schemeClr val="accent5"/>
           </a:solidFill>
         </p:spPr>
         <p:style>
@@ -6021,9 +6021,9 @@
           <p:nvPr/>
         </p:nvCxnSpPr>
         <p:spPr>
-          <a:xfrm>
-            <a:off x="8916174" y="2891985"/>
-            <a:ext cx="1014720" cy="351614"/>
+          <a:xfrm flipV="1">
+            <a:off x="8928660" y="2308389"/>
+            <a:ext cx="1378340" cy="996387"/>
           </a:xfrm>
           <a:prstGeom prst="straightConnector1">
             <a:avLst/>

</xml_diff>

<commit_message>
20210822 2324 tlw87 file updates for end of day.
</commit_message>
<xml_diff>
--- a/docs/ERS.pptx
+++ b/docs/ERS.pptx
@@ -6,9 +6,10 @@
   </p:sldMasterIdLst>
   <p:sldIdLst>
     <p:sldId id="264" r:id="rId2"/>
-    <p:sldId id="265" r:id="rId3"/>
-    <p:sldId id="269" r:id="rId4"/>
-    <p:sldId id="267" r:id="rId5"/>
+    <p:sldId id="270" r:id="rId3"/>
+    <p:sldId id="265" r:id="rId4"/>
+    <p:sldId id="269" r:id="rId5"/>
+    <p:sldId id="267" r:id="rId6"/>
   </p:sldIdLst>
   <p:sldSz cx="12192000" cy="6858000"/>
   <p:notesSz cx="6858000" cy="9144000"/>
@@ -262,7 +263,7 @@
           <a:p>
             <a:fld id="{6C733091-19F0-4DD7-90FE-000B4789B4CF}" type="datetimeFigureOut">
               <a:rPr lang="en-US" smtClean="0"/>
-              <a:t>8/20/2021</a:t>
+              <a:t>8/22/2021</a:t>
             </a:fld>
             <a:endParaRPr lang="en-US"/>
           </a:p>
@@ -460,7 +461,7 @@
           <a:p>
             <a:fld id="{6C733091-19F0-4DD7-90FE-000B4789B4CF}" type="datetimeFigureOut">
               <a:rPr lang="en-US" smtClean="0"/>
-              <a:t>8/20/2021</a:t>
+              <a:t>8/22/2021</a:t>
             </a:fld>
             <a:endParaRPr lang="en-US"/>
           </a:p>
@@ -668,7 +669,7 @@
           <a:p>
             <a:fld id="{6C733091-19F0-4DD7-90FE-000B4789B4CF}" type="datetimeFigureOut">
               <a:rPr lang="en-US" smtClean="0"/>
-              <a:t>8/20/2021</a:t>
+              <a:t>8/22/2021</a:t>
             </a:fld>
             <a:endParaRPr lang="en-US"/>
           </a:p>
@@ -866,7 +867,7 @@
           <a:p>
             <a:fld id="{6C733091-19F0-4DD7-90FE-000B4789B4CF}" type="datetimeFigureOut">
               <a:rPr lang="en-US" smtClean="0"/>
-              <a:t>8/20/2021</a:t>
+              <a:t>8/22/2021</a:t>
             </a:fld>
             <a:endParaRPr lang="en-US"/>
           </a:p>
@@ -1141,7 +1142,7 @@
           <a:p>
             <a:fld id="{6C733091-19F0-4DD7-90FE-000B4789B4CF}" type="datetimeFigureOut">
               <a:rPr lang="en-US" smtClean="0"/>
-              <a:t>8/20/2021</a:t>
+              <a:t>8/22/2021</a:t>
             </a:fld>
             <a:endParaRPr lang="en-US"/>
           </a:p>
@@ -1406,7 +1407,7 @@
           <a:p>
             <a:fld id="{6C733091-19F0-4DD7-90FE-000B4789B4CF}" type="datetimeFigureOut">
               <a:rPr lang="en-US" smtClean="0"/>
-              <a:t>8/20/2021</a:t>
+              <a:t>8/22/2021</a:t>
             </a:fld>
             <a:endParaRPr lang="en-US"/>
           </a:p>
@@ -1818,7 +1819,7 @@
           <a:p>
             <a:fld id="{6C733091-19F0-4DD7-90FE-000B4789B4CF}" type="datetimeFigureOut">
               <a:rPr lang="en-US" smtClean="0"/>
-              <a:t>8/20/2021</a:t>
+              <a:t>8/22/2021</a:t>
             </a:fld>
             <a:endParaRPr lang="en-US"/>
           </a:p>
@@ -1959,7 +1960,7 @@
           <a:p>
             <a:fld id="{6C733091-19F0-4DD7-90FE-000B4789B4CF}" type="datetimeFigureOut">
               <a:rPr lang="en-US" smtClean="0"/>
-              <a:t>8/20/2021</a:t>
+              <a:t>8/22/2021</a:t>
             </a:fld>
             <a:endParaRPr lang="en-US"/>
           </a:p>
@@ -2072,7 +2073,7 @@
           <a:p>
             <a:fld id="{6C733091-19F0-4DD7-90FE-000B4789B4CF}" type="datetimeFigureOut">
               <a:rPr lang="en-US" smtClean="0"/>
-              <a:t>8/20/2021</a:t>
+              <a:t>8/22/2021</a:t>
             </a:fld>
             <a:endParaRPr lang="en-US"/>
           </a:p>
@@ -2383,7 +2384,7 @@
           <a:p>
             <a:fld id="{6C733091-19F0-4DD7-90FE-000B4789B4CF}" type="datetimeFigureOut">
               <a:rPr lang="en-US" smtClean="0"/>
-              <a:t>8/20/2021</a:t>
+              <a:t>8/22/2021</a:t>
             </a:fld>
             <a:endParaRPr lang="en-US"/>
           </a:p>
@@ -2671,7 +2672,7 @@
           <a:p>
             <a:fld id="{6C733091-19F0-4DD7-90FE-000B4789B4CF}" type="datetimeFigureOut">
               <a:rPr lang="en-US" smtClean="0"/>
-              <a:t>8/20/2021</a:t>
+              <a:t>8/22/2021</a:t>
             </a:fld>
             <a:endParaRPr lang="en-US"/>
           </a:p>
@@ -2912,7 +2913,7 @@
           <a:p>
             <a:fld id="{6C733091-19F0-4DD7-90FE-000B4789B4CF}" type="datetimeFigureOut">
               <a:rPr lang="en-US" smtClean="0"/>
-              <a:t>8/20/2021</a:t>
+              <a:t>8/22/2021</a:t>
             </a:fld>
             <a:endParaRPr lang="en-US"/>
           </a:p>
@@ -3767,6 +3768,127 @@
       </p:grpSpPr>
       <p:sp>
         <p:nvSpPr>
+          <p:cNvPr id="53" name="TextBox 52">
+            <a:extLst>
+              <a:ext uri="{FF2B5EF4-FFF2-40B4-BE49-F238E27FC236}">
+                <a16:creationId xmlns:a16="http://schemas.microsoft.com/office/drawing/2014/main" id="{CFFD1938-4192-486E-9D53-D9784518AD14}"/>
+              </a:ext>
+            </a:extLst>
+          </p:cNvPr>
+          <p:cNvSpPr txBox="1"/>
+          <p:nvPr/>
+        </p:nvSpPr>
+        <p:spPr>
+          <a:xfrm>
+            <a:off x="0" y="30549"/>
+            <a:ext cx="4944934" cy="369332"/>
+          </a:xfrm>
+          <a:prstGeom prst="rect">
+            <a:avLst/>
+          </a:prstGeom>
+          <a:noFill/>
+        </p:spPr>
+        <p:txBody>
+          <a:bodyPr wrap="square" rtlCol="0">
+            <a:spAutoFit/>
+          </a:bodyPr>
+          <a:lstStyle/>
+          <a:p>
+            <a:r>
+              <a:rPr lang="en-US" dirty="0"/>
+              <a:t>ERS Project Client Process Flow Model</a:t>
+            </a:r>
+          </a:p>
+        </p:txBody>
+      </p:sp>
+      <p:sp>
+        <p:nvSpPr>
+          <p:cNvPr id="2" name="Rectangle 1">
+            <a:extLst>
+              <a:ext uri="{FF2B5EF4-FFF2-40B4-BE49-F238E27FC236}">
+                <a16:creationId xmlns:a16="http://schemas.microsoft.com/office/drawing/2014/main" id="{AA0ED7A8-1532-4365-90ED-3F304B8440CE}"/>
+              </a:ext>
+            </a:extLst>
+          </p:cNvPr>
+          <p:cNvSpPr/>
+          <p:nvPr/>
+        </p:nvSpPr>
+        <p:spPr>
+          <a:xfrm>
+            <a:off x="655608" y="759125"/>
+            <a:ext cx="1690777" cy="1061049"/>
+          </a:xfrm>
+          <a:prstGeom prst="rect">
+            <a:avLst/>
+          </a:prstGeom>
+        </p:spPr>
+        <p:style>
+          <a:lnRef idx="2">
+            <a:schemeClr val="accent3">
+              <a:shade val="50000"/>
+            </a:schemeClr>
+          </a:lnRef>
+          <a:fillRef idx="1">
+            <a:schemeClr val="accent3"/>
+          </a:fillRef>
+          <a:effectRef idx="0">
+            <a:schemeClr val="accent3"/>
+          </a:effectRef>
+          <a:fontRef idx="minor">
+            <a:schemeClr val="lt1"/>
+          </a:fontRef>
+        </p:style>
+        <p:txBody>
+          <a:bodyPr rtlCol="0" anchor="ctr"/>
+          <a:lstStyle/>
+          <a:p>
+            <a:pPr algn="ctr"/>
+            <a:r>
+              <a:rPr lang="en-US" sz="1200" dirty="0"/>
+              <a:t>ERS-Client</a:t>
+            </a:r>
+          </a:p>
+          <a:p>
+            <a:pPr algn="ctr"/>
+            <a:r>
+              <a:rPr lang="en-US" dirty="0"/>
+              <a:t>Index.html</a:t>
+            </a:r>
+          </a:p>
+        </p:txBody>
+      </p:sp>
+    </p:spTree>
+    <p:extLst>
+      <p:ext uri="{BB962C8B-B14F-4D97-AF65-F5344CB8AC3E}">
+        <p14:creationId xmlns:p14="http://schemas.microsoft.com/office/powerpoint/2010/main" val="1956872358"/>
+      </p:ext>
+    </p:extLst>
+  </p:cSld>
+  <p:clrMapOvr>
+    <a:masterClrMapping/>
+  </p:clrMapOvr>
+</p:sld>
+</file>
+
+<file path=ppt/slides/slide3.xml><?xml version="1.0" encoding="utf-8"?>
+<p:sld xmlns:a="http://schemas.openxmlformats.org/drawingml/2006/main" xmlns:r="http://schemas.openxmlformats.org/officeDocument/2006/relationships" xmlns:p="http://schemas.openxmlformats.org/presentationml/2006/main">
+  <p:cSld>
+    <p:spTree>
+      <p:nvGrpSpPr>
+        <p:cNvPr id="1" name=""/>
+        <p:cNvGrpSpPr/>
+        <p:nvPr/>
+      </p:nvGrpSpPr>
+      <p:grpSpPr>
+        <a:xfrm>
+          <a:off x="0" y="0"/>
+          <a:ext cx="0" cy="0"/>
+          <a:chOff x="0" y="0"/>
+          <a:chExt cx="0" cy="0"/>
+        </a:xfrm>
+      </p:grpSpPr>
+      <p:sp>
+        <p:nvSpPr>
           <p:cNvPr id="89" name="Rectangle 88">
             <a:extLst>
               <a:ext uri="{FF2B5EF4-FFF2-40B4-BE49-F238E27FC236}">
@@ -6095,7 +6217,7 @@
 </p:sld>
 </file>
 
-<file path=ppt/slides/slide3.xml><?xml version="1.0" encoding="utf-8"?>
+<file path=ppt/slides/slide4.xml><?xml version="1.0" encoding="utf-8"?>
 <p:sld xmlns:a="http://schemas.openxmlformats.org/drawingml/2006/main" xmlns:r="http://schemas.openxmlformats.org/officeDocument/2006/relationships" xmlns:p="http://schemas.openxmlformats.org/presentationml/2006/main">
   <p:cSld>
     <p:bg>
@@ -6343,7 +6465,7 @@
 </p:sld>
 </file>
 
-<file path=ppt/slides/slide4.xml><?xml version="1.0" encoding="utf-8"?>
+<file path=ppt/slides/slide5.xml><?xml version="1.0" encoding="utf-8"?>
 <p:sld xmlns:a="http://schemas.openxmlformats.org/drawingml/2006/main" xmlns:r="http://schemas.openxmlformats.org/officeDocument/2006/relationships" xmlns:p="http://schemas.openxmlformats.org/presentationml/2006/main">
   <p:cSld>
     <p:spTree>

</xml_diff>

<commit_message>
20210824 0833 tlw8748253: file update checkpoint.
</commit_message>
<xml_diff>
--- a/docs/ERS.pptx
+++ b/docs/ERS.pptx
@@ -138,7 +138,7 @@
           <p:cNvPr id="2" name="Title 1">
             <a:extLst>
               <a:ext uri="{FF2B5EF4-FFF2-40B4-BE49-F238E27FC236}">
-                <a16:creationId xmlns:a16="http://schemas.microsoft.com/office/drawing/2014/main" id="{67106D7E-D400-44F1-9A1A-D68CE501C73D}"/>
+                <a16:creationId xmlns:a16="http://schemas.microsoft.com/office/drawing/2014/main" xmlns="" id="{67106D7E-D400-44F1-9A1A-D68CE501C73D}"/>
               </a:ext>
             </a:extLst>
           </p:cNvPr>
@@ -175,7 +175,7 @@
           <p:cNvPr id="3" name="Subtitle 2">
             <a:extLst>
               <a:ext uri="{FF2B5EF4-FFF2-40B4-BE49-F238E27FC236}">
-                <a16:creationId xmlns:a16="http://schemas.microsoft.com/office/drawing/2014/main" id="{A5FDE527-E621-4639-A0C7-E1E9B0DFBCEC}"/>
+                <a16:creationId xmlns:a16="http://schemas.microsoft.com/office/drawing/2014/main" xmlns="" id="{A5FDE527-E621-4639-A0C7-E1E9B0DFBCEC}"/>
               </a:ext>
             </a:extLst>
           </p:cNvPr>
@@ -245,7 +245,7 @@
           <p:cNvPr id="4" name="Date Placeholder 3">
             <a:extLst>
               <a:ext uri="{FF2B5EF4-FFF2-40B4-BE49-F238E27FC236}">
-                <a16:creationId xmlns:a16="http://schemas.microsoft.com/office/drawing/2014/main" id="{E109CE88-B989-4109-89C8-36F7C245DB1C}"/>
+                <a16:creationId xmlns:a16="http://schemas.microsoft.com/office/drawing/2014/main" xmlns="" id="{E109CE88-B989-4109-89C8-36F7C245DB1C}"/>
               </a:ext>
             </a:extLst>
           </p:cNvPr>
@@ -263,7 +263,7 @@
           <a:p>
             <a:fld id="{6C733091-19F0-4DD7-90FE-000B4789B4CF}" type="datetimeFigureOut">
               <a:rPr lang="en-US" smtClean="0"/>
-              <a:t>8/22/2021</a:t>
+              <a:t>8/24/2021</a:t>
             </a:fld>
             <a:endParaRPr lang="en-US"/>
           </a:p>
@@ -274,7 +274,7 @@
           <p:cNvPr id="5" name="Footer Placeholder 4">
             <a:extLst>
               <a:ext uri="{FF2B5EF4-FFF2-40B4-BE49-F238E27FC236}">
-                <a16:creationId xmlns:a16="http://schemas.microsoft.com/office/drawing/2014/main" id="{0841498F-B991-43D3-B408-CC35D8EFCF37}"/>
+                <a16:creationId xmlns:a16="http://schemas.microsoft.com/office/drawing/2014/main" xmlns="" id="{0841498F-B991-43D3-B408-CC35D8EFCF37}"/>
               </a:ext>
             </a:extLst>
           </p:cNvPr>
@@ -299,7 +299,7 @@
           <p:cNvPr id="6" name="Slide Number Placeholder 5">
             <a:extLst>
               <a:ext uri="{FF2B5EF4-FFF2-40B4-BE49-F238E27FC236}">
-                <a16:creationId xmlns:a16="http://schemas.microsoft.com/office/drawing/2014/main" id="{01754CB8-17B1-45A0-AE7D-755EAA1B69D8}"/>
+                <a16:creationId xmlns:a16="http://schemas.microsoft.com/office/drawing/2014/main" xmlns="" id="{01754CB8-17B1-45A0-AE7D-755EAA1B69D8}"/>
               </a:ext>
             </a:extLst>
           </p:cNvPr>
@@ -358,7 +358,7 @@
           <p:cNvPr id="2" name="Title 1">
             <a:extLst>
               <a:ext uri="{FF2B5EF4-FFF2-40B4-BE49-F238E27FC236}">
-                <a16:creationId xmlns:a16="http://schemas.microsoft.com/office/drawing/2014/main" id="{E7A7B055-5DC2-440D-83C1-CAAE8E9A8E14}"/>
+                <a16:creationId xmlns:a16="http://schemas.microsoft.com/office/drawing/2014/main" xmlns="" id="{E7A7B055-5DC2-440D-83C1-CAAE8E9A8E14}"/>
               </a:ext>
             </a:extLst>
           </p:cNvPr>
@@ -386,7 +386,7 @@
           <p:cNvPr id="3" name="Vertical Text Placeholder 2">
             <a:extLst>
               <a:ext uri="{FF2B5EF4-FFF2-40B4-BE49-F238E27FC236}">
-                <a16:creationId xmlns:a16="http://schemas.microsoft.com/office/drawing/2014/main" id="{65710707-423D-4F9D-A49D-6C764C562553}"/>
+                <a16:creationId xmlns:a16="http://schemas.microsoft.com/office/drawing/2014/main" xmlns="" id="{65710707-423D-4F9D-A49D-6C764C562553}"/>
               </a:ext>
             </a:extLst>
           </p:cNvPr>
@@ -443,7 +443,7 @@
           <p:cNvPr id="4" name="Date Placeholder 3">
             <a:extLst>
               <a:ext uri="{FF2B5EF4-FFF2-40B4-BE49-F238E27FC236}">
-                <a16:creationId xmlns:a16="http://schemas.microsoft.com/office/drawing/2014/main" id="{98B6F7EF-D1BE-4437-85F3-99626E37E4EF}"/>
+                <a16:creationId xmlns:a16="http://schemas.microsoft.com/office/drawing/2014/main" xmlns="" id="{98B6F7EF-D1BE-4437-85F3-99626E37E4EF}"/>
               </a:ext>
             </a:extLst>
           </p:cNvPr>
@@ -461,7 +461,7 @@
           <a:p>
             <a:fld id="{6C733091-19F0-4DD7-90FE-000B4789B4CF}" type="datetimeFigureOut">
               <a:rPr lang="en-US" smtClean="0"/>
-              <a:t>8/22/2021</a:t>
+              <a:t>8/24/2021</a:t>
             </a:fld>
             <a:endParaRPr lang="en-US"/>
           </a:p>
@@ -472,7 +472,7 @@
           <p:cNvPr id="5" name="Footer Placeholder 4">
             <a:extLst>
               <a:ext uri="{FF2B5EF4-FFF2-40B4-BE49-F238E27FC236}">
-                <a16:creationId xmlns:a16="http://schemas.microsoft.com/office/drawing/2014/main" id="{D890AA9B-E479-4209-B245-83608F3D4013}"/>
+                <a16:creationId xmlns:a16="http://schemas.microsoft.com/office/drawing/2014/main" xmlns="" id="{D890AA9B-E479-4209-B245-83608F3D4013}"/>
               </a:ext>
             </a:extLst>
           </p:cNvPr>
@@ -497,7 +497,7 @@
           <p:cNvPr id="6" name="Slide Number Placeholder 5">
             <a:extLst>
               <a:ext uri="{FF2B5EF4-FFF2-40B4-BE49-F238E27FC236}">
-                <a16:creationId xmlns:a16="http://schemas.microsoft.com/office/drawing/2014/main" id="{0E4976E4-E15A-4296-A430-633D2BB9142B}"/>
+                <a16:creationId xmlns:a16="http://schemas.microsoft.com/office/drawing/2014/main" xmlns="" id="{0E4976E4-E15A-4296-A430-633D2BB9142B}"/>
               </a:ext>
             </a:extLst>
           </p:cNvPr>
@@ -556,7 +556,7 @@
           <p:cNvPr id="2" name="Vertical Title 1">
             <a:extLst>
               <a:ext uri="{FF2B5EF4-FFF2-40B4-BE49-F238E27FC236}">
-                <a16:creationId xmlns:a16="http://schemas.microsoft.com/office/drawing/2014/main" id="{66F63CF5-8DEE-4BB2-A2A5-5C16FEBE1AD5}"/>
+                <a16:creationId xmlns:a16="http://schemas.microsoft.com/office/drawing/2014/main" xmlns="" id="{66F63CF5-8DEE-4BB2-A2A5-5C16FEBE1AD5}"/>
               </a:ext>
             </a:extLst>
           </p:cNvPr>
@@ -589,7 +589,7 @@
           <p:cNvPr id="3" name="Vertical Text Placeholder 2">
             <a:extLst>
               <a:ext uri="{FF2B5EF4-FFF2-40B4-BE49-F238E27FC236}">
-                <a16:creationId xmlns:a16="http://schemas.microsoft.com/office/drawing/2014/main" id="{E0D5EBA5-94AF-4373-B032-A40FF73C7575}"/>
+                <a16:creationId xmlns:a16="http://schemas.microsoft.com/office/drawing/2014/main" xmlns="" id="{E0D5EBA5-94AF-4373-B032-A40FF73C7575}"/>
               </a:ext>
             </a:extLst>
           </p:cNvPr>
@@ -651,7 +651,7 @@
           <p:cNvPr id="4" name="Date Placeholder 3">
             <a:extLst>
               <a:ext uri="{FF2B5EF4-FFF2-40B4-BE49-F238E27FC236}">
-                <a16:creationId xmlns:a16="http://schemas.microsoft.com/office/drawing/2014/main" id="{7426B8E1-6758-4F5E-B618-96641332600B}"/>
+                <a16:creationId xmlns:a16="http://schemas.microsoft.com/office/drawing/2014/main" xmlns="" id="{7426B8E1-6758-4F5E-B618-96641332600B}"/>
               </a:ext>
             </a:extLst>
           </p:cNvPr>
@@ -669,7 +669,7 @@
           <a:p>
             <a:fld id="{6C733091-19F0-4DD7-90FE-000B4789B4CF}" type="datetimeFigureOut">
               <a:rPr lang="en-US" smtClean="0"/>
-              <a:t>8/22/2021</a:t>
+              <a:t>8/24/2021</a:t>
             </a:fld>
             <a:endParaRPr lang="en-US"/>
           </a:p>
@@ -680,7 +680,7 @@
           <p:cNvPr id="5" name="Footer Placeholder 4">
             <a:extLst>
               <a:ext uri="{FF2B5EF4-FFF2-40B4-BE49-F238E27FC236}">
-                <a16:creationId xmlns:a16="http://schemas.microsoft.com/office/drawing/2014/main" id="{F65E330E-2A7E-482D-AE0F-70EA5A29958B}"/>
+                <a16:creationId xmlns:a16="http://schemas.microsoft.com/office/drawing/2014/main" xmlns="" id="{F65E330E-2A7E-482D-AE0F-70EA5A29958B}"/>
               </a:ext>
             </a:extLst>
           </p:cNvPr>
@@ -705,7 +705,7 @@
           <p:cNvPr id="6" name="Slide Number Placeholder 5">
             <a:extLst>
               <a:ext uri="{FF2B5EF4-FFF2-40B4-BE49-F238E27FC236}">
-                <a16:creationId xmlns:a16="http://schemas.microsoft.com/office/drawing/2014/main" id="{B8000005-FC38-4A6C-9D09-7945EFA08160}"/>
+                <a16:creationId xmlns:a16="http://schemas.microsoft.com/office/drawing/2014/main" xmlns="" id="{B8000005-FC38-4A6C-9D09-7945EFA08160}"/>
               </a:ext>
             </a:extLst>
           </p:cNvPr>
@@ -764,7 +764,7 @@
           <p:cNvPr id="2" name="Title 1">
             <a:extLst>
               <a:ext uri="{FF2B5EF4-FFF2-40B4-BE49-F238E27FC236}">
-                <a16:creationId xmlns:a16="http://schemas.microsoft.com/office/drawing/2014/main" id="{91D0002C-766B-44B4-A24C-BE6DE6C7BA4C}"/>
+                <a16:creationId xmlns:a16="http://schemas.microsoft.com/office/drawing/2014/main" xmlns="" id="{91D0002C-766B-44B4-A24C-BE6DE6C7BA4C}"/>
               </a:ext>
             </a:extLst>
           </p:cNvPr>
@@ -792,7 +792,7 @@
           <p:cNvPr id="3" name="Content Placeholder 2">
             <a:extLst>
               <a:ext uri="{FF2B5EF4-FFF2-40B4-BE49-F238E27FC236}">
-                <a16:creationId xmlns:a16="http://schemas.microsoft.com/office/drawing/2014/main" id="{3455BAA9-6C7B-4874-AD76-BD466F64802D}"/>
+                <a16:creationId xmlns:a16="http://schemas.microsoft.com/office/drawing/2014/main" xmlns="" id="{3455BAA9-6C7B-4874-AD76-BD466F64802D}"/>
               </a:ext>
             </a:extLst>
           </p:cNvPr>
@@ -849,7 +849,7 @@
           <p:cNvPr id="4" name="Date Placeholder 3">
             <a:extLst>
               <a:ext uri="{FF2B5EF4-FFF2-40B4-BE49-F238E27FC236}">
-                <a16:creationId xmlns:a16="http://schemas.microsoft.com/office/drawing/2014/main" id="{8776BDAF-D8F2-4A61-904D-094BB4545702}"/>
+                <a16:creationId xmlns:a16="http://schemas.microsoft.com/office/drawing/2014/main" xmlns="" id="{8776BDAF-D8F2-4A61-904D-094BB4545702}"/>
               </a:ext>
             </a:extLst>
           </p:cNvPr>
@@ -867,7 +867,7 @@
           <a:p>
             <a:fld id="{6C733091-19F0-4DD7-90FE-000B4789B4CF}" type="datetimeFigureOut">
               <a:rPr lang="en-US" smtClean="0"/>
-              <a:t>8/22/2021</a:t>
+              <a:t>8/24/2021</a:t>
             </a:fld>
             <a:endParaRPr lang="en-US"/>
           </a:p>
@@ -878,7 +878,7 @@
           <p:cNvPr id="5" name="Footer Placeholder 4">
             <a:extLst>
               <a:ext uri="{FF2B5EF4-FFF2-40B4-BE49-F238E27FC236}">
-                <a16:creationId xmlns:a16="http://schemas.microsoft.com/office/drawing/2014/main" id="{F89C5665-4384-4706-9BD2-9F42B05C96BC}"/>
+                <a16:creationId xmlns:a16="http://schemas.microsoft.com/office/drawing/2014/main" xmlns="" id="{F89C5665-4384-4706-9BD2-9F42B05C96BC}"/>
               </a:ext>
             </a:extLst>
           </p:cNvPr>
@@ -903,7 +903,7 @@
           <p:cNvPr id="6" name="Slide Number Placeholder 5">
             <a:extLst>
               <a:ext uri="{FF2B5EF4-FFF2-40B4-BE49-F238E27FC236}">
-                <a16:creationId xmlns:a16="http://schemas.microsoft.com/office/drawing/2014/main" id="{7DCAD73E-CAB3-4BA7-905E-D203691D0418}"/>
+                <a16:creationId xmlns:a16="http://schemas.microsoft.com/office/drawing/2014/main" xmlns="" id="{7DCAD73E-CAB3-4BA7-905E-D203691D0418}"/>
               </a:ext>
             </a:extLst>
           </p:cNvPr>
@@ -962,7 +962,7 @@
           <p:cNvPr id="2" name="Title 1">
             <a:extLst>
               <a:ext uri="{FF2B5EF4-FFF2-40B4-BE49-F238E27FC236}">
-                <a16:creationId xmlns:a16="http://schemas.microsoft.com/office/drawing/2014/main" id="{A9880706-F7FA-4EC3-A022-9D6C7CEC3692}"/>
+                <a16:creationId xmlns:a16="http://schemas.microsoft.com/office/drawing/2014/main" xmlns="" id="{A9880706-F7FA-4EC3-A022-9D6C7CEC3692}"/>
               </a:ext>
             </a:extLst>
           </p:cNvPr>
@@ -999,7 +999,7 @@
           <p:cNvPr id="3" name="Text Placeholder 2">
             <a:extLst>
               <a:ext uri="{FF2B5EF4-FFF2-40B4-BE49-F238E27FC236}">
-                <a16:creationId xmlns:a16="http://schemas.microsoft.com/office/drawing/2014/main" id="{FA8A65D0-3DF5-448D-82EC-A967682A0DED}"/>
+                <a16:creationId xmlns:a16="http://schemas.microsoft.com/office/drawing/2014/main" xmlns="" id="{FA8A65D0-3DF5-448D-82EC-A967682A0DED}"/>
               </a:ext>
             </a:extLst>
           </p:cNvPr>
@@ -1124,7 +1124,7 @@
           <p:cNvPr id="4" name="Date Placeholder 3">
             <a:extLst>
               <a:ext uri="{FF2B5EF4-FFF2-40B4-BE49-F238E27FC236}">
-                <a16:creationId xmlns:a16="http://schemas.microsoft.com/office/drawing/2014/main" id="{600EA68C-01A6-487D-9D6E-1D1B4EAC0440}"/>
+                <a16:creationId xmlns:a16="http://schemas.microsoft.com/office/drawing/2014/main" xmlns="" id="{600EA68C-01A6-487D-9D6E-1D1B4EAC0440}"/>
               </a:ext>
             </a:extLst>
           </p:cNvPr>
@@ -1142,7 +1142,7 @@
           <a:p>
             <a:fld id="{6C733091-19F0-4DD7-90FE-000B4789B4CF}" type="datetimeFigureOut">
               <a:rPr lang="en-US" smtClean="0"/>
-              <a:t>8/22/2021</a:t>
+              <a:t>8/24/2021</a:t>
             </a:fld>
             <a:endParaRPr lang="en-US"/>
           </a:p>
@@ -1153,7 +1153,7 @@
           <p:cNvPr id="5" name="Footer Placeholder 4">
             <a:extLst>
               <a:ext uri="{FF2B5EF4-FFF2-40B4-BE49-F238E27FC236}">
-                <a16:creationId xmlns:a16="http://schemas.microsoft.com/office/drawing/2014/main" id="{6E6527CB-4FFD-4569-A82C-5EDC311B2CF6}"/>
+                <a16:creationId xmlns:a16="http://schemas.microsoft.com/office/drawing/2014/main" xmlns="" id="{6E6527CB-4FFD-4569-A82C-5EDC311B2CF6}"/>
               </a:ext>
             </a:extLst>
           </p:cNvPr>
@@ -1178,7 +1178,7 @@
           <p:cNvPr id="6" name="Slide Number Placeholder 5">
             <a:extLst>
               <a:ext uri="{FF2B5EF4-FFF2-40B4-BE49-F238E27FC236}">
-                <a16:creationId xmlns:a16="http://schemas.microsoft.com/office/drawing/2014/main" id="{24B19E5B-5A98-4381-A01D-01F81FD65792}"/>
+                <a16:creationId xmlns:a16="http://schemas.microsoft.com/office/drawing/2014/main" xmlns="" id="{24B19E5B-5A98-4381-A01D-01F81FD65792}"/>
               </a:ext>
             </a:extLst>
           </p:cNvPr>
@@ -1237,7 +1237,7 @@
           <p:cNvPr id="2" name="Title 1">
             <a:extLst>
               <a:ext uri="{FF2B5EF4-FFF2-40B4-BE49-F238E27FC236}">
-                <a16:creationId xmlns:a16="http://schemas.microsoft.com/office/drawing/2014/main" id="{63228B71-E923-4431-B8D2-FAE724678940}"/>
+                <a16:creationId xmlns:a16="http://schemas.microsoft.com/office/drawing/2014/main" xmlns="" id="{63228B71-E923-4431-B8D2-FAE724678940}"/>
               </a:ext>
             </a:extLst>
           </p:cNvPr>
@@ -1265,7 +1265,7 @@
           <p:cNvPr id="3" name="Content Placeholder 2">
             <a:extLst>
               <a:ext uri="{FF2B5EF4-FFF2-40B4-BE49-F238E27FC236}">
-                <a16:creationId xmlns:a16="http://schemas.microsoft.com/office/drawing/2014/main" id="{B18895E9-B7FF-4A00-955B-206CF8C73E43}"/>
+                <a16:creationId xmlns:a16="http://schemas.microsoft.com/office/drawing/2014/main" xmlns="" id="{B18895E9-B7FF-4A00-955B-206CF8C73E43}"/>
               </a:ext>
             </a:extLst>
           </p:cNvPr>
@@ -1327,7 +1327,7 @@
           <p:cNvPr id="4" name="Content Placeholder 3">
             <a:extLst>
               <a:ext uri="{FF2B5EF4-FFF2-40B4-BE49-F238E27FC236}">
-                <a16:creationId xmlns:a16="http://schemas.microsoft.com/office/drawing/2014/main" id="{DA813955-E3B9-44BC-8E1D-139269C8B48A}"/>
+                <a16:creationId xmlns:a16="http://schemas.microsoft.com/office/drawing/2014/main" xmlns="" id="{DA813955-E3B9-44BC-8E1D-139269C8B48A}"/>
               </a:ext>
             </a:extLst>
           </p:cNvPr>
@@ -1389,7 +1389,7 @@
           <p:cNvPr id="5" name="Date Placeholder 4">
             <a:extLst>
               <a:ext uri="{FF2B5EF4-FFF2-40B4-BE49-F238E27FC236}">
-                <a16:creationId xmlns:a16="http://schemas.microsoft.com/office/drawing/2014/main" id="{7E9B8EF5-28D5-4C4E-A2AB-EEA30D75DAFE}"/>
+                <a16:creationId xmlns:a16="http://schemas.microsoft.com/office/drawing/2014/main" xmlns="" id="{7E9B8EF5-28D5-4C4E-A2AB-EEA30D75DAFE}"/>
               </a:ext>
             </a:extLst>
           </p:cNvPr>
@@ -1407,7 +1407,7 @@
           <a:p>
             <a:fld id="{6C733091-19F0-4DD7-90FE-000B4789B4CF}" type="datetimeFigureOut">
               <a:rPr lang="en-US" smtClean="0"/>
-              <a:t>8/22/2021</a:t>
+              <a:t>8/24/2021</a:t>
             </a:fld>
             <a:endParaRPr lang="en-US"/>
           </a:p>
@@ -1418,7 +1418,7 @@
           <p:cNvPr id="6" name="Footer Placeholder 5">
             <a:extLst>
               <a:ext uri="{FF2B5EF4-FFF2-40B4-BE49-F238E27FC236}">
-                <a16:creationId xmlns:a16="http://schemas.microsoft.com/office/drawing/2014/main" id="{5723E678-8CB4-4335-AA04-6BD391748717}"/>
+                <a16:creationId xmlns:a16="http://schemas.microsoft.com/office/drawing/2014/main" xmlns="" id="{5723E678-8CB4-4335-AA04-6BD391748717}"/>
               </a:ext>
             </a:extLst>
           </p:cNvPr>
@@ -1443,7 +1443,7 @@
           <p:cNvPr id="7" name="Slide Number Placeholder 6">
             <a:extLst>
               <a:ext uri="{FF2B5EF4-FFF2-40B4-BE49-F238E27FC236}">
-                <a16:creationId xmlns:a16="http://schemas.microsoft.com/office/drawing/2014/main" id="{887B5567-9F4D-4AE1-92D8-769C9F7EA4F0}"/>
+                <a16:creationId xmlns:a16="http://schemas.microsoft.com/office/drawing/2014/main" xmlns="" id="{887B5567-9F4D-4AE1-92D8-769C9F7EA4F0}"/>
               </a:ext>
             </a:extLst>
           </p:cNvPr>
@@ -1502,7 +1502,7 @@
           <p:cNvPr id="2" name="Title 1">
             <a:extLst>
               <a:ext uri="{FF2B5EF4-FFF2-40B4-BE49-F238E27FC236}">
-                <a16:creationId xmlns:a16="http://schemas.microsoft.com/office/drawing/2014/main" id="{A40320A9-7C0C-45B4-BF2B-3B53B5686EBB}"/>
+                <a16:creationId xmlns:a16="http://schemas.microsoft.com/office/drawing/2014/main" xmlns="" id="{A40320A9-7C0C-45B4-BF2B-3B53B5686EBB}"/>
               </a:ext>
             </a:extLst>
           </p:cNvPr>
@@ -1535,7 +1535,7 @@
           <p:cNvPr id="3" name="Text Placeholder 2">
             <a:extLst>
               <a:ext uri="{FF2B5EF4-FFF2-40B4-BE49-F238E27FC236}">
-                <a16:creationId xmlns:a16="http://schemas.microsoft.com/office/drawing/2014/main" id="{8C440DE1-7DD6-4B1C-B961-CD2079B51F03}"/>
+                <a16:creationId xmlns:a16="http://schemas.microsoft.com/office/drawing/2014/main" xmlns="" id="{8C440DE1-7DD6-4B1C-B961-CD2079B51F03}"/>
               </a:ext>
             </a:extLst>
           </p:cNvPr>
@@ -1606,7 +1606,7 @@
           <p:cNvPr id="4" name="Content Placeholder 3">
             <a:extLst>
               <a:ext uri="{FF2B5EF4-FFF2-40B4-BE49-F238E27FC236}">
-                <a16:creationId xmlns:a16="http://schemas.microsoft.com/office/drawing/2014/main" id="{6FAFE840-CC9A-4D89-B05F-159EF756B427}"/>
+                <a16:creationId xmlns:a16="http://schemas.microsoft.com/office/drawing/2014/main" xmlns="" id="{6FAFE840-CC9A-4D89-B05F-159EF756B427}"/>
               </a:ext>
             </a:extLst>
           </p:cNvPr>
@@ -1668,7 +1668,7 @@
           <p:cNvPr id="5" name="Text Placeholder 4">
             <a:extLst>
               <a:ext uri="{FF2B5EF4-FFF2-40B4-BE49-F238E27FC236}">
-                <a16:creationId xmlns:a16="http://schemas.microsoft.com/office/drawing/2014/main" id="{4B87AADC-3401-48C6-98F6-0AB60F6DF9BE}"/>
+                <a16:creationId xmlns:a16="http://schemas.microsoft.com/office/drawing/2014/main" xmlns="" id="{4B87AADC-3401-48C6-98F6-0AB60F6DF9BE}"/>
               </a:ext>
             </a:extLst>
           </p:cNvPr>
@@ -1739,7 +1739,7 @@
           <p:cNvPr id="6" name="Content Placeholder 5">
             <a:extLst>
               <a:ext uri="{FF2B5EF4-FFF2-40B4-BE49-F238E27FC236}">
-                <a16:creationId xmlns:a16="http://schemas.microsoft.com/office/drawing/2014/main" id="{34BCF1A4-FB52-4DCD-80BC-324BA41C33CD}"/>
+                <a16:creationId xmlns:a16="http://schemas.microsoft.com/office/drawing/2014/main" xmlns="" id="{34BCF1A4-FB52-4DCD-80BC-324BA41C33CD}"/>
               </a:ext>
             </a:extLst>
           </p:cNvPr>
@@ -1801,7 +1801,7 @@
           <p:cNvPr id="7" name="Date Placeholder 6">
             <a:extLst>
               <a:ext uri="{FF2B5EF4-FFF2-40B4-BE49-F238E27FC236}">
-                <a16:creationId xmlns:a16="http://schemas.microsoft.com/office/drawing/2014/main" id="{8CFD4208-60E7-48B1-8CD0-717D5E26B827}"/>
+                <a16:creationId xmlns:a16="http://schemas.microsoft.com/office/drawing/2014/main" xmlns="" id="{8CFD4208-60E7-48B1-8CD0-717D5E26B827}"/>
               </a:ext>
             </a:extLst>
           </p:cNvPr>
@@ -1819,7 +1819,7 @@
           <a:p>
             <a:fld id="{6C733091-19F0-4DD7-90FE-000B4789B4CF}" type="datetimeFigureOut">
               <a:rPr lang="en-US" smtClean="0"/>
-              <a:t>8/22/2021</a:t>
+              <a:t>8/24/2021</a:t>
             </a:fld>
             <a:endParaRPr lang="en-US"/>
           </a:p>
@@ -1830,7 +1830,7 @@
           <p:cNvPr id="8" name="Footer Placeholder 7">
             <a:extLst>
               <a:ext uri="{FF2B5EF4-FFF2-40B4-BE49-F238E27FC236}">
-                <a16:creationId xmlns:a16="http://schemas.microsoft.com/office/drawing/2014/main" id="{94E429D1-BEB1-4D8A-91F2-CD4F80157F8D}"/>
+                <a16:creationId xmlns:a16="http://schemas.microsoft.com/office/drawing/2014/main" xmlns="" id="{94E429D1-BEB1-4D8A-91F2-CD4F80157F8D}"/>
               </a:ext>
             </a:extLst>
           </p:cNvPr>
@@ -1855,7 +1855,7 @@
           <p:cNvPr id="9" name="Slide Number Placeholder 8">
             <a:extLst>
               <a:ext uri="{FF2B5EF4-FFF2-40B4-BE49-F238E27FC236}">
-                <a16:creationId xmlns:a16="http://schemas.microsoft.com/office/drawing/2014/main" id="{6F17C19C-8370-4118-A8FC-5DDA6F84230F}"/>
+                <a16:creationId xmlns:a16="http://schemas.microsoft.com/office/drawing/2014/main" xmlns="" id="{6F17C19C-8370-4118-A8FC-5DDA6F84230F}"/>
               </a:ext>
             </a:extLst>
           </p:cNvPr>
@@ -1914,7 +1914,7 @@
           <p:cNvPr id="2" name="Title 1">
             <a:extLst>
               <a:ext uri="{FF2B5EF4-FFF2-40B4-BE49-F238E27FC236}">
-                <a16:creationId xmlns:a16="http://schemas.microsoft.com/office/drawing/2014/main" id="{252CBF36-7F99-45A9-BC35-BD2EC260CBF0}"/>
+                <a16:creationId xmlns:a16="http://schemas.microsoft.com/office/drawing/2014/main" xmlns="" id="{252CBF36-7F99-45A9-BC35-BD2EC260CBF0}"/>
               </a:ext>
             </a:extLst>
           </p:cNvPr>
@@ -1942,7 +1942,7 @@
           <p:cNvPr id="3" name="Date Placeholder 2">
             <a:extLst>
               <a:ext uri="{FF2B5EF4-FFF2-40B4-BE49-F238E27FC236}">
-                <a16:creationId xmlns:a16="http://schemas.microsoft.com/office/drawing/2014/main" id="{0D6F5F83-F07E-4501-B86B-9F96CD43993C}"/>
+                <a16:creationId xmlns:a16="http://schemas.microsoft.com/office/drawing/2014/main" xmlns="" id="{0D6F5F83-F07E-4501-B86B-9F96CD43993C}"/>
               </a:ext>
             </a:extLst>
           </p:cNvPr>
@@ -1960,7 +1960,7 @@
           <a:p>
             <a:fld id="{6C733091-19F0-4DD7-90FE-000B4789B4CF}" type="datetimeFigureOut">
               <a:rPr lang="en-US" smtClean="0"/>
-              <a:t>8/22/2021</a:t>
+              <a:t>8/24/2021</a:t>
             </a:fld>
             <a:endParaRPr lang="en-US"/>
           </a:p>
@@ -1971,7 +1971,7 @@
           <p:cNvPr id="4" name="Footer Placeholder 3">
             <a:extLst>
               <a:ext uri="{FF2B5EF4-FFF2-40B4-BE49-F238E27FC236}">
-                <a16:creationId xmlns:a16="http://schemas.microsoft.com/office/drawing/2014/main" id="{2861989B-F8E9-41FD-8E16-687424BCC266}"/>
+                <a16:creationId xmlns:a16="http://schemas.microsoft.com/office/drawing/2014/main" xmlns="" id="{2861989B-F8E9-41FD-8E16-687424BCC266}"/>
               </a:ext>
             </a:extLst>
           </p:cNvPr>
@@ -1996,7 +1996,7 @@
           <p:cNvPr id="5" name="Slide Number Placeholder 4">
             <a:extLst>
               <a:ext uri="{FF2B5EF4-FFF2-40B4-BE49-F238E27FC236}">
-                <a16:creationId xmlns:a16="http://schemas.microsoft.com/office/drawing/2014/main" id="{2026B6D7-7832-4815-95CE-5CEC39502825}"/>
+                <a16:creationId xmlns:a16="http://schemas.microsoft.com/office/drawing/2014/main" xmlns="" id="{2026B6D7-7832-4815-95CE-5CEC39502825}"/>
               </a:ext>
             </a:extLst>
           </p:cNvPr>
@@ -2055,7 +2055,7 @@
           <p:cNvPr id="2" name="Date Placeholder 1">
             <a:extLst>
               <a:ext uri="{FF2B5EF4-FFF2-40B4-BE49-F238E27FC236}">
-                <a16:creationId xmlns:a16="http://schemas.microsoft.com/office/drawing/2014/main" id="{9877919A-C4B6-46FD-A08A-9A4B867FE01A}"/>
+                <a16:creationId xmlns:a16="http://schemas.microsoft.com/office/drawing/2014/main" xmlns="" id="{9877919A-C4B6-46FD-A08A-9A4B867FE01A}"/>
               </a:ext>
             </a:extLst>
           </p:cNvPr>
@@ -2073,7 +2073,7 @@
           <a:p>
             <a:fld id="{6C733091-19F0-4DD7-90FE-000B4789B4CF}" type="datetimeFigureOut">
               <a:rPr lang="en-US" smtClean="0"/>
-              <a:t>8/22/2021</a:t>
+              <a:t>8/24/2021</a:t>
             </a:fld>
             <a:endParaRPr lang="en-US"/>
           </a:p>
@@ -2084,7 +2084,7 @@
           <p:cNvPr id="3" name="Footer Placeholder 2">
             <a:extLst>
               <a:ext uri="{FF2B5EF4-FFF2-40B4-BE49-F238E27FC236}">
-                <a16:creationId xmlns:a16="http://schemas.microsoft.com/office/drawing/2014/main" id="{9118539E-383C-4F1C-86F2-14C533A7E9FB}"/>
+                <a16:creationId xmlns:a16="http://schemas.microsoft.com/office/drawing/2014/main" xmlns="" id="{9118539E-383C-4F1C-86F2-14C533A7E9FB}"/>
               </a:ext>
             </a:extLst>
           </p:cNvPr>
@@ -2109,7 +2109,7 @@
           <p:cNvPr id="4" name="Slide Number Placeholder 3">
             <a:extLst>
               <a:ext uri="{FF2B5EF4-FFF2-40B4-BE49-F238E27FC236}">
-                <a16:creationId xmlns:a16="http://schemas.microsoft.com/office/drawing/2014/main" id="{C9A6D4E1-CA83-4214-9942-9E4617AA89BF}"/>
+                <a16:creationId xmlns:a16="http://schemas.microsoft.com/office/drawing/2014/main" xmlns="" id="{C9A6D4E1-CA83-4214-9942-9E4617AA89BF}"/>
               </a:ext>
             </a:extLst>
           </p:cNvPr>
@@ -2168,7 +2168,7 @@
           <p:cNvPr id="2" name="Title 1">
             <a:extLst>
               <a:ext uri="{FF2B5EF4-FFF2-40B4-BE49-F238E27FC236}">
-                <a16:creationId xmlns:a16="http://schemas.microsoft.com/office/drawing/2014/main" id="{046EF9B5-7A2A-4225-8817-86D028D6950C}"/>
+                <a16:creationId xmlns:a16="http://schemas.microsoft.com/office/drawing/2014/main" xmlns="" id="{046EF9B5-7A2A-4225-8817-86D028D6950C}"/>
               </a:ext>
             </a:extLst>
           </p:cNvPr>
@@ -2205,7 +2205,7 @@
           <p:cNvPr id="3" name="Content Placeholder 2">
             <a:extLst>
               <a:ext uri="{FF2B5EF4-FFF2-40B4-BE49-F238E27FC236}">
-                <a16:creationId xmlns:a16="http://schemas.microsoft.com/office/drawing/2014/main" id="{8667C390-5297-41E8-A403-22856007B051}"/>
+                <a16:creationId xmlns:a16="http://schemas.microsoft.com/office/drawing/2014/main" xmlns="" id="{8667C390-5297-41E8-A403-22856007B051}"/>
               </a:ext>
             </a:extLst>
           </p:cNvPr>
@@ -2295,7 +2295,7 @@
           <p:cNvPr id="4" name="Text Placeholder 3">
             <a:extLst>
               <a:ext uri="{FF2B5EF4-FFF2-40B4-BE49-F238E27FC236}">
-                <a16:creationId xmlns:a16="http://schemas.microsoft.com/office/drawing/2014/main" id="{8D0D2F7D-D6CD-4AB1-A3EA-CBFD2A2B3703}"/>
+                <a16:creationId xmlns:a16="http://schemas.microsoft.com/office/drawing/2014/main" xmlns="" id="{8D0D2F7D-D6CD-4AB1-A3EA-CBFD2A2B3703}"/>
               </a:ext>
             </a:extLst>
           </p:cNvPr>
@@ -2366,7 +2366,7 @@
           <p:cNvPr id="5" name="Date Placeholder 4">
             <a:extLst>
               <a:ext uri="{FF2B5EF4-FFF2-40B4-BE49-F238E27FC236}">
-                <a16:creationId xmlns:a16="http://schemas.microsoft.com/office/drawing/2014/main" id="{E17A441D-4FA7-4110-BF24-165CD3C3DAD7}"/>
+                <a16:creationId xmlns:a16="http://schemas.microsoft.com/office/drawing/2014/main" xmlns="" id="{E17A441D-4FA7-4110-BF24-165CD3C3DAD7}"/>
               </a:ext>
             </a:extLst>
           </p:cNvPr>
@@ -2384,7 +2384,7 @@
           <a:p>
             <a:fld id="{6C733091-19F0-4DD7-90FE-000B4789B4CF}" type="datetimeFigureOut">
               <a:rPr lang="en-US" smtClean="0"/>
-              <a:t>8/22/2021</a:t>
+              <a:t>8/24/2021</a:t>
             </a:fld>
             <a:endParaRPr lang="en-US"/>
           </a:p>
@@ -2395,7 +2395,7 @@
           <p:cNvPr id="6" name="Footer Placeholder 5">
             <a:extLst>
               <a:ext uri="{FF2B5EF4-FFF2-40B4-BE49-F238E27FC236}">
-                <a16:creationId xmlns:a16="http://schemas.microsoft.com/office/drawing/2014/main" id="{346102C5-5AE3-43CF-A686-1AB72B0790AB}"/>
+                <a16:creationId xmlns:a16="http://schemas.microsoft.com/office/drawing/2014/main" xmlns="" id="{346102C5-5AE3-43CF-A686-1AB72B0790AB}"/>
               </a:ext>
             </a:extLst>
           </p:cNvPr>
@@ -2420,7 +2420,7 @@
           <p:cNvPr id="7" name="Slide Number Placeholder 6">
             <a:extLst>
               <a:ext uri="{FF2B5EF4-FFF2-40B4-BE49-F238E27FC236}">
-                <a16:creationId xmlns:a16="http://schemas.microsoft.com/office/drawing/2014/main" id="{5528B3F7-462C-4500-8836-B3E5CD8DA61A}"/>
+                <a16:creationId xmlns:a16="http://schemas.microsoft.com/office/drawing/2014/main" xmlns="" id="{5528B3F7-462C-4500-8836-B3E5CD8DA61A}"/>
               </a:ext>
             </a:extLst>
           </p:cNvPr>
@@ -2479,7 +2479,7 @@
           <p:cNvPr id="2" name="Title 1">
             <a:extLst>
               <a:ext uri="{FF2B5EF4-FFF2-40B4-BE49-F238E27FC236}">
-                <a16:creationId xmlns:a16="http://schemas.microsoft.com/office/drawing/2014/main" id="{4BA10E59-DA48-4690-A956-9EB8E4E11EE5}"/>
+                <a16:creationId xmlns:a16="http://schemas.microsoft.com/office/drawing/2014/main" xmlns="" id="{4BA10E59-DA48-4690-A956-9EB8E4E11EE5}"/>
               </a:ext>
             </a:extLst>
           </p:cNvPr>
@@ -2516,7 +2516,7 @@
           <p:cNvPr id="3" name="Picture Placeholder 2">
             <a:extLst>
               <a:ext uri="{FF2B5EF4-FFF2-40B4-BE49-F238E27FC236}">
-                <a16:creationId xmlns:a16="http://schemas.microsoft.com/office/drawing/2014/main" id="{AC7AFE1E-67D1-4106-97CA-98302D42CC4D}"/>
+                <a16:creationId xmlns:a16="http://schemas.microsoft.com/office/drawing/2014/main" xmlns="" id="{AC7AFE1E-67D1-4106-97CA-98302D42CC4D}"/>
               </a:ext>
             </a:extLst>
           </p:cNvPr>
@@ -2583,7 +2583,7 @@
           <p:cNvPr id="4" name="Text Placeholder 3">
             <a:extLst>
               <a:ext uri="{FF2B5EF4-FFF2-40B4-BE49-F238E27FC236}">
-                <a16:creationId xmlns:a16="http://schemas.microsoft.com/office/drawing/2014/main" id="{67D8D73B-3D4D-42A7-9A3C-1D508E8A9B45}"/>
+                <a16:creationId xmlns:a16="http://schemas.microsoft.com/office/drawing/2014/main" xmlns="" id="{67D8D73B-3D4D-42A7-9A3C-1D508E8A9B45}"/>
               </a:ext>
             </a:extLst>
           </p:cNvPr>
@@ -2654,7 +2654,7 @@
           <p:cNvPr id="5" name="Date Placeholder 4">
             <a:extLst>
               <a:ext uri="{FF2B5EF4-FFF2-40B4-BE49-F238E27FC236}">
-                <a16:creationId xmlns:a16="http://schemas.microsoft.com/office/drawing/2014/main" id="{48C8945E-A47A-42A2-9DF6-CA6D5002F65F}"/>
+                <a16:creationId xmlns:a16="http://schemas.microsoft.com/office/drawing/2014/main" xmlns="" id="{48C8945E-A47A-42A2-9DF6-CA6D5002F65F}"/>
               </a:ext>
             </a:extLst>
           </p:cNvPr>
@@ -2672,7 +2672,7 @@
           <a:p>
             <a:fld id="{6C733091-19F0-4DD7-90FE-000B4789B4CF}" type="datetimeFigureOut">
               <a:rPr lang="en-US" smtClean="0"/>
-              <a:t>8/22/2021</a:t>
+              <a:t>8/24/2021</a:t>
             </a:fld>
             <a:endParaRPr lang="en-US"/>
           </a:p>
@@ -2683,7 +2683,7 @@
           <p:cNvPr id="6" name="Footer Placeholder 5">
             <a:extLst>
               <a:ext uri="{FF2B5EF4-FFF2-40B4-BE49-F238E27FC236}">
-                <a16:creationId xmlns:a16="http://schemas.microsoft.com/office/drawing/2014/main" id="{EB000DB4-2747-4297-B400-42A539FBDB42}"/>
+                <a16:creationId xmlns:a16="http://schemas.microsoft.com/office/drawing/2014/main" xmlns="" id="{EB000DB4-2747-4297-B400-42A539FBDB42}"/>
               </a:ext>
             </a:extLst>
           </p:cNvPr>
@@ -2708,7 +2708,7 @@
           <p:cNvPr id="7" name="Slide Number Placeholder 6">
             <a:extLst>
               <a:ext uri="{FF2B5EF4-FFF2-40B4-BE49-F238E27FC236}">
-                <a16:creationId xmlns:a16="http://schemas.microsoft.com/office/drawing/2014/main" id="{5BAD9222-F141-4803-AF73-E2DD92E2ABBC}"/>
+                <a16:creationId xmlns:a16="http://schemas.microsoft.com/office/drawing/2014/main" xmlns="" id="{5BAD9222-F141-4803-AF73-E2DD92E2ABBC}"/>
               </a:ext>
             </a:extLst>
           </p:cNvPr>
@@ -2772,7 +2772,7 @@
           <p:cNvPr id="2" name="Title Placeholder 1">
             <a:extLst>
               <a:ext uri="{FF2B5EF4-FFF2-40B4-BE49-F238E27FC236}">
-                <a16:creationId xmlns:a16="http://schemas.microsoft.com/office/drawing/2014/main" id="{5BF9D404-795C-4EA4-AD01-26740519239C}"/>
+                <a16:creationId xmlns:a16="http://schemas.microsoft.com/office/drawing/2014/main" xmlns="" id="{5BF9D404-795C-4EA4-AD01-26740519239C}"/>
               </a:ext>
             </a:extLst>
           </p:cNvPr>
@@ -2810,7 +2810,7 @@
           <p:cNvPr id="3" name="Text Placeholder 2">
             <a:extLst>
               <a:ext uri="{FF2B5EF4-FFF2-40B4-BE49-F238E27FC236}">
-                <a16:creationId xmlns:a16="http://schemas.microsoft.com/office/drawing/2014/main" id="{DE3FEC7B-48F8-4348-9BC6-68F83B859EE9}"/>
+                <a16:creationId xmlns:a16="http://schemas.microsoft.com/office/drawing/2014/main" xmlns="" id="{DE3FEC7B-48F8-4348-9BC6-68F83B859EE9}"/>
               </a:ext>
             </a:extLst>
           </p:cNvPr>
@@ -2877,7 +2877,7 @@
           <p:cNvPr id="4" name="Date Placeholder 3">
             <a:extLst>
               <a:ext uri="{FF2B5EF4-FFF2-40B4-BE49-F238E27FC236}">
-                <a16:creationId xmlns:a16="http://schemas.microsoft.com/office/drawing/2014/main" id="{31CA1A1D-E2F5-4161-A025-7B911965C2FE}"/>
+                <a16:creationId xmlns:a16="http://schemas.microsoft.com/office/drawing/2014/main" xmlns="" id="{31CA1A1D-E2F5-4161-A025-7B911965C2FE}"/>
               </a:ext>
             </a:extLst>
           </p:cNvPr>
@@ -2913,7 +2913,7 @@
           <a:p>
             <a:fld id="{6C733091-19F0-4DD7-90FE-000B4789B4CF}" type="datetimeFigureOut">
               <a:rPr lang="en-US" smtClean="0"/>
-              <a:t>8/22/2021</a:t>
+              <a:t>8/24/2021</a:t>
             </a:fld>
             <a:endParaRPr lang="en-US"/>
           </a:p>
@@ -2924,7 +2924,7 @@
           <p:cNvPr id="5" name="Footer Placeholder 4">
             <a:extLst>
               <a:ext uri="{FF2B5EF4-FFF2-40B4-BE49-F238E27FC236}">
-                <a16:creationId xmlns:a16="http://schemas.microsoft.com/office/drawing/2014/main" id="{43C7B926-18F3-4C13-AB92-764E10D324FB}"/>
+                <a16:creationId xmlns:a16="http://schemas.microsoft.com/office/drawing/2014/main" xmlns="" id="{43C7B926-18F3-4C13-AB92-764E10D324FB}"/>
               </a:ext>
             </a:extLst>
           </p:cNvPr>
@@ -2967,7 +2967,7 @@
           <p:cNvPr id="6" name="Slide Number Placeholder 5">
             <a:extLst>
               <a:ext uri="{FF2B5EF4-FFF2-40B4-BE49-F238E27FC236}">
-                <a16:creationId xmlns:a16="http://schemas.microsoft.com/office/drawing/2014/main" id="{734FA846-3BF6-46FD-80CF-34B300D244C0}"/>
+                <a16:creationId xmlns:a16="http://schemas.microsoft.com/office/drawing/2014/main" xmlns="" id="{734FA846-3BF6-46FD-80CF-34B300D244C0}"/>
               </a:ext>
             </a:extLst>
           </p:cNvPr>
@@ -3342,8 +3342,8 @@
         </p:nvSpPr>
         <p:spPr>
           <a:xfrm>
-            <a:off x="166089" y="120357"/>
-            <a:ext cx="9144000" cy="698793"/>
+            <a:off x="166088" y="120357"/>
+            <a:ext cx="9755425" cy="698793"/>
           </a:xfrm>
         </p:spPr>
         <p:txBody>
@@ -3354,9 +3354,18 @@
           <a:p>
             <a:pPr algn="l"/>
             <a:r>
-              <a:rPr lang="en-US" sz="4800" dirty="0"/>
-              <a:t>Shell Project</a:t>
-            </a:r>
+              <a:rPr lang="en-US" sz="4000" dirty="0" smtClean="0"/>
+              <a:t>Expense </a:t>
+            </a:r>
+            <a:r>
+              <a:rPr lang="en-US" sz="4000" dirty="0"/>
+              <a:t>Reimbursement </a:t>
+            </a:r>
+            <a:r>
+              <a:rPr lang="en-US" sz="4000" dirty="0" smtClean="0"/>
+              <a:t>System (ERS)</a:t>
+            </a:r>
+            <a:endParaRPr lang="en-US" sz="4000" dirty="0"/>
           </a:p>
         </p:txBody>
       </p:sp>
@@ -3372,8 +3381,8 @@
         </p:nvSpPr>
         <p:spPr>
           <a:xfrm>
-            <a:off x="954820" y="819150"/>
-            <a:ext cx="9144000" cy="5956300"/>
+            <a:off x="569447" y="819149"/>
+            <a:ext cx="9423247" cy="5953982"/>
           </a:xfrm>
         </p:spPr>
         <p:txBody>
@@ -3387,8 +3396,12 @@
               <a:buChar char="•"/>
             </a:pPr>
             <a:r>
+              <a:rPr lang="en-US" dirty="0" smtClean="0"/>
+              <a:t>ERS Project </a:t>
+            </a:r>
+            <a:r>
               <a:rPr lang="en-US" dirty="0"/>
-              <a:t>Shell Project built based on </a:t>
+              <a:t>built based on </a:t>
             </a:r>
             <a:r>
               <a:rPr lang="en-US" dirty="0" err="1"/>
@@ -3405,8 +3418,12 @@
               <a:buChar char="•"/>
             </a:pPr>
             <a:r>
+              <a:rPr lang="en-US" dirty="0" smtClean="0"/>
+              <a:t>Project 0 architecture modified and used </a:t>
+            </a:r>
+            <a:r>
               <a:rPr lang="en-US" dirty="0"/>
-              <a:t>Shell architecture used in this </a:t>
+              <a:t>in this </a:t>
             </a:r>
             <a:r>
               <a:rPr lang="en-US" dirty="0" err="1"/>
@@ -3424,7 +3441,11 @@
             </a:pPr>
             <a:r>
               <a:rPr lang="en-US" dirty="0"/>
-              <a:t>Develop a &lt;insert project&gt;</a:t>
+              <a:t>Develop </a:t>
+            </a:r>
+            <a:r>
+              <a:rPr lang="en-US" dirty="0" smtClean="0"/>
+              <a:t>an Expense Reimbursement System </a:t>
             </a:r>
           </a:p>
           <a:p>
@@ -3433,7 +3454,7 @@
               <a:buChar char="•"/>
             </a:pPr>
             <a:r>
-              <a:rPr lang="en-US" dirty="0"/>
+              <a:rPr lang="en-US" dirty="0" smtClean="0"/>
               <a:t>Technologies:</a:t>
             </a:r>
           </a:p>
@@ -3443,9 +3464,10 @@
               <a:buChar char="•"/>
             </a:pPr>
             <a:r>
-              <a:rPr lang="en-US" dirty="0"/>
+              <a:rPr lang="en-US" dirty="0" smtClean="0"/>
               <a:t>Java 8</a:t>
             </a:r>
+            <a:endParaRPr lang="en-US" dirty="0"/>
           </a:p>
           <a:p>
             <a:pPr marL="800100" lvl="1" indent="-342900" algn="l">
@@ -3454,7 +3476,7 @@
             </a:pPr>
             <a:r>
               <a:rPr lang="en-US" dirty="0"/>
-              <a:t>Test driven development</a:t>
+              <a:t>RESTful API</a:t>
             </a:r>
           </a:p>
           <a:p>
@@ -3463,8 +3485,12 @@
               <a:buChar char="•"/>
             </a:pPr>
             <a:r>
+              <a:rPr lang="en-US" dirty="0" smtClean="0"/>
+              <a:t>User and Reimbursement </a:t>
+            </a:r>
+            <a:r>
               <a:rPr lang="en-US" dirty="0"/>
-              <a:t>RESTful API</a:t>
+              <a:t>resources</a:t>
             </a:r>
           </a:p>
           <a:p>
@@ -3473,8 +3499,55 @@
               <a:buChar char="•"/>
             </a:pPr>
             <a:r>
+              <a:rPr lang="en-US" dirty="0" err="1"/>
+              <a:t>Javalin</a:t>
+            </a:r>
+            <a:r>
+              <a:rPr lang="en-US" dirty="0" smtClean="0"/>
+              <a:t>, </a:t>
+            </a:r>
+            <a:r>
+              <a:rPr lang="en-US" dirty="0" err="1"/>
+              <a:t>Logback</a:t>
+            </a:r>
+            <a:r>
               <a:rPr lang="en-US" dirty="0"/>
-              <a:t>Clients and Accounts resources</a:t>
+              <a:t> / SLF4J, JUnit, </a:t>
+            </a:r>
+            <a:r>
+              <a:rPr lang="en-US" dirty="0" err="1"/>
+              <a:t>Mockito</a:t>
+            </a:r>
+            <a:r>
+              <a:rPr lang="en-US" dirty="0" smtClean="0"/>
+              <a:t>,</a:t>
+            </a:r>
+            <a:r>
+              <a:rPr lang="en-US" dirty="0" smtClean="0"/>
+              <a:t> </a:t>
+            </a:r>
+            <a:r>
+              <a:rPr lang="en-US" dirty="0"/>
+              <a:t>Hibernate, </a:t>
+            </a:r>
+            <a:r>
+              <a:rPr lang="en-US" dirty="0" smtClean="0"/>
+              <a:t>JDBC, </a:t>
+            </a:r>
+            <a:r>
+              <a:rPr lang="en-US" dirty="0" err="1"/>
+              <a:t>MariaDB</a:t>
+            </a:r>
+            <a:endParaRPr lang="en-US" dirty="0"/>
+          </a:p>
+          <a:p>
+            <a:pPr marL="342900" indent="-342900" algn="l">
+              <a:buFont typeface="Arial" panose="020B0604020202020204" pitchFamily="34" charset="0"/>
+              <a:buChar char="•"/>
+            </a:pPr>
+            <a:r>
+              <a:rPr lang="en-US" dirty="0"/>
+              <a:t>HTTP Endpoints </a:t>
             </a:r>
           </a:p>
           <a:p>
@@ -3483,34 +3556,14 @@
               <a:buChar char="•"/>
             </a:pPr>
             <a:r>
-              <a:rPr lang="en-US" dirty="0" err="1"/>
-              <a:t>Javalin</a:t>
-            </a:r>
-            <a:r>
-              <a:rPr lang="en-US" dirty="0"/>
-              <a:t>, JDBC, </a:t>
-            </a:r>
-            <a:r>
-              <a:rPr lang="en-US" dirty="0" err="1"/>
-              <a:t>Logback</a:t>
-            </a:r>
-            <a:r>
-              <a:rPr lang="en-US" dirty="0"/>
-              <a:t> / SLF4J, JUnit, </a:t>
-            </a:r>
-            <a:r>
-              <a:rPr lang="en-US" dirty="0" err="1"/>
-              <a:t>Mockito</a:t>
-            </a:r>
-            <a:r>
-              <a:rPr lang="en-US" dirty="0"/>
-              <a:t>, </a:t>
-            </a:r>
-            <a:r>
-              <a:rPr lang="en-US" dirty="0" err="1"/>
-              <a:t>MariaDB</a:t>
-            </a:r>
-            <a:endParaRPr lang="en-US" dirty="0"/>
+              <a:rPr lang="en-US" dirty="0" smtClean="0"/>
+              <a:t>Login, User, and Reimbursement </a:t>
+            </a:r>
+            <a:r>
+              <a:rPr lang="en-US" dirty="0" err="1" smtClean="0"/>
+              <a:t>enpoints</a:t>
+            </a:r>
+            <a:endParaRPr lang="en-US" b="1" dirty="0"/>
           </a:p>
           <a:p>
             <a:pPr marL="342900" indent="-342900" algn="l">
@@ -3519,7 +3572,7 @@
             </a:pPr>
             <a:r>
               <a:rPr lang="en-US" dirty="0"/>
-              <a:t>HTTP Endpoints (minimum of 11)</a:t>
+              <a:t>General Requirements </a:t>
             </a:r>
           </a:p>
           <a:p>
@@ -3529,7 +3582,7 @@
             </a:pPr>
             <a:r>
               <a:rPr lang="en-US" dirty="0"/>
-              <a:t>POST (2), PUT(2), DELETE (2), GET (5)</a:t>
+              <a:t>3 layered architecture</a:t>
             </a:r>
           </a:p>
           <a:p>
@@ -3537,7 +3590,145 @@
               <a:buFont typeface="Arial" panose="020B0604020202020204" pitchFamily="34" charset="0"/>
               <a:buChar char="•"/>
             </a:pPr>
-            <a:endParaRPr lang="en-US" b="1" dirty="0"/>
+            <a:r>
+              <a:rPr lang="en-US" dirty="0"/>
+              <a:t>Controller (presentation) layer</a:t>
+            </a:r>
+          </a:p>
+          <a:p>
+            <a:pPr marL="1257300" lvl="2" indent="-342900" algn="l">
+              <a:buFont typeface="Arial" panose="020B0604020202020204" pitchFamily="34" charset="0"/>
+              <a:buChar char="•"/>
+            </a:pPr>
+            <a:r>
+              <a:rPr lang="en-US" dirty="0"/>
+              <a:t>Service (business logic) layer</a:t>
+            </a:r>
+          </a:p>
+          <a:p>
+            <a:pPr marL="1257300" lvl="2" indent="-342900" algn="l">
+              <a:buFont typeface="Arial" panose="020B0604020202020204" pitchFamily="34" charset="0"/>
+              <a:buChar char="•"/>
+            </a:pPr>
+            <a:r>
+              <a:rPr lang="en-US" dirty="0" smtClean="0"/>
+              <a:t>Data </a:t>
+            </a:r>
+            <a:r>
+              <a:rPr lang="en-US" dirty="0"/>
+              <a:t>Access layer</a:t>
+            </a:r>
+          </a:p>
+          <a:p>
+            <a:pPr marL="800100" lvl="1" indent="-342900" algn="l">
+              <a:buFont typeface="Arial" panose="020B0604020202020204" pitchFamily="34" charset="0"/>
+              <a:buChar char="•"/>
+            </a:pPr>
+            <a:r>
+              <a:rPr lang="en-US" dirty="0" smtClean="0"/>
+              <a:t>Utilize </a:t>
+            </a:r>
+            <a:r>
+              <a:rPr lang="en-US" dirty="0" err="1"/>
+              <a:t>Mockito</a:t>
+            </a:r>
+            <a:r>
+              <a:rPr lang="en-US" dirty="0"/>
+              <a:t> in order to mock DAO dependencies</a:t>
+            </a:r>
+          </a:p>
+          <a:p>
+            <a:pPr marL="800100" lvl="1" indent="-342900" algn="l">
+              <a:buFont typeface="Arial" panose="020B0604020202020204" pitchFamily="34" charset="0"/>
+              <a:buChar char="•"/>
+            </a:pPr>
+            <a:r>
+              <a:rPr lang="en-US" dirty="0"/>
+              <a:t>Logging accomplished using </a:t>
+            </a:r>
+            <a:r>
+              <a:rPr lang="en-US" dirty="0" err="1"/>
+              <a:t>Logback</a:t>
+            </a:r>
+            <a:endParaRPr lang="en-US" dirty="0"/>
+          </a:p>
+          <a:p>
+            <a:pPr marL="800100" lvl="1" indent="-342900" algn="l">
+              <a:buFont typeface="Arial" panose="020B0604020202020204" pitchFamily="34" charset="0"/>
+              <a:buChar char="•"/>
+            </a:pPr>
+            <a:r>
+              <a:rPr lang="en-US" dirty="0"/>
+              <a:t>Considerations for logging (Http Requests, Methods being executed, Exceptions)</a:t>
+            </a:r>
+          </a:p>
+          <a:p>
+            <a:pPr marL="800100" lvl="1" indent="-342900" algn="l">
+              <a:buFont typeface="Arial" panose="020B0604020202020204" pitchFamily="34" charset="0"/>
+              <a:buChar char="•"/>
+            </a:pPr>
+            <a:r>
+              <a:rPr lang="en-US" dirty="0"/>
+              <a:t>Hibernate database modeling and connectivity</a:t>
+            </a:r>
+            <a:endParaRPr lang="en-US" dirty="0" smtClean="0"/>
+          </a:p>
+          <a:p>
+            <a:pPr marL="800100" lvl="1" indent="-342900" algn="l">
+              <a:buFont typeface="Arial" panose="020B0604020202020204" pitchFamily="34" charset="0"/>
+              <a:buChar char="•"/>
+            </a:pPr>
+            <a:r>
+              <a:rPr lang="en-US" dirty="0" smtClean="0"/>
+              <a:t>Hibernate </a:t>
+            </a:r>
+            <a:r>
+              <a:rPr lang="en-US" dirty="0" smtClean="0"/>
+              <a:t>HQL object orientated schema creation, data loads, record creation and updates</a:t>
+            </a:r>
+          </a:p>
+          <a:p>
+            <a:pPr marL="800100" lvl="1" indent="-342900" algn="l">
+              <a:buFont typeface="Arial" panose="020B0604020202020204" pitchFamily="34" charset="0"/>
+              <a:buChar char="•"/>
+            </a:pPr>
+            <a:r>
+              <a:rPr lang="en-US" dirty="0" smtClean="0"/>
+              <a:t>Utilize Hybrid for database modeling and connectivity</a:t>
+            </a:r>
+          </a:p>
+          <a:p>
+            <a:pPr marL="800100" lvl="1" indent="-342900" algn="l">
+              <a:buFont typeface="Arial" panose="020B0604020202020204" pitchFamily="34" charset="0"/>
+              <a:buChar char="•"/>
+            </a:pPr>
+            <a:r>
+              <a:rPr lang="en-US" dirty="0" smtClean="0"/>
+              <a:t>Utilizes the endpoint Controller, Service layer validation, and Data </a:t>
+            </a:r>
+            <a:r>
+              <a:rPr lang="en-US" dirty="0"/>
+              <a:t>Access Object (DAO) design pattern</a:t>
+            </a:r>
+          </a:p>
+          <a:p>
+            <a:pPr marL="800100" lvl="1" indent="-342900" algn="l">
+              <a:buFont typeface="Arial" panose="020B0604020202020204" pitchFamily="34" charset="0"/>
+              <a:buChar char="•"/>
+            </a:pPr>
+            <a:r>
+              <a:rPr lang="en-US" dirty="0" err="1"/>
+              <a:t>MariaDB</a:t>
+            </a:r>
+            <a:r>
+              <a:rPr lang="en-US" dirty="0"/>
+              <a:t> (locally or ideally Amazon Web Services (AWS</a:t>
+            </a:r>
+            <a:r>
+              <a:rPr lang="en-US" dirty="0" smtClean="0"/>
+              <a:t>)) using Hibernate</a:t>
+            </a:r>
+            <a:endParaRPr lang="en-US" dirty="0"/>
           </a:p>
           <a:p>
             <a:pPr marL="342900" indent="-342900" algn="l">
@@ -3545,8 +3736,8 @@
               <a:buChar char="•"/>
             </a:pPr>
             <a:r>
-              <a:rPr lang="en-US" dirty="0"/>
-              <a:t>General Requirements </a:t>
+              <a:rPr lang="en-US" dirty="0" smtClean="0"/>
+              <a:t>Extend concepts created in Project 0</a:t>
             </a:r>
           </a:p>
           <a:p>
@@ -3555,38 +3746,16 @@
               <a:buChar char="•"/>
             </a:pPr>
             <a:r>
-              <a:rPr lang="en-US" dirty="0"/>
-              <a:t>3 layered architecture</a:t>
-            </a:r>
-          </a:p>
-          <a:p>
-            <a:pPr marL="1257300" lvl="2" indent="-342900" algn="l">
-              <a:buFont typeface="Arial" panose="020B0604020202020204" pitchFamily="34" charset="0"/>
-              <a:buChar char="•"/>
-            </a:pPr>
-            <a:r>
-              <a:rPr lang="en-US" dirty="0"/>
-              <a:t>Controller (presentation) layer</a:t>
-            </a:r>
-          </a:p>
-          <a:p>
-            <a:pPr marL="1257300" lvl="2" indent="-342900" algn="l">
-              <a:buFont typeface="Arial" panose="020B0604020202020204" pitchFamily="34" charset="0"/>
-              <a:buChar char="•"/>
-            </a:pPr>
-            <a:r>
-              <a:rPr lang="en-US" dirty="0"/>
-              <a:t>Service (business logic) layer</a:t>
-            </a:r>
-          </a:p>
-          <a:p>
-            <a:pPr marL="1257300" lvl="2" indent="-342900" algn="l">
-              <a:buFont typeface="Arial" panose="020B0604020202020204" pitchFamily="34" charset="0"/>
-              <a:buChar char="•"/>
-            </a:pPr>
-            <a:r>
-              <a:rPr lang="en-US" dirty="0"/>
-              <a:t>Data Access layer</a:t>
+              <a:rPr lang="en-US" dirty="0" smtClean="0"/>
+              <a:t>Fully implements a </a:t>
+            </a:r>
+            <a:r>
+              <a:rPr lang="en-US" dirty="0" err="1" smtClean="0"/>
+              <a:t>GenericDAO</a:t>
+            </a:r>
+            <a:r>
+              <a:rPr lang="en-US" dirty="0" smtClean="0"/>
+              <a:t>&lt;T&gt; DAO model</a:t>
             </a:r>
           </a:p>
           <a:p>
@@ -3595,143 +3764,9 @@
               <a:buChar char="•"/>
             </a:pPr>
             <a:r>
-              <a:rPr lang="en-US" dirty="0"/>
-              <a:t>80-90% JUnit test coverage for the service layer</a:t>
-            </a:r>
-          </a:p>
-          <a:p>
-            <a:pPr marL="800100" lvl="1" indent="-342900" algn="l">
-              <a:buFont typeface="Arial" panose="020B0604020202020204" pitchFamily="34" charset="0"/>
-              <a:buChar char="•"/>
-            </a:pPr>
-            <a:r>
-              <a:rPr lang="en-US" dirty="0"/>
-              <a:t>Utilize </a:t>
-            </a:r>
-            <a:r>
-              <a:rPr lang="en-US" dirty="0" err="1"/>
-              <a:t>Mockito</a:t>
-            </a:r>
-            <a:r>
-              <a:rPr lang="en-US" dirty="0"/>
-              <a:t> in order to mock DAO dependencies</a:t>
-            </a:r>
-          </a:p>
-          <a:p>
-            <a:pPr marL="800100" lvl="1" indent="-342900" algn="l">
-              <a:buFont typeface="Arial" panose="020B0604020202020204" pitchFamily="34" charset="0"/>
-              <a:buChar char="•"/>
-            </a:pPr>
-            <a:r>
-              <a:rPr lang="en-US" dirty="0"/>
-              <a:t>Logging accomplished using </a:t>
-            </a:r>
-            <a:r>
-              <a:rPr lang="en-US" dirty="0" err="1"/>
-              <a:t>Logback</a:t>
-            </a:r>
-            <a:endParaRPr lang="en-US" dirty="0"/>
-          </a:p>
-          <a:p>
-            <a:pPr marL="800100" lvl="1" indent="-342900" algn="l">
-              <a:buFont typeface="Arial" panose="020B0604020202020204" pitchFamily="34" charset="0"/>
-              <a:buChar char="•"/>
-            </a:pPr>
-            <a:r>
-              <a:rPr lang="en-US" dirty="0"/>
-              <a:t>Considerations for logging (Http Requests, Methods being executed, Exceptions)</a:t>
-            </a:r>
-          </a:p>
-          <a:p>
-            <a:pPr marL="800100" lvl="1" indent="-342900" algn="l">
-              <a:buFont typeface="Arial" panose="020B0604020202020204" pitchFamily="34" charset="0"/>
-              <a:buChar char="•"/>
-            </a:pPr>
-            <a:r>
-              <a:rPr lang="en-US" dirty="0"/>
-              <a:t>SQL script creating a table schema and performs initial data load</a:t>
-            </a:r>
-          </a:p>
-          <a:p>
-            <a:pPr marL="800100" lvl="1" indent="-342900" algn="l">
-              <a:buFont typeface="Arial" panose="020B0604020202020204" pitchFamily="34" charset="0"/>
-              <a:buChar char="•"/>
-            </a:pPr>
-            <a:r>
-              <a:rPr lang="en-US" dirty="0"/>
-              <a:t>Utilize Hybrid for database modeling and connectivity</a:t>
-            </a:r>
-          </a:p>
-          <a:p>
-            <a:pPr marL="800100" lvl="1" indent="-342900" algn="l">
-              <a:buFont typeface="Arial" panose="020B0604020202020204" pitchFamily="34" charset="0"/>
-              <a:buChar char="•"/>
-            </a:pPr>
-            <a:r>
-              <a:rPr lang="en-US" dirty="0"/>
-              <a:t>Must utilize the Data Access Object (DAO) design pattern</a:t>
-            </a:r>
-          </a:p>
-          <a:p>
-            <a:pPr marL="800100" lvl="1" indent="-342900" algn="l">
-              <a:buFont typeface="Arial" panose="020B0604020202020204" pitchFamily="34" charset="0"/>
-              <a:buChar char="•"/>
-            </a:pPr>
-            <a:r>
-              <a:rPr lang="en-US" dirty="0" err="1"/>
-              <a:t>MariaDB</a:t>
-            </a:r>
-            <a:r>
-              <a:rPr lang="en-US" dirty="0"/>
-              <a:t> (locally or ideally Amazon Web Services (AWS))</a:t>
-            </a:r>
-          </a:p>
-          <a:p>
-            <a:pPr marL="342900" indent="-342900" algn="l">
-              <a:buFont typeface="Arial" panose="020B0604020202020204" pitchFamily="34" charset="0"/>
-              <a:buChar char="•"/>
-            </a:pPr>
-            <a:r>
-              <a:rPr lang="en-US" dirty="0"/>
-              <a:t>Stretch Goals</a:t>
-            </a:r>
-          </a:p>
-          <a:p>
-            <a:pPr marL="800100" lvl="1" indent="-342900" algn="l">
-              <a:buFont typeface="Arial" panose="020B0604020202020204" pitchFamily="34" charset="0"/>
-              <a:buChar char="•"/>
-            </a:pPr>
-            <a:r>
-              <a:rPr lang="en-US" dirty="0"/>
-              <a:t>Postman tests to verify API functionality</a:t>
-            </a:r>
-          </a:p>
-          <a:p>
-            <a:pPr marL="800100" lvl="1" indent="-342900" algn="l">
-              <a:buFont typeface="Arial" panose="020B0604020202020204" pitchFamily="34" charset="0"/>
-              <a:buChar char="•"/>
-            </a:pPr>
-            <a:endParaRPr lang="en-US" dirty="0"/>
-          </a:p>
-          <a:p>
-            <a:pPr marL="342900" indent="-342900" algn="l">
-              <a:buFont typeface="Arial" panose="020B0604020202020204" pitchFamily="34" charset="0"/>
-              <a:buChar char="•"/>
-            </a:pPr>
-            <a:endParaRPr lang="en-US" dirty="0"/>
-          </a:p>
-          <a:p>
-            <a:pPr marL="800100" lvl="1" indent="-342900" algn="l">
-              <a:buFont typeface="Arial" panose="020B0604020202020204" pitchFamily="34" charset="0"/>
-              <a:buChar char="•"/>
-            </a:pPr>
-            <a:endParaRPr lang="en-US" dirty="0"/>
-          </a:p>
-          <a:p>
-            <a:pPr marL="342900" indent="-342900" algn="l">
-              <a:buFont typeface="Arial" panose="020B0604020202020204" pitchFamily="34" charset="0"/>
-              <a:buChar char="•"/>
-            </a:pPr>
+              <a:rPr lang="en-US" dirty="0" smtClean="0"/>
+              <a:t>Fully extends a base Data Transfer Object (DTO) model</a:t>
+            </a:r>
             <a:endParaRPr lang="en-US" dirty="0"/>
           </a:p>
         </p:txBody>
@@ -3771,7 +3806,7 @@
           <p:cNvPr id="53" name="TextBox 52">
             <a:extLst>
               <a:ext uri="{FF2B5EF4-FFF2-40B4-BE49-F238E27FC236}">
-                <a16:creationId xmlns:a16="http://schemas.microsoft.com/office/drawing/2014/main" id="{CFFD1938-4192-486E-9D53-D9784518AD14}"/>
+                <a16:creationId xmlns:a16="http://schemas.microsoft.com/office/drawing/2014/main" xmlns="" id="{CFFD1938-4192-486E-9D53-D9784518AD14}"/>
               </a:ext>
             </a:extLst>
           </p:cNvPr>
@@ -3780,7 +3815,7 @@
         </p:nvSpPr>
         <p:spPr>
           <a:xfrm>
-            <a:off x="0" y="30549"/>
+            <a:off x="180690" y="103547"/>
             <a:ext cx="4944934" cy="369332"/>
           </a:xfrm>
           <a:prstGeom prst="rect">
@@ -3806,7 +3841,7 @@
           <p:cNvPr id="2" name="Rectangle 1">
             <a:extLst>
               <a:ext uri="{FF2B5EF4-FFF2-40B4-BE49-F238E27FC236}">
-                <a16:creationId xmlns:a16="http://schemas.microsoft.com/office/drawing/2014/main" id="{AA0ED7A8-1532-4365-90ED-3F304B8440CE}"/>
+                <a16:creationId xmlns:a16="http://schemas.microsoft.com/office/drawing/2014/main" xmlns="" id="{AA0ED7A8-1532-4365-90ED-3F304B8440CE}"/>
               </a:ext>
             </a:extLst>
           </p:cNvPr>
@@ -3815,7 +3850,7 @@
         </p:nvSpPr>
         <p:spPr>
           <a:xfrm>
-            <a:off x="655608" y="759125"/>
+            <a:off x="4603408" y="1334048"/>
             <a:ext cx="1690777" cy="1061049"/>
           </a:xfrm>
           <a:prstGeom prst="rect">
@@ -3857,6 +3892,807 @@
           </a:p>
         </p:txBody>
       </p:sp>
+      <p:sp>
+        <p:nvSpPr>
+          <p:cNvPr id="4" name="Rectangle 3">
+            <a:extLst>
+              <a:ext uri="{FF2B5EF4-FFF2-40B4-BE49-F238E27FC236}">
+                <a16:creationId xmlns:a16="http://schemas.microsoft.com/office/drawing/2014/main" xmlns="" id="{21B869D6-66CB-4B38-975F-B7FEB6AA9B13}"/>
+              </a:ext>
+            </a:extLst>
+          </p:cNvPr>
+          <p:cNvSpPr/>
+          <p:nvPr/>
+        </p:nvSpPr>
+        <p:spPr>
+          <a:xfrm>
+            <a:off x="4026596" y="3586912"/>
+            <a:ext cx="2844400" cy="224286"/>
+          </a:xfrm>
+          <a:prstGeom prst="rect">
+            <a:avLst/>
+          </a:prstGeom>
+        </p:spPr>
+        <p:style>
+          <a:lnRef idx="2">
+            <a:schemeClr val="accent3">
+              <a:shade val="50000"/>
+            </a:schemeClr>
+          </a:lnRef>
+          <a:fillRef idx="1">
+            <a:schemeClr val="accent3"/>
+          </a:fillRef>
+          <a:effectRef idx="0">
+            <a:schemeClr val="accent3"/>
+          </a:effectRef>
+          <a:fontRef idx="minor">
+            <a:schemeClr val="lt1"/>
+          </a:fontRef>
+        </p:style>
+        <p:txBody>
+          <a:bodyPr rtlCol="0" anchor="ctr"/>
+          <a:lstStyle/>
+          <a:p>
+            <a:pPr algn="ctr"/>
+            <a:r>
+              <a:rPr lang="en-US" dirty="0"/>
+              <a:t>HTTP Request / Response</a:t>
+            </a:r>
+          </a:p>
+        </p:txBody>
+      </p:sp>
+      <p:sp>
+        <p:nvSpPr>
+          <p:cNvPr id="5" name="Rectangle 4"/>
+          <p:cNvSpPr/>
+          <p:nvPr/>
+        </p:nvSpPr>
+        <p:spPr>
+          <a:xfrm>
+            <a:off x="4615269" y="5154561"/>
+            <a:ext cx="1678916" cy="991056"/>
+          </a:xfrm>
+          <a:prstGeom prst="rect">
+            <a:avLst/>
+          </a:prstGeom>
+          <a:solidFill>
+            <a:schemeClr val="accent6"/>
+          </a:solidFill>
+        </p:spPr>
+        <p:style>
+          <a:lnRef idx="2">
+            <a:schemeClr val="accent1">
+              <a:shade val="50000"/>
+            </a:schemeClr>
+          </a:lnRef>
+          <a:fillRef idx="1">
+            <a:schemeClr val="accent1"/>
+          </a:fillRef>
+          <a:effectRef idx="0">
+            <a:schemeClr val="accent1"/>
+          </a:effectRef>
+          <a:fontRef idx="minor">
+            <a:schemeClr val="lt1"/>
+          </a:fontRef>
+        </p:style>
+        <p:txBody>
+          <a:bodyPr rtlCol="0" anchor="ctr"/>
+          <a:lstStyle/>
+          <a:p>
+            <a:pPr algn="ctr"/>
+            <a:r>
+              <a:rPr lang="en-US" sz="1000" dirty="0"/>
+              <a:t>com.tlw8253.controller</a:t>
+            </a:r>
+          </a:p>
+          <a:p>
+            <a:pPr algn="ctr"/>
+            <a:r>
+              <a:rPr lang="en-US" dirty="0" err="1" smtClean="0"/>
+              <a:t>Login</a:t>
+            </a:r>
+            <a:r>
+              <a:rPr lang="en-US" dirty="0" err="1" smtClean="0"/>
+              <a:t>Controller</a:t>
+            </a:r>
+            <a:endParaRPr lang="en-US" dirty="0"/>
+          </a:p>
+        </p:txBody>
+      </p:sp>
+      <p:cxnSp>
+        <p:nvCxnSpPr>
+          <p:cNvPr id="6" name="Straight Arrow Connector 5"/>
+          <p:cNvCxnSpPr>
+            <a:cxnSpLocks/>
+            <a:stCxn id="4" idx="2"/>
+            <a:endCxn id="5" idx="0"/>
+          </p:cNvCxnSpPr>
+          <p:nvPr/>
+        </p:nvCxnSpPr>
+        <p:spPr>
+          <a:xfrm>
+            <a:off x="5448796" y="3811198"/>
+            <a:ext cx="5931" cy="1343363"/>
+          </a:xfrm>
+          <a:prstGeom prst="straightConnector1">
+            <a:avLst/>
+          </a:prstGeom>
+          <a:ln>
+            <a:tailEnd type="triangle"/>
+          </a:ln>
+        </p:spPr>
+        <p:style>
+          <a:lnRef idx="1">
+            <a:schemeClr val="accent1"/>
+          </a:lnRef>
+          <a:fillRef idx="0">
+            <a:schemeClr val="accent1"/>
+          </a:fillRef>
+          <a:effectRef idx="0">
+            <a:schemeClr val="accent1"/>
+          </a:effectRef>
+          <a:fontRef idx="minor">
+            <a:schemeClr val="tx1"/>
+          </a:fontRef>
+        </p:style>
+      </p:cxnSp>
+      <p:sp>
+        <p:nvSpPr>
+          <p:cNvPr id="7" name="TextBox 6">
+            <a:extLst>
+              <a:ext uri="{FF2B5EF4-FFF2-40B4-BE49-F238E27FC236}">
+                <a16:creationId xmlns:a16="http://schemas.microsoft.com/office/drawing/2014/main" xmlns="" id="{E0BBD6C8-C8F2-40C5-AA64-85961A11ADC2}"/>
+              </a:ext>
+            </a:extLst>
+          </p:cNvPr>
+          <p:cNvSpPr txBox="1"/>
+          <p:nvPr/>
+        </p:nvSpPr>
+        <p:spPr>
+          <a:xfrm>
+            <a:off x="5391776" y="4626920"/>
+            <a:ext cx="843694" cy="276999"/>
+          </a:xfrm>
+          <a:prstGeom prst="rect">
+            <a:avLst/>
+          </a:prstGeom>
+          <a:noFill/>
+        </p:spPr>
+        <p:txBody>
+          <a:bodyPr wrap="square" rtlCol="0">
+            <a:spAutoFit/>
+          </a:bodyPr>
+          <a:lstStyle/>
+          <a:p>
+            <a:r>
+              <a:rPr lang="en-US" sz="1200" dirty="0"/>
+              <a:t>processes</a:t>
+            </a:r>
+          </a:p>
+        </p:txBody>
+      </p:sp>
+      <p:cxnSp>
+        <p:nvCxnSpPr>
+          <p:cNvPr id="10" name="Elbow Connector 9"/>
+          <p:cNvCxnSpPr>
+            <a:stCxn id="5" idx="0"/>
+            <a:endCxn id="4" idx="2"/>
+          </p:cNvCxnSpPr>
+          <p:nvPr/>
+        </p:nvCxnSpPr>
+        <p:spPr>
+          <a:xfrm rot="16200000" flipV="1">
+            <a:off x="4780081" y="4479914"/>
+            <a:ext cx="1343363" cy="5931"/>
+          </a:xfrm>
+          <a:prstGeom prst="bentConnector3">
+            <a:avLst/>
+          </a:prstGeom>
+          <a:ln>
+            <a:tailEnd type="triangle"/>
+          </a:ln>
+        </p:spPr>
+        <p:style>
+          <a:lnRef idx="1">
+            <a:schemeClr val="accent1"/>
+          </a:lnRef>
+          <a:fillRef idx="0">
+            <a:schemeClr val="accent1"/>
+          </a:fillRef>
+          <a:effectRef idx="0">
+            <a:schemeClr val="accent1"/>
+          </a:effectRef>
+          <a:fontRef idx="minor">
+            <a:schemeClr val="tx1"/>
+          </a:fontRef>
+        </p:style>
+      </p:cxnSp>
+      <p:cxnSp>
+        <p:nvCxnSpPr>
+          <p:cNvPr id="12" name="Straight Arrow Connector 11"/>
+          <p:cNvCxnSpPr>
+            <a:stCxn id="2" idx="2"/>
+            <a:endCxn id="4" idx="0"/>
+          </p:cNvCxnSpPr>
+          <p:nvPr/>
+        </p:nvCxnSpPr>
+        <p:spPr>
+          <a:xfrm flipH="1">
+            <a:off x="5448796" y="2395097"/>
+            <a:ext cx="1" cy="1191815"/>
+          </a:xfrm>
+          <a:prstGeom prst="straightConnector1">
+            <a:avLst/>
+          </a:prstGeom>
+          <a:ln>
+            <a:tailEnd type="triangle"/>
+          </a:ln>
+        </p:spPr>
+        <p:style>
+          <a:lnRef idx="1">
+            <a:schemeClr val="accent1"/>
+          </a:lnRef>
+          <a:fillRef idx="0">
+            <a:schemeClr val="accent1"/>
+          </a:fillRef>
+          <a:effectRef idx="0">
+            <a:schemeClr val="accent1"/>
+          </a:effectRef>
+          <a:fontRef idx="minor">
+            <a:schemeClr val="tx1"/>
+          </a:fontRef>
+        </p:style>
+      </p:cxnSp>
+      <p:cxnSp>
+        <p:nvCxnSpPr>
+          <p:cNvPr id="14" name="Straight Arrow Connector 13"/>
+          <p:cNvCxnSpPr>
+            <a:stCxn id="4" idx="0"/>
+            <a:endCxn id="2" idx="2"/>
+          </p:cNvCxnSpPr>
+          <p:nvPr/>
+        </p:nvCxnSpPr>
+        <p:spPr>
+          <a:xfrm flipV="1">
+            <a:off x="5448796" y="2395097"/>
+            <a:ext cx="1" cy="1191815"/>
+          </a:xfrm>
+          <a:prstGeom prst="straightConnector1">
+            <a:avLst/>
+          </a:prstGeom>
+          <a:ln>
+            <a:tailEnd type="triangle"/>
+          </a:ln>
+        </p:spPr>
+        <p:style>
+          <a:lnRef idx="1">
+            <a:schemeClr val="accent1"/>
+          </a:lnRef>
+          <a:fillRef idx="0">
+            <a:schemeClr val="accent1"/>
+          </a:fillRef>
+          <a:effectRef idx="0">
+            <a:schemeClr val="accent1"/>
+          </a:effectRef>
+          <a:fontRef idx="minor">
+            <a:schemeClr val="tx1"/>
+          </a:fontRef>
+        </p:style>
+      </p:cxnSp>
+      <p:sp>
+        <p:nvSpPr>
+          <p:cNvPr id="16" name="Rectangle 15">
+            <a:extLst>
+              <a:ext uri="{FF2B5EF4-FFF2-40B4-BE49-F238E27FC236}">
+                <a16:creationId xmlns:a16="http://schemas.microsoft.com/office/drawing/2014/main" xmlns="" id="{AA0ED7A8-1532-4365-90ED-3F304B8440CE}"/>
+              </a:ext>
+            </a:extLst>
+          </p:cNvPr>
+          <p:cNvSpPr/>
+          <p:nvPr/>
+        </p:nvSpPr>
+        <p:spPr>
+          <a:xfrm>
+            <a:off x="8358653" y="1318743"/>
+            <a:ext cx="1690777" cy="1061049"/>
+          </a:xfrm>
+          <a:prstGeom prst="rect">
+            <a:avLst/>
+          </a:prstGeom>
+        </p:spPr>
+        <p:style>
+          <a:lnRef idx="2">
+            <a:schemeClr val="accent3">
+              <a:shade val="50000"/>
+            </a:schemeClr>
+          </a:lnRef>
+          <a:fillRef idx="1">
+            <a:schemeClr val="accent3"/>
+          </a:fillRef>
+          <a:effectRef idx="0">
+            <a:schemeClr val="accent3"/>
+          </a:effectRef>
+          <a:fontRef idx="minor">
+            <a:schemeClr val="lt1"/>
+          </a:fontRef>
+        </p:style>
+        <p:txBody>
+          <a:bodyPr rtlCol="0" anchor="ctr"/>
+          <a:lstStyle/>
+          <a:p>
+            <a:pPr algn="ctr"/>
+            <a:r>
+              <a:rPr lang="en-US" sz="1200" dirty="0"/>
+              <a:t>ERS-Client</a:t>
+            </a:r>
+          </a:p>
+          <a:p>
+            <a:pPr algn="ctr"/>
+            <a:r>
+              <a:rPr lang="en-US" sz="1300" dirty="0" smtClean="0"/>
+              <a:t>Reimbursement.html</a:t>
+            </a:r>
+            <a:endParaRPr lang="en-US" sz="1300" dirty="0"/>
+          </a:p>
+        </p:txBody>
+      </p:sp>
+      <p:sp>
+        <p:nvSpPr>
+          <p:cNvPr id="17" name="Rectangle 16">
+            <a:extLst>
+              <a:ext uri="{FF2B5EF4-FFF2-40B4-BE49-F238E27FC236}">
+                <a16:creationId xmlns:a16="http://schemas.microsoft.com/office/drawing/2014/main" xmlns="" id="{AA0ED7A8-1532-4365-90ED-3F304B8440CE}"/>
+              </a:ext>
+            </a:extLst>
+          </p:cNvPr>
+          <p:cNvSpPr/>
+          <p:nvPr/>
+        </p:nvSpPr>
+        <p:spPr>
+          <a:xfrm>
+            <a:off x="962380" y="1334048"/>
+            <a:ext cx="1690777" cy="1061049"/>
+          </a:xfrm>
+          <a:prstGeom prst="rect">
+            <a:avLst/>
+          </a:prstGeom>
+        </p:spPr>
+        <p:style>
+          <a:lnRef idx="2">
+            <a:schemeClr val="accent3">
+              <a:shade val="50000"/>
+            </a:schemeClr>
+          </a:lnRef>
+          <a:fillRef idx="1">
+            <a:schemeClr val="accent3"/>
+          </a:fillRef>
+          <a:effectRef idx="0">
+            <a:schemeClr val="accent3"/>
+          </a:effectRef>
+          <a:fontRef idx="minor">
+            <a:schemeClr val="lt1"/>
+          </a:fontRef>
+        </p:style>
+        <p:txBody>
+          <a:bodyPr rtlCol="0" anchor="ctr"/>
+          <a:lstStyle/>
+          <a:p>
+            <a:pPr algn="ctr"/>
+            <a:r>
+              <a:rPr lang="en-US" sz="1200" dirty="0"/>
+              <a:t>ERS-Client</a:t>
+            </a:r>
+          </a:p>
+          <a:p>
+            <a:pPr algn="ctr"/>
+            <a:r>
+              <a:rPr lang="en-US" dirty="0"/>
+              <a:t>Finance.html</a:t>
+            </a:r>
+            <a:endParaRPr lang="en-US" dirty="0"/>
+          </a:p>
+        </p:txBody>
+      </p:sp>
+      <p:cxnSp>
+        <p:nvCxnSpPr>
+          <p:cNvPr id="18" name="Straight Arrow Connector 17"/>
+          <p:cNvCxnSpPr>
+            <a:stCxn id="2" idx="3"/>
+            <a:endCxn id="16" idx="1"/>
+          </p:cNvCxnSpPr>
+          <p:nvPr/>
+        </p:nvCxnSpPr>
+        <p:spPr>
+          <a:xfrm flipV="1">
+            <a:off x="6294185" y="1849268"/>
+            <a:ext cx="2064468" cy="15305"/>
+          </a:xfrm>
+          <a:prstGeom prst="straightConnector1">
+            <a:avLst/>
+          </a:prstGeom>
+          <a:ln>
+            <a:tailEnd type="triangle"/>
+          </a:ln>
+        </p:spPr>
+        <p:style>
+          <a:lnRef idx="1">
+            <a:schemeClr val="accent1"/>
+          </a:lnRef>
+          <a:fillRef idx="0">
+            <a:schemeClr val="accent1"/>
+          </a:fillRef>
+          <a:effectRef idx="0">
+            <a:schemeClr val="accent1"/>
+          </a:effectRef>
+          <a:fontRef idx="minor">
+            <a:schemeClr val="tx1"/>
+          </a:fontRef>
+        </p:style>
+      </p:cxnSp>
+      <p:sp>
+        <p:nvSpPr>
+          <p:cNvPr id="20" name="TextBox 19">
+            <a:extLst>
+              <a:ext uri="{FF2B5EF4-FFF2-40B4-BE49-F238E27FC236}">
+                <a16:creationId xmlns:a16="http://schemas.microsoft.com/office/drawing/2014/main" xmlns="" id="{E0BBD6C8-C8F2-40C5-AA64-85961A11ADC2}"/>
+              </a:ext>
+            </a:extLst>
+          </p:cNvPr>
+          <p:cNvSpPr txBox="1"/>
+          <p:nvPr/>
+        </p:nvSpPr>
+        <p:spPr>
+          <a:xfrm>
+            <a:off x="4912926" y="2575506"/>
+            <a:ext cx="843694" cy="276999"/>
+          </a:xfrm>
+          <a:prstGeom prst="rect">
+            <a:avLst/>
+          </a:prstGeom>
+          <a:noFill/>
+        </p:spPr>
+        <p:txBody>
+          <a:bodyPr wrap="square" rtlCol="0">
+            <a:spAutoFit/>
+          </a:bodyPr>
+          <a:lstStyle/>
+          <a:p>
+            <a:r>
+              <a:rPr lang="en-US" sz="1200" dirty="0" smtClean="0"/>
+              <a:t>login</a:t>
+            </a:r>
+            <a:endParaRPr lang="en-US" sz="1200" dirty="0"/>
+          </a:p>
+        </p:txBody>
+      </p:sp>
+      <p:sp>
+        <p:nvSpPr>
+          <p:cNvPr id="21" name="TextBox 20">
+            <a:extLst>
+              <a:ext uri="{FF2B5EF4-FFF2-40B4-BE49-F238E27FC236}">
+                <a16:creationId xmlns:a16="http://schemas.microsoft.com/office/drawing/2014/main" xmlns="" id="{E0BBD6C8-C8F2-40C5-AA64-85961A11ADC2}"/>
+              </a:ext>
+            </a:extLst>
+          </p:cNvPr>
+          <p:cNvSpPr txBox="1"/>
+          <p:nvPr/>
+        </p:nvSpPr>
+        <p:spPr>
+          <a:xfrm>
+            <a:off x="6433247" y="1572268"/>
+            <a:ext cx="953133" cy="276999"/>
+          </a:xfrm>
+          <a:prstGeom prst="rect">
+            <a:avLst/>
+          </a:prstGeom>
+          <a:noFill/>
+        </p:spPr>
+        <p:txBody>
+          <a:bodyPr wrap="square" rtlCol="0">
+            <a:spAutoFit/>
+          </a:bodyPr>
+          <a:lstStyle/>
+          <a:p>
+            <a:r>
+              <a:rPr lang="en-US" sz="1200" dirty="0" smtClean="0"/>
+              <a:t>EMPLOYEE</a:t>
+            </a:r>
+            <a:endParaRPr lang="en-US" sz="1200" dirty="0"/>
+          </a:p>
+        </p:txBody>
+      </p:sp>
+      <p:cxnSp>
+        <p:nvCxnSpPr>
+          <p:cNvPr id="22" name="Elbow Connector 21"/>
+          <p:cNvCxnSpPr>
+            <a:stCxn id="16" idx="0"/>
+            <a:endCxn id="2" idx="0"/>
+          </p:cNvCxnSpPr>
+          <p:nvPr/>
+        </p:nvCxnSpPr>
+        <p:spPr>
+          <a:xfrm rot="16200000" flipH="1" flipV="1">
+            <a:off x="7318767" y="-551228"/>
+            <a:ext cx="15305" cy="3755245"/>
+          </a:xfrm>
+          <a:prstGeom prst="bentConnector3">
+            <a:avLst>
+              <a:gd name="adj1" fmla="val -1493630"/>
+            </a:avLst>
+          </a:prstGeom>
+          <a:ln>
+            <a:tailEnd type="triangle"/>
+          </a:ln>
+        </p:spPr>
+        <p:style>
+          <a:lnRef idx="1">
+            <a:schemeClr val="accent1"/>
+          </a:lnRef>
+          <a:fillRef idx="0">
+            <a:schemeClr val="accent1"/>
+          </a:fillRef>
+          <a:effectRef idx="0">
+            <a:schemeClr val="accent1"/>
+          </a:effectRef>
+          <a:fontRef idx="minor">
+            <a:schemeClr val="tx1"/>
+          </a:fontRef>
+        </p:style>
+      </p:cxnSp>
+      <p:sp>
+        <p:nvSpPr>
+          <p:cNvPr id="24" name="TextBox 23">
+            <a:extLst>
+              <a:ext uri="{FF2B5EF4-FFF2-40B4-BE49-F238E27FC236}">
+                <a16:creationId xmlns:a16="http://schemas.microsoft.com/office/drawing/2014/main" xmlns="" id="{E0BBD6C8-C8F2-40C5-AA64-85961A11ADC2}"/>
+              </a:ext>
+            </a:extLst>
+          </p:cNvPr>
+          <p:cNvSpPr txBox="1"/>
+          <p:nvPr/>
+        </p:nvSpPr>
+        <p:spPr>
+          <a:xfrm>
+            <a:off x="7249861" y="849687"/>
+            <a:ext cx="843694" cy="461665"/>
+          </a:xfrm>
+          <a:prstGeom prst="rect">
+            <a:avLst/>
+          </a:prstGeom>
+          <a:noFill/>
+        </p:spPr>
+        <p:txBody>
+          <a:bodyPr wrap="square" rtlCol="0">
+            <a:spAutoFit/>
+          </a:bodyPr>
+          <a:lstStyle/>
+          <a:p>
+            <a:r>
+              <a:rPr lang="en-US" sz="1200" dirty="0" smtClean="0"/>
+              <a:t>session expired</a:t>
+            </a:r>
+            <a:endParaRPr lang="en-US" sz="1200" dirty="0"/>
+          </a:p>
+        </p:txBody>
+      </p:sp>
+      <p:cxnSp>
+        <p:nvCxnSpPr>
+          <p:cNvPr id="25" name="Straight Arrow Connector 24"/>
+          <p:cNvCxnSpPr>
+            <a:stCxn id="2" idx="1"/>
+            <a:endCxn id="17" idx="3"/>
+          </p:cNvCxnSpPr>
+          <p:nvPr/>
+        </p:nvCxnSpPr>
+        <p:spPr>
+          <a:xfrm flipH="1">
+            <a:off x="2653157" y="1864573"/>
+            <a:ext cx="1950251" cy="0"/>
+          </a:xfrm>
+          <a:prstGeom prst="straightConnector1">
+            <a:avLst/>
+          </a:prstGeom>
+          <a:ln>
+            <a:tailEnd type="triangle"/>
+          </a:ln>
+        </p:spPr>
+        <p:style>
+          <a:lnRef idx="1">
+            <a:schemeClr val="accent1"/>
+          </a:lnRef>
+          <a:fillRef idx="0">
+            <a:schemeClr val="accent1"/>
+          </a:fillRef>
+          <a:effectRef idx="0">
+            <a:schemeClr val="accent1"/>
+          </a:effectRef>
+          <a:fontRef idx="minor">
+            <a:schemeClr val="tx1"/>
+          </a:fontRef>
+        </p:style>
+      </p:cxnSp>
+      <p:cxnSp>
+        <p:nvCxnSpPr>
+          <p:cNvPr id="27" name="Elbow Connector 26"/>
+          <p:cNvCxnSpPr>
+            <a:stCxn id="17" idx="0"/>
+            <a:endCxn id="2" idx="0"/>
+          </p:cNvCxnSpPr>
+          <p:nvPr/>
+        </p:nvCxnSpPr>
+        <p:spPr>
+          <a:xfrm rot="5400000" flipH="1" flipV="1">
+            <a:off x="3628283" y="-486466"/>
+            <a:ext cx="12700" cy="3641028"/>
+          </a:xfrm>
+          <a:prstGeom prst="bentConnector3">
+            <a:avLst>
+              <a:gd name="adj1" fmla="val 1800000"/>
+            </a:avLst>
+          </a:prstGeom>
+          <a:ln>
+            <a:tailEnd type="triangle"/>
+          </a:ln>
+        </p:spPr>
+        <p:style>
+          <a:lnRef idx="1">
+            <a:schemeClr val="accent1"/>
+          </a:lnRef>
+          <a:fillRef idx="0">
+            <a:schemeClr val="accent1"/>
+          </a:fillRef>
+          <a:effectRef idx="0">
+            <a:schemeClr val="accent1"/>
+          </a:effectRef>
+          <a:fontRef idx="minor">
+            <a:schemeClr val="tx1"/>
+          </a:fontRef>
+        </p:style>
+      </p:cxnSp>
+      <p:sp>
+        <p:nvSpPr>
+          <p:cNvPr id="29" name="TextBox 28">
+            <a:extLst>
+              <a:ext uri="{FF2B5EF4-FFF2-40B4-BE49-F238E27FC236}">
+                <a16:creationId xmlns:a16="http://schemas.microsoft.com/office/drawing/2014/main" xmlns="" id="{E0BBD6C8-C8F2-40C5-AA64-85961A11ADC2}"/>
+              </a:ext>
+            </a:extLst>
+          </p:cNvPr>
+          <p:cNvSpPr txBox="1"/>
+          <p:nvPr/>
+        </p:nvSpPr>
+        <p:spPr>
+          <a:xfrm>
+            <a:off x="3083049" y="878733"/>
+            <a:ext cx="843694" cy="461665"/>
+          </a:xfrm>
+          <a:prstGeom prst="rect">
+            <a:avLst/>
+          </a:prstGeom>
+          <a:noFill/>
+        </p:spPr>
+        <p:txBody>
+          <a:bodyPr wrap="square" rtlCol="0">
+            <a:spAutoFit/>
+          </a:bodyPr>
+          <a:lstStyle/>
+          <a:p>
+            <a:r>
+              <a:rPr lang="en-US" sz="1200" dirty="0" smtClean="0"/>
+              <a:t>session expired</a:t>
+            </a:r>
+            <a:endParaRPr lang="en-US" sz="1200" dirty="0"/>
+          </a:p>
+        </p:txBody>
+      </p:sp>
+      <p:sp>
+        <p:nvSpPr>
+          <p:cNvPr id="30" name="TextBox 29">
+            <a:extLst>
+              <a:ext uri="{FF2B5EF4-FFF2-40B4-BE49-F238E27FC236}">
+                <a16:creationId xmlns:a16="http://schemas.microsoft.com/office/drawing/2014/main" xmlns="" id="{E0BBD6C8-C8F2-40C5-AA64-85961A11ADC2}"/>
+              </a:ext>
+            </a:extLst>
+          </p:cNvPr>
+          <p:cNvSpPr txBox="1"/>
+          <p:nvPr/>
+        </p:nvSpPr>
+        <p:spPr>
+          <a:xfrm>
+            <a:off x="2929740" y="1636915"/>
+            <a:ext cx="953133" cy="461665"/>
+          </a:xfrm>
+          <a:prstGeom prst="rect">
+            <a:avLst/>
+          </a:prstGeom>
+          <a:noFill/>
+        </p:spPr>
+        <p:txBody>
+          <a:bodyPr wrap="square" rtlCol="0">
+            <a:spAutoFit/>
+          </a:bodyPr>
+          <a:lstStyle/>
+          <a:p>
+            <a:r>
+              <a:rPr lang="en-US" sz="1200" dirty="0" smtClean="0"/>
+              <a:t>FINANCE MANAGER</a:t>
+            </a:r>
+            <a:endParaRPr lang="en-US" sz="1200" dirty="0"/>
+          </a:p>
+        </p:txBody>
+      </p:sp>
+      <p:cxnSp>
+        <p:nvCxnSpPr>
+          <p:cNvPr id="31" name="Straight Arrow Connector 30"/>
+          <p:cNvCxnSpPr>
+            <a:stCxn id="16" idx="1"/>
+            <a:endCxn id="4" idx="0"/>
+          </p:cNvCxnSpPr>
+          <p:nvPr/>
+        </p:nvCxnSpPr>
+        <p:spPr>
+          <a:xfrm flipH="1">
+            <a:off x="5448796" y="1849268"/>
+            <a:ext cx="2909857" cy="1737644"/>
+          </a:xfrm>
+          <a:prstGeom prst="straightConnector1">
+            <a:avLst/>
+          </a:prstGeom>
+          <a:ln>
+            <a:tailEnd type="triangle"/>
+          </a:ln>
+        </p:spPr>
+        <p:style>
+          <a:lnRef idx="1">
+            <a:schemeClr val="accent1"/>
+          </a:lnRef>
+          <a:fillRef idx="0">
+            <a:schemeClr val="accent1"/>
+          </a:fillRef>
+          <a:effectRef idx="0">
+            <a:schemeClr val="accent1"/>
+          </a:effectRef>
+          <a:fontRef idx="minor">
+            <a:schemeClr val="tx1"/>
+          </a:fontRef>
+        </p:style>
+      </p:cxnSp>
+      <p:cxnSp>
+        <p:nvCxnSpPr>
+          <p:cNvPr id="33" name="Straight Arrow Connector 32"/>
+          <p:cNvCxnSpPr>
+            <a:stCxn id="4" idx="0"/>
+            <a:endCxn id="16" idx="1"/>
+          </p:cNvCxnSpPr>
+          <p:nvPr/>
+        </p:nvCxnSpPr>
+        <p:spPr>
+          <a:xfrm flipV="1">
+            <a:off x="5448796" y="1849268"/>
+            <a:ext cx="2909857" cy="1737644"/>
+          </a:xfrm>
+          <a:prstGeom prst="straightConnector1">
+            <a:avLst/>
+          </a:prstGeom>
+          <a:ln>
+            <a:tailEnd type="triangle"/>
+          </a:ln>
+        </p:spPr>
+        <p:style>
+          <a:lnRef idx="1">
+            <a:schemeClr val="accent1"/>
+          </a:lnRef>
+          <a:fillRef idx="0">
+            <a:schemeClr val="accent1"/>
+          </a:fillRef>
+          <a:effectRef idx="0">
+            <a:schemeClr val="accent1"/>
+          </a:effectRef>
+          <a:fontRef idx="minor">
+            <a:schemeClr val="tx1"/>
+          </a:fontRef>
+        </p:style>
+      </p:cxnSp>
     </p:spTree>
     <p:extLst>
       <p:ext uri="{BB962C8B-B14F-4D97-AF65-F5344CB8AC3E}">
@@ -3892,7 +4728,7 @@
           <p:cNvPr id="89" name="Rectangle 88">
             <a:extLst>
               <a:ext uri="{FF2B5EF4-FFF2-40B4-BE49-F238E27FC236}">
-                <a16:creationId xmlns:a16="http://schemas.microsoft.com/office/drawing/2014/main" id="{EED827AB-78FC-41AC-8676-30DA25D7C5FC}"/>
+                <a16:creationId xmlns:a16="http://schemas.microsoft.com/office/drawing/2014/main" xmlns="" id="{EED827AB-78FC-41AC-8676-30DA25D7C5FC}"/>
               </a:ext>
             </a:extLst>
           </p:cNvPr>
@@ -3970,7 +4806,7 @@
           <p:cNvPr id="62" name="Rectangle 61">
             <a:extLst>
               <a:ext uri="{FF2B5EF4-FFF2-40B4-BE49-F238E27FC236}">
-                <a16:creationId xmlns:a16="http://schemas.microsoft.com/office/drawing/2014/main" id="{C3FE7107-D2B1-4448-B03A-F2CE9B45CFD6}"/>
+                <a16:creationId xmlns:a16="http://schemas.microsoft.com/office/drawing/2014/main" xmlns="" id="{C3FE7107-D2B1-4448-B03A-F2CE9B45CFD6}"/>
               </a:ext>
             </a:extLst>
           </p:cNvPr>
@@ -4034,7 +4870,7 @@
           <p:cNvPr id="61" name="Rectangle 60">
             <a:extLst>
               <a:ext uri="{FF2B5EF4-FFF2-40B4-BE49-F238E27FC236}">
-                <a16:creationId xmlns:a16="http://schemas.microsoft.com/office/drawing/2014/main" id="{2F7B40FD-C5BA-431D-AE99-1CB70F1BAB88}"/>
+                <a16:creationId xmlns:a16="http://schemas.microsoft.com/office/drawing/2014/main" xmlns="" id="{2F7B40FD-C5BA-431D-AE99-1CB70F1BAB88}"/>
               </a:ext>
             </a:extLst>
           </p:cNvPr>
@@ -4093,7 +4929,7 @@
           <p:cNvPr id="60" name="Rectangle 59">
             <a:extLst>
               <a:ext uri="{FF2B5EF4-FFF2-40B4-BE49-F238E27FC236}">
-                <a16:creationId xmlns:a16="http://schemas.microsoft.com/office/drawing/2014/main" id="{CF3E4DE9-C6F2-4C11-BE7F-2753CDEFE535}"/>
+                <a16:creationId xmlns:a16="http://schemas.microsoft.com/office/drawing/2014/main" xmlns="" id="{CF3E4DE9-C6F2-4C11-BE7F-2753CDEFE535}"/>
               </a:ext>
             </a:extLst>
           </p:cNvPr>
@@ -4475,7 +5311,7 @@
           <p:cNvPr id="19" name="TextBox 18">
             <a:extLst>
               <a:ext uri="{FF2B5EF4-FFF2-40B4-BE49-F238E27FC236}">
-                <a16:creationId xmlns:a16="http://schemas.microsoft.com/office/drawing/2014/main" id="{E0BBD6C8-C8F2-40C5-AA64-85961A11ADC2}"/>
+                <a16:creationId xmlns:a16="http://schemas.microsoft.com/office/drawing/2014/main" xmlns="" id="{E0BBD6C8-C8F2-40C5-AA64-85961A11ADC2}"/>
               </a:ext>
             </a:extLst>
           </p:cNvPr>
@@ -4605,7 +5441,7 @@
           <p:cNvPr id="23" name="TextBox 22">
             <a:extLst>
               <a:ext uri="{FF2B5EF4-FFF2-40B4-BE49-F238E27FC236}">
-                <a16:creationId xmlns:a16="http://schemas.microsoft.com/office/drawing/2014/main" id="{E0BBD6C8-C8F2-40C5-AA64-85961A11ADC2}"/>
+                <a16:creationId xmlns:a16="http://schemas.microsoft.com/office/drawing/2014/main" xmlns="" id="{E0BBD6C8-C8F2-40C5-AA64-85961A11ADC2}"/>
               </a:ext>
             </a:extLst>
           </p:cNvPr>
@@ -4722,7 +5558,7 @@
           <p:cNvPr id="28" name="TextBox 27">
             <a:extLst>
               <a:ext uri="{FF2B5EF4-FFF2-40B4-BE49-F238E27FC236}">
-                <a16:creationId xmlns:a16="http://schemas.microsoft.com/office/drawing/2014/main" id="{E0BBD6C8-C8F2-40C5-AA64-85961A11ADC2}"/>
+                <a16:creationId xmlns:a16="http://schemas.microsoft.com/office/drawing/2014/main" xmlns="" id="{E0BBD6C8-C8F2-40C5-AA64-85961A11ADC2}"/>
               </a:ext>
             </a:extLst>
           </p:cNvPr>
@@ -4846,7 +5682,7 @@
           <p:cNvPr id="34" name="TextBox 33">
             <a:extLst>
               <a:ext uri="{FF2B5EF4-FFF2-40B4-BE49-F238E27FC236}">
-                <a16:creationId xmlns:a16="http://schemas.microsoft.com/office/drawing/2014/main" id="{E0BBD6C8-C8F2-40C5-AA64-85961A11ADC2}"/>
+                <a16:creationId xmlns:a16="http://schemas.microsoft.com/office/drawing/2014/main" xmlns="" id="{E0BBD6C8-C8F2-40C5-AA64-85961A11ADC2}"/>
               </a:ext>
             </a:extLst>
           </p:cNvPr>
@@ -4972,7 +5808,7 @@
           <p:cNvPr id="38" name="TextBox 37">
             <a:extLst>
               <a:ext uri="{FF2B5EF4-FFF2-40B4-BE49-F238E27FC236}">
-                <a16:creationId xmlns:a16="http://schemas.microsoft.com/office/drawing/2014/main" id="{E0BBD6C8-C8F2-40C5-AA64-85961A11ADC2}"/>
+                <a16:creationId xmlns:a16="http://schemas.microsoft.com/office/drawing/2014/main" xmlns="" id="{E0BBD6C8-C8F2-40C5-AA64-85961A11ADC2}"/>
               </a:ext>
             </a:extLst>
           </p:cNvPr>
@@ -5142,7 +5978,7 @@
           <p:cNvPr id="44" name="TextBox 43">
             <a:extLst>
               <a:ext uri="{FF2B5EF4-FFF2-40B4-BE49-F238E27FC236}">
-                <a16:creationId xmlns:a16="http://schemas.microsoft.com/office/drawing/2014/main" id="{E0BBD6C8-C8F2-40C5-AA64-85961A11ADC2}"/>
+                <a16:creationId xmlns:a16="http://schemas.microsoft.com/office/drawing/2014/main" xmlns="" id="{E0BBD6C8-C8F2-40C5-AA64-85961A11ADC2}"/>
               </a:ext>
             </a:extLst>
           </p:cNvPr>
@@ -5177,7 +6013,7 @@
           <p:cNvPr id="45" name="TextBox 44">
             <a:extLst>
               <a:ext uri="{FF2B5EF4-FFF2-40B4-BE49-F238E27FC236}">
-                <a16:creationId xmlns:a16="http://schemas.microsoft.com/office/drawing/2014/main" id="{E0BBD6C8-C8F2-40C5-AA64-85961A11ADC2}"/>
+                <a16:creationId xmlns:a16="http://schemas.microsoft.com/office/drawing/2014/main" xmlns="" id="{E0BBD6C8-C8F2-40C5-AA64-85961A11ADC2}"/>
               </a:ext>
             </a:extLst>
           </p:cNvPr>
@@ -5224,7 +6060,7 @@
           <p:cNvPr id="26" name="TextBox 25">
             <a:extLst>
               <a:ext uri="{FF2B5EF4-FFF2-40B4-BE49-F238E27FC236}">
-                <a16:creationId xmlns:a16="http://schemas.microsoft.com/office/drawing/2014/main" id="{6C45E26E-8FEE-4439-A34B-789237C9C62C}"/>
+                <a16:creationId xmlns:a16="http://schemas.microsoft.com/office/drawing/2014/main" xmlns="" id="{6C45E26E-8FEE-4439-A34B-789237C9C62C}"/>
               </a:ext>
             </a:extLst>
           </p:cNvPr>
@@ -5259,7 +6095,7 @@
           <p:cNvPr id="31" name="Rectangle 30">
             <a:extLst>
               <a:ext uri="{FF2B5EF4-FFF2-40B4-BE49-F238E27FC236}">
-                <a16:creationId xmlns:a16="http://schemas.microsoft.com/office/drawing/2014/main" id="{6D396BFC-10E0-4935-903B-EDC457BD1755}"/>
+                <a16:creationId xmlns:a16="http://schemas.microsoft.com/office/drawing/2014/main" xmlns="" id="{6D396BFC-10E0-4935-903B-EDC457BD1755}"/>
               </a:ext>
             </a:extLst>
           </p:cNvPr>
@@ -5319,7 +6155,7 @@
           <p:cNvPr id="32" name="Rectangle 31">
             <a:extLst>
               <a:ext uri="{FF2B5EF4-FFF2-40B4-BE49-F238E27FC236}">
-                <a16:creationId xmlns:a16="http://schemas.microsoft.com/office/drawing/2014/main" id="{02A645C8-F11F-438D-92DC-F6FCCA5ECFB8}"/>
+                <a16:creationId xmlns:a16="http://schemas.microsoft.com/office/drawing/2014/main" xmlns="" id="{02A645C8-F11F-438D-92DC-F6FCCA5ECFB8}"/>
               </a:ext>
             </a:extLst>
           </p:cNvPr>
@@ -5379,7 +6215,7 @@
           <p:cNvPr id="12" name="Straight Arrow Connector 11">
             <a:extLst>
               <a:ext uri="{FF2B5EF4-FFF2-40B4-BE49-F238E27FC236}">
-                <a16:creationId xmlns:a16="http://schemas.microsoft.com/office/drawing/2014/main" id="{FF2076CA-F897-4293-B6CD-7408EB452156}"/>
+                <a16:creationId xmlns:a16="http://schemas.microsoft.com/office/drawing/2014/main" xmlns="" id="{FF2076CA-F897-4293-B6CD-7408EB452156}"/>
               </a:ext>
             </a:extLst>
           </p:cNvPr>
@@ -5422,7 +6258,7 @@
           <p:cNvPr id="14" name="Straight Arrow Connector 13">
             <a:extLst>
               <a:ext uri="{FF2B5EF4-FFF2-40B4-BE49-F238E27FC236}">
-                <a16:creationId xmlns:a16="http://schemas.microsoft.com/office/drawing/2014/main" id="{5C625B7B-4A1E-46C5-9082-4FEC89B30DA9}"/>
+                <a16:creationId xmlns:a16="http://schemas.microsoft.com/office/drawing/2014/main" xmlns="" id="{5C625B7B-4A1E-46C5-9082-4FEC89B30DA9}"/>
               </a:ext>
             </a:extLst>
           </p:cNvPr>
@@ -5465,7 +6301,7 @@
           <p:cNvPr id="65" name="Straight Arrow Connector 64">
             <a:extLst>
               <a:ext uri="{FF2B5EF4-FFF2-40B4-BE49-F238E27FC236}">
-                <a16:creationId xmlns:a16="http://schemas.microsoft.com/office/drawing/2014/main" id="{C1C9B843-1D11-4D9F-8CBF-AE00E90AA070}"/>
+                <a16:creationId xmlns:a16="http://schemas.microsoft.com/office/drawing/2014/main" xmlns="" id="{C1C9B843-1D11-4D9F-8CBF-AE00E90AA070}"/>
               </a:ext>
             </a:extLst>
           </p:cNvPr>
@@ -5507,7 +6343,7 @@
           <p:cNvPr id="66" name="TextBox 65">
             <a:extLst>
               <a:ext uri="{FF2B5EF4-FFF2-40B4-BE49-F238E27FC236}">
-                <a16:creationId xmlns:a16="http://schemas.microsoft.com/office/drawing/2014/main" id="{5E4B2700-0522-40EF-B035-166AA1C17D76}"/>
+                <a16:creationId xmlns:a16="http://schemas.microsoft.com/office/drawing/2014/main" xmlns="" id="{5E4B2700-0522-40EF-B035-166AA1C17D76}"/>
               </a:ext>
             </a:extLst>
           </p:cNvPr>
@@ -5631,7 +6467,7 @@
           <p:cNvPr id="48" name="TextBox 47">
             <a:extLst>
               <a:ext uri="{FF2B5EF4-FFF2-40B4-BE49-F238E27FC236}">
-                <a16:creationId xmlns:a16="http://schemas.microsoft.com/office/drawing/2014/main" id="{E0BBD6C8-C8F2-40C5-AA64-85961A11ADC2}"/>
+                <a16:creationId xmlns:a16="http://schemas.microsoft.com/office/drawing/2014/main" xmlns="" id="{E0BBD6C8-C8F2-40C5-AA64-85961A11ADC2}"/>
               </a:ext>
             </a:extLst>
           </p:cNvPr>
@@ -5666,7 +6502,7 @@
           <p:cNvPr id="52" name="Rectangle 51">
             <a:extLst>
               <a:ext uri="{FF2B5EF4-FFF2-40B4-BE49-F238E27FC236}">
-                <a16:creationId xmlns:a16="http://schemas.microsoft.com/office/drawing/2014/main" id="{21B869D6-66CB-4B38-975F-B7FEB6AA9B13}"/>
+                <a16:creationId xmlns:a16="http://schemas.microsoft.com/office/drawing/2014/main" xmlns="" id="{21B869D6-66CB-4B38-975F-B7FEB6AA9B13}"/>
               </a:ext>
             </a:extLst>
           </p:cNvPr>
@@ -5789,7 +6625,7 @@
           <p:cNvPr id="58" name="TextBox 57">
             <a:extLst>
               <a:ext uri="{FF2B5EF4-FFF2-40B4-BE49-F238E27FC236}">
-                <a16:creationId xmlns:a16="http://schemas.microsoft.com/office/drawing/2014/main" id="{E0BBD6C8-C8F2-40C5-AA64-85961A11ADC2}"/>
+                <a16:creationId xmlns:a16="http://schemas.microsoft.com/office/drawing/2014/main" xmlns="" id="{E0BBD6C8-C8F2-40C5-AA64-85961A11ADC2}"/>
               </a:ext>
             </a:extLst>
           </p:cNvPr>
@@ -5897,7 +6733,7 @@
           <p:cNvPr id="94" name="TextBox 93">
             <a:extLst>
               <a:ext uri="{FF2B5EF4-FFF2-40B4-BE49-F238E27FC236}">
-                <a16:creationId xmlns:a16="http://schemas.microsoft.com/office/drawing/2014/main" id="{E0BBD6C8-C8F2-40C5-AA64-85961A11ADC2}"/>
+                <a16:creationId xmlns:a16="http://schemas.microsoft.com/office/drawing/2014/main" xmlns="" id="{E0BBD6C8-C8F2-40C5-AA64-85961A11ADC2}"/>
               </a:ext>
             </a:extLst>
           </p:cNvPr>
@@ -5932,7 +6768,7 @@
           <p:cNvPr id="95" name="TextBox 94">
             <a:extLst>
               <a:ext uri="{FF2B5EF4-FFF2-40B4-BE49-F238E27FC236}">
-                <a16:creationId xmlns:a16="http://schemas.microsoft.com/office/drawing/2014/main" id="{E0BBD6C8-C8F2-40C5-AA64-85961A11ADC2}"/>
+                <a16:creationId xmlns:a16="http://schemas.microsoft.com/office/drawing/2014/main" xmlns="" id="{E0BBD6C8-C8F2-40C5-AA64-85961A11ADC2}"/>
               </a:ext>
             </a:extLst>
           </p:cNvPr>
@@ -5967,7 +6803,7 @@
           <p:cNvPr id="49" name="Rectangle 48">
             <a:extLst>
               <a:ext uri="{FF2B5EF4-FFF2-40B4-BE49-F238E27FC236}">
-                <a16:creationId xmlns:a16="http://schemas.microsoft.com/office/drawing/2014/main" id="{02A645C8-F11F-438D-92DC-F6FCCA5ECFB8}"/>
+                <a16:creationId xmlns:a16="http://schemas.microsoft.com/office/drawing/2014/main" xmlns="" id="{02A645C8-F11F-438D-92DC-F6FCCA5ECFB8}"/>
               </a:ext>
             </a:extLst>
           </p:cNvPr>
@@ -6064,7 +6900,7 @@
           <p:cNvPr id="57" name="Rectangle 56">
             <a:extLst>
               <a:ext uri="{FF2B5EF4-FFF2-40B4-BE49-F238E27FC236}">
-                <a16:creationId xmlns:a16="http://schemas.microsoft.com/office/drawing/2014/main" id="{93FBA679-F71B-47BD-BE29-21E7C2262CEB}"/>
+                <a16:creationId xmlns:a16="http://schemas.microsoft.com/office/drawing/2014/main" xmlns="" id="{93FBA679-F71B-47BD-BE29-21E7C2262CEB}"/>
               </a:ext>
             </a:extLst>
           </p:cNvPr>
@@ -6174,7 +7010,7 @@
           <p:cNvPr id="59" name="TextBox 58">
             <a:extLst>
               <a:ext uri="{FF2B5EF4-FFF2-40B4-BE49-F238E27FC236}">
-                <a16:creationId xmlns:a16="http://schemas.microsoft.com/office/drawing/2014/main" id="{5E4B2700-0522-40EF-B035-166AA1C17D76}"/>
+                <a16:creationId xmlns:a16="http://schemas.microsoft.com/office/drawing/2014/main" xmlns="" id="{5E4B2700-0522-40EF-B035-166AA1C17D76}"/>
               </a:ext>
             </a:extLst>
           </p:cNvPr>
@@ -6247,10 +7083,10 @@
           <p:cNvPr id="12" name="Rectangle 11">
             <a:extLst>
               <a:ext uri="{FF2B5EF4-FFF2-40B4-BE49-F238E27FC236}">
-                <a16:creationId xmlns:a16="http://schemas.microsoft.com/office/drawing/2014/main" id="{6753252F-4873-4F63-801D-CC719279A7D5}"/>
+                <a16:creationId xmlns:a16="http://schemas.microsoft.com/office/drawing/2014/main" xmlns="" id="{6753252F-4873-4F63-801D-CC719279A7D5}"/>
               </a:ext>
               <a:ext uri="{C183D7F6-B498-43B3-948B-1728B52AA6E4}">
-                <adec:decorative xmlns:adec="http://schemas.microsoft.com/office/drawing/2017/decorative" val="1"/>
+                <adec:decorative xmlns:adec="http://schemas.microsoft.com/office/drawing/2017/decorative" xmlns="" val="1"/>
               </a:ext>
             </a:extLst>
           </p:cNvPr>
@@ -6260,7 +7096,7 @@
           <p:nvPr>
             <p:extLst>
               <p:ext uri="{386F3935-93C4-4BCD-93E2-E3B085C9AB24}">
-                <p16:designElem xmlns:p16="http://schemas.microsoft.com/office/powerpoint/2015/main" val="1"/>
+                <p16:designElem xmlns:p16="http://schemas.microsoft.com/office/powerpoint/2015/main" xmlns="" val="1"/>
               </p:ext>
             </p:extLst>
           </p:nvPr>
@@ -6310,10 +7146,10 @@
           <p:cNvPr id="14" name="Rectangle 13">
             <a:extLst>
               <a:ext uri="{FF2B5EF4-FFF2-40B4-BE49-F238E27FC236}">
-                <a16:creationId xmlns:a16="http://schemas.microsoft.com/office/drawing/2014/main" id="{047C8CCB-F95D-4249-92DD-651249D3535A}"/>
+                <a16:creationId xmlns:a16="http://schemas.microsoft.com/office/drawing/2014/main" xmlns="" id="{047C8CCB-F95D-4249-92DD-651249D3535A}"/>
               </a:ext>
               <a:ext uri="{C183D7F6-B498-43B3-948B-1728B52AA6E4}">
-                <adec:decorative xmlns:adec="http://schemas.microsoft.com/office/drawing/2017/decorative" val="1"/>
+                <adec:decorative xmlns:adec="http://schemas.microsoft.com/office/drawing/2017/decorative" xmlns="" val="1"/>
               </a:ext>
             </a:extLst>
           </p:cNvPr>
@@ -6323,7 +7159,7 @@
           <p:nvPr>
             <p:extLst>
               <p:ext uri="{386F3935-93C4-4BCD-93E2-E3B085C9AB24}">
-                <p16:designElem xmlns:p16="http://schemas.microsoft.com/office/powerpoint/2015/main" val="1"/>
+                <p16:designElem xmlns:p16="http://schemas.microsoft.com/office/powerpoint/2015/main" xmlns="" val="1"/>
               </p:ext>
             </p:extLst>
           </p:nvPr>
@@ -6373,7 +7209,7 @@
           <p:cNvPr id="5" name="TextBox 4">
             <a:extLst>
               <a:ext uri="{FF2B5EF4-FFF2-40B4-BE49-F238E27FC236}">
-                <a16:creationId xmlns:a16="http://schemas.microsoft.com/office/drawing/2014/main" id="{6C45E26E-8FEE-4439-A34B-789237C9C62C}"/>
+                <a16:creationId xmlns:a16="http://schemas.microsoft.com/office/drawing/2014/main" xmlns="" id="{6C45E26E-8FEE-4439-A34B-789237C9C62C}"/>
               </a:ext>
             </a:extLst>
           </p:cNvPr>
@@ -6484,40 +7320,6 @@
       </p:grpSpPr>
       <p:sp>
         <p:nvSpPr>
-          <p:cNvPr id="2" name="Title 1"/>
-          <p:cNvSpPr>
-            <a:spLocks noGrp="1"/>
-          </p:cNvSpPr>
-          <p:nvPr>
-            <p:ph type="ctrTitle"/>
-          </p:nvPr>
-        </p:nvSpPr>
-        <p:spPr>
-          <a:xfrm>
-            <a:off x="166089" y="120357"/>
-            <a:ext cx="9144000" cy="698793"/>
-          </a:xfrm>
-        </p:spPr>
-        <p:txBody>
-          <a:bodyPr>
-            <a:noAutofit/>
-          </a:bodyPr>
-          <a:lstStyle/>
-          <a:p>
-            <a:pPr algn="l"/>
-            <a:r>
-              <a:rPr lang="en-US" sz="4800" dirty="0" err="1"/>
-              <a:t>ShellProject</a:t>
-            </a:r>
-            <a:r>
-              <a:rPr lang="en-US" sz="4800" dirty="0"/>
-              <a:t> Conclusion</a:t>
-            </a:r>
-          </a:p>
-        </p:txBody>
-      </p:sp>
-      <p:sp>
-        <p:nvSpPr>
           <p:cNvPr id="3" name="Subtitle 2"/>
           <p:cNvSpPr>
             <a:spLocks noGrp="1"/>
@@ -6534,7 +7336,7 @@
         </p:spPr>
         <p:txBody>
           <a:bodyPr>
-            <a:normAutofit lnSpcReduction="10000"/>
+            <a:normAutofit fontScale="92500" lnSpcReduction="20000"/>
           </a:bodyPr>
           <a:lstStyle/>
           <a:p>
@@ -6573,8 +7375,8 @@
               <a:buChar char="•"/>
             </a:pPr>
             <a:r>
-              <a:rPr lang="en-US" dirty="0"/>
-              <a:t>SQL script creating a table schema and performs initial data load</a:t>
+              <a:rPr lang="en-US" dirty="0" smtClean="0"/>
+              <a:t>Hibernate “create” for creating the schema </a:t>
             </a:r>
           </a:p>
           <a:p>
@@ -6583,9 +7385,18 @@
               <a:buChar char="•"/>
             </a:pPr>
             <a:r>
+              <a:rPr lang="en-US" dirty="0" smtClean="0"/>
+              <a:t>Hibernate HQL performing object </a:t>
+            </a:r>
+            <a:r>
               <a:rPr lang="en-US" dirty="0"/>
-              <a:t>Utilize JDBC for data persistence</a:t>
-            </a:r>
+              <a:t>data </a:t>
+            </a:r>
+            <a:r>
+              <a:rPr lang="en-US" dirty="0" smtClean="0"/>
+              <a:t>loads, record create and updates</a:t>
+            </a:r>
+            <a:endParaRPr lang="en-US" dirty="0"/>
           </a:p>
           <a:p>
             <a:pPr marL="800100" lvl="1" indent="-342900" algn="l">
@@ -6593,8 +7404,20 @@
               <a:buChar char="•"/>
             </a:pPr>
             <a:r>
+              <a:rPr lang="en-US" dirty="0" smtClean="0"/>
+              <a:t>Utilize </a:t>
+            </a:r>
+            <a:r>
               <a:rPr lang="en-US" dirty="0"/>
-              <a:t>Must utilize the Data Access Object (DAO) design pattern</a:t>
+              <a:t>the </a:t>
+            </a:r>
+            <a:r>
+              <a:rPr lang="en-US" dirty="0" smtClean="0"/>
+              <a:t>Controller, Service, DTO, DAO </a:t>
+            </a:r>
+            <a:r>
+              <a:rPr lang="en-US" dirty="0"/>
+              <a:t>design pattern</a:t>
             </a:r>
           </a:p>
           <a:p>
@@ -6621,8 +7444,19 @@
               <a:t>Logging accomplished using </a:t>
             </a:r>
             <a:r>
-              <a:rPr lang="en-US" dirty="0" err="1"/>
+              <a:rPr lang="en-US" dirty="0" err="1" smtClean="0"/>
               <a:t>Logback</a:t>
+            </a:r>
+            <a:endParaRPr lang="en-US" dirty="0" smtClean="0"/>
+          </a:p>
+          <a:p>
+            <a:pPr marL="800100" lvl="1" indent="-342900" algn="l">
+              <a:buFont typeface="Arial" panose="020B0604020202020204" pitchFamily="34" charset="0"/>
+              <a:buChar char="•"/>
+            </a:pPr>
+            <a:r>
+              <a:rPr lang="en-US" dirty="0" smtClean="0"/>
+              <a:t>Login session control and validation</a:t>
             </a:r>
             <a:endParaRPr lang="en-US" dirty="0"/>
           </a:p>
@@ -6790,6 +7624,95 @@
               <a:buChar char="•"/>
             </a:pPr>
             <a:endParaRPr lang="en-US" dirty="0"/>
+          </a:p>
+        </p:txBody>
+      </p:sp>
+      <p:sp>
+        <p:nvSpPr>
+          <p:cNvPr id="5" name="Title 1"/>
+          <p:cNvSpPr>
+            <a:spLocks noGrp="1"/>
+          </p:cNvSpPr>
+          <p:nvPr>
+            <p:ph type="ctrTitle"/>
+          </p:nvPr>
+        </p:nvSpPr>
+        <p:spPr>
+          <a:xfrm>
+            <a:off x="166088" y="120357"/>
+            <a:ext cx="10965500" cy="698793"/>
+          </a:xfrm>
+        </p:spPr>
+        <p:txBody>
+          <a:bodyPr>
+            <a:noAutofit/>
+          </a:bodyPr>
+          <a:lstStyle/>
+          <a:p>
+            <a:pPr algn="l"/>
+            <a:r>
+              <a:rPr lang="en-US" sz="4000" dirty="0" smtClean="0"/>
+              <a:t>Expense </a:t>
+            </a:r>
+            <a:r>
+              <a:rPr lang="en-US" sz="4000" dirty="0"/>
+              <a:t>Reimbursement </a:t>
+            </a:r>
+            <a:r>
+              <a:rPr lang="en-US" sz="4000" dirty="0" smtClean="0"/>
+              <a:t>System (ERS) Summary</a:t>
+            </a:r>
+            <a:endParaRPr lang="en-US" sz="4000" dirty="0"/>
+          </a:p>
+        </p:txBody>
+      </p:sp>
+      <p:sp>
+        <p:nvSpPr>
+          <p:cNvPr id="6" name="Title 1"/>
+          <p:cNvSpPr txBox="1">
+            <a:spLocks/>
+          </p:cNvSpPr>
+          <p:nvPr/>
+        </p:nvSpPr>
+        <p:spPr>
+          <a:xfrm>
+            <a:off x="166088" y="125832"/>
+            <a:ext cx="9755425" cy="698793"/>
+          </a:xfrm>
+          <a:prstGeom prst="rect">
+            <a:avLst/>
+          </a:prstGeom>
+        </p:spPr>
+        <p:txBody>
+          <a:bodyPr vert="horz" lIns="91440" tIns="45720" rIns="91440" bIns="45720" rtlCol="0" anchor="b">
+            <a:noAutofit/>
+          </a:bodyPr>
+          <a:lstStyle>
+            <a:lvl1pPr algn="ctr" defTabSz="914400" rtl="0" eaLnBrk="1" latinLnBrk="0" hangingPunct="1">
+              <a:lnSpc>
+                <a:spcPct val="90000"/>
+              </a:lnSpc>
+              <a:spcBef>
+                <a:spcPct val="0"/>
+              </a:spcBef>
+              <a:buNone/>
+              <a:defRPr sz="6000" kern="1200">
+                <a:solidFill>
+                  <a:schemeClr val="tx1"/>
+                </a:solidFill>
+                <a:latin typeface="+mj-lt"/>
+                <a:ea typeface="+mj-ea"/>
+                <a:cs typeface="+mj-cs"/>
+              </a:defRPr>
+            </a:lvl1pPr>
+          </a:lstStyle>
+          <a:p>
+            <a:pPr algn="l"/>
+            <a:r>
+              <a:rPr lang="en-US" sz="4000" smtClean="0"/>
+              <a:t>Expense Reimbursement System (ERS)</a:t>
+            </a:r>
+            <a:endParaRPr lang="en-US" sz="4000" dirty="0"/>
           </a:p>
         </p:txBody>
       </p:sp>

</xml_diff>

<commit_message>
20210824 1604 tlw8748253: file updates for today.
</commit_message>
<xml_diff>
--- a/docs/ERS.pptx
+++ b/docs/ERS.pptx
@@ -138,7 +138,7 @@
           <p:cNvPr id="2" name="Title 1">
             <a:extLst>
               <a:ext uri="{FF2B5EF4-FFF2-40B4-BE49-F238E27FC236}">
-                <a16:creationId xmlns:a16="http://schemas.microsoft.com/office/drawing/2014/main" xmlns="" id="{67106D7E-D400-44F1-9A1A-D68CE501C73D}"/>
+                <a16:creationId xmlns="" xmlns:a16="http://schemas.microsoft.com/office/drawing/2014/main" id="{67106D7E-D400-44F1-9A1A-D68CE501C73D}"/>
               </a:ext>
             </a:extLst>
           </p:cNvPr>
@@ -175,7 +175,7 @@
           <p:cNvPr id="3" name="Subtitle 2">
             <a:extLst>
               <a:ext uri="{FF2B5EF4-FFF2-40B4-BE49-F238E27FC236}">
-                <a16:creationId xmlns:a16="http://schemas.microsoft.com/office/drawing/2014/main" xmlns="" id="{A5FDE527-E621-4639-A0C7-E1E9B0DFBCEC}"/>
+                <a16:creationId xmlns="" xmlns:a16="http://schemas.microsoft.com/office/drawing/2014/main" id="{A5FDE527-E621-4639-A0C7-E1E9B0DFBCEC}"/>
               </a:ext>
             </a:extLst>
           </p:cNvPr>
@@ -245,7 +245,7 @@
           <p:cNvPr id="4" name="Date Placeholder 3">
             <a:extLst>
               <a:ext uri="{FF2B5EF4-FFF2-40B4-BE49-F238E27FC236}">
-                <a16:creationId xmlns:a16="http://schemas.microsoft.com/office/drawing/2014/main" xmlns="" id="{E109CE88-B989-4109-89C8-36F7C245DB1C}"/>
+                <a16:creationId xmlns="" xmlns:a16="http://schemas.microsoft.com/office/drawing/2014/main" id="{E109CE88-B989-4109-89C8-36F7C245DB1C}"/>
               </a:ext>
             </a:extLst>
           </p:cNvPr>
@@ -274,7 +274,7 @@
           <p:cNvPr id="5" name="Footer Placeholder 4">
             <a:extLst>
               <a:ext uri="{FF2B5EF4-FFF2-40B4-BE49-F238E27FC236}">
-                <a16:creationId xmlns:a16="http://schemas.microsoft.com/office/drawing/2014/main" xmlns="" id="{0841498F-B991-43D3-B408-CC35D8EFCF37}"/>
+                <a16:creationId xmlns="" xmlns:a16="http://schemas.microsoft.com/office/drawing/2014/main" id="{0841498F-B991-43D3-B408-CC35D8EFCF37}"/>
               </a:ext>
             </a:extLst>
           </p:cNvPr>
@@ -299,7 +299,7 @@
           <p:cNvPr id="6" name="Slide Number Placeholder 5">
             <a:extLst>
               <a:ext uri="{FF2B5EF4-FFF2-40B4-BE49-F238E27FC236}">
-                <a16:creationId xmlns:a16="http://schemas.microsoft.com/office/drawing/2014/main" xmlns="" id="{01754CB8-17B1-45A0-AE7D-755EAA1B69D8}"/>
+                <a16:creationId xmlns="" xmlns:a16="http://schemas.microsoft.com/office/drawing/2014/main" id="{01754CB8-17B1-45A0-AE7D-755EAA1B69D8}"/>
               </a:ext>
             </a:extLst>
           </p:cNvPr>
@@ -358,7 +358,7 @@
           <p:cNvPr id="2" name="Title 1">
             <a:extLst>
               <a:ext uri="{FF2B5EF4-FFF2-40B4-BE49-F238E27FC236}">
-                <a16:creationId xmlns:a16="http://schemas.microsoft.com/office/drawing/2014/main" xmlns="" id="{E7A7B055-5DC2-440D-83C1-CAAE8E9A8E14}"/>
+                <a16:creationId xmlns="" xmlns:a16="http://schemas.microsoft.com/office/drawing/2014/main" id="{E7A7B055-5DC2-440D-83C1-CAAE8E9A8E14}"/>
               </a:ext>
             </a:extLst>
           </p:cNvPr>
@@ -386,7 +386,7 @@
           <p:cNvPr id="3" name="Vertical Text Placeholder 2">
             <a:extLst>
               <a:ext uri="{FF2B5EF4-FFF2-40B4-BE49-F238E27FC236}">
-                <a16:creationId xmlns:a16="http://schemas.microsoft.com/office/drawing/2014/main" xmlns="" id="{65710707-423D-4F9D-A49D-6C764C562553}"/>
+                <a16:creationId xmlns="" xmlns:a16="http://schemas.microsoft.com/office/drawing/2014/main" id="{65710707-423D-4F9D-A49D-6C764C562553}"/>
               </a:ext>
             </a:extLst>
           </p:cNvPr>
@@ -443,7 +443,7 @@
           <p:cNvPr id="4" name="Date Placeholder 3">
             <a:extLst>
               <a:ext uri="{FF2B5EF4-FFF2-40B4-BE49-F238E27FC236}">
-                <a16:creationId xmlns:a16="http://schemas.microsoft.com/office/drawing/2014/main" xmlns="" id="{98B6F7EF-D1BE-4437-85F3-99626E37E4EF}"/>
+                <a16:creationId xmlns="" xmlns:a16="http://schemas.microsoft.com/office/drawing/2014/main" id="{98B6F7EF-D1BE-4437-85F3-99626E37E4EF}"/>
               </a:ext>
             </a:extLst>
           </p:cNvPr>
@@ -472,7 +472,7 @@
           <p:cNvPr id="5" name="Footer Placeholder 4">
             <a:extLst>
               <a:ext uri="{FF2B5EF4-FFF2-40B4-BE49-F238E27FC236}">
-                <a16:creationId xmlns:a16="http://schemas.microsoft.com/office/drawing/2014/main" xmlns="" id="{D890AA9B-E479-4209-B245-83608F3D4013}"/>
+                <a16:creationId xmlns="" xmlns:a16="http://schemas.microsoft.com/office/drawing/2014/main" id="{D890AA9B-E479-4209-B245-83608F3D4013}"/>
               </a:ext>
             </a:extLst>
           </p:cNvPr>
@@ -497,7 +497,7 @@
           <p:cNvPr id="6" name="Slide Number Placeholder 5">
             <a:extLst>
               <a:ext uri="{FF2B5EF4-FFF2-40B4-BE49-F238E27FC236}">
-                <a16:creationId xmlns:a16="http://schemas.microsoft.com/office/drawing/2014/main" xmlns="" id="{0E4976E4-E15A-4296-A430-633D2BB9142B}"/>
+                <a16:creationId xmlns="" xmlns:a16="http://schemas.microsoft.com/office/drawing/2014/main" id="{0E4976E4-E15A-4296-A430-633D2BB9142B}"/>
               </a:ext>
             </a:extLst>
           </p:cNvPr>
@@ -556,7 +556,7 @@
           <p:cNvPr id="2" name="Vertical Title 1">
             <a:extLst>
               <a:ext uri="{FF2B5EF4-FFF2-40B4-BE49-F238E27FC236}">
-                <a16:creationId xmlns:a16="http://schemas.microsoft.com/office/drawing/2014/main" xmlns="" id="{66F63CF5-8DEE-4BB2-A2A5-5C16FEBE1AD5}"/>
+                <a16:creationId xmlns="" xmlns:a16="http://schemas.microsoft.com/office/drawing/2014/main" id="{66F63CF5-8DEE-4BB2-A2A5-5C16FEBE1AD5}"/>
               </a:ext>
             </a:extLst>
           </p:cNvPr>
@@ -589,7 +589,7 @@
           <p:cNvPr id="3" name="Vertical Text Placeholder 2">
             <a:extLst>
               <a:ext uri="{FF2B5EF4-FFF2-40B4-BE49-F238E27FC236}">
-                <a16:creationId xmlns:a16="http://schemas.microsoft.com/office/drawing/2014/main" xmlns="" id="{E0D5EBA5-94AF-4373-B032-A40FF73C7575}"/>
+                <a16:creationId xmlns="" xmlns:a16="http://schemas.microsoft.com/office/drawing/2014/main" id="{E0D5EBA5-94AF-4373-B032-A40FF73C7575}"/>
               </a:ext>
             </a:extLst>
           </p:cNvPr>
@@ -651,7 +651,7 @@
           <p:cNvPr id="4" name="Date Placeholder 3">
             <a:extLst>
               <a:ext uri="{FF2B5EF4-FFF2-40B4-BE49-F238E27FC236}">
-                <a16:creationId xmlns:a16="http://schemas.microsoft.com/office/drawing/2014/main" xmlns="" id="{7426B8E1-6758-4F5E-B618-96641332600B}"/>
+                <a16:creationId xmlns="" xmlns:a16="http://schemas.microsoft.com/office/drawing/2014/main" id="{7426B8E1-6758-4F5E-B618-96641332600B}"/>
               </a:ext>
             </a:extLst>
           </p:cNvPr>
@@ -680,7 +680,7 @@
           <p:cNvPr id="5" name="Footer Placeholder 4">
             <a:extLst>
               <a:ext uri="{FF2B5EF4-FFF2-40B4-BE49-F238E27FC236}">
-                <a16:creationId xmlns:a16="http://schemas.microsoft.com/office/drawing/2014/main" xmlns="" id="{F65E330E-2A7E-482D-AE0F-70EA5A29958B}"/>
+                <a16:creationId xmlns="" xmlns:a16="http://schemas.microsoft.com/office/drawing/2014/main" id="{F65E330E-2A7E-482D-AE0F-70EA5A29958B}"/>
               </a:ext>
             </a:extLst>
           </p:cNvPr>
@@ -705,7 +705,7 @@
           <p:cNvPr id="6" name="Slide Number Placeholder 5">
             <a:extLst>
               <a:ext uri="{FF2B5EF4-FFF2-40B4-BE49-F238E27FC236}">
-                <a16:creationId xmlns:a16="http://schemas.microsoft.com/office/drawing/2014/main" xmlns="" id="{B8000005-FC38-4A6C-9D09-7945EFA08160}"/>
+                <a16:creationId xmlns="" xmlns:a16="http://schemas.microsoft.com/office/drawing/2014/main" id="{B8000005-FC38-4A6C-9D09-7945EFA08160}"/>
               </a:ext>
             </a:extLst>
           </p:cNvPr>
@@ -764,7 +764,7 @@
           <p:cNvPr id="2" name="Title 1">
             <a:extLst>
               <a:ext uri="{FF2B5EF4-FFF2-40B4-BE49-F238E27FC236}">
-                <a16:creationId xmlns:a16="http://schemas.microsoft.com/office/drawing/2014/main" xmlns="" id="{91D0002C-766B-44B4-A24C-BE6DE6C7BA4C}"/>
+                <a16:creationId xmlns="" xmlns:a16="http://schemas.microsoft.com/office/drawing/2014/main" id="{91D0002C-766B-44B4-A24C-BE6DE6C7BA4C}"/>
               </a:ext>
             </a:extLst>
           </p:cNvPr>
@@ -792,7 +792,7 @@
           <p:cNvPr id="3" name="Content Placeholder 2">
             <a:extLst>
               <a:ext uri="{FF2B5EF4-FFF2-40B4-BE49-F238E27FC236}">
-                <a16:creationId xmlns:a16="http://schemas.microsoft.com/office/drawing/2014/main" xmlns="" id="{3455BAA9-6C7B-4874-AD76-BD466F64802D}"/>
+                <a16:creationId xmlns="" xmlns:a16="http://schemas.microsoft.com/office/drawing/2014/main" id="{3455BAA9-6C7B-4874-AD76-BD466F64802D}"/>
               </a:ext>
             </a:extLst>
           </p:cNvPr>
@@ -849,7 +849,7 @@
           <p:cNvPr id="4" name="Date Placeholder 3">
             <a:extLst>
               <a:ext uri="{FF2B5EF4-FFF2-40B4-BE49-F238E27FC236}">
-                <a16:creationId xmlns:a16="http://schemas.microsoft.com/office/drawing/2014/main" xmlns="" id="{8776BDAF-D8F2-4A61-904D-094BB4545702}"/>
+                <a16:creationId xmlns="" xmlns:a16="http://schemas.microsoft.com/office/drawing/2014/main" id="{8776BDAF-D8F2-4A61-904D-094BB4545702}"/>
               </a:ext>
             </a:extLst>
           </p:cNvPr>
@@ -878,7 +878,7 @@
           <p:cNvPr id="5" name="Footer Placeholder 4">
             <a:extLst>
               <a:ext uri="{FF2B5EF4-FFF2-40B4-BE49-F238E27FC236}">
-                <a16:creationId xmlns:a16="http://schemas.microsoft.com/office/drawing/2014/main" xmlns="" id="{F89C5665-4384-4706-9BD2-9F42B05C96BC}"/>
+                <a16:creationId xmlns="" xmlns:a16="http://schemas.microsoft.com/office/drawing/2014/main" id="{F89C5665-4384-4706-9BD2-9F42B05C96BC}"/>
               </a:ext>
             </a:extLst>
           </p:cNvPr>
@@ -903,7 +903,7 @@
           <p:cNvPr id="6" name="Slide Number Placeholder 5">
             <a:extLst>
               <a:ext uri="{FF2B5EF4-FFF2-40B4-BE49-F238E27FC236}">
-                <a16:creationId xmlns:a16="http://schemas.microsoft.com/office/drawing/2014/main" xmlns="" id="{7DCAD73E-CAB3-4BA7-905E-D203691D0418}"/>
+                <a16:creationId xmlns="" xmlns:a16="http://schemas.microsoft.com/office/drawing/2014/main" id="{7DCAD73E-CAB3-4BA7-905E-D203691D0418}"/>
               </a:ext>
             </a:extLst>
           </p:cNvPr>
@@ -962,7 +962,7 @@
           <p:cNvPr id="2" name="Title 1">
             <a:extLst>
               <a:ext uri="{FF2B5EF4-FFF2-40B4-BE49-F238E27FC236}">
-                <a16:creationId xmlns:a16="http://schemas.microsoft.com/office/drawing/2014/main" xmlns="" id="{A9880706-F7FA-4EC3-A022-9D6C7CEC3692}"/>
+                <a16:creationId xmlns="" xmlns:a16="http://schemas.microsoft.com/office/drawing/2014/main" id="{A9880706-F7FA-4EC3-A022-9D6C7CEC3692}"/>
               </a:ext>
             </a:extLst>
           </p:cNvPr>
@@ -999,7 +999,7 @@
           <p:cNvPr id="3" name="Text Placeholder 2">
             <a:extLst>
               <a:ext uri="{FF2B5EF4-FFF2-40B4-BE49-F238E27FC236}">
-                <a16:creationId xmlns:a16="http://schemas.microsoft.com/office/drawing/2014/main" xmlns="" id="{FA8A65D0-3DF5-448D-82EC-A967682A0DED}"/>
+                <a16:creationId xmlns="" xmlns:a16="http://schemas.microsoft.com/office/drawing/2014/main" id="{FA8A65D0-3DF5-448D-82EC-A967682A0DED}"/>
               </a:ext>
             </a:extLst>
           </p:cNvPr>
@@ -1124,7 +1124,7 @@
           <p:cNvPr id="4" name="Date Placeholder 3">
             <a:extLst>
               <a:ext uri="{FF2B5EF4-FFF2-40B4-BE49-F238E27FC236}">
-                <a16:creationId xmlns:a16="http://schemas.microsoft.com/office/drawing/2014/main" xmlns="" id="{600EA68C-01A6-487D-9D6E-1D1B4EAC0440}"/>
+                <a16:creationId xmlns="" xmlns:a16="http://schemas.microsoft.com/office/drawing/2014/main" id="{600EA68C-01A6-487D-9D6E-1D1B4EAC0440}"/>
               </a:ext>
             </a:extLst>
           </p:cNvPr>
@@ -1153,7 +1153,7 @@
           <p:cNvPr id="5" name="Footer Placeholder 4">
             <a:extLst>
               <a:ext uri="{FF2B5EF4-FFF2-40B4-BE49-F238E27FC236}">
-                <a16:creationId xmlns:a16="http://schemas.microsoft.com/office/drawing/2014/main" xmlns="" id="{6E6527CB-4FFD-4569-A82C-5EDC311B2CF6}"/>
+                <a16:creationId xmlns="" xmlns:a16="http://schemas.microsoft.com/office/drawing/2014/main" id="{6E6527CB-4FFD-4569-A82C-5EDC311B2CF6}"/>
               </a:ext>
             </a:extLst>
           </p:cNvPr>
@@ -1178,7 +1178,7 @@
           <p:cNvPr id="6" name="Slide Number Placeholder 5">
             <a:extLst>
               <a:ext uri="{FF2B5EF4-FFF2-40B4-BE49-F238E27FC236}">
-                <a16:creationId xmlns:a16="http://schemas.microsoft.com/office/drawing/2014/main" xmlns="" id="{24B19E5B-5A98-4381-A01D-01F81FD65792}"/>
+                <a16:creationId xmlns="" xmlns:a16="http://schemas.microsoft.com/office/drawing/2014/main" id="{24B19E5B-5A98-4381-A01D-01F81FD65792}"/>
               </a:ext>
             </a:extLst>
           </p:cNvPr>
@@ -1237,7 +1237,7 @@
           <p:cNvPr id="2" name="Title 1">
             <a:extLst>
               <a:ext uri="{FF2B5EF4-FFF2-40B4-BE49-F238E27FC236}">
-                <a16:creationId xmlns:a16="http://schemas.microsoft.com/office/drawing/2014/main" xmlns="" id="{63228B71-E923-4431-B8D2-FAE724678940}"/>
+                <a16:creationId xmlns="" xmlns:a16="http://schemas.microsoft.com/office/drawing/2014/main" id="{63228B71-E923-4431-B8D2-FAE724678940}"/>
               </a:ext>
             </a:extLst>
           </p:cNvPr>
@@ -1265,7 +1265,7 @@
           <p:cNvPr id="3" name="Content Placeholder 2">
             <a:extLst>
               <a:ext uri="{FF2B5EF4-FFF2-40B4-BE49-F238E27FC236}">
-                <a16:creationId xmlns:a16="http://schemas.microsoft.com/office/drawing/2014/main" xmlns="" id="{B18895E9-B7FF-4A00-955B-206CF8C73E43}"/>
+                <a16:creationId xmlns="" xmlns:a16="http://schemas.microsoft.com/office/drawing/2014/main" id="{B18895E9-B7FF-4A00-955B-206CF8C73E43}"/>
               </a:ext>
             </a:extLst>
           </p:cNvPr>
@@ -1327,7 +1327,7 @@
           <p:cNvPr id="4" name="Content Placeholder 3">
             <a:extLst>
               <a:ext uri="{FF2B5EF4-FFF2-40B4-BE49-F238E27FC236}">
-                <a16:creationId xmlns:a16="http://schemas.microsoft.com/office/drawing/2014/main" xmlns="" id="{DA813955-E3B9-44BC-8E1D-139269C8B48A}"/>
+                <a16:creationId xmlns="" xmlns:a16="http://schemas.microsoft.com/office/drawing/2014/main" id="{DA813955-E3B9-44BC-8E1D-139269C8B48A}"/>
               </a:ext>
             </a:extLst>
           </p:cNvPr>
@@ -1389,7 +1389,7 @@
           <p:cNvPr id="5" name="Date Placeholder 4">
             <a:extLst>
               <a:ext uri="{FF2B5EF4-FFF2-40B4-BE49-F238E27FC236}">
-                <a16:creationId xmlns:a16="http://schemas.microsoft.com/office/drawing/2014/main" xmlns="" id="{7E9B8EF5-28D5-4C4E-A2AB-EEA30D75DAFE}"/>
+                <a16:creationId xmlns="" xmlns:a16="http://schemas.microsoft.com/office/drawing/2014/main" id="{7E9B8EF5-28D5-4C4E-A2AB-EEA30D75DAFE}"/>
               </a:ext>
             </a:extLst>
           </p:cNvPr>
@@ -1418,7 +1418,7 @@
           <p:cNvPr id="6" name="Footer Placeholder 5">
             <a:extLst>
               <a:ext uri="{FF2B5EF4-FFF2-40B4-BE49-F238E27FC236}">
-                <a16:creationId xmlns:a16="http://schemas.microsoft.com/office/drawing/2014/main" xmlns="" id="{5723E678-8CB4-4335-AA04-6BD391748717}"/>
+                <a16:creationId xmlns="" xmlns:a16="http://schemas.microsoft.com/office/drawing/2014/main" id="{5723E678-8CB4-4335-AA04-6BD391748717}"/>
               </a:ext>
             </a:extLst>
           </p:cNvPr>
@@ -1443,7 +1443,7 @@
           <p:cNvPr id="7" name="Slide Number Placeholder 6">
             <a:extLst>
               <a:ext uri="{FF2B5EF4-FFF2-40B4-BE49-F238E27FC236}">
-                <a16:creationId xmlns:a16="http://schemas.microsoft.com/office/drawing/2014/main" xmlns="" id="{887B5567-9F4D-4AE1-92D8-769C9F7EA4F0}"/>
+                <a16:creationId xmlns="" xmlns:a16="http://schemas.microsoft.com/office/drawing/2014/main" id="{887B5567-9F4D-4AE1-92D8-769C9F7EA4F0}"/>
               </a:ext>
             </a:extLst>
           </p:cNvPr>
@@ -1502,7 +1502,7 @@
           <p:cNvPr id="2" name="Title 1">
             <a:extLst>
               <a:ext uri="{FF2B5EF4-FFF2-40B4-BE49-F238E27FC236}">
-                <a16:creationId xmlns:a16="http://schemas.microsoft.com/office/drawing/2014/main" xmlns="" id="{A40320A9-7C0C-45B4-BF2B-3B53B5686EBB}"/>
+                <a16:creationId xmlns="" xmlns:a16="http://schemas.microsoft.com/office/drawing/2014/main" id="{A40320A9-7C0C-45B4-BF2B-3B53B5686EBB}"/>
               </a:ext>
             </a:extLst>
           </p:cNvPr>
@@ -1535,7 +1535,7 @@
           <p:cNvPr id="3" name="Text Placeholder 2">
             <a:extLst>
               <a:ext uri="{FF2B5EF4-FFF2-40B4-BE49-F238E27FC236}">
-                <a16:creationId xmlns:a16="http://schemas.microsoft.com/office/drawing/2014/main" xmlns="" id="{8C440DE1-7DD6-4B1C-B961-CD2079B51F03}"/>
+                <a16:creationId xmlns="" xmlns:a16="http://schemas.microsoft.com/office/drawing/2014/main" id="{8C440DE1-7DD6-4B1C-B961-CD2079B51F03}"/>
               </a:ext>
             </a:extLst>
           </p:cNvPr>
@@ -1606,7 +1606,7 @@
           <p:cNvPr id="4" name="Content Placeholder 3">
             <a:extLst>
               <a:ext uri="{FF2B5EF4-FFF2-40B4-BE49-F238E27FC236}">
-                <a16:creationId xmlns:a16="http://schemas.microsoft.com/office/drawing/2014/main" xmlns="" id="{6FAFE840-CC9A-4D89-B05F-159EF756B427}"/>
+                <a16:creationId xmlns="" xmlns:a16="http://schemas.microsoft.com/office/drawing/2014/main" id="{6FAFE840-CC9A-4D89-B05F-159EF756B427}"/>
               </a:ext>
             </a:extLst>
           </p:cNvPr>
@@ -1668,7 +1668,7 @@
           <p:cNvPr id="5" name="Text Placeholder 4">
             <a:extLst>
               <a:ext uri="{FF2B5EF4-FFF2-40B4-BE49-F238E27FC236}">
-                <a16:creationId xmlns:a16="http://schemas.microsoft.com/office/drawing/2014/main" xmlns="" id="{4B87AADC-3401-48C6-98F6-0AB60F6DF9BE}"/>
+                <a16:creationId xmlns="" xmlns:a16="http://schemas.microsoft.com/office/drawing/2014/main" id="{4B87AADC-3401-48C6-98F6-0AB60F6DF9BE}"/>
               </a:ext>
             </a:extLst>
           </p:cNvPr>
@@ -1739,7 +1739,7 @@
           <p:cNvPr id="6" name="Content Placeholder 5">
             <a:extLst>
               <a:ext uri="{FF2B5EF4-FFF2-40B4-BE49-F238E27FC236}">
-                <a16:creationId xmlns:a16="http://schemas.microsoft.com/office/drawing/2014/main" xmlns="" id="{34BCF1A4-FB52-4DCD-80BC-324BA41C33CD}"/>
+                <a16:creationId xmlns="" xmlns:a16="http://schemas.microsoft.com/office/drawing/2014/main" id="{34BCF1A4-FB52-4DCD-80BC-324BA41C33CD}"/>
               </a:ext>
             </a:extLst>
           </p:cNvPr>
@@ -1801,7 +1801,7 @@
           <p:cNvPr id="7" name="Date Placeholder 6">
             <a:extLst>
               <a:ext uri="{FF2B5EF4-FFF2-40B4-BE49-F238E27FC236}">
-                <a16:creationId xmlns:a16="http://schemas.microsoft.com/office/drawing/2014/main" xmlns="" id="{8CFD4208-60E7-48B1-8CD0-717D5E26B827}"/>
+                <a16:creationId xmlns="" xmlns:a16="http://schemas.microsoft.com/office/drawing/2014/main" id="{8CFD4208-60E7-48B1-8CD0-717D5E26B827}"/>
               </a:ext>
             </a:extLst>
           </p:cNvPr>
@@ -1830,7 +1830,7 @@
           <p:cNvPr id="8" name="Footer Placeholder 7">
             <a:extLst>
               <a:ext uri="{FF2B5EF4-FFF2-40B4-BE49-F238E27FC236}">
-                <a16:creationId xmlns:a16="http://schemas.microsoft.com/office/drawing/2014/main" xmlns="" id="{94E429D1-BEB1-4D8A-91F2-CD4F80157F8D}"/>
+                <a16:creationId xmlns="" xmlns:a16="http://schemas.microsoft.com/office/drawing/2014/main" id="{94E429D1-BEB1-4D8A-91F2-CD4F80157F8D}"/>
               </a:ext>
             </a:extLst>
           </p:cNvPr>
@@ -1855,7 +1855,7 @@
           <p:cNvPr id="9" name="Slide Number Placeholder 8">
             <a:extLst>
               <a:ext uri="{FF2B5EF4-FFF2-40B4-BE49-F238E27FC236}">
-                <a16:creationId xmlns:a16="http://schemas.microsoft.com/office/drawing/2014/main" xmlns="" id="{6F17C19C-8370-4118-A8FC-5DDA6F84230F}"/>
+                <a16:creationId xmlns="" xmlns:a16="http://schemas.microsoft.com/office/drawing/2014/main" id="{6F17C19C-8370-4118-A8FC-5DDA6F84230F}"/>
               </a:ext>
             </a:extLst>
           </p:cNvPr>
@@ -1914,7 +1914,7 @@
           <p:cNvPr id="2" name="Title 1">
             <a:extLst>
               <a:ext uri="{FF2B5EF4-FFF2-40B4-BE49-F238E27FC236}">
-                <a16:creationId xmlns:a16="http://schemas.microsoft.com/office/drawing/2014/main" xmlns="" id="{252CBF36-7F99-45A9-BC35-BD2EC260CBF0}"/>
+                <a16:creationId xmlns="" xmlns:a16="http://schemas.microsoft.com/office/drawing/2014/main" id="{252CBF36-7F99-45A9-BC35-BD2EC260CBF0}"/>
               </a:ext>
             </a:extLst>
           </p:cNvPr>
@@ -1942,7 +1942,7 @@
           <p:cNvPr id="3" name="Date Placeholder 2">
             <a:extLst>
               <a:ext uri="{FF2B5EF4-FFF2-40B4-BE49-F238E27FC236}">
-                <a16:creationId xmlns:a16="http://schemas.microsoft.com/office/drawing/2014/main" xmlns="" id="{0D6F5F83-F07E-4501-B86B-9F96CD43993C}"/>
+                <a16:creationId xmlns="" xmlns:a16="http://schemas.microsoft.com/office/drawing/2014/main" id="{0D6F5F83-F07E-4501-B86B-9F96CD43993C}"/>
               </a:ext>
             </a:extLst>
           </p:cNvPr>
@@ -1971,7 +1971,7 @@
           <p:cNvPr id="4" name="Footer Placeholder 3">
             <a:extLst>
               <a:ext uri="{FF2B5EF4-FFF2-40B4-BE49-F238E27FC236}">
-                <a16:creationId xmlns:a16="http://schemas.microsoft.com/office/drawing/2014/main" xmlns="" id="{2861989B-F8E9-41FD-8E16-687424BCC266}"/>
+                <a16:creationId xmlns="" xmlns:a16="http://schemas.microsoft.com/office/drawing/2014/main" id="{2861989B-F8E9-41FD-8E16-687424BCC266}"/>
               </a:ext>
             </a:extLst>
           </p:cNvPr>
@@ -1996,7 +1996,7 @@
           <p:cNvPr id="5" name="Slide Number Placeholder 4">
             <a:extLst>
               <a:ext uri="{FF2B5EF4-FFF2-40B4-BE49-F238E27FC236}">
-                <a16:creationId xmlns:a16="http://schemas.microsoft.com/office/drawing/2014/main" xmlns="" id="{2026B6D7-7832-4815-95CE-5CEC39502825}"/>
+                <a16:creationId xmlns="" xmlns:a16="http://schemas.microsoft.com/office/drawing/2014/main" id="{2026B6D7-7832-4815-95CE-5CEC39502825}"/>
               </a:ext>
             </a:extLst>
           </p:cNvPr>
@@ -2055,7 +2055,7 @@
           <p:cNvPr id="2" name="Date Placeholder 1">
             <a:extLst>
               <a:ext uri="{FF2B5EF4-FFF2-40B4-BE49-F238E27FC236}">
-                <a16:creationId xmlns:a16="http://schemas.microsoft.com/office/drawing/2014/main" xmlns="" id="{9877919A-C4B6-46FD-A08A-9A4B867FE01A}"/>
+                <a16:creationId xmlns="" xmlns:a16="http://schemas.microsoft.com/office/drawing/2014/main" id="{9877919A-C4B6-46FD-A08A-9A4B867FE01A}"/>
               </a:ext>
             </a:extLst>
           </p:cNvPr>
@@ -2084,7 +2084,7 @@
           <p:cNvPr id="3" name="Footer Placeholder 2">
             <a:extLst>
               <a:ext uri="{FF2B5EF4-FFF2-40B4-BE49-F238E27FC236}">
-                <a16:creationId xmlns:a16="http://schemas.microsoft.com/office/drawing/2014/main" xmlns="" id="{9118539E-383C-4F1C-86F2-14C533A7E9FB}"/>
+                <a16:creationId xmlns="" xmlns:a16="http://schemas.microsoft.com/office/drawing/2014/main" id="{9118539E-383C-4F1C-86F2-14C533A7E9FB}"/>
               </a:ext>
             </a:extLst>
           </p:cNvPr>
@@ -2109,7 +2109,7 @@
           <p:cNvPr id="4" name="Slide Number Placeholder 3">
             <a:extLst>
               <a:ext uri="{FF2B5EF4-FFF2-40B4-BE49-F238E27FC236}">
-                <a16:creationId xmlns:a16="http://schemas.microsoft.com/office/drawing/2014/main" xmlns="" id="{C9A6D4E1-CA83-4214-9942-9E4617AA89BF}"/>
+                <a16:creationId xmlns="" xmlns:a16="http://schemas.microsoft.com/office/drawing/2014/main" id="{C9A6D4E1-CA83-4214-9942-9E4617AA89BF}"/>
               </a:ext>
             </a:extLst>
           </p:cNvPr>
@@ -2168,7 +2168,7 @@
           <p:cNvPr id="2" name="Title 1">
             <a:extLst>
               <a:ext uri="{FF2B5EF4-FFF2-40B4-BE49-F238E27FC236}">
-                <a16:creationId xmlns:a16="http://schemas.microsoft.com/office/drawing/2014/main" xmlns="" id="{046EF9B5-7A2A-4225-8817-86D028D6950C}"/>
+                <a16:creationId xmlns="" xmlns:a16="http://schemas.microsoft.com/office/drawing/2014/main" id="{046EF9B5-7A2A-4225-8817-86D028D6950C}"/>
               </a:ext>
             </a:extLst>
           </p:cNvPr>
@@ -2205,7 +2205,7 @@
           <p:cNvPr id="3" name="Content Placeholder 2">
             <a:extLst>
               <a:ext uri="{FF2B5EF4-FFF2-40B4-BE49-F238E27FC236}">
-                <a16:creationId xmlns:a16="http://schemas.microsoft.com/office/drawing/2014/main" xmlns="" id="{8667C390-5297-41E8-A403-22856007B051}"/>
+                <a16:creationId xmlns="" xmlns:a16="http://schemas.microsoft.com/office/drawing/2014/main" id="{8667C390-5297-41E8-A403-22856007B051}"/>
               </a:ext>
             </a:extLst>
           </p:cNvPr>
@@ -2295,7 +2295,7 @@
           <p:cNvPr id="4" name="Text Placeholder 3">
             <a:extLst>
               <a:ext uri="{FF2B5EF4-FFF2-40B4-BE49-F238E27FC236}">
-                <a16:creationId xmlns:a16="http://schemas.microsoft.com/office/drawing/2014/main" xmlns="" id="{8D0D2F7D-D6CD-4AB1-A3EA-CBFD2A2B3703}"/>
+                <a16:creationId xmlns="" xmlns:a16="http://schemas.microsoft.com/office/drawing/2014/main" id="{8D0D2F7D-D6CD-4AB1-A3EA-CBFD2A2B3703}"/>
               </a:ext>
             </a:extLst>
           </p:cNvPr>
@@ -2366,7 +2366,7 @@
           <p:cNvPr id="5" name="Date Placeholder 4">
             <a:extLst>
               <a:ext uri="{FF2B5EF4-FFF2-40B4-BE49-F238E27FC236}">
-                <a16:creationId xmlns:a16="http://schemas.microsoft.com/office/drawing/2014/main" xmlns="" id="{E17A441D-4FA7-4110-BF24-165CD3C3DAD7}"/>
+                <a16:creationId xmlns="" xmlns:a16="http://schemas.microsoft.com/office/drawing/2014/main" id="{E17A441D-4FA7-4110-BF24-165CD3C3DAD7}"/>
               </a:ext>
             </a:extLst>
           </p:cNvPr>
@@ -2395,7 +2395,7 @@
           <p:cNvPr id="6" name="Footer Placeholder 5">
             <a:extLst>
               <a:ext uri="{FF2B5EF4-FFF2-40B4-BE49-F238E27FC236}">
-                <a16:creationId xmlns:a16="http://schemas.microsoft.com/office/drawing/2014/main" xmlns="" id="{346102C5-5AE3-43CF-A686-1AB72B0790AB}"/>
+                <a16:creationId xmlns="" xmlns:a16="http://schemas.microsoft.com/office/drawing/2014/main" id="{346102C5-5AE3-43CF-A686-1AB72B0790AB}"/>
               </a:ext>
             </a:extLst>
           </p:cNvPr>
@@ -2420,7 +2420,7 @@
           <p:cNvPr id="7" name="Slide Number Placeholder 6">
             <a:extLst>
               <a:ext uri="{FF2B5EF4-FFF2-40B4-BE49-F238E27FC236}">
-                <a16:creationId xmlns:a16="http://schemas.microsoft.com/office/drawing/2014/main" xmlns="" id="{5528B3F7-462C-4500-8836-B3E5CD8DA61A}"/>
+                <a16:creationId xmlns="" xmlns:a16="http://schemas.microsoft.com/office/drawing/2014/main" id="{5528B3F7-462C-4500-8836-B3E5CD8DA61A}"/>
               </a:ext>
             </a:extLst>
           </p:cNvPr>
@@ -2479,7 +2479,7 @@
           <p:cNvPr id="2" name="Title 1">
             <a:extLst>
               <a:ext uri="{FF2B5EF4-FFF2-40B4-BE49-F238E27FC236}">
-                <a16:creationId xmlns:a16="http://schemas.microsoft.com/office/drawing/2014/main" xmlns="" id="{4BA10E59-DA48-4690-A956-9EB8E4E11EE5}"/>
+                <a16:creationId xmlns="" xmlns:a16="http://schemas.microsoft.com/office/drawing/2014/main" id="{4BA10E59-DA48-4690-A956-9EB8E4E11EE5}"/>
               </a:ext>
             </a:extLst>
           </p:cNvPr>
@@ -2516,7 +2516,7 @@
           <p:cNvPr id="3" name="Picture Placeholder 2">
             <a:extLst>
               <a:ext uri="{FF2B5EF4-FFF2-40B4-BE49-F238E27FC236}">
-                <a16:creationId xmlns:a16="http://schemas.microsoft.com/office/drawing/2014/main" xmlns="" id="{AC7AFE1E-67D1-4106-97CA-98302D42CC4D}"/>
+                <a16:creationId xmlns="" xmlns:a16="http://schemas.microsoft.com/office/drawing/2014/main" id="{AC7AFE1E-67D1-4106-97CA-98302D42CC4D}"/>
               </a:ext>
             </a:extLst>
           </p:cNvPr>
@@ -2583,7 +2583,7 @@
           <p:cNvPr id="4" name="Text Placeholder 3">
             <a:extLst>
               <a:ext uri="{FF2B5EF4-FFF2-40B4-BE49-F238E27FC236}">
-                <a16:creationId xmlns:a16="http://schemas.microsoft.com/office/drawing/2014/main" xmlns="" id="{67D8D73B-3D4D-42A7-9A3C-1D508E8A9B45}"/>
+                <a16:creationId xmlns="" xmlns:a16="http://schemas.microsoft.com/office/drawing/2014/main" id="{67D8D73B-3D4D-42A7-9A3C-1D508E8A9B45}"/>
               </a:ext>
             </a:extLst>
           </p:cNvPr>
@@ -2654,7 +2654,7 @@
           <p:cNvPr id="5" name="Date Placeholder 4">
             <a:extLst>
               <a:ext uri="{FF2B5EF4-FFF2-40B4-BE49-F238E27FC236}">
-                <a16:creationId xmlns:a16="http://schemas.microsoft.com/office/drawing/2014/main" xmlns="" id="{48C8945E-A47A-42A2-9DF6-CA6D5002F65F}"/>
+                <a16:creationId xmlns="" xmlns:a16="http://schemas.microsoft.com/office/drawing/2014/main" id="{48C8945E-A47A-42A2-9DF6-CA6D5002F65F}"/>
               </a:ext>
             </a:extLst>
           </p:cNvPr>
@@ -2683,7 +2683,7 @@
           <p:cNvPr id="6" name="Footer Placeholder 5">
             <a:extLst>
               <a:ext uri="{FF2B5EF4-FFF2-40B4-BE49-F238E27FC236}">
-                <a16:creationId xmlns:a16="http://schemas.microsoft.com/office/drawing/2014/main" xmlns="" id="{EB000DB4-2747-4297-B400-42A539FBDB42}"/>
+                <a16:creationId xmlns="" xmlns:a16="http://schemas.microsoft.com/office/drawing/2014/main" id="{EB000DB4-2747-4297-B400-42A539FBDB42}"/>
               </a:ext>
             </a:extLst>
           </p:cNvPr>
@@ -2708,7 +2708,7 @@
           <p:cNvPr id="7" name="Slide Number Placeholder 6">
             <a:extLst>
               <a:ext uri="{FF2B5EF4-FFF2-40B4-BE49-F238E27FC236}">
-                <a16:creationId xmlns:a16="http://schemas.microsoft.com/office/drawing/2014/main" xmlns="" id="{5BAD9222-F141-4803-AF73-E2DD92E2ABBC}"/>
+                <a16:creationId xmlns="" xmlns:a16="http://schemas.microsoft.com/office/drawing/2014/main" id="{5BAD9222-F141-4803-AF73-E2DD92E2ABBC}"/>
               </a:ext>
             </a:extLst>
           </p:cNvPr>
@@ -2772,7 +2772,7 @@
           <p:cNvPr id="2" name="Title Placeholder 1">
             <a:extLst>
               <a:ext uri="{FF2B5EF4-FFF2-40B4-BE49-F238E27FC236}">
-                <a16:creationId xmlns:a16="http://schemas.microsoft.com/office/drawing/2014/main" xmlns="" id="{5BF9D404-795C-4EA4-AD01-26740519239C}"/>
+                <a16:creationId xmlns="" xmlns:a16="http://schemas.microsoft.com/office/drawing/2014/main" id="{5BF9D404-795C-4EA4-AD01-26740519239C}"/>
               </a:ext>
             </a:extLst>
           </p:cNvPr>
@@ -2810,7 +2810,7 @@
           <p:cNvPr id="3" name="Text Placeholder 2">
             <a:extLst>
               <a:ext uri="{FF2B5EF4-FFF2-40B4-BE49-F238E27FC236}">
-                <a16:creationId xmlns:a16="http://schemas.microsoft.com/office/drawing/2014/main" xmlns="" id="{DE3FEC7B-48F8-4348-9BC6-68F83B859EE9}"/>
+                <a16:creationId xmlns="" xmlns:a16="http://schemas.microsoft.com/office/drawing/2014/main" id="{DE3FEC7B-48F8-4348-9BC6-68F83B859EE9}"/>
               </a:ext>
             </a:extLst>
           </p:cNvPr>
@@ -2877,7 +2877,7 @@
           <p:cNvPr id="4" name="Date Placeholder 3">
             <a:extLst>
               <a:ext uri="{FF2B5EF4-FFF2-40B4-BE49-F238E27FC236}">
-                <a16:creationId xmlns:a16="http://schemas.microsoft.com/office/drawing/2014/main" xmlns="" id="{31CA1A1D-E2F5-4161-A025-7B911965C2FE}"/>
+                <a16:creationId xmlns="" xmlns:a16="http://schemas.microsoft.com/office/drawing/2014/main" id="{31CA1A1D-E2F5-4161-A025-7B911965C2FE}"/>
               </a:ext>
             </a:extLst>
           </p:cNvPr>
@@ -2924,7 +2924,7 @@
           <p:cNvPr id="5" name="Footer Placeholder 4">
             <a:extLst>
               <a:ext uri="{FF2B5EF4-FFF2-40B4-BE49-F238E27FC236}">
-                <a16:creationId xmlns:a16="http://schemas.microsoft.com/office/drawing/2014/main" xmlns="" id="{43C7B926-18F3-4C13-AB92-764E10D324FB}"/>
+                <a16:creationId xmlns="" xmlns:a16="http://schemas.microsoft.com/office/drawing/2014/main" id="{43C7B926-18F3-4C13-AB92-764E10D324FB}"/>
               </a:ext>
             </a:extLst>
           </p:cNvPr>
@@ -2967,7 +2967,7 @@
           <p:cNvPr id="6" name="Slide Number Placeholder 5">
             <a:extLst>
               <a:ext uri="{FF2B5EF4-FFF2-40B4-BE49-F238E27FC236}">
-                <a16:creationId xmlns:a16="http://schemas.microsoft.com/office/drawing/2014/main" xmlns="" id="{734FA846-3BF6-46FD-80CF-34B300D244C0}"/>
+                <a16:creationId xmlns="" xmlns:a16="http://schemas.microsoft.com/office/drawing/2014/main" id="{734FA846-3BF6-46FD-80CF-34B300D244C0}"/>
               </a:ext>
             </a:extLst>
           </p:cNvPr>
@@ -3520,11 +3520,7 @@
             </a:r>
             <a:r>
               <a:rPr lang="en-US" dirty="0" smtClean="0"/>
-              <a:t>,</a:t>
-            </a:r>
-            <a:r>
-              <a:rPr lang="en-US" dirty="0" smtClean="0"/>
-              <a:t> </a:t>
+              <a:t>, </a:t>
             </a:r>
             <a:r>
               <a:rPr lang="en-US" dirty="0"/>
@@ -3557,11 +3553,15 @@
             </a:pPr>
             <a:r>
               <a:rPr lang="en-US" dirty="0" smtClean="0"/>
-              <a:t>Login, User, and Reimbursement </a:t>
-            </a:r>
-            <a:r>
-              <a:rPr lang="en-US" dirty="0" err="1" smtClean="0"/>
-              <a:t>enpoints</a:t>
+              <a:t>Login and </a:t>
+            </a:r>
+            <a:r>
+              <a:rPr lang="en-US" dirty="0" smtClean="0"/>
+              <a:t>Reimbursement </a:t>
+            </a:r>
+            <a:r>
+              <a:rPr lang="en-US" dirty="0" smtClean="0"/>
+              <a:t>endpoints</a:t>
             </a:r>
             <a:endParaRPr lang="en-US" b="1" dirty="0"/>
           </a:p>
@@ -3680,11 +3680,7 @@
             </a:pPr>
             <a:r>
               <a:rPr lang="en-US" dirty="0" smtClean="0"/>
-              <a:t>Hibernate </a:t>
-            </a:r>
-            <a:r>
-              <a:rPr lang="en-US" dirty="0" smtClean="0"/>
-              <a:t>HQL object orientated schema creation, data loads, record creation and updates</a:t>
+              <a:t>Hibernate HQL object orientated schema creation, data loads, record creation and updates</a:t>
             </a:r>
           </a:p>
           <a:p>
@@ -3806,7 +3802,7 @@
           <p:cNvPr id="53" name="TextBox 52">
             <a:extLst>
               <a:ext uri="{FF2B5EF4-FFF2-40B4-BE49-F238E27FC236}">
-                <a16:creationId xmlns:a16="http://schemas.microsoft.com/office/drawing/2014/main" xmlns="" id="{CFFD1938-4192-486E-9D53-D9784518AD14}"/>
+                <a16:creationId xmlns="" xmlns:a16="http://schemas.microsoft.com/office/drawing/2014/main" id="{CFFD1938-4192-486E-9D53-D9784518AD14}"/>
               </a:ext>
             </a:extLst>
           </p:cNvPr>
@@ -3815,7 +3811,7 @@
         </p:nvSpPr>
         <p:spPr>
           <a:xfrm>
-            <a:off x="180690" y="103547"/>
+            <a:off x="111945" y="9881"/>
             <a:ext cx="4944934" cy="369332"/>
           </a:xfrm>
           <a:prstGeom prst="rect">
@@ -3841,7 +3837,7 @@
           <p:cNvPr id="2" name="Rectangle 1">
             <a:extLst>
               <a:ext uri="{FF2B5EF4-FFF2-40B4-BE49-F238E27FC236}">
-                <a16:creationId xmlns:a16="http://schemas.microsoft.com/office/drawing/2014/main" xmlns="" id="{AA0ED7A8-1532-4365-90ED-3F304B8440CE}"/>
+                <a16:creationId xmlns="" xmlns:a16="http://schemas.microsoft.com/office/drawing/2014/main" id="{AA0ED7A8-1532-4365-90ED-3F304B8440CE}"/>
               </a:ext>
             </a:extLst>
           </p:cNvPr>
@@ -3850,12 +3846,15 @@
         </p:nvSpPr>
         <p:spPr>
           <a:xfrm>
-            <a:off x="4603408" y="1334048"/>
+            <a:off x="4608883" y="896012"/>
             <a:ext cx="1690777" cy="1061049"/>
           </a:xfrm>
           <a:prstGeom prst="rect">
             <a:avLst/>
           </a:prstGeom>
+          <a:solidFill>
+            <a:schemeClr val="accent1"/>
+          </a:solidFill>
         </p:spPr>
         <p:style>
           <a:lnRef idx="2">
@@ -3897,7 +3896,7 @@
           <p:cNvPr id="4" name="Rectangle 3">
             <a:extLst>
               <a:ext uri="{FF2B5EF4-FFF2-40B4-BE49-F238E27FC236}">
-                <a16:creationId xmlns:a16="http://schemas.microsoft.com/office/drawing/2014/main" xmlns="" id="{21B869D6-66CB-4B38-975F-B7FEB6AA9B13}"/>
+                <a16:creationId xmlns="" xmlns:a16="http://schemas.microsoft.com/office/drawing/2014/main" id="{21B869D6-66CB-4B38-975F-B7FEB6AA9B13}"/>
               </a:ext>
             </a:extLst>
           </p:cNvPr>
@@ -3906,8 +3905,8 @@
         </p:nvSpPr>
         <p:spPr>
           <a:xfrm>
-            <a:off x="4026596" y="3586912"/>
-            <a:ext cx="2844400" cy="224286"/>
+            <a:off x="2584412" y="3148876"/>
+            <a:ext cx="5710893" cy="224286"/>
           </a:xfrm>
           <a:prstGeom prst="rect">
             <a:avLst/>
@@ -3949,7 +3948,7 @@
         </p:nvSpPr>
         <p:spPr>
           <a:xfrm>
-            <a:off x="4615269" y="5154561"/>
+            <a:off x="4607607" y="3883283"/>
             <a:ext cx="1678916" cy="991056"/>
           </a:xfrm>
           <a:prstGeom prst="rect">
@@ -3989,11 +3988,7 @@
             <a:pPr algn="ctr"/>
             <a:r>
               <a:rPr lang="en-US" dirty="0" err="1" smtClean="0"/>
-              <a:t>Login</a:t>
-            </a:r>
-            <a:r>
-              <a:rPr lang="en-US" dirty="0" err="1" smtClean="0"/>
-              <a:t>Controller</a:t>
+              <a:t>LoginController</a:t>
             </a:r>
             <a:endParaRPr lang="en-US" dirty="0"/>
           </a:p>
@@ -4011,8 +4006,8 @@
         </p:nvCxnSpPr>
         <p:spPr>
           <a:xfrm>
-            <a:off x="5448796" y="3811198"/>
-            <a:ext cx="5931" cy="1343363"/>
+            <a:off x="5439859" y="3373162"/>
+            <a:ext cx="7206" cy="510121"/>
           </a:xfrm>
           <a:prstGeom prst="straightConnector1">
             <a:avLst/>
@@ -4041,7 +4036,7 @@
           <p:cNvPr id="7" name="TextBox 6">
             <a:extLst>
               <a:ext uri="{FF2B5EF4-FFF2-40B4-BE49-F238E27FC236}">
-                <a16:creationId xmlns:a16="http://schemas.microsoft.com/office/drawing/2014/main" xmlns="" id="{E0BBD6C8-C8F2-40C5-AA64-85961A11ADC2}"/>
+                <a16:creationId xmlns="" xmlns:a16="http://schemas.microsoft.com/office/drawing/2014/main" id="{E0BBD6C8-C8F2-40C5-AA64-85961A11ADC2}"/>
               </a:ext>
             </a:extLst>
           </p:cNvPr>
@@ -4050,7 +4045,7 @@
         </p:nvSpPr>
         <p:spPr>
           <a:xfrm>
-            <a:off x="5391776" y="4626920"/>
+            <a:off x="5391775" y="3556205"/>
             <a:ext cx="843694" cy="276999"/>
           </a:xfrm>
           <a:prstGeom prst="rect">
@@ -4082,8 +4077,8 @@
         </p:nvCxnSpPr>
         <p:spPr>
           <a:xfrm rot="16200000" flipV="1">
-            <a:off x="4780081" y="4479914"/>
-            <a:ext cx="1343363" cy="5931"/>
+            <a:off x="5188402" y="3624620"/>
+            <a:ext cx="510121" cy="7206"/>
           </a:xfrm>
           <a:prstGeom prst="bentConnector3">
             <a:avLst/>
@@ -4118,8 +4113,8 @@
         </p:nvCxnSpPr>
         <p:spPr>
           <a:xfrm flipH="1">
-            <a:off x="5448796" y="2395097"/>
-            <a:ext cx="1" cy="1191815"/>
+            <a:off x="5439859" y="1957061"/>
+            <a:ext cx="14413" cy="1191815"/>
           </a:xfrm>
           <a:prstGeom prst="straightConnector1">
             <a:avLst/>
@@ -4154,8 +4149,8 @@
         </p:nvCxnSpPr>
         <p:spPr>
           <a:xfrm flipV="1">
-            <a:off x="5448796" y="2395097"/>
-            <a:ext cx="1" cy="1191815"/>
+            <a:off x="5439859" y="1957061"/>
+            <a:ext cx="14413" cy="1191815"/>
           </a:xfrm>
           <a:prstGeom prst="straightConnector1">
             <a:avLst/>
@@ -4184,7 +4179,7 @@
           <p:cNvPr id="16" name="Rectangle 15">
             <a:extLst>
               <a:ext uri="{FF2B5EF4-FFF2-40B4-BE49-F238E27FC236}">
-                <a16:creationId xmlns:a16="http://schemas.microsoft.com/office/drawing/2014/main" xmlns="" id="{AA0ED7A8-1532-4365-90ED-3F304B8440CE}"/>
+                <a16:creationId xmlns="" xmlns:a16="http://schemas.microsoft.com/office/drawing/2014/main" id="{AA0ED7A8-1532-4365-90ED-3F304B8440CE}"/>
               </a:ext>
             </a:extLst>
           </p:cNvPr>
@@ -4193,12 +4188,15 @@
         </p:nvSpPr>
         <p:spPr>
           <a:xfrm>
-            <a:off x="8358653" y="1318743"/>
+            <a:off x="8364128" y="880707"/>
             <a:ext cx="1690777" cy="1061049"/>
           </a:xfrm>
           <a:prstGeom prst="rect">
             <a:avLst/>
           </a:prstGeom>
+          <a:solidFill>
+            <a:schemeClr val="accent1"/>
+          </a:solidFill>
         </p:spPr>
         <p:style>
           <a:lnRef idx="2">
@@ -4241,7 +4239,7 @@
           <p:cNvPr id="17" name="Rectangle 16">
             <a:extLst>
               <a:ext uri="{FF2B5EF4-FFF2-40B4-BE49-F238E27FC236}">
-                <a16:creationId xmlns:a16="http://schemas.microsoft.com/office/drawing/2014/main" xmlns="" id="{AA0ED7A8-1532-4365-90ED-3F304B8440CE}"/>
+                <a16:creationId xmlns="" xmlns:a16="http://schemas.microsoft.com/office/drawing/2014/main" id="{AA0ED7A8-1532-4365-90ED-3F304B8440CE}"/>
               </a:ext>
             </a:extLst>
           </p:cNvPr>
@@ -4250,12 +4248,15 @@
         </p:nvSpPr>
         <p:spPr>
           <a:xfrm>
-            <a:off x="962380" y="1334048"/>
+            <a:off x="967855" y="896012"/>
             <a:ext cx="1690777" cy="1061049"/>
           </a:xfrm>
           <a:prstGeom prst="rect">
             <a:avLst/>
           </a:prstGeom>
+          <a:solidFill>
+            <a:schemeClr val="accent1"/>
+          </a:solidFill>
         </p:spPr>
         <p:style>
           <a:lnRef idx="2">
@@ -4289,7 +4290,6 @@
               <a:rPr lang="en-US" dirty="0"/>
               <a:t>Finance.html</a:t>
             </a:r>
-            <a:endParaRPr lang="en-US" dirty="0"/>
           </a:p>
         </p:txBody>
       </p:sp>
@@ -4304,7 +4304,7 @@
         </p:nvCxnSpPr>
         <p:spPr>
           <a:xfrm flipV="1">
-            <a:off x="6294185" y="1849268"/>
+            <a:off x="6299660" y="1411232"/>
             <a:ext cx="2064468" cy="15305"/>
           </a:xfrm>
           <a:prstGeom prst="straightConnector1">
@@ -4334,7 +4334,7 @@
           <p:cNvPr id="20" name="TextBox 19">
             <a:extLst>
               <a:ext uri="{FF2B5EF4-FFF2-40B4-BE49-F238E27FC236}">
-                <a16:creationId xmlns:a16="http://schemas.microsoft.com/office/drawing/2014/main" xmlns="" id="{E0BBD6C8-C8F2-40C5-AA64-85961A11ADC2}"/>
+                <a16:creationId xmlns="" xmlns:a16="http://schemas.microsoft.com/office/drawing/2014/main" id="{E0BBD6C8-C8F2-40C5-AA64-85961A11ADC2}"/>
               </a:ext>
             </a:extLst>
           </p:cNvPr>
@@ -4343,8 +4343,8 @@
         </p:nvSpPr>
         <p:spPr>
           <a:xfrm>
-            <a:off x="4912926" y="2575506"/>
-            <a:ext cx="843694" cy="276999"/>
+            <a:off x="4918401" y="2137470"/>
+            <a:ext cx="542221" cy="276999"/>
           </a:xfrm>
           <a:prstGeom prst="rect">
             <a:avLst/>
@@ -4370,7 +4370,7 @@
           <p:cNvPr id="21" name="TextBox 20">
             <a:extLst>
               <a:ext uri="{FF2B5EF4-FFF2-40B4-BE49-F238E27FC236}">
-                <a16:creationId xmlns:a16="http://schemas.microsoft.com/office/drawing/2014/main" xmlns="" id="{E0BBD6C8-C8F2-40C5-AA64-85961A11ADC2}"/>
+                <a16:creationId xmlns="" xmlns:a16="http://schemas.microsoft.com/office/drawing/2014/main" id="{E0BBD6C8-C8F2-40C5-AA64-85961A11ADC2}"/>
               </a:ext>
             </a:extLst>
           </p:cNvPr>
@@ -4379,7 +4379,7 @@
         </p:nvSpPr>
         <p:spPr>
           <a:xfrm>
-            <a:off x="6433247" y="1572268"/>
+            <a:off x="6438722" y="1134232"/>
             <a:ext cx="953133" cy="276999"/>
           </a:xfrm>
           <a:prstGeom prst="rect">
@@ -4412,7 +4412,7 @@
         </p:nvCxnSpPr>
         <p:spPr>
           <a:xfrm rot="16200000" flipH="1" flipV="1">
-            <a:off x="7318767" y="-551228"/>
+            <a:off x="7324242" y="-989264"/>
             <a:ext cx="15305" cy="3755245"/>
           </a:xfrm>
           <a:prstGeom prst="bentConnector3">
@@ -4444,7 +4444,7 @@
           <p:cNvPr id="24" name="TextBox 23">
             <a:extLst>
               <a:ext uri="{FF2B5EF4-FFF2-40B4-BE49-F238E27FC236}">
-                <a16:creationId xmlns:a16="http://schemas.microsoft.com/office/drawing/2014/main" xmlns="" id="{E0BBD6C8-C8F2-40C5-AA64-85961A11ADC2}"/>
+                <a16:creationId xmlns="" xmlns:a16="http://schemas.microsoft.com/office/drawing/2014/main" id="{E0BBD6C8-C8F2-40C5-AA64-85961A11ADC2}"/>
               </a:ext>
             </a:extLst>
           </p:cNvPr>
@@ -4453,7 +4453,7 @@
         </p:nvSpPr>
         <p:spPr>
           <a:xfrm>
-            <a:off x="7249861" y="849687"/>
+            <a:off x="7255336" y="411651"/>
             <a:ext cx="843694" cy="461665"/>
           </a:xfrm>
           <a:prstGeom prst="rect">
@@ -4486,7 +4486,7 @@
         </p:nvCxnSpPr>
         <p:spPr>
           <a:xfrm flipH="1">
-            <a:off x="2653157" y="1864573"/>
+            <a:off x="2658632" y="1426537"/>
             <a:ext cx="1950251" cy="0"/>
           </a:xfrm>
           <a:prstGeom prst="straightConnector1">
@@ -4522,7 +4522,7 @@
         </p:nvCxnSpPr>
         <p:spPr>
           <a:xfrm rot="5400000" flipH="1" flipV="1">
-            <a:off x="3628283" y="-486466"/>
+            <a:off x="3633758" y="-924502"/>
             <a:ext cx="12700" cy="3641028"/>
           </a:xfrm>
           <a:prstGeom prst="bentConnector3">
@@ -4554,7 +4554,7 @@
           <p:cNvPr id="29" name="TextBox 28">
             <a:extLst>
               <a:ext uri="{FF2B5EF4-FFF2-40B4-BE49-F238E27FC236}">
-                <a16:creationId xmlns:a16="http://schemas.microsoft.com/office/drawing/2014/main" xmlns="" id="{E0BBD6C8-C8F2-40C5-AA64-85961A11ADC2}"/>
+                <a16:creationId xmlns="" xmlns:a16="http://schemas.microsoft.com/office/drawing/2014/main" id="{E0BBD6C8-C8F2-40C5-AA64-85961A11ADC2}"/>
               </a:ext>
             </a:extLst>
           </p:cNvPr>
@@ -4563,7 +4563,7 @@
         </p:nvSpPr>
         <p:spPr>
           <a:xfrm>
-            <a:off x="3083049" y="878733"/>
+            <a:off x="3088524" y="440697"/>
             <a:ext cx="843694" cy="461665"/>
           </a:xfrm>
           <a:prstGeom prst="rect">
@@ -4590,7 +4590,7 @@
           <p:cNvPr id="30" name="TextBox 29">
             <a:extLst>
               <a:ext uri="{FF2B5EF4-FFF2-40B4-BE49-F238E27FC236}">
-                <a16:creationId xmlns:a16="http://schemas.microsoft.com/office/drawing/2014/main" xmlns="" id="{E0BBD6C8-C8F2-40C5-AA64-85961A11ADC2}"/>
+                <a16:creationId xmlns="" xmlns:a16="http://schemas.microsoft.com/office/drawing/2014/main" id="{E0BBD6C8-C8F2-40C5-AA64-85961A11ADC2}"/>
               </a:ext>
             </a:extLst>
           </p:cNvPr>
@@ -4599,7 +4599,7 @@
         </p:nvSpPr>
         <p:spPr>
           <a:xfrm>
-            <a:off x="2929740" y="1636915"/>
+            <a:off x="2935215" y="1198879"/>
             <a:ext cx="953133" cy="461665"/>
           </a:xfrm>
           <a:prstGeom prst="rect">
@@ -4632,8 +4632,8 @@
         </p:nvCxnSpPr>
         <p:spPr>
           <a:xfrm flipH="1">
-            <a:off x="5448796" y="1849268"/>
-            <a:ext cx="2909857" cy="1737644"/>
+            <a:off x="5439859" y="1411232"/>
+            <a:ext cx="2924269" cy="1737644"/>
           </a:xfrm>
           <a:prstGeom prst="straightConnector1">
             <a:avLst/>
@@ -4668,8 +4668,840 @@
         </p:nvCxnSpPr>
         <p:spPr>
           <a:xfrm flipV="1">
-            <a:off x="5448796" y="1849268"/>
-            <a:ext cx="2909857" cy="1737644"/>
+            <a:off x="5439859" y="1411232"/>
+            <a:ext cx="2924269" cy="1737644"/>
+          </a:xfrm>
+          <a:prstGeom prst="straightConnector1">
+            <a:avLst/>
+          </a:prstGeom>
+          <a:ln>
+            <a:tailEnd type="triangle"/>
+          </a:ln>
+        </p:spPr>
+        <p:style>
+          <a:lnRef idx="1">
+            <a:schemeClr val="accent1"/>
+          </a:lnRef>
+          <a:fillRef idx="0">
+            <a:schemeClr val="accent1"/>
+          </a:fillRef>
+          <a:effectRef idx="0">
+            <a:schemeClr val="accent1"/>
+          </a:effectRef>
+          <a:fontRef idx="minor">
+            <a:schemeClr val="tx1"/>
+          </a:fontRef>
+        </p:style>
+      </p:cxnSp>
+      <p:cxnSp>
+        <p:nvCxnSpPr>
+          <p:cNvPr id="8" name="Straight Arrow Connector 7"/>
+          <p:cNvCxnSpPr>
+            <a:stCxn id="17" idx="2"/>
+            <a:endCxn id="4" idx="0"/>
+          </p:cNvCxnSpPr>
+          <p:nvPr/>
+        </p:nvCxnSpPr>
+        <p:spPr>
+          <a:xfrm>
+            <a:off x="1813244" y="1957061"/>
+            <a:ext cx="3626615" cy="1191815"/>
+          </a:xfrm>
+          <a:prstGeom prst="straightConnector1">
+            <a:avLst/>
+          </a:prstGeom>
+          <a:ln>
+            <a:tailEnd type="triangle"/>
+          </a:ln>
+        </p:spPr>
+        <p:style>
+          <a:lnRef idx="1">
+            <a:schemeClr val="accent1"/>
+          </a:lnRef>
+          <a:fillRef idx="0">
+            <a:schemeClr val="accent1"/>
+          </a:fillRef>
+          <a:effectRef idx="0">
+            <a:schemeClr val="accent1"/>
+          </a:effectRef>
+          <a:fontRef idx="minor">
+            <a:schemeClr val="tx1"/>
+          </a:fontRef>
+        </p:style>
+      </p:cxnSp>
+      <p:sp>
+        <p:nvSpPr>
+          <p:cNvPr id="26" name="TextBox 25">
+            <a:extLst>
+              <a:ext uri="{FF2B5EF4-FFF2-40B4-BE49-F238E27FC236}">
+                <a16:creationId xmlns="" xmlns:a16="http://schemas.microsoft.com/office/drawing/2014/main" id="{E0BBD6C8-C8F2-40C5-AA64-85961A11ADC2}"/>
+              </a:ext>
+            </a:extLst>
+          </p:cNvPr>
+          <p:cNvSpPr txBox="1"/>
+          <p:nvPr/>
+        </p:nvSpPr>
+        <p:spPr>
+          <a:xfrm>
+            <a:off x="2919800" y="1972367"/>
+            <a:ext cx="843694" cy="461665"/>
+          </a:xfrm>
+          <a:prstGeom prst="rect">
+            <a:avLst/>
+          </a:prstGeom>
+          <a:noFill/>
+        </p:spPr>
+        <p:txBody>
+          <a:bodyPr wrap="square" rtlCol="0">
+            <a:spAutoFit/>
+          </a:bodyPr>
+          <a:lstStyle/>
+          <a:p>
+            <a:r>
+              <a:rPr lang="en-US" sz="1200" dirty="0" smtClean="0"/>
+              <a:t>verify session</a:t>
+            </a:r>
+            <a:endParaRPr lang="en-US" sz="1200" dirty="0"/>
+          </a:p>
+        </p:txBody>
+      </p:sp>
+      <p:sp>
+        <p:nvSpPr>
+          <p:cNvPr id="28" name="TextBox 27">
+            <a:extLst>
+              <a:ext uri="{FF2B5EF4-FFF2-40B4-BE49-F238E27FC236}">
+                <a16:creationId xmlns="" xmlns:a16="http://schemas.microsoft.com/office/drawing/2014/main" id="{E0BBD6C8-C8F2-40C5-AA64-85961A11ADC2}"/>
+              </a:ext>
+            </a:extLst>
+          </p:cNvPr>
+          <p:cNvSpPr txBox="1"/>
+          <p:nvPr/>
+        </p:nvSpPr>
+        <p:spPr>
+          <a:xfrm>
+            <a:off x="6607483" y="1781722"/>
+            <a:ext cx="843694" cy="461665"/>
+          </a:xfrm>
+          <a:prstGeom prst="rect">
+            <a:avLst/>
+          </a:prstGeom>
+          <a:noFill/>
+        </p:spPr>
+        <p:txBody>
+          <a:bodyPr wrap="square" rtlCol="0">
+            <a:spAutoFit/>
+          </a:bodyPr>
+          <a:lstStyle/>
+          <a:p>
+            <a:r>
+              <a:rPr lang="en-US" sz="1200" dirty="0" smtClean="0"/>
+              <a:t>verify session</a:t>
+            </a:r>
+            <a:endParaRPr lang="en-US" sz="1200" dirty="0"/>
+          </a:p>
+        </p:txBody>
+      </p:sp>
+      <p:sp>
+        <p:nvSpPr>
+          <p:cNvPr id="32" name="Rectangle 31"/>
+          <p:cNvSpPr/>
+          <p:nvPr/>
+        </p:nvSpPr>
+        <p:spPr>
+          <a:xfrm>
+            <a:off x="1732865" y="3980661"/>
+            <a:ext cx="1678916" cy="991056"/>
+          </a:xfrm>
+          <a:prstGeom prst="rect">
+            <a:avLst/>
+          </a:prstGeom>
+          <a:solidFill>
+            <a:schemeClr val="accent6"/>
+          </a:solidFill>
+        </p:spPr>
+        <p:style>
+          <a:lnRef idx="2">
+            <a:schemeClr val="accent1">
+              <a:shade val="50000"/>
+            </a:schemeClr>
+          </a:lnRef>
+          <a:fillRef idx="1">
+            <a:schemeClr val="accent1"/>
+          </a:fillRef>
+          <a:effectRef idx="0">
+            <a:schemeClr val="accent1"/>
+          </a:effectRef>
+          <a:fontRef idx="minor">
+            <a:schemeClr val="lt1"/>
+          </a:fontRef>
+        </p:style>
+        <p:txBody>
+          <a:bodyPr rtlCol="0" anchor="ctr"/>
+          <a:lstStyle/>
+          <a:p>
+            <a:pPr algn="ctr"/>
+            <a:r>
+              <a:rPr lang="en-US" sz="1000" dirty="0"/>
+              <a:t>com.tlw8253.controller</a:t>
+            </a:r>
+          </a:p>
+          <a:p>
+            <a:pPr algn="ctr"/>
+            <a:r>
+              <a:rPr lang="en-US" dirty="0" err="1" smtClean="0"/>
+              <a:t>Reimbursement</a:t>
+            </a:r>
+            <a:r>
+              <a:rPr lang="en-US" dirty="0" err="1" smtClean="0"/>
+              <a:t>Controller</a:t>
+            </a:r>
+            <a:endParaRPr lang="en-US" dirty="0"/>
+          </a:p>
+        </p:txBody>
+      </p:sp>
+      <p:sp>
+        <p:nvSpPr>
+          <p:cNvPr id="34" name="Rectangle 33"/>
+          <p:cNvSpPr/>
+          <p:nvPr/>
+        </p:nvSpPr>
+        <p:spPr>
+          <a:xfrm>
+            <a:off x="4621164" y="5351487"/>
+            <a:ext cx="1678916" cy="991056"/>
+          </a:xfrm>
+          <a:prstGeom prst="rect">
+            <a:avLst/>
+          </a:prstGeom>
+          <a:solidFill>
+            <a:schemeClr val="accent6"/>
+          </a:solidFill>
+        </p:spPr>
+        <p:style>
+          <a:lnRef idx="2">
+            <a:schemeClr val="accent1">
+              <a:shade val="50000"/>
+            </a:schemeClr>
+          </a:lnRef>
+          <a:fillRef idx="1">
+            <a:schemeClr val="accent1"/>
+          </a:fillRef>
+          <a:effectRef idx="0">
+            <a:schemeClr val="accent1"/>
+          </a:effectRef>
+          <a:fontRef idx="minor">
+            <a:schemeClr val="lt1"/>
+          </a:fontRef>
+        </p:style>
+        <p:txBody>
+          <a:bodyPr rtlCol="0" anchor="ctr"/>
+          <a:lstStyle/>
+          <a:p>
+            <a:pPr algn="ctr"/>
+            <a:r>
+              <a:rPr lang="en-US" sz="1000" dirty="0" smtClean="0"/>
+              <a:t>com.tlw8253.service</a:t>
+            </a:r>
+            <a:endParaRPr lang="en-US" sz="1000" dirty="0"/>
+          </a:p>
+          <a:p>
+            <a:pPr algn="ctr"/>
+            <a:r>
+              <a:rPr lang="en-US" dirty="0" err="1" smtClean="0"/>
+              <a:t>UserService</a:t>
+            </a:r>
+            <a:endParaRPr lang="en-US" dirty="0"/>
+          </a:p>
+        </p:txBody>
+      </p:sp>
+      <p:cxnSp>
+        <p:nvCxnSpPr>
+          <p:cNvPr id="48" name="Straight Arrow Connector 47"/>
+          <p:cNvCxnSpPr>
+            <a:stCxn id="17" idx="2"/>
+            <a:endCxn id="4" idx="1"/>
+          </p:cNvCxnSpPr>
+          <p:nvPr/>
+        </p:nvCxnSpPr>
+        <p:spPr>
+          <a:xfrm>
+            <a:off x="1813244" y="1957061"/>
+            <a:ext cx="771168" cy="1303958"/>
+          </a:xfrm>
+          <a:prstGeom prst="straightConnector1">
+            <a:avLst/>
+          </a:prstGeom>
+          <a:ln>
+            <a:tailEnd type="triangle"/>
+          </a:ln>
+        </p:spPr>
+        <p:style>
+          <a:lnRef idx="1">
+            <a:schemeClr val="accent1"/>
+          </a:lnRef>
+          <a:fillRef idx="0">
+            <a:schemeClr val="accent1"/>
+          </a:fillRef>
+          <a:effectRef idx="0">
+            <a:schemeClr val="accent1"/>
+          </a:effectRef>
+          <a:fontRef idx="minor">
+            <a:schemeClr val="tx1"/>
+          </a:fontRef>
+        </p:style>
+      </p:cxnSp>
+      <p:cxnSp>
+        <p:nvCxnSpPr>
+          <p:cNvPr id="51" name="Straight Arrow Connector 50"/>
+          <p:cNvCxnSpPr>
+            <a:stCxn id="16" idx="2"/>
+            <a:endCxn id="4" idx="3"/>
+          </p:cNvCxnSpPr>
+          <p:nvPr/>
+        </p:nvCxnSpPr>
+        <p:spPr>
+          <a:xfrm flipH="1">
+            <a:off x="8295305" y="1941756"/>
+            <a:ext cx="914212" cy="1319263"/>
+          </a:xfrm>
+          <a:prstGeom prst="straightConnector1">
+            <a:avLst/>
+          </a:prstGeom>
+          <a:ln>
+            <a:tailEnd type="triangle"/>
+          </a:ln>
+        </p:spPr>
+        <p:style>
+          <a:lnRef idx="1">
+            <a:schemeClr val="accent1"/>
+          </a:lnRef>
+          <a:fillRef idx="0">
+            <a:schemeClr val="accent1"/>
+          </a:fillRef>
+          <a:effectRef idx="0">
+            <a:schemeClr val="accent1"/>
+          </a:effectRef>
+          <a:fontRef idx="minor">
+            <a:schemeClr val="tx1"/>
+          </a:fontRef>
+        </p:style>
+      </p:cxnSp>
+      <p:cxnSp>
+        <p:nvCxnSpPr>
+          <p:cNvPr id="54" name="Straight Arrow Connector 53"/>
+          <p:cNvCxnSpPr>
+            <a:stCxn id="5" idx="2"/>
+            <a:endCxn id="34" idx="0"/>
+          </p:cNvCxnSpPr>
+          <p:nvPr/>
+        </p:nvCxnSpPr>
+        <p:spPr>
+          <a:xfrm>
+            <a:off x="5447065" y="4874339"/>
+            <a:ext cx="13557" cy="477148"/>
+          </a:xfrm>
+          <a:prstGeom prst="straightConnector1">
+            <a:avLst/>
+          </a:prstGeom>
+          <a:ln>
+            <a:tailEnd type="triangle"/>
+          </a:ln>
+        </p:spPr>
+        <p:style>
+          <a:lnRef idx="1">
+            <a:schemeClr val="accent1"/>
+          </a:lnRef>
+          <a:fillRef idx="0">
+            <a:schemeClr val="accent1"/>
+          </a:fillRef>
+          <a:effectRef idx="0">
+            <a:schemeClr val="accent1"/>
+          </a:effectRef>
+          <a:fontRef idx="minor">
+            <a:schemeClr val="tx1"/>
+          </a:fontRef>
+        </p:style>
+      </p:cxnSp>
+      <p:sp>
+        <p:nvSpPr>
+          <p:cNvPr id="55" name="TextBox 54">
+            <a:extLst>
+              <a:ext uri="{FF2B5EF4-FFF2-40B4-BE49-F238E27FC236}">
+                <a16:creationId xmlns="" xmlns:a16="http://schemas.microsoft.com/office/drawing/2014/main" id="{E0BBD6C8-C8F2-40C5-AA64-85961A11ADC2}"/>
+              </a:ext>
+            </a:extLst>
+          </p:cNvPr>
+          <p:cNvSpPr txBox="1"/>
+          <p:nvPr/>
+        </p:nvSpPr>
+        <p:spPr>
+          <a:xfrm>
+            <a:off x="5453843" y="4974413"/>
+            <a:ext cx="542221" cy="276999"/>
+          </a:xfrm>
+          <a:prstGeom prst="rect">
+            <a:avLst/>
+          </a:prstGeom>
+          <a:noFill/>
+        </p:spPr>
+        <p:txBody>
+          <a:bodyPr wrap="square" rtlCol="0">
+            <a:spAutoFit/>
+          </a:bodyPr>
+          <a:lstStyle/>
+          <a:p>
+            <a:r>
+              <a:rPr lang="en-US" sz="1200" dirty="0" smtClean="0"/>
+              <a:t>uses</a:t>
+            </a:r>
+            <a:endParaRPr lang="en-US" sz="1200" dirty="0"/>
+          </a:p>
+        </p:txBody>
+      </p:sp>
+      <p:sp>
+        <p:nvSpPr>
+          <p:cNvPr id="66" name="TextBox 65">
+            <a:extLst>
+              <a:ext uri="{FF2B5EF4-FFF2-40B4-BE49-F238E27FC236}">
+                <a16:creationId xmlns="" xmlns:a16="http://schemas.microsoft.com/office/drawing/2014/main" id="{E0BBD6C8-C8F2-40C5-AA64-85961A11ADC2}"/>
+              </a:ext>
+            </a:extLst>
+          </p:cNvPr>
+          <p:cNvSpPr txBox="1"/>
+          <p:nvPr/>
+        </p:nvSpPr>
+        <p:spPr>
+          <a:xfrm>
+            <a:off x="1028117" y="2538203"/>
+            <a:ext cx="1166958" cy="276999"/>
+          </a:xfrm>
+          <a:prstGeom prst="rect">
+            <a:avLst/>
+          </a:prstGeom>
+          <a:noFill/>
+        </p:spPr>
+        <p:txBody>
+          <a:bodyPr wrap="square" rtlCol="0">
+            <a:spAutoFit/>
+          </a:bodyPr>
+          <a:lstStyle/>
+          <a:p>
+            <a:r>
+              <a:rPr lang="en-US" sz="1200" dirty="0" smtClean="0"/>
+              <a:t>reimbursement</a:t>
+            </a:r>
+            <a:endParaRPr lang="en-US" sz="1200" dirty="0"/>
+          </a:p>
+        </p:txBody>
+      </p:sp>
+      <p:sp>
+        <p:nvSpPr>
+          <p:cNvPr id="67" name="TextBox 66">
+            <a:extLst>
+              <a:ext uri="{FF2B5EF4-FFF2-40B4-BE49-F238E27FC236}">
+                <a16:creationId xmlns="" xmlns:a16="http://schemas.microsoft.com/office/drawing/2014/main" id="{E0BBD6C8-C8F2-40C5-AA64-85961A11ADC2}"/>
+              </a:ext>
+            </a:extLst>
+          </p:cNvPr>
+          <p:cNvSpPr txBox="1"/>
+          <p:nvPr/>
+        </p:nvSpPr>
+        <p:spPr>
+          <a:xfrm>
+            <a:off x="8752411" y="2472280"/>
+            <a:ext cx="1166958" cy="276999"/>
+          </a:xfrm>
+          <a:prstGeom prst="rect">
+            <a:avLst/>
+          </a:prstGeom>
+          <a:noFill/>
+        </p:spPr>
+        <p:txBody>
+          <a:bodyPr wrap="square" rtlCol="0">
+            <a:spAutoFit/>
+          </a:bodyPr>
+          <a:lstStyle/>
+          <a:p>
+            <a:r>
+              <a:rPr lang="en-US" sz="1200" dirty="0" smtClean="0"/>
+              <a:t>reimbursement</a:t>
+            </a:r>
+            <a:endParaRPr lang="en-US" sz="1200" dirty="0"/>
+          </a:p>
+        </p:txBody>
+      </p:sp>
+      <p:cxnSp>
+        <p:nvCxnSpPr>
+          <p:cNvPr id="69" name="Straight Arrow Connector 68"/>
+          <p:cNvCxnSpPr>
+            <a:stCxn id="4" idx="2"/>
+            <a:endCxn id="32" idx="0"/>
+          </p:cNvCxnSpPr>
+          <p:nvPr/>
+        </p:nvCxnSpPr>
+        <p:spPr>
+          <a:xfrm flipH="1">
+            <a:off x="2572323" y="3373162"/>
+            <a:ext cx="2867536" cy="607499"/>
+          </a:xfrm>
+          <a:prstGeom prst="straightConnector1">
+            <a:avLst/>
+          </a:prstGeom>
+          <a:ln>
+            <a:tailEnd type="triangle"/>
+          </a:ln>
+        </p:spPr>
+        <p:style>
+          <a:lnRef idx="1">
+            <a:schemeClr val="accent1"/>
+          </a:lnRef>
+          <a:fillRef idx="0">
+            <a:schemeClr val="accent1"/>
+          </a:fillRef>
+          <a:effectRef idx="0">
+            <a:schemeClr val="accent1"/>
+          </a:effectRef>
+          <a:fontRef idx="minor">
+            <a:schemeClr val="tx1"/>
+          </a:fontRef>
+        </p:style>
+      </p:cxnSp>
+      <p:sp>
+        <p:nvSpPr>
+          <p:cNvPr id="70" name="TextBox 69">
+            <a:extLst>
+              <a:ext uri="{FF2B5EF4-FFF2-40B4-BE49-F238E27FC236}">
+                <a16:creationId xmlns="" xmlns:a16="http://schemas.microsoft.com/office/drawing/2014/main" id="{E0BBD6C8-C8F2-40C5-AA64-85961A11ADC2}"/>
+              </a:ext>
+            </a:extLst>
+          </p:cNvPr>
+          <p:cNvSpPr txBox="1"/>
+          <p:nvPr/>
+        </p:nvSpPr>
+        <p:spPr>
+          <a:xfrm>
+            <a:off x="2658632" y="3580694"/>
+            <a:ext cx="843694" cy="276999"/>
+          </a:xfrm>
+          <a:prstGeom prst="rect">
+            <a:avLst/>
+          </a:prstGeom>
+          <a:noFill/>
+        </p:spPr>
+        <p:txBody>
+          <a:bodyPr wrap="square" rtlCol="0">
+            <a:spAutoFit/>
+          </a:bodyPr>
+          <a:lstStyle/>
+          <a:p>
+            <a:r>
+              <a:rPr lang="en-US" sz="1200" dirty="0"/>
+              <a:t>processes</a:t>
+            </a:r>
+          </a:p>
+        </p:txBody>
+      </p:sp>
+      <p:cxnSp>
+        <p:nvCxnSpPr>
+          <p:cNvPr id="72" name="Straight Arrow Connector 71"/>
+          <p:cNvCxnSpPr>
+            <a:stCxn id="32" idx="2"/>
+            <a:endCxn id="34" idx="1"/>
+          </p:cNvCxnSpPr>
+          <p:nvPr/>
+        </p:nvCxnSpPr>
+        <p:spPr>
+          <a:xfrm>
+            <a:off x="2572323" y="4971717"/>
+            <a:ext cx="2048841" cy="875298"/>
+          </a:xfrm>
+          <a:prstGeom prst="straightConnector1">
+            <a:avLst/>
+          </a:prstGeom>
+          <a:ln>
+            <a:tailEnd type="triangle"/>
+          </a:ln>
+        </p:spPr>
+        <p:style>
+          <a:lnRef idx="1">
+            <a:schemeClr val="accent1"/>
+          </a:lnRef>
+          <a:fillRef idx="0">
+            <a:schemeClr val="accent1"/>
+          </a:fillRef>
+          <a:effectRef idx="0">
+            <a:schemeClr val="accent1"/>
+          </a:effectRef>
+          <a:fontRef idx="minor">
+            <a:schemeClr val="tx1"/>
+          </a:fontRef>
+        </p:style>
+      </p:cxnSp>
+      <p:sp>
+        <p:nvSpPr>
+          <p:cNvPr id="73" name="TextBox 72">
+            <a:extLst>
+              <a:ext uri="{FF2B5EF4-FFF2-40B4-BE49-F238E27FC236}">
+                <a16:creationId xmlns="" xmlns:a16="http://schemas.microsoft.com/office/drawing/2014/main" id="{E0BBD6C8-C8F2-40C5-AA64-85961A11ADC2}"/>
+              </a:ext>
+            </a:extLst>
+          </p:cNvPr>
+          <p:cNvSpPr txBox="1"/>
+          <p:nvPr/>
+        </p:nvSpPr>
+        <p:spPr>
+          <a:xfrm>
+            <a:off x="3091536" y="5440716"/>
+            <a:ext cx="542221" cy="276999"/>
+          </a:xfrm>
+          <a:prstGeom prst="rect">
+            <a:avLst/>
+          </a:prstGeom>
+          <a:noFill/>
+        </p:spPr>
+        <p:txBody>
+          <a:bodyPr wrap="square" rtlCol="0">
+            <a:spAutoFit/>
+          </a:bodyPr>
+          <a:lstStyle/>
+          <a:p>
+            <a:r>
+              <a:rPr lang="en-US" sz="1200" dirty="0" smtClean="0"/>
+              <a:t>uses</a:t>
+            </a:r>
+            <a:endParaRPr lang="en-US" sz="1200" dirty="0"/>
+          </a:p>
+        </p:txBody>
+      </p:sp>
+      <p:cxnSp>
+        <p:nvCxnSpPr>
+          <p:cNvPr id="75" name="Straight Arrow Connector 74"/>
+          <p:cNvCxnSpPr>
+            <a:stCxn id="4" idx="3"/>
+            <a:endCxn id="16" idx="2"/>
+          </p:cNvCxnSpPr>
+          <p:nvPr/>
+        </p:nvCxnSpPr>
+        <p:spPr>
+          <a:xfrm flipV="1">
+            <a:off x="8295305" y="1941756"/>
+            <a:ext cx="914212" cy="1319263"/>
+          </a:xfrm>
+          <a:prstGeom prst="straightConnector1">
+            <a:avLst/>
+          </a:prstGeom>
+          <a:ln>
+            <a:tailEnd type="triangle"/>
+          </a:ln>
+        </p:spPr>
+        <p:style>
+          <a:lnRef idx="1">
+            <a:schemeClr val="accent1"/>
+          </a:lnRef>
+          <a:fillRef idx="0">
+            <a:schemeClr val="accent1"/>
+          </a:fillRef>
+          <a:effectRef idx="0">
+            <a:schemeClr val="accent1"/>
+          </a:effectRef>
+          <a:fontRef idx="minor">
+            <a:schemeClr val="tx1"/>
+          </a:fontRef>
+        </p:style>
+      </p:cxnSp>
+      <p:cxnSp>
+        <p:nvCxnSpPr>
+          <p:cNvPr id="77" name="Straight Arrow Connector 76"/>
+          <p:cNvCxnSpPr>
+            <a:stCxn id="4" idx="1"/>
+            <a:endCxn id="17" idx="2"/>
+          </p:cNvCxnSpPr>
+          <p:nvPr/>
+        </p:nvCxnSpPr>
+        <p:spPr>
+          <a:xfrm flipH="1" flipV="1">
+            <a:off x="1813244" y="1957061"/>
+            <a:ext cx="771168" cy="1303958"/>
+          </a:xfrm>
+          <a:prstGeom prst="straightConnector1">
+            <a:avLst/>
+          </a:prstGeom>
+          <a:ln>
+            <a:tailEnd type="triangle"/>
+          </a:ln>
+        </p:spPr>
+        <p:style>
+          <a:lnRef idx="1">
+            <a:schemeClr val="accent1"/>
+          </a:lnRef>
+          <a:fillRef idx="0">
+            <a:schemeClr val="accent1"/>
+          </a:fillRef>
+          <a:effectRef idx="0">
+            <a:schemeClr val="accent1"/>
+          </a:effectRef>
+          <a:fontRef idx="minor">
+            <a:schemeClr val="tx1"/>
+          </a:fontRef>
+        </p:style>
+      </p:cxnSp>
+      <p:cxnSp>
+        <p:nvCxnSpPr>
+          <p:cNvPr id="79" name="Straight Arrow Connector 78"/>
+          <p:cNvCxnSpPr>
+            <a:stCxn id="34" idx="0"/>
+            <a:endCxn id="5" idx="2"/>
+          </p:cNvCxnSpPr>
+          <p:nvPr/>
+        </p:nvCxnSpPr>
+        <p:spPr>
+          <a:xfrm flipH="1" flipV="1">
+            <a:off x="5447065" y="4874339"/>
+            <a:ext cx="13557" cy="477148"/>
+          </a:xfrm>
+          <a:prstGeom prst="straightConnector1">
+            <a:avLst/>
+          </a:prstGeom>
+          <a:ln>
+            <a:tailEnd type="triangle"/>
+          </a:ln>
+        </p:spPr>
+        <p:style>
+          <a:lnRef idx="1">
+            <a:schemeClr val="accent1"/>
+          </a:lnRef>
+          <a:fillRef idx="0">
+            <a:schemeClr val="accent1"/>
+          </a:fillRef>
+          <a:effectRef idx="0">
+            <a:schemeClr val="accent1"/>
+          </a:effectRef>
+          <a:fontRef idx="minor">
+            <a:schemeClr val="tx1"/>
+          </a:fontRef>
+        </p:style>
+      </p:cxnSp>
+      <p:cxnSp>
+        <p:nvCxnSpPr>
+          <p:cNvPr id="81" name="Straight Arrow Connector 80"/>
+          <p:cNvCxnSpPr>
+            <a:stCxn id="34" idx="1"/>
+            <a:endCxn id="32" idx="2"/>
+          </p:cNvCxnSpPr>
+          <p:nvPr/>
+        </p:nvCxnSpPr>
+        <p:spPr>
+          <a:xfrm flipH="1" flipV="1">
+            <a:off x="2572323" y="4971717"/>
+            <a:ext cx="2048841" cy="875298"/>
+          </a:xfrm>
+          <a:prstGeom prst="straightConnector1">
+            <a:avLst/>
+          </a:prstGeom>
+          <a:ln>
+            <a:tailEnd type="triangle"/>
+          </a:ln>
+        </p:spPr>
+        <p:style>
+          <a:lnRef idx="1">
+            <a:schemeClr val="accent1"/>
+          </a:lnRef>
+          <a:fillRef idx="0">
+            <a:schemeClr val="accent1"/>
+          </a:fillRef>
+          <a:effectRef idx="0">
+            <a:schemeClr val="accent1"/>
+          </a:effectRef>
+          <a:fontRef idx="minor">
+            <a:schemeClr val="tx1"/>
+          </a:fontRef>
+        </p:style>
+      </p:cxnSp>
+      <p:cxnSp>
+        <p:nvCxnSpPr>
+          <p:cNvPr id="83" name="Straight Arrow Connector 82"/>
+          <p:cNvCxnSpPr>
+            <a:stCxn id="32" idx="0"/>
+            <a:endCxn id="4" idx="2"/>
+          </p:cNvCxnSpPr>
+          <p:nvPr/>
+        </p:nvCxnSpPr>
+        <p:spPr>
+          <a:xfrm flipV="1">
+            <a:off x="2572323" y="3373162"/>
+            <a:ext cx="2867536" cy="607499"/>
+          </a:xfrm>
+          <a:prstGeom prst="straightConnector1">
+            <a:avLst/>
+          </a:prstGeom>
+          <a:ln>
+            <a:tailEnd type="triangle"/>
+          </a:ln>
+        </p:spPr>
+        <p:style>
+          <a:lnRef idx="1">
+            <a:schemeClr val="accent1"/>
+          </a:lnRef>
+          <a:fillRef idx="0">
+            <a:schemeClr val="accent1"/>
+          </a:fillRef>
+          <a:effectRef idx="0">
+            <a:schemeClr val="accent1"/>
+          </a:effectRef>
+          <a:fontRef idx="minor">
+            <a:schemeClr val="tx1"/>
+          </a:fontRef>
+        </p:style>
+      </p:cxnSp>
+      <p:cxnSp>
+        <p:nvCxnSpPr>
+          <p:cNvPr id="85" name="Straight Arrow Connector 84"/>
+          <p:cNvCxnSpPr>
+            <a:stCxn id="4" idx="0"/>
+            <a:endCxn id="17" idx="2"/>
+          </p:cNvCxnSpPr>
+          <p:nvPr/>
+        </p:nvCxnSpPr>
+        <p:spPr>
+          <a:xfrm flipH="1" flipV="1">
+            <a:off x="1813244" y="1957061"/>
+            <a:ext cx="3626615" cy="1191815"/>
+          </a:xfrm>
+          <a:prstGeom prst="straightConnector1">
+            <a:avLst/>
+          </a:prstGeom>
+          <a:ln>
+            <a:tailEnd type="triangle"/>
+          </a:ln>
+        </p:spPr>
+        <p:style>
+          <a:lnRef idx="1">
+            <a:schemeClr val="accent1"/>
+          </a:lnRef>
+          <a:fillRef idx="0">
+            <a:schemeClr val="accent1"/>
+          </a:fillRef>
+          <a:effectRef idx="0">
+            <a:schemeClr val="accent1"/>
+          </a:effectRef>
+          <a:fontRef idx="minor">
+            <a:schemeClr val="tx1"/>
+          </a:fontRef>
+        </p:style>
+      </p:cxnSp>
+      <p:cxnSp>
+        <p:nvCxnSpPr>
+          <p:cNvPr id="87" name="Straight Arrow Connector 86"/>
+          <p:cNvCxnSpPr>
+            <a:stCxn id="4" idx="0"/>
+            <a:endCxn id="16" idx="1"/>
+          </p:cNvCxnSpPr>
+          <p:nvPr/>
+        </p:nvCxnSpPr>
+        <p:spPr>
+          <a:xfrm flipV="1">
+            <a:off x="5439859" y="1411232"/>
+            <a:ext cx="2924269" cy="1737644"/>
           </a:xfrm>
           <a:prstGeom prst="straightConnector1">
             <a:avLst/>
@@ -4728,7 +5560,7 @@
           <p:cNvPr id="89" name="Rectangle 88">
             <a:extLst>
               <a:ext uri="{FF2B5EF4-FFF2-40B4-BE49-F238E27FC236}">
-                <a16:creationId xmlns:a16="http://schemas.microsoft.com/office/drawing/2014/main" xmlns="" id="{EED827AB-78FC-41AC-8676-30DA25D7C5FC}"/>
+                <a16:creationId xmlns="" xmlns:a16="http://schemas.microsoft.com/office/drawing/2014/main" id="{EED827AB-78FC-41AC-8676-30DA25D7C5FC}"/>
               </a:ext>
             </a:extLst>
           </p:cNvPr>
@@ -4737,7 +5569,7 @@
         </p:nvSpPr>
         <p:spPr>
           <a:xfrm>
-            <a:off x="7571927" y="3266915"/>
+            <a:off x="7544214" y="3326408"/>
             <a:ext cx="1494797" cy="991056"/>
           </a:xfrm>
           <a:prstGeom prst="rect">
@@ -4806,7 +5638,7 @@
           <p:cNvPr id="62" name="Rectangle 61">
             <a:extLst>
               <a:ext uri="{FF2B5EF4-FFF2-40B4-BE49-F238E27FC236}">
-                <a16:creationId xmlns:a16="http://schemas.microsoft.com/office/drawing/2014/main" xmlns="" id="{C3FE7107-D2B1-4448-B03A-F2CE9B45CFD6}"/>
+                <a16:creationId xmlns="" xmlns:a16="http://schemas.microsoft.com/office/drawing/2014/main" id="{C3FE7107-D2B1-4448-B03A-F2CE9B45CFD6}"/>
               </a:ext>
             </a:extLst>
           </p:cNvPr>
@@ -4870,7 +5702,7 @@
           <p:cNvPr id="61" name="Rectangle 60">
             <a:extLst>
               <a:ext uri="{FF2B5EF4-FFF2-40B4-BE49-F238E27FC236}">
-                <a16:creationId xmlns:a16="http://schemas.microsoft.com/office/drawing/2014/main" xmlns="" id="{2F7B40FD-C5BA-431D-AE99-1CB70F1BAB88}"/>
+                <a16:creationId xmlns="" xmlns:a16="http://schemas.microsoft.com/office/drawing/2014/main" id="{2F7B40FD-C5BA-431D-AE99-1CB70F1BAB88}"/>
               </a:ext>
             </a:extLst>
           </p:cNvPr>
@@ -4929,7 +5761,7 @@
           <p:cNvPr id="60" name="Rectangle 59">
             <a:extLst>
               <a:ext uri="{FF2B5EF4-FFF2-40B4-BE49-F238E27FC236}">
-                <a16:creationId xmlns:a16="http://schemas.microsoft.com/office/drawing/2014/main" xmlns="" id="{CF3E4DE9-C6F2-4C11-BE7F-2753CDEFE535}"/>
+                <a16:creationId xmlns="" xmlns:a16="http://schemas.microsoft.com/office/drawing/2014/main" id="{CF3E4DE9-C6F2-4C11-BE7F-2753CDEFE535}"/>
               </a:ext>
             </a:extLst>
           </p:cNvPr>
@@ -5311,7 +6143,7 @@
           <p:cNvPr id="19" name="TextBox 18">
             <a:extLst>
               <a:ext uri="{FF2B5EF4-FFF2-40B4-BE49-F238E27FC236}">
-                <a16:creationId xmlns:a16="http://schemas.microsoft.com/office/drawing/2014/main" xmlns="" id="{E0BBD6C8-C8F2-40C5-AA64-85961A11ADC2}"/>
+                <a16:creationId xmlns="" xmlns:a16="http://schemas.microsoft.com/office/drawing/2014/main" id="{E0BBD6C8-C8F2-40C5-AA64-85961A11ADC2}"/>
               </a:ext>
             </a:extLst>
           </p:cNvPr>
@@ -5441,7 +6273,7 @@
           <p:cNvPr id="23" name="TextBox 22">
             <a:extLst>
               <a:ext uri="{FF2B5EF4-FFF2-40B4-BE49-F238E27FC236}">
-                <a16:creationId xmlns:a16="http://schemas.microsoft.com/office/drawing/2014/main" xmlns="" id="{E0BBD6C8-C8F2-40C5-AA64-85961A11ADC2}"/>
+                <a16:creationId xmlns="" xmlns:a16="http://schemas.microsoft.com/office/drawing/2014/main" id="{E0BBD6C8-C8F2-40C5-AA64-85961A11ADC2}"/>
               </a:ext>
             </a:extLst>
           </p:cNvPr>
@@ -5558,7 +6390,7 @@
           <p:cNvPr id="28" name="TextBox 27">
             <a:extLst>
               <a:ext uri="{FF2B5EF4-FFF2-40B4-BE49-F238E27FC236}">
-                <a16:creationId xmlns:a16="http://schemas.microsoft.com/office/drawing/2014/main" xmlns="" id="{E0BBD6C8-C8F2-40C5-AA64-85961A11ADC2}"/>
+                <a16:creationId xmlns="" xmlns:a16="http://schemas.microsoft.com/office/drawing/2014/main" id="{E0BBD6C8-C8F2-40C5-AA64-85961A11ADC2}"/>
               </a:ext>
             </a:extLst>
           </p:cNvPr>
@@ -5682,7 +6514,7 @@
           <p:cNvPr id="34" name="TextBox 33">
             <a:extLst>
               <a:ext uri="{FF2B5EF4-FFF2-40B4-BE49-F238E27FC236}">
-                <a16:creationId xmlns:a16="http://schemas.microsoft.com/office/drawing/2014/main" xmlns="" id="{E0BBD6C8-C8F2-40C5-AA64-85961A11ADC2}"/>
+                <a16:creationId xmlns="" xmlns:a16="http://schemas.microsoft.com/office/drawing/2014/main" id="{E0BBD6C8-C8F2-40C5-AA64-85961A11ADC2}"/>
               </a:ext>
             </a:extLst>
           </p:cNvPr>
@@ -5808,7 +6640,7 @@
           <p:cNvPr id="38" name="TextBox 37">
             <a:extLst>
               <a:ext uri="{FF2B5EF4-FFF2-40B4-BE49-F238E27FC236}">
-                <a16:creationId xmlns:a16="http://schemas.microsoft.com/office/drawing/2014/main" xmlns="" id="{E0BBD6C8-C8F2-40C5-AA64-85961A11ADC2}"/>
+                <a16:creationId xmlns="" xmlns:a16="http://schemas.microsoft.com/office/drawing/2014/main" id="{E0BBD6C8-C8F2-40C5-AA64-85961A11ADC2}"/>
               </a:ext>
             </a:extLst>
           </p:cNvPr>
@@ -5978,7 +6810,7 @@
           <p:cNvPr id="44" name="TextBox 43">
             <a:extLst>
               <a:ext uri="{FF2B5EF4-FFF2-40B4-BE49-F238E27FC236}">
-                <a16:creationId xmlns:a16="http://schemas.microsoft.com/office/drawing/2014/main" xmlns="" id="{E0BBD6C8-C8F2-40C5-AA64-85961A11ADC2}"/>
+                <a16:creationId xmlns="" xmlns:a16="http://schemas.microsoft.com/office/drawing/2014/main" id="{E0BBD6C8-C8F2-40C5-AA64-85961A11ADC2}"/>
               </a:ext>
             </a:extLst>
           </p:cNvPr>
@@ -6013,7 +6845,7 @@
           <p:cNvPr id="45" name="TextBox 44">
             <a:extLst>
               <a:ext uri="{FF2B5EF4-FFF2-40B4-BE49-F238E27FC236}">
-                <a16:creationId xmlns:a16="http://schemas.microsoft.com/office/drawing/2014/main" xmlns="" id="{E0BBD6C8-C8F2-40C5-AA64-85961A11ADC2}"/>
+                <a16:creationId xmlns="" xmlns:a16="http://schemas.microsoft.com/office/drawing/2014/main" id="{E0BBD6C8-C8F2-40C5-AA64-85961A11ADC2}"/>
               </a:ext>
             </a:extLst>
           </p:cNvPr>
@@ -6060,7 +6892,7 @@
           <p:cNvPr id="26" name="TextBox 25">
             <a:extLst>
               <a:ext uri="{FF2B5EF4-FFF2-40B4-BE49-F238E27FC236}">
-                <a16:creationId xmlns:a16="http://schemas.microsoft.com/office/drawing/2014/main" xmlns="" id="{6C45E26E-8FEE-4439-A34B-789237C9C62C}"/>
+                <a16:creationId xmlns="" xmlns:a16="http://schemas.microsoft.com/office/drawing/2014/main" id="{6C45E26E-8FEE-4439-A34B-789237C9C62C}"/>
               </a:ext>
             </a:extLst>
           </p:cNvPr>
@@ -6095,7 +6927,7 @@
           <p:cNvPr id="31" name="Rectangle 30">
             <a:extLst>
               <a:ext uri="{FF2B5EF4-FFF2-40B4-BE49-F238E27FC236}">
-                <a16:creationId xmlns:a16="http://schemas.microsoft.com/office/drawing/2014/main" xmlns="" id="{6D396BFC-10E0-4935-903B-EDC457BD1755}"/>
+                <a16:creationId xmlns="" xmlns:a16="http://schemas.microsoft.com/office/drawing/2014/main" id="{6D396BFC-10E0-4935-903B-EDC457BD1755}"/>
               </a:ext>
             </a:extLst>
           </p:cNvPr>
@@ -6155,7 +6987,7 @@
           <p:cNvPr id="32" name="Rectangle 31">
             <a:extLst>
               <a:ext uri="{FF2B5EF4-FFF2-40B4-BE49-F238E27FC236}">
-                <a16:creationId xmlns:a16="http://schemas.microsoft.com/office/drawing/2014/main" xmlns="" id="{02A645C8-F11F-438D-92DC-F6FCCA5ECFB8}"/>
+                <a16:creationId xmlns="" xmlns:a16="http://schemas.microsoft.com/office/drawing/2014/main" id="{02A645C8-F11F-438D-92DC-F6FCCA5ECFB8}"/>
               </a:ext>
             </a:extLst>
           </p:cNvPr>
@@ -6215,7 +7047,7 @@
           <p:cNvPr id="12" name="Straight Arrow Connector 11">
             <a:extLst>
               <a:ext uri="{FF2B5EF4-FFF2-40B4-BE49-F238E27FC236}">
-                <a16:creationId xmlns:a16="http://schemas.microsoft.com/office/drawing/2014/main" xmlns="" id="{FF2076CA-F897-4293-B6CD-7408EB452156}"/>
+                <a16:creationId xmlns="" xmlns:a16="http://schemas.microsoft.com/office/drawing/2014/main" id="{FF2076CA-F897-4293-B6CD-7408EB452156}"/>
               </a:ext>
             </a:extLst>
           </p:cNvPr>
@@ -6258,7 +7090,7 @@
           <p:cNvPr id="14" name="Straight Arrow Connector 13">
             <a:extLst>
               <a:ext uri="{FF2B5EF4-FFF2-40B4-BE49-F238E27FC236}">
-                <a16:creationId xmlns:a16="http://schemas.microsoft.com/office/drawing/2014/main" xmlns="" id="{5C625B7B-4A1E-46C5-9082-4FEC89B30DA9}"/>
+                <a16:creationId xmlns="" xmlns:a16="http://schemas.microsoft.com/office/drawing/2014/main" id="{5C625B7B-4A1E-46C5-9082-4FEC89B30DA9}"/>
               </a:ext>
             </a:extLst>
           </p:cNvPr>
@@ -6301,7 +7133,7 @@
           <p:cNvPr id="65" name="Straight Arrow Connector 64">
             <a:extLst>
               <a:ext uri="{FF2B5EF4-FFF2-40B4-BE49-F238E27FC236}">
-                <a16:creationId xmlns:a16="http://schemas.microsoft.com/office/drawing/2014/main" xmlns="" id="{C1C9B843-1D11-4D9F-8CBF-AE00E90AA070}"/>
+                <a16:creationId xmlns="" xmlns:a16="http://schemas.microsoft.com/office/drawing/2014/main" id="{C1C9B843-1D11-4D9F-8CBF-AE00E90AA070}"/>
               </a:ext>
             </a:extLst>
           </p:cNvPr>
@@ -6343,7 +7175,7 @@
           <p:cNvPr id="66" name="TextBox 65">
             <a:extLst>
               <a:ext uri="{FF2B5EF4-FFF2-40B4-BE49-F238E27FC236}">
-                <a16:creationId xmlns:a16="http://schemas.microsoft.com/office/drawing/2014/main" xmlns="" id="{5E4B2700-0522-40EF-B035-166AA1C17D76}"/>
+                <a16:creationId xmlns="" xmlns:a16="http://schemas.microsoft.com/office/drawing/2014/main" id="{5E4B2700-0522-40EF-B035-166AA1C17D76}"/>
               </a:ext>
             </a:extLst>
           </p:cNvPr>
@@ -6467,7 +7299,7 @@
           <p:cNvPr id="48" name="TextBox 47">
             <a:extLst>
               <a:ext uri="{FF2B5EF4-FFF2-40B4-BE49-F238E27FC236}">
-                <a16:creationId xmlns:a16="http://schemas.microsoft.com/office/drawing/2014/main" xmlns="" id="{E0BBD6C8-C8F2-40C5-AA64-85961A11ADC2}"/>
+                <a16:creationId xmlns="" xmlns:a16="http://schemas.microsoft.com/office/drawing/2014/main" id="{E0BBD6C8-C8F2-40C5-AA64-85961A11ADC2}"/>
               </a:ext>
             </a:extLst>
           </p:cNvPr>
@@ -6502,7 +7334,7 @@
           <p:cNvPr id="52" name="Rectangle 51">
             <a:extLst>
               <a:ext uri="{FF2B5EF4-FFF2-40B4-BE49-F238E27FC236}">
-                <a16:creationId xmlns:a16="http://schemas.microsoft.com/office/drawing/2014/main" xmlns="" id="{21B869D6-66CB-4B38-975F-B7FEB6AA9B13}"/>
+                <a16:creationId xmlns="" xmlns:a16="http://schemas.microsoft.com/office/drawing/2014/main" id="{21B869D6-66CB-4B38-975F-B7FEB6AA9B13}"/>
               </a:ext>
             </a:extLst>
           </p:cNvPr>
@@ -6625,7 +7457,7 @@
           <p:cNvPr id="58" name="TextBox 57">
             <a:extLst>
               <a:ext uri="{FF2B5EF4-FFF2-40B4-BE49-F238E27FC236}">
-                <a16:creationId xmlns:a16="http://schemas.microsoft.com/office/drawing/2014/main" xmlns="" id="{E0BBD6C8-C8F2-40C5-AA64-85961A11ADC2}"/>
+                <a16:creationId xmlns="" xmlns:a16="http://schemas.microsoft.com/office/drawing/2014/main" id="{E0BBD6C8-C8F2-40C5-AA64-85961A11ADC2}"/>
               </a:ext>
             </a:extLst>
           </p:cNvPr>
@@ -6733,7 +7565,7 @@
           <p:cNvPr id="94" name="TextBox 93">
             <a:extLst>
               <a:ext uri="{FF2B5EF4-FFF2-40B4-BE49-F238E27FC236}">
-                <a16:creationId xmlns:a16="http://schemas.microsoft.com/office/drawing/2014/main" xmlns="" id="{E0BBD6C8-C8F2-40C5-AA64-85961A11ADC2}"/>
+                <a16:creationId xmlns="" xmlns:a16="http://schemas.microsoft.com/office/drawing/2014/main" id="{E0BBD6C8-C8F2-40C5-AA64-85961A11ADC2}"/>
               </a:ext>
             </a:extLst>
           </p:cNvPr>
@@ -6768,7 +7600,7 @@
           <p:cNvPr id="95" name="TextBox 94">
             <a:extLst>
               <a:ext uri="{FF2B5EF4-FFF2-40B4-BE49-F238E27FC236}">
-                <a16:creationId xmlns:a16="http://schemas.microsoft.com/office/drawing/2014/main" xmlns="" id="{E0BBD6C8-C8F2-40C5-AA64-85961A11ADC2}"/>
+                <a16:creationId xmlns="" xmlns:a16="http://schemas.microsoft.com/office/drawing/2014/main" id="{E0BBD6C8-C8F2-40C5-AA64-85961A11ADC2}"/>
               </a:ext>
             </a:extLst>
           </p:cNvPr>
@@ -6803,7 +7635,7 @@
           <p:cNvPr id="49" name="Rectangle 48">
             <a:extLst>
               <a:ext uri="{FF2B5EF4-FFF2-40B4-BE49-F238E27FC236}">
-                <a16:creationId xmlns:a16="http://schemas.microsoft.com/office/drawing/2014/main" xmlns="" id="{02A645C8-F11F-438D-92DC-F6FCCA5ECFB8}"/>
+                <a16:creationId xmlns="" xmlns:a16="http://schemas.microsoft.com/office/drawing/2014/main" id="{02A645C8-F11F-438D-92DC-F6FCCA5ECFB8}"/>
               </a:ext>
             </a:extLst>
           </p:cNvPr>
@@ -6900,7 +7732,7 @@
           <p:cNvPr id="57" name="Rectangle 56">
             <a:extLst>
               <a:ext uri="{FF2B5EF4-FFF2-40B4-BE49-F238E27FC236}">
-                <a16:creationId xmlns:a16="http://schemas.microsoft.com/office/drawing/2014/main" xmlns="" id="{93FBA679-F71B-47BD-BE29-21E7C2262CEB}"/>
+                <a16:creationId xmlns="" xmlns:a16="http://schemas.microsoft.com/office/drawing/2014/main" id="{93FBA679-F71B-47BD-BE29-21E7C2262CEB}"/>
               </a:ext>
             </a:extLst>
           </p:cNvPr>
@@ -7010,7 +7842,7 @@
           <p:cNvPr id="59" name="TextBox 58">
             <a:extLst>
               <a:ext uri="{FF2B5EF4-FFF2-40B4-BE49-F238E27FC236}">
-                <a16:creationId xmlns:a16="http://schemas.microsoft.com/office/drawing/2014/main" xmlns="" id="{5E4B2700-0522-40EF-B035-166AA1C17D76}"/>
+                <a16:creationId xmlns="" xmlns:a16="http://schemas.microsoft.com/office/drawing/2014/main" id="{5E4B2700-0522-40EF-B035-166AA1C17D76}"/>
               </a:ext>
             </a:extLst>
           </p:cNvPr>
@@ -7083,10 +7915,10 @@
           <p:cNvPr id="12" name="Rectangle 11">
             <a:extLst>
               <a:ext uri="{FF2B5EF4-FFF2-40B4-BE49-F238E27FC236}">
-                <a16:creationId xmlns:a16="http://schemas.microsoft.com/office/drawing/2014/main" xmlns="" id="{6753252F-4873-4F63-801D-CC719279A7D5}"/>
+                <a16:creationId xmlns="" xmlns:a16="http://schemas.microsoft.com/office/drawing/2014/main" id="{6753252F-4873-4F63-801D-CC719279A7D5}"/>
               </a:ext>
               <a:ext uri="{C183D7F6-B498-43B3-948B-1728B52AA6E4}">
-                <adec:decorative xmlns:adec="http://schemas.microsoft.com/office/drawing/2017/decorative" xmlns="" val="1"/>
+                <adec:decorative xmlns="" xmlns:adec="http://schemas.microsoft.com/office/drawing/2017/decorative" val="1"/>
               </a:ext>
             </a:extLst>
           </p:cNvPr>
@@ -7096,7 +7928,7 @@
           <p:nvPr>
             <p:extLst>
               <p:ext uri="{386F3935-93C4-4BCD-93E2-E3B085C9AB24}">
-                <p16:designElem xmlns:p16="http://schemas.microsoft.com/office/powerpoint/2015/main" xmlns="" val="1"/>
+                <p16:designElem xmlns="" xmlns:p16="http://schemas.microsoft.com/office/powerpoint/2015/main" val="1"/>
               </p:ext>
             </p:extLst>
           </p:nvPr>
@@ -7146,10 +7978,10 @@
           <p:cNvPr id="14" name="Rectangle 13">
             <a:extLst>
               <a:ext uri="{FF2B5EF4-FFF2-40B4-BE49-F238E27FC236}">
-                <a16:creationId xmlns:a16="http://schemas.microsoft.com/office/drawing/2014/main" xmlns="" id="{047C8CCB-F95D-4249-92DD-651249D3535A}"/>
+                <a16:creationId xmlns="" xmlns:a16="http://schemas.microsoft.com/office/drawing/2014/main" id="{047C8CCB-F95D-4249-92DD-651249D3535A}"/>
               </a:ext>
               <a:ext uri="{C183D7F6-B498-43B3-948B-1728B52AA6E4}">
-                <adec:decorative xmlns:adec="http://schemas.microsoft.com/office/drawing/2017/decorative" xmlns="" val="1"/>
+                <adec:decorative xmlns="" xmlns:adec="http://schemas.microsoft.com/office/drawing/2017/decorative" val="1"/>
               </a:ext>
             </a:extLst>
           </p:cNvPr>
@@ -7159,7 +7991,7 @@
           <p:nvPr>
             <p:extLst>
               <p:ext uri="{386F3935-93C4-4BCD-93E2-E3B085C9AB24}">
-                <p16:designElem xmlns:p16="http://schemas.microsoft.com/office/powerpoint/2015/main" xmlns="" val="1"/>
+                <p16:designElem xmlns="" xmlns:p16="http://schemas.microsoft.com/office/powerpoint/2015/main" val="1"/>
               </p:ext>
             </p:extLst>
           </p:nvPr>
@@ -7209,7 +8041,7 @@
           <p:cNvPr id="5" name="TextBox 4">
             <a:extLst>
               <a:ext uri="{FF2B5EF4-FFF2-40B4-BE49-F238E27FC236}">
-                <a16:creationId xmlns:a16="http://schemas.microsoft.com/office/drawing/2014/main" xmlns="" id="{6C45E26E-8FEE-4439-A34B-789237C9C62C}"/>
+                <a16:creationId xmlns="" xmlns:a16="http://schemas.microsoft.com/office/drawing/2014/main" id="{6C45E26E-8FEE-4439-A34B-789237C9C62C}"/>
               </a:ext>
             </a:extLst>
           </p:cNvPr>
@@ -7331,7 +8163,7 @@
         <p:spPr>
           <a:xfrm>
             <a:off x="954820" y="819150"/>
-            <a:ext cx="9144000" cy="5956300"/>
+            <a:ext cx="9144000" cy="5683250"/>
           </a:xfrm>
         </p:spPr>
         <p:txBody>
@@ -7467,7 +8299,15 @@
             </a:pPr>
             <a:r>
               <a:rPr lang="en-US" dirty="0"/>
-              <a:t>HTTP Endpoints (minimum of 11)</a:t>
+              <a:t>HTTP Endpoints </a:t>
+            </a:r>
+            <a:r>
+              <a:rPr lang="en-US" dirty="0"/>
+              <a:t>(Login and </a:t>
+            </a:r>
+            <a:r>
+              <a:rPr lang="en-US" dirty="0" smtClean="0"/>
+              <a:t>Reimbursement)</a:t>
             </a:r>
           </a:p>
           <a:p>
@@ -7476,8 +8316,8 @@
               <a:buChar char="•"/>
             </a:pPr>
             <a:r>
-              <a:rPr lang="en-US" dirty="0"/>
-              <a:t>Other considerations</a:t>
+              <a:rPr lang="en-US" dirty="0" smtClean="0"/>
+              <a:t>Front-end</a:t>
             </a:r>
           </a:p>
           <a:p>
@@ -7486,8 +8326,19 @@
               <a:buChar char="•"/>
             </a:pPr>
             <a:r>
+              <a:rPr lang="en-US" dirty="0" smtClean="0"/>
+              <a:t>Login, Reimbursement, and Finance interactive pages</a:t>
+            </a:r>
+            <a:endParaRPr lang="en-US" dirty="0"/>
+          </a:p>
+          <a:p>
+            <a:pPr marL="342900" indent="-342900" algn="l">
+              <a:buFont typeface="Arial" panose="020B0604020202020204" pitchFamily="34" charset="0"/>
+              <a:buChar char="•"/>
+            </a:pPr>
+            <a:r>
               <a:rPr lang="en-US" dirty="0"/>
-              <a:t>Account Number Primary Key (Randomly Generated)</a:t>
+              <a:t>Other considerations</a:t>
             </a:r>
           </a:p>
           <a:p>
@@ -7496,12 +8347,28 @@
               <a:buChar char="•"/>
             </a:pPr>
             <a:r>
-              <a:rPr lang="en-US" dirty="0" err="1"/>
+              <a:rPr lang="en-US" dirty="0" smtClean="0"/>
+              <a:t>Implementing </a:t>
+            </a:r>
+            <a:r>
+              <a:rPr lang="en-US" dirty="0" err="1" smtClean="0"/>
               <a:t>GenericDAO</a:t>
             </a:r>
             <a:r>
+              <a:rPr lang="en-US" dirty="0" smtClean="0"/>
+              <a:t>&lt;T</a:t>
+            </a:r>
+            <a:r>
               <a:rPr lang="en-US" dirty="0"/>
-              <a:t>&lt;T&gt; used but not fully realized</a:t>
+              <a:t>&gt; </a:t>
+            </a:r>
+            <a:r>
+              <a:rPr lang="en-US" dirty="0" smtClean="0"/>
+              <a:t> model fully </a:t>
+            </a:r>
+            <a:r>
+              <a:rPr lang="en-US" dirty="0"/>
+              <a:t>realized</a:t>
             </a:r>
           </a:p>
           <a:p>
@@ -7510,8 +8377,20 @@
               <a:buChar char="•"/>
             </a:pPr>
             <a:r>
+              <a:rPr lang="en-US" dirty="0" smtClean="0"/>
+              <a:t>Extend Add/Edit </a:t>
+            </a:r>
+            <a:r>
               <a:rPr lang="en-US" dirty="0"/>
-              <a:t>Simple Add/Edit DTO stores data generically in </a:t>
+              <a:t>DTO </a:t>
+            </a:r>
+            <a:r>
+              <a:rPr lang="en-US" dirty="0" smtClean="0"/>
+              <a:t>storing </a:t>
+            </a:r>
+            <a:r>
+              <a:rPr lang="en-US" dirty="0"/>
+              <a:t>data generically in </a:t>
             </a:r>
             <a:r>
               <a:rPr lang="en-US" dirty="0" err="1"/>
@@ -7525,9 +8404,18 @@
               <a:buChar char="•"/>
             </a:pPr>
             <a:r>
-              <a:rPr lang="en-US" dirty="0"/>
-              <a:t>JUnit test driven development not fully realized (18 tests)</a:t>
-            </a:r>
+              <a:rPr lang="en-US" dirty="0" smtClean="0"/>
+              <a:t>Minimal JUnit and </a:t>
+            </a:r>
+            <a:r>
+              <a:rPr lang="en-US" dirty="0" err="1" smtClean="0"/>
+              <a:t>Mockito</a:t>
+            </a:r>
+            <a:r>
+              <a:rPr lang="en-US" dirty="0" smtClean="0"/>
+              <a:t> test cases</a:t>
+            </a:r>
+            <a:endParaRPr lang="en-US" dirty="0"/>
           </a:p>
           <a:p>
             <a:pPr marL="800100" lvl="1" indent="-342900" algn="l">
@@ -7536,8 +8424,13 @@
             </a:pPr>
             <a:r>
               <a:rPr lang="en-US" dirty="0"/>
-              <a:t>Extensive utilization of Postman tests</a:t>
-            </a:r>
+              <a:t>Extensive utilization of </a:t>
+            </a:r>
+            <a:r>
+              <a:rPr lang="en-US" dirty="0" smtClean="0"/>
+              <a:t>internal driver tests</a:t>
+            </a:r>
+            <a:endParaRPr lang="en-US" dirty="0"/>
           </a:p>
           <a:p>
             <a:pPr marL="800100" lvl="1" indent="-342900" algn="l">
@@ -7545,9 +8438,18 @@
               <a:buChar char="•"/>
             </a:pPr>
             <a:r>
+              <a:rPr lang="en-US" dirty="0" smtClean="0"/>
+              <a:t>Extensive </a:t>
+            </a:r>
+            <a:r>
               <a:rPr lang="en-US" dirty="0"/>
-              <a:t>Additional endpoints created inadvertently and by extension</a:t>
-            </a:r>
+              <a:t>Logging through </a:t>
+            </a:r>
+            <a:r>
+              <a:rPr lang="en-US" dirty="0" smtClean="0"/>
+              <a:t>package logging levels</a:t>
+            </a:r>
+            <a:endParaRPr lang="en-US" dirty="0"/>
           </a:p>
           <a:p>
             <a:pPr marL="800100" lvl="1" indent="-342900" algn="l">
@@ -7556,52 +8458,12 @@
             </a:pPr>
             <a:r>
               <a:rPr lang="en-US" dirty="0"/>
-              <a:t>Extensive Logging through program logging levels used</a:t>
-            </a:r>
-          </a:p>
-          <a:p>
-            <a:pPr marL="800100" lvl="1" indent="-342900" algn="l">
-              <a:buFont typeface="Arial" panose="020B0604020202020204" pitchFamily="34" charset="0"/>
-              <a:buChar char="•"/>
-            </a:pPr>
-            <a:r>
-              <a:rPr lang="en-US" dirty="0"/>
-              <a:t>Postman utilize (~30+) tests</a:t>
-            </a:r>
-          </a:p>
-          <a:p>
-            <a:pPr marL="342900" indent="-342900" algn="l">
-              <a:buFont typeface="Arial" panose="020B0604020202020204" pitchFamily="34" charset="0"/>
-              <a:buChar char="•"/>
-            </a:pPr>
-            <a:endParaRPr lang="en-US" dirty="0"/>
-          </a:p>
-          <a:p>
-            <a:pPr marL="342900" indent="-342900" algn="l">
-              <a:buFont typeface="Arial" panose="020B0604020202020204" pitchFamily="34" charset="0"/>
-              <a:buChar char="•"/>
-            </a:pPr>
-            <a:endParaRPr lang="en-US" dirty="0"/>
-          </a:p>
-          <a:p>
-            <a:pPr marL="800100" lvl="1" indent="-342900" algn="l">
-              <a:buFont typeface="Arial" panose="020B0604020202020204" pitchFamily="34" charset="0"/>
-              <a:buChar char="•"/>
-            </a:pPr>
-            <a:endParaRPr lang="en-US" dirty="0"/>
-          </a:p>
-          <a:p>
-            <a:pPr marL="800100" lvl="1" indent="-342900" algn="l">
-              <a:buFont typeface="Arial" panose="020B0604020202020204" pitchFamily="34" charset="0"/>
-              <a:buChar char="•"/>
-            </a:pPr>
-            <a:endParaRPr lang="en-US" dirty="0"/>
-          </a:p>
-          <a:p>
-            <a:pPr marL="800100" lvl="1" indent="-342900" algn="l">
-              <a:buFont typeface="Arial" panose="020B0604020202020204" pitchFamily="34" charset="0"/>
-              <a:buChar char="•"/>
-            </a:pPr>
+              <a:t>Postman utilize </a:t>
+            </a:r>
+            <a:r>
+              <a:rPr lang="en-US" dirty="0" smtClean="0"/>
+              <a:t>for some initial endpoint tests</a:t>
+            </a:r>
             <a:endParaRPr lang="en-US" dirty="0"/>
           </a:p>
           <a:p>

</xml_diff>

<commit_message>
20210825 1639 tlw8748253: EOD checkpoint: [HTML: FM get all recs and can add own record].
</commit_message>
<xml_diff>
--- a/docs/ERS.pptx
+++ b/docs/ERS.pptx
@@ -138,7 +138,7 @@
           <p:cNvPr id="2" name="Title 1">
             <a:extLst>
               <a:ext uri="{FF2B5EF4-FFF2-40B4-BE49-F238E27FC236}">
-                <a16:creationId xmlns="" xmlns:a16="http://schemas.microsoft.com/office/drawing/2014/main" id="{67106D7E-D400-44F1-9A1A-D68CE501C73D}"/>
+                <a16:creationId xmlns:a16="http://schemas.microsoft.com/office/drawing/2014/main" xmlns="" id="{67106D7E-D400-44F1-9A1A-D68CE501C73D}"/>
               </a:ext>
             </a:extLst>
           </p:cNvPr>
@@ -175,7 +175,7 @@
           <p:cNvPr id="3" name="Subtitle 2">
             <a:extLst>
               <a:ext uri="{FF2B5EF4-FFF2-40B4-BE49-F238E27FC236}">
-                <a16:creationId xmlns="" xmlns:a16="http://schemas.microsoft.com/office/drawing/2014/main" id="{A5FDE527-E621-4639-A0C7-E1E9B0DFBCEC}"/>
+                <a16:creationId xmlns:a16="http://schemas.microsoft.com/office/drawing/2014/main" xmlns="" id="{A5FDE527-E621-4639-A0C7-E1E9B0DFBCEC}"/>
               </a:ext>
             </a:extLst>
           </p:cNvPr>
@@ -245,7 +245,7 @@
           <p:cNvPr id="4" name="Date Placeholder 3">
             <a:extLst>
               <a:ext uri="{FF2B5EF4-FFF2-40B4-BE49-F238E27FC236}">
-                <a16:creationId xmlns="" xmlns:a16="http://schemas.microsoft.com/office/drawing/2014/main" id="{E109CE88-B989-4109-89C8-36F7C245DB1C}"/>
+                <a16:creationId xmlns:a16="http://schemas.microsoft.com/office/drawing/2014/main" xmlns="" id="{E109CE88-B989-4109-89C8-36F7C245DB1C}"/>
               </a:ext>
             </a:extLst>
           </p:cNvPr>
@@ -263,7 +263,7 @@
           <a:p>
             <a:fld id="{6C733091-19F0-4DD7-90FE-000B4789B4CF}" type="datetimeFigureOut">
               <a:rPr lang="en-US" smtClean="0"/>
-              <a:t>8/24/2021</a:t>
+              <a:t>8/25/2021</a:t>
             </a:fld>
             <a:endParaRPr lang="en-US"/>
           </a:p>
@@ -274,7 +274,7 @@
           <p:cNvPr id="5" name="Footer Placeholder 4">
             <a:extLst>
               <a:ext uri="{FF2B5EF4-FFF2-40B4-BE49-F238E27FC236}">
-                <a16:creationId xmlns="" xmlns:a16="http://schemas.microsoft.com/office/drawing/2014/main" id="{0841498F-B991-43D3-B408-CC35D8EFCF37}"/>
+                <a16:creationId xmlns:a16="http://schemas.microsoft.com/office/drawing/2014/main" xmlns="" id="{0841498F-B991-43D3-B408-CC35D8EFCF37}"/>
               </a:ext>
             </a:extLst>
           </p:cNvPr>
@@ -299,7 +299,7 @@
           <p:cNvPr id="6" name="Slide Number Placeholder 5">
             <a:extLst>
               <a:ext uri="{FF2B5EF4-FFF2-40B4-BE49-F238E27FC236}">
-                <a16:creationId xmlns="" xmlns:a16="http://schemas.microsoft.com/office/drawing/2014/main" id="{01754CB8-17B1-45A0-AE7D-755EAA1B69D8}"/>
+                <a16:creationId xmlns:a16="http://schemas.microsoft.com/office/drawing/2014/main" xmlns="" id="{01754CB8-17B1-45A0-AE7D-755EAA1B69D8}"/>
               </a:ext>
             </a:extLst>
           </p:cNvPr>
@@ -358,7 +358,7 @@
           <p:cNvPr id="2" name="Title 1">
             <a:extLst>
               <a:ext uri="{FF2B5EF4-FFF2-40B4-BE49-F238E27FC236}">
-                <a16:creationId xmlns="" xmlns:a16="http://schemas.microsoft.com/office/drawing/2014/main" id="{E7A7B055-5DC2-440D-83C1-CAAE8E9A8E14}"/>
+                <a16:creationId xmlns:a16="http://schemas.microsoft.com/office/drawing/2014/main" xmlns="" id="{E7A7B055-5DC2-440D-83C1-CAAE8E9A8E14}"/>
               </a:ext>
             </a:extLst>
           </p:cNvPr>
@@ -386,7 +386,7 @@
           <p:cNvPr id="3" name="Vertical Text Placeholder 2">
             <a:extLst>
               <a:ext uri="{FF2B5EF4-FFF2-40B4-BE49-F238E27FC236}">
-                <a16:creationId xmlns="" xmlns:a16="http://schemas.microsoft.com/office/drawing/2014/main" id="{65710707-423D-4F9D-A49D-6C764C562553}"/>
+                <a16:creationId xmlns:a16="http://schemas.microsoft.com/office/drawing/2014/main" xmlns="" id="{65710707-423D-4F9D-A49D-6C764C562553}"/>
               </a:ext>
             </a:extLst>
           </p:cNvPr>
@@ -443,7 +443,7 @@
           <p:cNvPr id="4" name="Date Placeholder 3">
             <a:extLst>
               <a:ext uri="{FF2B5EF4-FFF2-40B4-BE49-F238E27FC236}">
-                <a16:creationId xmlns="" xmlns:a16="http://schemas.microsoft.com/office/drawing/2014/main" id="{98B6F7EF-D1BE-4437-85F3-99626E37E4EF}"/>
+                <a16:creationId xmlns:a16="http://schemas.microsoft.com/office/drawing/2014/main" xmlns="" id="{98B6F7EF-D1BE-4437-85F3-99626E37E4EF}"/>
               </a:ext>
             </a:extLst>
           </p:cNvPr>
@@ -461,7 +461,7 @@
           <a:p>
             <a:fld id="{6C733091-19F0-4DD7-90FE-000B4789B4CF}" type="datetimeFigureOut">
               <a:rPr lang="en-US" smtClean="0"/>
-              <a:t>8/24/2021</a:t>
+              <a:t>8/25/2021</a:t>
             </a:fld>
             <a:endParaRPr lang="en-US"/>
           </a:p>
@@ -472,7 +472,7 @@
           <p:cNvPr id="5" name="Footer Placeholder 4">
             <a:extLst>
               <a:ext uri="{FF2B5EF4-FFF2-40B4-BE49-F238E27FC236}">
-                <a16:creationId xmlns="" xmlns:a16="http://schemas.microsoft.com/office/drawing/2014/main" id="{D890AA9B-E479-4209-B245-83608F3D4013}"/>
+                <a16:creationId xmlns:a16="http://schemas.microsoft.com/office/drawing/2014/main" xmlns="" id="{D890AA9B-E479-4209-B245-83608F3D4013}"/>
               </a:ext>
             </a:extLst>
           </p:cNvPr>
@@ -497,7 +497,7 @@
           <p:cNvPr id="6" name="Slide Number Placeholder 5">
             <a:extLst>
               <a:ext uri="{FF2B5EF4-FFF2-40B4-BE49-F238E27FC236}">
-                <a16:creationId xmlns="" xmlns:a16="http://schemas.microsoft.com/office/drawing/2014/main" id="{0E4976E4-E15A-4296-A430-633D2BB9142B}"/>
+                <a16:creationId xmlns:a16="http://schemas.microsoft.com/office/drawing/2014/main" xmlns="" id="{0E4976E4-E15A-4296-A430-633D2BB9142B}"/>
               </a:ext>
             </a:extLst>
           </p:cNvPr>
@@ -556,7 +556,7 @@
           <p:cNvPr id="2" name="Vertical Title 1">
             <a:extLst>
               <a:ext uri="{FF2B5EF4-FFF2-40B4-BE49-F238E27FC236}">
-                <a16:creationId xmlns="" xmlns:a16="http://schemas.microsoft.com/office/drawing/2014/main" id="{66F63CF5-8DEE-4BB2-A2A5-5C16FEBE1AD5}"/>
+                <a16:creationId xmlns:a16="http://schemas.microsoft.com/office/drawing/2014/main" xmlns="" id="{66F63CF5-8DEE-4BB2-A2A5-5C16FEBE1AD5}"/>
               </a:ext>
             </a:extLst>
           </p:cNvPr>
@@ -589,7 +589,7 @@
           <p:cNvPr id="3" name="Vertical Text Placeholder 2">
             <a:extLst>
               <a:ext uri="{FF2B5EF4-FFF2-40B4-BE49-F238E27FC236}">
-                <a16:creationId xmlns="" xmlns:a16="http://schemas.microsoft.com/office/drawing/2014/main" id="{E0D5EBA5-94AF-4373-B032-A40FF73C7575}"/>
+                <a16:creationId xmlns:a16="http://schemas.microsoft.com/office/drawing/2014/main" xmlns="" id="{E0D5EBA5-94AF-4373-B032-A40FF73C7575}"/>
               </a:ext>
             </a:extLst>
           </p:cNvPr>
@@ -651,7 +651,7 @@
           <p:cNvPr id="4" name="Date Placeholder 3">
             <a:extLst>
               <a:ext uri="{FF2B5EF4-FFF2-40B4-BE49-F238E27FC236}">
-                <a16:creationId xmlns="" xmlns:a16="http://schemas.microsoft.com/office/drawing/2014/main" id="{7426B8E1-6758-4F5E-B618-96641332600B}"/>
+                <a16:creationId xmlns:a16="http://schemas.microsoft.com/office/drawing/2014/main" xmlns="" id="{7426B8E1-6758-4F5E-B618-96641332600B}"/>
               </a:ext>
             </a:extLst>
           </p:cNvPr>
@@ -669,7 +669,7 @@
           <a:p>
             <a:fld id="{6C733091-19F0-4DD7-90FE-000B4789B4CF}" type="datetimeFigureOut">
               <a:rPr lang="en-US" smtClean="0"/>
-              <a:t>8/24/2021</a:t>
+              <a:t>8/25/2021</a:t>
             </a:fld>
             <a:endParaRPr lang="en-US"/>
           </a:p>
@@ -680,7 +680,7 @@
           <p:cNvPr id="5" name="Footer Placeholder 4">
             <a:extLst>
               <a:ext uri="{FF2B5EF4-FFF2-40B4-BE49-F238E27FC236}">
-                <a16:creationId xmlns="" xmlns:a16="http://schemas.microsoft.com/office/drawing/2014/main" id="{F65E330E-2A7E-482D-AE0F-70EA5A29958B}"/>
+                <a16:creationId xmlns:a16="http://schemas.microsoft.com/office/drawing/2014/main" xmlns="" id="{F65E330E-2A7E-482D-AE0F-70EA5A29958B}"/>
               </a:ext>
             </a:extLst>
           </p:cNvPr>
@@ -705,7 +705,7 @@
           <p:cNvPr id="6" name="Slide Number Placeholder 5">
             <a:extLst>
               <a:ext uri="{FF2B5EF4-FFF2-40B4-BE49-F238E27FC236}">
-                <a16:creationId xmlns="" xmlns:a16="http://schemas.microsoft.com/office/drawing/2014/main" id="{B8000005-FC38-4A6C-9D09-7945EFA08160}"/>
+                <a16:creationId xmlns:a16="http://schemas.microsoft.com/office/drawing/2014/main" xmlns="" id="{B8000005-FC38-4A6C-9D09-7945EFA08160}"/>
               </a:ext>
             </a:extLst>
           </p:cNvPr>
@@ -764,7 +764,7 @@
           <p:cNvPr id="2" name="Title 1">
             <a:extLst>
               <a:ext uri="{FF2B5EF4-FFF2-40B4-BE49-F238E27FC236}">
-                <a16:creationId xmlns="" xmlns:a16="http://schemas.microsoft.com/office/drawing/2014/main" id="{91D0002C-766B-44B4-A24C-BE6DE6C7BA4C}"/>
+                <a16:creationId xmlns:a16="http://schemas.microsoft.com/office/drawing/2014/main" xmlns="" id="{91D0002C-766B-44B4-A24C-BE6DE6C7BA4C}"/>
               </a:ext>
             </a:extLst>
           </p:cNvPr>
@@ -792,7 +792,7 @@
           <p:cNvPr id="3" name="Content Placeholder 2">
             <a:extLst>
               <a:ext uri="{FF2B5EF4-FFF2-40B4-BE49-F238E27FC236}">
-                <a16:creationId xmlns="" xmlns:a16="http://schemas.microsoft.com/office/drawing/2014/main" id="{3455BAA9-6C7B-4874-AD76-BD466F64802D}"/>
+                <a16:creationId xmlns:a16="http://schemas.microsoft.com/office/drawing/2014/main" xmlns="" id="{3455BAA9-6C7B-4874-AD76-BD466F64802D}"/>
               </a:ext>
             </a:extLst>
           </p:cNvPr>
@@ -849,7 +849,7 @@
           <p:cNvPr id="4" name="Date Placeholder 3">
             <a:extLst>
               <a:ext uri="{FF2B5EF4-FFF2-40B4-BE49-F238E27FC236}">
-                <a16:creationId xmlns="" xmlns:a16="http://schemas.microsoft.com/office/drawing/2014/main" id="{8776BDAF-D8F2-4A61-904D-094BB4545702}"/>
+                <a16:creationId xmlns:a16="http://schemas.microsoft.com/office/drawing/2014/main" xmlns="" id="{8776BDAF-D8F2-4A61-904D-094BB4545702}"/>
               </a:ext>
             </a:extLst>
           </p:cNvPr>
@@ -867,7 +867,7 @@
           <a:p>
             <a:fld id="{6C733091-19F0-4DD7-90FE-000B4789B4CF}" type="datetimeFigureOut">
               <a:rPr lang="en-US" smtClean="0"/>
-              <a:t>8/24/2021</a:t>
+              <a:t>8/25/2021</a:t>
             </a:fld>
             <a:endParaRPr lang="en-US"/>
           </a:p>
@@ -878,7 +878,7 @@
           <p:cNvPr id="5" name="Footer Placeholder 4">
             <a:extLst>
               <a:ext uri="{FF2B5EF4-FFF2-40B4-BE49-F238E27FC236}">
-                <a16:creationId xmlns="" xmlns:a16="http://schemas.microsoft.com/office/drawing/2014/main" id="{F89C5665-4384-4706-9BD2-9F42B05C96BC}"/>
+                <a16:creationId xmlns:a16="http://schemas.microsoft.com/office/drawing/2014/main" xmlns="" id="{F89C5665-4384-4706-9BD2-9F42B05C96BC}"/>
               </a:ext>
             </a:extLst>
           </p:cNvPr>
@@ -903,7 +903,7 @@
           <p:cNvPr id="6" name="Slide Number Placeholder 5">
             <a:extLst>
               <a:ext uri="{FF2B5EF4-FFF2-40B4-BE49-F238E27FC236}">
-                <a16:creationId xmlns="" xmlns:a16="http://schemas.microsoft.com/office/drawing/2014/main" id="{7DCAD73E-CAB3-4BA7-905E-D203691D0418}"/>
+                <a16:creationId xmlns:a16="http://schemas.microsoft.com/office/drawing/2014/main" xmlns="" id="{7DCAD73E-CAB3-4BA7-905E-D203691D0418}"/>
               </a:ext>
             </a:extLst>
           </p:cNvPr>
@@ -962,7 +962,7 @@
           <p:cNvPr id="2" name="Title 1">
             <a:extLst>
               <a:ext uri="{FF2B5EF4-FFF2-40B4-BE49-F238E27FC236}">
-                <a16:creationId xmlns="" xmlns:a16="http://schemas.microsoft.com/office/drawing/2014/main" id="{A9880706-F7FA-4EC3-A022-9D6C7CEC3692}"/>
+                <a16:creationId xmlns:a16="http://schemas.microsoft.com/office/drawing/2014/main" xmlns="" id="{A9880706-F7FA-4EC3-A022-9D6C7CEC3692}"/>
               </a:ext>
             </a:extLst>
           </p:cNvPr>
@@ -999,7 +999,7 @@
           <p:cNvPr id="3" name="Text Placeholder 2">
             <a:extLst>
               <a:ext uri="{FF2B5EF4-FFF2-40B4-BE49-F238E27FC236}">
-                <a16:creationId xmlns="" xmlns:a16="http://schemas.microsoft.com/office/drawing/2014/main" id="{FA8A65D0-3DF5-448D-82EC-A967682A0DED}"/>
+                <a16:creationId xmlns:a16="http://schemas.microsoft.com/office/drawing/2014/main" xmlns="" id="{FA8A65D0-3DF5-448D-82EC-A967682A0DED}"/>
               </a:ext>
             </a:extLst>
           </p:cNvPr>
@@ -1124,7 +1124,7 @@
           <p:cNvPr id="4" name="Date Placeholder 3">
             <a:extLst>
               <a:ext uri="{FF2B5EF4-FFF2-40B4-BE49-F238E27FC236}">
-                <a16:creationId xmlns="" xmlns:a16="http://schemas.microsoft.com/office/drawing/2014/main" id="{600EA68C-01A6-487D-9D6E-1D1B4EAC0440}"/>
+                <a16:creationId xmlns:a16="http://schemas.microsoft.com/office/drawing/2014/main" xmlns="" id="{600EA68C-01A6-487D-9D6E-1D1B4EAC0440}"/>
               </a:ext>
             </a:extLst>
           </p:cNvPr>
@@ -1142,7 +1142,7 @@
           <a:p>
             <a:fld id="{6C733091-19F0-4DD7-90FE-000B4789B4CF}" type="datetimeFigureOut">
               <a:rPr lang="en-US" smtClean="0"/>
-              <a:t>8/24/2021</a:t>
+              <a:t>8/25/2021</a:t>
             </a:fld>
             <a:endParaRPr lang="en-US"/>
           </a:p>
@@ -1153,7 +1153,7 @@
           <p:cNvPr id="5" name="Footer Placeholder 4">
             <a:extLst>
               <a:ext uri="{FF2B5EF4-FFF2-40B4-BE49-F238E27FC236}">
-                <a16:creationId xmlns="" xmlns:a16="http://schemas.microsoft.com/office/drawing/2014/main" id="{6E6527CB-4FFD-4569-A82C-5EDC311B2CF6}"/>
+                <a16:creationId xmlns:a16="http://schemas.microsoft.com/office/drawing/2014/main" xmlns="" id="{6E6527CB-4FFD-4569-A82C-5EDC311B2CF6}"/>
               </a:ext>
             </a:extLst>
           </p:cNvPr>
@@ -1178,7 +1178,7 @@
           <p:cNvPr id="6" name="Slide Number Placeholder 5">
             <a:extLst>
               <a:ext uri="{FF2B5EF4-FFF2-40B4-BE49-F238E27FC236}">
-                <a16:creationId xmlns="" xmlns:a16="http://schemas.microsoft.com/office/drawing/2014/main" id="{24B19E5B-5A98-4381-A01D-01F81FD65792}"/>
+                <a16:creationId xmlns:a16="http://schemas.microsoft.com/office/drawing/2014/main" xmlns="" id="{24B19E5B-5A98-4381-A01D-01F81FD65792}"/>
               </a:ext>
             </a:extLst>
           </p:cNvPr>
@@ -1237,7 +1237,7 @@
           <p:cNvPr id="2" name="Title 1">
             <a:extLst>
               <a:ext uri="{FF2B5EF4-FFF2-40B4-BE49-F238E27FC236}">
-                <a16:creationId xmlns="" xmlns:a16="http://schemas.microsoft.com/office/drawing/2014/main" id="{63228B71-E923-4431-B8D2-FAE724678940}"/>
+                <a16:creationId xmlns:a16="http://schemas.microsoft.com/office/drawing/2014/main" xmlns="" id="{63228B71-E923-4431-B8D2-FAE724678940}"/>
               </a:ext>
             </a:extLst>
           </p:cNvPr>
@@ -1265,7 +1265,7 @@
           <p:cNvPr id="3" name="Content Placeholder 2">
             <a:extLst>
               <a:ext uri="{FF2B5EF4-FFF2-40B4-BE49-F238E27FC236}">
-                <a16:creationId xmlns="" xmlns:a16="http://schemas.microsoft.com/office/drawing/2014/main" id="{B18895E9-B7FF-4A00-955B-206CF8C73E43}"/>
+                <a16:creationId xmlns:a16="http://schemas.microsoft.com/office/drawing/2014/main" xmlns="" id="{B18895E9-B7FF-4A00-955B-206CF8C73E43}"/>
               </a:ext>
             </a:extLst>
           </p:cNvPr>
@@ -1327,7 +1327,7 @@
           <p:cNvPr id="4" name="Content Placeholder 3">
             <a:extLst>
               <a:ext uri="{FF2B5EF4-FFF2-40B4-BE49-F238E27FC236}">
-                <a16:creationId xmlns="" xmlns:a16="http://schemas.microsoft.com/office/drawing/2014/main" id="{DA813955-E3B9-44BC-8E1D-139269C8B48A}"/>
+                <a16:creationId xmlns:a16="http://schemas.microsoft.com/office/drawing/2014/main" xmlns="" id="{DA813955-E3B9-44BC-8E1D-139269C8B48A}"/>
               </a:ext>
             </a:extLst>
           </p:cNvPr>
@@ -1389,7 +1389,7 @@
           <p:cNvPr id="5" name="Date Placeholder 4">
             <a:extLst>
               <a:ext uri="{FF2B5EF4-FFF2-40B4-BE49-F238E27FC236}">
-                <a16:creationId xmlns="" xmlns:a16="http://schemas.microsoft.com/office/drawing/2014/main" id="{7E9B8EF5-28D5-4C4E-A2AB-EEA30D75DAFE}"/>
+                <a16:creationId xmlns:a16="http://schemas.microsoft.com/office/drawing/2014/main" xmlns="" id="{7E9B8EF5-28D5-4C4E-A2AB-EEA30D75DAFE}"/>
               </a:ext>
             </a:extLst>
           </p:cNvPr>
@@ -1407,7 +1407,7 @@
           <a:p>
             <a:fld id="{6C733091-19F0-4DD7-90FE-000B4789B4CF}" type="datetimeFigureOut">
               <a:rPr lang="en-US" smtClean="0"/>
-              <a:t>8/24/2021</a:t>
+              <a:t>8/25/2021</a:t>
             </a:fld>
             <a:endParaRPr lang="en-US"/>
           </a:p>
@@ -1418,7 +1418,7 @@
           <p:cNvPr id="6" name="Footer Placeholder 5">
             <a:extLst>
               <a:ext uri="{FF2B5EF4-FFF2-40B4-BE49-F238E27FC236}">
-                <a16:creationId xmlns="" xmlns:a16="http://schemas.microsoft.com/office/drawing/2014/main" id="{5723E678-8CB4-4335-AA04-6BD391748717}"/>
+                <a16:creationId xmlns:a16="http://schemas.microsoft.com/office/drawing/2014/main" xmlns="" id="{5723E678-8CB4-4335-AA04-6BD391748717}"/>
               </a:ext>
             </a:extLst>
           </p:cNvPr>
@@ -1443,7 +1443,7 @@
           <p:cNvPr id="7" name="Slide Number Placeholder 6">
             <a:extLst>
               <a:ext uri="{FF2B5EF4-FFF2-40B4-BE49-F238E27FC236}">
-                <a16:creationId xmlns="" xmlns:a16="http://schemas.microsoft.com/office/drawing/2014/main" id="{887B5567-9F4D-4AE1-92D8-769C9F7EA4F0}"/>
+                <a16:creationId xmlns:a16="http://schemas.microsoft.com/office/drawing/2014/main" xmlns="" id="{887B5567-9F4D-4AE1-92D8-769C9F7EA4F0}"/>
               </a:ext>
             </a:extLst>
           </p:cNvPr>
@@ -1502,7 +1502,7 @@
           <p:cNvPr id="2" name="Title 1">
             <a:extLst>
               <a:ext uri="{FF2B5EF4-FFF2-40B4-BE49-F238E27FC236}">
-                <a16:creationId xmlns="" xmlns:a16="http://schemas.microsoft.com/office/drawing/2014/main" id="{A40320A9-7C0C-45B4-BF2B-3B53B5686EBB}"/>
+                <a16:creationId xmlns:a16="http://schemas.microsoft.com/office/drawing/2014/main" xmlns="" id="{A40320A9-7C0C-45B4-BF2B-3B53B5686EBB}"/>
               </a:ext>
             </a:extLst>
           </p:cNvPr>
@@ -1535,7 +1535,7 @@
           <p:cNvPr id="3" name="Text Placeholder 2">
             <a:extLst>
               <a:ext uri="{FF2B5EF4-FFF2-40B4-BE49-F238E27FC236}">
-                <a16:creationId xmlns="" xmlns:a16="http://schemas.microsoft.com/office/drawing/2014/main" id="{8C440DE1-7DD6-4B1C-B961-CD2079B51F03}"/>
+                <a16:creationId xmlns:a16="http://schemas.microsoft.com/office/drawing/2014/main" xmlns="" id="{8C440DE1-7DD6-4B1C-B961-CD2079B51F03}"/>
               </a:ext>
             </a:extLst>
           </p:cNvPr>
@@ -1606,7 +1606,7 @@
           <p:cNvPr id="4" name="Content Placeholder 3">
             <a:extLst>
               <a:ext uri="{FF2B5EF4-FFF2-40B4-BE49-F238E27FC236}">
-                <a16:creationId xmlns="" xmlns:a16="http://schemas.microsoft.com/office/drawing/2014/main" id="{6FAFE840-CC9A-4D89-B05F-159EF756B427}"/>
+                <a16:creationId xmlns:a16="http://schemas.microsoft.com/office/drawing/2014/main" xmlns="" id="{6FAFE840-CC9A-4D89-B05F-159EF756B427}"/>
               </a:ext>
             </a:extLst>
           </p:cNvPr>
@@ -1668,7 +1668,7 @@
           <p:cNvPr id="5" name="Text Placeholder 4">
             <a:extLst>
               <a:ext uri="{FF2B5EF4-FFF2-40B4-BE49-F238E27FC236}">
-                <a16:creationId xmlns="" xmlns:a16="http://schemas.microsoft.com/office/drawing/2014/main" id="{4B87AADC-3401-48C6-98F6-0AB60F6DF9BE}"/>
+                <a16:creationId xmlns:a16="http://schemas.microsoft.com/office/drawing/2014/main" xmlns="" id="{4B87AADC-3401-48C6-98F6-0AB60F6DF9BE}"/>
               </a:ext>
             </a:extLst>
           </p:cNvPr>
@@ -1739,7 +1739,7 @@
           <p:cNvPr id="6" name="Content Placeholder 5">
             <a:extLst>
               <a:ext uri="{FF2B5EF4-FFF2-40B4-BE49-F238E27FC236}">
-                <a16:creationId xmlns="" xmlns:a16="http://schemas.microsoft.com/office/drawing/2014/main" id="{34BCF1A4-FB52-4DCD-80BC-324BA41C33CD}"/>
+                <a16:creationId xmlns:a16="http://schemas.microsoft.com/office/drawing/2014/main" xmlns="" id="{34BCF1A4-FB52-4DCD-80BC-324BA41C33CD}"/>
               </a:ext>
             </a:extLst>
           </p:cNvPr>
@@ -1801,7 +1801,7 @@
           <p:cNvPr id="7" name="Date Placeholder 6">
             <a:extLst>
               <a:ext uri="{FF2B5EF4-FFF2-40B4-BE49-F238E27FC236}">
-                <a16:creationId xmlns="" xmlns:a16="http://schemas.microsoft.com/office/drawing/2014/main" id="{8CFD4208-60E7-48B1-8CD0-717D5E26B827}"/>
+                <a16:creationId xmlns:a16="http://schemas.microsoft.com/office/drawing/2014/main" xmlns="" id="{8CFD4208-60E7-48B1-8CD0-717D5E26B827}"/>
               </a:ext>
             </a:extLst>
           </p:cNvPr>
@@ -1819,7 +1819,7 @@
           <a:p>
             <a:fld id="{6C733091-19F0-4DD7-90FE-000B4789B4CF}" type="datetimeFigureOut">
               <a:rPr lang="en-US" smtClean="0"/>
-              <a:t>8/24/2021</a:t>
+              <a:t>8/25/2021</a:t>
             </a:fld>
             <a:endParaRPr lang="en-US"/>
           </a:p>
@@ -1830,7 +1830,7 @@
           <p:cNvPr id="8" name="Footer Placeholder 7">
             <a:extLst>
               <a:ext uri="{FF2B5EF4-FFF2-40B4-BE49-F238E27FC236}">
-                <a16:creationId xmlns="" xmlns:a16="http://schemas.microsoft.com/office/drawing/2014/main" id="{94E429D1-BEB1-4D8A-91F2-CD4F80157F8D}"/>
+                <a16:creationId xmlns:a16="http://schemas.microsoft.com/office/drawing/2014/main" xmlns="" id="{94E429D1-BEB1-4D8A-91F2-CD4F80157F8D}"/>
               </a:ext>
             </a:extLst>
           </p:cNvPr>
@@ -1855,7 +1855,7 @@
           <p:cNvPr id="9" name="Slide Number Placeholder 8">
             <a:extLst>
               <a:ext uri="{FF2B5EF4-FFF2-40B4-BE49-F238E27FC236}">
-                <a16:creationId xmlns="" xmlns:a16="http://schemas.microsoft.com/office/drawing/2014/main" id="{6F17C19C-8370-4118-A8FC-5DDA6F84230F}"/>
+                <a16:creationId xmlns:a16="http://schemas.microsoft.com/office/drawing/2014/main" xmlns="" id="{6F17C19C-8370-4118-A8FC-5DDA6F84230F}"/>
               </a:ext>
             </a:extLst>
           </p:cNvPr>
@@ -1914,7 +1914,7 @@
           <p:cNvPr id="2" name="Title 1">
             <a:extLst>
               <a:ext uri="{FF2B5EF4-FFF2-40B4-BE49-F238E27FC236}">
-                <a16:creationId xmlns="" xmlns:a16="http://schemas.microsoft.com/office/drawing/2014/main" id="{252CBF36-7F99-45A9-BC35-BD2EC260CBF0}"/>
+                <a16:creationId xmlns:a16="http://schemas.microsoft.com/office/drawing/2014/main" xmlns="" id="{252CBF36-7F99-45A9-BC35-BD2EC260CBF0}"/>
               </a:ext>
             </a:extLst>
           </p:cNvPr>
@@ -1942,7 +1942,7 @@
           <p:cNvPr id="3" name="Date Placeholder 2">
             <a:extLst>
               <a:ext uri="{FF2B5EF4-FFF2-40B4-BE49-F238E27FC236}">
-                <a16:creationId xmlns="" xmlns:a16="http://schemas.microsoft.com/office/drawing/2014/main" id="{0D6F5F83-F07E-4501-B86B-9F96CD43993C}"/>
+                <a16:creationId xmlns:a16="http://schemas.microsoft.com/office/drawing/2014/main" xmlns="" id="{0D6F5F83-F07E-4501-B86B-9F96CD43993C}"/>
               </a:ext>
             </a:extLst>
           </p:cNvPr>
@@ -1960,7 +1960,7 @@
           <a:p>
             <a:fld id="{6C733091-19F0-4DD7-90FE-000B4789B4CF}" type="datetimeFigureOut">
               <a:rPr lang="en-US" smtClean="0"/>
-              <a:t>8/24/2021</a:t>
+              <a:t>8/25/2021</a:t>
             </a:fld>
             <a:endParaRPr lang="en-US"/>
           </a:p>
@@ -1971,7 +1971,7 @@
           <p:cNvPr id="4" name="Footer Placeholder 3">
             <a:extLst>
               <a:ext uri="{FF2B5EF4-FFF2-40B4-BE49-F238E27FC236}">
-                <a16:creationId xmlns="" xmlns:a16="http://schemas.microsoft.com/office/drawing/2014/main" id="{2861989B-F8E9-41FD-8E16-687424BCC266}"/>
+                <a16:creationId xmlns:a16="http://schemas.microsoft.com/office/drawing/2014/main" xmlns="" id="{2861989B-F8E9-41FD-8E16-687424BCC266}"/>
               </a:ext>
             </a:extLst>
           </p:cNvPr>
@@ -1996,7 +1996,7 @@
           <p:cNvPr id="5" name="Slide Number Placeholder 4">
             <a:extLst>
               <a:ext uri="{FF2B5EF4-FFF2-40B4-BE49-F238E27FC236}">
-                <a16:creationId xmlns="" xmlns:a16="http://schemas.microsoft.com/office/drawing/2014/main" id="{2026B6D7-7832-4815-95CE-5CEC39502825}"/>
+                <a16:creationId xmlns:a16="http://schemas.microsoft.com/office/drawing/2014/main" xmlns="" id="{2026B6D7-7832-4815-95CE-5CEC39502825}"/>
               </a:ext>
             </a:extLst>
           </p:cNvPr>
@@ -2055,7 +2055,7 @@
           <p:cNvPr id="2" name="Date Placeholder 1">
             <a:extLst>
               <a:ext uri="{FF2B5EF4-FFF2-40B4-BE49-F238E27FC236}">
-                <a16:creationId xmlns="" xmlns:a16="http://schemas.microsoft.com/office/drawing/2014/main" id="{9877919A-C4B6-46FD-A08A-9A4B867FE01A}"/>
+                <a16:creationId xmlns:a16="http://schemas.microsoft.com/office/drawing/2014/main" xmlns="" id="{9877919A-C4B6-46FD-A08A-9A4B867FE01A}"/>
               </a:ext>
             </a:extLst>
           </p:cNvPr>
@@ -2073,7 +2073,7 @@
           <a:p>
             <a:fld id="{6C733091-19F0-4DD7-90FE-000B4789B4CF}" type="datetimeFigureOut">
               <a:rPr lang="en-US" smtClean="0"/>
-              <a:t>8/24/2021</a:t>
+              <a:t>8/25/2021</a:t>
             </a:fld>
             <a:endParaRPr lang="en-US"/>
           </a:p>
@@ -2084,7 +2084,7 @@
           <p:cNvPr id="3" name="Footer Placeholder 2">
             <a:extLst>
               <a:ext uri="{FF2B5EF4-FFF2-40B4-BE49-F238E27FC236}">
-                <a16:creationId xmlns="" xmlns:a16="http://schemas.microsoft.com/office/drawing/2014/main" id="{9118539E-383C-4F1C-86F2-14C533A7E9FB}"/>
+                <a16:creationId xmlns:a16="http://schemas.microsoft.com/office/drawing/2014/main" xmlns="" id="{9118539E-383C-4F1C-86F2-14C533A7E9FB}"/>
               </a:ext>
             </a:extLst>
           </p:cNvPr>
@@ -2109,7 +2109,7 @@
           <p:cNvPr id="4" name="Slide Number Placeholder 3">
             <a:extLst>
               <a:ext uri="{FF2B5EF4-FFF2-40B4-BE49-F238E27FC236}">
-                <a16:creationId xmlns="" xmlns:a16="http://schemas.microsoft.com/office/drawing/2014/main" id="{C9A6D4E1-CA83-4214-9942-9E4617AA89BF}"/>
+                <a16:creationId xmlns:a16="http://schemas.microsoft.com/office/drawing/2014/main" xmlns="" id="{C9A6D4E1-CA83-4214-9942-9E4617AA89BF}"/>
               </a:ext>
             </a:extLst>
           </p:cNvPr>
@@ -2168,7 +2168,7 @@
           <p:cNvPr id="2" name="Title 1">
             <a:extLst>
               <a:ext uri="{FF2B5EF4-FFF2-40B4-BE49-F238E27FC236}">
-                <a16:creationId xmlns="" xmlns:a16="http://schemas.microsoft.com/office/drawing/2014/main" id="{046EF9B5-7A2A-4225-8817-86D028D6950C}"/>
+                <a16:creationId xmlns:a16="http://schemas.microsoft.com/office/drawing/2014/main" xmlns="" id="{046EF9B5-7A2A-4225-8817-86D028D6950C}"/>
               </a:ext>
             </a:extLst>
           </p:cNvPr>
@@ -2205,7 +2205,7 @@
           <p:cNvPr id="3" name="Content Placeholder 2">
             <a:extLst>
               <a:ext uri="{FF2B5EF4-FFF2-40B4-BE49-F238E27FC236}">
-                <a16:creationId xmlns="" xmlns:a16="http://schemas.microsoft.com/office/drawing/2014/main" id="{8667C390-5297-41E8-A403-22856007B051}"/>
+                <a16:creationId xmlns:a16="http://schemas.microsoft.com/office/drawing/2014/main" xmlns="" id="{8667C390-5297-41E8-A403-22856007B051}"/>
               </a:ext>
             </a:extLst>
           </p:cNvPr>
@@ -2295,7 +2295,7 @@
           <p:cNvPr id="4" name="Text Placeholder 3">
             <a:extLst>
               <a:ext uri="{FF2B5EF4-FFF2-40B4-BE49-F238E27FC236}">
-                <a16:creationId xmlns="" xmlns:a16="http://schemas.microsoft.com/office/drawing/2014/main" id="{8D0D2F7D-D6CD-4AB1-A3EA-CBFD2A2B3703}"/>
+                <a16:creationId xmlns:a16="http://schemas.microsoft.com/office/drawing/2014/main" xmlns="" id="{8D0D2F7D-D6CD-4AB1-A3EA-CBFD2A2B3703}"/>
               </a:ext>
             </a:extLst>
           </p:cNvPr>
@@ -2366,7 +2366,7 @@
           <p:cNvPr id="5" name="Date Placeholder 4">
             <a:extLst>
               <a:ext uri="{FF2B5EF4-FFF2-40B4-BE49-F238E27FC236}">
-                <a16:creationId xmlns="" xmlns:a16="http://schemas.microsoft.com/office/drawing/2014/main" id="{E17A441D-4FA7-4110-BF24-165CD3C3DAD7}"/>
+                <a16:creationId xmlns:a16="http://schemas.microsoft.com/office/drawing/2014/main" xmlns="" id="{E17A441D-4FA7-4110-BF24-165CD3C3DAD7}"/>
               </a:ext>
             </a:extLst>
           </p:cNvPr>
@@ -2384,7 +2384,7 @@
           <a:p>
             <a:fld id="{6C733091-19F0-4DD7-90FE-000B4789B4CF}" type="datetimeFigureOut">
               <a:rPr lang="en-US" smtClean="0"/>
-              <a:t>8/24/2021</a:t>
+              <a:t>8/25/2021</a:t>
             </a:fld>
             <a:endParaRPr lang="en-US"/>
           </a:p>
@@ -2395,7 +2395,7 @@
           <p:cNvPr id="6" name="Footer Placeholder 5">
             <a:extLst>
               <a:ext uri="{FF2B5EF4-FFF2-40B4-BE49-F238E27FC236}">
-                <a16:creationId xmlns="" xmlns:a16="http://schemas.microsoft.com/office/drawing/2014/main" id="{346102C5-5AE3-43CF-A686-1AB72B0790AB}"/>
+                <a16:creationId xmlns:a16="http://schemas.microsoft.com/office/drawing/2014/main" xmlns="" id="{346102C5-5AE3-43CF-A686-1AB72B0790AB}"/>
               </a:ext>
             </a:extLst>
           </p:cNvPr>
@@ -2420,7 +2420,7 @@
           <p:cNvPr id="7" name="Slide Number Placeholder 6">
             <a:extLst>
               <a:ext uri="{FF2B5EF4-FFF2-40B4-BE49-F238E27FC236}">
-                <a16:creationId xmlns="" xmlns:a16="http://schemas.microsoft.com/office/drawing/2014/main" id="{5528B3F7-462C-4500-8836-B3E5CD8DA61A}"/>
+                <a16:creationId xmlns:a16="http://schemas.microsoft.com/office/drawing/2014/main" xmlns="" id="{5528B3F7-462C-4500-8836-B3E5CD8DA61A}"/>
               </a:ext>
             </a:extLst>
           </p:cNvPr>
@@ -2479,7 +2479,7 @@
           <p:cNvPr id="2" name="Title 1">
             <a:extLst>
               <a:ext uri="{FF2B5EF4-FFF2-40B4-BE49-F238E27FC236}">
-                <a16:creationId xmlns="" xmlns:a16="http://schemas.microsoft.com/office/drawing/2014/main" id="{4BA10E59-DA48-4690-A956-9EB8E4E11EE5}"/>
+                <a16:creationId xmlns:a16="http://schemas.microsoft.com/office/drawing/2014/main" xmlns="" id="{4BA10E59-DA48-4690-A956-9EB8E4E11EE5}"/>
               </a:ext>
             </a:extLst>
           </p:cNvPr>
@@ -2516,7 +2516,7 @@
           <p:cNvPr id="3" name="Picture Placeholder 2">
             <a:extLst>
               <a:ext uri="{FF2B5EF4-FFF2-40B4-BE49-F238E27FC236}">
-                <a16:creationId xmlns="" xmlns:a16="http://schemas.microsoft.com/office/drawing/2014/main" id="{AC7AFE1E-67D1-4106-97CA-98302D42CC4D}"/>
+                <a16:creationId xmlns:a16="http://schemas.microsoft.com/office/drawing/2014/main" xmlns="" id="{AC7AFE1E-67D1-4106-97CA-98302D42CC4D}"/>
               </a:ext>
             </a:extLst>
           </p:cNvPr>
@@ -2583,7 +2583,7 @@
           <p:cNvPr id="4" name="Text Placeholder 3">
             <a:extLst>
               <a:ext uri="{FF2B5EF4-FFF2-40B4-BE49-F238E27FC236}">
-                <a16:creationId xmlns="" xmlns:a16="http://schemas.microsoft.com/office/drawing/2014/main" id="{67D8D73B-3D4D-42A7-9A3C-1D508E8A9B45}"/>
+                <a16:creationId xmlns:a16="http://schemas.microsoft.com/office/drawing/2014/main" xmlns="" id="{67D8D73B-3D4D-42A7-9A3C-1D508E8A9B45}"/>
               </a:ext>
             </a:extLst>
           </p:cNvPr>
@@ -2654,7 +2654,7 @@
           <p:cNvPr id="5" name="Date Placeholder 4">
             <a:extLst>
               <a:ext uri="{FF2B5EF4-FFF2-40B4-BE49-F238E27FC236}">
-                <a16:creationId xmlns="" xmlns:a16="http://schemas.microsoft.com/office/drawing/2014/main" id="{48C8945E-A47A-42A2-9DF6-CA6D5002F65F}"/>
+                <a16:creationId xmlns:a16="http://schemas.microsoft.com/office/drawing/2014/main" xmlns="" id="{48C8945E-A47A-42A2-9DF6-CA6D5002F65F}"/>
               </a:ext>
             </a:extLst>
           </p:cNvPr>
@@ -2672,7 +2672,7 @@
           <a:p>
             <a:fld id="{6C733091-19F0-4DD7-90FE-000B4789B4CF}" type="datetimeFigureOut">
               <a:rPr lang="en-US" smtClean="0"/>
-              <a:t>8/24/2021</a:t>
+              <a:t>8/25/2021</a:t>
             </a:fld>
             <a:endParaRPr lang="en-US"/>
           </a:p>
@@ -2683,7 +2683,7 @@
           <p:cNvPr id="6" name="Footer Placeholder 5">
             <a:extLst>
               <a:ext uri="{FF2B5EF4-FFF2-40B4-BE49-F238E27FC236}">
-                <a16:creationId xmlns="" xmlns:a16="http://schemas.microsoft.com/office/drawing/2014/main" id="{EB000DB4-2747-4297-B400-42A539FBDB42}"/>
+                <a16:creationId xmlns:a16="http://schemas.microsoft.com/office/drawing/2014/main" xmlns="" id="{EB000DB4-2747-4297-B400-42A539FBDB42}"/>
               </a:ext>
             </a:extLst>
           </p:cNvPr>
@@ -2708,7 +2708,7 @@
           <p:cNvPr id="7" name="Slide Number Placeholder 6">
             <a:extLst>
               <a:ext uri="{FF2B5EF4-FFF2-40B4-BE49-F238E27FC236}">
-                <a16:creationId xmlns="" xmlns:a16="http://schemas.microsoft.com/office/drawing/2014/main" id="{5BAD9222-F141-4803-AF73-E2DD92E2ABBC}"/>
+                <a16:creationId xmlns:a16="http://schemas.microsoft.com/office/drawing/2014/main" xmlns="" id="{5BAD9222-F141-4803-AF73-E2DD92E2ABBC}"/>
               </a:ext>
             </a:extLst>
           </p:cNvPr>
@@ -2772,7 +2772,7 @@
           <p:cNvPr id="2" name="Title Placeholder 1">
             <a:extLst>
               <a:ext uri="{FF2B5EF4-FFF2-40B4-BE49-F238E27FC236}">
-                <a16:creationId xmlns="" xmlns:a16="http://schemas.microsoft.com/office/drawing/2014/main" id="{5BF9D404-795C-4EA4-AD01-26740519239C}"/>
+                <a16:creationId xmlns:a16="http://schemas.microsoft.com/office/drawing/2014/main" xmlns="" id="{5BF9D404-795C-4EA4-AD01-26740519239C}"/>
               </a:ext>
             </a:extLst>
           </p:cNvPr>
@@ -2810,7 +2810,7 @@
           <p:cNvPr id="3" name="Text Placeholder 2">
             <a:extLst>
               <a:ext uri="{FF2B5EF4-FFF2-40B4-BE49-F238E27FC236}">
-                <a16:creationId xmlns="" xmlns:a16="http://schemas.microsoft.com/office/drawing/2014/main" id="{DE3FEC7B-48F8-4348-9BC6-68F83B859EE9}"/>
+                <a16:creationId xmlns:a16="http://schemas.microsoft.com/office/drawing/2014/main" xmlns="" id="{DE3FEC7B-48F8-4348-9BC6-68F83B859EE9}"/>
               </a:ext>
             </a:extLst>
           </p:cNvPr>
@@ -2877,7 +2877,7 @@
           <p:cNvPr id="4" name="Date Placeholder 3">
             <a:extLst>
               <a:ext uri="{FF2B5EF4-FFF2-40B4-BE49-F238E27FC236}">
-                <a16:creationId xmlns="" xmlns:a16="http://schemas.microsoft.com/office/drawing/2014/main" id="{31CA1A1D-E2F5-4161-A025-7B911965C2FE}"/>
+                <a16:creationId xmlns:a16="http://schemas.microsoft.com/office/drawing/2014/main" xmlns="" id="{31CA1A1D-E2F5-4161-A025-7B911965C2FE}"/>
               </a:ext>
             </a:extLst>
           </p:cNvPr>
@@ -2913,7 +2913,7 @@
           <a:p>
             <a:fld id="{6C733091-19F0-4DD7-90FE-000B4789B4CF}" type="datetimeFigureOut">
               <a:rPr lang="en-US" smtClean="0"/>
-              <a:t>8/24/2021</a:t>
+              <a:t>8/25/2021</a:t>
             </a:fld>
             <a:endParaRPr lang="en-US"/>
           </a:p>
@@ -2924,7 +2924,7 @@
           <p:cNvPr id="5" name="Footer Placeholder 4">
             <a:extLst>
               <a:ext uri="{FF2B5EF4-FFF2-40B4-BE49-F238E27FC236}">
-                <a16:creationId xmlns="" xmlns:a16="http://schemas.microsoft.com/office/drawing/2014/main" id="{43C7B926-18F3-4C13-AB92-764E10D324FB}"/>
+                <a16:creationId xmlns:a16="http://schemas.microsoft.com/office/drawing/2014/main" xmlns="" id="{43C7B926-18F3-4C13-AB92-764E10D324FB}"/>
               </a:ext>
             </a:extLst>
           </p:cNvPr>
@@ -2967,7 +2967,7 @@
           <p:cNvPr id="6" name="Slide Number Placeholder 5">
             <a:extLst>
               <a:ext uri="{FF2B5EF4-FFF2-40B4-BE49-F238E27FC236}">
-                <a16:creationId xmlns="" xmlns:a16="http://schemas.microsoft.com/office/drawing/2014/main" id="{734FA846-3BF6-46FD-80CF-34B300D244C0}"/>
+                <a16:creationId xmlns:a16="http://schemas.microsoft.com/office/drawing/2014/main" xmlns="" id="{734FA846-3BF6-46FD-80CF-34B300D244C0}"/>
               </a:ext>
             </a:extLst>
           </p:cNvPr>
@@ -3553,15 +3553,7 @@
             </a:pPr>
             <a:r>
               <a:rPr lang="en-US" dirty="0" smtClean="0"/>
-              <a:t>Login and </a:t>
-            </a:r>
-            <a:r>
-              <a:rPr lang="en-US" dirty="0" smtClean="0"/>
-              <a:t>Reimbursement </a:t>
-            </a:r>
-            <a:r>
-              <a:rPr lang="en-US" dirty="0" smtClean="0"/>
-              <a:t>endpoints</a:t>
+              <a:t>Login and Reimbursement endpoints</a:t>
             </a:r>
             <a:endParaRPr lang="en-US" b="1" dirty="0"/>
           </a:p>
@@ -3802,7 +3794,7 @@
           <p:cNvPr id="53" name="TextBox 52">
             <a:extLst>
               <a:ext uri="{FF2B5EF4-FFF2-40B4-BE49-F238E27FC236}">
-                <a16:creationId xmlns="" xmlns:a16="http://schemas.microsoft.com/office/drawing/2014/main" id="{CFFD1938-4192-486E-9D53-D9784518AD14}"/>
+                <a16:creationId xmlns:a16="http://schemas.microsoft.com/office/drawing/2014/main" xmlns="" id="{CFFD1938-4192-486E-9D53-D9784518AD14}"/>
               </a:ext>
             </a:extLst>
           </p:cNvPr>
@@ -3812,7 +3804,7 @@
         <p:spPr>
           <a:xfrm>
             <a:off x="111945" y="9881"/>
-            <a:ext cx="4944934" cy="369332"/>
+            <a:ext cx="3784975" cy="369332"/>
           </a:xfrm>
           <a:prstGeom prst="rect">
             <a:avLst/>
@@ -3837,7 +3829,7 @@
           <p:cNvPr id="2" name="Rectangle 1">
             <a:extLst>
               <a:ext uri="{FF2B5EF4-FFF2-40B4-BE49-F238E27FC236}">
-                <a16:creationId xmlns="" xmlns:a16="http://schemas.microsoft.com/office/drawing/2014/main" id="{AA0ED7A8-1532-4365-90ED-3F304B8440CE}"/>
+                <a16:creationId xmlns:a16="http://schemas.microsoft.com/office/drawing/2014/main" xmlns="" id="{AA0ED7A8-1532-4365-90ED-3F304B8440CE}"/>
               </a:ext>
             </a:extLst>
           </p:cNvPr>
@@ -3846,7 +3838,7 @@
         </p:nvSpPr>
         <p:spPr>
           <a:xfrm>
-            <a:off x="4608883" y="896012"/>
+            <a:off x="4581506" y="1132109"/>
             <a:ext cx="1690777" cy="1061049"/>
           </a:xfrm>
           <a:prstGeom prst="rect">
@@ -3896,7 +3888,7 @@
           <p:cNvPr id="4" name="Rectangle 3">
             <a:extLst>
               <a:ext uri="{FF2B5EF4-FFF2-40B4-BE49-F238E27FC236}">
-                <a16:creationId xmlns="" xmlns:a16="http://schemas.microsoft.com/office/drawing/2014/main" id="{21B869D6-66CB-4B38-975F-B7FEB6AA9B13}"/>
+                <a16:creationId xmlns:a16="http://schemas.microsoft.com/office/drawing/2014/main" xmlns="" id="{21B869D6-66CB-4B38-975F-B7FEB6AA9B13}"/>
               </a:ext>
             </a:extLst>
           </p:cNvPr>
@@ -4036,7 +4028,7 @@
           <p:cNvPr id="7" name="TextBox 6">
             <a:extLst>
               <a:ext uri="{FF2B5EF4-FFF2-40B4-BE49-F238E27FC236}">
-                <a16:creationId xmlns="" xmlns:a16="http://schemas.microsoft.com/office/drawing/2014/main" id="{E0BBD6C8-C8F2-40C5-AA64-85961A11ADC2}"/>
+                <a16:creationId xmlns:a16="http://schemas.microsoft.com/office/drawing/2014/main" xmlns="" id="{E0BBD6C8-C8F2-40C5-AA64-85961A11ADC2}"/>
               </a:ext>
             </a:extLst>
           </p:cNvPr>
@@ -4112,9 +4104,9 @@
           <p:nvPr/>
         </p:nvCxnSpPr>
         <p:spPr>
-          <a:xfrm flipH="1">
-            <a:off x="5439859" y="1957061"/>
-            <a:ext cx="14413" cy="1191815"/>
+          <a:xfrm>
+            <a:off x="5426895" y="2193158"/>
+            <a:ext cx="12964" cy="955718"/>
           </a:xfrm>
           <a:prstGeom prst="straightConnector1">
             <a:avLst/>
@@ -4148,9 +4140,9 @@
           <p:nvPr/>
         </p:nvCxnSpPr>
         <p:spPr>
-          <a:xfrm flipV="1">
-            <a:off x="5439859" y="1957061"/>
-            <a:ext cx="14413" cy="1191815"/>
+          <a:xfrm flipH="1" flipV="1">
+            <a:off x="5426895" y="2193158"/>
+            <a:ext cx="12964" cy="955718"/>
           </a:xfrm>
           <a:prstGeom prst="straightConnector1">
             <a:avLst/>
@@ -4179,7 +4171,7 @@
           <p:cNvPr id="16" name="Rectangle 15">
             <a:extLst>
               <a:ext uri="{FF2B5EF4-FFF2-40B4-BE49-F238E27FC236}">
-                <a16:creationId xmlns="" xmlns:a16="http://schemas.microsoft.com/office/drawing/2014/main" id="{AA0ED7A8-1532-4365-90ED-3F304B8440CE}"/>
+                <a16:creationId xmlns:a16="http://schemas.microsoft.com/office/drawing/2014/main" xmlns="" id="{AA0ED7A8-1532-4365-90ED-3F304B8440CE}"/>
               </a:ext>
             </a:extLst>
           </p:cNvPr>
@@ -4188,7 +4180,7 @@
         </p:nvSpPr>
         <p:spPr>
           <a:xfrm>
-            <a:off x="8364128" y="880707"/>
+            <a:off x="8336751" y="1116804"/>
             <a:ext cx="1690777" cy="1061049"/>
           </a:xfrm>
           <a:prstGeom prst="rect">
@@ -4239,7 +4231,7 @@
           <p:cNvPr id="17" name="Rectangle 16">
             <a:extLst>
               <a:ext uri="{FF2B5EF4-FFF2-40B4-BE49-F238E27FC236}">
-                <a16:creationId xmlns="" xmlns:a16="http://schemas.microsoft.com/office/drawing/2014/main" id="{AA0ED7A8-1532-4365-90ED-3F304B8440CE}"/>
+                <a16:creationId xmlns:a16="http://schemas.microsoft.com/office/drawing/2014/main" xmlns="" id="{AA0ED7A8-1532-4365-90ED-3F304B8440CE}"/>
               </a:ext>
             </a:extLst>
           </p:cNvPr>
@@ -4248,7 +4240,7 @@
         </p:nvSpPr>
         <p:spPr>
           <a:xfrm>
-            <a:off x="967855" y="896012"/>
+            <a:off x="940478" y="1132109"/>
             <a:ext cx="1690777" cy="1061049"/>
           </a:xfrm>
           <a:prstGeom prst="rect">
@@ -4304,7 +4296,7 @@
         </p:nvCxnSpPr>
         <p:spPr>
           <a:xfrm flipV="1">
-            <a:off x="6299660" y="1411232"/>
+            <a:off x="6272283" y="1647329"/>
             <a:ext cx="2064468" cy="15305"/>
           </a:xfrm>
           <a:prstGeom prst="straightConnector1">
@@ -4334,7 +4326,7 @@
           <p:cNvPr id="20" name="TextBox 19">
             <a:extLst>
               <a:ext uri="{FF2B5EF4-FFF2-40B4-BE49-F238E27FC236}">
-                <a16:creationId xmlns="" xmlns:a16="http://schemas.microsoft.com/office/drawing/2014/main" id="{E0BBD6C8-C8F2-40C5-AA64-85961A11ADC2}"/>
+                <a16:creationId xmlns:a16="http://schemas.microsoft.com/office/drawing/2014/main" xmlns="" id="{E0BBD6C8-C8F2-40C5-AA64-85961A11ADC2}"/>
               </a:ext>
             </a:extLst>
           </p:cNvPr>
@@ -4343,7 +4335,7 @@
         </p:nvSpPr>
         <p:spPr>
           <a:xfrm>
-            <a:off x="4918401" y="2137470"/>
+            <a:off x="4981251" y="2489530"/>
             <a:ext cx="542221" cy="276999"/>
           </a:xfrm>
           <a:prstGeom prst="rect">
@@ -4370,7 +4362,7 @@
           <p:cNvPr id="21" name="TextBox 20">
             <a:extLst>
               <a:ext uri="{FF2B5EF4-FFF2-40B4-BE49-F238E27FC236}">
-                <a16:creationId xmlns="" xmlns:a16="http://schemas.microsoft.com/office/drawing/2014/main" id="{E0BBD6C8-C8F2-40C5-AA64-85961A11ADC2}"/>
+                <a16:creationId xmlns:a16="http://schemas.microsoft.com/office/drawing/2014/main" xmlns="" id="{E0BBD6C8-C8F2-40C5-AA64-85961A11ADC2}"/>
               </a:ext>
             </a:extLst>
           </p:cNvPr>
@@ -4379,7 +4371,7 @@
         </p:nvSpPr>
         <p:spPr>
           <a:xfrm>
-            <a:off x="6438722" y="1134232"/>
+            <a:off x="6411345" y="1370329"/>
             <a:ext cx="953133" cy="276999"/>
           </a:xfrm>
           <a:prstGeom prst="rect">
@@ -4412,7 +4404,7 @@
         </p:nvCxnSpPr>
         <p:spPr>
           <a:xfrm rot="16200000" flipH="1" flipV="1">
-            <a:off x="7324242" y="-989264"/>
+            <a:off x="7296865" y="-753167"/>
             <a:ext cx="15305" cy="3755245"/>
           </a:xfrm>
           <a:prstGeom prst="bentConnector3">
@@ -4444,7 +4436,7 @@
           <p:cNvPr id="24" name="TextBox 23">
             <a:extLst>
               <a:ext uri="{FF2B5EF4-FFF2-40B4-BE49-F238E27FC236}">
-                <a16:creationId xmlns="" xmlns:a16="http://schemas.microsoft.com/office/drawing/2014/main" id="{E0BBD6C8-C8F2-40C5-AA64-85961A11ADC2}"/>
+                <a16:creationId xmlns:a16="http://schemas.microsoft.com/office/drawing/2014/main" xmlns="" id="{E0BBD6C8-C8F2-40C5-AA64-85961A11ADC2}"/>
               </a:ext>
             </a:extLst>
           </p:cNvPr>
@@ -4453,8 +4445,8 @@
         </p:nvSpPr>
         <p:spPr>
           <a:xfrm>
-            <a:off x="7255336" y="411651"/>
-            <a:ext cx="843694" cy="461665"/>
+            <a:off x="6887911" y="653985"/>
+            <a:ext cx="1258988" cy="461665"/>
           </a:xfrm>
           <a:prstGeom prst="rect">
             <a:avLst/>
@@ -4469,7 +4461,17 @@
           <a:p>
             <a:r>
               <a:rPr lang="en-US" sz="1200" dirty="0" smtClean="0"/>
-              <a:t>session expired</a:t>
+              <a:t>session </a:t>
+            </a:r>
+            <a:r>
+              <a:rPr lang="en-US" sz="1200" dirty="0" smtClean="0"/>
+              <a:t>expired</a:t>
+            </a:r>
+          </a:p>
+          <a:p>
+            <a:r>
+              <a:rPr lang="en-US" sz="1200" dirty="0" smtClean="0"/>
+              <a:t>logout</a:t>
             </a:r>
             <a:endParaRPr lang="en-US" sz="1200" dirty="0"/>
           </a:p>
@@ -4486,7 +4488,7 @@
         </p:nvCxnSpPr>
         <p:spPr>
           <a:xfrm flipH="1">
-            <a:off x="2658632" y="1426537"/>
+            <a:off x="2631255" y="1662634"/>
             <a:ext cx="1950251" cy="0"/>
           </a:xfrm>
           <a:prstGeom prst="straightConnector1">
@@ -4522,7 +4524,7 @@
         </p:nvCxnSpPr>
         <p:spPr>
           <a:xfrm rot="5400000" flipH="1" flipV="1">
-            <a:off x="3633758" y="-924502"/>
+            <a:off x="3606381" y="-688405"/>
             <a:ext cx="12700" cy="3641028"/>
           </a:xfrm>
           <a:prstGeom prst="bentConnector3">
@@ -4554,7 +4556,7 @@
           <p:cNvPr id="29" name="TextBox 28">
             <a:extLst>
               <a:ext uri="{FF2B5EF4-FFF2-40B4-BE49-F238E27FC236}">
-                <a16:creationId xmlns="" xmlns:a16="http://schemas.microsoft.com/office/drawing/2014/main" id="{E0BBD6C8-C8F2-40C5-AA64-85961A11ADC2}"/>
+                <a16:creationId xmlns:a16="http://schemas.microsoft.com/office/drawing/2014/main" xmlns="" id="{E0BBD6C8-C8F2-40C5-AA64-85961A11ADC2}"/>
               </a:ext>
             </a:extLst>
           </p:cNvPr>
@@ -4563,8 +4565,8 @@
         </p:nvSpPr>
         <p:spPr>
           <a:xfrm>
-            <a:off x="3088524" y="440697"/>
-            <a:ext cx="843694" cy="461665"/>
+            <a:off x="2891831" y="674296"/>
+            <a:ext cx="1182326" cy="461665"/>
           </a:xfrm>
           <a:prstGeom prst="rect">
             <a:avLst/>
@@ -4579,7 +4581,17 @@
           <a:p>
             <a:r>
               <a:rPr lang="en-US" sz="1200" dirty="0" smtClean="0"/>
-              <a:t>session expired</a:t>
+              <a:t>session </a:t>
+            </a:r>
+            <a:r>
+              <a:rPr lang="en-US" sz="1200" dirty="0" smtClean="0"/>
+              <a:t>expired</a:t>
+            </a:r>
+          </a:p>
+          <a:p>
+            <a:r>
+              <a:rPr lang="en-US" sz="1200" dirty="0" smtClean="0"/>
+              <a:t>logout</a:t>
             </a:r>
             <a:endParaRPr lang="en-US" sz="1200" dirty="0"/>
           </a:p>
@@ -4590,7 +4602,7 @@
           <p:cNvPr id="30" name="TextBox 29">
             <a:extLst>
               <a:ext uri="{FF2B5EF4-FFF2-40B4-BE49-F238E27FC236}">
-                <a16:creationId xmlns="" xmlns:a16="http://schemas.microsoft.com/office/drawing/2014/main" id="{E0BBD6C8-C8F2-40C5-AA64-85961A11ADC2}"/>
+                <a16:creationId xmlns:a16="http://schemas.microsoft.com/office/drawing/2014/main" xmlns="" id="{E0BBD6C8-C8F2-40C5-AA64-85961A11ADC2}"/>
               </a:ext>
             </a:extLst>
           </p:cNvPr>
@@ -4599,7 +4611,7 @@
         </p:nvSpPr>
         <p:spPr>
           <a:xfrm>
-            <a:off x="2935215" y="1198879"/>
+            <a:off x="2907838" y="1434976"/>
             <a:ext cx="953133" cy="461665"/>
           </a:xfrm>
           <a:prstGeom prst="rect">
@@ -4632,8 +4644,8 @@
         </p:nvCxnSpPr>
         <p:spPr>
           <a:xfrm flipH="1">
-            <a:off x="5439859" y="1411232"/>
-            <a:ext cx="2924269" cy="1737644"/>
+            <a:off x="5439859" y="1647329"/>
+            <a:ext cx="2896892" cy="1501547"/>
           </a:xfrm>
           <a:prstGeom prst="straightConnector1">
             <a:avLst/>
@@ -4668,8 +4680,8 @@
         </p:nvCxnSpPr>
         <p:spPr>
           <a:xfrm flipV="1">
-            <a:off x="5439859" y="1411232"/>
-            <a:ext cx="2924269" cy="1737644"/>
+            <a:off x="5439859" y="1647329"/>
+            <a:ext cx="2896892" cy="1501547"/>
           </a:xfrm>
           <a:prstGeom prst="straightConnector1">
             <a:avLst/>
@@ -4704,8 +4716,8 @@
         </p:nvCxnSpPr>
         <p:spPr>
           <a:xfrm>
-            <a:off x="1813244" y="1957061"/>
-            <a:ext cx="3626615" cy="1191815"/>
+            <a:off x="1785867" y="2193158"/>
+            <a:ext cx="3653992" cy="955718"/>
           </a:xfrm>
           <a:prstGeom prst="straightConnector1">
             <a:avLst/>
@@ -4734,7 +4746,7 @@
           <p:cNvPr id="26" name="TextBox 25">
             <a:extLst>
               <a:ext uri="{FF2B5EF4-FFF2-40B4-BE49-F238E27FC236}">
-                <a16:creationId xmlns="" xmlns:a16="http://schemas.microsoft.com/office/drawing/2014/main" id="{E0BBD6C8-C8F2-40C5-AA64-85961A11ADC2}"/>
+                <a16:creationId xmlns:a16="http://schemas.microsoft.com/office/drawing/2014/main" xmlns="" id="{E0BBD6C8-C8F2-40C5-AA64-85961A11ADC2}"/>
               </a:ext>
             </a:extLst>
           </p:cNvPr>
@@ -4743,7 +4755,7 @@
         </p:nvSpPr>
         <p:spPr>
           <a:xfrm>
-            <a:off x="2919800" y="1972367"/>
+            <a:off x="2939137" y="2324722"/>
             <a:ext cx="843694" cy="461665"/>
           </a:xfrm>
           <a:prstGeom prst="rect">
@@ -4770,7 +4782,7 @@
           <p:cNvPr id="28" name="TextBox 27">
             <a:extLst>
               <a:ext uri="{FF2B5EF4-FFF2-40B4-BE49-F238E27FC236}">
-                <a16:creationId xmlns="" xmlns:a16="http://schemas.microsoft.com/office/drawing/2014/main" id="{E0BBD6C8-C8F2-40C5-AA64-85961A11ADC2}"/>
+                <a16:creationId xmlns:a16="http://schemas.microsoft.com/office/drawing/2014/main" xmlns="" id="{E0BBD6C8-C8F2-40C5-AA64-85961A11ADC2}"/>
               </a:ext>
             </a:extLst>
           </p:cNvPr>
@@ -4779,7 +4791,7 @@
         </p:nvSpPr>
         <p:spPr>
           <a:xfrm>
-            <a:off x="6607483" y="1781722"/>
+            <a:off x="6578471" y="2202077"/>
             <a:ext cx="843694" cy="461665"/>
           </a:xfrm>
           <a:prstGeom prst="rect">
@@ -4849,11 +4861,7 @@
             <a:pPr algn="ctr"/>
             <a:r>
               <a:rPr lang="en-US" dirty="0" err="1" smtClean="0"/>
-              <a:t>Reimbursement</a:t>
-            </a:r>
-            <a:r>
-              <a:rPr lang="en-US" dirty="0" err="1" smtClean="0"/>
-              <a:t>Controller</a:t>
+              <a:t>ReimbursementController</a:t>
             </a:r>
             <a:endParaRPr lang="en-US" dirty="0"/>
           </a:p>
@@ -4925,8 +4933,8 @@
         </p:nvCxnSpPr>
         <p:spPr>
           <a:xfrm>
-            <a:off x="1813244" y="1957061"/>
-            <a:ext cx="771168" cy="1303958"/>
+            <a:off x="1785867" y="2193158"/>
+            <a:ext cx="798545" cy="1067861"/>
           </a:xfrm>
           <a:prstGeom prst="straightConnector1">
             <a:avLst/>
@@ -4961,8 +4969,8 @@
         </p:nvCxnSpPr>
         <p:spPr>
           <a:xfrm flipH="1">
-            <a:off x="8295305" y="1941756"/>
-            <a:ext cx="914212" cy="1319263"/>
+            <a:off x="8295305" y="2177853"/>
+            <a:ext cx="886835" cy="1083166"/>
           </a:xfrm>
           <a:prstGeom prst="straightConnector1">
             <a:avLst/>
@@ -5027,7 +5035,7 @@
           <p:cNvPr id="55" name="TextBox 54">
             <a:extLst>
               <a:ext uri="{FF2B5EF4-FFF2-40B4-BE49-F238E27FC236}">
-                <a16:creationId xmlns="" xmlns:a16="http://schemas.microsoft.com/office/drawing/2014/main" id="{E0BBD6C8-C8F2-40C5-AA64-85961A11ADC2}"/>
+                <a16:creationId xmlns:a16="http://schemas.microsoft.com/office/drawing/2014/main" xmlns="" id="{E0BBD6C8-C8F2-40C5-AA64-85961A11ADC2}"/>
               </a:ext>
             </a:extLst>
           </p:cNvPr>
@@ -5063,7 +5071,7 @@
           <p:cNvPr id="66" name="TextBox 65">
             <a:extLst>
               <a:ext uri="{FF2B5EF4-FFF2-40B4-BE49-F238E27FC236}">
-                <a16:creationId xmlns="" xmlns:a16="http://schemas.microsoft.com/office/drawing/2014/main" id="{E0BBD6C8-C8F2-40C5-AA64-85961A11ADC2}"/>
+                <a16:creationId xmlns:a16="http://schemas.microsoft.com/office/drawing/2014/main" xmlns="" id="{E0BBD6C8-C8F2-40C5-AA64-85961A11ADC2}"/>
               </a:ext>
             </a:extLst>
           </p:cNvPr>
@@ -5072,7 +5080,7 @@
         </p:nvSpPr>
         <p:spPr>
           <a:xfrm>
-            <a:off x="1028117" y="2538203"/>
+            <a:off x="1061598" y="2657293"/>
             <a:ext cx="1166958" cy="276999"/>
           </a:xfrm>
           <a:prstGeom prst="rect">
@@ -5099,7 +5107,7 @@
           <p:cNvPr id="67" name="TextBox 66">
             <a:extLst>
               <a:ext uri="{FF2B5EF4-FFF2-40B4-BE49-F238E27FC236}">
-                <a16:creationId xmlns="" xmlns:a16="http://schemas.microsoft.com/office/drawing/2014/main" id="{E0BBD6C8-C8F2-40C5-AA64-85961A11ADC2}"/>
+                <a16:creationId xmlns:a16="http://schemas.microsoft.com/office/drawing/2014/main" xmlns="" id="{E0BBD6C8-C8F2-40C5-AA64-85961A11ADC2}"/>
               </a:ext>
             </a:extLst>
           </p:cNvPr>
@@ -5108,7 +5116,7 @@
         </p:nvSpPr>
         <p:spPr>
           <a:xfrm>
-            <a:off x="8752411" y="2472280"/>
+            <a:off x="8738722" y="2555555"/>
             <a:ext cx="1166958" cy="276999"/>
           </a:xfrm>
           <a:prstGeom prst="rect">
@@ -5171,7 +5179,7 @@
           <p:cNvPr id="70" name="TextBox 69">
             <a:extLst>
               <a:ext uri="{FF2B5EF4-FFF2-40B4-BE49-F238E27FC236}">
-                <a16:creationId xmlns="" xmlns:a16="http://schemas.microsoft.com/office/drawing/2014/main" id="{E0BBD6C8-C8F2-40C5-AA64-85961A11ADC2}"/>
+                <a16:creationId xmlns:a16="http://schemas.microsoft.com/office/drawing/2014/main" xmlns="" id="{E0BBD6C8-C8F2-40C5-AA64-85961A11ADC2}"/>
               </a:ext>
             </a:extLst>
           </p:cNvPr>
@@ -5242,7 +5250,7 @@
           <p:cNvPr id="73" name="TextBox 72">
             <a:extLst>
               <a:ext uri="{FF2B5EF4-FFF2-40B4-BE49-F238E27FC236}">
-                <a16:creationId xmlns="" xmlns:a16="http://schemas.microsoft.com/office/drawing/2014/main" id="{E0BBD6C8-C8F2-40C5-AA64-85961A11ADC2}"/>
+                <a16:creationId xmlns:a16="http://schemas.microsoft.com/office/drawing/2014/main" xmlns="" id="{E0BBD6C8-C8F2-40C5-AA64-85961A11ADC2}"/>
               </a:ext>
             </a:extLst>
           </p:cNvPr>
@@ -5284,8 +5292,8 @@
         </p:nvCxnSpPr>
         <p:spPr>
           <a:xfrm flipV="1">
-            <a:off x="8295305" y="1941756"/>
-            <a:ext cx="914212" cy="1319263"/>
+            <a:off x="8295305" y="2177853"/>
+            <a:ext cx="886835" cy="1083166"/>
           </a:xfrm>
           <a:prstGeom prst="straightConnector1">
             <a:avLst/>
@@ -5320,8 +5328,8 @@
         </p:nvCxnSpPr>
         <p:spPr>
           <a:xfrm flipH="1" flipV="1">
-            <a:off x="1813244" y="1957061"/>
-            <a:ext cx="771168" cy="1303958"/>
+            <a:off x="1785867" y="2193158"/>
+            <a:ext cx="798545" cy="1067861"/>
           </a:xfrm>
           <a:prstGeom prst="straightConnector1">
             <a:avLst/>
@@ -5464,8 +5472,8 @@
         </p:nvCxnSpPr>
         <p:spPr>
           <a:xfrm flipH="1" flipV="1">
-            <a:off x="1813244" y="1957061"/>
-            <a:ext cx="3626615" cy="1191815"/>
+            <a:off x="1785867" y="2193158"/>
+            <a:ext cx="3653992" cy="955718"/>
           </a:xfrm>
           <a:prstGeom prst="straightConnector1">
             <a:avLst/>
@@ -5500,8 +5508,8 @@
         </p:nvCxnSpPr>
         <p:spPr>
           <a:xfrm flipV="1">
-            <a:off x="5439859" y="1411232"/>
-            <a:ext cx="2924269" cy="1737644"/>
+            <a:off x="5439859" y="1647329"/>
+            <a:ext cx="2896892" cy="1501547"/>
           </a:xfrm>
           <a:prstGeom prst="straightConnector1">
             <a:avLst/>
@@ -5525,6 +5533,279 @@
           </a:fontRef>
         </p:style>
       </p:cxnSp>
+      <p:sp>
+        <p:nvSpPr>
+          <p:cNvPr id="41" name="Flowchart: Sort 40"/>
+          <p:cNvSpPr/>
+          <p:nvPr/>
+        </p:nvSpPr>
+        <p:spPr>
+          <a:xfrm>
+            <a:off x="5012996" y="410775"/>
+            <a:ext cx="895252" cy="98528"/>
+          </a:xfrm>
+          <a:prstGeom prst="flowChartSort">
+            <a:avLst/>
+          </a:prstGeom>
+          <a:solidFill>
+            <a:schemeClr val="accent1">
+              <a:lumMod val="40000"/>
+              <a:lumOff val="60000"/>
+            </a:schemeClr>
+          </a:solidFill>
+        </p:spPr>
+        <p:style>
+          <a:lnRef idx="2">
+            <a:schemeClr val="accent1">
+              <a:shade val="50000"/>
+            </a:schemeClr>
+          </a:lnRef>
+          <a:fillRef idx="1">
+            <a:schemeClr val="accent1"/>
+          </a:fillRef>
+          <a:effectRef idx="0">
+            <a:schemeClr val="accent1"/>
+          </a:effectRef>
+          <a:fontRef idx="minor">
+            <a:schemeClr val="lt1"/>
+          </a:fontRef>
+        </p:style>
+        <p:txBody>
+          <a:bodyPr rtlCol="0" anchor="ctr"/>
+          <a:lstStyle/>
+          <a:p>
+            <a:pPr algn="ctr"/>
+            <a:endParaRPr lang="en-US"/>
+          </a:p>
+        </p:txBody>
+      </p:sp>
+      <p:cxnSp>
+        <p:nvCxnSpPr>
+          <p:cNvPr id="43" name="Elbow Connector 42"/>
+          <p:cNvCxnSpPr>
+            <a:stCxn id="17" idx="0"/>
+          </p:cNvCxnSpPr>
+          <p:nvPr/>
+        </p:nvCxnSpPr>
+        <p:spPr>
+          <a:xfrm>
+            <a:off x="1785866" y="1138459"/>
+            <a:ext cx="914400" cy="914400"/>
+          </a:xfrm>
+          <a:prstGeom prst="bentConnector3">
+            <a:avLst/>
+          </a:prstGeom>
+          <a:ln>
+            <a:tailEnd type="triangle"/>
+          </a:ln>
+        </p:spPr>
+        <p:style>
+          <a:lnRef idx="1">
+            <a:schemeClr val="accent1"/>
+          </a:lnRef>
+          <a:fillRef idx="0">
+            <a:schemeClr val="accent1"/>
+          </a:fillRef>
+          <a:effectRef idx="0">
+            <a:schemeClr val="accent1"/>
+          </a:effectRef>
+          <a:fontRef idx="minor">
+            <a:schemeClr val="tx1"/>
+          </a:fontRef>
+        </p:style>
+      </p:cxnSp>
+      <p:cxnSp>
+        <p:nvCxnSpPr>
+          <p:cNvPr id="47" name="Elbow Connector 46"/>
+          <p:cNvCxnSpPr>
+            <a:stCxn id="17" idx="0"/>
+            <a:endCxn id="41" idx="1"/>
+          </p:cNvCxnSpPr>
+          <p:nvPr/>
+        </p:nvCxnSpPr>
+        <p:spPr>
+          <a:xfrm rot="5400000" flipH="1" flipV="1">
+            <a:off x="3063396" y="-817490"/>
+            <a:ext cx="672070" cy="3227129"/>
+          </a:xfrm>
+          <a:prstGeom prst="bentConnector2">
+            <a:avLst/>
+          </a:prstGeom>
+          <a:ln>
+            <a:solidFill>
+              <a:srgbClr val="FF0000"/>
+            </a:solidFill>
+            <a:tailEnd type="triangle"/>
+          </a:ln>
+        </p:spPr>
+        <p:style>
+          <a:lnRef idx="1">
+            <a:schemeClr val="accent1"/>
+          </a:lnRef>
+          <a:fillRef idx="0">
+            <a:schemeClr val="accent1"/>
+          </a:fillRef>
+          <a:effectRef idx="0">
+            <a:schemeClr val="accent1"/>
+          </a:effectRef>
+          <a:fontRef idx="minor">
+            <a:schemeClr val="tx1"/>
+          </a:fontRef>
+        </p:style>
+      </p:cxnSp>
+      <p:cxnSp>
+        <p:nvCxnSpPr>
+          <p:cNvPr id="50" name="Elbow Connector 49"/>
+          <p:cNvCxnSpPr>
+            <a:stCxn id="41" idx="1"/>
+            <a:endCxn id="17" idx="0"/>
+          </p:cNvCxnSpPr>
+          <p:nvPr/>
+        </p:nvCxnSpPr>
+        <p:spPr>
+          <a:xfrm rot="10800000" flipV="1">
+            <a:off x="1785868" y="460039"/>
+            <a:ext cx="3227129" cy="672070"/>
+          </a:xfrm>
+          <a:prstGeom prst="bentConnector2">
+            <a:avLst/>
+          </a:prstGeom>
+          <a:ln>
+            <a:solidFill>
+              <a:srgbClr val="FF0000"/>
+            </a:solidFill>
+            <a:tailEnd type="triangle"/>
+          </a:ln>
+        </p:spPr>
+        <p:style>
+          <a:lnRef idx="1">
+            <a:schemeClr val="accent1"/>
+          </a:lnRef>
+          <a:fillRef idx="0">
+            <a:schemeClr val="accent1"/>
+          </a:fillRef>
+          <a:effectRef idx="0">
+            <a:schemeClr val="accent1"/>
+          </a:effectRef>
+          <a:fontRef idx="minor">
+            <a:schemeClr val="tx1"/>
+          </a:fontRef>
+        </p:style>
+      </p:cxnSp>
+      <p:cxnSp>
+        <p:nvCxnSpPr>
+          <p:cNvPr id="56" name="Elbow Connector 55"/>
+          <p:cNvCxnSpPr>
+            <a:stCxn id="41" idx="3"/>
+            <a:endCxn id="16" idx="0"/>
+          </p:cNvCxnSpPr>
+          <p:nvPr/>
+        </p:nvCxnSpPr>
+        <p:spPr>
+          <a:xfrm>
+            <a:off x="5908248" y="460039"/>
+            <a:ext cx="3273892" cy="656765"/>
+          </a:xfrm>
+          <a:prstGeom prst="bentConnector2">
+            <a:avLst/>
+          </a:prstGeom>
+          <a:ln>
+            <a:solidFill>
+              <a:srgbClr val="FF0000"/>
+            </a:solidFill>
+            <a:tailEnd type="triangle"/>
+          </a:ln>
+        </p:spPr>
+        <p:style>
+          <a:lnRef idx="1">
+            <a:schemeClr val="accent1"/>
+          </a:lnRef>
+          <a:fillRef idx="0">
+            <a:schemeClr val="accent1"/>
+          </a:fillRef>
+          <a:effectRef idx="0">
+            <a:schemeClr val="accent1"/>
+          </a:effectRef>
+          <a:fontRef idx="minor">
+            <a:schemeClr val="tx1"/>
+          </a:fontRef>
+        </p:style>
+      </p:cxnSp>
+      <p:cxnSp>
+        <p:nvCxnSpPr>
+          <p:cNvPr id="58" name="Elbow Connector 57"/>
+          <p:cNvCxnSpPr>
+            <a:stCxn id="16" idx="0"/>
+            <a:endCxn id="41" idx="3"/>
+          </p:cNvCxnSpPr>
+          <p:nvPr/>
+        </p:nvCxnSpPr>
+        <p:spPr>
+          <a:xfrm rot="16200000" flipV="1">
+            <a:off x="7216812" y="-848524"/>
+            <a:ext cx="656765" cy="3273892"/>
+          </a:xfrm>
+          <a:prstGeom prst="bentConnector2">
+            <a:avLst/>
+          </a:prstGeom>
+          <a:ln>
+            <a:solidFill>
+              <a:srgbClr val="FF0000"/>
+            </a:solidFill>
+            <a:tailEnd type="triangle"/>
+          </a:ln>
+        </p:spPr>
+        <p:style>
+          <a:lnRef idx="1">
+            <a:schemeClr val="accent1"/>
+          </a:lnRef>
+          <a:fillRef idx="0">
+            <a:schemeClr val="accent1"/>
+          </a:fillRef>
+          <a:effectRef idx="0">
+            <a:schemeClr val="accent1"/>
+          </a:effectRef>
+          <a:fontRef idx="minor">
+            <a:schemeClr val="tx1"/>
+          </a:fontRef>
+        </p:style>
+      </p:cxnSp>
+      <p:sp>
+        <p:nvSpPr>
+          <p:cNvPr id="74" name="TextBox 73">
+            <a:extLst>
+              <a:ext uri="{FF2B5EF4-FFF2-40B4-BE49-F238E27FC236}">
+                <a16:creationId xmlns:a16="http://schemas.microsoft.com/office/drawing/2014/main" xmlns="" id="{E0BBD6C8-C8F2-40C5-AA64-85961A11ADC2}"/>
+              </a:ext>
+            </a:extLst>
+          </p:cNvPr>
+          <p:cNvSpPr txBox="1"/>
+          <p:nvPr/>
+        </p:nvSpPr>
+        <p:spPr>
+          <a:xfrm>
+            <a:off x="2046442" y="410775"/>
+            <a:ext cx="1455883" cy="276999"/>
+          </a:xfrm>
+          <a:prstGeom prst="rect">
+            <a:avLst/>
+          </a:prstGeom>
+          <a:noFill/>
+        </p:spPr>
+        <p:txBody>
+          <a:bodyPr wrap="square" rtlCol="0">
+            <a:spAutoFit/>
+          </a:bodyPr>
+          <a:lstStyle/>
+          <a:p>
+            <a:r>
+              <a:rPr lang="en-US" sz="1200" dirty="0" smtClean="0"/>
+              <a:t>create own / return</a:t>
+            </a:r>
+            <a:endParaRPr lang="en-US" sz="1200" dirty="0"/>
+          </a:p>
+        </p:txBody>
+      </p:sp>
     </p:spTree>
     <p:extLst>
       <p:ext uri="{BB962C8B-B14F-4D97-AF65-F5344CB8AC3E}">
@@ -5560,7 +5841,7 @@
           <p:cNvPr id="89" name="Rectangle 88">
             <a:extLst>
               <a:ext uri="{FF2B5EF4-FFF2-40B4-BE49-F238E27FC236}">
-                <a16:creationId xmlns="" xmlns:a16="http://schemas.microsoft.com/office/drawing/2014/main" id="{EED827AB-78FC-41AC-8676-30DA25D7C5FC}"/>
+                <a16:creationId xmlns:a16="http://schemas.microsoft.com/office/drawing/2014/main" xmlns="" id="{EED827AB-78FC-41AC-8676-30DA25D7C5FC}"/>
               </a:ext>
             </a:extLst>
           </p:cNvPr>
@@ -5638,7 +5919,7 @@
           <p:cNvPr id="62" name="Rectangle 61">
             <a:extLst>
               <a:ext uri="{FF2B5EF4-FFF2-40B4-BE49-F238E27FC236}">
-                <a16:creationId xmlns="" xmlns:a16="http://schemas.microsoft.com/office/drawing/2014/main" id="{C3FE7107-D2B1-4448-B03A-F2CE9B45CFD6}"/>
+                <a16:creationId xmlns:a16="http://schemas.microsoft.com/office/drawing/2014/main" xmlns="" id="{C3FE7107-D2B1-4448-B03A-F2CE9B45CFD6}"/>
               </a:ext>
             </a:extLst>
           </p:cNvPr>
@@ -5702,7 +5983,7 @@
           <p:cNvPr id="61" name="Rectangle 60">
             <a:extLst>
               <a:ext uri="{FF2B5EF4-FFF2-40B4-BE49-F238E27FC236}">
-                <a16:creationId xmlns="" xmlns:a16="http://schemas.microsoft.com/office/drawing/2014/main" id="{2F7B40FD-C5BA-431D-AE99-1CB70F1BAB88}"/>
+                <a16:creationId xmlns:a16="http://schemas.microsoft.com/office/drawing/2014/main" xmlns="" id="{2F7B40FD-C5BA-431D-AE99-1CB70F1BAB88}"/>
               </a:ext>
             </a:extLst>
           </p:cNvPr>
@@ -5761,7 +6042,7 @@
           <p:cNvPr id="60" name="Rectangle 59">
             <a:extLst>
               <a:ext uri="{FF2B5EF4-FFF2-40B4-BE49-F238E27FC236}">
-                <a16:creationId xmlns="" xmlns:a16="http://schemas.microsoft.com/office/drawing/2014/main" id="{CF3E4DE9-C6F2-4C11-BE7F-2753CDEFE535}"/>
+                <a16:creationId xmlns:a16="http://schemas.microsoft.com/office/drawing/2014/main" xmlns="" id="{CF3E4DE9-C6F2-4C11-BE7F-2753CDEFE535}"/>
               </a:ext>
             </a:extLst>
           </p:cNvPr>
@@ -5883,7 +6164,7 @@
             <a:avLst/>
           </a:prstGeom>
           <a:solidFill>
-            <a:schemeClr val="accent5"/>
+            <a:schemeClr val="accent2"/>
           </a:solidFill>
         </p:spPr>
         <p:style>
@@ -6143,7 +6424,7 @@
           <p:cNvPr id="19" name="TextBox 18">
             <a:extLst>
               <a:ext uri="{FF2B5EF4-FFF2-40B4-BE49-F238E27FC236}">
-                <a16:creationId xmlns="" xmlns:a16="http://schemas.microsoft.com/office/drawing/2014/main" id="{E0BBD6C8-C8F2-40C5-AA64-85961A11ADC2}"/>
+                <a16:creationId xmlns:a16="http://schemas.microsoft.com/office/drawing/2014/main" xmlns="" id="{E0BBD6C8-C8F2-40C5-AA64-85961A11ADC2}"/>
               </a:ext>
             </a:extLst>
           </p:cNvPr>
@@ -6273,7 +6554,7 @@
           <p:cNvPr id="23" name="TextBox 22">
             <a:extLst>
               <a:ext uri="{FF2B5EF4-FFF2-40B4-BE49-F238E27FC236}">
-                <a16:creationId xmlns="" xmlns:a16="http://schemas.microsoft.com/office/drawing/2014/main" id="{E0BBD6C8-C8F2-40C5-AA64-85961A11ADC2}"/>
+                <a16:creationId xmlns:a16="http://schemas.microsoft.com/office/drawing/2014/main" xmlns="" id="{E0BBD6C8-C8F2-40C5-AA64-85961A11ADC2}"/>
               </a:ext>
             </a:extLst>
           </p:cNvPr>
@@ -6390,7 +6671,7 @@
           <p:cNvPr id="28" name="TextBox 27">
             <a:extLst>
               <a:ext uri="{FF2B5EF4-FFF2-40B4-BE49-F238E27FC236}">
-                <a16:creationId xmlns="" xmlns:a16="http://schemas.microsoft.com/office/drawing/2014/main" id="{E0BBD6C8-C8F2-40C5-AA64-85961A11ADC2}"/>
+                <a16:creationId xmlns:a16="http://schemas.microsoft.com/office/drawing/2014/main" xmlns="" id="{E0BBD6C8-C8F2-40C5-AA64-85961A11ADC2}"/>
               </a:ext>
             </a:extLst>
           </p:cNvPr>
@@ -6514,7 +6795,7 @@
           <p:cNvPr id="34" name="TextBox 33">
             <a:extLst>
               <a:ext uri="{FF2B5EF4-FFF2-40B4-BE49-F238E27FC236}">
-                <a16:creationId xmlns="" xmlns:a16="http://schemas.microsoft.com/office/drawing/2014/main" id="{E0BBD6C8-C8F2-40C5-AA64-85961A11ADC2}"/>
+                <a16:creationId xmlns:a16="http://schemas.microsoft.com/office/drawing/2014/main" xmlns="" id="{E0BBD6C8-C8F2-40C5-AA64-85961A11ADC2}"/>
               </a:ext>
             </a:extLst>
           </p:cNvPr>
@@ -6640,7 +6921,7 @@
           <p:cNvPr id="38" name="TextBox 37">
             <a:extLst>
               <a:ext uri="{FF2B5EF4-FFF2-40B4-BE49-F238E27FC236}">
-                <a16:creationId xmlns="" xmlns:a16="http://schemas.microsoft.com/office/drawing/2014/main" id="{E0BBD6C8-C8F2-40C5-AA64-85961A11ADC2}"/>
+                <a16:creationId xmlns:a16="http://schemas.microsoft.com/office/drawing/2014/main" xmlns="" id="{E0BBD6C8-C8F2-40C5-AA64-85961A11ADC2}"/>
               </a:ext>
             </a:extLst>
           </p:cNvPr>
@@ -6810,7 +7091,7 @@
           <p:cNvPr id="44" name="TextBox 43">
             <a:extLst>
               <a:ext uri="{FF2B5EF4-FFF2-40B4-BE49-F238E27FC236}">
-                <a16:creationId xmlns="" xmlns:a16="http://schemas.microsoft.com/office/drawing/2014/main" id="{E0BBD6C8-C8F2-40C5-AA64-85961A11ADC2}"/>
+                <a16:creationId xmlns:a16="http://schemas.microsoft.com/office/drawing/2014/main" xmlns="" id="{E0BBD6C8-C8F2-40C5-AA64-85961A11ADC2}"/>
               </a:ext>
             </a:extLst>
           </p:cNvPr>
@@ -6845,7 +7126,7 @@
           <p:cNvPr id="45" name="TextBox 44">
             <a:extLst>
               <a:ext uri="{FF2B5EF4-FFF2-40B4-BE49-F238E27FC236}">
-                <a16:creationId xmlns="" xmlns:a16="http://schemas.microsoft.com/office/drawing/2014/main" id="{E0BBD6C8-C8F2-40C5-AA64-85961A11ADC2}"/>
+                <a16:creationId xmlns:a16="http://schemas.microsoft.com/office/drawing/2014/main" xmlns="" id="{E0BBD6C8-C8F2-40C5-AA64-85961A11ADC2}"/>
               </a:ext>
             </a:extLst>
           </p:cNvPr>
@@ -6892,7 +7173,7 @@
           <p:cNvPr id="26" name="TextBox 25">
             <a:extLst>
               <a:ext uri="{FF2B5EF4-FFF2-40B4-BE49-F238E27FC236}">
-                <a16:creationId xmlns="" xmlns:a16="http://schemas.microsoft.com/office/drawing/2014/main" id="{6C45E26E-8FEE-4439-A34B-789237C9C62C}"/>
+                <a16:creationId xmlns:a16="http://schemas.microsoft.com/office/drawing/2014/main" xmlns="" id="{6C45E26E-8FEE-4439-A34B-789237C9C62C}"/>
               </a:ext>
             </a:extLst>
           </p:cNvPr>
@@ -6927,7 +7208,7 @@
           <p:cNvPr id="31" name="Rectangle 30">
             <a:extLst>
               <a:ext uri="{FF2B5EF4-FFF2-40B4-BE49-F238E27FC236}">
-                <a16:creationId xmlns="" xmlns:a16="http://schemas.microsoft.com/office/drawing/2014/main" id="{6D396BFC-10E0-4935-903B-EDC457BD1755}"/>
+                <a16:creationId xmlns:a16="http://schemas.microsoft.com/office/drawing/2014/main" xmlns="" id="{6D396BFC-10E0-4935-903B-EDC457BD1755}"/>
               </a:ext>
             </a:extLst>
           </p:cNvPr>
@@ -6987,7 +7268,7 @@
           <p:cNvPr id="32" name="Rectangle 31">
             <a:extLst>
               <a:ext uri="{FF2B5EF4-FFF2-40B4-BE49-F238E27FC236}">
-                <a16:creationId xmlns="" xmlns:a16="http://schemas.microsoft.com/office/drawing/2014/main" id="{02A645C8-F11F-438D-92DC-F6FCCA5ECFB8}"/>
+                <a16:creationId xmlns:a16="http://schemas.microsoft.com/office/drawing/2014/main" xmlns="" id="{02A645C8-F11F-438D-92DC-F6FCCA5ECFB8}"/>
               </a:ext>
             </a:extLst>
           </p:cNvPr>
@@ -7047,7 +7328,7 @@
           <p:cNvPr id="12" name="Straight Arrow Connector 11">
             <a:extLst>
               <a:ext uri="{FF2B5EF4-FFF2-40B4-BE49-F238E27FC236}">
-                <a16:creationId xmlns="" xmlns:a16="http://schemas.microsoft.com/office/drawing/2014/main" id="{FF2076CA-F897-4293-B6CD-7408EB452156}"/>
+                <a16:creationId xmlns:a16="http://schemas.microsoft.com/office/drawing/2014/main" xmlns="" id="{FF2076CA-F897-4293-B6CD-7408EB452156}"/>
               </a:ext>
             </a:extLst>
           </p:cNvPr>
@@ -7090,7 +7371,7 @@
           <p:cNvPr id="14" name="Straight Arrow Connector 13">
             <a:extLst>
               <a:ext uri="{FF2B5EF4-FFF2-40B4-BE49-F238E27FC236}">
-                <a16:creationId xmlns="" xmlns:a16="http://schemas.microsoft.com/office/drawing/2014/main" id="{5C625B7B-4A1E-46C5-9082-4FEC89B30DA9}"/>
+                <a16:creationId xmlns:a16="http://schemas.microsoft.com/office/drawing/2014/main" xmlns="" id="{5C625B7B-4A1E-46C5-9082-4FEC89B30DA9}"/>
               </a:ext>
             </a:extLst>
           </p:cNvPr>
@@ -7133,7 +7414,7 @@
           <p:cNvPr id="65" name="Straight Arrow Connector 64">
             <a:extLst>
               <a:ext uri="{FF2B5EF4-FFF2-40B4-BE49-F238E27FC236}">
-                <a16:creationId xmlns="" xmlns:a16="http://schemas.microsoft.com/office/drawing/2014/main" id="{C1C9B843-1D11-4D9F-8CBF-AE00E90AA070}"/>
+                <a16:creationId xmlns:a16="http://schemas.microsoft.com/office/drawing/2014/main" xmlns="" id="{C1C9B843-1D11-4D9F-8CBF-AE00E90AA070}"/>
               </a:ext>
             </a:extLst>
           </p:cNvPr>
@@ -7175,7 +7456,7 @@
           <p:cNvPr id="66" name="TextBox 65">
             <a:extLst>
               <a:ext uri="{FF2B5EF4-FFF2-40B4-BE49-F238E27FC236}">
-                <a16:creationId xmlns="" xmlns:a16="http://schemas.microsoft.com/office/drawing/2014/main" id="{5E4B2700-0522-40EF-B035-166AA1C17D76}"/>
+                <a16:creationId xmlns:a16="http://schemas.microsoft.com/office/drawing/2014/main" xmlns="" id="{5E4B2700-0522-40EF-B035-166AA1C17D76}"/>
               </a:ext>
             </a:extLst>
           </p:cNvPr>
@@ -7299,7 +7580,7 @@
           <p:cNvPr id="48" name="TextBox 47">
             <a:extLst>
               <a:ext uri="{FF2B5EF4-FFF2-40B4-BE49-F238E27FC236}">
-                <a16:creationId xmlns="" xmlns:a16="http://schemas.microsoft.com/office/drawing/2014/main" id="{E0BBD6C8-C8F2-40C5-AA64-85961A11ADC2}"/>
+                <a16:creationId xmlns:a16="http://schemas.microsoft.com/office/drawing/2014/main" xmlns="" id="{E0BBD6C8-C8F2-40C5-AA64-85961A11ADC2}"/>
               </a:ext>
             </a:extLst>
           </p:cNvPr>
@@ -7334,7 +7615,7 @@
           <p:cNvPr id="52" name="Rectangle 51">
             <a:extLst>
               <a:ext uri="{FF2B5EF4-FFF2-40B4-BE49-F238E27FC236}">
-                <a16:creationId xmlns="" xmlns:a16="http://schemas.microsoft.com/office/drawing/2014/main" id="{21B869D6-66CB-4B38-975F-B7FEB6AA9B13}"/>
+                <a16:creationId xmlns:a16="http://schemas.microsoft.com/office/drawing/2014/main" xmlns="" id="{21B869D6-66CB-4B38-975F-B7FEB6AA9B13}"/>
               </a:ext>
             </a:extLst>
           </p:cNvPr>
@@ -7457,7 +7738,7 @@
           <p:cNvPr id="58" name="TextBox 57">
             <a:extLst>
               <a:ext uri="{FF2B5EF4-FFF2-40B4-BE49-F238E27FC236}">
-                <a16:creationId xmlns="" xmlns:a16="http://schemas.microsoft.com/office/drawing/2014/main" id="{E0BBD6C8-C8F2-40C5-AA64-85961A11ADC2}"/>
+                <a16:creationId xmlns:a16="http://schemas.microsoft.com/office/drawing/2014/main" xmlns="" id="{E0BBD6C8-C8F2-40C5-AA64-85961A11ADC2}"/>
               </a:ext>
             </a:extLst>
           </p:cNvPr>
@@ -7565,7 +7846,7 @@
           <p:cNvPr id="94" name="TextBox 93">
             <a:extLst>
               <a:ext uri="{FF2B5EF4-FFF2-40B4-BE49-F238E27FC236}">
-                <a16:creationId xmlns="" xmlns:a16="http://schemas.microsoft.com/office/drawing/2014/main" id="{E0BBD6C8-C8F2-40C5-AA64-85961A11ADC2}"/>
+                <a16:creationId xmlns:a16="http://schemas.microsoft.com/office/drawing/2014/main" xmlns="" id="{E0BBD6C8-C8F2-40C5-AA64-85961A11ADC2}"/>
               </a:ext>
             </a:extLst>
           </p:cNvPr>
@@ -7600,7 +7881,7 @@
           <p:cNvPr id="95" name="TextBox 94">
             <a:extLst>
               <a:ext uri="{FF2B5EF4-FFF2-40B4-BE49-F238E27FC236}">
-                <a16:creationId xmlns="" xmlns:a16="http://schemas.microsoft.com/office/drawing/2014/main" id="{E0BBD6C8-C8F2-40C5-AA64-85961A11ADC2}"/>
+                <a16:creationId xmlns:a16="http://schemas.microsoft.com/office/drawing/2014/main" xmlns="" id="{E0BBD6C8-C8F2-40C5-AA64-85961A11ADC2}"/>
               </a:ext>
             </a:extLst>
           </p:cNvPr>
@@ -7635,7 +7916,7 @@
           <p:cNvPr id="49" name="Rectangle 48">
             <a:extLst>
               <a:ext uri="{FF2B5EF4-FFF2-40B4-BE49-F238E27FC236}">
-                <a16:creationId xmlns="" xmlns:a16="http://schemas.microsoft.com/office/drawing/2014/main" id="{02A645C8-F11F-438D-92DC-F6FCCA5ECFB8}"/>
+                <a16:creationId xmlns:a16="http://schemas.microsoft.com/office/drawing/2014/main" xmlns="" id="{02A645C8-F11F-438D-92DC-F6FCCA5ECFB8}"/>
               </a:ext>
             </a:extLst>
           </p:cNvPr>
@@ -7732,7 +8013,7 @@
           <p:cNvPr id="57" name="Rectangle 56">
             <a:extLst>
               <a:ext uri="{FF2B5EF4-FFF2-40B4-BE49-F238E27FC236}">
-                <a16:creationId xmlns="" xmlns:a16="http://schemas.microsoft.com/office/drawing/2014/main" id="{93FBA679-F71B-47BD-BE29-21E7C2262CEB}"/>
+                <a16:creationId xmlns:a16="http://schemas.microsoft.com/office/drawing/2014/main" xmlns="" id="{93FBA679-F71B-47BD-BE29-21E7C2262CEB}"/>
               </a:ext>
             </a:extLst>
           </p:cNvPr>
@@ -7748,7 +8029,7 @@
             <a:avLst/>
           </a:prstGeom>
           <a:solidFill>
-            <a:schemeClr val="accent5"/>
+            <a:schemeClr val="accent2"/>
           </a:solidFill>
         </p:spPr>
         <p:style>
@@ -7842,7 +8123,7 @@
           <p:cNvPr id="59" name="TextBox 58">
             <a:extLst>
               <a:ext uri="{FF2B5EF4-FFF2-40B4-BE49-F238E27FC236}">
-                <a16:creationId xmlns="" xmlns:a16="http://schemas.microsoft.com/office/drawing/2014/main" id="{5E4B2700-0522-40EF-B035-166AA1C17D76}"/>
+                <a16:creationId xmlns:a16="http://schemas.microsoft.com/office/drawing/2014/main" xmlns="" id="{5E4B2700-0522-40EF-B035-166AA1C17D76}"/>
               </a:ext>
             </a:extLst>
           </p:cNvPr>
@@ -7915,10 +8196,10 @@
           <p:cNvPr id="12" name="Rectangle 11">
             <a:extLst>
               <a:ext uri="{FF2B5EF4-FFF2-40B4-BE49-F238E27FC236}">
-                <a16:creationId xmlns="" xmlns:a16="http://schemas.microsoft.com/office/drawing/2014/main" id="{6753252F-4873-4F63-801D-CC719279A7D5}"/>
+                <a16:creationId xmlns:a16="http://schemas.microsoft.com/office/drawing/2014/main" xmlns="" id="{6753252F-4873-4F63-801D-CC719279A7D5}"/>
               </a:ext>
               <a:ext uri="{C183D7F6-B498-43B3-948B-1728B52AA6E4}">
-                <adec:decorative xmlns="" xmlns:adec="http://schemas.microsoft.com/office/drawing/2017/decorative" val="1"/>
+                <adec:decorative xmlns:adec="http://schemas.microsoft.com/office/drawing/2017/decorative" xmlns="" val="1"/>
               </a:ext>
             </a:extLst>
           </p:cNvPr>
@@ -7928,7 +8209,7 @@
           <p:nvPr>
             <p:extLst>
               <p:ext uri="{386F3935-93C4-4BCD-93E2-E3B085C9AB24}">
-                <p16:designElem xmlns="" xmlns:p16="http://schemas.microsoft.com/office/powerpoint/2015/main" val="1"/>
+                <p16:designElem xmlns:p16="http://schemas.microsoft.com/office/powerpoint/2015/main" xmlns="" val="1"/>
               </p:ext>
             </p:extLst>
           </p:nvPr>
@@ -7978,10 +8259,10 @@
           <p:cNvPr id="14" name="Rectangle 13">
             <a:extLst>
               <a:ext uri="{FF2B5EF4-FFF2-40B4-BE49-F238E27FC236}">
-                <a16:creationId xmlns="" xmlns:a16="http://schemas.microsoft.com/office/drawing/2014/main" id="{047C8CCB-F95D-4249-92DD-651249D3535A}"/>
+                <a16:creationId xmlns:a16="http://schemas.microsoft.com/office/drawing/2014/main" xmlns="" id="{047C8CCB-F95D-4249-92DD-651249D3535A}"/>
               </a:ext>
               <a:ext uri="{C183D7F6-B498-43B3-948B-1728B52AA6E4}">
-                <adec:decorative xmlns="" xmlns:adec="http://schemas.microsoft.com/office/drawing/2017/decorative" val="1"/>
+                <adec:decorative xmlns:adec="http://schemas.microsoft.com/office/drawing/2017/decorative" xmlns="" val="1"/>
               </a:ext>
             </a:extLst>
           </p:cNvPr>
@@ -7991,7 +8272,7 @@
           <p:nvPr>
             <p:extLst>
               <p:ext uri="{386F3935-93C4-4BCD-93E2-E3B085C9AB24}">
-                <p16:designElem xmlns="" xmlns:p16="http://schemas.microsoft.com/office/powerpoint/2015/main" val="1"/>
+                <p16:designElem xmlns:p16="http://schemas.microsoft.com/office/powerpoint/2015/main" xmlns="" val="1"/>
               </p:ext>
             </p:extLst>
           </p:nvPr>
@@ -8041,7 +8322,7 @@
           <p:cNvPr id="5" name="TextBox 4">
             <a:extLst>
               <a:ext uri="{FF2B5EF4-FFF2-40B4-BE49-F238E27FC236}">
-                <a16:creationId xmlns="" xmlns:a16="http://schemas.microsoft.com/office/drawing/2014/main" id="{6C45E26E-8FEE-4439-A34B-789237C9C62C}"/>
+                <a16:creationId xmlns:a16="http://schemas.microsoft.com/office/drawing/2014/main" xmlns="" id="{6C45E26E-8FEE-4439-A34B-789237C9C62C}"/>
               </a:ext>
             </a:extLst>
           </p:cNvPr>
@@ -8299,11 +8580,7 @@
             </a:pPr>
             <a:r>
               <a:rPr lang="en-US" dirty="0"/>
-              <a:t>HTTP Endpoints </a:t>
-            </a:r>
-            <a:r>
-              <a:rPr lang="en-US" dirty="0"/>
-              <a:t>(Login and </a:t>
+              <a:t>HTTP Endpoints (Login and </a:t>
             </a:r>
             <a:r>
               <a:rPr lang="en-US" dirty="0" smtClean="0"/>

</xml_diff>

<commit_message>
20210825 1606 tlw8748253: checkpoint: [working copy, still working on filter for employee].
</commit_message>
<xml_diff>
--- a/docs/ERS.pptx
+++ b/docs/ERS.pptx
@@ -138,7 +138,7 @@
           <p:cNvPr id="2" name="Title 1">
             <a:extLst>
               <a:ext uri="{FF2B5EF4-FFF2-40B4-BE49-F238E27FC236}">
-                <a16:creationId xmlns:a16="http://schemas.microsoft.com/office/drawing/2014/main" xmlns="" id="{67106D7E-D400-44F1-9A1A-D68CE501C73D}"/>
+                <a16:creationId xmlns="" xmlns:a16="http://schemas.microsoft.com/office/drawing/2014/main" id="{67106D7E-D400-44F1-9A1A-D68CE501C73D}"/>
               </a:ext>
             </a:extLst>
           </p:cNvPr>
@@ -175,7 +175,7 @@
           <p:cNvPr id="3" name="Subtitle 2">
             <a:extLst>
               <a:ext uri="{FF2B5EF4-FFF2-40B4-BE49-F238E27FC236}">
-                <a16:creationId xmlns:a16="http://schemas.microsoft.com/office/drawing/2014/main" xmlns="" id="{A5FDE527-E621-4639-A0C7-E1E9B0DFBCEC}"/>
+                <a16:creationId xmlns="" xmlns:a16="http://schemas.microsoft.com/office/drawing/2014/main" id="{A5FDE527-E621-4639-A0C7-E1E9B0DFBCEC}"/>
               </a:ext>
             </a:extLst>
           </p:cNvPr>
@@ -245,7 +245,7 @@
           <p:cNvPr id="4" name="Date Placeholder 3">
             <a:extLst>
               <a:ext uri="{FF2B5EF4-FFF2-40B4-BE49-F238E27FC236}">
-                <a16:creationId xmlns:a16="http://schemas.microsoft.com/office/drawing/2014/main" xmlns="" id="{E109CE88-B989-4109-89C8-36F7C245DB1C}"/>
+                <a16:creationId xmlns="" xmlns:a16="http://schemas.microsoft.com/office/drawing/2014/main" id="{E109CE88-B989-4109-89C8-36F7C245DB1C}"/>
               </a:ext>
             </a:extLst>
           </p:cNvPr>
@@ -263,7 +263,7 @@
           <a:p>
             <a:fld id="{6C733091-19F0-4DD7-90FE-000B4789B4CF}" type="datetimeFigureOut">
               <a:rPr lang="en-US" smtClean="0"/>
-              <a:t>8/25/2021</a:t>
+              <a:t>8/26/2021</a:t>
             </a:fld>
             <a:endParaRPr lang="en-US"/>
           </a:p>
@@ -274,7 +274,7 @@
           <p:cNvPr id="5" name="Footer Placeholder 4">
             <a:extLst>
               <a:ext uri="{FF2B5EF4-FFF2-40B4-BE49-F238E27FC236}">
-                <a16:creationId xmlns:a16="http://schemas.microsoft.com/office/drawing/2014/main" xmlns="" id="{0841498F-B991-43D3-B408-CC35D8EFCF37}"/>
+                <a16:creationId xmlns="" xmlns:a16="http://schemas.microsoft.com/office/drawing/2014/main" id="{0841498F-B991-43D3-B408-CC35D8EFCF37}"/>
               </a:ext>
             </a:extLst>
           </p:cNvPr>
@@ -299,7 +299,7 @@
           <p:cNvPr id="6" name="Slide Number Placeholder 5">
             <a:extLst>
               <a:ext uri="{FF2B5EF4-FFF2-40B4-BE49-F238E27FC236}">
-                <a16:creationId xmlns:a16="http://schemas.microsoft.com/office/drawing/2014/main" xmlns="" id="{01754CB8-17B1-45A0-AE7D-755EAA1B69D8}"/>
+                <a16:creationId xmlns="" xmlns:a16="http://schemas.microsoft.com/office/drawing/2014/main" id="{01754CB8-17B1-45A0-AE7D-755EAA1B69D8}"/>
               </a:ext>
             </a:extLst>
           </p:cNvPr>
@@ -358,7 +358,7 @@
           <p:cNvPr id="2" name="Title 1">
             <a:extLst>
               <a:ext uri="{FF2B5EF4-FFF2-40B4-BE49-F238E27FC236}">
-                <a16:creationId xmlns:a16="http://schemas.microsoft.com/office/drawing/2014/main" xmlns="" id="{E7A7B055-5DC2-440D-83C1-CAAE8E9A8E14}"/>
+                <a16:creationId xmlns="" xmlns:a16="http://schemas.microsoft.com/office/drawing/2014/main" id="{E7A7B055-5DC2-440D-83C1-CAAE8E9A8E14}"/>
               </a:ext>
             </a:extLst>
           </p:cNvPr>
@@ -386,7 +386,7 @@
           <p:cNvPr id="3" name="Vertical Text Placeholder 2">
             <a:extLst>
               <a:ext uri="{FF2B5EF4-FFF2-40B4-BE49-F238E27FC236}">
-                <a16:creationId xmlns:a16="http://schemas.microsoft.com/office/drawing/2014/main" xmlns="" id="{65710707-423D-4F9D-A49D-6C764C562553}"/>
+                <a16:creationId xmlns="" xmlns:a16="http://schemas.microsoft.com/office/drawing/2014/main" id="{65710707-423D-4F9D-A49D-6C764C562553}"/>
               </a:ext>
             </a:extLst>
           </p:cNvPr>
@@ -443,7 +443,7 @@
           <p:cNvPr id="4" name="Date Placeholder 3">
             <a:extLst>
               <a:ext uri="{FF2B5EF4-FFF2-40B4-BE49-F238E27FC236}">
-                <a16:creationId xmlns:a16="http://schemas.microsoft.com/office/drawing/2014/main" xmlns="" id="{98B6F7EF-D1BE-4437-85F3-99626E37E4EF}"/>
+                <a16:creationId xmlns="" xmlns:a16="http://schemas.microsoft.com/office/drawing/2014/main" id="{98B6F7EF-D1BE-4437-85F3-99626E37E4EF}"/>
               </a:ext>
             </a:extLst>
           </p:cNvPr>
@@ -461,7 +461,7 @@
           <a:p>
             <a:fld id="{6C733091-19F0-4DD7-90FE-000B4789B4CF}" type="datetimeFigureOut">
               <a:rPr lang="en-US" smtClean="0"/>
-              <a:t>8/25/2021</a:t>
+              <a:t>8/26/2021</a:t>
             </a:fld>
             <a:endParaRPr lang="en-US"/>
           </a:p>
@@ -472,7 +472,7 @@
           <p:cNvPr id="5" name="Footer Placeholder 4">
             <a:extLst>
               <a:ext uri="{FF2B5EF4-FFF2-40B4-BE49-F238E27FC236}">
-                <a16:creationId xmlns:a16="http://schemas.microsoft.com/office/drawing/2014/main" xmlns="" id="{D890AA9B-E479-4209-B245-83608F3D4013}"/>
+                <a16:creationId xmlns="" xmlns:a16="http://schemas.microsoft.com/office/drawing/2014/main" id="{D890AA9B-E479-4209-B245-83608F3D4013}"/>
               </a:ext>
             </a:extLst>
           </p:cNvPr>
@@ -497,7 +497,7 @@
           <p:cNvPr id="6" name="Slide Number Placeholder 5">
             <a:extLst>
               <a:ext uri="{FF2B5EF4-FFF2-40B4-BE49-F238E27FC236}">
-                <a16:creationId xmlns:a16="http://schemas.microsoft.com/office/drawing/2014/main" xmlns="" id="{0E4976E4-E15A-4296-A430-633D2BB9142B}"/>
+                <a16:creationId xmlns="" xmlns:a16="http://schemas.microsoft.com/office/drawing/2014/main" id="{0E4976E4-E15A-4296-A430-633D2BB9142B}"/>
               </a:ext>
             </a:extLst>
           </p:cNvPr>
@@ -556,7 +556,7 @@
           <p:cNvPr id="2" name="Vertical Title 1">
             <a:extLst>
               <a:ext uri="{FF2B5EF4-FFF2-40B4-BE49-F238E27FC236}">
-                <a16:creationId xmlns:a16="http://schemas.microsoft.com/office/drawing/2014/main" xmlns="" id="{66F63CF5-8DEE-4BB2-A2A5-5C16FEBE1AD5}"/>
+                <a16:creationId xmlns="" xmlns:a16="http://schemas.microsoft.com/office/drawing/2014/main" id="{66F63CF5-8DEE-4BB2-A2A5-5C16FEBE1AD5}"/>
               </a:ext>
             </a:extLst>
           </p:cNvPr>
@@ -589,7 +589,7 @@
           <p:cNvPr id="3" name="Vertical Text Placeholder 2">
             <a:extLst>
               <a:ext uri="{FF2B5EF4-FFF2-40B4-BE49-F238E27FC236}">
-                <a16:creationId xmlns:a16="http://schemas.microsoft.com/office/drawing/2014/main" xmlns="" id="{E0D5EBA5-94AF-4373-B032-A40FF73C7575}"/>
+                <a16:creationId xmlns="" xmlns:a16="http://schemas.microsoft.com/office/drawing/2014/main" id="{E0D5EBA5-94AF-4373-B032-A40FF73C7575}"/>
               </a:ext>
             </a:extLst>
           </p:cNvPr>
@@ -651,7 +651,7 @@
           <p:cNvPr id="4" name="Date Placeholder 3">
             <a:extLst>
               <a:ext uri="{FF2B5EF4-FFF2-40B4-BE49-F238E27FC236}">
-                <a16:creationId xmlns:a16="http://schemas.microsoft.com/office/drawing/2014/main" xmlns="" id="{7426B8E1-6758-4F5E-B618-96641332600B}"/>
+                <a16:creationId xmlns="" xmlns:a16="http://schemas.microsoft.com/office/drawing/2014/main" id="{7426B8E1-6758-4F5E-B618-96641332600B}"/>
               </a:ext>
             </a:extLst>
           </p:cNvPr>
@@ -669,7 +669,7 @@
           <a:p>
             <a:fld id="{6C733091-19F0-4DD7-90FE-000B4789B4CF}" type="datetimeFigureOut">
               <a:rPr lang="en-US" smtClean="0"/>
-              <a:t>8/25/2021</a:t>
+              <a:t>8/26/2021</a:t>
             </a:fld>
             <a:endParaRPr lang="en-US"/>
           </a:p>
@@ -680,7 +680,7 @@
           <p:cNvPr id="5" name="Footer Placeholder 4">
             <a:extLst>
               <a:ext uri="{FF2B5EF4-FFF2-40B4-BE49-F238E27FC236}">
-                <a16:creationId xmlns:a16="http://schemas.microsoft.com/office/drawing/2014/main" xmlns="" id="{F65E330E-2A7E-482D-AE0F-70EA5A29958B}"/>
+                <a16:creationId xmlns="" xmlns:a16="http://schemas.microsoft.com/office/drawing/2014/main" id="{F65E330E-2A7E-482D-AE0F-70EA5A29958B}"/>
               </a:ext>
             </a:extLst>
           </p:cNvPr>
@@ -705,7 +705,7 @@
           <p:cNvPr id="6" name="Slide Number Placeholder 5">
             <a:extLst>
               <a:ext uri="{FF2B5EF4-FFF2-40B4-BE49-F238E27FC236}">
-                <a16:creationId xmlns:a16="http://schemas.microsoft.com/office/drawing/2014/main" xmlns="" id="{B8000005-FC38-4A6C-9D09-7945EFA08160}"/>
+                <a16:creationId xmlns="" xmlns:a16="http://schemas.microsoft.com/office/drawing/2014/main" id="{B8000005-FC38-4A6C-9D09-7945EFA08160}"/>
               </a:ext>
             </a:extLst>
           </p:cNvPr>
@@ -764,7 +764,7 @@
           <p:cNvPr id="2" name="Title 1">
             <a:extLst>
               <a:ext uri="{FF2B5EF4-FFF2-40B4-BE49-F238E27FC236}">
-                <a16:creationId xmlns:a16="http://schemas.microsoft.com/office/drawing/2014/main" xmlns="" id="{91D0002C-766B-44B4-A24C-BE6DE6C7BA4C}"/>
+                <a16:creationId xmlns="" xmlns:a16="http://schemas.microsoft.com/office/drawing/2014/main" id="{91D0002C-766B-44B4-A24C-BE6DE6C7BA4C}"/>
               </a:ext>
             </a:extLst>
           </p:cNvPr>
@@ -792,7 +792,7 @@
           <p:cNvPr id="3" name="Content Placeholder 2">
             <a:extLst>
               <a:ext uri="{FF2B5EF4-FFF2-40B4-BE49-F238E27FC236}">
-                <a16:creationId xmlns:a16="http://schemas.microsoft.com/office/drawing/2014/main" xmlns="" id="{3455BAA9-6C7B-4874-AD76-BD466F64802D}"/>
+                <a16:creationId xmlns="" xmlns:a16="http://schemas.microsoft.com/office/drawing/2014/main" id="{3455BAA9-6C7B-4874-AD76-BD466F64802D}"/>
               </a:ext>
             </a:extLst>
           </p:cNvPr>
@@ -849,7 +849,7 @@
           <p:cNvPr id="4" name="Date Placeholder 3">
             <a:extLst>
               <a:ext uri="{FF2B5EF4-FFF2-40B4-BE49-F238E27FC236}">
-                <a16:creationId xmlns:a16="http://schemas.microsoft.com/office/drawing/2014/main" xmlns="" id="{8776BDAF-D8F2-4A61-904D-094BB4545702}"/>
+                <a16:creationId xmlns="" xmlns:a16="http://schemas.microsoft.com/office/drawing/2014/main" id="{8776BDAF-D8F2-4A61-904D-094BB4545702}"/>
               </a:ext>
             </a:extLst>
           </p:cNvPr>
@@ -867,7 +867,7 @@
           <a:p>
             <a:fld id="{6C733091-19F0-4DD7-90FE-000B4789B4CF}" type="datetimeFigureOut">
               <a:rPr lang="en-US" smtClean="0"/>
-              <a:t>8/25/2021</a:t>
+              <a:t>8/26/2021</a:t>
             </a:fld>
             <a:endParaRPr lang="en-US"/>
           </a:p>
@@ -878,7 +878,7 @@
           <p:cNvPr id="5" name="Footer Placeholder 4">
             <a:extLst>
               <a:ext uri="{FF2B5EF4-FFF2-40B4-BE49-F238E27FC236}">
-                <a16:creationId xmlns:a16="http://schemas.microsoft.com/office/drawing/2014/main" xmlns="" id="{F89C5665-4384-4706-9BD2-9F42B05C96BC}"/>
+                <a16:creationId xmlns="" xmlns:a16="http://schemas.microsoft.com/office/drawing/2014/main" id="{F89C5665-4384-4706-9BD2-9F42B05C96BC}"/>
               </a:ext>
             </a:extLst>
           </p:cNvPr>
@@ -903,7 +903,7 @@
           <p:cNvPr id="6" name="Slide Number Placeholder 5">
             <a:extLst>
               <a:ext uri="{FF2B5EF4-FFF2-40B4-BE49-F238E27FC236}">
-                <a16:creationId xmlns:a16="http://schemas.microsoft.com/office/drawing/2014/main" xmlns="" id="{7DCAD73E-CAB3-4BA7-905E-D203691D0418}"/>
+                <a16:creationId xmlns="" xmlns:a16="http://schemas.microsoft.com/office/drawing/2014/main" id="{7DCAD73E-CAB3-4BA7-905E-D203691D0418}"/>
               </a:ext>
             </a:extLst>
           </p:cNvPr>
@@ -962,7 +962,7 @@
           <p:cNvPr id="2" name="Title 1">
             <a:extLst>
               <a:ext uri="{FF2B5EF4-FFF2-40B4-BE49-F238E27FC236}">
-                <a16:creationId xmlns:a16="http://schemas.microsoft.com/office/drawing/2014/main" xmlns="" id="{A9880706-F7FA-4EC3-A022-9D6C7CEC3692}"/>
+                <a16:creationId xmlns="" xmlns:a16="http://schemas.microsoft.com/office/drawing/2014/main" id="{A9880706-F7FA-4EC3-A022-9D6C7CEC3692}"/>
               </a:ext>
             </a:extLst>
           </p:cNvPr>
@@ -999,7 +999,7 @@
           <p:cNvPr id="3" name="Text Placeholder 2">
             <a:extLst>
               <a:ext uri="{FF2B5EF4-FFF2-40B4-BE49-F238E27FC236}">
-                <a16:creationId xmlns:a16="http://schemas.microsoft.com/office/drawing/2014/main" xmlns="" id="{FA8A65D0-3DF5-448D-82EC-A967682A0DED}"/>
+                <a16:creationId xmlns="" xmlns:a16="http://schemas.microsoft.com/office/drawing/2014/main" id="{FA8A65D0-3DF5-448D-82EC-A967682A0DED}"/>
               </a:ext>
             </a:extLst>
           </p:cNvPr>
@@ -1124,7 +1124,7 @@
           <p:cNvPr id="4" name="Date Placeholder 3">
             <a:extLst>
               <a:ext uri="{FF2B5EF4-FFF2-40B4-BE49-F238E27FC236}">
-                <a16:creationId xmlns:a16="http://schemas.microsoft.com/office/drawing/2014/main" xmlns="" id="{600EA68C-01A6-487D-9D6E-1D1B4EAC0440}"/>
+                <a16:creationId xmlns="" xmlns:a16="http://schemas.microsoft.com/office/drawing/2014/main" id="{600EA68C-01A6-487D-9D6E-1D1B4EAC0440}"/>
               </a:ext>
             </a:extLst>
           </p:cNvPr>
@@ -1142,7 +1142,7 @@
           <a:p>
             <a:fld id="{6C733091-19F0-4DD7-90FE-000B4789B4CF}" type="datetimeFigureOut">
               <a:rPr lang="en-US" smtClean="0"/>
-              <a:t>8/25/2021</a:t>
+              <a:t>8/26/2021</a:t>
             </a:fld>
             <a:endParaRPr lang="en-US"/>
           </a:p>
@@ -1153,7 +1153,7 @@
           <p:cNvPr id="5" name="Footer Placeholder 4">
             <a:extLst>
               <a:ext uri="{FF2B5EF4-FFF2-40B4-BE49-F238E27FC236}">
-                <a16:creationId xmlns:a16="http://schemas.microsoft.com/office/drawing/2014/main" xmlns="" id="{6E6527CB-4FFD-4569-A82C-5EDC311B2CF6}"/>
+                <a16:creationId xmlns="" xmlns:a16="http://schemas.microsoft.com/office/drawing/2014/main" id="{6E6527CB-4FFD-4569-A82C-5EDC311B2CF6}"/>
               </a:ext>
             </a:extLst>
           </p:cNvPr>
@@ -1178,7 +1178,7 @@
           <p:cNvPr id="6" name="Slide Number Placeholder 5">
             <a:extLst>
               <a:ext uri="{FF2B5EF4-FFF2-40B4-BE49-F238E27FC236}">
-                <a16:creationId xmlns:a16="http://schemas.microsoft.com/office/drawing/2014/main" xmlns="" id="{24B19E5B-5A98-4381-A01D-01F81FD65792}"/>
+                <a16:creationId xmlns="" xmlns:a16="http://schemas.microsoft.com/office/drawing/2014/main" id="{24B19E5B-5A98-4381-A01D-01F81FD65792}"/>
               </a:ext>
             </a:extLst>
           </p:cNvPr>
@@ -1237,7 +1237,7 @@
           <p:cNvPr id="2" name="Title 1">
             <a:extLst>
               <a:ext uri="{FF2B5EF4-FFF2-40B4-BE49-F238E27FC236}">
-                <a16:creationId xmlns:a16="http://schemas.microsoft.com/office/drawing/2014/main" xmlns="" id="{63228B71-E923-4431-B8D2-FAE724678940}"/>
+                <a16:creationId xmlns="" xmlns:a16="http://schemas.microsoft.com/office/drawing/2014/main" id="{63228B71-E923-4431-B8D2-FAE724678940}"/>
               </a:ext>
             </a:extLst>
           </p:cNvPr>
@@ -1265,7 +1265,7 @@
           <p:cNvPr id="3" name="Content Placeholder 2">
             <a:extLst>
               <a:ext uri="{FF2B5EF4-FFF2-40B4-BE49-F238E27FC236}">
-                <a16:creationId xmlns:a16="http://schemas.microsoft.com/office/drawing/2014/main" xmlns="" id="{B18895E9-B7FF-4A00-955B-206CF8C73E43}"/>
+                <a16:creationId xmlns="" xmlns:a16="http://schemas.microsoft.com/office/drawing/2014/main" id="{B18895E9-B7FF-4A00-955B-206CF8C73E43}"/>
               </a:ext>
             </a:extLst>
           </p:cNvPr>
@@ -1327,7 +1327,7 @@
           <p:cNvPr id="4" name="Content Placeholder 3">
             <a:extLst>
               <a:ext uri="{FF2B5EF4-FFF2-40B4-BE49-F238E27FC236}">
-                <a16:creationId xmlns:a16="http://schemas.microsoft.com/office/drawing/2014/main" xmlns="" id="{DA813955-E3B9-44BC-8E1D-139269C8B48A}"/>
+                <a16:creationId xmlns="" xmlns:a16="http://schemas.microsoft.com/office/drawing/2014/main" id="{DA813955-E3B9-44BC-8E1D-139269C8B48A}"/>
               </a:ext>
             </a:extLst>
           </p:cNvPr>
@@ -1389,7 +1389,7 @@
           <p:cNvPr id="5" name="Date Placeholder 4">
             <a:extLst>
               <a:ext uri="{FF2B5EF4-FFF2-40B4-BE49-F238E27FC236}">
-                <a16:creationId xmlns:a16="http://schemas.microsoft.com/office/drawing/2014/main" xmlns="" id="{7E9B8EF5-28D5-4C4E-A2AB-EEA30D75DAFE}"/>
+                <a16:creationId xmlns="" xmlns:a16="http://schemas.microsoft.com/office/drawing/2014/main" id="{7E9B8EF5-28D5-4C4E-A2AB-EEA30D75DAFE}"/>
               </a:ext>
             </a:extLst>
           </p:cNvPr>
@@ -1407,7 +1407,7 @@
           <a:p>
             <a:fld id="{6C733091-19F0-4DD7-90FE-000B4789B4CF}" type="datetimeFigureOut">
               <a:rPr lang="en-US" smtClean="0"/>
-              <a:t>8/25/2021</a:t>
+              <a:t>8/26/2021</a:t>
             </a:fld>
             <a:endParaRPr lang="en-US"/>
           </a:p>
@@ -1418,7 +1418,7 @@
           <p:cNvPr id="6" name="Footer Placeholder 5">
             <a:extLst>
               <a:ext uri="{FF2B5EF4-FFF2-40B4-BE49-F238E27FC236}">
-                <a16:creationId xmlns:a16="http://schemas.microsoft.com/office/drawing/2014/main" xmlns="" id="{5723E678-8CB4-4335-AA04-6BD391748717}"/>
+                <a16:creationId xmlns="" xmlns:a16="http://schemas.microsoft.com/office/drawing/2014/main" id="{5723E678-8CB4-4335-AA04-6BD391748717}"/>
               </a:ext>
             </a:extLst>
           </p:cNvPr>
@@ -1443,7 +1443,7 @@
           <p:cNvPr id="7" name="Slide Number Placeholder 6">
             <a:extLst>
               <a:ext uri="{FF2B5EF4-FFF2-40B4-BE49-F238E27FC236}">
-                <a16:creationId xmlns:a16="http://schemas.microsoft.com/office/drawing/2014/main" xmlns="" id="{887B5567-9F4D-4AE1-92D8-769C9F7EA4F0}"/>
+                <a16:creationId xmlns="" xmlns:a16="http://schemas.microsoft.com/office/drawing/2014/main" id="{887B5567-9F4D-4AE1-92D8-769C9F7EA4F0}"/>
               </a:ext>
             </a:extLst>
           </p:cNvPr>
@@ -1502,7 +1502,7 @@
           <p:cNvPr id="2" name="Title 1">
             <a:extLst>
               <a:ext uri="{FF2B5EF4-FFF2-40B4-BE49-F238E27FC236}">
-                <a16:creationId xmlns:a16="http://schemas.microsoft.com/office/drawing/2014/main" xmlns="" id="{A40320A9-7C0C-45B4-BF2B-3B53B5686EBB}"/>
+                <a16:creationId xmlns="" xmlns:a16="http://schemas.microsoft.com/office/drawing/2014/main" id="{A40320A9-7C0C-45B4-BF2B-3B53B5686EBB}"/>
               </a:ext>
             </a:extLst>
           </p:cNvPr>
@@ -1535,7 +1535,7 @@
           <p:cNvPr id="3" name="Text Placeholder 2">
             <a:extLst>
               <a:ext uri="{FF2B5EF4-FFF2-40B4-BE49-F238E27FC236}">
-                <a16:creationId xmlns:a16="http://schemas.microsoft.com/office/drawing/2014/main" xmlns="" id="{8C440DE1-7DD6-4B1C-B961-CD2079B51F03}"/>
+                <a16:creationId xmlns="" xmlns:a16="http://schemas.microsoft.com/office/drawing/2014/main" id="{8C440DE1-7DD6-4B1C-B961-CD2079B51F03}"/>
               </a:ext>
             </a:extLst>
           </p:cNvPr>
@@ -1606,7 +1606,7 @@
           <p:cNvPr id="4" name="Content Placeholder 3">
             <a:extLst>
               <a:ext uri="{FF2B5EF4-FFF2-40B4-BE49-F238E27FC236}">
-                <a16:creationId xmlns:a16="http://schemas.microsoft.com/office/drawing/2014/main" xmlns="" id="{6FAFE840-CC9A-4D89-B05F-159EF756B427}"/>
+                <a16:creationId xmlns="" xmlns:a16="http://schemas.microsoft.com/office/drawing/2014/main" id="{6FAFE840-CC9A-4D89-B05F-159EF756B427}"/>
               </a:ext>
             </a:extLst>
           </p:cNvPr>
@@ -1668,7 +1668,7 @@
           <p:cNvPr id="5" name="Text Placeholder 4">
             <a:extLst>
               <a:ext uri="{FF2B5EF4-FFF2-40B4-BE49-F238E27FC236}">
-                <a16:creationId xmlns:a16="http://schemas.microsoft.com/office/drawing/2014/main" xmlns="" id="{4B87AADC-3401-48C6-98F6-0AB60F6DF9BE}"/>
+                <a16:creationId xmlns="" xmlns:a16="http://schemas.microsoft.com/office/drawing/2014/main" id="{4B87AADC-3401-48C6-98F6-0AB60F6DF9BE}"/>
               </a:ext>
             </a:extLst>
           </p:cNvPr>
@@ -1739,7 +1739,7 @@
           <p:cNvPr id="6" name="Content Placeholder 5">
             <a:extLst>
               <a:ext uri="{FF2B5EF4-FFF2-40B4-BE49-F238E27FC236}">
-                <a16:creationId xmlns:a16="http://schemas.microsoft.com/office/drawing/2014/main" xmlns="" id="{34BCF1A4-FB52-4DCD-80BC-324BA41C33CD}"/>
+                <a16:creationId xmlns="" xmlns:a16="http://schemas.microsoft.com/office/drawing/2014/main" id="{34BCF1A4-FB52-4DCD-80BC-324BA41C33CD}"/>
               </a:ext>
             </a:extLst>
           </p:cNvPr>
@@ -1801,7 +1801,7 @@
           <p:cNvPr id="7" name="Date Placeholder 6">
             <a:extLst>
               <a:ext uri="{FF2B5EF4-FFF2-40B4-BE49-F238E27FC236}">
-                <a16:creationId xmlns:a16="http://schemas.microsoft.com/office/drawing/2014/main" xmlns="" id="{8CFD4208-60E7-48B1-8CD0-717D5E26B827}"/>
+                <a16:creationId xmlns="" xmlns:a16="http://schemas.microsoft.com/office/drawing/2014/main" id="{8CFD4208-60E7-48B1-8CD0-717D5E26B827}"/>
               </a:ext>
             </a:extLst>
           </p:cNvPr>
@@ -1819,7 +1819,7 @@
           <a:p>
             <a:fld id="{6C733091-19F0-4DD7-90FE-000B4789B4CF}" type="datetimeFigureOut">
               <a:rPr lang="en-US" smtClean="0"/>
-              <a:t>8/25/2021</a:t>
+              <a:t>8/26/2021</a:t>
             </a:fld>
             <a:endParaRPr lang="en-US"/>
           </a:p>
@@ -1830,7 +1830,7 @@
           <p:cNvPr id="8" name="Footer Placeholder 7">
             <a:extLst>
               <a:ext uri="{FF2B5EF4-FFF2-40B4-BE49-F238E27FC236}">
-                <a16:creationId xmlns:a16="http://schemas.microsoft.com/office/drawing/2014/main" xmlns="" id="{94E429D1-BEB1-4D8A-91F2-CD4F80157F8D}"/>
+                <a16:creationId xmlns="" xmlns:a16="http://schemas.microsoft.com/office/drawing/2014/main" id="{94E429D1-BEB1-4D8A-91F2-CD4F80157F8D}"/>
               </a:ext>
             </a:extLst>
           </p:cNvPr>
@@ -1855,7 +1855,7 @@
           <p:cNvPr id="9" name="Slide Number Placeholder 8">
             <a:extLst>
               <a:ext uri="{FF2B5EF4-FFF2-40B4-BE49-F238E27FC236}">
-                <a16:creationId xmlns:a16="http://schemas.microsoft.com/office/drawing/2014/main" xmlns="" id="{6F17C19C-8370-4118-A8FC-5DDA6F84230F}"/>
+                <a16:creationId xmlns="" xmlns:a16="http://schemas.microsoft.com/office/drawing/2014/main" id="{6F17C19C-8370-4118-A8FC-5DDA6F84230F}"/>
               </a:ext>
             </a:extLst>
           </p:cNvPr>
@@ -1914,7 +1914,7 @@
           <p:cNvPr id="2" name="Title 1">
             <a:extLst>
               <a:ext uri="{FF2B5EF4-FFF2-40B4-BE49-F238E27FC236}">
-                <a16:creationId xmlns:a16="http://schemas.microsoft.com/office/drawing/2014/main" xmlns="" id="{252CBF36-7F99-45A9-BC35-BD2EC260CBF0}"/>
+                <a16:creationId xmlns="" xmlns:a16="http://schemas.microsoft.com/office/drawing/2014/main" id="{252CBF36-7F99-45A9-BC35-BD2EC260CBF0}"/>
               </a:ext>
             </a:extLst>
           </p:cNvPr>
@@ -1942,7 +1942,7 @@
           <p:cNvPr id="3" name="Date Placeholder 2">
             <a:extLst>
               <a:ext uri="{FF2B5EF4-FFF2-40B4-BE49-F238E27FC236}">
-                <a16:creationId xmlns:a16="http://schemas.microsoft.com/office/drawing/2014/main" xmlns="" id="{0D6F5F83-F07E-4501-B86B-9F96CD43993C}"/>
+                <a16:creationId xmlns="" xmlns:a16="http://schemas.microsoft.com/office/drawing/2014/main" id="{0D6F5F83-F07E-4501-B86B-9F96CD43993C}"/>
               </a:ext>
             </a:extLst>
           </p:cNvPr>
@@ -1960,7 +1960,7 @@
           <a:p>
             <a:fld id="{6C733091-19F0-4DD7-90FE-000B4789B4CF}" type="datetimeFigureOut">
               <a:rPr lang="en-US" smtClean="0"/>
-              <a:t>8/25/2021</a:t>
+              <a:t>8/26/2021</a:t>
             </a:fld>
             <a:endParaRPr lang="en-US"/>
           </a:p>
@@ -1971,7 +1971,7 @@
           <p:cNvPr id="4" name="Footer Placeholder 3">
             <a:extLst>
               <a:ext uri="{FF2B5EF4-FFF2-40B4-BE49-F238E27FC236}">
-                <a16:creationId xmlns:a16="http://schemas.microsoft.com/office/drawing/2014/main" xmlns="" id="{2861989B-F8E9-41FD-8E16-687424BCC266}"/>
+                <a16:creationId xmlns="" xmlns:a16="http://schemas.microsoft.com/office/drawing/2014/main" id="{2861989B-F8E9-41FD-8E16-687424BCC266}"/>
               </a:ext>
             </a:extLst>
           </p:cNvPr>
@@ -1996,7 +1996,7 @@
           <p:cNvPr id="5" name="Slide Number Placeholder 4">
             <a:extLst>
               <a:ext uri="{FF2B5EF4-FFF2-40B4-BE49-F238E27FC236}">
-                <a16:creationId xmlns:a16="http://schemas.microsoft.com/office/drawing/2014/main" xmlns="" id="{2026B6D7-7832-4815-95CE-5CEC39502825}"/>
+                <a16:creationId xmlns="" xmlns:a16="http://schemas.microsoft.com/office/drawing/2014/main" id="{2026B6D7-7832-4815-95CE-5CEC39502825}"/>
               </a:ext>
             </a:extLst>
           </p:cNvPr>
@@ -2055,7 +2055,7 @@
           <p:cNvPr id="2" name="Date Placeholder 1">
             <a:extLst>
               <a:ext uri="{FF2B5EF4-FFF2-40B4-BE49-F238E27FC236}">
-                <a16:creationId xmlns:a16="http://schemas.microsoft.com/office/drawing/2014/main" xmlns="" id="{9877919A-C4B6-46FD-A08A-9A4B867FE01A}"/>
+                <a16:creationId xmlns="" xmlns:a16="http://schemas.microsoft.com/office/drawing/2014/main" id="{9877919A-C4B6-46FD-A08A-9A4B867FE01A}"/>
               </a:ext>
             </a:extLst>
           </p:cNvPr>
@@ -2073,7 +2073,7 @@
           <a:p>
             <a:fld id="{6C733091-19F0-4DD7-90FE-000B4789B4CF}" type="datetimeFigureOut">
               <a:rPr lang="en-US" smtClean="0"/>
-              <a:t>8/25/2021</a:t>
+              <a:t>8/26/2021</a:t>
             </a:fld>
             <a:endParaRPr lang="en-US"/>
           </a:p>
@@ -2084,7 +2084,7 @@
           <p:cNvPr id="3" name="Footer Placeholder 2">
             <a:extLst>
               <a:ext uri="{FF2B5EF4-FFF2-40B4-BE49-F238E27FC236}">
-                <a16:creationId xmlns:a16="http://schemas.microsoft.com/office/drawing/2014/main" xmlns="" id="{9118539E-383C-4F1C-86F2-14C533A7E9FB}"/>
+                <a16:creationId xmlns="" xmlns:a16="http://schemas.microsoft.com/office/drawing/2014/main" id="{9118539E-383C-4F1C-86F2-14C533A7E9FB}"/>
               </a:ext>
             </a:extLst>
           </p:cNvPr>
@@ -2109,7 +2109,7 @@
           <p:cNvPr id="4" name="Slide Number Placeholder 3">
             <a:extLst>
               <a:ext uri="{FF2B5EF4-FFF2-40B4-BE49-F238E27FC236}">
-                <a16:creationId xmlns:a16="http://schemas.microsoft.com/office/drawing/2014/main" xmlns="" id="{C9A6D4E1-CA83-4214-9942-9E4617AA89BF}"/>
+                <a16:creationId xmlns="" xmlns:a16="http://schemas.microsoft.com/office/drawing/2014/main" id="{C9A6D4E1-CA83-4214-9942-9E4617AA89BF}"/>
               </a:ext>
             </a:extLst>
           </p:cNvPr>
@@ -2168,7 +2168,7 @@
           <p:cNvPr id="2" name="Title 1">
             <a:extLst>
               <a:ext uri="{FF2B5EF4-FFF2-40B4-BE49-F238E27FC236}">
-                <a16:creationId xmlns:a16="http://schemas.microsoft.com/office/drawing/2014/main" xmlns="" id="{046EF9B5-7A2A-4225-8817-86D028D6950C}"/>
+                <a16:creationId xmlns="" xmlns:a16="http://schemas.microsoft.com/office/drawing/2014/main" id="{046EF9B5-7A2A-4225-8817-86D028D6950C}"/>
               </a:ext>
             </a:extLst>
           </p:cNvPr>
@@ -2205,7 +2205,7 @@
           <p:cNvPr id="3" name="Content Placeholder 2">
             <a:extLst>
               <a:ext uri="{FF2B5EF4-FFF2-40B4-BE49-F238E27FC236}">
-                <a16:creationId xmlns:a16="http://schemas.microsoft.com/office/drawing/2014/main" xmlns="" id="{8667C390-5297-41E8-A403-22856007B051}"/>
+                <a16:creationId xmlns="" xmlns:a16="http://schemas.microsoft.com/office/drawing/2014/main" id="{8667C390-5297-41E8-A403-22856007B051}"/>
               </a:ext>
             </a:extLst>
           </p:cNvPr>
@@ -2295,7 +2295,7 @@
           <p:cNvPr id="4" name="Text Placeholder 3">
             <a:extLst>
               <a:ext uri="{FF2B5EF4-FFF2-40B4-BE49-F238E27FC236}">
-                <a16:creationId xmlns:a16="http://schemas.microsoft.com/office/drawing/2014/main" xmlns="" id="{8D0D2F7D-D6CD-4AB1-A3EA-CBFD2A2B3703}"/>
+                <a16:creationId xmlns="" xmlns:a16="http://schemas.microsoft.com/office/drawing/2014/main" id="{8D0D2F7D-D6CD-4AB1-A3EA-CBFD2A2B3703}"/>
               </a:ext>
             </a:extLst>
           </p:cNvPr>
@@ -2366,7 +2366,7 @@
           <p:cNvPr id="5" name="Date Placeholder 4">
             <a:extLst>
               <a:ext uri="{FF2B5EF4-FFF2-40B4-BE49-F238E27FC236}">
-                <a16:creationId xmlns:a16="http://schemas.microsoft.com/office/drawing/2014/main" xmlns="" id="{E17A441D-4FA7-4110-BF24-165CD3C3DAD7}"/>
+                <a16:creationId xmlns="" xmlns:a16="http://schemas.microsoft.com/office/drawing/2014/main" id="{E17A441D-4FA7-4110-BF24-165CD3C3DAD7}"/>
               </a:ext>
             </a:extLst>
           </p:cNvPr>
@@ -2384,7 +2384,7 @@
           <a:p>
             <a:fld id="{6C733091-19F0-4DD7-90FE-000B4789B4CF}" type="datetimeFigureOut">
               <a:rPr lang="en-US" smtClean="0"/>
-              <a:t>8/25/2021</a:t>
+              <a:t>8/26/2021</a:t>
             </a:fld>
             <a:endParaRPr lang="en-US"/>
           </a:p>
@@ -2395,7 +2395,7 @@
           <p:cNvPr id="6" name="Footer Placeholder 5">
             <a:extLst>
               <a:ext uri="{FF2B5EF4-FFF2-40B4-BE49-F238E27FC236}">
-                <a16:creationId xmlns:a16="http://schemas.microsoft.com/office/drawing/2014/main" xmlns="" id="{346102C5-5AE3-43CF-A686-1AB72B0790AB}"/>
+                <a16:creationId xmlns="" xmlns:a16="http://schemas.microsoft.com/office/drawing/2014/main" id="{346102C5-5AE3-43CF-A686-1AB72B0790AB}"/>
               </a:ext>
             </a:extLst>
           </p:cNvPr>
@@ -2420,7 +2420,7 @@
           <p:cNvPr id="7" name="Slide Number Placeholder 6">
             <a:extLst>
               <a:ext uri="{FF2B5EF4-FFF2-40B4-BE49-F238E27FC236}">
-                <a16:creationId xmlns:a16="http://schemas.microsoft.com/office/drawing/2014/main" xmlns="" id="{5528B3F7-462C-4500-8836-B3E5CD8DA61A}"/>
+                <a16:creationId xmlns="" xmlns:a16="http://schemas.microsoft.com/office/drawing/2014/main" id="{5528B3F7-462C-4500-8836-B3E5CD8DA61A}"/>
               </a:ext>
             </a:extLst>
           </p:cNvPr>
@@ -2479,7 +2479,7 @@
           <p:cNvPr id="2" name="Title 1">
             <a:extLst>
               <a:ext uri="{FF2B5EF4-FFF2-40B4-BE49-F238E27FC236}">
-                <a16:creationId xmlns:a16="http://schemas.microsoft.com/office/drawing/2014/main" xmlns="" id="{4BA10E59-DA48-4690-A956-9EB8E4E11EE5}"/>
+                <a16:creationId xmlns="" xmlns:a16="http://schemas.microsoft.com/office/drawing/2014/main" id="{4BA10E59-DA48-4690-A956-9EB8E4E11EE5}"/>
               </a:ext>
             </a:extLst>
           </p:cNvPr>
@@ -2516,7 +2516,7 @@
           <p:cNvPr id="3" name="Picture Placeholder 2">
             <a:extLst>
               <a:ext uri="{FF2B5EF4-FFF2-40B4-BE49-F238E27FC236}">
-                <a16:creationId xmlns:a16="http://schemas.microsoft.com/office/drawing/2014/main" xmlns="" id="{AC7AFE1E-67D1-4106-97CA-98302D42CC4D}"/>
+                <a16:creationId xmlns="" xmlns:a16="http://schemas.microsoft.com/office/drawing/2014/main" id="{AC7AFE1E-67D1-4106-97CA-98302D42CC4D}"/>
               </a:ext>
             </a:extLst>
           </p:cNvPr>
@@ -2583,7 +2583,7 @@
           <p:cNvPr id="4" name="Text Placeholder 3">
             <a:extLst>
               <a:ext uri="{FF2B5EF4-FFF2-40B4-BE49-F238E27FC236}">
-                <a16:creationId xmlns:a16="http://schemas.microsoft.com/office/drawing/2014/main" xmlns="" id="{67D8D73B-3D4D-42A7-9A3C-1D508E8A9B45}"/>
+                <a16:creationId xmlns="" xmlns:a16="http://schemas.microsoft.com/office/drawing/2014/main" id="{67D8D73B-3D4D-42A7-9A3C-1D508E8A9B45}"/>
               </a:ext>
             </a:extLst>
           </p:cNvPr>
@@ -2654,7 +2654,7 @@
           <p:cNvPr id="5" name="Date Placeholder 4">
             <a:extLst>
               <a:ext uri="{FF2B5EF4-FFF2-40B4-BE49-F238E27FC236}">
-                <a16:creationId xmlns:a16="http://schemas.microsoft.com/office/drawing/2014/main" xmlns="" id="{48C8945E-A47A-42A2-9DF6-CA6D5002F65F}"/>
+                <a16:creationId xmlns="" xmlns:a16="http://schemas.microsoft.com/office/drawing/2014/main" id="{48C8945E-A47A-42A2-9DF6-CA6D5002F65F}"/>
               </a:ext>
             </a:extLst>
           </p:cNvPr>
@@ -2672,7 +2672,7 @@
           <a:p>
             <a:fld id="{6C733091-19F0-4DD7-90FE-000B4789B4CF}" type="datetimeFigureOut">
               <a:rPr lang="en-US" smtClean="0"/>
-              <a:t>8/25/2021</a:t>
+              <a:t>8/26/2021</a:t>
             </a:fld>
             <a:endParaRPr lang="en-US"/>
           </a:p>
@@ -2683,7 +2683,7 @@
           <p:cNvPr id="6" name="Footer Placeholder 5">
             <a:extLst>
               <a:ext uri="{FF2B5EF4-FFF2-40B4-BE49-F238E27FC236}">
-                <a16:creationId xmlns:a16="http://schemas.microsoft.com/office/drawing/2014/main" xmlns="" id="{EB000DB4-2747-4297-B400-42A539FBDB42}"/>
+                <a16:creationId xmlns="" xmlns:a16="http://schemas.microsoft.com/office/drawing/2014/main" id="{EB000DB4-2747-4297-B400-42A539FBDB42}"/>
               </a:ext>
             </a:extLst>
           </p:cNvPr>
@@ -2708,7 +2708,7 @@
           <p:cNvPr id="7" name="Slide Number Placeholder 6">
             <a:extLst>
               <a:ext uri="{FF2B5EF4-FFF2-40B4-BE49-F238E27FC236}">
-                <a16:creationId xmlns:a16="http://schemas.microsoft.com/office/drawing/2014/main" xmlns="" id="{5BAD9222-F141-4803-AF73-E2DD92E2ABBC}"/>
+                <a16:creationId xmlns="" xmlns:a16="http://schemas.microsoft.com/office/drawing/2014/main" id="{5BAD9222-F141-4803-AF73-E2DD92E2ABBC}"/>
               </a:ext>
             </a:extLst>
           </p:cNvPr>
@@ -2772,7 +2772,7 @@
           <p:cNvPr id="2" name="Title Placeholder 1">
             <a:extLst>
               <a:ext uri="{FF2B5EF4-FFF2-40B4-BE49-F238E27FC236}">
-                <a16:creationId xmlns:a16="http://schemas.microsoft.com/office/drawing/2014/main" xmlns="" id="{5BF9D404-795C-4EA4-AD01-26740519239C}"/>
+                <a16:creationId xmlns="" xmlns:a16="http://schemas.microsoft.com/office/drawing/2014/main" id="{5BF9D404-795C-4EA4-AD01-26740519239C}"/>
               </a:ext>
             </a:extLst>
           </p:cNvPr>
@@ -2810,7 +2810,7 @@
           <p:cNvPr id="3" name="Text Placeholder 2">
             <a:extLst>
               <a:ext uri="{FF2B5EF4-FFF2-40B4-BE49-F238E27FC236}">
-                <a16:creationId xmlns:a16="http://schemas.microsoft.com/office/drawing/2014/main" xmlns="" id="{DE3FEC7B-48F8-4348-9BC6-68F83B859EE9}"/>
+                <a16:creationId xmlns="" xmlns:a16="http://schemas.microsoft.com/office/drawing/2014/main" id="{DE3FEC7B-48F8-4348-9BC6-68F83B859EE9}"/>
               </a:ext>
             </a:extLst>
           </p:cNvPr>
@@ -2877,7 +2877,7 @@
           <p:cNvPr id="4" name="Date Placeholder 3">
             <a:extLst>
               <a:ext uri="{FF2B5EF4-FFF2-40B4-BE49-F238E27FC236}">
-                <a16:creationId xmlns:a16="http://schemas.microsoft.com/office/drawing/2014/main" xmlns="" id="{31CA1A1D-E2F5-4161-A025-7B911965C2FE}"/>
+                <a16:creationId xmlns="" xmlns:a16="http://schemas.microsoft.com/office/drawing/2014/main" id="{31CA1A1D-E2F5-4161-A025-7B911965C2FE}"/>
               </a:ext>
             </a:extLst>
           </p:cNvPr>
@@ -2913,7 +2913,7 @@
           <a:p>
             <a:fld id="{6C733091-19F0-4DD7-90FE-000B4789B4CF}" type="datetimeFigureOut">
               <a:rPr lang="en-US" smtClean="0"/>
-              <a:t>8/25/2021</a:t>
+              <a:t>8/26/2021</a:t>
             </a:fld>
             <a:endParaRPr lang="en-US"/>
           </a:p>
@@ -2924,7 +2924,7 @@
           <p:cNvPr id="5" name="Footer Placeholder 4">
             <a:extLst>
               <a:ext uri="{FF2B5EF4-FFF2-40B4-BE49-F238E27FC236}">
-                <a16:creationId xmlns:a16="http://schemas.microsoft.com/office/drawing/2014/main" xmlns="" id="{43C7B926-18F3-4C13-AB92-764E10D324FB}"/>
+                <a16:creationId xmlns="" xmlns:a16="http://schemas.microsoft.com/office/drawing/2014/main" id="{43C7B926-18F3-4C13-AB92-764E10D324FB}"/>
               </a:ext>
             </a:extLst>
           </p:cNvPr>
@@ -2967,7 +2967,7 @@
           <p:cNvPr id="6" name="Slide Number Placeholder 5">
             <a:extLst>
               <a:ext uri="{FF2B5EF4-FFF2-40B4-BE49-F238E27FC236}">
-                <a16:creationId xmlns:a16="http://schemas.microsoft.com/office/drawing/2014/main" xmlns="" id="{734FA846-3BF6-46FD-80CF-34B300D244C0}"/>
+                <a16:creationId xmlns="" xmlns:a16="http://schemas.microsoft.com/office/drawing/2014/main" id="{734FA846-3BF6-46FD-80CF-34B300D244C0}"/>
               </a:ext>
             </a:extLst>
           </p:cNvPr>
@@ -3682,7 +3682,15 @@
             </a:pPr>
             <a:r>
               <a:rPr lang="en-US" dirty="0" smtClean="0"/>
-              <a:t>Utilize Hybrid for database modeling and connectivity</a:t>
+              <a:t>Utilize </a:t>
+            </a:r>
+            <a:r>
+              <a:rPr lang="en-US" dirty="0"/>
+              <a:t>Hibernate for </a:t>
+            </a:r>
+            <a:r>
+              <a:rPr lang="en-US" dirty="0" smtClean="0"/>
+              <a:t>database modeling and connectivity</a:t>
             </a:r>
           </a:p>
           <a:p>
@@ -3794,7 +3802,7 @@
           <p:cNvPr id="53" name="TextBox 52">
             <a:extLst>
               <a:ext uri="{FF2B5EF4-FFF2-40B4-BE49-F238E27FC236}">
-                <a16:creationId xmlns:a16="http://schemas.microsoft.com/office/drawing/2014/main" xmlns="" id="{CFFD1938-4192-486E-9D53-D9784518AD14}"/>
+                <a16:creationId xmlns="" xmlns:a16="http://schemas.microsoft.com/office/drawing/2014/main" id="{CFFD1938-4192-486E-9D53-D9784518AD14}"/>
               </a:ext>
             </a:extLst>
           </p:cNvPr>
@@ -3803,7 +3811,7 @@
         </p:nvSpPr>
         <p:spPr>
           <a:xfrm>
-            <a:off x="111945" y="9881"/>
+            <a:off x="130751" y="135257"/>
             <a:ext cx="3784975" cy="369332"/>
           </a:xfrm>
           <a:prstGeom prst="rect">
@@ -3829,7 +3837,7 @@
           <p:cNvPr id="2" name="Rectangle 1">
             <a:extLst>
               <a:ext uri="{FF2B5EF4-FFF2-40B4-BE49-F238E27FC236}">
-                <a16:creationId xmlns:a16="http://schemas.microsoft.com/office/drawing/2014/main" xmlns="" id="{AA0ED7A8-1532-4365-90ED-3F304B8440CE}"/>
+                <a16:creationId xmlns="" xmlns:a16="http://schemas.microsoft.com/office/drawing/2014/main" id="{AA0ED7A8-1532-4365-90ED-3F304B8440CE}"/>
               </a:ext>
             </a:extLst>
           </p:cNvPr>
@@ -3838,7 +3846,7 @@
         </p:nvSpPr>
         <p:spPr>
           <a:xfrm>
-            <a:off x="4581506" y="1132109"/>
+            <a:off x="4636261" y="1778212"/>
             <a:ext cx="1690777" cy="1061049"/>
           </a:xfrm>
           <a:prstGeom prst="rect">
@@ -3888,7 +3896,7 @@
           <p:cNvPr id="4" name="Rectangle 3">
             <a:extLst>
               <a:ext uri="{FF2B5EF4-FFF2-40B4-BE49-F238E27FC236}">
-                <a16:creationId xmlns:a16="http://schemas.microsoft.com/office/drawing/2014/main" xmlns="" id="{21B869D6-66CB-4B38-975F-B7FEB6AA9B13}"/>
+                <a16:creationId xmlns="" xmlns:a16="http://schemas.microsoft.com/office/drawing/2014/main" id="{21B869D6-66CB-4B38-975F-B7FEB6AA9B13}"/>
               </a:ext>
             </a:extLst>
           </p:cNvPr>
@@ -3897,7 +3905,7 @@
         </p:nvSpPr>
         <p:spPr>
           <a:xfrm>
-            <a:off x="2584412" y="3148876"/>
+            <a:off x="2639167" y="3794979"/>
             <a:ext cx="5710893" cy="224286"/>
           </a:xfrm>
           <a:prstGeom prst="rect">
@@ -3940,7 +3948,7 @@
         </p:nvSpPr>
         <p:spPr>
           <a:xfrm>
-            <a:off x="4607607" y="3883283"/>
+            <a:off x="4662362" y="4529386"/>
             <a:ext cx="1678916" cy="991056"/>
           </a:xfrm>
           <a:prstGeom prst="rect">
@@ -3998,7 +4006,7 @@
         </p:nvCxnSpPr>
         <p:spPr>
           <a:xfrm>
-            <a:off x="5439859" y="3373162"/>
+            <a:off x="5494614" y="4019265"/>
             <a:ext cx="7206" cy="510121"/>
           </a:xfrm>
           <a:prstGeom prst="straightConnector1">
@@ -4028,7 +4036,7 @@
           <p:cNvPr id="7" name="TextBox 6">
             <a:extLst>
               <a:ext uri="{FF2B5EF4-FFF2-40B4-BE49-F238E27FC236}">
-                <a16:creationId xmlns:a16="http://schemas.microsoft.com/office/drawing/2014/main" xmlns="" id="{E0BBD6C8-C8F2-40C5-AA64-85961A11ADC2}"/>
+                <a16:creationId xmlns="" xmlns:a16="http://schemas.microsoft.com/office/drawing/2014/main" id="{E0BBD6C8-C8F2-40C5-AA64-85961A11ADC2}"/>
               </a:ext>
             </a:extLst>
           </p:cNvPr>
@@ -4037,7 +4045,7 @@
         </p:nvSpPr>
         <p:spPr>
           <a:xfrm>
-            <a:off x="5391775" y="3556205"/>
+            <a:off x="5446530" y="4202308"/>
             <a:ext cx="843694" cy="276999"/>
           </a:xfrm>
           <a:prstGeom prst="rect">
@@ -4069,7 +4077,7 @@
         </p:nvCxnSpPr>
         <p:spPr>
           <a:xfrm rot="16200000" flipV="1">
-            <a:off x="5188402" y="3624620"/>
+            <a:off x="5243157" y="4270723"/>
             <a:ext cx="510121" cy="7206"/>
           </a:xfrm>
           <a:prstGeom prst="bentConnector3">
@@ -4105,7 +4113,7 @@
         </p:nvCxnSpPr>
         <p:spPr>
           <a:xfrm>
-            <a:off x="5426895" y="2193158"/>
+            <a:off x="5481650" y="2839261"/>
             <a:ext cx="12964" cy="955718"/>
           </a:xfrm>
           <a:prstGeom prst="straightConnector1">
@@ -4141,7 +4149,7 @@
         </p:nvCxnSpPr>
         <p:spPr>
           <a:xfrm flipH="1" flipV="1">
-            <a:off x="5426895" y="2193158"/>
+            <a:off x="5481650" y="2839261"/>
             <a:ext cx="12964" cy="955718"/>
           </a:xfrm>
           <a:prstGeom prst="straightConnector1">
@@ -4171,7 +4179,7 @@
           <p:cNvPr id="16" name="Rectangle 15">
             <a:extLst>
               <a:ext uri="{FF2B5EF4-FFF2-40B4-BE49-F238E27FC236}">
-                <a16:creationId xmlns:a16="http://schemas.microsoft.com/office/drawing/2014/main" xmlns="" id="{AA0ED7A8-1532-4365-90ED-3F304B8440CE}"/>
+                <a16:creationId xmlns="" xmlns:a16="http://schemas.microsoft.com/office/drawing/2014/main" id="{AA0ED7A8-1532-4365-90ED-3F304B8440CE}"/>
               </a:ext>
             </a:extLst>
           </p:cNvPr>
@@ -4180,7 +4188,7 @@
         </p:nvSpPr>
         <p:spPr>
           <a:xfrm>
-            <a:off x="8336751" y="1116804"/>
+            <a:off x="8391506" y="1762907"/>
             <a:ext cx="1690777" cy="1061049"/>
           </a:xfrm>
           <a:prstGeom prst="rect">
@@ -4231,7 +4239,7 @@
           <p:cNvPr id="17" name="Rectangle 16">
             <a:extLst>
               <a:ext uri="{FF2B5EF4-FFF2-40B4-BE49-F238E27FC236}">
-                <a16:creationId xmlns:a16="http://schemas.microsoft.com/office/drawing/2014/main" xmlns="" id="{AA0ED7A8-1532-4365-90ED-3F304B8440CE}"/>
+                <a16:creationId xmlns="" xmlns:a16="http://schemas.microsoft.com/office/drawing/2014/main" id="{AA0ED7A8-1532-4365-90ED-3F304B8440CE}"/>
               </a:ext>
             </a:extLst>
           </p:cNvPr>
@@ -4240,7 +4248,7 @@
         </p:nvSpPr>
         <p:spPr>
           <a:xfrm>
-            <a:off x="940478" y="1132109"/>
+            <a:off x="995233" y="1778212"/>
             <a:ext cx="1690777" cy="1061049"/>
           </a:xfrm>
           <a:prstGeom prst="rect">
@@ -4296,7 +4304,7 @@
         </p:nvCxnSpPr>
         <p:spPr>
           <a:xfrm flipV="1">
-            <a:off x="6272283" y="1647329"/>
+            <a:off x="6327038" y="2293432"/>
             <a:ext cx="2064468" cy="15305"/>
           </a:xfrm>
           <a:prstGeom prst="straightConnector1">
@@ -4326,7 +4334,7 @@
           <p:cNvPr id="20" name="TextBox 19">
             <a:extLst>
               <a:ext uri="{FF2B5EF4-FFF2-40B4-BE49-F238E27FC236}">
-                <a16:creationId xmlns:a16="http://schemas.microsoft.com/office/drawing/2014/main" xmlns="" id="{E0BBD6C8-C8F2-40C5-AA64-85961A11ADC2}"/>
+                <a16:creationId xmlns="" xmlns:a16="http://schemas.microsoft.com/office/drawing/2014/main" id="{E0BBD6C8-C8F2-40C5-AA64-85961A11ADC2}"/>
               </a:ext>
             </a:extLst>
           </p:cNvPr>
@@ -4335,7 +4343,7 @@
         </p:nvSpPr>
         <p:spPr>
           <a:xfrm>
-            <a:off x="4981251" y="2489530"/>
+            <a:off x="5036006" y="3135633"/>
             <a:ext cx="542221" cy="276999"/>
           </a:xfrm>
           <a:prstGeom prst="rect">
@@ -4362,7 +4370,7 @@
           <p:cNvPr id="21" name="TextBox 20">
             <a:extLst>
               <a:ext uri="{FF2B5EF4-FFF2-40B4-BE49-F238E27FC236}">
-                <a16:creationId xmlns:a16="http://schemas.microsoft.com/office/drawing/2014/main" xmlns="" id="{E0BBD6C8-C8F2-40C5-AA64-85961A11ADC2}"/>
+                <a16:creationId xmlns="" xmlns:a16="http://schemas.microsoft.com/office/drawing/2014/main" id="{E0BBD6C8-C8F2-40C5-AA64-85961A11ADC2}"/>
               </a:ext>
             </a:extLst>
           </p:cNvPr>
@@ -4371,7 +4379,7 @@
         </p:nvSpPr>
         <p:spPr>
           <a:xfrm>
-            <a:off x="6411345" y="1370329"/>
+            <a:off x="6466100" y="2016432"/>
             <a:ext cx="953133" cy="276999"/>
           </a:xfrm>
           <a:prstGeom prst="rect">
@@ -4404,7 +4412,7 @@
         </p:nvCxnSpPr>
         <p:spPr>
           <a:xfrm rot="16200000" flipH="1" flipV="1">
-            <a:off x="7296865" y="-753167"/>
+            <a:off x="7351620" y="-107064"/>
             <a:ext cx="15305" cy="3755245"/>
           </a:xfrm>
           <a:prstGeom prst="bentConnector3">
@@ -4436,7 +4444,7 @@
           <p:cNvPr id="24" name="TextBox 23">
             <a:extLst>
               <a:ext uri="{FF2B5EF4-FFF2-40B4-BE49-F238E27FC236}">
-                <a16:creationId xmlns:a16="http://schemas.microsoft.com/office/drawing/2014/main" xmlns="" id="{E0BBD6C8-C8F2-40C5-AA64-85961A11ADC2}"/>
+                <a16:creationId xmlns="" xmlns:a16="http://schemas.microsoft.com/office/drawing/2014/main" id="{E0BBD6C8-C8F2-40C5-AA64-85961A11ADC2}"/>
               </a:ext>
             </a:extLst>
           </p:cNvPr>
@@ -4445,7 +4453,7 @@
         </p:nvSpPr>
         <p:spPr>
           <a:xfrm>
-            <a:off x="6887911" y="653985"/>
+            <a:off x="6942666" y="1300088"/>
             <a:ext cx="1258988" cy="461665"/>
           </a:xfrm>
           <a:prstGeom prst="rect">
@@ -4461,11 +4469,7 @@
           <a:p>
             <a:r>
               <a:rPr lang="en-US" sz="1200" dirty="0" smtClean="0"/>
-              <a:t>session </a:t>
-            </a:r>
-            <a:r>
-              <a:rPr lang="en-US" sz="1200" dirty="0" smtClean="0"/>
-              <a:t>expired</a:t>
+              <a:t>session expired</a:t>
             </a:r>
           </a:p>
           <a:p>
@@ -4488,7 +4492,7 @@
         </p:nvCxnSpPr>
         <p:spPr>
           <a:xfrm flipH="1">
-            <a:off x="2631255" y="1662634"/>
+            <a:off x="2686010" y="2308737"/>
             <a:ext cx="1950251" cy="0"/>
           </a:xfrm>
           <a:prstGeom prst="straightConnector1">
@@ -4524,7 +4528,7 @@
         </p:nvCxnSpPr>
         <p:spPr>
           <a:xfrm rot="5400000" flipH="1" flipV="1">
-            <a:off x="3606381" y="-688405"/>
+            <a:off x="3661136" y="-42302"/>
             <a:ext cx="12700" cy="3641028"/>
           </a:xfrm>
           <a:prstGeom prst="bentConnector3">
@@ -4556,7 +4560,7 @@
           <p:cNvPr id="29" name="TextBox 28">
             <a:extLst>
               <a:ext uri="{FF2B5EF4-FFF2-40B4-BE49-F238E27FC236}">
-                <a16:creationId xmlns:a16="http://schemas.microsoft.com/office/drawing/2014/main" xmlns="" id="{E0BBD6C8-C8F2-40C5-AA64-85961A11ADC2}"/>
+                <a16:creationId xmlns="" xmlns:a16="http://schemas.microsoft.com/office/drawing/2014/main" id="{E0BBD6C8-C8F2-40C5-AA64-85961A11ADC2}"/>
               </a:ext>
             </a:extLst>
           </p:cNvPr>
@@ -4565,7 +4569,7 @@
         </p:nvSpPr>
         <p:spPr>
           <a:xfrm>
-            <a:off x="2891831" y="674296"/>
+            <a:off x="2946586" y="1320399"/>
             <a:ext cx="1182326" cy="461665"/>
           </a:xfrm>
           <a:prstGeom prst="rect">
@@ -4581,11 +4585,7 @@
           <a:p>
             <a:r>
               <a:rPr lang="en-US" sz="1200" dirty="0" smtClean="0"/>
-              <a:t>session </a:t>
-            </a:r>
-            <a:r>
-              <a:rPr lang="en-US" sz="1200" dirty="0" smtClean="0"/>
-              <a:t>expired</a:t>
+              <a:t>session expired</a:t>
             </a:r>
           </a:p>
           <a:p>
@@ -4602,7 +4602,7 @@
           <p:cNvPr id="30" name="TextBox 29">
             <a:extLst>
               <a:ext uri="{FF2B5EF4-FFF2-40B4-BE49-F238E27FC236}">
-                <a16:creationId xmlns:a16="http://schemas.microsoft.com/office/drawing/2014/main" xmlns="" id="{E0BBD6C8-C8F2-40C5-AA64-85961A11ADC2}"/>
+                <a16:creationId xmlns="" xmlns:a16="http://schemas.microsoft.com/office/drawing/2014/main" id="{E0BBD6C8-C8F2-40C5-AA64-85961A11ADC2}"/>
               </a:ext>
             </a:extLst>
           </p:cNvPr>
@@ -4611,7 +4611,7 @@
         </p:nvSpPr>
         <p:spPr>
           <a:xfrm>
-            <a:off x="2907838" y="1434976"/>
+            <a:off x="2962593" y="2081079"/>
             <a:ext cx="953133" cy="461665"/>
           </a:xfrm>
           <a:prstGeom prst="rect">
@@ -4644,7 +4644,7 @@
         </p:nvCxnSpPr>
         <p:spPr>
           <a:xfrm flipH="1">
-            <a:off x="5439859" y="1647329"/>
+            <a:off x="5494614" y="2293432"/>
             <a:ext cx="2896892" cy="1501547"/>
           </a:xfrm>
           <a:prstGeom prst="straightConnector1">
@@ -4680,7 +4680,7 @@
         </p:nvCxnSpPr>
         <p:spPr>
           <a:xfrm flipV="1">
-            <a:off x="5439859" y="1647329"/>
+            <a:off x="5494614" y="2293432"/>
             <a:ext cx="2896892" cy="1501547"/>
           </a:xfrm>
           <a:prstGeom prst="straightConnector1">
@@ -4716,7 +4716,7 @@
         </p:nvCxnSpPr>
         <p:spPr>
           <a:xfrm>
-            <a:off x="1785867" y="2193158"/>
+            <a:off x="1840622" y="2839261"/>
             <a:ext cx="3653992" cy="955718"/>
           </a:xfrm>
           <a:prstGeom prst="straightConnector1">
@@ -4746,7 +4746,7 @@
           <p:cNvPr id="26" name="TextBox 25">
             <a:extLst>
               <a:ext uri="{FF2B5EF4-FFF2-40B4-BE49-F238E27FC236}">
-                <a16:creationId xmlns:a16="http://schemas.microsoft.com/office/drawing/2014/main" xmlns="" id="{E0BBD6C8-C8F2-40C5-AA64-85961A11ADC2}"/>
+                <a16:creationId xmlns="" xmlns:a16="http://schemas.microsoft.com/office/drawing/2014/main" id="{E0BBD6C8-C8F2-40C5-AA64-85961A11ADC2}"/>
               </a:ext>
             </a:extLst>
           </p:cNvPr>
@@ -4755,7 +4755,7 @@
         </p:nvSpPr>
         <p:spPr>
           <a:xfrm>
-            <a:off x="2939137" y="2324722"/>
+            <a:off x="2993892" y="2970825"/>
             <a:ext cx="843694" cy="461665"/>
           </a:xfrm>
           <a:prstGeom prst="rect">
@@ -4782,7 +4782,7 @@
           <p:cNvPr id="28" name="TextBox 27">
             <a:extLst>
               <a:ext uri="{FF2B5EF4-FFF2-40B4-BE49-F238E27FC236}">
-                <a16:creationId xmlns:a16="http://schemas.microsoft.com/office/drawing/2014/main" xmlns="" id="{E0BBD6C8-C8F2-40C5-AA64-85961A11ADC2}"/>
+                <a16:creationId xmlns="" xmlns:a16="http://schemas.microsoft.com/office/drawing/2014/main" id="{E0BBD6C8-C8F2-40C5-AA64-85961A11ADC2}"/>
               </a:ext>
             </a:extLst>
           </p:cNvPr>
@@ -4791,7 +4791,7 @@
         </p:nvSpPr>
         <p:spPr>
           <a:xfrm>
-            <a:off x="6578471" y="2202077"/>
+            <a:off x="6633226" y="2848180"/>
             <a:ext cx="843694" cy="461665"/>
           </a:xfrm>
           <a:prstGeom prst="rect">
@@ -4821,7 +4821,7 @@
         </p:nvSpPr>
         <p:spPr>
           <a:xfrm>
-            <a:off x="1732865" y="3980661"/>
+            <a:off x="1799709" y="4546914"/>
             <a:ext cx="1678916" cy="991056"/>
           </a:xfrm>
           <a:prstGeom prst="rect">
@@ -4875,7 +4875,7 @@
         </p:nvSpPr>
         <p:spPr>
           <a:xfrm>
-            <a:off x="4621164" y="5351487"/>
+            <a:off x="7954019" y="4546914"/>
             <a:ext cx="1678916" cy="991056"/>
           </a:xfrm>
           <a:prstGeom prst="rect">
@@ -4933,7 +4933,7 @@
         </p:nvCxnSpPr>
         <p:spPr>
           <a:xfrm>
-            <a:off x="1785867" y="2193158"/>
+            <a:off x="1840622" y="2839261"/>
             <a:ext cx="798545" cy="1067861"/>
           </a:xfrm>
           <a:prstGeom prst="straightConnector1">
@@ -4969,7 +4969,7 @@
         </p:nvCxnSpPr>
         <p:spPr>
           <a:xfrm flipH="1">
-            <a:off x="8295305" y="2177853"/>
+            <a:off x="8350060" y="2823956"/>
             <a:ext cx="886835" cy="1083166"/>
           </a:xfrm>
           <a:prstGeom prst="straightConnector1">
@@ -4998,15 +4998,15 @@
         <p:nvCxnSpPr>
           <p:cNvPr id="54" name="Straight Arrow Connector 53"/>
           <p:cNvCxnSpPr>
-            <a:stCxn id="5" idx="2"/>
-            <a:endCxn id="34" idx="0"/>
+            <a:stCxn id="5" idx="3"/>
+            <a:endCxn id="34" idx="1"/>
           </p:cNvCxnSpPr>
           <p:nvPr/>
         </p:nvCxnSpPr>
         <p:spPr>
           <a:xfrm>
-            <a:off x="5447065" y="4874339"/>
-            <a:ext cx="13557" cy="477148"/>
+            <a:off x="6341278" y="5024914"/>
+            <a:ext cx="1612741" cy="17528"/>
           </a:xfrm>
           <a:prstGeom prst="straightConnector1">
             <a:avLst/>
@@ -5035,7 +5035,7 @@
           <p:cNvPr id="55" name="TextBox 54">
             <a:extLst>
               <a:ext uri="{FF2B5EF4-FFF2-40B4-BE49-F238E27FC236}">
-                <a16:creationId xmlns:a16="http://schemas.microsoft.com/office/drawing/2014/main" xmlns="" id="{E0BBD6C8-C8F2-40C5-AA64-85961A11ADC2}"/>
+                <a16:creationId xmlns="" xmlns:a16="http://schemas.microsoft.com/office/drawing/2014/main" id="{E0BBD6C8-C8F2-40C5-AA64-85961A11ADC2}"/>
               </a:ext>
             </a:extLst>
           </p:cNvPr>
@@ -5044,7 +5044,7 @@
         </p:nvSpPr>
         <p:spPr>
           <a:xfrm>
-            <a:off x="5453843" y="4974413"/>
+            <a:off x="6638514" y="4796087"/>
             <a:ext cx="542221" cy="276999"/>
           </a:xfrm>
           <a:prstGeom prst="rect">
@@ -5071,7 +5071,7 @@
           <p:cNvPr id="66" name="TextBox 65">
             <a:extLst>
               <a:ext uri="{FF2B5EF4-FFF2-40B4-BE49-F238E27FC236}">
-                <a16:creationId xmlns:a16="http://schemas.microsoft.com/office/drawing/2014/main" xmlns="" id="{E0BBD6C8-C8F2-40C5-AA64-85961A11ADC2}"/>
+                <a16:creationId xmlns="" xmlns:a16="http://schemas.microsoft.com/office/drawing/2014/main" id="{E0BBD6C8-C8F2-40C5-AA64-85961A11ADC2}"/>
               </a:ext>
             </a:extLst>
           </p:cNvPr>
@@ -5080,7 +5080,7 @@
         </p:nvSpPr>
         <p:spPr>
           <a:xfrm>
-            <a:off x="1061598" y="2657293"/>
+            <a:off x="1116353" y="3303396"/>
             <a:ext cx="1166958" cy="276999"/>
           </a:xfrm>
           <a:prstGeom prst="rect">
@@ -5107,7 +5107,7 @@
           <p:cNvPr id="67" name="TextBox 66">
             <a:extLst>
               <a:ext uri="{FF2B5EF4-FFF2-40B4-BE49-F238E27FC236}">
-                <a16:creationId xmlns:a16="http://schemas.microsoft.com/office/drawing/2014/main" xmlns="" id="{E0BBD6C8-C8F2-40C5-AA64-85961A11ADC2}"/>
+                <a16:creationId xmlns="" xmlns:a16="http://schemas.microsoft.com/office/drawing/2014/main" id="{E0BBD6C8-C8F2-40C5-AA64-85961A11ADC2}"/>
               </a:ext>
             </a:extLst>
           </p:cNvPr>
@@ -5116,7 +5116,7 @@
         </p:nvSpPr>
         <p:spPr>
           <a:xfrm>
-            <a:off x="8738722" y="2555555"/>
+            <a:off x="8793477" y="3201658"/>
             <a:ext cx="1166958" cy="276999"/>
           </a:xfrm>
           <a:prstGeom prst="rect">
@@ -5149,8 +5149,8 @@
         </p:nvCxnSpPr>
         <p:spPr>
           <a:xfrm flipH="1">
-            <a:off x="2572323" y="3373162"/>
-            <a:ext cx="2867536" cy="607499"/>
+            <a:off x="2639167" y="4019265"/>
+            <a:ext cx="2855447" cy="527649"/>
           </a:xfrm>
           <a:prstGeom prst="straightConnector1">
             <a:avLst/>
@@ -5179,7 +5179,7 @@
           <p:cNvPr id="70" name="TextBox 69">
             <a:extLst>
               <a:ext uri="{FF2B5EF4-FFF2-40B4-BE49-F238E27FC236}">
-                <a16:creationId xmlns:a16="http://schemas.microsoft.com/office/drawing/2014/main" xmlns="" id="{E0BBD6C8-C8F2-40C5-AA64-85961A11ADC2}"/>
+                <a16:creationId xmlns="" xmlns:a16="http://schemas.microsoft.com/office/drawing/2014/main" id="{E0BBD6C8-C8F2-40C5-AA64-85961A11ADC2}"/>
               </a:ext>
             </a:extLst>
           </p:cNvPr>
@@ -5188,7 +5188,7 @@
         </p:nvSpPr>
         <p:spPr>
           <a:xfrm>
-            <a:off x="2658632" y="3580694"/>
+            <a:off x="2713387" y="4226797"/>
             <a:ext cx="843694" cy="276999"/>
           </a:xfrm>
           <a:prstGeom prst="rect">
@@ -5214,14 +5214,14 @@
           <p:cNvPr id="72" name="Straight Arrow Connector 71"/>
           <p:cNvCxnSpPr>
             <a:stCxn id="32" idx="2"/>
-            <a:endCxn id="34" idx="1"/>
+            <a:endCxn id="57" idx="1"/>
           </p:cNvCxnSpPr>
           <p:nvPr/>
         </p:nvCxnSpPr>
         <p:spPr>
           <a:xfrm>
-            <a:off x="2572323" y="4971717"/>
-            <a:ext cx="2048841" cy="875298"/>
+            <a:off x="2639167" y="5537970"/>
+            <a:ext cx="2443754" cy="615407"/>
           </a:xfrm>
           <a:prstGeom prst="straightConnector1">
             <a:avLst/>
@@ -5250,7 +5250,7 @@
           <p:cNvPr id="73" name="TextBox 72">
             <a:extLst>
               <a:ext uri="{FF2B5EF4-FFF2-40B4-BE49-F238E27FC236}">
-                <a16:creationId xmlns:a16="http://schemas.microsoft.com/office/drawing/2014/main" xmlns="" id="{E0BBD6C8-C8F2-40C5-AA64-85961A11ADC2}"/>
+                <a16:creationId xmlns="" xmlns:a16="http://schemas.microsoft.com/office/drawing/2014/main" id="{E0BBD6C8-C8F2-40C5-AA64-85961A11ADC2}"/>
               </a:ext>
             </a:extLst>
           </p:cNvPr>
@@ -5259,7 +5259,7 @@
         </p:nvSpPr>
         <p:spPr>
           <a:xfrm>
-            <a:off x="3091536" y="5440716"/>
+            <a:off x="3680564" y="5962975"/>
             <a:ext cx="542221" cy="276999"/>
           </a:xfrm>
           <a:prstGeom prst="rect">
@@ -5292,7 +5292,7 @@
         </p:nvCxnSpPr>
         <p:spPr>
           <a:xfrm flipV="1">
-            <a:off x="8295305" y="2177853"/>
+            <a:off x="8350060" y="2823956"/>
             <a:ext cx="886835" cy="1083166"/>
           </a:xfrm>
           <a:prstGeom prst="straightConnector1">
@@ -5328,7 +5328,7 @@
         </p:nvCxnSpPr>
         <p:spPr>
           <a:xfrm flipH="1" flipV="1">
-            <a:off x="1785867" y="2193158"/>
+            <a:off x="1840622" y="2839261"/>
             <a:ext cx="798545" cy="1067861"/>
           </a:xfrm>
           <a:prstGeom prst="straightConnector1">
@@ -5357,15 +5357,15 @@
         <p:nvCxnSpPr>
           <p:cNvPr id="79" name="Straight Arrow Connector 78"/>
           <p:cNvCxnSpPr>
-            <a:stCxn id="34" idx="0"/>
-            <a:endCxn id="5" idx="2"/>
+            <a:stCxn id="34" idx="1"/>
+            <a:endCxn id="5" idx="3"/>
           </p:cNvCxnSpPr>
           <p:nvPr/>
         </p:nvCxnSpPr>
         <p:spPr>
           <a:xfrm flipH="1" flipV="1">
-            <a:off x="5447065" y="4874339"/>
-            <a:ext cx="13557" cy="477148"/>
+            <a:off x="6341278" y="5024914"/>
+            <a:ext cx="1612741" cy="17528"/>
           </a:xfrm>
           <a:prstGeom prst="straightConnector1">
             <a:avLst/>
@@ -5393,15 +5393,15 @@
         <p:nvCxnSpPr>
           <p:cNvPr id="81" name="Straight Arrow Connector 80"/>
           <p:cNvCxnSpPr>
-            <a:stCxn id="34" idx="1"/>
+            <a:stCxn id="57" idx="1"/>
             <a:endCxn id="32" idx="2"/>
           </p:cNvCxnSpPr>
           <p:nvPr/>
         </p:nvCxnSpPr>
         <p:spPr>
           <a:xfrm flipH="1" flipV="1">
-            <a:off x="2572323" y="4971717"/>
-            <a:ext cx="2048841" cy="875298"/>
+            <a:off x="2639167" y="5537970"/>
+            <a:ext cx="2443754" cy="615407"/>
           </a:xfrm>
           <a:prstGeom prst="straightConnector1">
             <a:avLst/>
@@ -5436,8 +5436,8 @@
         </p:nvCxnSpPr>
         <p:spPr>
           <a:xfrm flipV="1">
-            <a:off x="2572323" y="3373162"/>
-            <a:ext cx="2867536" cy="607499"/>
+            <a:off x="2639167" y="4019265"/>
+            <a:ext cx="2855447" cy="527649"/>
           </a:xfrm>
           <a:prstGeom prst="straightConnector1">
             <a:avLst/>
@@ -5472,7 +5472,7 @@
         </p:nvCxnSpPr>
         <p:spPr>
           <a:xfrm flipH="1" flipV="1">
-            <a:off x="1785867" y="2193158"/>
+            <a:off x="1840622" y="2839261"/>
             <a:ext cx="3653992" cy="955718"/>
           </a:xfrm>
           <a:prstGeom prst="straightConnector1">
@@ -5508,7 +5508,7 @@
         </p:nvCxnSpPr>
         <p:spPr>
           <a:xfrm flipV="1">
-            <a:off x="5439859" y="1647329"/>
+            <a:off x="5494614" y="2293432"/>
             <a:ext cx="2896892" cy="1501547"/>
           </a:xfrm>
           <a:prstGeom prst="straightConnector1">
@@ -5541,7 +5541,7 @@
         </p:nvSpPr>
         <p:spPr>
           <a:xfrm>
-            <a:off x="5012996" y="410775"/>
+            <a:off x="5067751" y="1056878"/>
             <a:ext cx="895252" cy="98528"/>
           </a:xfrm>
           <a:prstGeom prst="flowChartSort">
@@ -5589,7 +5589,7 @@
         </p:nvCxnSpPr>
         <p:spPr>
           <a:xfrm>
-            <a:off x="1785866" y="1138459"/>
+            <a:off x="1840621" y="1784562"/>
             <a:ext cx="914400" cy="914400"/>
           </a:xfrm>
           <a:prstGeom prst="bentConnector3">
@@ -5625,7 +5625,7 @@
         </p:nvCxnSpPr>
         <p:spPr>
           <a:xfrm rot="5400000" flipH="1" flipV="1">
-            <a:off x="3063396" y="-817490"/>
+            <a:off x="3118151" y="-171387"/>
             <a:ext cx="672070" cy="3227129"/>
           </a:xfrm>
           <a:prstGeom prst="bentConnector2">
@@ -5664,7 +5664,7 @@
         </p:nvCxnSpPr>
         <p:spPr>
           <a:xfrm rot="10800000" flipV="1">
-            <a:off x="1785868" y="460039"/>
+            <a:off x="1840623" y="1106142"/>
             <a:ext cx="3227129" cy="672070"/>
           </a:xfrm>
           <a:prstGeom prst="bentConnector2">
@@ -5703,7 +5703,7 @@
         </p:nvCxnSpPr>
         <p:spPr>
           <a:xfrm>
-            <a:off x="5908248" y="460039"/>
+            <a:off x="5963003" y="1106142"/>
             <a:ext cx="3273892" cy="656765"/>
           </a:xfrm>
           <a:prstGeom prst="bentConnector2">
@@ -5742,7 +5742,7 @@
         </p:nvCxnSpPr>
         <p:spPr>
           <a:xfrm rot="16200000" flipV="1">
-            <a:off x="7216812" y="-848524"/>
+            <a:off x="7271567" y="-202421"/>
             <a:ext cx="656765" cy="3273892"/>
           </a:xfrm>
           <a:prstGeom prst="bentConnector2">
@@ -5775,7 +5775,7 @@
           <p:cNvPr id="74" name="TextBox 73">
             <a:extLst>
               <a:ext uri="{FF2B5EF4-FFF2-40B4-BE49-F238E27FC236}">
-                <a16:creationId xmlns:a16="http://schemas.microsoft.com/office/drawing/2014/main" xmlns="" id="{E0BBD6C8-C8F2-40C5-AA64-85961A11ADC2}"/>
+                <a16:creationId xmlns="" xmlns:a16="http://schemas.microsoft.com/office/drawing/2014/main" id="{E0BBD6C8-C8F2-40C5-AA64-85961A11ADC2}"/>
               </a:ext>
             </a:extLst>
           </p:cNvPr>
@@ -5784,8 +5784,8 @@
         </p:nvSpPr>
         <p:spPr>
           <a:xfrm>
-            <a:off x="2046442" y="410775"/>
-            <a:ext cx="1455883" cy="276999"/>
+            <a:off x="2101198" y="825839"/>
+            <a:ext cx="965053" cy="276999"/>
           </a:xfrm>
           <a:prstGeom prst="rect">
             <a:avLst/>
@@ -5800,7 +5800,308 @@
           <a:p>
             <a:r>
               <a:rPr lang="en-US" sz="1200" dirty="0" smtClean="0"/>
-              <a:t>create own / return</a:t>
+              <a:t>create </a:t>
+            </a:r>
+            <a:r>
+              <a:rPr lang="en-US" sz="1200" dirty="0" smtClean="0"/>
+              <a:t>own</a:t>
+            </a:r>
+            <a:endParaRPr lang="en-US" sz="1200" dirty="0"/>
+          </a:p>
+        </p:txBody>
+      </p:sp>
+      <p:sp>
+        <p:nvSpPr>
+          <p:cNvPr id="57" name="Flowchart: Sort 56"/>
+          <p:cNvSpPr/>
+          <p:nvPr/>
+        </p:nvSpPr>
+        <p:spPr>
+          <a:xfrm>
+            <a:off x="5082921" y="6104113"/>
+            <a:ext cx="895252" cy="98528"/>
+          </a:xfrm>
+          <a:prstGeom prst="flowChartSort">
+            <a:avLst/>
+          </a:prstGeom>
+          <a:solidFill>
+            <a:schemeClr val="accent1">
+              <a:lumMod val="40000"/>
+              <a:lumOff val="60000"/>
+            </a:schemeClr>
+          </a:solidFill>
+        </p:spPr>
+        <p:style>
+          <a:lnRef idx="2">
+            <a:schemeClr val="accent1">
+              <a:shade val="50000"/>
+            </a:schemeClr>
+          </a:lnRef>
+          <a:fillRef idx="1">
+            <a:schemeClr val="accent1"/>
+          </a:fillRef>
+          <a:effectRef idx="0">
+            <a:schemeClr val="accent1"/>
+          </a:effectRef>
+          <a:fontRef idx="minor">
+            <a:schemeClr val="lt1"/>
+          </a:fontRef>
+        </p:style>
+        <p:txBody>
+          <a:bodyPr rtlCol="0" anchor="ctr"/>
+          <a:lstStyle/>
+          <a:p>
+            <a:pPr algn="ctr"/>
+            <a:endParaRPr lang="en-US"/>
+          </a:p>
+        </p:txBody>
+      </p:sp>
+      <p:cxnSp>
+        <p:nvCxnSpPr>
+          <p:cNvPr id="52" name="Straight Arrow Connector 51"/>
+          <p:cNvCxnSpPr>
+            <a:stCxn id="4" idx="2"/>
+            <a:endCxn id="34" idx="0"/>
+          </p:cNvCxnSpPr>
+          <p:nvPr/>
+        </p:nvCxnSpPr>
+        <p:spPr>
+          <a:xfrm>
+            <a:off x="5494614" y="4019265"/>
+            <a:ext cx="3298863" cy="527649"/>
+          </a:xfrm>
+          <a:prstGeom prst="straightConnector1">
+            <a:avLst/>
+          </a:prstGeom>
+          <a:ln>
+            <a:tailEnd type="triangle"/>
+          </a:ln>
+        </p:spPr>
+        <p:style>
+          <a:lnRef idx="1">
+            <a:schemeClr val="accent1"/>
+          </a:lnRef>
+          <a:fillRef idx="0">
+            <a:schemeClr val="accent1"/>
+          </a:fillRef>
+          <a:effectRef idx="0">
+            <a:schemeClr val="accent1"/>
+          </a:effectRef>
+          <a:fontRef idx="minor">
+            <a:schemeClr val="tx1"/>
+          </a:fontRef>
+        </p:style>
+      </p:cxnSp>
+      <p:cxnSp>
+        <p:nvCxnSpPr>
+          <p:cNvPr id="60" name="Straight Arrow Connector 59"/>
+          <p:cNvCxnSpPr>
+            <a:stCxn id="34" idx="0"/>
+            <a:endCxn id="4" idx="2"/>
+          </p:cNvCxnSpPr>
+          <p:nvPr/>
+        </p:nvCxnSpPr>
+        <p:spPr>
+          <a:xfrm flipH="1" flipV="1">
+            <a:off x="5494614" y="4019265"/>
+            <a:ext cx="3298863" cy="527649"/>
+          </a:xfrm>
+          <a:prstGeom prst="straightConnector1">
+            <a:avLst/>
+          </a:prstGeom>
+          <a:ln>
+            <a:tailEnd type="triangle"/>
+          </a:ln>
+        </p:spPr>
+        <p:style>
+          <a:lnRef idx="1">
+            <a:schemeClr val="accent1"/>
+          </a:lnRef>
+          <a:fillRef idx="0">
+            <a:schemeClr val="accent1"/>
+          </a:fillRef>
+          <a:effectRef idx="0">
+            <a:schemeClr val="accent1"/>
+          </a:effectRef>
+          <a:fontRef idx="minor">
+            <a:schemeClr val="tx1"/>
+          </a:fontRef>
+        </p:style>
+      </p:cxnSp>
+      <p:sp>
+        <p:nvSpPr>
+          <p:cNvPr id="76" name="TextBox 75">
+            <a:extLst>
+              <a:ext uri="{FF2B5EF4-FFF2-40B4-BE49-F238E27FC236}">
+                <a16:creationId xmlns="" xmlns:a16="http://schemas.microsoft.com/office/drawing/2014/main" id="{E0BBD6C8-C8F2-40C5-AA64-85961A11ADC2}"/>
+              </a:ext>
+            </a:extLst>
+          </p:cNvPr>
+          <p:cNvSpPr txBox="1"/>
+          <p:nvPr/>
+        </p:nvSpPr>
+        <p:spPr>
+          <a:xfrm>
+            <a:off x="7384063" y="4088297"/>
+            <a:ext cx="843694" cy="276999"/>
+          </a:xfrm>
+          <a:prstGeom prst="rect">
+            <a:avLst/>
+          </a:prstGeom>
+          <a:noFill/>
+        </p:spPr>
+        <p:txBody>
+          <a:bodyPr wrap="square" rtlCol="0">
+            <a:spAutoFit/>
+          </a:bodyPr>
+          <a:lstStyle/>
+          <a:p>
+            <a:r>
+              <a:rPr lang="en-US" sz="1200" dirty="0"/>
+              <a:t>processes</a:t>
+            </a:r>
+          </a:p>
+        </p:txBody>
+      </p:sp>
+      <p:cxnSp>
+        <p:nvCxnSpPr>
+          <p:cNvPr id="78" name="Straight Arrow Connector 77"/>
+          <p:cNvCxnSpPr>
+            <a:stCxn id="57" idx="3"/>
+            <a:endCxn id="34" idx="2"/>
+          </p:cNvCxnSpPr>
+          <p:nvPr/>
+        </p:nvCxnSpPr>
+        <p:spPr>
+          <a:xfrm flipV="1">
+            <a:off x="5978173" y="5537970"/>
+            <a:ext cx="2815304" cy="615407"/>
+          </a:xfrm>
+          <a:prstGeom prst="straightConnector1">
+            <a:avLst/>
+          </a:prstGeom>
+          <a:ln>
+            <a:tailEnd type="triangle"/>
+          </a:ln>
+        </p:spPr>
+        <p:style>
+          <a:lnRef idx="1">
+            <a:schemeClr val="accent1"/>
+          </a:lnRef>
+          <a:fillRef idx="0">
+            <a:schemeClr val="accent1"/>
+          </a:fillRef>
+          <a:effectRef idx="0">
+            <a:schemeClr val="accent1"/>
+          </a:effectRef>
+          <a:fontRef idx="minor">
+            <a:schemeClr val="tx1"/>
+          </a:fontRef>
+        </p:style>
+      </p:cxnSp>
+      <p:cxnSp>
+        <p:nvCxnSpPr>
+          <p:cNvPr id="82" name="Straight Arrow Connector 81"/>
+          <p:cNvCxnSpPr>
+            <a:stCxn id="34" idx="2"/>
+            <a:endCxn id="57" idx="3"/>
+          </p:cNvCxnSpPr>
+          <p:nvPr/>
+        </p:nvCxnSpPr>
+        <p:spPr>
+          <a:xfrm flipH="1">
+            <a:off x="5978173" y="5537970"/>
+            <a:ext cx="2815304" cy="615407"/>
+          </a:xfrm>
+          <a:prstGeom prst="straightConnector1">
+            <a:avLst/>
+          </a:prstGeom>
+          <a:ln>
+            <a:tailEnd type="triangle"/>
+          </a:ln>
+        </p:spPr>
+        <p:style>
+          <a:lnRef idx="1">
+            <a:schemeClr val="accent1"/>
+          </a:lnRef>
+          <a:fillRef idx="0">
+            <a:schemeClr val="accent1"/>
+          </a:fillRef>
+          <a:effectRef idx="0">
+            <a:schemeClr val="accent1"/>
+          </a:effectRef>
+          <a:fontRef idx="minor">
+            <a:schemeClr val="tx1"/>
+          </a:fontRef>
+        </p:style>
+      </p:cxnSp>
+      <p:sp>
+        <p:nvSpPr>
+          <p:cNvPr id="86" name="TextBox 85">
+            <a:extLst>
+              <a:ext uri="{FF2B5EF4-FFF2-40B4-BE49-F238E27FC236}">
+                <a16:creationId xmlns="" xmlns:a16="http://schemas.microsoft.com/office/drawing/2014/main" id="{E0BBD6C8-C8F2-40C5-AA64-85961A11ADC2}"/>
+              </a:ext>
+            </a:extLst>
+          </p:cNvPr>
+          <p:cNvSpPr txBox="1"/>
+          <p:nvPr/>
+        </p:nvSpPr>
+        <p:spPr>
+          <a:xfrm>
+            <a:off x="7048786" y="5925642"/>
+            <a:ext cx="542221" cy="276999"/>
+          </a:xfrm>
+          <a:prstGeom prst="rect">
+            <a:avLst/>
+          </a:prstGeom>
+          <a:noFill/>
+        </p:spPr>
+        <p:txBody>
+          <a:bodyPr wrap="square" rtlCol="0">
+            <a:spAutoFit/>
+          </a:bodyPr>
+          <a:lstStyle/>
+          <a:p>
+            <a:r>
+              <a:rPr lang="en-US" sz="1200" dirty="0" smtClean="0"/>
+              <a:t>uses</a:t>
+            </a:r>
+            <a:endParaRPr lang="en-US" sz="1200" dirty="0"/>
+          </a:p>
+        </p:txBody>
+      </p:sp>
+      <p:sp>
+        <p:nvSpPr>
+          <p:cNvPr id="111" name="TextBox 110">
+            <a:extLst>
+              <a:ext uri="{FF2B5EF4-FFF2-40B4-BE49-F238E27FC236}">
+                <a16:creationId xmlns="" xmlns:a16="http://schemas.microsoft.com/office/drawing/2014/main" id="{E0BBD6C8-C8F2-40C5-AA64-85961A11ADC2}"/>
+              </a:ext>
+            </a:extLst>
+          </p:cNvPr>
+          <p:cNvSpPr txBox="1"/>
+          <p:nvPr/>
+        </p:nvSpPr>
+        <p:spPr>
+          <a:xfrm>
+            <a:off x="7572161" y="804511"/>
+            <a:ext cx="629494" cy="276999"/>
+          </a:xfrm>
+          <a:prstGeom prst="rect">
+            <a:avLst/>
+          </a:prstGeom>
+          <a:noFill/>
+        </p:spPr>
+        <p:txBody>
+          <a:bodyPr wrap="square" rtlCol="0">
+            <a:spAutoFit/>
+          </a:bodyPr>
+          <a:lstStyle/>
+          <a:p>
+            <a:r>
+              <a:rPr lang="en-US" sz="1200" dirty="0" smtClean="0"/>
+              <a:t>return</a:t>
             </a:r>
             <a:endParaRPr lang="en-US" sz="1200" dirty="0"/>
           </a:p>
@@ -5841,7 +6142,7 @@
           <p:cNvPr id="89" name="Rectangle 88">
             <a:extLst>
               <a:ext uri="{FF2B5EF4-FFF2-40B4-BE49-F238E27FC236}">
-                <a16:creationId xmlns:a16="http://schemas.microsoft.com/office/drawing/2014/main" xmlns="" id="{EED827AB-78FC-41AC-8676-30DA25D7C5FC}"/>
+                <a16:creationId xmlns="" xmlns:a16="http://schemas.microsoft.com/office/drawing/2014/main" id="{EED827AB-78FC-41AC-8676-30DA25D7C5FC}"/>
               </a:ext>
             </a:extLst>
           </p:cNvPr>
@@ -5919,7 +6220,7 @@
           <p:cNvPr id="62" name="Rectangle 61">
             <a:extLst>
               <a:ext uri="{FF2B5EF4-FFF2-40B4-BE49-F238E27FC236}">
-                <a16:creationId xmlns:a16="http://schemas.microsoft.com/office/drawing/2014/main" xmlns="" id="{C3FE7107-D2B1-4448-B03A-F2CE9B45CFD6}"/>
+                <a16:creationId xmlns="" xmlns:a16="http://schemas.microsoft.com/office/drawing/2014/main" id="{C3FE7107-D2B1-4448-B03A-F2CE9B45CFD6}"/>
               </a:ext>
             </a:extLst>
           </p:cNvPr>
@@ -5983,7 +6284,7 @@
           <p:cNvPr id="61" name="Rectangle 60">
             <a:extLst>
               <a:ext uri="{FF2B5EF4-FFF2-40B4-BE49-F238E27FC236}">
-                <a16:creationId xmlns:a16="http://schemas.microsoft.com/office/drawing/2014/main" xmlns="" id="{2F7B40FD-C5BA-431D-AE99-1CB70F1BAB88}"/>
+                <a16:creationId xmlns="" xmlns:a16="http://schemas.microsoft.com/office/drawing/2014/main" id="{2F7B40FD-C5BA-431D-AE99-1CB70F1BAB88}"/>
               </a:ext>
             </a:extLst>
           </p:cNvPr>
@@ -6042,7 +6343,7 @@
           <p:cNvPr id="60" name="Rectangle 59">
             <a:extLst>
               <a:ext uri="{FF2B5EF4-FFF2-40B4-BE49-F238E27FC236}">
-                <a16:creationId xmlns:a16="http://schemas.microsoft.com/office/drawing/2014/main" xmlns="" id="{CF3E4DE9-C6F2-4C11-BE7F-2753CDEFE535}"/>
+                <a16:creationId xmlns="" xmlns:a16="http://schemas.microsoft.com/office/drawing/2014/main" id="{CF3E4DE9-C6F2-4C11-BE7F-2753CDEFE535}"/>
               </a:ext>
             </a:extLst>
           </p:cNvPr>
@@ -6424,7 +6725,7 @@
           <p:cNvPr id="19" name="TextBox 18">
             <a:extLst>
               <a:ext uri="{FF2B5EF4-FFF2-40B4-BE49-F238E27FC236}">
-                <a16:creationId xmlns:a16="http://schemas.microsoft.com/office/drawing/2014/main" xmlns="" id="{E0BBD6C8-C8F2-40C5-AA64-85961A11ADC2}"/>
+                <a16:creationId xmlns="" xmlns:a16="http://schemas.microsoft.com/office/drawing/2014/main" id="{E0BBD6C8-C8F2-40C5-AA64-85961A11ADC2}"/>
               </a:ext>
             </a:extLst>
           </p:cNvPr>
@@ -6554,7 +6855,7 @@
           <p:cNvPr id="23" name="TextBox 22">
             <a:extLst>
               <a:ext uri="{FF2B5EF4-FFF2-40B4-BE49-F238E27FC236}">
-                <a16:creationId xmlns:a16="http://schemas.microsoft.com/office/drawing/2014/main" xmlns="" id="{E0BBD6C8-C8F2-40C5-AA64-85961A11ADC2}"/>
+                <a16:creationId xmlns="" xmlns:a16="http://schemas.microsoft.com/office/drawing/2014/main" id="{E0BBD6C8-C8F2-40C5-AA64-85961A11ADC2}"/>
               </a:ext>
             </a:extLst>
           </p:cNvPr>
@@ -6671,7 +6972,7 @@
           <p:cNvPr id="28" name="TextBox 27">
             <a:extLst>
               <a:ext uri="{FF2B5EF4-FFF2-40B4-BE49-F238E27FC236}">
-                <a16:creationId xmlns:a16="http://schemas.microsoft.com/office/drawing/2014/main" xmlns="" id="{E0BBD6C8-C8F2-40C5-AA64-85961A11ADC2}"/>
+                <a16:creationId xmlns="" xmlns:a16="http://schemas.microsoft.com/office/drawing/2014/main" id="{E0BBD6C8-C8F2-40C5-AA64-85961A11ADC2}"/>
               </a:ext>
             </a:extLst>
           </p:cNvPr>
@@ -6795,7 +7096,7 @@
           <p:cNvPr id="34" name="TextBox 33">
             <a:extLst>
               <a:ext uri="{FF2B5EF4-FFF2-40B4-BE49-F238E27FC236}">
-                <a16:creationId xmlns:a16="http://schemas.microsoft.com/office/drawing/2014/main" xmlns="" id="{E0BBD6C8-C8F2-40C5-AA64-85961A11ADC2}"/>
+                <a16:creationId xmlns="" xmlns:a16="http://schemas.microsoft.com/office/drawing/2014/main" id="{E0BBD6C8-C8F2-40C5-AA64-85961A11ADC2}"/>
               </a:ext>
             </a:extLst>
           </p:cNvPr>
@@ -6921,7 +7222,7 @@
           <p:cNvPr id="38" name="TextBox 37">
             <a:extLst>
               <a:ext uri="{FF2B5EF4-FFF2-40B4-BE49-F238E27FC236}">
-                <a16:creationId xmlns:a16="http://schemas.microsoft.com/office/drawing/2014/main" xmlns="" id="{E0BBD6C8-C8F2-40C5-AA64-85961A11ADC2}"/>
+                <a16:creationId xmlns="" xmlns:a16="http://schemas.microsoft.com/office/drawing/2014/main" id="{E0BBD6C8-C8F2-40C5-AA64-85961A11ADC2}"/>
               </a:ext>
             </a:extLst>
           </p:cNvPr>
@@ -7091,7 +7392,7 @@
           <p:cNvPr id="44" name="TextBox 43">
             <a:extLst>
               <a:ext uri="{FF2B5EF4-FFF2-40B4-BE49-F238E27FC236}">
-                <a16:creationId xmlns:a16="http://schemas.microsoft.com/office/drawing/2014/main" xmlns="" id="{E0BBD6C8-C8F2-40C5-AA64-85961A11ADC2}"/>
+                <a16:creationId xmlns="" xmlns:a16="http://schemas.microsoft.com/office/drawing/2014/main" id="{E0BBD6C8-C8F2-40C5-AA64-85961A11ADC2}"/>
               </a:ext>
             </a:extLst>
           </p:cNvPr>
@@ -7126,7 +7427,7 @@
           <p:cNvPr id="45" name="TextBox 44">
             <a:extLst>
               <a:ext uri="{FF2B5EF4-FFF2-40B4-BE49-F238E27FC236}">
-                <a16:creationId xmlns:a16="http://schemas.microsoft.com/office/drawing/2014/main" xmlns="" id="{E0BBD6C8-C8F2-40C5-AA64-85961A11ADC2}"/>
+                <a16:creationId xmlns="" xmlns:a16="http://schemas.microsoft.com/office/drawing/2014/main" id="{E0BBD6C8-C8F2-40C5-AA64-85961A11ADC2}"/>
               </a:ext>
             </a:extLst>
           </p:cNvPr>
@@ -7173,7 +7474,7 @@
           <p:cNvPr id="26" name="TextBox 25">
             <a:extLst>
               <a:ext uri="{FF2B5EF4-FFF2-40B4-BE49-F238E27FC236}">
-                <a16:creationId xmlns:a16="http://schemas.microsoft.com/office/drawing/2014/main" xmlns="" id="{6C45E26E-8FEE-4439-A34B-789237C9C62C}"/>
+                <a16:creationId xmlns="" xmlns:a16="http://schemas.microsoft.com/office/drawing/2014/main" id="{6C45E26E-8FEE-4439-A34B-789237C9C62C}"/>
               </a:ext>
             </a:extLst>
           </p:cNvPr>
@@ -7208,7 +7509,7 @@
           <p:cNvPr id="31" name="Rectangle 30">
             <a:extLst>
               <a:ext uri="{FF2B5EF4-FFF2-40B4-BE49-F238E27FC236}">
-                <a16:creationId xmlns:a16="http://schemas.microsoft.com/office/drawing/2014/main" xmlns="" id="{6D396BFC-10E0-4935-903B-EDC457BD1755}"/>
+                <a16:creationId xmlns="" xmlns:a16="http://schemas.microsoft.com/office/drawing/2014/main" id="{6D396BFC-10E0-4935-903B-EDC457BD1755}"/>
               </a:ext>
             </a:extLst>
           </p:cNvPr>
@@ -7268,7 +7569,7 @@
           <p:cNvPr id="32" name="Rectangle 31">
             <a:extLst>
               <a:ext uri="{FF2B5EF4-FFF2-40B4-BE49-F238E27FC236}">
-                <a16:creationId xmlns:a16="http://schemas.microsoft.com/office/drawing/2014/main" xmlns="" id="{02A645C8-F11F-438D-92DC-F6FCCA5ECFB8}"/>
+                <a16:creationId xmlns="" xmlns:a16="http://schemas.microsoft.com/office/drawing/2014/main" id="{02A645C8-F11F-438D-92DC-F6FCCA5ECFB8}"/>
               </a:ext>
             </a:extLst>
           </p:cNvPr>
@@ -7328,7 +7629,7 @@
           <p:cNvPr id="12" name="Straight Arrow Connector 11">
             <a:extLst>
               <a:ext uri="{FF2B5EF4-FFF2-40B4-BE49-F238E27FC236}">
-                <a16:creationId xmlns:a16="http://schemas.microsoft.com/office/drawing/2014/main" xmlns="" id="{FF2076CA-F897-4293-B6CD-7408EB452156}"/>
+                <a16:creationId xmlns="" xmlns:a16="http://schemas.microsoft.com/office/drawing/2014/main" id="{FF2076CA-F897-4293-B6CD-7408EB452156}"/>
               </a:ext>
             </a:extLst>
           </p:cNvPr>
@@ -7371,7 +7672,7 @@
           <p:cNvPr id="14" name="Straight Arrow Connector 13">
             <a:extLst>
               <a:ext uri="{FF2B5EF4-FFF2-40B4-BE49-F238E27FC236}">
-                <a16:creationId xmlns:a16="http://schemas.microsoft.com/office/drawing/2014/main" xmlns="" id="{5C625B7B-4A1E-46C5-9082-4FEC89B30DA9}"/>
+                <a16:creationId xmlns="" xmlns:a16="http://schemas.microsoft.com/office/drawing/2014/main" id="{5C625B7B-4A1E-46C5-9082-4FEC89B30DA9}"/>
               </a:ext>
             </a:extLst>
           </p:cNvPr>
@@ -7414,7 +7715,7 @@
           <p:cNvPr id="65" name="Straight Arrow Connector 64">
             <a:extLst>
               <a:ext uri="{FF2B5EF4-FFF2-40B4-BE49-F238E27FC236}">
-                <a16:creationId xmlns:a16="http://schemas.microsoft.com/office/drawing/2014/main" xmlns="" id="{C1C9B843-1D11-4D9F-8CBF-AE00E90AA070}"/>
+                <a16:creationId xmlns="" xmlns:a16="http://schemas.microsoft.com/office/drawing/2014/main" id="{C1C9B843-1D11-4D9F-8CBF-AE00E90AA070}"/>
               </a:ext>
             </a:extLst>
           </p:cNvPr>
@@ -7456,7 +7757,7 @@
           <p:cNvPr id="66" name="TextBox 65">
             <a:extLst>
               <a:ext uri="{FF2B5EF4-FFF2-40B4-BE49-F238E27FC236}">
-                <a16:creationId xmlns:a16="http://schemas.microsoft.com/office/drawing/2014/main" xmlns="" id="{5E4B2700-0522-40EF-B035-166AA1C17D76}"/>
+                <a16:creationId xmlns="" xmlns:a16="http://schemas.microsoft.com/office/drawing/2014/main" id="{5E4B2700-0522-40EF-B035-166AA1C17D76}"/>
               </a:ext>
             </a:extLst>
           </p:cNvPr>
@@ -7580,7 +7881,7 @@
           <p:cNvPr id="48" name="TextBox 47">
             <a:extLst>
               <a:ext uri="{FF2B5EF4-FFF2-40B4-BE49-F238E27FC236}">
-                <a16:creationId xmlns:a16="http://schemas.microsoft.com/office/drawing/2014/main" xmlns="" id="{E0BBD6C8-C8F2-40C5-AA64-85961A11ADC2}"/>
+                <a16:creationId xmlns="" xmlns:a16="http://schemas.microsoft.com/office/drawing/2014/main" id="{E0BBD6C8-C8F2-40C5-AA64-85961A11ADC2}"/>
               </a:ext>
             </a:extLst>
           </p:cNvPr>
@@ -7615,7 +7916,7 @@
           <p:cNvPr id="52" name="Rectangle 51">
             <a:extLst>
               <a:ext uri="{FF2B5EF4-FFF2-40B4-BE49-F238E27FC236}">
-                <a16:creationId xmlns:a16="http://schemas.microsoft.com/office/drawing/2014/main" xmlns="" id="{21B869D6-66CB-4B38-975F-B7FEB6AA9B13}"/>
+                <a16:creationId xmlns="" xmlns:a16="http://schemas.microsoft.com/office/drawing/2014/main" id="{21B869D6-66CB-4B38-975F-B7FEB6AA9B13}"/>
               </a:ext>
             </a:extLst>
           </p:cNvPr>
@@ -7738,7 +8039,7 @@
           <p:cNvPr id="58" name="TextBox 57">
             <a:extLst>
               <a:ext uri="{FF2B5EF4-FFF2-40B4-BE49-F238E27FC236}">
-                <a16:creationId xmlns:a16="http://schemas.microsoft.com/office/drawing/2014/main" xmlns="" id="{E0BBD6C8-C8F2-40C5-AA64-85961A11ADC2}"/>
+                <a16:creationId xmlns="" xmlns:a16="http://schemas.microsoft.com/office/drawing/2014/main" id="{E0BBD6C8-C8F2-40C5-AA64-85961A11ADC2}"/>
               </a:ext>
             </a:extLst>
           </p:cNvPr>
@@ -7846,7 +8147,7 @@
           <p:cNvPr id="94" name="TextBox 93">
             <a:extLst>
               <a:ext uri="{FF2B5EF4-FFF2-40B4-BE49-F238E27FC236}">
-                <a16:creationId xmlns:a16="http://schemas.microsoft.com/office/drawing/2014/main" xmlns="" id="{E0BBD6C8-C8F2-40C5-AA64-85961A11ADC2}"/>
+                <a16:creationId xmlns="" xmlns:a16="http://schemas.microsoft.com/office/drawing/2014/main" id="{E0BBD6C8-C8F2-40C5-AA64-85961A11ADC2}"/>
               </a:ext>
             </a:extLst>
           </p:cNvPr>
@@ -7881,7 +8182,7 @@
           <p:cNvPr id="95" name="TextBox 94">
             <a:extLst>
               <a:ext uri="{FF2B5EF4-FFF2-40B4-BE49-F238E27FC236}">
-                <a16:creationId xmlns:a16="http://schemas.microsoft.com/office/drawing/2014/main" xmlns="" id="{E0BBD6C8-C8F2-40C5-AA64-85961A11ADC2}"/>
+                <a16:creationId xmlns="" xmlns:a16="http://schemas.microsoft.com/office/drawing/2014/main" id="{E0BBD6C8-C8F2-40C5-AA64-85961A11ADC2}"/>
               </a:ext>
             </a:extLst>
           </p:cNvPr>
@@ -7916,7 +8217,7 @@
           <p:cNvPr id="49" name="Rectangle 48">
             <a:extLst>
               <a:ext uri="{FF2B5EF4-FFF2-40B4-BE49-F238E27FC236}">
-                <a16:creationId xmlns:a16="http://schemas.microsoft.com/office/drawing/2014/main" xmlns="" id="{02A645C8-F11F-438D-92DC-F6FCCA5ECFB8}"/>
+                <a16:creationId xmlns="" xmlns:a16="http://schemas.microsoft.com/office/drawing/2014/main" id="{02A645C8-F11F-438D-92DC-F6FCCA5ECFB8}"/>
               </a:ext>
             </a:extLst>
           </p:cNvPr>
@@ -8013,7 +8314,7 @@
           <p:cNvPr id="57" name="Rectangle 56">
             <a:extLst>
               <a:ext uri="{FF2B5EF4-FFF2-40B4-BE49-F238E27FC236}">
-                <a16:creationId xmlns:a16="http://schemas.microsoft.com/office/drawing/2014/main" xmlns="" id="{93FBA679-F71B-47BD-BE29-21E7C2262CEB}"/>
+                <a16:creationId xmlns="" xmlns:a16="http://schemas.microsoft.com/office/drawing/2014/main" id="{93FBA679-F71B-47BD-BE29-21E7C2262CEB}"/>
               </a:ext>
             </a:extLst>
           </p:cNvPr>
@@ -8123,7 +8424,7 @@
           <p:cNvPr id="59" name="TextBox 58">
             <a:extLst>
               <a:ext uri="{FF2B5EF4-FFF2-40B4-BE49-F238E27FC236}">
-                <a16:creationId xmlns:a16="http://schemas.microsoft.com/office/drawing/2014/main" xmlns="" id="{5E4B2700-0522-40EF-B035-166AA1C17D76}"/>
+                <a16:creationId xmlns="" xmlns:a16="http://schemas.microsoft.com/office/drawing/2014/main" id="{5E4B2700-0522-40EF-B035-166AA1C17D76}"/>
               </a:ext>
             </a:extLst>
           </p:cNvPr>
@@ -8196,10 +8497,10 @@
           <p:cNvPr id="12" name="Rectangle 11">
             <a:extLst>
               <a:ext uri="{FF2B5EF4-FFF2-40B4-BE49-F238E27FC236}">
-                <a16:creationId xmlns:a16="http://schemas.microsoft.com/office/drawing/2014/main" xmlns="" id="{6753252F-4873-4F63-801D-CC719279A7D5}"/>
+                <a16:creationId xmlns="" xmlns:a16="http://schemas.microsoft.com/office/drawing/2014/main" id="{6753252F-4873-4F63-801D-CC719279A7D5}"/>
               </a:ext>
               <a:ext uri="{C183D7F6-B498-43B3-948B-1728B52AA6E4}">
-                <adec:decorative xmlns:adec="http://schemas.microsoft.com/office/drawing/2017/decorative" xmlns="" val="1"/>
+                <adec:decorative xmlns="" xmlns:adec="http://schemas.microsoft.com/office/drawing/2017/decorative" val="1"/>
               </a:ext>
             </a:extLst>
           </p:cNvPr>
@@ -8209,7 +8510,7 @@
           <p:nvPr>
             <p:extLst>
               <p:ext uri="{386F3935-93C4-4BCD-93E2-E3B085C9AB24}">
-                <p16:designElem xmlns:p16="http://schemas.microsoft.com/office/powerpoint/2015/main" xmlns="" val="1"/>
+                <p16:designElem xmlns="" xmlns:p16="http://schemas.microsoft.com/office/powerpoint/2015/main" val="1"/>
               </p:ext>
             </p:extLst>
           </p:nvPr>
@@ -8259,10 +8560,10 @@
           <p:cNvPr id="14" name="Rectangle 13">
             <a:extLst>
               <a:ext uri="{FF2B5EF4-FFF2-40B4-BE49-F238E27FC236}">
-                <a16:creationId xmlns:a16="http://schemas.microsoft.com/office/drawing/2014/main" xmlns="" id="{047C8CCB-F95D-4249-92DD-651249D3535A}"/>
+                <a16:creationId xmlns="" xmlns:a16="http://schemas.microsoft.com/office/drawing/2014/main" id="{047C8CCB-F95D-4249-92DD-651249D3535A}"/>
               </a:ext>
               <a:ext uri="{C183D7F6-B498-43B3-948B-1728B52AA6E4}">
-                <adec:decorative xmlns:adec="http://schemas.microsoft.com/office/drawing/2017/decorative" xmlns="" val="1"/>
+                <adec:decorative xmlns="" xmlns:adec="http://schemas.microsoft.com/office/drawing/2017/decorative" val="1"/>
               </a:ext>
             </a:extLst>
           </p:cNvPr>
@@ -8272,7 +8573,7 @@
           <p:nvPr>
             <p:extLst>
               <p:ext uri="{386F3935-93C4-4BCD-93E2-E3B085C9AB24}">
-                <p16:designElem xmlns:p16="http://schemas.microsoft.com/office/powerpoint/2015/main" xmlns="" val="1"/>
+                <p16:designElem xmlns="" xmlns:p16="http://schemas.microsoft.com/office/powerpoint/2015/main" val="1"/>
               </p:ext>
             </p:extLst>
           </p:nvPr>
@@ -8322,7 +8623,7 @@
           <p:cNvPr id="5" name="TextBox 4">
             <a:extLst>
               <a:ext uri="{FF2B5EF4-FFF2-40B4-BE49-F238E27FC236}">
-                <a16:creationId xmlns:a16="http://schemas.microsoft.com/office/drawing/2014/main" xmlns="" id="{6C45E26E-8FEE-4439-A34B-789237C9C62C}"/>
+                <a16:creationId xmlns="" xmlns:a16="http://schemas.microsoft.com/office/drawing/2014/main" id="{6C45E26E-8FEE-4439-A34B-789237C9C62C}"/>
               </a:ext>
             </a:extLst>
           </p:cNvPr>
@@ -8379,7 +8680,7 @@
       </p:sp>
       <p:pic>
         <p:nvPicPr>
-          <p:cNvPr id="2" name="Picture 1"/>
+          <p:cNvPr id="6" name="Picture 5"/>
           <p:cNvPicPr>
             <a:picLocks noChangeAspect="1"/>
           </p:cNvPicPr>
@@ -8393,8 +8694,8 @@
         </p:blipFill>
         <p:spPr>
           <a:xfrm>
-            <a:off x="3800161" y="1033462"/>
-            <a:ext cx="7000875" cy="4791075"/>
+            <a:off x="4133736" y="993024"/>
+            <a:ext cx="6629400" cy="4543425"/>
           </a:xfrm>
           <a:prstGeom prst="rect">
             <a:avLst/>
@@ -8443,8 +8744,8 @@
         </p:nvSpPr>
         <p:spPr>
           <a:xfrm>
-            <a:off x="954820" y="819150"/>
-            <a:ext cx="9144000" cy="5683250"/>
+            <a:off x="954820" y="819149"/>
+            <a:ext cx="9144000" cy="5888275"/>
           </a:xfrm>
         </p:spPr>
         <p:txBody>
@@ -8739,7 +9040,21 @@
             </a:r>
             <a:r>
               <a:rPr lang="en-US" dirty="0" smtClean="0"/>
-              <a:t>for some initial endpoint tests</a:t>
+              <a:t>for some initial endpoint </a:t>
+            </a:r>
+            <a:r>
+              <a:rPr lang="en-US" dirty="0" smtClean="0"/>
+              <a:t>tests</a:t>
+            </a:r>
+          </a:p>
+          <a:p>
+            <a:pPr marL="800100" lvl="1" indent="-342900" algn="l">
+              <a:buFont typeface="Arial" panose="020B0604020202020204" pitchFamily="34" charset="0"/>
+              <a:buChar char="•"/>
+            </a:pPr>
+            <a:r>
+              <a:rPr lang="en-US" dirty="0" smtClean="0"/>
+              <a:t>Internal test drivers and Admin driver</a:t>
             </a:r>
             <a:endParaRPr lang="en-US" dirty="0"/>
           </a:p>

</xml_diff>

<commit_message>
20210826 2019 tlw87 checkpoint [corrected null object].
</commit_message>
<xml_diff>
--- a/docs/ERS.pptx
+++ b/docs/ERS.pptx
@@ -9,7 +9,8 @@
     <p:sldId id="270" r:id="rId3"/>
     <p:sldId id="265" r:id="rId4"/>
     <p:sldId id="269" r:id="rId5"/>
-    <p:sldId id="267" r:id="rId6"/>
+    <p:sldId id="271" r:id="rId6"/>
+    <p:sldId id="267" r:id="rId7"/>
   </p:sldIdLst>
   <p:sldSz cx="12192000" cy="6858000"/>
   <p:notesSz cx="6858000" cy="9144000"/>
@@ -138,7 +139,7 @@
           <p:cNvPr id="2" name="Title 1">
             <a:extLst>
               <a:ext uri="{FF2B5EF4-FFF2-40B4-BE49-F238E27FC236}">
-                <a16:creationId xmlns="" xmlns:a16="http://schemas.microsoft.com/office/drawing/2014/main" id="{67106D7E-D400-44F1-9A1A-D68CE501C73D}"/>
+                <a16:creationId xmlns:a16="http://schemas.microsoft.com/office/drawing/2014/main" id="{67106D7E-D400-44F1-9A1A-D68CE501C73D}"/>
               </a:ext>
             </a:extLst>
           </p:cNvPr>
@@ -175,7 +176,7 @@
           <p:cNvPr id="3" name="Subtitle 2">
             <a:extLst>
               <a:ext uri="{FF2B5EF4-FFF2-40B4-BE49-F238E27FC236}">
-                <a16:creationId xmlns="" xmlns:a16="http://schemas.microsoft.com/office/drawing/2014/main" id="{A5FDE527-E621-4639-A0C7-E1E9B0DFBCEC}"/>
+                <a16:creationId xmlns:a16="http://schemas.microsoft.com/office/drawing/2014/main" id="{A5FDE527-E621-4639-A0C7-E1E9B0DFBCEC}"/>
               </a:ext>
             </a:extLst>
           </p:cNvPr>
@@ -245,7 +246,7 @@
           <p:cNvPr id="4" name="Date Placeholder 3">
             <a:extLst>
               <a:ext uri="{FF2B5EF4-FFF2-40B4-BE49-F238E27FC236}">
-                <a16:creationId xmlns="" xmlns:a16="http://schemas.microsoft.com/office/drawing/2014/main" id="{E109CE88-B989-4109-89C8-36F7C245DB1C}"/>
+                <a16:creationId xmlns:a16="http://schemas.microsoft.com/office/drawing/2014/main" id="{E109CE88-B989-4109-89C8-36F7C245DB1C}"/>
               </a:ext>
             </a:extLst>
           </p:cNvPr>
@@ -274,7 +275,7 @@
           <p:cNvPr id="5" name="Footer Placeholder 4">
             <a:extLst>
               <a:ext uri="{FF2B5EF4-FFF2-40B4-BE49-F238E27FC236}">
-                <a16:creationId xmlns="" xmlns:a16="http://schemas.microsoft.com/office/drawing/2014/main" id="{0841498F-B991-43D3-B408-CC35D8EFCF37}"/>
+                <a16:creationId xmlns:a16="http://schemas.microsoft.com/office/drawing/2014/main" id="{0841498F-B991-43D3-B408-CC35D8EFCF37}"/>
               </a:ext>
             </a:extLst>
           </p:cNvPr>
@@ -299,7 +300,7 @@
           <p:cNvPr id="6" name="Slide Number Placeholder 5">
             <a:extLst>
               <a:ext uri="{FF2B5EF4-FFF2-40B4-BE49-F238E27FC236}">
-                <a16:creationId xmlns="" xmlns:a16="http://schemas.microsoft.com/office/drawing/2014/main" id="{01754CB8-17B1-45A0-AE7D-755EAA1B69D8}"/>
+                <a16:creationId xmlns:a16="http://schemas.microsoft.com/office/drawing/2014/main" id="{01754CB8-17B1-45A0-AE7D-755EAA1B69D8}"/>
               </a:ext>
             </a:extLst>
           </p:cNvPr>
@@ -358,7 +359,7 @@
           <p:cNvPr id="2" name="Title 1">
             <a:extLst>
               <a:ext uri="{FF2B5EF4-FFF2-40B4-BE49-F238E27FC236}">
-                <a16:creationId xmlns="" xmlns:a16="http://schemas.microsoft.com/office/drawing/2014/main" id="{E7A7B055-5DC2-440D-83C1-CAAE8E9A8E14}"/>
+                <a16:creationId xmlns:a16="http://schemas.microsoft.com/office/drawing/2014/main" id="{E7A7B055-5DC2-440D-83C1-CAAE8E9A8E14}"/>
               </a:ext>
             </a:extLst>
           </p:cNvPr>
@@ -386,7 +387,7 @@
           <p:cNvPr id="3" name="Vertical Text Placeholder 2">
             <a:extLst>
               <a:ext uri="{FF2B5EF4-FFF2-40B4-BE49-F238E27FC236}">
-                <a16:creationId xmlns="" xmlns:a16="http://schemas.microsoft.com/office/drawing/2014/main" id="{65710707-423D-4F9D-A49D-6C764C562553}"/>
+                <a16:creationId xmlns:a16="http://schemas.microsoft.com/office/drawing/2014/main" id="{65710707-423D-4F9D-A49D-6C764C562553}"/>
               </a:ext>
             </a:extLst>
           </p:cNvPr>
@@ -443,7 +444,7 @@
           <p:cNvPr id="4" name="Date Placeholder 3">
             <a:extLst>
               <a:ext uri="{FF2B5EF4-FFF2-40B4-BE49-F238E27FC236}">
-                <a16:creationId xmlns="" xmlns:a16="http://schemas.microsoft.com/office/drawing/2014/main" id="{98B6F7EF-D1BE-4437-85F3-99626E37E4EF}"/>
+                <a16:creationId xmlns:a16="http://schemas.microsoft.com/office/drawing/2014/main" id="{98B6F7EF-D1BE-4437-85F3-99626E37E4EF}"/>
               </a:ext>
             </a:extLst>
           </p:cNvPr>
@@ -472,7 +473,7 @@
           <p:cNvPr id="5" name="Footer Placeholder 4">
             <a:extLst>
               <a:ext uri="{FF2B5EF4-FFF2-40B4-BE49-F238E27FC236}">
-                <a16:creationId xmlns="" xmlns:a16="http://schemas.microsoft.com/office/drawing/2014/main" id="{D890AA9B-E479-4209-B245-83608F3D4013}"/>
+                <a16:creationId xmlns:a16="http://schemas.microsoft.com/office/drawing/2014/main" id="{D890AA9B-E479-4209-B245-83608F3D4013}"/>
               </a:ext>
             </a:extLst>
           </p:cNvPr>
@@ -497,7 +498,7 @@
           <p:cNvPr id="6" name="Slide Number Placeholder 5">
             <a:extLst>
               <a:ext uri="{FF2B5EF4-FFF2-40B4-BE49-F238E27FC236}">
-                <a16:creationId xmlns="" xmlns:a16="http://schemas.microsoft.com/office/drawing/2014/main" id="{0E4976E4-E15A-4296-A430-633D2BB9142B}"/>
+                <a16:creationId xmlns:a16="http://schemas.microsoft.com/office/drawing/2014/main" id="{0E4976E4-E15A-4296-A430-633D2BB9142B}"/>
               </a:ext>
             </a:extLst>
           </p:cNvPr>
@@ -556,7 +557,7 @@
           <p:cNvPr id="2" name="Vertical Title 1">
             <a:extLst>
               <a:ext uri="{FF2B5EF4-FFF2-40B4-BE49-F238E27FC236}">
-                <a16:creationId xmlns="" xmlns:a16="http://schemas.microsoft.com/office/drawing/2014/main" id="{66F63CF5-8DEE-4BB2-A2A5-5C16FEBE1AD5}"/>
+                <a16:creationId xmlns:a16="http://schemas.microsoft.com/office/drawing/2014/main" id="{66F63CF5-8DEE-4BB2-A2A5-5C16FEBE1AD5}"/>
               </a:ext>
             </a:extLst>
           </p:cNvPr>
@@ -589,7 +590,7 @@
           <p:cNvPr id="3" name="Vertical Text Placeholder 2">
             <a:extLst>
               <a:ext uri="{FF2B5EF4-FFF2-40B4-BE49-F238E27FC236}">
-                <a16:creationId xmlns="" xmlns:a16="http://schemas.microsoft.com/office/drawing/2014/main" id="{E0D5EBA5-94AF-4373-B032-A40FF73C7575}"/>
+                <a16:creationId xmlns:a16="http://schemas.microsoft.com/office/drawing/2014/main" id="{E0D5EBA5-94AF-4373-B032-A40FF73C7575}"/>
               </a:ext>
             </a:extLst>
           </p:cNvPr>
@@ -651,7 +652,7 @@
           <p:cNvPr id="4" name="Date Placeholder 3">
             <a:extLst>
               <a:ext uri="{FF2B5EF4-FFF2-40B4-BE49-F238E27FC236}">
-                <a16:creationId xmlns="" xmlns:a16="http://schemas.microsoft.com/office/drawing/2014/main" id="{7426B8E1-6758-4F5E-B618-96641332600B}"/>
+                <a16:creationId xmlns:a16="http://schemas.microsoft.com/office/drawing/2014/main" id="{7426B8E1-6758-4F5E-B618-96641332600B}"/>
               </a:ext>
             </a:extLst>
           </p:cNvPr>
@@ -680,7 +681,7 @@
           <p:cNvPr id="5" name="Footer Placeholder 4">
             <a:extLst>
               <a:ext uri="{FF2B5EF4-FFF2-40B4-BE49-F238E27FC236}">
-                <a16:creationId xmlns="" xmlns:a16="http://schemas.microsoft.com/office/drawing/2014/main" id="{F65E330E-2A7E-482D-AE0F-70EA5A29958B}"/>
+                <a16:creationId xmlns:a16="http://schemas.microsoft.com/office/drawing/2014/main" id="{F65E330E-2A7E-482D-AE0F-70EA5A29958B}"/>
               </a:ext>
             </a:extLst>
           </p:cNvPr>
@@ -705,7 +706,7 @@
           <p:cNvPr id="6" name="Slide Number Placeholder 5">
             <a:extLst>
               <a:ext uri="{FF2B5EF4-FFF2-40B4-BE49-F238E27FC236}">
-                <a16:creationId xmlns="" xmlns:a16="http://schemas.microsoft.com/office/drawing/2014/main" id="{B8000005-FC38-4A6C-9D09-7945EFA08160}"/>
+                <a16:creationId xmlns:a16="http://schemas.microsoft.com/office/drawing/2014/main" id="{B8000005-FC38-4A6C-9D09-7945EFA08160}"/>
               </a:ext>
             </a:extLst>
           </p:cNvPr>
@@ -764,7 +765,7 @@
           <p:cNvPr id="2" name="Title 1">
             <a:extLst>
               <a:ext uri="{FF2B5EF4-FFF2-40B4-BE49-F238E27FC236}">
-                <a16:creationId xmlns="" xmlns:a16="http://schemas.microsoft.com/office/drawing/2014/main" id="{91D0002C-766B-44B4-A24C-BE6DE6C7BA4C}"/>
+                <a16:creationId xmlns:a16="http://schemas.microsoft.com/office/drawing/2014/main" id="{91D0002C-766B-44B4-A24C-BE6DE6C7BA4C}"/>
               </a:ext>
             </a:extLst>
           </p:cNvPr>
@@ -792,7 +793,7 @@
           <p:cNvPr id="3" name="Content Placeholder 2">
             <a:extLst>
               <a:ext uri="{FF2B5EF4-FFF2-40B4-BE49-F238E27FC236}">
-                <a16:creationId xmlns="" xmlns:a16="http://schemas.microsoft.com/office/drawing/2014/main" id="{3455BAA9-6C7B-4874-AD76-BD466F64802D}"/>
+                <a16:creationId xmlns:a16="http://schemas.microsoft.com/office/drawing/2014/main" id="{3455BAA9-6C7B-4874-AD76-BD466F64802D}"/>
               </a:ext>
             </a:extLst>
           </p:cNvPr>
@@ -849,7 +850,7 @@
           <p:cNvPr id="4" name="Date Placeholder 3">
             <a:extLst>
               <a:ext uri="{FF2B5EF4-FFF2-40B4-BE49-F238E27FC236}">
-                <a16:creationId xmlns="" xmlns:a16="http://schemas.microsoft.com/office/drawing/2014/main" id="{8776BDAF-D8F2-4A61-904D-094BB4545702}"/>
+                <a16:creationId xmlns:a16="http://schemas.microsoft.com/office/drawing/2014/main" id="{8776BDAF-D8F2-4A61-904D-094BB4545702}"/>
               </a:ext>
             </a:extLst>
           </p:cNvPr>
@@ -878,7 +879,7 @@
           <p:cNvPr id="5" name="Footer Placeholder 4">
             <a:extLst>
               <a:ext uri="{FF2B5EF4-FFF2-40B4-BE49-F238E27FC236}">
-                <a16:creationId xmlns="" xmlns:a16="http://schemas.microsoft.com/office/drawing/2014/main" id="{F89C5665-4384-4706-9BD2-9F42B05C96BC}"/>
+                <a16:creationId xmlns:a16="http://schemas.microsoft.com/office/drawing/2014/main" id="{F89C5665-4384-4706-9BD2-9F42B05C96BC}"/>
               </a:ext>
             </a:extLst>
           </p:cNvPr>
@@ -903,7 +904,7 @@
           <p:cNvPr id="6" name="Slide Number Placeholder 5">
             <a:extLst>
               <a:ext uri="{FF2B5EF4-FFF2-40B4-BE49-F238E27FC236}">
-                <a16:creationId xmlns="" xmlns:a16="http://schemas.microsoft.com/office/drawing/2014/main" id="{7DCAD73E-CAB3-4BA7-905E-D203691D0418}"/>
+                <a16:creationId xmlns:a16="http://schemas.microsoft.com/office/drawing/2014/main" id="{7DCAD73E-CAB3-4BA7-905E-D203691D0418}"/>
               </a:ext>
             </a:extLst>
           </p:cNvPr>
@@ -962,7 +963,7 @@
           <p:cNvPr id="2" name="Title 1">
             <a:extLst>
               <a:ext uri="{FF2B5EF4-FFF2-40B4-BE49-F238E27FC236}">
-                <a16:creationId xmlns="" xmlns:a16="http://schemas.microsoft.com/office/drawing/2014/main" id="{A9880706-F7FA-4EC3-A022-9D6C7CEC3692}"/>
+                <a16:creationId xmlns:a16="http://schemas.microsoft.com/office/drawing/2014/main" id="{A9880706-F7FA-4EC3-A022-9D6C7CEC3692}"/>
               </a:ext>
             </a:extLst>
           </p:cNvPr>
@@ -999,7 +1000,7 @@
           <p:cNvPr id="3" name="Text Placeholder 2">
             <a:extLst>
               <a:ext uri="{FF2B5EF4-FFF2-40B4-BE49-F238E27FC236}">
-                <a16:creationId xmlns="" xmlns:a16="http://schemas.microsoft.com/office/drawing/2014/main" id="{FA8A65D0-3DF5-448D-82EC-A967682A0DED}"/>
+                <a16:creationId xmlns:a16="http://schemas.microsoft.com/office/drawing/2014/main" id="{FA8A65D0-3DF5-448D-82EC-A967682A0DED}"/>
               </a:ext>
             </a:extLst>
           </p:cNvPr>
@@ -1124,7 +1125,7 @@
           <p:cNvPr id="4" name="Date Placeholder 3">
             <a:extLst>
               <a:ext uri="{FF2B5EF4-FFF2-40B4-BE49-F238E27FC236}">
-                <a16:creationId xmlns="" xmlns:a16="http://schemas.microsoft.com/office/drawing/2014/main" id="{600EA68C-01A6-487D-9D6E-1D1B4EAC0440}"/>
+                <a16:creationId xmlns:a16="http://schemas.microsoft.com/office/drawing/2014/main" id="{600EA68C-01A6-487D-9D6E-1D1B4EAC0440}"/>
               </a:ext>
             </a:extLst>
           </p:cNvPr>
@@ -1153,7 +1154,7 @@
           <p:cNvPr id="5" name="Footer Placeholder 4">
             <a:extLst>
               <a:ext uri="{FF2B5EF4-FFF2-40B4-BE49-F238E27FC236}">
-                <a16:creationId xmlns="" xmlns:a16="http://schemas.microsoft.com/office/drawing/2014/main" id="{6E6527CB-4FFD-4569-A82C-5EDC311B2CF6}"/>
+                <a16:creationId xmlns:a16="http://schemas.microsoft.com/office/drawing/2014/main" id="{6E6527CB-4FFD-4569-A82C-5EDC311B2CF6}"/>
               </a:ext>
             </a:extLst>
           </p:cNvPr>
@@ -1178,7 +1179,7 @@
           <p:cNvPr id="6" name="Slide Number Placeholder 5">
             <a:extLst>
               <a:ext uri="{FF2B5EF4-FFF2-40B4-BE49-F238E27FC236}">
-                <a16:creationId xmlns="" xmlns:a16="http://schemas.microsoft.com/office/drawing/2014/main" id="{24B19E5B-5A98-4381-A01D-01F81FD65792}"/>
+                <a16:creationId xmlns:a16="http://schemas.microsoft.com/office/drawing/2014/main" id="{24B19E5B-5A98-4381-A01D-01F81FD65792}"/>
               </a:ext>
             </a:extLst>
           </p:cNvPr>
@@ -1237,7 +1238,7 @@
           <p:cNvPr id="2" name="Title 1">
             <a:extLst>
               <a:ext uri="{FF2B5EF4-FFF2-40B4-BE49-F238E27FC236}">
-                <a16:creationId xmlns="" xmlns:a16="http://schemas.microsoft.com/office/drawing/2014/main" id="{63228B71-E923-4431-B8D2-FAE724678940}"/>
+                <a16:creationId xmlns:a16="http://schemas.microsoft.com/office/drawing/2014/main" id="{63228B71-E923-4431-B8D2-FAE724678940}"/>
               </a:ext>
             </a:extLst>
           </p:cNvPr>
@@ -1265,7 +1266,7 @@
           <p:cNvPr id="3" name="Content Placeholder 2">
             <a:extLst>
               <a:ext uri="{FF2B5EF4-FFF2-40B4-BE49-F238E27FC236}">
-                <a16:creationId xmlns="" xmlns:a16="http://schemas.microsoft.com/office/drawing/2014/main" id="{B18895E9-B7FF-4A00-955B-206CF8C73E43}"/>
+                <a16:creationId xmlns:a16="http://schemas.microsoft.com/office/drawing/2014/main" id="{B18895E9-B7FF-4A00-955B-206CF8C73E43}"/>
               </a:ext>
             </a:extLst>
           </p:cNvPr>
@@ -1327,7 +1328,7 @@
           <p:cNvPr id="4" name="Content Placeholder 3">
             <a:extLst>
               <a:ext uri="{FF2B5EF4-FFF2-40B4-BE49-F238E27FC236}">
-                <a16:creationId xmlns="" xmlns:a16="http://schemas.microsoft.com/office/drawing/2014/main" id="{DA813955-E3B9-44BC-8E1D-139269C8B48A}"/>
+                <a16:creationId xmlns:a16="http://schemas.microsoft.com/office/drawing/2014/main" id="{DA813955-E3B9-44BC-8E1D-139269C8B48A}"/>
               </a:ext>
             </a:extLst>
           </p:cNvPr>
@@ -1389,7 +1390,7 @@
           <p:cNvPr id="5" name="Date Placeholder 4">
             <a:extLst>
               <a:ext uri="{FF2B5EF4-FFF2-40B4-BE49-F238E27FC236}">
-                <a16:creationId xmlns="" xmlns:a16="http://schemas.microsoft.com/office/drawing/2014/main" id="{7E9B8EF5-28D5-4C4E-A2AB-EEA30D75DAFE}"/>
+                <a16:creationId xmlns:a16="http://schemas.microsoft.com/office/drawing/2014/main" id="{7E9B8EF5-28D5-4C4E-A2AB-EEA30D75DAFE}"/>
               </a:ext>
             </a:extLst>
           </p:cNvPr>
@@ -1418,7 +1419,7 @@
           <p:cNvPr id="6" name="Footer Placeholder 5">
             <a:extLst>
               <a:ext uri="{FF2B5EF4-FFF2-40B4-BE49-F238E27FC236}">
-                <a16:creationId xmlns="" xmlns:a16="http://schemas.microsoft.com/office/drawing/2014/main" id="{5723E678-8CB4-4335-AA04-6BD391748717}"/>
+                <a16:creationId xmlns:a16="http://schemas.microsoft.com/office/drawing/2014/main" id="{5723E678-8CB4-4335-AA04-6BD391748717}"/>
               </a:ext>
             </a:extLst>
           </p:cNvPr>
@@ -1443,7 +1444,7 @@
           <p:cNvPr id="7" name="Slide Number Placeholder 6">
             <a:extLst>
               <a:ext uri="{FF2B5EF4-FFF2-40B4-BE49-F238E27FC236}">
-                <a16:creationId xmlns="" xmlns:a16="http://schemas.microsoft.com/office/drawing/2014/main" id="{887B5567-9F4D-4AE1-92D8-769C9F7EA4F0}"/>
+                <a16:creationId xmlns:a16="http://schemas.microsoft.com/office/drawing/2014/main" id="{887B5567-9F4D-4AE1-92D8-769C9F7EA4F0}"/>
               </a:ext>
             </a:extLst>
           </p:cNvPr>
@@ -1502,7 +1503,7 @@
           <p:cNvPr id="2" name="Title 1">
             <a:extLst>
               <a:ext uri="{FF2B5EF4-FFF2-40B4-BE49-F238E27FC236}">
-                <a16:creationId xmlns="" xmlns:a16="http://schemas.microsoft.com/office/drawing/2014/main" id="{A40320A9-7C0C-45B4-BF2B-3B53B5686EBB}"/>
+                <a16:creationId xmlns:a16="http://schemas.microsoft.com/office/drawing/2014/main" id="{A40320A9-7C0C-45B4-BF2B-3B53B5686EBB}"/>
               </a:ext>
             </a:extLst>
           </p:cNvPr>
@@ -1535,7 +1536,7 @@
           <p:cNvPr id="3" name="Text Placeholder 2">
             <a:extLst>
               <a:ext uri="{FF2B5EF4-FFF2-40B4-BE49-F238E27FC236}">
-                <a16:creationId xmlns="" xmlns:a16="http://schemas.microsoft.com/office/drawing/2014/main" id="{8C440DE1-7DD6-4B1C-B961-CD2079B51F03}"/>
+                <a16:creationId xmlns:a16="http://schemas.microsoft.com/office/drawing/2014/main" id="{8C440DE1-7DD6-4B1C-B961-CD2079B51F03}"/>
               </a:ext>
             </a:extLst>
           </p:cNvPr>
@@ -1606,7 +1607,7 @@
           <p:cNvPr id="4" name="Content Placeholder 3">
             <a:extLst>
               <a:ext uri="{FF2B5EF4-FFF2-40B4-BE49-F238E27FC236}">
-                <a16:creationId xmlns="" xmlns:a16="http://schemas.microsoft.com/office/drawing/2014/main" id="{6FAFE840-CC9A-4D89-B05F-159EF756B427}"/>
+                <a16:creationId xmlns:a16="http://schemas.microsoft.com/office/drawing/2014/main" id="{6FAFE840-CC9A-4D89-B05F-159EF756B427}"/>
               </a:ext>
             </a:extLst>
           </p:cNvPr>
@@ -1668,7 +1669,7 @@
           <p:cNvPr id="5" name="Text Placeholder 4">
             <a:extLst>
               <a:ext uri="{FF2B5EF4-FFF2-40B4-BE49-F238E27FC236}">
-                <a16:creationId xmlns="" xmlns:a16="http://schemas.microsoft.com/office/drawing/2014/main" id="{4B87AADC-3401-48C6-98F6-0AB60F6DF9BE}"/>
+                <a16:creationId xmlns:a16="http://schemas.microsoft.com/office/drawing/2014/main" id="{4B87AADC-3401-48C6-98F6-0AB60F6DF9BE}"/>
               </a:ext>
             </a:extLst>
           </p:cNvPr>
@@ -1739,7 +1740,7 @@
           <p:cNvPr id="6" name="Content Placeholder 5">
             <a:extLst>
               <a:ext uri="{FF2B5EF4-FFF2-40B4-BE49-F238E27FC236}">
-                <a16:creationId xmlns="" xmlns:a16="http://schemas.microsoft.com/office/drawing/2014/main" id="{34BCF1A4-FB52-4DCD-80BC-324BA41C33CD}"/>
+                <a16:creationId xmlns:a16="http://schemas.microsoft.com/office/drawing/2014/main" id="{34BCF1A4-FB52-4DCD-80BC-324BA41C33CD}"/>
               </a:ext>
             </a:extLst>
           </p:cNvPr>
@@ -1801,7 +1802,7 @@
           <p:cNvPr id="7" name="Date Placeholder 6">
             <a:extLst>
               <a:ext uri="{FF2B5EF4-FFF2-40B4-BE49-F238E27FC236}">
-                <a16:creationId xmlns="" xmlns:a16="http://schemas.microsoft.com/office/drawing/2014/main" id="{8CFD4208-60E7-48B1-8CD0-717D5E26B827}"/>
+                <a16:creationId xmlns:a16="http://schemas.microsoft.com/office/drawing/2014/main" id="{8CFD4208-60E7-48B1-8CD0-717D5E26B827}"/>
               </a:ext>
             </a:extLst>
           </p:cNvPr>
@@ -1830,7 +1831,7 @@
           <p:cNvPr id="8" name="Footer Placeholder 7">
             <a:extLst>
               <a:ext uri="{FF2B5EF4-FFF2-40B4-BE49-F238E27FC236}">
-                <a16:creationId xmlns="" xmlns:a16="http://schemas.microsoft.com/office/drawing/2014/main" id="{94E429D1-BEB1-4D8A-91F2-CD4F80157F8D}"/>
+                <a16:creationId xmlns:a16="http://schemas.microsoft.com/office/drawing/2014/main" id="{94E429D1-BEB1-4D8A-91F2-CD4F80157F8D}"/>
               </a:ext>
             </a:extLst>
           </p:cNvPr>
@@ -1855,7 +1856,7 @@
           <p:cNvPr id="9" name="Slide Number Placeholder 8">
             <a:extLst>
               <a:ext uri="{FF2B5EF4-FFF2-40B4-BE49-F238E27FC236}">
-                <a16:creationId xmlns="" xmlns:a16="http://schemas.microsoft.com/office/drawing/2014/main" id="{6F17C19C-8370-4118-A8FC-5DDA6F84230F}"/>
+                <a16:creationId xmlns:a16="http://schemas.microsoft.com/office/drawing/2014/main" id="{6F17C19C-8370-4118-A8FC-5DDA6F84230F}"/>
               </a:ext>
             </a:extLst>
           </p:cNvPr>
@@ -1914,7 +1915,7 @@
           <p:cNvPr id="2" name="Title 1">
             <a:extLst>
               <a:ext uri="{FF2B5EF4-FFF2-40B4-BE49-F238E27FC236}">
-                <a16:creationId xmlns="" xmlns:a16="http://schemas.microsoft.com/office/drawing/2014/main" id="{252CBF36-7F99-45A9-BC35-BD2EC260CBF0}"/>
+                <a16:creationId xmlns:a16="http://schemas.microsoft.com/office/drawing/2014/main" id="{252CBF36-7F99-45A9-BC35-BD2EC260CBF0}"/>
               </a:ext>
             </a:extLst>
           </p:cNvPr>
@@ -1942,7 +1943,7 @@
           <p:cNvPr id="3" name="Date Placeholder 2">
             <a:extLst>
               <a:ext uri="{FF2B5EF4-FFF2-40B4-BE49-F238E27FC236}">
-                <a16:creationId xmlns="" xmlns:a16="http://schemas.microsoft.com/office/drawing/2014/main" id="{0D6F5F83-F07E-4501-B86B-9F96CD43993C}"/>
+                <a16:creationId xmlns:a16="http://schemas.microsoft.com/office/drawing/2014/main" id="{0D6F5F83-F07E-4501-B86B-9F96CD43993C}"/>
               </a:ext>
             </a:extLst>
           </p:cNvPr>
@@ -1971,7 +1972,7 @@
           <p:cNvPr id="4" name="Footer Placeholder 3">
             <a:extLst>
               <a:ext uri="{FF2B5EF4-FFF2-40B4-BE49-F238E27FC236}">
-                <a16:creationId xmlns="" xmlns:a16="http://schemas.microsoft.com/office/drawing/2014/main" id="{2861989B-F8E9-41FD-8E16-687424BCC266}"/>
+                <a16:creationId xmlns:a16="http://schemas.microsoft.com/office/drawing/2014/main" id="{2861989B-F8E9-41FD-8E16-687424BCC266}"/>
               </a:ext>
             </a:extLst>
           </p:cNvPr>
@@ -1996,7 +1997,7 @@
           <p:cNvPr id="5" name="Slide Number Placeholder 4">
             <a:extLst>
               <a:ext uri="{FF2B5EF4-FFF2-40B4-BE49-F238E27FC236}">
-                <a16:creationId xmlns="" xmlns:a16="http://schemas.microsoft.com/office/drawing/2014/main" id="{2026B6D7-7832-4815-95CE-5CEC39502825}"/>
+                <a16:creationId xmlns:a16="http://schemas.microsoft.com/office/drawing/2014/main" id="{2026B6D7-7832-4815-95CE-5CEC39502825}"/>
               </a:ext>
             </a:extLst>
           </p:cNvPr>
@@ -2055,7 +2056,7 @@
           <p:cNvPr id="2" name="Date Placeholder 1">
             <a:extLst>
               <a:ext uri="{FF2B5EF4-FFF2-40B4-BE49-F238E27FC236}">
-                <a16:creationId xmlns="" xmlns:a16="http://schemas.microsoft.com/office/drawing/2014/main" id="{9877919A-C4B6-46FD-A08A-9A4B867FE01A}"/>
+                <a16:creationId xmlns:a16="http://schemas.microsoft.com/office/drawing/2014/main" id="{9877919A-C4B6-46FD-A08A-9A4B867FE01A}"/>
               </a:ext>
             </a:extLst>
           </p:cNvPr>
@@ -2084,7 +2085,7 @@
           <p:cNvPr id="3" name="Footer Placeholder 2">
             <a:extLst>
               <a:ext uri="{FF2B5EF4-FFF2-40B4-BE49-F238E27FC236}">
-                <a16:creationId xmlns="" xmlns:a16="http://schemas.microsoft.com/office/drawing/2014/main" id="{9118539E-383C-4F1C-86F2-14C533A7E9FB}"/>
+                <a16:creationId xmlns:a16="http://schemas.microsoft.com/office/drawing/2014/main" id="{9118539E-383C-4F1C-86F2-14C533A7E9FB}"/>
               </a:ext>
             </a:extLst>
           </p:cNvPr>
@@ -2109,7 +2110,7 @@
           <p:cNvPr id="4" name="Slide Number Placeholder 3">
             <a:extLst>
               <a:ext uri="{FF2B5EF4-FFF2-40B4-BE49-F238E27FC236}">
-                <a16:creationId xmlns="" xmlns:a16="http://schemas.microsoft.com/office/drawing/2014/main" id="{C9A6D4E1-CA83-4214-9942-9E4617AA89BF}"/>
+                <a16:creationId xmlns:a16="http://schemas.microsoft.com/office/drawing/2014/main" id="{C9A6D4E1-CA83-4214-9942-9E4617AA89BF}"/>
               </a:ext>
             </a:extLst>
           </p:cNvPr>
@@ -2168,7 +2169,7 @@
           <p:cNvPr id="2" name="Title 1">
             <a:extLst>
               <a:ext uri="{FF2B5EF4-FFF2-40B4-BE49-F238E27FC236}">
-                <a16:creationId xmlns="" xmlns:a16="http://schemas.microsoft.com/office/drawing/2014/main" id="{046EF9B5-7A2A-4225-8817-86D028D6950C}"/>
+                <a16:creationId xmlns:a16="http://schemas.microsoft.com/office/drawing/2014/main" id="{046EF9B5-7A2A-4225-8817-86D028D6950C}"/>
               </a:ext>
             </a:extLst>
           </p:cNvPr>
@@ -2205,7 +2206,7 @@
           <p:cNvPr id="3" name="Content Placeholder 2">
             <a:extLst>
               <a:ext uri="{FF2B5EF4-FFF2-40B4-BE49-F238E27FC236}">
-                <a16:creationId xmlns="" xmlns:a16="http://schemas.microsoft.com/office/drawing/2014/main" id="{8667C390-5297-41E8-A403-22856007B051}"/>
+                <a16:creationId xmlns:a16="http://schemas.microsoft.com/office/drawing/2014/main" id="{8667C390-5297-41E8-A403-22856007B051}"/>
               </a:ext>
             </a:extLst>
           </p:cNvPr>
@@ -2295,7 +2296,7 @@
           <p:cNvPr id="4" name="Text Placeholder 3">
             <a:extLst>
               <a:ext uri="{FF2B5EF4-FFF2-40B4-BE49-F238E27FC236}">
-                <a16:creationId xmlns="" xmlns:a16="http://schemas.microsoft.com/office/drawing/2014/main" id="{8D0D2F7D-D6CD-4AB1-A3EA-CBFD2A2B3703}"/>
+                <a16:creationId xmlns:a16="http://schemas.microsoft.com/office/drawing/2014/main" id="{8D0D2F7D-D6CD-4AB1-A3EA-CBFD2A2B3703}"/>
               </a:ext>
             </a:extLst>
           </p:cNvPr>
@@ -2366,7 +2367,7 @@
           <p:cNvPr id="5" name="Date Placeholder 4">
             <a:extLst>
               <a:ext uri="{FF2B5EF4-FFF2-40B4-BE49-F238E27FC236}">
-                <a16:creationId xmlns="" xmlns:a16="http://schemas.microsoft.com/office/drawing/2014/main" id="{E17A441D-4FA7-4110-BF24-165CD3C3DAD7}"/>
+                <a16:creationId xmlns:a16="http://schemas.microsoft.com/office/drawing/2014/main" id="{E17A441D-4FA7-4110-BF24-165CD3C3DAD7}"/>
               </a:ext>
             </a:extLst>
           </p:cNvPr>
@@ -2395,7 +2396,7 @@
           <p:cNvPr id="6" name="Footer Placeholder 5">
             <a:extLst>
               <a:ext uri="{FF2B5EF4-FFF2-40B4-BE49-F238E27FC236}">
-                <a16:creationId xmlns="" xmlns:a16="http://schemas.microsoft.com/office/drawing/2014/main" id="{346102C5-5AE3-43CF-A686-1AB72B0790AB}"/>
+                <a16:creationId xmlns:a16="http://schemas.microsoft.com/office/drawing/2014/main" id="{346102C5-5AE3-43CF-A686-1AB72B0790AB}"/>
               </a:ext>
             </a:extLst>
           </p:cNvPr>
@@ -2420,7 +2421,7 @@
           <p:cNvPr id="7" name="Slide Number Placeholder 6">
             <a:extLst>
               <a:ext uri="{FF2B5EF4-FFF2-40B4-BE49-F238E27FC236}">
-                <a16:creationId xmlns="" xmlns:a16="http://schemas.microsoft.com/office/drawing/2014/main" id="{5528B3F7-462C-4500-8836-B3E5CD8DA61A}"/>
+                <a16:creationId xmlns:a16="http://schemas.microsoft.com/office/drawing/2014/main" id="{5528B3F7-462C-4500-8836-B3E5CD8DA61A}"/>
               </a:ext>
             </a:extLst>
           </p:cNvPr>
@@ -2479,7 +2480,7 @@
           <p:cNvPr id="2" name="Title 1">
             <a:extLst>
               <a:ext uri="{FF2B5EF4-FFF2-40B4-BE49-F238E27FC236}">
-                <a16:creationId xmlns="" xmlns:a16="http://schemas.microsoft.com/office/drawing/2014/main" id="{4BA10E59-DA48-4690-A956-9EB8E4E11EE5}"/>
+                <a16:creationId xmlns:a16="http://schemas.microsoft.com/office/drawing/2014/main" id="{4BA10E59-DA48-4690-A956-9EB8E4E11EE5}"/>
               </a:ext>
             </a:extLst>
           </p:cNvPr>
@@ -2516,7 +2517,7 @@
           <p:cNvPr id="3" name="Picture Placeholder 2">
             <a:extLst>
               <a:ext uri="{FF2B5EF4-FFF2-40B4-BE49-F238E27FC236}">
-                <a16:creationId xmlns="" xmlns:a16="http://schemas.microsoft.com/office/drawing/2014/main" id="{AC7AFE1E-67D1-4106-97CA-98302D42CC4D}"/>
+                <a16:creationId xmlns:a16="http://schemas.microsoft.com/office/drawing/2014/main" id="{AC7AFE1E-67D1-4106-97CA-98302D42CC4D}"/>
               </a:ext>
             </a:extLst>
           </p:cNvPr>
@@ -2583,7 +2584,7 @@
           <p:cNvPr id="4" name="Text Placeholder 3">
             <a:extLst>
               <a:ext uri="{FF2B5EF4-FFF2-40B4-BE49-F238E27FC236}">
-                <a16:creationId xmlns="" xmlns:a16="http://schemas.microsoft.com/office/drawing/2014/main" id="{67D8D73B-3D4D-42A7-9A3C-1D508E8A9B45}"/>
+                <a16:creationId xmlns:a16="http://schemas.microsoft.com/office/drawing/2014/main" id="{67D8D73B-3D4D-42A7-9A3C-1D508E8A9B45}"/>
               </a:ext>
             </a:extLst>
           </p:cNvPr>
@@ -2654,7 +2655,7 @@
           <p:cNvPr id="5" name="Date Placeholder 4">
             <a:extLst>
               <a:ext uri="{FF2B5EF4-FFF2-40B4-BE49-F238E27FC236}">
-                <a16:creationId xmlns="" xmlns:a16="http://schemas.microsoft.com/office/drawing/2014/main" id="{48C8945E-A47A-42A2-9DF6-CA6D5002F65F}"/>
+                <a16:creationId xmlns:a16="http://schemas.microsoft.com/office/drawing/2014/main" id="{48C8945E-A47A-42A2-9DF6-CA6D5002F65F}"/>
               </a:ext>
             </a:extLst>
           </p:cNvPr>
@@ -2683,7 +2684,7 @@
           <p:cNvPr id="6" name="Footer Placeholder 5">
             <a:extLst>
               <a:ext uri="{FF2B5EF4-FFF2-40B4-BE49-F238E27FC236}">
-                <a16:creationId xmlns="" xmlns:a16="http://schemas.microsoft.com/office/drawing/2014/main" id="{EB000DB4-2747-4297-B400-42A539FBDB42}"/>
+                <a16:creationId xmlns:a16="http://schemas.microsoft.com/office/drawing/2014/main" id="{EB000DB4-2747-4297-B400-42A539FBDB42}"/>
               </a:ext>
             </a:extLst>
           </p:cNvPr>
@@ -2708,7 +2709,7 @@
           <p:cNvPr id="7" name="Slide Number Placeholder 6">
             <a:extLst>
               <a:ext uri="{FF2B5EF4-FFF2-40B4-BE49-F238E27FC236}">
-                <a16:creationId xmlns="" xmlns:a16="http://schemas.microsoft.com/office/drawing/2014/main" id="{5BAD9222-F141-4803-AF73-E2DD92E2ABBC}"/>
+                <a16:creationId xmlns:a16="http://schemas.microsoft.com/office/drawing/2014/main" id="{5BAD9222-F141-4803-AF73-E2DD92E2ABBC}"/>
               </a:ext>
             </a:extLst>
           </p:cNvPr>
@@ -2772,7 +2773,7 @@
           <p:cNvPr id="2" name="Title Placeholder 1">
             <a:extLst>
               <a:ext uri="{FF2B5EF4-FFF2-40B4-BE49-F238E27FC236}">
-                <a16:creationId xmlns="" xmlns:a16="http://schemas.microsoft.com/office/drawing/2014/main" id="{5BF9D404-795C-4EA4-AD01-26740519239C}"/>
+                <a16:creationId xmlns:a16="http://schemas.microsoft.com/office/drawing/2014/main" id="{5BF9D404-795C-4EA4-AD01-26740519239C}"/>
               </a:ext>
             </a:extLst>
           </p:cNvPr>
@@ -2810,7 +2811,7 @@
           <p:cNvPr id="3" name="Text Placeholder 2">
             <a:extLst>
               <a:ext uri="{FF2B5EF4-FFF2-40B4-BE49-F238E27FC236}">
-                <a16:creationId xmlns="" xmlns:a16="http://schemas.microsoft.com/office/drawing/2014/main" id="{DE3FEC7B-48F8-4348-9BC6-68F83B859EE9}"/>
+                <a16:creationId xmlns:a16="http://schemas.microsoft.com/office/drawing/2014/main" id="{DE3FEC7B-48F8-4348-9BC6-68F83B859EE9}"/>
               </a:ext>
             </a:extLst>
           </p:cNvPr>
@@ -2877,7 +2878,7 @@
           <p:cNvPr id="4" name="Date Placeholder 3">
             <a:extLst>
               <a:ext uri="{FF2B5EF4-FFF2-40B4-BE49-F238E27FC236}">
-                <a16:creationId xmlns="" xmlns:a16="http://schemas.microsoft.com/office/drawing/2014/main" id="{31CA1A1D-E2F5-4161-A025-7B911965C2FE}"/>
+                <a16:creationId xmlns:a16="http://schemas.microsoft.com/office/drawing/2014/main" id="{31CA1A1D-E2F5-4161-A025-7B911965C2FE}"/>
               </a:ext>
             </a:extLst>
           </p:cNvPr>
@@ -2924,7 +2925,7 @@
           <p:cNvPr id="5" name="Footer Placeholder 4">
             <a:extLst>
               <a:ext uri="{FF2B5EF4-FFF2-40B4-BE49-F238E27FC236}">
-                <a16:creationId xmlns="" xmlns:a16="http://schemas.microsoft.com/office/drawing/2014/main" id="{43C7B926-18F3-4C13-AB92-764E10D324FB}"/>
+                <a16:creationId xmlns:a16="http://schemas.microsoft.com/office/drawing/2014/main" id="{43C7B926-18F3-4C13-AB92-764E10D324FB}"/>
               </a:ext>
             </a:extLst>
           </p:cNvPr>
@@ -2967,7 +2968,7 @@
           <p:cNvPr id="6" name="Slide Number Placeholder 5">
             <a:extLst>
               <a:ext uri="{FF2B5EF4-FFF2-40B4-BE49-F238E27FC236}">
-                <a16:creationId xmlns="" xmlns:a16="http://schemas.microsoft.com/office/drawing/2014/main" id="{734FA846-3BF6-46FD-80CF-34B300D244C0}"/>
+                <a16:creationId xmlns:a16="http://schemas.microsoft.com/office/drawing/2014/main" id="{734FA846-3BF6-46FD-80CF-34B300D244C0}"/>
               </a:ext>
             </a:extLst>
           </p:cNvPr>
@@ -3354,18 +3355,9 @@
           <a:p>
             <a:pPr algn="l"/>
             <a:r>
-              <a:rPr lang="en-US" sz="4000" dirty="0" smtClean="0"/>
-              <a:t>Expense </a:t>
-            </a:r>
-            <a:r>
               <a:rPr lang="en-US" sz="4000" dirty="0"/>
-              <a:t>Reimbursement </a:t>
-            </a:r>
-            <a:r>
-              <a:rPr lang="en-US" sz="4000" dirty="0" smtClean="0"/>
-              <a:t>System (ERS)</a:t>
-            </a:r>
-            <a:endParaRPr lang="en-US" sz="4000" dirty="0"/>
+              <a:t>Expense Reimbursement System (ERS)</a:t>
+            </a:r>
           </a:p>
         </p:txBody>
       </p:sp>
@@ -3396,12 +3388,8 @@
               <a:buChar char="•"/>
             </a:pPr>
             <a:r>
-              <a:rPr lang="en-US" dirty="0" smtClean="0"/>
-              <a:t>ERS Project </a:t>
-            </a:r>
-            <a:r>
               <a:rPr lang="en-US" dirty="0"/>
-              <a:t>built based on </a:t>
+              <a:t>ERS Project built based on </a:t>
             </a:r>
             <a:r>
               <a:rPr lang="en-US" dirty="0" err="1"/>
@@ -3418,12 +3406,8 @@
               <a:buChar char="•"/>
             </a:pPr>
             <a:r>
-              <a:rPr lang="en-US" dirty="0" smtClean="0"/>
-              <a:t>Project 0 architecture modified and used </a:t>
-            </a:r>
-            <a:r>
               <a:rPr lang="en-US" dirty="0"/>
-              <a:t>in this </a:t>
+              <a:t>Project 0 architecture modified and used in this </a:t>
             </a:r>
             <a:r>
               <a:rPr lang="en-US" dirty="0" err="1"/>
@@ -3441,11 +3425,7 @@
             </a:pPr>
             <a:r>
               <a:rPr lang="en-US" dirty="0"/>
-              <a:t>Develop </a:t>
-            </a:r>
-            <a:r>
-              <a:rPr lang="en-US" dirty="0" smtClean="0"/>
-              <a:t>an Expense Reimbursement System </a:t>
+              <a:t>Develop an Expense Reimbursement System </a:t>
             </a:r>
           </a:p>
           <a:p>
@@ -3454,7 +3434,7 @@
               <a:buChar char="•"/>
             </a:pPr>
             <a:r>
-              <a:rPr lang="en-US" dirty="0" smtClean="0"/>
+              <a:rPr lang="en-US" dirty="0"/>
               <a:t>Technologies:</a:t>
             </a:r>
           </a:p>
@@ -3464,10 +3444,9 @@
               <a:buChar char="•"/>
             </a:pPr>
             <a:r>
-              <a:rPr lang="en-US" dirty="0" smtClean="0"/>
+              <a:rPr lang="en-US" dirty="0"/>
               <a:t>Java 8</a:t>
             </a:r>
-            <a:endParaRPr lang="en-US" dirty="0"/>
           </a:p>
           <a:p>
             <a:pPr marL="800100" lvl="1" indent="-342900" algn="l">
@@ -3485,12 +3464,8 @@
               <a:buChar char="•"/>
             </a:pPr>
             <a:r>
-              <a:rPr lang="en-US" dirty="0" smtClean="0"/>
-              <a:t>User and Reimbursement </a:t>
-            </a:r>
-            <a:r>
               <a:rPr lang="en-US" dirty="0"/>
-              <a:t>resources</a:t>
+              <a:t>User and Reimbursement resources</a:t>
             </a:r>
           </a:p>
           <a:p>
@@ -3503,7 +3478,7 @@
               <a:t>Javalin</a:t>
             </a:r>
             <a:r>
-              <a:rPr lang="en-US" dirty="0" smtClean="0"/>
+              <a:rPr lang="en-US" dirty="0"/>
               <a:t>, </a:t>
             </a:r>
             <a:r>
@@ -3519,16 +3494,8 @@
               <a:t>Mockito</a:t>
             </a:r>
             <a:r>
-              <a:rPr lang="en-US" dirty="0" smtClean="0"/>
-              <a:t>, </a:t>
-            </a:r>
-            <a:r>
               <a:rPr lang="en-US" dirty="0"/>
-              <a:t>Hibernate, </a:t>
-            </a:r>
-            <a:r>
-              <a:rPr lang="en-US" dirty="0" smtClean="0"/>
-              <a:t>JDBC, </a:t>
+              <a:t>, Hibernate, JDBC, </a:t>
             </a:r>
             <a:r>
               <a:rPr lang="en-US" dirty="0" err="1"/>
@@ -3552,7 +3519,7 @@
               <a:buChar char="•"/>
             </a:pPr>
             <a:r>
-              <a:rPr lang="en-US" dirty="0" smtClean="0"/>
+              <a:rPr lang="en-US" dirty="0"/>
               <a:t>Login and Reimbursement endpoints</a:t>
             </a:r>
             <a:endParaRPr lang="en-US" b="1" dirty="0"/>
@@ -3603,12 +3570,8 @@
               <a:buChar char="•"/>
             </a:pPr>
             <a:r>
-              <a:rPr lang="en-US" dirty="0" smtClean="0"/>
-              <a:t>Data </a:t>
-            </a:r>
-            <a:r>
               <a:rPr lang="en-US" dirty="0"/>
-              <a:t>Access layer</a:t>
+              <a:t>Data Access layer</a:t>
             </a:r>
           </a:p>
           <a:p>
@@ -3617,7 +3580,7 @@
               <a:buChar char="•"/>
             </a:pPr>
             <a:r>
-              <a:rPr lang="en-US" dirty="0" smtClean="0"/>
+              <a:rPr lang="en-US" dirty="0"/>
               <a:t>Utilize </a:t>
             </a:r>
             <a:r>
@@ -3663,7 +3626,6 @@
               <a:rPr lang="en-US" dirty="0"/>
               <a:t>Hibernate database modeling and connectivity</a:t>
             </a:r>
-            <a:endParaRPr lang="en-US" dirty="0" smtClean="0"/>
           </a:p>
           <a:p>
             <a:pPr marL="800100" lvl="1" indent="-342900" algn="l">
@@ -3671,7 +3633,7 @@
               <a:buChar char="•"/>
             </a:pPr>
             <a:r>
-              <a:rPr lang="en-US" dirty="0" smtClean="0"/>
+              <a:rPr lang="en-US" dirty="0"/>
               <a:t>Hibernate HQL object orientated schema creation, data loads, record creation and updates</a:t>
             </a:r>
           </a:p>
@@ -3681,16 +3643,8 @@
               <a:buChar char="•"/>
             </a:pPr>
             <a:r>
-              <a:rPr lang="en-US" dirty="0" smtClean="0"/>
-              <a:t>Utilize </a:t>
-            </a:r>
-            <a:r>
               <a:rPr lang="en-US" dirty="0"/>
-              <a:t>Hibernate for </a:t>
-            </a:r>
-            <a:r>
-              <a:rPr lang="en-US" dirty="0" smtClean="0"/>
-              <a:t>database modeling and connectivity</a:t>
+              <a:t>Utilize Hibernate for database modeling and connectivity</a:t>
             </a:r>
           </a:p>
           <a:p>
@@ -3699,12 +3653,8 @@
               <a:buChar char="•"/>
             </a:pPr>
             <a:r>
-              <a:rPr lang="en-US" dirty="0" smtClean="0"/>
-              <a:t>Utilizes the endpoint Controller, Service layer validation, and Data </a:t>
-            </a:r>
-            <a:r>
               <a:rPr lang="en-US" dirty="0"/>
-              <a:t>Access Object (DAO) design pattern</a:t>
+              <a:t>Utilizes the endpoint Controller, Service layer validation, and Data Access Object (DAO) design pattern</a:t>
             </a:r>
           </a:p>
           <a:p>
@@ -3718,13 +3668,8 @@
             </a:r>
             <a:r>
               <a:rPr lang="en-US" dirty="0"/>
-              <a:t> (locally or ideally Amazon Web Services (AWS</a:t>
-            </a:r>
-            <a:r>
-              <a:rPr lang="en-US" dirty="0" smtClean="0"/>
-              <a:t>)) using Hibernate</a:t>
-            </a:r>
-            <a:endParaRPr lang="en-US" dirty="0"/>
+              <a:t> (locally or ideally Amazon Web Services (AWS)) using Hibernate</a:t>
+            </a:r>
           </a:p>
           <a:p>
             <a:pPr marL="342900" indent="-342900" algn="l">
@@ -3732,7 +3677,7 @@
               <a:buChar char="•"/>
             </a:pPr>
             <a:r>
-              <a:rPr lang="en-US" dirty="0" smtClean="0"/>
+              <a:rPr lang="en-US" dirty="0"/>
               <a:t>Extend concepts created in Project 0</a:t>
             </a:r>
           </a:p>
@@ -3742,15 +3687,15 @@
               <a:buChar char="•"/>
             </a:pPr>
             <a:r>
-              <a:rPr lang="en-US" dirty="0" smtClean="0"/>
+              <a:rPr lang="en-US" dirty="0"/>
               <a:t>Fully implements a </a:t>
             </a:r>
             <a:r>
-              <a:rPr lang="en-US" dirty="0" err="1" smtClean="0"/>
+              <a:rPr lang="en-US" dirty="0" err="1"/>
               <a:t>GenericDAO</a:t>
             </a:r>
             <a:r>
-              <a:rPr lang="en-US" dirty="0" smtClean="0"/>
+              <a:rPr lang="en-US" dirty="0"/>
               <a:t>&lt;T&gt; DAO model</a:t>
             </a:r>
           </a:p>
@@ -3760,10 +3705,9 @@
               <a:buChar char="•"/>
             </a:pPr>
             <a:r>
-              <a:rPr lang="en-US" dirty="0" smtClean="0"/>
+              <a:rPr lang="en-US" dirty="0"/>
               <a:t>Fully extends a base Data Transfer Object (DTO) model</a:t>
             </a:r>
-            <a:endParaRPr lang="en-US" dirty="0"/>
           </a:p>
         </p:txBody>
       </p:sp>
@@ -3802,7 +3746,7 @@
           <p:cNvPr id="53" name="TextBox 52">
             <a:extLst>
               <a:ext uri="{FF2B5EF4-FFF2-40B4-BE49-F238E27FC236}">
-                <a16:creationId xmlns="" xmlns:a16="http://schemas.microsoft.com/office/drawing/2014/main" id="{CFFD1938-4192-486E-9D53-D9784518AD14}"/>
+                <a16:creationId xmlns:a16="http://schemas.microsoft.com/office/drawing/2014/main" id="{CFFD1938-4192-486E-9D53-D9784518AD14}"/>
               </a:ext>
             </a:extLst>
           </p:cNvPr>
@@ -3837,7 +3781,7 @@
           <p:cNvPr id="2" name="Rectangle 1">
             <a:extLst>
               <a:ext uri="{FF2B5EF4-FFF2-40B4-BE49-F238E27FC236}">
-                <a16:creationId xmlns="" xmlns:a16="http://schemas.microsoft.com/office/drawing/2014/main" id="{AA0ED7A8-1532-4365-90ED-3F304B8440CE}"/>
+                <a16:creationId xmlns:a16="http://schemas.microsoft.com/office/drawing/2014/main" id="{AA0ED7A8-1532-4365-90ED-3F304B8440CE}"/>
               </a:ext>
             </a:extLst>
           </p:cNvPr>
@@ -3896,7 +3840,7 @@
           <p:cNvPr id="4" name="Rectangle 3">
             <a:extLst>
               <a:ext uri="{FF2B5EF4-FFF2-40B4-BE49-F238E27FC236}">
-                <a16:creationId xmlns="" xmlns:a16="http://schemas.microsoft.com/office/drawing/2014/main" id="{21B869D6-66CB-4B38-975F-B7FEB6AA9B13}"/>
+                <a16:creationId xmlns:a16="http://schemas.microsoft.com/office/drawing/2014/main" id="{21B869D6-66CB-4B38-975F-B7FEB6AA9B13}"/>
               </a:ext>
             </a:extLst>
           </p:cNvPr>
@@ -3987,7 +3931,7 @@
           <a:p>
             <a:pPr algn="ctr"/>
             <a:r>
-              <a:rPr lang="en-US" dirty="0" err="1" smtClean="0"/>
+              <a:rPr lang="en-US" dirty="0" err="1"/>
               <a:t>LoginController</a:t>
             </a:r>
             <a:endParaRPr lang="en-US" dirty="0"/>
@@ -4036,7 +3980,7 @@
           <p:cNvPr id="7" name="TextBox 6">
             <a:extLst>
               <a:ext uri="{FF2B5EF4-FFF2-40B4-BE49-F238E27FC236}">
-                <a16:creationId xmlns="" xmlns:a16="http://schemas.microsoft.com/office/drawing/2014/main" id="{E0BBD6C8-C8F2-40C5-AA64-85961A11ADC2}"/>
+                <a16:creationId xmlns:a16="http://schemas.microsoft.com/office/drawing/2014/main" id="{E0BBD6C8-C8F2-40C5-AA64-85961A11ADC2}"/>
               </a:ext>
             </a:extLst>
           </p:cNvPr>
@@ -4179,7 +4123,7 @@
           <p:cNvPr id="16" name="Rectangle 15">
             <a:extLst>
               <a:ext uri="{FF2B5EF4-FFF2-40B4-BE49-F238E27FC236}">
-                <a16:creationId xmlns="" xmlns:a16="http://schemas.microsoft.com/office/drawing/2014/main" id="{AA0ED7A8-1532-4365-90ED-3F304B8440CE}"/>
+                <a16:creationId xmlns:a16="http://schemas.microsoft.com/office/drawing/2014/main" id="{AA0ED7A8-1532-4365-90ED-3F304B8440CE}"/>
               </a:ext>
             </a:extLst>
           </p:cNvPr>
@@ -4227,10 +4171,9 @@
           <a:p>
             <a:pPr algn="ctr"/>
             <a:r>
-              <a:rPr lang="en-US" sz="1300" dirty="0" smtClean="0"/>
+              <a:rPr lang="en-US" sz="1300" dirty="0"/>
               <a:t>Reimbursement.html</a:t>
             </a:r>
-            <a:endParaRPr lang="en-US" sz="1300" dirty="0"/>
           </a:p>
         </p:txBody>
       </p:sp>
@@ -4239,7 +4182,7 @@
           <p:cNvPr id="17" name="Rectangle 16">
             <a:extLst>
               <a:ext uri="{FF2B5EF4-FFF2-40B4-BE49-F238E27FC236}">
-                <a16:creationId xmlns="" xmlns:a16="http://schemas.microsoft.com/office/drawing/2014/main" id="{AA0ED7A8-1532-4365-90ED-3F304B8440CE}"/>
+                <a16:creationId xmlns:a16="http://schemas.microsoft.com/office/drawing/2014/main" id="{AA0ED7A8-1532-4365-90ED-3F304B8440CE}"/>
               </a:ext>
             </a:extLst>
           </p:cNvPr>
@@ -4334,7 +4277,7 @@
           <p:cNvPr id="20" name="TextBox 19">
             <a:extLst>
               <a:ext uri="{FF2B5EF4-FFF2-40B4-BE49-F238E27FC236}">
-                <a16:creationId xmlns="" xmlns:a16="http://schemas.microsoft.com/office/drawing/2014/main" id="{E0BBD6C8-C8F2-40C5-AA64-85961A11ADC2}"/>
+                <a16:creationId xmlns:a16="http://schemas.microsoft.com/office/drawing/2014/main" id="{E0BBD6C8-C8F2-40C5-AA64-85961A11ADC2}"/>
               </a:ext>
             </a:extLst>
           </p:cNvPr>
@@ -4358,10 +4301,9 @@
           <a:lstStyle/>
           <a:p>
             <a:r>
-              <a:rPr lang="en-US" sz="1200" dirty="0" smtClean="0"/>
+              <a:rPr lang="en-US" sz="1200" dirty="0"/>
               <a:t>login</a:t>
             </a:r>
-            <a:endParaRPr lang="en-US" sz="1200" dirty="0"/>
           </a:p>
         </p:txBody>
       </p:sp>
@@ -4370,7 +4312,7 @@
           <p:cNvPr id="21" name="TextBox 20">
             <a:extLst>
               <a:ext uri="{FF2B5EF4-FFF2-40B4-BE49-F238E27FC236}">
-                <a16:creationId xmlns="" xmlns:a16="http://schemas.microsoft.com/office/drawing/2014/main" id="{E0BBD6C8-C8F2-40C5-AA64-85961A11ADC2}"/>
+                <a16:creationId xmlns:a16="http://schemas.microsoft.com/office/drawing/2014/main" id="{E0BBD6C8-C8F2-40C5-AA64-85961A11ADC2}"/>
               </a:ext>
             </a:extLst>
           </p:cNvPr>
@@ -4394,10 +4336,9 @@
           <a:lstStyle/>
           <a:p>
             <a:r>
-              <a:rPr lang="en-US" sz="1200" dirty="0" smtClean="0"/>
+              <a:rPr lang="en-US" sz="1200" dirty="0"/>
               <a:t>EMPLOYEE</a:t>
             </a:r>
-            <a:endParaRPr lang="en-US" sz="1200" dirty="0"/>
           </a:p>
         </p:txBody>
       </p:sp>
@@ -4444,7 +4385,7 @@
           <p:cNvPr id="24" name="TextBox 23">
             <a:extLst>
               <a:ext uri="{FF2B5EF4-FFF2-40B4-BE49-F238E27FC236}">
-                <a16:creationId xmlns="" xmlns:a16="http://schemas.microsoft.com/office/drawing/2014/main" id="{E0BBD6C8-C8F2-40C5-AA64-85961A11ADC2}"/>
+                <a16:creationId xmlns:a16="http://schemas.microsoft.com/office/drawing/2014/main" id="{E0BBD6C8-C8F2-40C5-AA64-85961A11ADC2}"/>
               </a:ext>
             </a:extLst>
           </p:cNvPr>
@@ -4468,16 +4409,15 @@
           <a:lstStyle/>
           <a:p>
             <a:r>
-              <a:rPr lang="en-US" sz="1200" dirty="0" smtClean="0"/>
+              <a:rPr lang="en-US" sz="1200" dirty="0"/>
               <a:t>session expired</a:t>
             </a:r>
           </a:p>
           <a:p>
             <a:r>
-              <a:rPr lang="en-US" sz="1200" dirty="0" smtClean="0"/>
+              <a:rPr lang="en-US" sz="1200" dirty="0"/>
               <a:t>logout</a:t>
             </a:r>
-            <a:endParaRPr lang="en-US" sz="1200" dirty="0"/>
           </a:p>
         </p:txBody>
       </p:sp>
@@ -4560,7 +4500,7 @@
           <p:cNvPr id="29" name="TextBox 28">
             <a:extLst>
               <a:ext uri="{FF2B5EF4-FFF2-40B4-BE49-F238E27FC236}">
-                <a16:creationId xmlns="" xmlns:a16="http://schemas.microsoft.com/office/drawing/2014/main" id="{E0BBD6C8-C8F2-40C5-AA64-85961A11ADC2}"/>
+                <a16:creationId xmlns:a16="http://schemas.microsoft.com/office/drawing/2014/main" id="{E0BBD6C8-C8F2-40C5-AA64-85961A11ADC2}"/>
               </a:ext>
             </a:extLst>
           </p:cNvPr>
@@ -4584,16 +4524,15 @@
           <a:lstStyle/>
           <a:p>
             <a:r>
-              <a:rPr lang="en-US" sz="1200" dirty="0" smtClean="0"/>
+              <a:rPr lang="en-US" sz="1200" dirty="0"/>
               <a:t>session expired</a:t>
             </a:r>
           </a:p>
           <a:p>
             <a:r>
-              <a:rPr lang="en-US" sz="1200" dirty="0" smtClean="0"/>
+              <a:rPr lang="en-US" sz="1200" dirty="0"/>
               <a:t>logout</a:t>
             </a:r>
-            <a:endParaRPr lang="en-US" sz="1200" dirty="0"/>
           </a:p>
         </p:txBody>
       </p:sp>
@@ -4602,7 +4541,7 @@
           <p:cNvPr id="30" name="TextBox 29">
             <a:extLst>
               <a:ext uri="{FF2B5EF4-FFF2-40B4-BE49-F238E27FC236}">
-                <a16:creationId xmlns="" xmlns:a16="http://schemas.microsoft.com/office/drawing/2014/main" id="{E0BBD6C8-C8F2-40C5-AA64-85961A11ADC2}"/>
+                <a16:creationId xmlns:a16="http://schemas.microsoft.com/office/drawing/2014/main" id="{E0BBD6C8-C8F2-40C5-AA64-85961A11ADC2}"/>
               </a:ext>
             </a:extLst>
           </p:cNvPr>
@@ -4626,10 +4565,9 @@
           <a:lstStyle/>
           <a:p>
             <a:r>
-              <a:rPr lang="en-US" sz="1200" dirty="0" smtClean="0"/>
+              <a:rPr lang="en-US" sz="1200" dirty="0"/>
               <a:t>FINANCE MANAGER</a:t>
             </a:r>
-            <a:endParaRPr lang="en-US" sz="1200" dirty="0"/>
           </a:p>
         </p:txBody>
       </p:sp>
@@ -4746,7 +4684,7 @@
           <p:cNvPr id="26" name="TextBox 25">
             <a:extLst>
               <a:ext uri="{FF2B5EF4-FFF2-40B4-BE49-F238E27FC236}">
-                <a16:creationId xmlns="" xmlns:a16="http://schemas.microsoft.com/office/drawing/2014/main" id="{E0BBD6C8-C8F2-40C5-AA64-85961A11ADC2}"/>
+                <a16:creationId xmlns:a16="http://schemas.microsoft.com/office/drawing/2014/main" id="{E0BBD6C8-C8F2-40C5-AA64-85961A11ADC2}"/>
               </a:ext>
             </a:extLst>
           </p:cNvPr>
@@ -4770,10 +4708,9 @@
           <a:lstStyle/>
           <a:p>
             <a:r>
-              <a:rPr lang="en-US" sz="1200" dirty="0" smtClean="0"/>
+              <a:rPr lang="en-US" sz="1200" dirty="0"/>
               <a:t>verify session</a:t>
             </a:r>
-            <a:endParaRPr lang="en-US" sz="1200" dirty="0"/>
           </a:p>
         </p:txBody>
       </p:sp>
@@ -4782,7 +4719,7 @@
           <p:cNvPr id="28" name="TextBox 27">
             <a:extLst>
               <a:ext uri="{FF2B5EF4-FFF2-40B4-BE49-F238E27FC236}">
-                <a16:creationId xmlns="" xmlns:a16="http://schemas.microsoft.com/office/drawing/2014/main" id="{E0BBD6C8-C8F2-40C5-AA64-85961A11ADC2}"/>
+                <a16:creationId xmlns:a16="http://schemas.microsoft.com/office/drawing/2014/main" id="{E0BBD6C8-C8F2-40C5-AA64-85961A11ADC2}"/>
               </a:ext>
             </a:extLst>
           </p:cNvPr>
@@ -4806,10 +4743,9 @@
           <a:lstStyle/>
           <a:p>
             <a:r>
-              <a:rPr lang="en-US" sz="1200" dirty="0" smtClean="0"/>
+              <a:rPr lang="en-US" sz="1200" dirty="0"/>
               <a:t>verify session</a:t>
             </a:r>
-            <a:endParaRPr lang="en-US" sz="1200" dirty="0"/>
           </a:p>
         </p:txBody>
       </p:sp>
@@ -4860,7 +4796,7 @@
           <a:p>
             <a:pPr algn="ctr"/>
             <a:r>
-              <a:rPr lang="en-US" dirty="0" err="1" smtClean="0"/>
+              <a:rPr lang="en-US" dirty="0" err="1"/>
               <a:t>ReimbursementController</a:t>
             </a:r>
             <a:endParaRPr lang="en-US" dirty="0"/>
@@ -4907,15 +4843,14 @@
           <a:p>
             <a:pPr algn="ctr"/>
             <a:r>
-              <a:rPr lang="en-US" sz="1000" dirty="0" smtClean="0"/>
+              <a:rPr lang="en-US" sz="1000" dirty="0"/>
               <a:t>com.tlw8253.service</a:t>
             </a:r>
-            <a:endParaRPr lang="en-US" sz="1000" dirty="0"/>
           </a:p>
           <a:p>
             <a:pPr algn="ctr"/>
             <a:r>
-              <a:rPr lang="en-US" dirty="0" err="1" smtClean="0"/>
+              <a:rPr lang="en-US" dirty="0" err="1"/>
               <a:t>UserService</a:t>
             </a:r>
             <a:endParaRPr lang="en-US" dirty="0"/>
@@ -5035,7 +4970,7 @@
           <p:cNvPr id="55" name="TextBox 54">
             <a:extLst>
               <a:ext uri="{FF2B5EF4-FFF2-40B4-BE49-F238E27FC236}">
-                <a16:creationId xmlns="" xmlns:a16="http://schemas.microsoft.com/office/drawing/2014/main" id="{E0BBD6C8-C8F2-40C5-AA64-85961A11ADC2}"/>
+                <a16:creationId xmlns:a16="http://schemas.microsoft.com/office/drawing/2014/main" id="{E0BBD6C8-C8F2-40C5-AA64-85961A11ADC2}"/>
               </a:ext>
             </a:extLst>
           </p:cNvPr>
@@ -5059,10 +4994,9 @@
           <a:lstStyle/>
           <a:p>
             <a:r>
-              <a:rPr lang="en-US" sz="1200" dirty="0" smtClean="0"/>
+              <a:rPr lang="en-US" sz="1200" dirty="0"/>
               <a:t>uses</a:t>
             </a:r>
-            <a:endParaRPr lang="en-US" sz="1200" dirty="0"/>
           </a:p>
         </p:txBody>
       </p:sp>
@@ -5071,7 +5005,7 @@
           <p:cNvPr id="66" name="TextBox 65">
             <a:extLst>
               <a:ext uri="{FF2B5EF4-FFF2-40B4-BE49-F238E27FC236}">
-                <a16:creationId xmlns="" xmlns:a16="http://schemas.microsoft.com/office/drawing/2014/main" id="{E0BBD6C8-C8F2-40C5-AA64-85961A11ADC2}"/>
+                <a16:creationId xmlns:a16="http://schemas.microsoft.com/office/drawing/2014/main" id="{E0BBD6C8-C8F2-40C5-AA64-85961A11ADC2}"/>
               </a:ext>
             </a:extLst>
           </p:cNvPr>
@@ -5095,10 +5029,9 @@
           <a:lstStyle/>
           <a:p>
             <a:r>
-              <a:rPr lang="en-US" sz="1200" dirty="0" smtClean="0"/>
+              <a:rPr lang="en-US" sz="1200" dirty="0"/>
               <a:t>reimbursement</a:t>
             </a:r>
-            <a:endParaRPr lang="en-US" sz="1200" dirty="0"/>
           </a:p>
         </p:txBody>
       </p:sp>
@@ -5107,7 +5040,7 @@
           <p:cNvPr id="67" name="TextBox 66">
             <a:extLst>
               <a:ext uri="{FF2B5EF4-FFF2-40B4-BE49-F238E27FC236}">
-                <a16:creationId xmlns="" xmlns:a16="http://schemas.microsoft.com/office/drawing/2014/main" id="{E0BBD6C8-C8F2-40C5-AA64-85961A11ADC2}"/>
+                <a16:creationId xmlns:a16="http://schemas.microsoft.com/office/drawing/2014/main" id="{E0BBD6C8-C8F2-40C5-AA64-85961A11ADC2}"/>
               </a:ext>
             </a:extLst>
           </p:cNvPr>
@@ -5131,10 +5064,9 @@
           <a:lstStyle/>
           <a:p>
             <a:r>
-              <a:rPr lang="en-US" sz="1200" dirty="0" smtClean="0"/>
+              <a:rPr lang="en-US" sz="1200" dirty="0"/>
               <a:t>reimbursement</a:t>
             </a:r>
-            <a:endParaRPr lang="en-US" sz="1200" dirty="0"/>
           </a:p>
         </p:txBody>
       </p:sp>
@@ -5179,7 +5111,7 @@
           <p:cNvPr id="70" name="TextBox 69">
             <a:extLst>
               <a:ext uri="{FF2B5EF4-FFF2-40B4-BE49-F238E27FC236}">
-                <a16:creationId xmlns="" xmlns:a16="http://schemas.microsoft.com/office/drawing/2014/main" id="{E0BBD6C8-C8F2-40C5-AA64-85961A11ADC2}"/>
+                <a16:creationId xmlns:a16="http://schemas.microsoft.com/office/drawing/2014/main" id="{E0BBD6C8-C8F2-40C5-AA64-85961A11ADC2}"/>
               </a:ext>
             </a:extLst>
           </p:cNvPr>
@@ -5250,7 +5182,7 @@
           <p:cNvPr id="73" name="TextBox 72">
             <a:extLst>
               <a:ext uri="{FF2B5EF4-FFF2-40B4-BE49-F238E27FC236}">
-                <a16:creationId xmlns="" xmlns:a16="http://schemas.microsoft.com/office/drawing/2014/main" id="{E0BBD6C8-C8F2-40C5-AA64-85961A11ADC2}"/>
+                <a16:creationId xmlns:a16="http://schemas.microsoft.com/office/drawing/2014/main" id="{E0BBD6C8-C8F2-40C5-AA64-85961A11ADC2}"/>
               </a:ext>
             </a:extLst>
           </p:cNvPr>
@@ -5274,10 +5206,9 @@
           <a:lstStyle/>
           <a:p>
             <a:r>
-              <a:rPr lang="en-US" sz="1200" dirty="0" smtClean="0"/>
+              <a:rPr lang="en-US" sz="1200" dirty="0"/>
               <a:t>uses</a:t>
             </a:r>
-            <a:endParaRPr lang="en-US" sz="1200" dirty="0"/>
           </a:p>
         </p:txBody>
       </p:sp>
@@ -5775,7 +5706,7 @@
           <p:cNvPr id="74" name="TextBox 73">
             <a:extLst>
               <a:ext uri="{FF2B5EF4-FFF2-40B4-BE49-F238E27FC236}">
-                <a16:creationId xmlns="" xmlns:a16="http://schemas.microsoft.com/office/drawing/2014/main" id="{E0BBD6C8-C8F2-40C5-AA64-85961A11ADC2}"/>
+                <a16:creationId xmlns:a16="http://schemas.microsoft.com/office/drawing/2014/main" id="{E0BBD6C8-C8F2-40C5-AA64-85961A11ADC2}"/>
               </a:ext>
             </a:extLst>
           </p:cNvPr>
@@ -5799,14 +5730,9 @@
           <a:lstStyle/>
           <a:p>
             <a:r>
-              <a:rPr lang="en-US" sz="1200" dirty="0" smtClean="0"/>
-              <a:t>create </a:t>
-            </a:r>
-            <a:r>
-              <a:rPr lang="en-US" sz="1200" dirty="0" smtClean="0"/>
-              <a:t>own</a:t>
-            </a:r>
-            <a:endParaRPr lang="en-US" sz="1200" dirty="0"/>
+              <a:rPr lang="en-US" sz="1200" dirty="0"/>
+              <a:t>create own</a:t>
+            </a:r>
           </a:p>
         </p:txBody>
       </p:sp>
@@ -5933,7 +5859,7 @@
           <p:cNvPr id="76" name="TextBox 75">
             <a:extLst>
               <a:ext uri="{FF2B5EF4-FFF2-40B4-BE49-F238E27FC236}">
-                <a16:creationId xmlns="" xmlns:a16="http://schemas.microsoft.com/office/drawing/2014/main" id="{E0BBD6C8-C8F2-40C5-AA64-85961A11ADC2}"/>
+                <a16:creationId xmlns:a16="http://schemas.microsoft.com/office/drawing/2014/main" id="{E0BBD6C8-C8F2-40C5-AA64-85961A11ADC2}"/>
               </a:ext>
             </a:extLst>
           </p:cNvPr>
@@ -6040,7 +5966,7 @@
           <p:cNvPr id="86" name="TextBox 85">
             <a:extLst>
               <a:ext uri="{FF2B5EF4-FFF2-40B4-BE49-F238E27FC236}">
-                <a16:creationId xmlns="" xmlns:a16="http://schemas.microsoft.com/office/drawing/2014/main" id="{E0BBD6C8-C8F2-40C5-AA64-85961A11ADC2}"/>
+                <a16:creationId xmlns:a16="http://schemas.microsoft.com/office/drawing/2014/main" id="{E0BBD6C8-C8F2-40C5-AA64-85961A11ADC2}"/>
               </a:ext>
             </a:extLst>
           </p:cNvPr>
@@ -6064,10 +5990,9 @@
           <a:lstStyle/>
           <a:p>
             <a:r>
-              <a:rPr lang="en-US" sz="1200" dirty="0" smtClean="0"/>
+              <a:rPr lang="en-US" sz="1200" dirty="0"/>
               <a:t>uses</a:t>
             </a:r>
-            <a:endParaRPr lang="en-US" sz="1200" dirty="0"/>
           </a:p>
         </p:txBody>
       </p:sp>
@@ -6076,7 +6001,7 @@
           <p:cNvPr id="111" name="TextBox 110">
             <a:extLst>
               <a:ext uri="{FF2B5EF4-FFF2-40B4-BE49-F238E27FC236}">
-                <a16:creationId xmlns="" xmlns:a16="http://schemas.microsoft.com/office/drawing/2014/main" id="{E0BBD6C8-C8F2-40C5-AA64-85961A11ADC2}"/>
+                <a16:creationId xmlns:a16="http://schemas.microsoft.com/office/drawing/2014/main" id="{E0BBD6C8-C8F2-40C5-AA64-85961A11ADC2}"/>
               </a:ext>
             </a:extLst>
           </p:cNvPr>
@@ -6100,10 +6025,9 @@
           <a:lstStyle/>
           <a:p>
             <a:r>
-              <a:rPr lang="en-US" sz="1200" dirty="0" smtClean="0"/>
+              <a:rPr lang="en-US" sz="1200" dirty="0"/>
               <a:t>return</a:t>
             </a:r>
-            <a:endParaRPr lang="en-US" sz="1200" dirty="0"/>
           </a:p>
         </p:txBody>
       </p:sp>
@@ -6142,7 +6066,7 @@
           <p:cNvPr id="89" name="Rectangle 88">
             <a:extLst>
               <a:ext uri="{FF2B5EF4-FFF2-40B4-BE49-F238E27FC236}">
-                <a16:creationId xmlns="" xmlns:a16="http://schemas.microsoft.com/office/drawing/2014/main" id="{EED827AB-78FC-41AC-8676-30DA25D7C5FC}"/>
+                <a16:creationId xmlns:a16="http://schemas.microsoft.com/office/drawing/2014/main" id="{EED827AB-78FC-41AC-8676-30DA25D7C5FC}"/>
               </a:ext>
             </a:extLst>
           </p:cNvPr>
@@ -6220,7 +6144,7 @@
           <p:cNvPr id="62" name="Rectangle 61">
             <a:extLst>
               <a:ext uri="{FF2B5EF4-FFF2-40B4-BE49-F238E27FC236}">
-                <a16:creationId xmlns="" xmlns:a16="http://schemas.microsoft.com/office/drawing/2014/main" id="{C3FE7107-D2B1-4448-B03A-F2CE9B45CFD6}"/>
+                <a16:creationId xmlns:a16="http://schemas.microsoft.com/office/drawing/2014/main" id="{C3FE7107-D2B1-4448-B03A-F2CE9B45CFD6}"/>
               </a:ext>
             </a:extLst>
           </p:cNvPr>
@@ -6284,7 +6208,7 @@
           <p:cNvPr id="61" name="Rectangle 60">
             <a:extLst>
               <a:ext uri="{FF2B5EF4-FFF2-40B4-BE49-F238E27FC236}">
-                <a16:creationId xmlns="" xmlns:a16="http://schemas.microsoft.com/office/drawing/2014/main" id="{2F7B40FD-C5BA-431D-AE99-1CB70F1BAB88}"/>
+                <a16:creationId xmlns:a16="http://schemas.microsoft.com/office/drawing/2014/main" id="{2F7B40FD-C5BA-431D-AE99-1CB70F1BAB88}"/>
               </a:ext>
             </a:extLst>
           </p:cNvPr>
@@ -6343,7 +6267,7 @@
           <p:cNvPr id="60" name="Rectangle 59">
             <a:extLst>
               <a:ext uri="{FF2B5EF4-FFF2-40B4-BE49-F238E27FC236}">
-                <a16:creationId xmlns="" xmlns:a16="http://schemas.microsoft.com/office/drawing/2014/main" id="{CF3E4DE9-C6F2-4C11-BE7F-2753CDEFE535}"/>
+                <a16:creationId xmlns:a16="http://schemas.microsoft.com/office/drawing/2014/main" id="{CF3E4DE9-C6F2-4C11-BE7F-2753CDEFE535}"/>
               </a:ext>
             </a:extLst>
           </p:cNvPr>
@@ -6725,7 +6649,7 @@
           <p:cNvPr id="19" name="TextBox 18">
             <a:extLst>
               <a:ext uri="{FF2B5EF4-FFF2-40B4-BE49-F238E27FC236}">
-                <a16:creationId xmlns="" xmlns:a16="http://schemas.microsoft.com/office/drawing/2014/main" id="{E0BBD6C8-C8F2-40C5-AA64-85961A11ADC2}"/>
+                <a16:creationId xmlns:a16="http://schemas.microsoft.com/office/drawing/2014/main" id="{E0BBD6C8-C8F2-40C5-AA64-85961A11ADC2}"/>
               </a:ext>
             </a:extLst>
           </p:cNvPr>
@@ -6855,7 +6779,7 @@
           <p:cNvPr id="23" name="TextBox 22">
             <a:extLst>
               <a:ext uri="{FF2B5EF4-FFF2-40B4-BE49-F238E27FC236}">
-                <a16:creationId xmlns="" xmlns:a16="http://schemas.microsoft.com/office/drawing/2014/main" id="{E0BBD6C8-C8F2-40C5-AA64-85961A11ADC2}"/>
+                <a16:creationId xmlns:a16="http://schemas.microsoft.com/office/drawing/2014/main" id="{E0BBD6C8-C8F2-40C5-AA64-85961A11ADC2}"/>
               </a:ext>
             </a:extLst>
           </p:cNvPr>
@@ -6972,7 +6896,7 @@
           <p:cNvPr id="28" name="TextBox 27">
             <a:extLst>
               <a:ext uri="{FF2B5EF4-FFF2-40B4-BE49-F238E27FC236}">
-                <a16:creationId xmlns="" xmlns:a16="http://schemas.microsoft.com/office/drawing/2014/main" id="{E0BBD6C8-C8F2-40C5-AA64-85961A11ADC2}"/>
+                <a16:creationId xmlns:a16="http://schemas.microsoft.com/office/drawing/2014/main" id="{E0BBD6C8-C8F2-40C5-AA64-85961A11ADC2}"/>
               </a:ext>
             </a:extLst>
           </p:cNvPr>
@@ -7096,7 +7020,7 @@
           <p:cNvPr id="34" name="TextBox 33">
             <a:extLst>
               <a:ext uri="{FF2B5EF4-FFF2-40B4-BE49-F238E27FC236}">
-                <a16:creationId xmlns="" xmlns:a16="http://schemas.microsoft.com/office/drawing/2014/main" id="{E0BBD6C8-C8F2-40C5-AA64-85961A11ADC2}"/>
+                <a16:creationId xmlns:a16="http://schemas.microsoft.com/office/drawing/2014/main" id="{E0BBD6C8-C8F2-40C5-AA64-85961A11ADC2}"/>
               </a:ext>
             </a:extLst>
           </p:cNvPr>
@@ -7222,7 +7146,7 @@
           <p:cNvPr id="38" name="TextBox 37">
             <a:extLst>
               <a:ext uri="{FF2B5EF4-FFF2-40B4-BE49-F238E27FC236}">
-                <a16:creationId xmlns="" xmlns:a16="http://schemas.microsoft.com/office/drawing/2014/main" id="{E0BBD6C8-C8F2-40C5-AA64-85961A11ADC2}"/>
+                <a16:creationId xmlns:a16="http://schemas.microsoft.com/office/drawing/2014/main" id="{E0BBD6C8-C8F2-40C5-AA64-85961A11ADC2}"/>
               </a:ext>
             </a:extLst>
           </p:cNvPr>
@@ -7392,7 +7316,7 @@
           <p:cNvPr id="44" name="TextBox 43">
             <a:extLst>
               <a:ext uri="{FF2B5EF4-FFF2-40B4-BE49-F238E27FC236}">
-                <a16:creationId xmlns="" xmlns:a16="http://schemas.microsoft.com/office/drawing/2014/main" id="{E0BBD6C8-C8F2-40C5-AA64-85961A11ADC2}"/>
+                <a16:creationId xmlns:a16="http://schemas.microsoft.com/office/drawing/2014/main" id="{E0BBD6C8-C8F2-40C5-AA64-85961A11ADC2}"/>
               </a:ext>
             </a:extLst>
           </p:cNvPr>
@@ -7427,7 +7351,7 @@
           <p:cNvPr id="45" name="TextBox 44">
             <a:extLst>
               <a:ext uri="{FF2B5EF4-FFF2-40B4-BE49-F238E27FC236}">
-                <a16:creationId xmlns="" xmlns:a16="http://schemas.microsoft.com/office/drawing/2014/main" id="{E0BBD6C8-C8F2-40C5-AA64-85961A11ADC2}"/>
+                <a16:creationId xmlns:a16="http://schemas.microsoft.com/office/drawing/2014/main" id="{E0BBD6C8-C8F2-40C5-AA64-85961A11ADC2}"/>
               </a:ext>
             </a:extLst>
           </p:cNvPr>
@@ -7474,7 +7398,7 @@
           <p:cNvPr id="26" name="TextBox 25">
             <a:extLst>
               <a:ext uri="{FF2B5EF4-FFF2-40B4-BE49-F238E27FC236}">
-                <a16:creationId xmlns="" xmlns:a16="http://schemas.microsoft.com/office/drawing/2014/main" id="{6C45E26E-8FEE-4439-A34B-789237C9C62C}"/>
+                <a16:creationId xmlns:a16="http://schemas.microsoft.com/office/drawing/2014/main" id="{6C45E26E-8FEE-4439-A34B-789237C9C62C}"/>
               </a:ext>
             </a:extLst>
           </p:cNvPr>
@@ -7509,7 +7433,7 @@
           <p:cNvPr id="31" name="Rectangle 30">
             <a:extLst>
               <a:ext uri="{FF2B5EF4-FFF2-40B4-BE49-F238E27FC236}">
-                <a16:creationId xmlns="" xmlns:a16="http://schemas.microsoft.com/office/drawing/2014/main" id="{6D396BFC-10E0-4935-903B-EDC457BD1755}"/>
+                <a16:creationId xmlns:a16="http://schemas.microsoft.com/office/drawing/2014/main" id="{6D396BFC-10E0-4935-903B-EDC457BD1755}"/>
               </a:ext>
             </a:extLst>
           </p:cNvPr>
@@ -7569,7 +7493,7 @@
           <p:cNvPr id="32" name="Rectangle 31">
             <a:extLst>
               <a:ext uri="{FF2B5EF4-FFF2-40B4-BE49-F238E27FC236}">
-                <a16:creationId xmlns="" xmlns:a16="http://schemas.microsoft.com/office/drawing/2014/main" id="{02A645C8-F11F-438D-92DC-F6FCCA5ECFB8}"/>
+                <a16:creationId xmlns:a16="http://schemas.microsoft.com/office/drawing/2014/main" id="{02A645C8-F11F-438D-92DC-F6FCCA5ECFB8}"/>
               </a:ext>
             </a:extLst>
           </p:cNvPr>
@@ -7629,7 +7553,7 @@
           <p:cNvPr id="12" name="Straight Arrow Connector 11">
             <a:extLst>
               <a:ext uri="{FF2B5EF4-FFF2-40B4-BE49-F238E27FC236}">
-                <a16:creationId xmlns="" xmlns:a16="http://schemas.microsoft.com/office/drawing/2014/main" id="{FF2076CA-F897-4293-B6CD-7408EB452156}"/>
+                <a16:creationId xmlns:a16="http://schemas.microsoft.com/office/drawing/2014/main" id="{FF2076CA-F897-4293-B6CD-7408EB452156}"/>
               </a:ext>
             </a:extLst>
           </p:cNvPr>
@@ -7672,7 +7596,7 @@
           <p:cNvPr id="14" name="Straight Arrow Connector 13">
             <a:extLst>
               <a:ext uri="{FF2B5EF4-FFF2-40B4-BE49-F238E27FC236}">
-                <a16:creationId xmlns="" xmlns:a16="http://schemas.microsoft.com/office/drawing/2014/main" id="{5C625B7B-4A1E-46C5-9082-4FEC89B30DA9}"/>
+                <a16:creationId xmlns:a16="http://schemas.microsoft.com/office/drawing/2014/main" id="{5C625B7B-4A1E-46C5-9082-4FEC89B30DA9}"/>
               </a:ext>
             </a:extLst>
           </p:cNvPr>
@@ -7715,7 +7639,7 @@
           <p:cNvPr id="65" name="Straight Arrow Connector 64">
             <a:extLst>
               <a:ext uri="{FF2B5EF4-FFF2-40B4-BE49-F238E27FC236}">
-                <a16:creationId xmlns="" xmlns:a16="http://schemas.microsoft.com/office/drawing/2014/main" id="{C1C9B843-1D11-4D9F-8CBF-AE00E90AA070}"/>
+                <a16:creationId xmlns:a16="http://schemas.microsoft.com/office/drawing/2014/main" id="{C1C9B843-1D11-4D9F-8CBF-AE00E90AA070}"/>
               </a:ext>
             </a:extLst>
           </p:cNvPr>
@@ -7757,7 +7681,7 @@
           <p:cNvPr id="66" name="TextBox 65">
             <a:extLst>
               <a:ext uri="{FF2B5EF4-FFF2-40B4-BE49-F238E27FC236}">
-                <a16:creationId xmlns="" xmlns:a16="http://schemas.microsoft.com/office/drawing/2014/main" id="{5E4B2700-0522-40EF-B035-166AA1C17D76}"/>
+                <a16:creationId xmlns:a16="http://schemas.microsoft.com/office/drawing/2014/main" id="{5E4B2700-0522-40EF-B035-166AA1C17D76}"/>
               </a:ext>
             </a:extLst>
           </p:cNvPr>
@@ -7881,7 +7805,7 @@
           <p:cNvPr id="48" name="TextBox 47">
             <a:extLst>
               <a:ext uri="{FF2B5EF4-FFF2-40B4-BE49-F238E27FC236}">
-                <a16:creationId xmlns="" xmlns:a16="http://schemas.microsoft.com/office/drawing/2014/main" id="{E0BBD6C8-C8F2-40C5-AA64-85961A11ADC2}"/>
+                <a16:creationId xmlns:a16="http://schemas.microsoft.com/office/drawing/2014/main" id="{E0BBD6C8-C8F2-40C5-AA64-85961A11ADC2}"/>
               </a:ext>
             </a:extLst>
           </p:cNvPr>
@@ -7916,7 +7840,7 @@
           <p:cNvPr id="52" name="Rectangle 51">
             <a:extLst>
               <a:ext uri="{FF2B5EF4-FFF2-40B4-BE49-F238E27FC236}">
-                <a16:creationId xmlns="" xmlns:a16="http://schemas.microsoft.com/office/drawing/2014/main" id="{21B869D6-66CB-4B38-975F-B7FEB6AA9B13}"/>
+                <a16:creationId xmlns:a16="http://schemas.microsoft.com/office/drawing/2014/main" id="{21B869D6-66CB-4B38-975F-B7FEB6AA9B13}"/>
               </a:ext>
             </a:extLst>
           </p:cNvPr>
@@ -8039,7 +7963,7 @@
           <p:cNvPr id="58" name="TextBox 57">
             <a:extLst>
               <a:ext uri="{FF2B5EF4-FFF2-40B4-BE49-F238E27FC236}">
-                <a16:creationId xmlns="" xmlns:a16="http://schemas.microsoft.com/office/drawing/2014/main" id="{E0BBD6C8-C8F2-40C5-AA64-85961A11ADC2}"/>
+                <a16:creationId xmlns:a16="http://schemas.microsoft.com/office/drawing/2014/main" id="{E0BBD6C8-C8F2-40C5-AA64-85961A11ADC2}"/>
               </a:ext>
             </a:extLst>
           </p:cNvPr>
@@ -8147,7 +8071,7 @@
           <p:cNvPr id="94" name="TextBox 93">
             <a:extLst>
               <a:ext uri="{FF2B5EF4-FFF2-40B4-BE49-F238E27FC236}">
-                <a16:creationId xmlns="" xmlns:a16="http://schemas.microsoft.com/office/drawing/2014/main" id="{E0BBD6C8-C8F2-40C5-AA64-85961A11ADC2}"/>
+                <a16:creationId xmlns:a16="http://schemas.microsoft.com/office/drawing/2014/main" id="{E0BBD6C8-C8F2-40C5-AA64-85961A11ADC2}"/>
               </a:ext>
             </a:extLst>
           </p:cNvPr>
@@ -8182,7 +8106,7 @@
           <p:cNvPr id="95" name="TextBox 94">
             <a:extLst>
               <a:ext uri="{FF2B5EF4-FFF2-40B4-BE49-F238E27FC236}">
-                <a16:creationId xmlns="" xmlns:a16="http://schemas.microsoft.com/office/drawing/2014/main" id="{E0BBD6C8-C8F2-40C5-AA64-85961A11ADC2}"/>
+                <a16:creationId xmlns:a16="http://schemas.microsoft.com/office/drawing/2014/main" id="{E0BBD6C8-C8F2-40C5-AA64-85961A11ADC2}"/>
               </a:ext>
             </a:extLst>
           </p:cNvPr>
@@ -8217,7 +8141,7 @@
           <p:cNvPr id="49" name="Rectangle 48">
             <a:extLst>
               <a:ext uri="{FF2B5EF4-FFF2-40B4-BE49-F238E27FC236}">
-                <a16:creationId xmlns="" xmlns:a16="http://schemas.microsoft.com/office/drawing/2014/main" id="{02A645C8-F11F-438D-92DC-F6FCCA5ECFB8}"/>
+                <a16:creationId xmlns:a16="http://schemas.microsoft.com/office/drawing/2014/main" id="{02A645C8-F11F-438D-92DC-F6FCCA5ECFB8}"/>
               </a:ext>
             </a:extLst>
           </p:cNvPr>
@@ -8314,7 +8238,7 @@
           <p:cNvPr id="57" name="Rectangle 56">
             <a:extLst>
               <a:ext uri="{FF2B5EF4-FFF2-40B4-BE49-F238E27FC236}">
-                <a16:creationId xmlns="" xmlns:a16="http://schemas.microsoft.com/office/drawing/2014/main" id="{93FBA679-F71B-47BD-BE29-21E7C2262CEB}"/>
+                <a16:creationId xmlns:a16="http://schemas.microsoft.com/office/drawing/2014/main" id="{93FBA679-F71B-47BD-BE29-21E7C2262CEB}"/>
               </a:ext>
             </a:extLst>
           </p:cNvPr>
@@ -8424,7 +8348,7 @@
           <p:cNvPr id="59" name="TextBox 58">
             <a:extLst>
               <a:ext uri="{FF2B5EF4-FFF2-40B4-BE49-F238E27FC236}">
-                <a16:creationId xmlns="" xmlns:a16="http://schemas.microsoft.com/office/drawing/2014/main" id="{5E4B2700-0522-40EF-B035-166AA1C17D76}"/>
+                <a16:creationId xmlns:a16="http://schemas.microsoft.com/office/drawing/2014/main" id="{5E4B2700-0522-40EF-B035-166AA1C17D76}"/>
               </a:ext>
             </a:extLst>
           </p:cNvPr>
@@ -8497,10 +8421,10 @@
           <p:cNvPr id="12" name="Rectangle 11">
             <a:extLst>
               <a:ext uri="{FF2B5EF4-FFF2-40B4-BE49-F238E27FC236}">
-                <a16:creationId xmlns="" xmlns:a16="http://schemas.microsoft.com/office/drawing/2014/main" id="{6753252F-4873-4F63-801D-CC719279A7D5}"/>
+                <a16:creationId xmlns:a16="http://schemas.microsoft.com/office/drawing/2014/main" id="{6753252F-4873-4F63-801D-CC719279A7D5}"/>
               </a:ext>
               <a:ext uri="{C183D7F6-B498-43B3-948B-1728B52AA6E4}">
-                <adec:decorative xmlns="" xmlns:adec="http://schemas.microsoft.com/office/drawing/2017/decorative" val="1"/>
+                <adec:decorative xmlns:adec="http://schemas.microsoft.com/office/drawing/2017/decorative" val="1"/>
               </a:ext>
             </a:extLst>
           </p:cNvPr>
@@ -8510,7 +8434,7 @@
           <p:nvPr>
             <p:extLst>
               <p:ext uri="{386F3935-93C4-4BCD-93E2-E3B085C9AB24}">
-                <p16:designElem xmlns="" xmlns:p16="http://schemas.microsoft.com/office/powerpoint/2015/main" val="1"/>
+                <p16:designElem xmlns:p16="http://schemas.microsoft.com/office/powerpoint/2015/main" val="1"/>
               </p:ext>
             </p:extLst>
           </p:nvPr>
@@ -8560,10 +8484,10 @@
           <p:cNvPr id="14" name="Rectangle 13">
             <a:extLst>
               <a:ext uri="{FF2B5EF4-FFF2-40B4-BE49-F238E27FC236}">
-                <a16:creationId xmlns="" xmlns:a16="http://schemas.microsoft.com/office/drawing/2014/main" id="{047C8CCB-F95D-4249-92DD-651249D3535A}"/>
+                <a16:creationId xmlns:a16="http://schemas.microsoft.com/office/drawing/2014/main" id="{047C8CCB-F95D-4249-92DD-651249D3535A}"/>
               </a:ext>
               <a:ext uri="{C183D7F6-B498-43B3-948B-1728B52AA6E4}">
-                <adec:decorative xmlns="" xmlns:adec="http://schemas.microsoft.com/office/drawing/2017/decorative" val="1"/>
+                <adec:decorative xmlns:adec="http://schemas.microsoft.com/office/drawing/2017/decorative" val="1"/>
               </a:ext>
             </a:extLst>
           </p:cNvPr>
@@ -8573,7 +8497,7 @@
           <p:nvPr>
             <p:extLst>
               <p:ext uri="{386F3935-93C4-4BCD-93E2-E3B085C9AB24}">
-                <p16:designElem xmlns="" xmlns:p16="http://schemas.microsoft.com/office/powerpoint/2015/main" val="1"/>
+                <p16:designElem xmlns:p16="http://schemas.microsoft.com/office/powerpoint/2015/main" val="1"/>
               </p:ext>
             </p:extLst>
           </p:nvPr>
@@ -8623,7 +8547,7 @@
           <p:cNvPr id="5" name="TextBox 4">
             <a:extLst>
               <a:ext uri="{FF2B5EF4-FFF2-40B4-BE49-F238E27FC236}">
-                <a16:creationId xmlns="" xmlns:a16="http://schemas.microsoft.com/office/drawing/2014/main" id="{6C45E26E-8FEE-4439-A34B-789237C9C62C}"/>
+                <a16:creationId xmlns:a16="http://schemas.microsoft.com/office/drawing/2014/main" id="{6C45E26E-8FEE-4439-A34B-789237C9C62C}"/>
               </a:ext>
             </a:extLst>
           </p:cNvPr>
@@ -8734,6 +8658,128 @@
       </p:grpSpPr>
       <p:sp>
         <p:nvSpPr>
+          <p:cNvPr id="2" name="Title 1">
+            <a:extLst>
+              <a:ext uri="{FF2B5EF4-FFF2-40B4-BE49-F238E27FC236}">
+                <a16:creationId xmlns:a16="http://schemas.microsoft.com/office/drawing/2014/main" id="{C8A221E1-FAF2-4290-9E9E-12C74FCBDD4A}"/>
+              </a:ext>
+            </a:extLst>
+          </p:cNvPr>
+          <p:cNvSpPr>
+            <a:spLocks noGrp="1"/>
+          </p:cNvSpPr>
+          <p:nvPr>
+            <p:ph type="title"/>
+          </p:nvPr>
+        </p:nvSpPr>
+        <p:spPr/>
+        <p:txBody>
+          <a:bodyPr/>
+          <a:lstStyle/>
+          <a:p>
+            <a:r>
+              <a:rPr lang="en-US" dirty="0"/>
+              <a:t>Requirements Traceability Matrix (RTM)</a:t>
+            </a:r>
+          </a:p>
+        </p:txBody>
+      </p:sp>
+      <p:graphicFrame>
+        <p:nvGraphicFramePr>
+          <p:cNvPr id="4" name="Content Placeholder 3">
+            <a:extLst>
+              <a:ext uri="{FF2B5EF4-FFF2-40B4-BE49-F238E27FC236}">
+                <a16:creationId xmlns:a16="http://schemas.microsoft.com/office/drawing/2014/main" id="{CD35AFD6-14E5-4229-AC73-C65241D45091}"/>
+              </a:ext>
+            </a:extLst>
+          </p:cNvPr>
+          <p:cNvGraphicFramePr>
+            <a:graphicFrameLocks noGrp="1" noChangeAspect="1"/>
+          </p:cNvGraphicFramePr>
+          <p:nvPr>
+            <p:ph idx="1"/>
+            <p:extLst>
+              <p:ext uri="{D42A27DB-BD31-4B8C-83A1-F6EECF244321}">
+                <p14:modId xmlns:p14="http://schemas.microsoft.com/office/powerpoint/2010/main" val="2349842346"/>
+              </p:ext>
+            </p:extLst>
+          </p:nvPr>
+        </p:nvGraphicFramePr>
+        <p:xfrm>
+          <a:off x="838200" y="1533525"/>
+          <a:ext cx="10668000" cy="4667250"/>
+        </p:xfrm>
+        <a:graphic>
+          <a:graphicData uri="http://schemas.openxmlformats.org/presentationml/2006/ole">
+            <mc:AlternateContent xmlns:mc="http://schemas.openxmlformats.org/markup-compatibility/2006">
+              <mc:Choice xmlns:v="urn:schemas-microsoft-com:vml" Requires="v">
+                <p:oleObj name="Worksheet" r:id="rId2" imgW="10449082" imgH="7819875" progId="Excel.Sheet.12">
+                  <p:embed/>
+                </p:oleObj>
+              </mc:Choice>
+              <mc:Fallback>
+                <p:oleObj name="Worksheet" r:id="rId2" imgW="10449082" imgH="7819875" progId="Excel.Sheet.12">
+                  <p:embed/>
+                  <p:pic>
+                    <p:nvPicPr>
+                      <p:cNvPr id="0" name=""/>
+                      <p:cNvPicPr/>
+                      <p:nvPr/>
+                    </p:nvPicPr>
+                    <p:blipFill>
+                      <a:blip r:embed="rId3"/>
+                      <a:stretch>
+                        <a:fillRect/>
+                      </a:stretch>
+                    </p:blipFill>
+                    <p:spPr>
+                      <a:xfrm>
+                        <a:off x="838200" y="1533525"/>
+                        <a:ext cx="10668000" cy="4667250"/>
+                      </a:xfrm>
+                      <a:prstGeom prst="rect">
+                        <a:avLst/>
+                      </a:prstGeom>
+                    </p:spPr>
+                  </p:pic>
+                </p:oleObj>
+              </mc:Fallback>
+            </mc:AlternateContent>
+          </a:graphicData>
+        </a:graphic>
+      </p:graphicFrame>
+    </p:spTree>
+    <p:extLst>
+      <p:ext uri="{BB962C8B-B14F-4D97-AF65-F5344CB8AC3E}">
+        <p14:creationId xmlns:p14="http://schemas.microsoft.com/office/powerpoint/2010/main" val="1487346533"/>
+      </p:ext>
+    </p:extLst>
+  </p:cSld>
+  <p:clrMapOvr>
+    <a:masterClrMapping/>
+  </p:clrMapOvr>
+</p:sld>
+</file>
+
+<file path=ppt/slides/slide6.xml><?xml version="1.0" encoding="utf-8"?>
+<p:sld xmlns:a="http://schemas.openxmlformats.org/drawingml/2006/main" xmlns:r="http://schemas.openxmlformats.org/officeDocument/2006/relationships" xmlns:p="http://schemas.openxmlformats.org/presentationml/2006/main">
+  <p:cSld>
+    <p:spTree>
+      <p:nvGrpSpPr>
+        <p:cNvPr id="1" name=""/>
+        <p:cNvGrpSpPr/>
+        <p:nvPr/>
+      </p:nvGrpSpPr>
+      <p:grpSpPr>
+        <a:xfrm>
+          <a:off x="0" y="0"/>
+          <a:ext cx="0" cy="0"/>
+          <a:chOff x="0" y="0"/>
+          <a:chExt cx="0" cy="0"/>
+        </a:xfrm>
+      </p:grpSpPr>
+      <p:sp>
+        <p:nvSpPr>
           <p:cNvPr id="3" name="Subtitle 2"/>
           <p:cNvSpPr>
             <a:spLocks noGrp="1"/>
@@ -8789,7 +8835,7 @@
               <a:buChar char="•"/>
             </a:pPr>
             <a:r>
-              <a:rPr lang="en-US" dirty="0" smtClean="0"/>
+              <a:rPr lang="en-US" dirty="0"/>
               <a:t>Hibernate “create” for creating the schema </a:t>
             </a:r>
           </a:p>
@@ -8799,18 +8845,9 @@
               <a:buChar char="•"/>
             </a:pPr>
             <a:r>
-              <a:rPr lang="en-US" dirty="0" smtClean="0"/>
-              <a:t>Hibernate HQL performing object </a:t>
-            </a:r>
-            <a:r>
               <a:rPr lang="en-US" dirty="0"/>
-              <a:t>data </a:t>
-            </a:r>
-            <a:r>
-              <a:rPr lang="en-US" dirty="0" smtClean="0"/>
-              <a:t>loads, record create and updates</a:t>
-            </a:r>
-            <a:endParaRPr lang="en-US" dirty="0"/>
+              <a:t>Hibernate HQL performing object data loads, record create and updates</a:t>
+            </a:r>
           </a:p>
           <a:p>
             <a:pPr marL="800100" lvl="1" indent="-342900" algn="l">
@@ -8818,20 +8855,8 @@
               <a:buChar char="•"/>
             </a:pPr>
             <a:r>
-              <a:rPr lang="en-US" dirty="0" smtClean="0"/>
-              <a:t>Utilize </a:t>
-            </a:r>
-            <a:r>
               <a:rPr lang="en-US" dirty="0"/>
-              <a:t>the </a:t>
-            </a:r>
-            <a:r>
-              <a:rPr lang="en-US" dirty="0" smtClean="0"/>
-              <a:t>Controller, Service, DTO, DAO </a:t>
-            </a:r>
-            <a:r>
-              <a:rPr lang="en-US" dirty="0"/>
-              <a:t>design pattern</a:t>
+              <a:t>Utilize the Controller, Service, DTO, DAO design pattern</a:t>
             </a:r>
           </a:p>
           <a:p>
@@ -8858,10 +8883,10 @@
               <a:t>Logging accomplished using </a:t>
             </a:r>
             <a:r>
-              <a:rPr lang="en-US" dirty="0" err="1" smtClean="0"/>
+              <a:rPr lang="en-US" dirty="0" err="1"/>
               <a:t>Logback</a:t>
             </a:r>
-            <a:endParaRPr lang="en-US" dirty="0" smtClean="0"/>
+            <a:endParaRPr lang="en-US" dirty="0"/>
           </a:p>
           <a:p>
             <a:pPr marL="800100" lvl="1" indent="-342900" algn="l">
@@ -8869,10 +8894,9 @@
               <a:buChar char="•"/>
             </a:pPr>
             <a:r>
-              <a:rPr lang="en-US" dirty="0" smtClean="0"/>
+              <a:rPr lang="en-US" dirty="0"/>
               <a:t>Login session control and validation</a:t>
             </a:r>
-            <a:endParaRPr lang="en-US" dirty="0"/>
           </a:p>
           <a:p>
             <a:pPr marL="342900" indent="-342900" algn="l">
@@ -8881,11 +8905,7 @@
             </a:pPr>
             <a:r>
               <a:rPr lang="en-US" dirty="0"/>
-              <a:t>HTTP Endpoints (Login and </a:t>
-            </a:r>
-            <a:r>
-              <a:rPr lang="en-US" dirty="0" smtClean="0"/>
-              <a:t>Reimbursement)</a:t>
+              <a:t>HTTP Endpoints (Login and Reimbursement)</a:t>
             </a:r>
           </a:p>
           <a:p>
@@ -8894,7 +8914,7 @@
               <a:buChar char="•"/>
             </a:pPr>
             <a:r>
-              <a:rPr lang="en-US" dirty="0" smtClean="0"/>
+              <a:rPr lang="en-US" dirty="0"/>
               <a:t>Front-end</a:t>
             </a:r>
           </a:p>
@@ -8904,10 +8924,9 @@
               <a:buChar char="•"/>
             </a:pPr>
             <a:r>
-              <a:rPr lang="en-US" dirty="0" smtClean="0"/>
+              <a:rPr lang="en-US" dirty="0"/>
               <a:t>Login, Reimbursement, and Finance interactive pages</a:t>
             </a:r>
-            <a:endParaRPr lang="en-US" dirty="0"/>
           </a:p>
           <a:p>
             <a:pPr marL="342900" indent="-342900" algn="l">
@@ -8925,28 +8944,16 @@
               <a:buChar char="•"/>
             </a:pPr>
             <a:r>
-              <a:rPr lang="en-US" dirty="0" smtClean="0"/>
+              <a:rPr lang="en-US" dirty="0"/>
               <a:t>Implementing </a:t>
             </a:r>
             <a:r>
-              <a:rPr lang="en-US" dirty="0" err="1" smtClean="0"/>
+              <a:rPr lang="en-US" dirty="0" err="1"/>
               <a:t>GenericDAO</a:t>
             </a:r>
             <a:r>
-              <a:rPr lang="en-US" dirty="0" smtClean="0"/>
-              <a:t>&lt;T</a:t>
-            </a:r>
-            <a:r>
               <a:rPr lang="en-US" dirty="0"/>
-              <a:t>&gt; </a:t>
-            </a:r>
-            <a:r>
-              <a:rPr lang="en-US" dirty="0" smtClean="0"/>
-              <a:t> model fully </a:t>
-            </a:r>
-            <a:r>
-              <a:rPr lang="en-US" dirty="0"/>
-              <a:t>realized</a:t>
+              <a:t>&lt;T&gt;  model fully realized</a:t>
             </a:r>
           </a:p>
           <a:p>
@@ -8955,20 +8962,8 @@
               <a:buChar char="•"/>
             </a:pPr>
             <a:r>
-              <a:rPr lang="en-US" dirty="0" smtClean="0"/>
-              <a:t>Extend Add/Edit </a:t>
-            </a:r>
-            <a:r>
               <a:rPr lang="en-US" dirty="0"/>
-              <a:t>DTO </a:t>
-            </a:r>
-            <a:r>
-              <a:rPr lang="en-US" dirty="0" smtClean="0"/>
-              <a:t>storing </a:t>
-            </a:r>
-            <a:r>
-              <a:rPr lang="en-US" dirty="0"/>
-              <a:t>data generically in </a:t>
+              <a:t>Extend Add/Edit DTO storing data generically in </a:t>
             </a:r>
             <a:r>
               <a:rPr lang="en-US" dirty="0" err="1"/>
@@ -8982,18 +8977,17 @@
               <a:buChar char="•"/>
             </a:pPr>
             <a:r>
-              <a:rPr lang="en-US" dirty="0" smtClean="0"/>
+              <a:rPr lang="en-US" dirty="0"/>
               <a:t>Minimal JUnit and </a:t>
             </a:r>
             <a:r>
-              <a:rPr lang="en-US" dirty="0" err="1" smtClean="0"/>
+              <a:rPr lang="en-US" dirty="0" err="1"/>
               <a:t>Mockito</a:t>
             </a:r>
             <a:r>
-              <a:rPr lang="en-US" dirty="0" smtClean="0"/>
+              <a:rPr lang="en-US" dirty="0"/>
               <a:t> test cases</a:t>
             </a:r>
-            <a:endParaRPr lang="en-US" dirty="0"/>
           </a:p>
           <a:p>
             <a:pPr marL="800100" lvl="1" indent="-342900" algn="l">
@@ -9002,13 +8996,8 @@
             </a:pPr>
             <a:r>
               <a:rPr lang="en-US" dirty="0"/>
-              <a:t>Extensive utilization of </a:t>
-            </a:r>
-            <a:r>
-              <a:rPr lang="en-US" dirty="0" smtClean="0"/>
-              <a:t>internal driver tests</a:t>
-            </a:r>
-            <a:endParaRPr lang="en-US" dirty="0"/>
+              <a:t>Extensive utilization of internal driver tests</a:t>
+            </a:r>
           </a:p>
           <a:p>
             <a:pPr marL="800100" lvl="1" indent="-342900" algn="l">
@@ -9016,18 +9005,9 @@
               <a:buChar char="•"/>
             </a:pPr>
             <a:r>
-              <a:rPr lang="en-US" dirty="0" smtClean="0"/>
-              <a:t>Extensive </a:t>
-            </a:r>
-            <a:r>
               <a:rPr lang="en-US" dirty="0"/>
-              <a:t>Logging through </a:t>
-            </a:r>
-            <a:r>
-              <a:rPr lang="en-US" dirty="0" smtClean="0"/>
-              <a:t>package logging levels</a:t>
-            </a:r>
-            <a:endParaRPr lang="en-US" dirty="0"/>
+              <a:t>Extensive Logging through package logging levels</a:t>
+            </a:r>
           </a:p>
           <a:p>
             <a:pPr marL="800100" lvl="1" indent="-342900" algn="l">
@@ -9036,15 +9016,7 @@
             </a:pPr>
             <a:r>
               <a:rPr lang="en-US" dirty="0"/>
-              <a:t>Postman utilize </a:t>
-            </a:r>
-            <a:r>
-              <a:rPr lang="en-US" dirty="0" smtClean="0"/>
-              <a:t>for some initial endpoint </a:t>
-            </a:r>
-            <a:r>
-              <a:rPr lang="en-US" dirty="0" smtClean="0"/>
-              <a:t>tests</a:t>
+              <a:t>Postman utilize for some initial endpoint tests</a:t>
             </a:r>
           </a:p>
           <a:p>
@@ -9053,10 +9025,9 @@
               <a:buChar char="•"/>
             </a:pPr>
             <a:r>
-              <a:rPr lang="en-US" dirty="0" smtClean="0"/>
+              <a:rPr lang="en-US" dirty="0"/>
               <a:t>Internal test drivers and Admin driver</a:t>
             </a:r>
-            <a:endParaRPr lang="en-US" dirty="0"/>
           </a:p>
           <a:p>
             <a:pPr marL="342900" indent="-342900" algn="l">
@@ -9105,18 +9076,9 @@
           <a:p>
             <a:pPr algn="l"/>
             <a:r>
-              <a:rPr lang="en-US" sz="4000" dirty="0" smtClean="0"/>
-              <a:t>Expense </a:t>
-            </a:r>
-            <a:r>
               <a:rPr lang="en-US" sz="4000" dirty="0"/>
-              <a:t>Reimbursement </a:t>
-            </a:r>
-            <a:r>
-              <a:rPr lang="en-US" sz="4000" dirty="0" smtClean="0"/>
-              <a:t>System (ERS) Summary</a:t>
-            </a:r>
-            <a:endParaRPr lang="en-US" sz="4000" dirty="0"/>
+              <a:t>Expense Reimbursement System (ERS) Summary</a:t>
+            </a:r>
           </a:p>
         </p:txBody>
       </p:sp>
@@ -9163,7 +9125,7 @@
           <a:p>
             <a:pPr algn="l"/>
             <a:r>
-              <a:rPr lang="en-US" sz="4000" smtClean="0"/>
+              <a:rPr lang="en-US" sz="4000"/>
               <a:t>Expense Reimbursement System (ERS)</a:t>
             </a:r>
             <a:endParaRPr lang="en-US" sz="4000" dirty="0"/>

</xml_diff>

<commit_message>
20210827 1600 tlw8748253: continue work for portfolio.
</commit_message>
<xml_diff>
--- a/docs/ERS.pptx
+++ b/docs/ERS.pptx
@@ -139,7 +139,7 @@
           <p:cNvPr id="2" name="Title 1">
             <a:extLst>
               <a:ext uri="{FF2B5EF4-FFF2-40B4-BE49-F238E27FC236}">
-                <a16:creationId xmlns:a16="http://schemas.microsoft.com/office/drawing/2014/main" id="{67106D7E-D400-44F1-9A1A-D68CE501C73D}"/>
+                <a16:creationId xmlns:a16="http://schemas.microsoft.com/office/drawing/2014/main" xmlns="" id="{67106D7E-D400-44F1-9A1A-D68CE501C73D}"/>
               </a:ext>
             </a:extLst>
           </p:cNvPr>
@@ -176,7 +176,7 @@
           <p:cNvPr id="3" name="Subtitle 2">
             <a:extLst>
               <a:ext uri="{FF2B5EF4-FFF2-40B4-BE49-F238E27FC236}">
-                <a16:creationId xmlns:a16="http://schemas.microsoft.com/office/drawing/2014/main" id="{A5FDE527-E621-4639-A0C7-E1E9B0DFBCEC}"/>
+                <a16:creationId xmlns:a16="http://schemas.microsoft.com/office/drawing/2014/main" xmlns="" id="{A5FDE527-E621-4639-A0C7-E1E9B0DFBCEC}"/>
               </a:ext>
             </a:extLst>
           </p:cNvPr>
@@ -246,7 +246,7 @@
           <p:cNvPr id="4" name="Date Placeholder 3">
             <a:extLst>
               <a:ext uri="{FF2B5EF4-FFF2-40B4-BE49-F238E27FC236}">
-                <a16:creationId xmlns:a16="http://schemas.microsoft.com/office/drawing/2014/main" id="{E109CE88-B989-4109-89C8-36F7C245DB1C}"/>
+                <a16:creationId xmlns:a16="http://schemas.microsoft.com/office/drawing/2014/main" xmlns="" id="{E109CE88-B989-4109-89C8-36F7C245DB1C}"/>
               </a:ext>
             </a:extLst>
           </p:cNvPr>
@@ -264,7 +264,7 @@
           <a:p>
             <a:fld id="{6C733091-19F0-4DD7-90FE-000B4789B4CF}" type="datetimeFigureOut">
               <a:rPr lang="en-US" smtClean="0"/>
-              <a:t>8/26/2021</a:t>
+              <a:t>8/27/2021</a:t>
             </a:fld>
             <a:endParaRPr lang="en-US"/>
           </a:p>
@@ -275,7 +275,7 @@
           <p:cNvPr id="5" name="Footer Placeholder 4">
             <a:extLst>
               <a:ext uri="{FF2B5EF4-FFF2-40B4-BE49-F238E27FC236}">
-                <a16:creationId xmlns:a16="http://schemas.microsoft.com/office/drawing/2014/main" id="{0841498F-B991-43D3-B408-CC35D8EFCF37}"/>
+                <a16:creationId xmlns:a16="http://schemas.microsoft.com/office/drawing/2014/main" xmlns="" id="{0841498F-B991-43D3-B408-CC35D8EFCF37}"/>
               </a:ext>
             </a:extLst>
           </p:cNvPr>
@@ -300,7 +300,7 @@
           <p:cNvPr id="6" name="Slide Number Placeholder 5">
             <a:extLst>
               <a:ext uri="{FF2B5EF4-FFF2-40B4-BE49-F238E27FC236}">
-                <a16:creationId xmlns:a16="http://schemas.microsoft.com/office/drawing/2014/main" id="{01754CB8-17B1-45A0-AE7D-755EAA1B69D8}"/>
+                <a16:creationId xmlns:a16="http://schemas.microsoft.com/office/drawing/2014/main" xmlns="" id="{01754CB8-17B1-45A0-AE7D-755EAA1B69D8}"/>
               </a:ext>
             </a:extLst>
           </p:cNvPr>
@@ -359,7 +359,7 @@
           <p:cNvPr id="2" name="Title 1">
             <a:extLst>
               <a:ext uri="{FF2B5EF4-FFF2-40B4-BE49-F238E27FC236}">
-                <a16:creationId xmlns:a16="http://schemas.microsoft.com/office/drawing/2014/main" id="{E7A7B055-5DC2-440D-83C1-CAAE8E9A8E14}"/>
+                <a16:creationId xmlns:a16="http://schemas.microsoft.com/office/drawing/2014/main" xmlns="" id="{E7A7B055-5DC2-440D-83C1-CAAE8E9A8E14}"/>
               </a:ext>
             </a:extLst>
           </p:cNvPr>
@@ -387,7 +387,7 @@
           <p:cNvPr id="3" name="Vertical Text Placeholder 2">
             <a:extLst>
               <a:ext uri="{FF2B5EF4-FFF2-40B4-BE49-F238E27FC236}">
-                <a16:creationId xmlns:a16="http://schemas.microsoft.com/office/drawing/2014/main" id="{65710707-423D-4F9D-A49D-6C764C562553}"/>
+                <a16:creationId xmlns:a16="http://schemas.microsoft.com/office/drawing/2014/main" xmlns="" id="{65710707-423D-4F9D-A49D-6C764C562553}"/>
               </a:ext>
             </a:extLst>
           </p:cNvPr>
@@ -444,7 +444,7 @@
           <p:cNvPr id="4" name="Date Placeholder 3">
             <a:extLst>
               <a:ext uri="{FF2B5EF4-FFF2-40B4-BE49-F238E27FC236}">
-                <a16:creationId xmlns:a16="http://schemas.microsoft.com/office/drawing/2014/main" id="{98B6F7EF-D1BE-4437-85F3-99626E37E4EF}"/>
+                <a16:creationId xmlns:a16="http://schemas.microsoft.com/office/drawing/2014/main" xmlns="" id="{98B6F7EF-D1BE-4437-85F3-99626E37E4EF}"/>
               </a:ext>
             </a:extLst>
           </p:cNvPr>
@@ -462,7 +462,7 @@
           <a:p>
             <a:fld id="{6C733091-19F0-4DD7-90FE-000B4789B4CF}" type="datetimeFigureOut">
               <a:rPr lang="en-US" smtClean="0"/>
-              <a:t>8/26/2021</a:t>
+              <a:t>8/27/2021</a:t>
             </a:fld>
             <a:endParaRPr lang="en-US"/>
           </a:p>
@@ -473,7 +473,7 @@
           <p:cNvPr id="5" name="Footer Placeholder 4">
             <a:extLst>
               <a:ext uri="{FF2B5EF4-FFF2-40B4-BE49-F238E27FC236}">
-                <a16:creationId xmlns:a16="http://schemas.microsoft.com/office/drawing/2014/main" id="{D890AA9B-E479-4209-B245-83608F3D4013}"/>
+                <a16:creationId xmlns:a16="http://schemas.microsoft.com/office/drawing/2014/main" xmlns="" id="{D890AA9B-E479-4209-B245-83608F3D4013}"/>
               </a:ext>
             </a:extLst>
           </p:cNvPr>
@@ -498,7 +498,7 @@
           <p:cNvPr id="6" name="Slide Number Placeholder 5">
             <a:extLst>
               <a:ext uri="{FF2B5EF4-FFF2-40B4-BE49-F238E27FC236}">
-                <a16:creationId xmlns:a16="http://schemas.microsoft.com/office/drawing/2014/main" id="{0E4976E4-E15A-4296-A430-633D2BB9142B}"/>
+                <a16:creationId xmlns:a16="http://schemas.microsoft.com/office/drawing/2014/main" xmlns="" id="{0E4976E4-E15A-4296-A430-633D2BB9142B}"/>
               </a:ext>
             </a:extLst>
           </p:cNvPr>
@@ -557,7 +557,7 @@
           <p:cNvPr id="2" name="Vertical Title 1">
             <a:extLst>
               <a:ext uri="{FF2B5EF4-FFF2-40B4-BE49-F238E27FC236}">
-                <a16:creationId xmlns:a16="http://schemas.microsoft.com/office/drawing/2014/main" id="{66F63CF5-8DEE-4BB2-A2A5-5C16FEBE1AD5}"/>
+                <a16:creationId xmlns:a16="http://schemas.microsoft.com/office/drawing/2014/main" xmlns="" id="{66F63CF5-8DEE-4BB2-A2A5-5C16FEBE1AD5}"/>
               </a:ext>
             </a:extLst>
           </p:cNvPr>
@@ -590,7 +590,7 @@
           <p:cNvPr id="3" name="Vertical Text Placeholder 2">
             <a:extLst>
               <a:ext uri="{FF2B5EF4-FFF2-40B4-BE49-F238E27FC236}">
-                <a16:creationId xmlns:a16="http://schemas.microsoft.com/office/drawing/2014/main" id="{E0D5EBA5-94AF-4373-B032-A40FF73C7575}"/>
+                <a16:creationId xmlns:a16="http://schemas.microsoft.com/office/drawing/2014/main" xmlns="" id="{E0D5EBA5-94AF-4373-B032-A40FF73C7575}"/>
               </a:ext>
             </a:extLst>
           </p:cNvPr>
@@ -652,7 +652,7 @@
           <p:cNvPr id="4" name="Date Placeholder 3">
             <a:extLst>
               <a:ext uri="{FF2B5EF4-FFF2-40B4-BE49-F238E27FC236}">
-                <a16:creationId xmlns:a16="http://schemas.microsoft.com/office/drawing/2014/main" id="{7426B8E1-6758-4F5E-B618-96641332600B}"/>
+                <a16:creationId xmlns:a16="http://schemas.microsoft.com/office/drawing/2014/main" xmlns="" id="{7426B8E1-6758-4F5E-B618-96641332600B}"/>
               </a:ext>
             </a:extLst>
           </p:cNvPr>
@@ -670,7 +670,7 @@
           <a:p>
             <a:fld id="{6C733091-19F0-4DD7-90FE-000B4789B4CF}" type="datetimeFigureOut">
               <a:rPr lang="en-US" smtClean="0"/>
-              <a:t>8/26/2021</a:t>
+              <a:t>8/27/2021</a:t>
             </a:fld>
             <a:endParaRPr lang="en-US"/>
           </a:p>
@@ -681,7 +681,7 @@
           <p:cNvPr id="5" name="Footer Placeholder 4">
             <a:extLst>
               <a:ext uri="{FF2B5EF4-FFF2-40B4-BE49-F238E27FC236}">
-                <a16:creationId xmlns:a16="http://schemas.microsoft.com/office/drawing/2014/main" id="{F65E330E-2A7E-482D-AE0F-70EA5A29958B}"/>
+                <a16:creationId xmlns:a16="http://schemas.microsoft.com/office/drawing/2014/main" xmlns="" id="{F65E330E-2A7E-482D-AE0F-70EA5A29958B}"/>
               </a:ext>
             </a:extLst>
           </p:cNvPr>
@@ -706,7 +706,7 @@
           <p:cNvPr id="6" name="Slide Number Placeholder 5">
             <a:extLst>
               <a:ext uri="{FF2B5EF4-FFF2-40B4-BE49-F238E27FC236}">
-                <a16:creationId xmlns:a16="http://schemas.microsoft.com/office/drawing/2014/main" id="{B8000005-FC38-4A6C-9D09-7945EFA08160}"/>
+                <a16:creationId xmlns:a16="http://schemas.microsoft.com/office/drawing/2014/main" xmlns="" id="{B8000005-FC38-4A6C-9D09-7945EFA08160}"/>
               </a:ext>
             </a:extLst>
           </p:cNvPr>
@@ -765,7 +765,7 @@
           <p:cNvPr id="2" name="Title 1">
             <a:extLst>
               <a:ext uri="{FF2B5EF4-FFF2-40B4-BE49-F238E27FC236}">
-                <a16:creationId xmlns:a16="http://schemas.microsoft.com/office/drawing/2014/main" id="{91D0002C-766B-44B4-A24C-BE6DE6C7BA4C}"/>
+                <a16:creationId xmlns:a16="http://schemas.microsoft.com/office/drawing/2014/main" xmlns="" id="{91D0002C-766B-44B4-A24C-BE6DE6C7BA4C}"/>
               </a:ext>
             </a:extLst>
           </p:cNvPr>
@@ -793,7 +793,7 @@
           <p:cNvPr id="3" name="Content Placeholder 2">
             <a:extLst>
               <a:ext uri="{FF2B5EF4-FFF2-40B4-BE49-F238E27FC236}">
-                <a16:creationId xmlns:a16="http://schemas.microsoft.com/office/drawing/2014/main" id="{3455BAA9-6C7B-4874-AD76-BD466F64802D}"/>
+                <a16:creationId xmlns:a16="http://schemas.microsoft.com/office/drawing/2014/main" xmlns="" id="{3455BAA9-6C7B-4874-AD76-BD466F64802D}"/>
               </a:ext>
             </a:extLst>
           </p:cNvPr>
@@ -850,7 +850,7 @@
           <p:cNvPr id="4" name="Date Placeholder 3">
             <a:extLst>
               <a:ext uri="{FF2B5EF4-FFF2-40B4-BE49-F238E27FC236}">
-                <a16:creationId xmlns:a16="http://schemas.microsoft.com/office/drawing/2014/main" id="{8776BDAF-D8F2-4A61-904D-094BB4545702}"/>
+                <a16:creationId xmlns:a16="http://schemas.microsoft.com/office/drawing/2014/main" xmlns="" id="{8776BDAF-D8F2-4A61-904D-094BB4545702}"/>
               </a:ext>
             </a:extLst>
           </p:cNvPr>
@@ -868,7 +868,7 @@
           <a:p>
             <a:fld id="{6C733091-19F0-4DD7-90FE-000B4789B4CF}" type="datetimeFigureOut">
               <a:rPr lang="en-US" smtClean="0"/>
-              <a:t>8/26/2021</a:t>
+              <a:t>8/27/2021</a:t>
             </a:fld>
             <a:endParaRPr lang="en-US"/>
           </a:p>
@@ -879,7 +879,7 @@
           <p:cNvPr id="5" name="Footer Placeholder 4">
             <a:extLst>
               <a:ext uri="{FF2B5EF4-FFF2-40B4-BE49-F238E27FC236}">
-                <a16:creationId xmlns:a16="http://schemas.microsoft.com/office/drawing/2014/main" id="{F89C5665-4384-4706-9BD2-9F42B05C96BC}"/>
+                <a16:creationId xmlns:a16="http://schemas.microsoft.com/office/drawing/2014/main" xmlns="" id="{F89C5665-4384-4706-9BD2-9F42B05C96BC}"/>
               </a:ext>
             </a:extLst>
           </p:cNvPr>
@@ -904,7 +904,7 @@
           <p:cNvPr id="6" name="Slide Number Placeholder 5">
             <a:extLst>
               <a:ext uri="{FF2B5EF4-FFF2-40B4-BE49-F238E27FC236}">
-                <a16:creationId xmlns:a16="http://schemas.microsoft.com/office/drawing/2014/main" id="{7DCAD73E-CAB3-4BA7-905E-D203691D0418}"/>
+                <a16:creationId xmlns:a16="http://schemas.microsoft.com/office/drawing/2014/main" xmlns="" id="{7DCAD73E-CAB3-4BA7-905E-D203691D0418}"/>
               </a:ext>
             </a:extLst>
           </p:cNvPr>
@@ -963,7 +963,7 @@
           <p:cNvPr id="2" name="Title 1">
             <a:extLst>
               <a:ext uri="{FF2B5EF4-FFF2-40B4-BE49-F238E27FC236}">
-                <a16:creationId xmlns:a16="http://schemas.microsoft.com/office/drawing/2014/main" id="{A9880706-F7FA-4EC3-A022-9D6C7CEC3692}"/>
+                <a16:creationId xmlns:a16="http://schemas.microsoft.com/office/drawing/2014/main" xmlns="" id="{A9880706-F7FA-4EC3-A022-9D6C7CEC3692}"/>
               </a:ext>
             </a:extLst>
           </p:cNvPr>
@@ -1000,7 +1000,7 @@
           <p:cNvPr id="3" name="Text Placeholder 2">
             <a:extLst>
               <a:ext uri="{FF2B5EF4-FFF2-40B4-BE49-F238E27FC236}">
-                <a16:creationId xmlns:a16="http://schemas.microsoft.com/office/drawing/2014/main" id="{FA8A65D0-3DF5-448D-82EC-A967682A0DED}"/>
+                <a16:creationId xmlns:a16="http://schemas.microsoft.com/office/drawing/2014/main" xmlns="" id="{FA8A65D0-3DF5-448D-82EC-A967682A0DED}"/>
               </a:ext>
             </a:extLst>
           </p:cNvPr>
@@ -1125,7 +1125,7 @@
           <p:cNvPr id="4" name="Date Placeholder 3">
             <a:extLst>
               <a:ext uri="{FF2B5EF4-FFF2-40B4-BE49-F238E27FC236}">
-                <a16:creationId xmlns:a16="http://schemas.microsoft.com/office/drawing/2014/main" id="{600EA68C-01A6-487D-9D6E-1D1B4EAC0440}"/>
+                <a16:creationId xmlns:a16="http://schemas.microsoft.com/office/drawing/2014/main" xmlns="" id="{600EA68C-01A6-487D-9D6E-1D1B4EAC0440}"/>
               </a:ext>
             </a:extLst>
           </p:cNvPr>
@@ -1143,7 +1143,7 @@
           <a:p>
             <a:fld id="{6C733091-19F0-4DD7-90FE-000B4789B4CF}" type="datetimeFigureOut">
               <a:rPr lang="en-US" smtClean="0"/>
-              <a:t>8/26/2021</a:t>
+              <a:t>8/27/2021</a:t>
             </a:fld>
             <a:endParaRPr lang="en-US"/>
           </a:p>
@@ -1154,7 +1154,7 @@
           <p:cNvPr id="5" name="Footer Placeholder 4">
             <a:extLst>
               <a:ext uri="{FF2B5EF4-FFF2-40B4-BE49-F238E27FC236}">
-                <a16:creationId xmlns:a16="http://schemas.microsoft.com/office/drawing/2014/main" id="{6E6527CB-4FFD-4569-A82C-5EDC311B2CF6}"/>
+                <a16:creationId xmlns:a16="http://schemas.microsoft.com/office/drawing/2014/main" xmlns="" id="{6E6527CB-4FFD-4569-A82C-5EDC311B2CF6}"/>
               </a:ext>
             </a:extLst>
           </p:cNvPr>
@@ -1179,7 +1179,7 @@
           <p:cNvPr id="6" name="Slide Number Placeholder 5">
             <a:extLst>
               <a:ext uri="{FF2B5EF4-FFF2-40B4-BE49-F238E27FC236}">
-                <a16:creationId xmlns:a16="http://schemas.microsoft.com/office/drawing/2014/main" id="{24B19E5B-5A98-4381-A01D-01F81FD65792}"/>
+                <a16:creationId xmlns:a16="http://schemas.microsoft.com/office/drawing/2014/main" xmlns="" id="{24B19E5B-5A98-4381-A01D-01F81FD65792}"/>
               </a:ext>
             </a:extLst>
           </p:cNvPr>
@@ -1238,7 +1238,7 @@
           <p:cNvPr id="2" name="Title 1">
             <a:extLst>
               <a:ext uri="{FF2B5EF4-FFF2-40B4-BE49-F238E27FC236}">
-                <a16:creationId xmlns:a16="http://schemas.microsoft.com/office/drawing/2014/main" id="{63228B71-E923-4431-B8D2-FAE724678940}"/>
+                <a16:creationId xmlns:a16="http://schemas.microsoft.com/office/drawing/2014/main" xmlns="" id="{63228B71-E923-4431-B8D2-FAE724678940}"/>
               </a:ext>
             </a:extLst>
           </p:cNvPr>
@@ -1266,7 +1266,7 @@
           <p:cNvPr id="3" name="Content Placeholder 2">
             <a:extLst>
               <a:ext uri="{FF2B5EF4-FFF2-40B4-BE49-F238E27FC236}">
-                <a16:creationId xmlns:a16="http://schemas.microsoft.com/office/drawing/2014/main" id="{B18895E9-B7FF-4A00-955B-206CF8C73E43}"/>
+                <a16:creationId xmlns:a16="http://schemas.microsoft.com/office/drawing/2014/main" xmlns="" id="{B18895E9-B7FF-4A00-955B-206CF8C73E43}"/>
               </a:ext>
             </a:extLst>
           </p:cNvPr>
@@ -1328,7 +1328,7 @@
           <p:cNvPr id="4" name="Content Placeholder 3">
             <a:extLst>
               <a:ext uri="{FF2B5EF4-FFF2-40B4-BE49-F238E27FC236}">
-                <a16:creationId xmlns:a16="http://schemas.microsoft.com/office/drawing/2014/main" id="{DA813955-E3B9-44BC-8E1D-139269C8B48A}"/>
+                <a16:creationId xmlns:a16="http://schemas.microsoft.com/office/drawing/2014/main" xmlns="" id="{DA813955-E3B9-44BC-8E1D-139269C8B48A}"/>
               </a:ext>
             </a:extLst>
           </p:cNvPr>
@@ -1390,7 +1390,7 @@
           <p:cNvPr id="5" name="Date Placeholder 4">
             <a:extLst>
               <a:ext uri="{FF2B5EF4-FFF2-40B4-BE49-F238E27FC236}">
-                <a16:creationId xmlns:a16="http://schemas.microsoft.com/office/drawing/2014/main" id="{7E9B8EF5-28D5-4C4E-A2AB-EEA30D75DAFE}"/>
+                <a16:creationId xmlns:a16="http://schemas.microsoft.com/office/drawing/2014/main" xmlns="" id="{7E9B8EF5-28D5-4C4E-A2AB-EEA30D75DAFE}"/>
               </a:ext>
             </a:extLst>
           </p:cNvPr>
@@ -1408,7 +1408,7 @@
           <a:p>
             <a:fld id="{6C733091-19F0-4DD7-90FE-000B4789B4CF}" type="datetimeFigureOut">
               <a:rPr lang="en-US" smtClean="0"/>
-              <a:t>8/26/2021</a:t>
+              <a:t>8/27/2021</a:t>
             </a:fld>
             <a:endParaRPr lang="en-US"/>
           </a:p>
@@ -1419,7 +1419,7 @@
           <p:cNvPr id="6" name="Footer Placeholder 5">
             <a:extLst>
               <a:ext uri="{FF2B5EF4-FFF2-40B4-BE49-F238E27FC236}">
-                <a16:creationId xmlns:a16="http://schemas.microsoft.com/office/drawing/2014/main" id="{5723E678-8CB4-4335-AA04-6BD391748717}"/>
+                <a16:creationId xmlns:a16="http://schemas.microsoft.com/office/drawing/2014/main" xmlns="" id="{5723E678-8CB4-4335-AA04-6BD391748717}"/>
               </a:ext>
             </a:extLst>
           </p:cNvPr>
@@ -1444,7 +1444,7 @@
           <p:cNvPr id="7" name="Slide Number Placeholder 6">
             <a:extLst>
               <a:ext uri="{FF2B5EF4-FFF2-40B4-BE49-F238E27FC236}">
-                <a16:creationId xmlns:a16="http://schemas.microsoft.com/office/drawing/2014/main" id="{887B5567-9F4D-4AE1-92D8-769C9F7EA4F0}"/>
+                <a16:creationId xmlns:a16="http://schemas.microsoft.com/office/drawing/2014/main" xmlns="" id="{887B5567-9F4D-4AE1-92D8-769C9F7EA4F0}"/>
               </a:ext>
             </a:extLst>
           </p:cNvPr>
@@ -1503,7 +1503,7 @@
           <p:cNvPr id="2" name="Title 1">
             <a:extLst>
               <a:ext uri="{FF2B5EF4-FFF2-40B4-BE49-F238E27FC236}">
-                <a16:creationId xmlns:a16="http://schemas.microsoft.com/office/drawing/2014/main" id="{A40320A9-7C0C-45B4-BF2B-3B53B5686EBB}"/>
+                <a16:creationId xmlns:a16="http://schemas.microsoft.com/office/drawing/2014/main" xmlns="" id="{A40320A9-7C0C-45B4-BF2B-3B53B5686EBB}"/>
               </a:ext>
             </a:extLst>
           </p:cNvPr>
@@ -1536,7 +1536,7 @@
           <p:cNvPr id="3" name="Text Placeholder 2">
             <a:extLst>
               <a:ext uri="{FF2B5EF4-FFF2-40B4-BE49-F238E27FC236}">
-                <a16:creationId xmlns:a16="http://schemas.microsoft.com/office/drawing/2014/main" id="{8C440DE1-7DD6-4B1C-B961-CD2079B51F03}"/>
+                <a16:creationId xmlns:a16="http://schemas.microsoft.com/office/drawing/2014/main" xmlns="" id="{8C440DE1-7DD6-4B1C-B961-CD2079B51F03}"/>
               </a:ext>
             </a:extLst>
           </p:cNvPr>
@@ -1607,7 +1607,7 @@
           <p:cNvPr id="4" name="Content Placeholder 3">
             <a:extLst>
               <a:ext uri="{FF2B5EF4-FFF2-40B4-BE49-F238E27FC236}">
-                <a16:creationId xmlns:a16="http://schemas.microsoft.com/office/drawing/2014/main" id="{6FAFE840-CC9A-4D89-B05F-159EF756B427}"/>
+                <a16:creationId xmlns:a16="http://schemas.microsoft.com/office/drawing/2014/main" xmlns="" id="{6FAFE840-CC9A-4D89-B05F-159EF756B427}"/>
               </a:ext>
             </a:extLst>
           </p:cNvPr>
@@ -1669,7 +1669,7 @@
           <p:cNvPr id="5" name="Text Placeholder 4">
             <a:extLst>
               <a:ext uri="{FF2B5EF4-FFF2-40B4-BE49-F238E27FC236}">
-                <a16:creationId xmlns:a16="http://schemas.microsoft.com/office/drawing/2014/main" id="{4B87AADC-3401-48C6-98F6-0AB60F6DF9BE}"/>
+                <a16:creationId xmlns:a16="http://schemas.microsoft.com/office/drawing/2014/main" xmlns="" id="{4B87AADC-3401-48C6-98F6-0AB60F6DF9BE}"/>
               </a:ext>
             </a:extLst>
           </p:cNvPr>
@@ -1740,7 +1740,7 @@
           <p:cNvPr id="6" name="Content Placeholder 5">
             <a:extLst>
               <a:ext uri="{FF2B5EF4-FFF2-40B4-BE49-F238E27FC236}">
-                <a16:creationId xmlns:a16="http://schemas.microsoft.com/office/drawing/2014/main" id="{34BCF1A4-FB52-4DCD-80BC-324BA41C33CD}"/>
+                <a16:creationId xmlns:a16="http://schemas.microsoft.com/office/drawing/2014/main" xmlns="" id="{34BCF1A4-FB52-4DCD-80BC-324BA41C33CD}"/>
               </a:ext>
             </a:extLst>
           </p:cNvPr>
@@ -1802,7 +1802,7 @@
           <p:cNvPr id="7" name="Date Placeholder 6">
             <a:extLst>
               <a:ext uri="{FF2B5EF4-FFF2-40B4-BE49-F238E27FC236}">
-                <a16:creationId xmlns:a16="http://schemas.microsoft.com/office/drawing/2014/main" id="{8CFD4208-60E7-48B1-8CD0-717D5E26B827}"/>
+                <a16:creationId xmlns:a16="http://schemas.microsoft.com/office/drawing/2014/main" xmlns="" id="{8CFD4208-60E7-48B1-8CD0-717D5E26B827}"/>
               </a:ext>
             </a:extLst>
           </p:cNvPr>
@@ -1820,7 +1820,7 @@
           <a:p>
             <a:fld id="{6C733091-19F0-4DD7-90FE-000B4789B4CF}" type="datetimeFigureOut">
               <a:rPr lang="en-US" smtClean="0"/>
-              <a:t>8/26/2021</a:t>
+              <a:t>8/27/2021</a:t>
             </a:fld>
             <a:endParaRPr lang="en-US"/>
           </a:p>
@@ -1831,7 +1831,7 @@
           <p:cNvPr id="8" name="Footer Placeholder 7">
             <a:extLst>
               <a:ext uri="{FF2B5EF4-FFF2-40B4-BE49-F238E27FC236}">
-                <a16:creationId xmlns:a16="http://schemas.microsoft.com/office/drawing/2014/main" id="{94E429D1-BEB1-4D8A-91F2-CD4F80157F8D}"/>
+                <a16:creationId xmlns:a16="http://schemas.microsoft.com/office/drawing/2014/main" xmlns="" id="{94E429D1-BEB1-4D8A-91F2-CD4F80157F8D}"/>
               </a:ext>
             </a:extLst>
           </p:cNvPr>
@@ -1856,7 +1856,7 @@
           <p:cNvPr id="9" name="Slide Number Placeholder 8">
             <a:extLst>
               <a:ext uri="{FF2B5EF4-FFF2-40B4-BE49-F238E27FC236}">
-                <a16:creationId xmlns:a16="http://schemas.microsoft.com/office/drawing/2014/main" id="{6F17C19C-8370-4118-A8FC-5DDA6F84230F}"/>
+                <a16:creationId xmlns:a16="http://schemas.microsoft.com/office/drawing/2014/main" xmlns="" id="{6F17C19C-8370-4118-A8FC-5DDA6F84230F}"/>
               </a:ext>
             </a:extLst>
           </p:cNvPr>
@@ -1915,7 +1915,7 @@
           <p:cNvPr id="2" name="Title 1">
             <a:extLst>
               <a:ext uri="{FF2B5EF4-FFF2-40B4-BE49-F238E27FC236}">
-                <a16:creationId xmlns:a16="http://schemas.microsoft.com/office/drawing/2014/main" id="{252CBF36-7F99-45A9-BC35-BD2EC260CBF0}"/>
+                <a16:creationId xmlns:a16="http://schemas.microsoft.com/office/drawing/2014/main" xmlns="" id="{252CBF36-7F99-45A9-BC35-BD2EC260CBF0}"/>
               </a:ext>
             </a:extLst>
           </p:cNvPr>
@@ -1943,7 +1943,7 @@
           <p:cNvPr id="3" name="Date Placeholder 2">
             <a:extLst>
               <a:ext uri="{FF2B5EF4-FFF2-40B4-BE49-F238E27FC236}">
-                <a16:creationId xmlns:a16="http://schemas.microsoft.com/office/drawing/2014/main" id="{0D6F5F83-F07E-4501-B86B-9F96CD43993C}"/>
+                <a16:creationId xmlns:a16="http://schemas.microsoft.com/office/drawing/2014/main" xmlns="" id="{0D6F5F83-F07E-4501-B86B-9F96CD43993C}"/>
               </a:ext>
             </a:extLst>
           </p:cNvPr>
@@ -1961,7 +1961,7 @@
           <a:p>
             <a:fld id="{6C733091-19F0-4DD7-90FE-000B4789B4CF}" type="datetimeFigureOut">
               <a:rPr lang="en-US" smtClean="0"/>
-              <a:t>8/26/2021</a:t>
+              <a:t>8/27/2021</a:t>
             </a:fld>
             <a:endParaRPr lang="en-US"/>
           </a:p>
@@ -1972,7 +1972,7 @@
           <p:cNvPr id="4" name="Footer Placeholder 3">
             <a:extLst>
               <a:ext uri="{FF2B5EF4-FFF2-40B4-BE49-F238E27FC236}">
-                <a16:creationId xmlns:a16="http://schemas.microsoft.com/office/drawing/2014/main" id="{2861989B-F8E9-41FD-8E16-687424BCC266}"/>
+                <a16:creationId xmlns:a16="http://schemas.microsoft.com/office/drawing/2014/main" xmlns="" id="{2861989B-F8E9-41FD-8E16-687424BCC266}"/>
               </a:ext>
             </a:extLst>
           </p:cNvPr>
@@ -1997,7 +1997,7 @@
           <p:cNvPr id="5" name="Slide Number Placeholder 4">
             <a:extLst>
               <a:ext uri="{FF2B5EF4-FFF2-40B4-BE49-F238E27FC236}">
-                <a16:creationId xmlns:a16="http://schemas.microsoft.com/office/drawing/2014/main" id="{2026B6D7-7832-4815-95CE-5CEC39502825}"/>
+                <a16:creationId xmlns:a16="http://schemas.microsoft.com/office/drawing/2014/main" xmlns="" id="{2026B6D7-7832-4815-95CE-5CEC39502825}"/>
               </a:ext>
             </a:extLst>
           </p:cNvPr>
@@ -2056,7 +2056,7 @@
           <p:cNvPr id="2" name="Date Placeholder 1">
             <a:extLst>
               <a:ext uri="{FF2B5EF4-FFF2-40B4-BE49-F238E27FC236}">
-                <a16:creationId xmlns:a16="http://schemas.microsoft.com/office/drawing/2014/main" id="{9877919A-C4B6-46FD-A08A-9A4B867FE01A}"/>
+                <a16:creationId xmlns:a16="http://schemas.microsoft.com/office/drawing/2014/main" xmlns="" id="{9877919A-C4B6-46FD-A08A-9A4B867FE01A}"/>
               </a:ext>
             </a:extLst>
           </p:cNvPr>
@@ -2074,7 +2074,7 @@
           <a:p>
             <a:fld id="{6C733091-19F0-4DD7-90FE-000B4789B4CF}" type="datetimeFigureOut">
               <a:rPr lang="en-US" smtClean="0"/>
-              <a:t>8/26/2021</a:t>
+              <a:t>8/27/2021</a:t>
             </a:fld>
             <a:endParaRPr lang="en-US"/>
           </a:p>
@@ -2085,7 +2085,7 @@
           <p:cNvPr id="3" name="Footer Placeholder 2">
             <a:extLst>
               <a:ext uri="{FF2B5EF4-FFF2-40B4-BE49-F238E27FC236}">
-                <a16:creationId xmlns:a16="http://schemas.microsoft.com/office/drawing/2014/main" id="{9118539E-383C-4F1C-86F2-14C533A7E9FB}"/>
+                <a16:creationId xmlns:a16="http://schemas.microsoft.com/office/drawing/2014/main" xmlns="" id="{9118539E-383C-4F1C-86F2-14C533A7E9FB}"/>
               </a:ext>
             </a:extLst>
           </p:cNvPr>
@@ -2110,7 +2110,7 @@
           <p:cNvPr id="4" name="Slide Number Placeholder 3">
             <a:extLst>
               <a:ext uri="{FF2B5EF4-FFF2-40B4-BE49-F238E27FC236}">
-                <a16:creationId xmlns:a16="http://schemas.microsoft.com/office/drawing/2014/main" id="{C9A6D4E1-CA83-4214-9942-9E4617AA89BF}"/>
+                <a16:creationId xmlns:a16="http://schemas.microsoft.com/office/drawing/2014/main" xmlns="" id="{C9A6D4E1-CA83-4214-9942-9E4617AA89BF}"/>
               </a:ext>
             </a:extLst>
           </p:cNvPr>
@@ -2169,7 +2169,7 @@
           <p:cNvPr id="2" name="Title 1">
             <a:extLst>
               <a:ext uri="{FF2B5EF4-FFF2-40B4-BE49-F238E27FC236}">
-                <a16:creationId xmlns:a16="http://schemas.microsoft.com/office/drawing/2014/main" id="{046EF9B5-7A2A-4225-8817-86D028D6950C}"/>
+                <a16:creationId xmlns:a16="http://schemas.microsoft.com/office/drawing/2014/main" xmlns="" id="{046EF9B5-7A2A-4225-8817-86D028D6950C}"/>
               </a:ext>
             </a:extLst>
           </p:cNvPr>
@@ -2206,7 +2206,7 @@
           <p:cNvPr id="3" name="Content Placeholder 2">
             <a:extLst>
               <a:ext uri="{FF2B5EF4-FFF2-40B4-BE49-F238E27FC236}">
-                <a16:creationId xmlns:a16="http://schemas.microsoft.com/office/drawing/2014/main" id="{8667C390-5297-41E8-A403-22856007B051}"/>
+                <a16:creationId xmlns:a16="http://schemas.microsoft.com/office/drawing/2014/main" xmlns="" id="{8667C390-5297-41E8-A403-22856007B051}"/>
               </a:ext>
             </a:extLst>
           </p:cNvPr>
@@ -2296,7 +2296,7 @@
           <p:cNvPr id="4" name="Text Placeholder 3">
             <a:extLst>
               <a:ext uri="{FF2B5EF4-FFF2-40B4-BE49-F238E27FC236}">
-                <a16:creationId xmlns:a16="http://schemas.microsoft.com/office/drawing/2014/main" id="{8D0D2F7D-D6CD-4AB1-A3EA-CBFD2A2B3703}"/>
+                <a16:creationId xmlns:a16="http://schemas.microsoft.com/office/drawing/2014/main" xmlns="" id="{8D0D2F7D-D6CD-4AB1-A3EA-CBFD2A2B3703}"/>
               </a:ext>
             </a:extLst>
           </p:cNvPr>
@@ -2367,7 +2367,7 @@
           <p:cNvPr id="5" name="Date Placeholder 4">
             <a:extLst>
               <a:ext uri="{FF2B5EF4-FFF2-40B4-BE49-F238E27FC236}">
-                <a16:creationId xmlns:a16="http://schemas.microsoft.com/office/drawing/2014/main" id="{E17A441D-4FA7-4110-BF24-165CD3C3DAD7}"/>
+                <a16:creationId xmlns:a16="http://schemas.microsoft.com/office/drawing/2014/main" xmlns="" id="{E17A441D-4FA7-4110-BF24-165CD3C3DAD7}"/>
               </a:ext>
             </a:extLst>
           </p:cNvPr>
@@ -2385,7 +2385,7 @@
           <a:p>
             <a:fld id="{6C733091-19F0-4DD7-90FE-000B4789B4CF}" type="datetimeFigureOut">
               <a:rPr lang="en-US" smtClean="0"/>
-              <a:t>8/26/2021</a:t>
+              <a:t>8/27/2021</a:t>
             </a:fld>
             <a:endParaRPr lang="en-US"/>
           </a:p>
@@ -2396,7 +2396,7 @@
           <p:cNvPr id="6" name="Footer Placeholder 5">
             <a:extLst>
               <a:ext uri="{FF2B5EF4-FFF2-40B4-BE49-F238E27FC236}">
-                <a16:creationId xmlns:a16="http://schemas.microsoft.com/office/drawing/2014/main" id="{346102C5-5AE3-43CF-A686-1AB72B0790AB}"/>
+                <a16:creationId xmlns:a16="http://schemas.microsoft.com/office/drawing/2014/main" xmlns="" id="{346102C5-5AE3-43CF-A686-1AB72B0790AB}"/>
               </a:ext>
             </a:extLst>
           </p:cNvPr>
@@ -2421,7 +2421,7 @@
           <p:cNvPr id="7" name="Slide Number Placeholder 6">
             <a:extLst>
               <a:ext uri="{FF2B5EF4-FFF2-40B4-BE49-F238E27FC236}">
-                <a16:creationId xmlns:a16="http://schemas.microsoft.com/office/drawing/2014/main" id="{5528B3F7-462C-4500-8836-B3E5CD8DA61A}"/>
+                <a16:creationId xmlns:a16="http://schemas.microsoft.com/office/drawing/2014/main" xmlns="" id="{5528B3F7-462C-4500-8836-B3E5CD8DA61A}"/>
               </a:ext>
             </a:extLst>
           </p:cNvPr>
@@ -2480,7 +2480,7 @@
           <p:cNvPr id="2" name="Title 1">
             <a:extLst>
               <a:ext uri="{FF2B5EF4-FFF2-40B4-BE49-F238E27FC236}">
-                <a16:creationId xmlns:a16="http://schemas.microsoft.com/office/drawing/2014/main" id="{4BA10E59-DA48-4690-A956-9EB8E4E11EE5}"/>
+                <a16:creationId xmlns:a16="http://schemas.microsoft.com/office/drawing/2014/main" xmlns="" id="{4BA10E59-DA48-4690-A956-9EB8E4E11EE5}"/>
               </a:ext>
             </a:extLst>
           </p:cNvPr>
@@ -2517,7 +2517,7 @@
           <p:cNvPr id="3" name="Picture Placeholder 2">
             <a:extLst>
               <a:ext uri="{FF2B5EF4-FFF2-40B4-BE49-F238E27FC236}">
-                <a16:creationId xmlns:a16="http://schemas.microsoft.com/office/drawing/2014/main" id="{AC7AFE1E-67D1-4106-97CA-98302D42CC4D}"/>
+                <a16:creationId xmlns:a16="http://schemas.microsoft.com/office/drawing/2014/main" xmlns="" id="{AC7AFE1E-67D1-4106-97CA-98302D42CC4D}"/>
               </a:ext>
             </a:extLst>
           </p:cNvPr>
@@ -2584,7 +2584,7 @@
           <p:cNvPr id="4" name="Text Placeholder 3">
             <a:extLst>
               <a:ext uri="{FF2B5EF4-FFF2-40B4-BE49-F238E27FC236}">
-                <a16:creationId xmlns:a16="http://schemas.microsoft.com/office/drawing/2014/main" id="{67D8D73B-3D4D-42A7-9A3C-1D508E8A9B45}"/>
+                <a16:creationId xmlns:a16="http://schemas.microsoft.com/office/drawing/2014/main" xmlns="" id="{67D8D73B-3D4D-42A7-9A3C-1D508E8A9B45}"/>
               </a:ext>
             </a:extLst>
           </p:cNvPr>
@@ -2655,7 +2655,7 @@
           <p:cNvPr id="5" name="Date Placeholder 4">
             <a:extLst>
               <a:ext uri="{FF2B5EF4-FFF2-40B4-BE49-F238E27FC236}">
-                <a16:creationId xmlns:a16="http://schemas.microsoft.com/office/drawing/2014/main" id="{48C8945E-A47A-42A2-9DF6-CA6D5002F65F}"/>
+                <a16:creationId xmlns:a16="http://schemas.microsoft.com/office/drawing/2014/main" xmlns="" id="{48C8945E-A47A-42A2-9DF6-CA6D5002F65F}"/>
               </a:ext>
             </a:extLst>
           </p:cNvPr>
@@ -2673,7 +2673,7 @@
           <a:p>
             <a:fld id="{6C733091-19F0-4DD7-90FE-000B4789B4CF}" type="datetimeFigureOut">
               <a:rPr lang="en-US" smtClean="0"/>
-              <a:t>8/26/2021</a:t>
+              <a:t>8/27/2021</a:t>
             </a:fld>
             <a:endParaRPr lang="en-US"/>
           </a:p>
@@ -2684,7 +2684,7 @@
           <p:cNvPr id="6" name="Footer Placeholder 5">
             <a:extLst>
               <a:ext uri="{FF2B5EF4-FFF2-40B4-BE49-F238E27FC236}">
-                <a16:creationId xmlns:a16="http://schemas.microsoft.com/office/drawing/2014/main" id="{EB000DB4-2747-4297-B400-42A539FBDB42}"/>
+                <a16:creationId xmlns:a16="http://schemas.microsoft.com/office/drawing/2014/main" xmlns="" id="{EB000DB4-2747-4297-B400-42A539FBDB42}"/>
               </a:ext>
             </a:extLst>
           </p:cNvPr>
@@ -2709,7 +2709,7 @@
           <p:cNvPr id="7" name="Slide Number Placeholder 6">
             <a:extLst>
               <a:ext uri="{FF2B5EF4-FFF2-40B4-BE49-F238E27FC236}">
-                <a16:creationId xmlns:a16="http://schemas.microsoft.com/office/drawing/2014/main" id="{5BAD9222-F141-4803-AF73-E2DD92E2ABBC}"/>
+                <a16:creationId xmlns:a16="http://schemas.microsoft.com/office/drawing/2014/main" xmlns="" id="{5BAD9222-F141-4803-AF73-E2DD92E2ABBC}"/>
               </a:ext>
             </a:extLst>
           </p:cNvPr>
@@ -2773,7 +2773,7 @@
           <p:cNvPr id="2" name="Title Placeholder 1">
             <a:extLst>
               <a:ext uri="{FF2B5EF4-FFF2-40B4-BE49-F238E27FC236}">
-                <a16:creationId xmlns:a16="http://schemas.microsoft.com/office/drawing/2014/main" id="{5BF9D404-795C-4EA4-AD01-26740519239C}"/>
+                <a16:creationId xmlns:a16="http://schemas.microsoft.com/office/drawing/2014/main" xmlns="" id="{5BF9D404-795C-4EA4-AD01-26740519239C}"/>
               </a:ext>
             </a:extLst>
           </p:cNvPr>
@@ -2811,7 +2811,7 @@
           <p:cNvPr id="3" name="Text Placeholder 2">
             <a:extLst>
               <a:ext uri="{FF2B5EF4-FFF2-40B4-BE49-F238E27FC236}">
-                <a16:creationId xmlns:a16="http://schemas.microsoft.com/office/drawing/2014/main" id="{DE3FEC7B-48F8-4348-9BC6-68F83B859EE9}"/>
+                <a16:creationId xmlns:a16="http://schemas.microsoft.com/office/drawing/2014/main" xmlns="" id="{DE3FEC7B-48F8-4348-9BC6-68F83B859EE9}"/>
               </a:ext>
             </a:extLst>
           </p:cNvPr>
@@ -2878,7 +2878,7 @@
           <p:cNvPr id="4" name="Date Placeholder 3">
             <a:extLst>
               <a:ext uri="{FF2B5EF4-FFF2-40B4-BE49-F238E27FC236}">
-                <a16:creationId xmlns:a16="http://schemas.microsoft.com/office/drawing/2014/main" id="{31CA1A1D-E2F5-4161-A025-7B911965C2FE}"/>
+                <a16:creationId xmlns:a16="http://schemas.microsoft.com/office/drawing/2014/main" xmlns="" id="{31CA1A1D-E2F5-4161-A025-7B911965C2FE}"/>
               </a:ext>
             </a:extLst>
           </p:cNvPr>
@@ -2914,7 +2914,7 @@
           <a:p>
             <a:fld id="{6C733091-19F0-4DD7-90FE-000B4789B4CF}" type="datetimeFigureOut">
               <a:rPr lang="en-US" smtClean="0"/>
-              <a:t>8/26/2021</a:t>
+              <a:t>8/27/2021</a:t>
             </a:fld>
             <a:endParaRPr lang="en-US"/>
           </a:p>
@@ -2925,7 +2925,7 @@
           <p:cNvPr id="5" name="Footer Placeholder 4">
             <a:extLst>
               <a:ext uri="{FF2B5EF4-FFF2-40B4-BE49-F238E27FC236}">
-                <a16:creationId xmlns:a16="http://schemas.microsoft.com/office/drawing/2014/main" id="{43C7B926-18F3-4C13-AB92-764E10D324FB}"/>
+                <a16:creationId xmlns:a16="http://schemas.microsoft.com/office/drawing/2014/main" xmlns="" id="{43C7B926-18F3-4C13-AB92-764E10D324FB}"/>
               </a:ext>
             </a:extLst>
           </p:cNvPr>
@@ -2968,7 +2968,7 @@
           <p:cNvPr id="6" name="Slide Number Placeholder 5">
             <a:extLst>
               <a:ext uri="{FF2B5EF4-FFF2-40B4-BE49-F238E27FC236}">
-                <a16:creationId xmlns:a16="http://schemas.microsoft.com/office/drawing/2014/main" id="{734FA846-3BF6-46FD-80CF-34B300D244C0}"/>
+                <a16:creationId xmlns:a16="http://schemas.microsoft.com/office/drawing/2014/main" xmlns="" id="{734FA846-3BF6-46FD-80CF-34B300D244C0}"/>
               </a:ext>
             </a:extLst>
           </p:cNvPr>
@@ -3746,7 +3746,7 @@
           <p:cNvPr id="53" name="TextBox 52">
             <a:extLst>
               <a:ext uri="{FF2B5EF4-FFF2-40B4-BE49-F238E27FC236}">
-                <a16:creationId xmlns:a16="http://schemas.microsoft.com/office/drawing/2014/main" id="{CFFD1938-4192-486E-9D53-D9784518AD14}"/>
+                <a16:creationId xmlns:a16="http://schemas.microsoft.com/office/drawing/2014/main" xmlns="" id="{CFFD1938-4192-486E-9D53-D9784518AD14}"/>
               </a:ext>
             </a:extLst>
           </p:cNvPr>
@@ -3781,7 +3781,7 @@
           <p:cNvPr id="2" name="Rectangle 1">
             <a:extLst>
               <a:ext uri="{FF2B5EF4-FFF2-40B4-BE49-F238E27FC236}">
-                <a16:creationId xmlns:a16="http://schemas.microsoft.com/office/drawing/2014/main" id="{AA0ED7A8-1532-4365-90ED-3F304B8440CE}"/>
+                <a16:creationId xmlns:a16="http://schemas.microsoft.com/office/drawing/2014/main" xmlns="" id="{AA0ED7A8-1532-4365-90ED-3F304B8440CE}"/>
               </a:ext>
             </a:extLst>
           </p:cNvPr>
@@ -3840,7 +3840,7 @@
           <p:cNvPr id="4" name="Rectangle 3">
             <a:extLst>
               <a:ext uri="{FF2B5EF4-FFF2-40B4-BE49-F238E27FC236}">
-                <a16:creationId xmlns:a16="http://schemas.microsoft.com/office/drawing/2014/main" id="{21B869D6-66CB-4B38-975F-B7FEB6AA9B13}"/>
+                <a16:creationId xmlns:a16="http://schemas.microsoft.com/office/drawing/2014/main" xmlns="" id="{21B869D6-66CB-4B38-975F-B7FEB6AA9B13}"/>
               </a:ext>
             </a:extLst>
           </p:cNvPr>
@@ -3980,7 +3980,7 @@
           <p:cNvPr id="7" name="TextBox 6">
             <a:extLst>
               <a:ext uri="{FF2B5EF4-FFF2-40B4-BE49-F238E27FC236}">
-                <a16:creationId xmlns:a16="http://schemas.microsoft.com/office/drawing/2014/main" id="{E0BBD6C8-C8F2-40C5-AA64-85961A11ADC2}"/>
+                <a16:creationId xmlns:a16="http://schemas.microsoft.com/office/drawing/2014/main" xmlns="" id="{E0BBD6C8-C8F2-40C5-AA64-85961A11ADC2}"/>
               </a:ext>
             </a:extLst>
           </p:cNvPr>
@@ -4123,7 +4123,7 @@
           <p:cNvPr id="16" name="Rectangle 15">
             <a:extLst>
               <a:ext uri="{FF2B5EF4-FFF2-40B4-BE49-F238E27FC236}">
-                <a16:creationId xmlns:a16="http://schemas.microsoft.com/office/drawing/2014/main" id="{AA0ED7A8-1532-4365-90ED-3F304B8440CE}"/>
+                <a16:creationId xmlns:a16="http://schemas.microsoft.com/office/drawing/2014/main" xmlns="" id="{AA0ED7A8-1532-4365-90ED-3F304B8440CE}"/>
               </a:ext>
             </a:extLst>
           </p:cNvPr>
@@ -4182,7 +4182,7 @@
           <p:cNvPr id="17" name="Rectangle 16">
             <a:extLst>
               <a:ext uri="{FF2B5EF4-FFF2-40B4-BE49-F238E27FC236}">
-                <a16:creationId xmlns:a16="http://schemas.microsoft.com/office/drawing/2014/main" id="{AA0ED7A8-1532-4365-90ED-3F304B8440CE}"/>
+                <a16:creationId xmlns:a16="http://schemas.microsoft.com/office/drawing/2014/main" xmlns="" id="{AA0ED7A8-1532-4365-90ED-3F304B8440CE}"/>
               </a:ext>
             </a:extLst>
           </p:cNvPr>
@@ -4277,7 +4277,7 @@
           <p:cNvPr id="20" name="TextBox 19">
             <a:extLst>
               <a:ext uri="{FF2B5EF4-FFF2-40B4-BE49-F238E27FC236}">
-                <a16:creationId xmlns:a16="http://schemas.microsoft.com/office/drawing/2014/main" id="{E0BBD6C8-C8F2-40C5-AA64-85961A11ADC2}"/>
+                <a16:creationId xmlns:a16="http://schemas.microsoft.com/office/drawing/2014/main" xmlns="" id="{E0BBD6C8-C8F2-40C5-AA64-85961A11ADC2}"/>
               </a:ext>
             </a:extLst>
           </p:cNvPr>
@@ -4312,7 +4312,7 @@
           <p:cNvPr id="21" name="TextBox 20">
             <a:extLst>
               <a:ext uri="{FF2B5EF4-FFF2-40B4-BE49-F238E27FC236}">
-                <a16:creationId xmlns:a16="http://schemas.microsoft.com/office/drawing/2014/main" id="{E0BBD6C8-C8F2-40C5-AA64-85961A11ADC2}"/>
+                <a16:creationId xmlns:a16="http://schemas.microsoft.com/office/drawing/2014/main" xmlns="" id="{E0BBD6C8-C8F2-40C5-AA64-85961A11ADC2}"/>
               </a:ext>
             </a:extLst>
           </p:cNvPr>
@@ -4347,19 +4347,17 @@
           <p:cNvPr id="22" name="Elbow Connector 21"/>
           <p:cNvCxnSpPr>
             <a:stCxn id="16" idx="0"/>
-            <a:endCxn id="2" idx="0"/>
+            <a:endCxn id="61" idx="3"/>
           </p:cNvCxnSpPr>
           <p:nvPr/>
         </p:nvCxnSpPr>
         <p:spPr>
-          <a:xfrm rot="16200000" flipH="1" flipV="1">
-            <a:off x="7351620" y="-107064"/>
-            <a:ext cx="15305" cy="3755245"/>
-          </a:xfrm>
-          <a:prstGeom prst="bentConnector3">
-            <a:avLst>
-              <a:gd name="adj1" fmla="val -1493630"/>
-            </a:avLst>
+          <a:xfrm rot="16200000" flipV="1">
+            <a:off x="7441133" y="-32855"/>
+            <a:ext cx="280612" cy="3310912"/>
+          </a:xfrm>
+          <a:prstGeom prst="bentConnector2">
+            <a:avLst/>
           </a:prstGeom>
           <a:ln>
             <a:tailEnd type="triangle"/>
@@ -4385,7 +4383,7 @@
           <p:cNvPr id="24" name="TextBox 23">
             <a:extLst>
               <a:ext uri="{FF2B5EF4-FFF2-40B4-BE49-F238E27FC236}">
-                <a16:creationId xmlns:a16="http://schemas.microsoft.com/office/drawing/2014/main" id="{E0BBD6C8-C8F2-40C5-AA64-85961A11ADC2}"/>
+                <a16:creationId xmlns:a16="http://schemas.microsoft.com/office/drawing/2014/main" xmlns="" id="{E0BBD6C8-C8F2-40C5-AA64-85961A11ADC2}"/>
               </a:ext>
             </a:extLst>
           </p:cNvPr>
@@ -4394,7 +4392,7 @@
         </p:nvSpPr>
         <p:spPr>
           <a:xfrm>
-            <a:off x="6942666" y="1300088"/>
+            <a:off x="6915099" y="1262465"/>
             <a:ext cx="1258988" cy="461665"/>
           </a:xfrm>
           <a:prstGeom prst="rect">
@@ -4462,19 +4460,17 @@
           <p:cNvPr id="27" name="Elbow Connector 26"/>
           <p:cNvCxnSpPr>
             <a:stCxn id="17" idx="0"/>
-            <a:endCxn id="2" idx="0"/>
+            <a:endCxn id="61" idx="1"/>
           </p:cNvCxnSpPr>
           <p:nvPr/>
         </p:nvCxnSpPr>
         <p:spPr>
           <a:xfrm rot="5400000" flipH="1" flipV="1">
-            <a:off x="3661136" y="-42302"/>
-            <a:ext cx="12700" cy="3641028"/>
-          </a:xfrm>
-          <a:prstGeom prst="bentConnector3">
-            <a:avLst>
-              <a:gd name="adj1" fmla="val 1800000"/>
-            </a:avLst>
+            <a:off x="3287718" y="35200"/>
+            <a:ext cx="295917" cy="3190109"/>
+          </a:xfrm>
+          <a:prstGeom prst="bentConnector2">
+            <a:avLst/>
           </a:prstGeom>
           <a:ln>
             <a:tailEnd type="triangle"/>
@@ -4500,7 +4496,7 @@
           <p:cNvPr id="29" name="TextBox 28">
             <a:extLst>
               <a:ext uri="{FF2B5EF4-FFF2-40B4-BE49-F238E27FC236}">
-                <a16:creationId xmlns:a16="http://schemas.microsoft.com/office/drawing/2014/main" id="{E0BBD6C8-C8F2-40C5-AA64-85961A11ADC2}"/>
+                <a16:creationId xmlns:a16="http://schemas.microsoft.com/office/drawing/2014/main" xmlns="" id="{E0BBD6C8-C8F2-40C5-AA64-85961A11ADC2}"/>
               </a:ext>
             </a:extLst>
           </p:cNvPr>
@@ -4509,7 +4505,7 @@
         </p:nvSpPr>
         <p:spPr>
           <a:xfrm>
-            <a:off x="2946586" y="1320399"/>
+            <a:off x="2953154" y="1274764"/>
             <a:ext cx="1182326" cy="461665"/>
           </a:xfrm>
           <a:prstGeom prst="rect">
@@ -4541,7 +4537,7 @@
           <p:cNvPr id="30" name="TextBox 29">
             <a:extLst>
               <a:ext uri="{FF2B5EF4-FFF2-40B4-BE49-F238E27FC236}">
-                <a16:creationId xmlns:a16="http://schemas.microsoft.com/office/drawing/2014/main" id="{E0BBD6C8-C8F2-40C5-AA64-85961A11ADC2}"/>
+                <a16:creationId xmlns:a16="http://schemas.microsoft.com/office/drawing/2014/main" xmlns="" id="{E0BBD6C8-C8F2-40C5-AA64-85961A11ADC2}"/>
               </a:ext>
             </a:extLst>
           </p:cNvPr>
@@ -4684,7 +4680,7 @@
           <p:cNvPr id="26" name="TextBox 25">
             <a:extLst>
               <a:ext uri="{FF2B5EF4-FFF2-40B4-BE49-F238E27FC236}">
-                <a16:creationId xmlns:a16="http://schemas.microsoft.com/office/drawing/2014/main" id="{E0BBD6C8-C8F2-40C5-AA64-85961A11ADC2}"/>
+                <a16:creationId xmlns:a16="http://schemas.microsoft.com/office/drawing/2014/main" xmlns="" id="{E0BBD6C8-C8F2-40C5-AA64-85961A11ADC2}"/>
               </a:ext>
             </a:extLst>
           </p:cNvPr>
@@ -4719,7 +4715,7 @@
           <p:cNvPr id="28" name="TextBox 27">
             <a:extLst>
               <a:ext uri="{FF2B5EF4-FFF2-40B4-BE49-F238E27FC236}">
-                <a16:creationId xmlns:a16="http://schemas.microsoft.com/office/drawing/2014/main" id="{E0BBD6C8-C8F2-40C5-AA64-85961A11ADC2}"/>
+                <a16:creationId xmlns:a16="http://schemas.microsoft.com/office/drawing/2014/main" xmlns="" id="{E0BBD6C8-C8F2-40C5-AA64-85961A11ADC2}"/>
               </a:ext>
             </a:extLst>
           </p:cNvPr>
@@ -4757,7 +4753,7 @@
         </p:nvSpPr>
         <p:spPr>
           <a:xfrm>
-            <a:off x="1799709" y="4546914"/>
+            <a:off x="2174155" y="4536113"/>
             <a:ext cx="1678916" cy="991056"/>
           </a:xfrm>
           <a:prstGeom prst="rect">
@@ -4811,7 +4807,7 @@
         </p:nvSpPr>
         <p:spPr>
           <a:xfrm>
-            <a:off x="7954019" y="4546914"/>
+            <a:off x="7842615" y="5568613"/>
             <a:ext cx="1678916" cy="991056"/>
           </a:xfrm>
           <a:prstGeom prst="rect">
@@ -4941,7 +4937,7 @@
         <p:spPr>
           <a:xfrm>
             <a:off x="6341278" y="5024914"/>
-            <a:ext cx="1612741" cy="17528"/>
+            <a:ext cx="1501337" cy="1039227"/>
           </a:xfrm>
           <a:prstGeom prst="straightConnector1">
             <a:avLst/>
@@ -4970,7 +4966,7 @@
           <p:cNvPr id="55" name="TextBox 54">
             <a:extLst>
               <a:ext uri="{FF2B5EF4-FFF2-40B4-BE49-F238E27FC236}">
-                <a16:creationId xmlns:a16="http://schemas.microsoft.com/office/drawing/2014/main" id="{E0BBD6C8-C8F2-40C5-AA64-85961A11ADC2}"/>
+                <a16:creationId xmlns:a16="http://schemas.microsoft.com/office/drawing/2014/main" xmlns="" id="{E0BBD6C8-C8F2-40C5-AA64-85961A11ADC2}"/>
               </a:ext>
             </a:extLst>
           </p:cNvPr>
@@ -4979,7 +4975,7 @@
         </p:nvSpPr>
         <p:spPr>
           <a:xfrm>
-            <a:off x="6638514" y="4796087"/>
+            <a:off x="6549725" y="6101474"/>
             <a:ext cx="542221" cy="276999"/>
           </a:xfrm>
           <a:prstGeom prst="rect">
@@ -5005,7 +5001,7 @@
           <p:cNvPr id="66" name="TextBox 65">
             <a:extLst>
               <a:ext uri="{FF2B5EF4-FFF2-40B4-BE49-F238E27FC236}">
-                <a16:creationId xmlns:a16="http://schemas.microsoft.com/office/drawing/2014/main" id="{E0BBD6C8-C8F2-40C5-AA64-85961A11ADC2}"/>
+                <a16:creationId xmlns:a16="http://schemas.microsoft.com/office/drawing/2014/main" xmlns="" id="{E0BBD6C8-C8F2-40C5-AA64-85961A11ADC2}"/>
               </a:ext>
             </a:extLst>
           </p:cNvPr>
@@ -5040,7 +5036,7 @@
           <p:cNvPr id="67" name="TextBox 66">
             <a:extLst>
               <a:ext uri="{FF2B5EF4-FFF2-40B4-BE49-F238E27FC236}">
-                <a16:creationId xmlns:a16="http://schemas.microsoft.com/office/drawing/2014/main" id="{E0BBD6C8-C8F2-40C5-AA64-85961A11ADC2}"/>
+                <a16:creationId xmlns:a16="http://schemas.microsoft.com/office/drawing/2014/main" xmlns="" id="{E0BBD6C8-C8F2-40C5-AA64-85961A11ADC2}"/>
               </a:ext>
             </a:extLst>
           </p:cNvPr>
@@ -5081,8 +5077,8 @@
         </p:nvCxnSpPr>
         <p:spPr>
           <a:xfrm flipH="1">
-            <a:off x="2639167" y="4019265"/>
-            <a:ext cx="2855447" cy="527649"/>
+            <a:off x="3013613" y="4019265"/>
+            <a:ext cx="2481001" cy="516848"/>
           </a:xfrm>
           <a:prstGeom prst="straightConnector1">
             <a:avLst/>
@@ -5111,7 +5107,7 @@
           <p:cNvPr id="70" name="TextBox 69">
             <a:extLst>
               <a:ext uri="{FF2B5EF4-FFF2-40B4-BE49-F238E27FC236}">
-                <a16:creationId xmlns:a16="http://schemas.microsoft.com/office/drawing/2014/main" id="{E0BBD6C8-C8F2-40C5-AA64-85961A11ADC2}"/>
+                <a16:creationId xmlns:a16="http://schemas.microsoft.com/office/drawing/2014/main" xmlns="" id="{E0BBD6C8-C8F2-40C5-AA64-85961A11ADC2}"/>
               </a:ext>
             </a:extLst>
           </p:cNvPr>
@@ -5120,7 +5116,7 @@
         </p:nvSpPr>
         <p:spPr>
           <a:xfrm>
-            <a:off x="2713387" y="4226797"/>
+            <a:off x="2817441" y="4155667"/>
             <a:ext cx="843694" cy="276999"/>
           </a:xfrm>
           <a:prstGeom prst="rect">
@@ -5152,8 +5148,8 @@
         </p:nvCxnSpPr>
         <p:spPr>
           <a:xfrm>
-            <a:off x="2639167" y="5537970"/>
-            <a:ext cx="2443754" cy="615407"/>
+            <a:off x="3013613" y="5527169"/>
+            <a:ext cx="2069308" cy="626208"/>
           </a:xfrm>
           <a:prstGeom prst="straightConnector1">
             <a:avLst/>
@@ -5182,7 +5178,7 @@
           <p:cNvPr id="73" name="TextBox 72">
             <a:extLst>
               <a:ext uri="{FF2B5EF4-FFF2-40B4-BE49-F238E27FC236}">
-                <a16:creationId xmlns:a16="http://schemas.microsoft.com/office/drawing/2014/main" id="{E0BBD6C8-C8F2-40C5-AA64-85961A11ADC2}"/>
+                <a16:creationId xmlns:a16="http://schemas.microsoft.com/office/drawing/2014/main" xmlns="" id="{E0BBD6C8-C8F2-40C5-AA64-85961A11ADC2}"/>
               </a:ext>
             </a:extLst>
           </p:cNvPr>
@@ -5191,7 +5187,7 @@
         </p:nvSpPr>
         <p:spPr>
           <a:xfrm>
-            <a:off x="3680564" y="5962975"/>
+            <a:off x="3837321" y="5568613"/>
             <a:ext cx="542221" cy="276999"/>
           </a:xfrm>
           <a:prstGeom prst="rect">
@@ -5296,7 +5292,7 @@
         <p:spPr>
           <a:xfrm flipH="1" flipV="1">
             <a:off x="6341278" y="5024914"/>
-            <a:ext cx="1612741" cy="17528"/>
+            <a:ext cx="1501337" cy="1039227"/>
           </a:xfrm>
           <a:prstGeom prst="straightConnector1">
             <a:avLst/>
@@ -5331,8 +5327,8 @@
         </p:nvCxnSpPr>
         <p:spPr>
           <a:xfrm flipH="1" flipV="1">
-            <a:off x="2639167" y="5537970"/>
-            <a:ext cx="2443754" cy="615407"/>
+            <a:off x="3013613" y="5527169"/>
+            <a:ext cx="2069308" cy="626208"/>
           </a:xfrm>
           <a:prstGeom prst="straightConnector1">
             <a:avLst/>
@@ -5367,8 +5363,8 @@
         </p:nvCxnSpPr>
         <p:spPr>
           <a:xfrm flipV="1">
-            <a:off x="2639167" y="4019265"/>
-            <a:ext cx="2855447" cy="527649"/>
+            <a:off x="3013613" y="4019265"/>
+            <a:ext cx="2481001" cy="516848"/>
           </a:xfrm>
           <a:prstGeom prst="straightConnector1">
             <a:avLst/>
@@ -5706,7 +5702,7 @@
           <p:cNvPr id="74" name="TextBox 73">
             <a:extLst>
               <a:ext uri="{FF2B5EF4-FFF2-40B4-BE49-F238E27FC236}">
-                <a16:creationId xmlns:a16="http://schemas.microsoft.com/office/drawing/2014/main" id="{E0BBD6C8-C8F2-40C5-AA64-85961A11ADC2}"/>
+                <a16:creationId xmlns:a16="http://schemas.microsoft.com/office/drawing/2014/main" xmlns="" id="{E0BBD6C8-C8F2-40C5-AA64-85961A11ADC2}"/>
               </a:ext>
             </a:extLst>
           </p:cNvPr>
@@ -5782,84 +5778,12 @@
           </a:p>
         </p:txBody>
       </p:sp>
-      <p:cxnSp>
-        <p:nvCxnSpPr>
-          <p:cNvPr id="52" name="Straight Arrow Connector 51"/>
-          <p:cNvCxnSpPr>
-            <a:stCxn id="4" idx="2"/>
-            <a:endCxn id="34" idx="0"/>
-          </p:cNvCxnSpPr>
-          <p:nvPr/>
-        </p:nvCxnSpPr>
-        <p:spPr>
-          <a:xfrm>
-            <a:off x="5494614" y="4019265"/>
-            <a:ext cx="3298863" cy="527649"/>
-          </a:xfrm>
-          <a:prstGeom prst="straightConnector1">
-            <a:avLst/>
-          </a:prstGeom>
-          <a:ln>
-            <a:tailEnd type="triangle"/>
-          </a:ln>
-        </p:spPr>
-        <p:style>
-          <a:lnRef idx="1">
-            <a:schemeClr val="accent1"/>
-          </a:lnRef>
-          <a:fillRef idx="0">
-            <a:schemeClr val="accent1"/>
-          </a:fillRef>
-          <a:effectRef idx="0">
-            <a:schemeClr val="accent1"/>
-          </a:effectRef>
-          <a:fontRef idx="minor">
-            <a:schemeClr val="tx1"/>
-          </a:fontRef>
-        </p:style>
-      </p:cxnSp>
-      <p:cxnSp>
-        <p:nvCxnSpPr>
-          <p:cNvPr id="60" name="Straight Arrow Connector 59"/>
-          <p:cNvCxnSpPr>
-            <a:stCxn id="34" idx="0"/>
-            <a:endCxn id="4" idx="2"/>
-          </p:cNvCxnSpPr>
-          <p:nvPr/>
-        </p:nvCxnSpPr>
-        <p:spPr>
-          <a:xfrm flipH="1" flipV="1">
-            <a:off x="5494614" y="4019265"/>
-            <a:ext cx="3298863" cy="527649"/>
-          </a:xfrm>
-          <a:prstGeom prst="straightConnector1">
-            <a:avLst/>
-          </a:prstGeom>
-          <a:ln>
-            <a:tailEnd type="triangle"/>
-          </a:ln>
-        </p:spPr>
-        <p:style>
-          <a:lnRef idx="1">
-            <a:schemeClr val="accent1"/>
-          </a:lnRef>
-          <a:fillRef idx="0">
-            <a:schemeClr val="accent1"/>
-          </a:fillRef>
-          <a:effectRef idx="0">
-            <a:schemeClr val="accent1"/>
-          </a:effectRef>
-          <a:fontRef idx="minor">
-            <a:schemeClr val="tx1"/>
-          </a:fontRef>
-        </p:style>
-      </p:cxnSp>
       <p:sp>
         <p:nvSpPr>
           <p:cNvPr id="76" name="TextBox 75">
             <a:extLst>
               <a:ext uri="{FF2B5EF4-FFF2-40B4-BE49-F238E27FC236}">
-                <a16:creationId xmlns:a16="http://schemas.microsoft.com/office/drawing/2014/main" id="{E0BBD6C8-C8F2-40C5-AA64-85961A11ADC2}"/>
+                <a16:creationId xmlns:a16="http://schemas.microsoft.com/office/drawing/2014/main" xmlns="" id="{E0BBD6C8-C8F2-40C5-AA64-85961A11ADC2}"/>
               </a:ext>
             </a:extLst>
           </p:cNvPr>
@@ -5868,7 +5792,7 @@
         </p:nvSpPr>
         <p:spPr>
           <a:xfrm>
-            <a:off x="7384063" y="4088297"/>
+            <a:off x="8424280" y="4217951"/>
             <a:ext cx="843694" cy="276999"/>
           </a:xfrm>
           <a:prstGeom prst="rect">
@@ -5894,14 +5818,14 @@
           <p:cNvPr id="78" name="Straight Arrow Connector 77"/>
           <p:cNvCxnSpPr>
             <a:stCxn id="57" idx="3"/>
-            <a:endCxn id="34" idx="2"/>
+            <a:endCxn id="34" idx="1"/>
           </p:cNvCxnSpPr>
           <p:nvPr/>
         </p:nvCxnSpPr>
         <p:spPr>
           <a:xfrm flipV="1">
-            <a:off x="5978173" y="5537970"/>
-            <a:ext cx="2815304" cy="615407"/>
+            <a:off x="5978173" y="6064141"/>
+            <a:ext cx="1864442" cy="89236"/>
           </a:xfrm>
           <a:prstGeom prst="straightConnector1">
             <a:avLst/>
@@ -5929,15 +5853,14 @@
         <p:nvCxnSpPr>
           <p:cNvPr id="82" name="Straight Arrow Connector 81"/>
           <p:cNvCxnSpPr>
-            <a:stCxn id="34" idx="2"/>
             <a:endCxn id="57" idx="3"/>
           </p:cNvCxnSpPr>
           <p:nvPr/>
         </p:nvCxnSpPr>
         <p:spPr>
           <a:xfrm flipH="1">
-            <a:off x="5978173" y="5537970"/>
-            <a:ext cx="2815304" cy="615407"/>
+            <a:off x="5978173" y="6064141"/>
+            <a:ext cx="1827737" cy="89236"/>
           </a:xfrm>
           <a:prstGeom prst="straightConnector1">
             <a:avLst/>
@@ -5966,7 +5889,7 @@
           <p:cNvPr id="86" name="TextBox 85">
             <a:extLst>
               <a:ext uri="{FF2B5EF4-FFF2-40B4-BE49-F238E27FC236}">
-                <a16:creationId xmlns:a16="http://schemas.microsoft.com/office/drawing/2014/main" id="{E0BBD6C8-C8F2-40C5-AA64-85961A11ADC2}"/>
+                <a16:creationId xmlns:a16="http://schemas.microsoft.com/office/drawing/2014/main" xmlns="" id="{E0BBD6C8-C8F2-40C5-AA64-85961A11ADC2}"/>
               </a:ext>
             </a:extLst>
           </p:cNvPr>
@@ -5975,7 +5898,7 @@
         </p:nvSpPr>
         <p:spPr>
           <a:xfrm>
-            <a:off x="7048786" y="5925642"/>
+            <a:off x="6820835" y="5197733"/>
             <a:ext cx="542221" cy="276999"/>
           </a:xfrm>
           <a:prstGeom prst="rect">
@@ -6001,7 +5924,7 @@
           <p:cNvPr id="111" name="TextBox 110">
             <a:extLst>
               <a:ext uri="{FF2B5EF4-FFF2-40B4-BE49-F238E27FC236}">
-                <a16:creationId xmlns:a16="http://schemas.microsoft.com/office/drawing/2014/main" id="{E0BBD6C8-C8F2-40C5-AA64-85961A11ADC2}"/>
+                <a16:creationId xmlns:a16="http://schemas.microsoft.com/office/drawing/2014/main" xmlns="" id="{E0BBD6C8-C8F2-40C5-AA64-85961A11ADC2}"/>
               </a:ext>
             </a:extLst>
           </p:cNvPr>
@@ -6027,6 +5950,559 @@
             <a:r>
               <a:rPr lang="en-US" sz="1200" dirty="0"/>
               <a:t>return</a:t>
+            </a:r>
+          </a:p>
+        </p:txBody>
+      </p:sp>
+      <p:sp>
+        <p:nvSpPr>
+          <p:cNvPr id="61" name="Flowchart: Sort 60"/>
+          <p:cNvSpPr/>
+          <p:nvPr/>
+        </p:nvSpPr>
+        <p:spPr>
+          <a:xfrm>
+            <a:off x="5030731" y="1433031"/>
+            <a:ext cx="895252" cy="98528"/>
+          </a:xfrm>
+          <a:prstGeom prst="flowChartSort">
+            <a:avLst/>
+          </a:prstGeom>
+          <a:solidFill>
+            <a:schemeClr val="accent1">
+              <a:lumMod val="40000"/>
+              <a:lumOff val="60000"/>
+            </a:schemeClr>
+          </a:solidFill>
+        </p:spPr>
+        <p:style>
+          <a:lnRef idx="2">
+            <a:schemeClr val="accent1">
+              <a:shade val="50000"/>
+            </a:schemeClr>
+          </a:lnRef>
+          <a:fillRef idx="1">
+            <a:schemeClr val="accent1"/>
+          </a:fillRef>
+          <a:effectRef idx="0">
+            <a:schemeClr val="accent1"/>
+          </a:effectRef>
+          <a:fontRef idx="minor">
+            <a:schemeClr val="lt1"/>
+          </a:fontRef>
+        </p:style>
+        <p:txBody>
+          <a:bodyPr rtlCol="0" anchor="ctr"/>
+          <a:lstStyle/>
+          <a:p>
+            <a:pPr algn="ctr"/>
+            <a:endParaRPr lang="en-US"/>
+          </a:p>
+        </p:txBody>
+      </p:sp>
+      <p:cxnSp>
+        <p:nvCxnSpPr>
+          <p:cNvPr id="19" name="Straight Arrow Connector 18"/>
+          <p:cNvCxnSpPr>
+            <a:stCxn id="61" idx="2"/>
+            <a:endCxn id="2" idx="0"/>
+          </p:cNvCxnSpPr>
+          <p:nvPr/>
+        </p:nvCxnSpPr>
+        <p:spPr>
+          <a:xfrm>
+            <a:off x="5478357" y="1531559"/>
+            <a:ext cx="3293" cy="246653"/>
+          </a:xfrm>
+          <a:prstGeom prst="straightConnector1">
+            <a:avLst/>
+          </a:prstGeom>
+          <a:ln>
+            <a:tailEnd type="triangle"/>
+          </a:ln>
+        </p:spPr>
+        <p:style>
+          <a:lnRef idx="1">
+            <a:schemeClr val="accent1"/>
+          </a:lnRef>
+          <a:fillRef idx="0">
+            <a:schemeClr val="accent1"/>
+          </a:fillRef>
+          <a:effectRef idx="0">
+            <a:schemeClr val="accent1"/>
+          </a:effectRef>
+          <a:fontRef idx="minor">
+            <a:schemeClr val="tx1"/>
+          </a:fontRef>
+        </p:style>
+      </p:cxnSp>
+      <p:cxnSp>
+        <p:nvCxnSpPr>
+          <p:cNvPr id="38" name="Straight Arrow Connector 37"/>
+          <p:cNvCxnSpPr>
+            <a:stCxn id="2" idx="0"/>
+            <a:endCxn id="61" idx="2"/>
+          </p:cNvCxnSpPr>
+          <p:nvPr/>
+        </p:nvCxnSpPr>
+        <p:spPr>
+          <a:xfrm flipH="1" flipV="1">
+            <a:off x="5478357" y="1531559"/>
+            <a:ext cx="3293" cy="246653"/>
+          </a:xfrm>
+          <a:prstGeom prst="straightConnector1">
+            <a:avLst/>
+          </a:prstGeom>
+          <a:ln>
+            <a:tailEnd type="triangle"/>
+          </a:ln>
+        </p:spPr>
+        <p:style>
+          <a:lnRef idx="1">
+            <a:schemeClr val="accent1"/>
+          </a:lnRef>
+          <a:fillRef idx="0">
+            <a:schemeClr val="accent1"/>
+          </a:fillRef>
+          <a:effectRef idx="0">
+            <a:schemeClr val="accent1"/>
+          </a:effectRef>
+          <a:fontRef idx="minor">
+            <a:schemeClr val="tx1"/>
+          </a:fontRef>
+        </p:style>
+      </p:cxnSp>
+      <p:sp>
+        <p:nvSpPr>
+          <p:cNvPr id="80" name="Rectangle 79"/>
+          <p:cNvSpPr/>
+          <p:nvPr/>
+        </p:nvSpPr>
+        <p:spPr>
+          <a:xfrm>
+            <a:off x="9775912" y="3999422"/>
+            <a:ext cx="1678916" cy="991056"/>
+          </a:xfrm>
+          <a:prstGeom prst="rect">
+            <a:avLst/>
+          </a:prstGeom>
+          <a:solidFill>
+            <a:schemeClr val="accent6"/>
+          </a:solidFill>
+        </p:spPr>
+        <p:style>
+          <a:lnRef idx="2">
+            <a:schemeClr val="accent1">
+              <a:shade val="50000"/>
+            </a:schemeClr>
+          </a:lnRef>
+          <a:fillRef idx="1">
+            <a:schemeClr val="accent1"/>
+          </a:fillRef>
+          <a:effectRef idx="0">
+            <a:schemeClr val="accent1"/>
+          </a:effectRef>
+          <a:fontRef idx="minor">
+            <a:schemeClr val="lt1"/>
+          </a:fontRef>
+        </p:style>
+        <p:txBody>
+          <a:bodyPr rtlCol="0" anchor="ctr"/>
+          <a:lstStyle/>
+          <a:p>
+            <a:pPr algn="ctr"/>
+            <a:r>
+              <a:rPr lang="en-US" sz="1000" dirty="0"/>
+              <a:t>com.tlw8253.controller</a:t>
+            </a:r>
+          </a:p>
+          <a:p>
+            <a:pPr algn="ctr"/>
+            <a:r>
+              <a:rPr lang="en-US" dirty="0" err="1" smtClean="0"/>
+              <a:t>UserController</a:t>
+            </a:r>
+            <a:endParaRPr lang="en-US" dirty="0"/>
+          </a:p>
+        </p:txBody>
+      </p:sp>
+      <p:cxnSp>
+        <p:nvCxnSpPr>
+          <p:cNvPr id="63" name="Straight Arrow Connector 62"/>
+          <p:cNvCxnSpPr>
+            <a:stCxn id="4" idx="3"/>
+            <a:endCxn id="80" idx="1"/>
+          </p:cNvCxnSpPr>
+          <p:nvPr/>
+        </p:nvCxnSpPr>
+        <p:spPr>
+          <a:xfrm>
+            <a:off x="8350060" y="3907122"/>
+            <a:ext cx="1425852" cy="587828"/>
+          </a:xfrm>
+          <a:prstGeom prst="straightConnector1">
+            <a:avLst/>
+          </a:prstGeom>
+          <a:ln>
+            <a:tailEnd type="triangle"/>
+          </a:ln>
+        </p:spPr>
+        <p:style>
+          <a:lnRef idx="1">
+            <a:schemeClr val="accent1"/>
+          </a:lnRef>
+          <a:fillRef idx="0">
+            <a:schemeClr val="accent1"/>
+          </a:fillRef>
+          <a:effectRef idx="0">
+            <a:schemeClr val="accent1"/>
+          </a:effectRef>
+          <a:fontRef idx="minor">
+            <a:schemeClr val="tx1"/>
+          </a:fontRef>
+        </p:style>
+      </p:cxnSp>
+      <p:cxnSp>
+        <p:nvCxnSpPr>
+          <p:cNvPr id="65" name="Straight Arrow Connector 64"/>
+          <p:cNvCxnSpPr>
+            <a:stCxn id="80" idx="1"/>
+            <a:endCxn id="34" idx="0"/>
+          </p:cNvCxnSpPr>
+          <p:nvPr/>
+        </p:nvCxnSpPr>
+        <p:spPr>
+          <a:xfrm flipH="1">
+            <a:off x="8682073" y="4494950"/>
+            <a:ext cx="1093839" cy="1073663"/>
+          </a:xfrm>
+          <a:prstGeom prst="straightConnector1">
+            <a:avLst/>
+          </a:prstGeom>
+          <a:ln>
+            <a:tailEnd type="triangle"/>
+          </a:ln>
+        </p:spPr>
+        <p:style>
+          <a:lnRef idx="1">
+            <a:schemeClr val="accent1"/>
+          </a:lnRef>
+          <a:fillRef idx="0">
+            <a:schemeClr val="accent1"/>
+          </a:fillRef>
+          <a:effectRef idx="0">
+            <a:schemeClr val="accent1"/>
+          </a:effectRef>
+          <a:fontRef idx="minor">
+            <a:schemeClr val="tx1"/>
+          </a:fontRef>
+        </p:style>
+      </p:cxnSp>
+      <p:cxnSp>
+        <p:nvCxnSpPr>
+          <p:cNvPr id="71" name="Straight Arrow Connector 70"/>
+          <p:cNvCxnSpPr>
+            <a:stCxn id="34" idx="0"/>
+            <a:endCxn id="80" idx="1"/>
+          </p:cNvCxnSpPr>
+          <p:nvPr/>
+        </p:nvCxnSpPr>
+        <p:spPr>
+          <a:xfrm flipV="1">
+            <a:off x="8682073" y="4494950"/>
+            <a:ext cx="1093839" cy="1073663"/>
+          </a:xfrm>
+          <a:prstGeom prst="straightConnector1">
+            <a:avLst/>
+          </a:prstGeom>
+          <a:ln>
+            <a:tailEnd type="triangle"/>
+          </a:ln>
+        </p:spPr>
+        <p:style>
+          <a:lnRef idx="1">
+            <a:schemeClr val="accent1"/>
+          </a:lnRef>
+          <a:fillRef idx="0">
+            <a:schemeClr val="accent1"/>
+          </a:fillRef>
+          <a:effectRef idx="0">
+            <a:schemeClr val="accent1"/>
+          </a:effectRef>
+          <a:fontRef idx="minor">
+            <a:schemeClr val="tx1"/>
+          </a:fontRef>
+        </p:style>
+      </p:cxnSp>
+      <p:cxnSp>
+        <p:nvCxnSpPr>
+          <p:cNvPr id="88" name="Straight Arrow Connector 87"/>
+          <p:cNvCxnSpPr>
+            <a:stCxn id="80" idx="1"/>
+            <a:endCxn id="4" idx="3"/>
+          </p:cNvCxnSpPr>
+          <p:nvPr/>
+        </p:nvCxnSpPr>
+        <p:spPr>
+          <a:xfrm flipH="1" flipV="1">
+            <a:off x="8350060" y="3907122"/>
+            <a:ext cx="1425852" cy="587828"/>
+          </a:xfrm>
+          <a:prstGeom prst="straightConnector1">
+            <a:avLst/>
+          </a:prstGeom>
+          <a:ln>
+            <a:tailEnd type="triangle"/>
+          </a:ln>
+        </p:spPr>
+        <p:style>
+          <a:lnRef idx="1">
+            <a:schemeClr val="accent1"/>
+          </a:lnRef>
+          <a:fillRef idx="0">
+            <a:schemeClr val="accent1"/>
+          </a:fillRef>
+          <a:effectRef idx="0">
+            <a:schemeClr val="accent1"/>
+          </a:effectRef>
+          <a:fontRef idx="minor">
+            <a:schemeClr val="tx1"/>
+          </a:fontRef>
+        </p:style>
+      </p:cxnSp>
+      <p:sp>
+        <p:nvSpPr>
+          <p:cNvPr id="90" name="Rectangle 89"/>
+          <p:cNvSpPr/>
+          <p:nvPr/>
+        </p:nvSpPr>
+        <p:spPr>
+          <a:xfrm>
+            <a:off x="362720" y="5627144"/>
+            <a:ext cx="1678916" cy="991056"/>
+          </a:xfrm>
+          <a:prstGeom prst="rect">
+            <a:avLst/>
+          </a:prstGeom>
+          <a:solidFill>
+            <a:schemeClr val="accent6"/>
+          </a:solidFill>
+        </p:spPr>
+        <p:style>
+          <a:lnRef idx="2">
+            <a:schemeClr val="accent1">
+              <a:shade val="50000"/>
+            </a:schemeClr>
+          </a:lnRef>
+          <a:fillRef idx="1">
+            <a:schemeClr val="accent1"/>
+          </a:fillRef>
+          <a:effectRef idx="0">
+            <a:schemeClr val="accent1"/>
+          </a:effectRef>
+          <a:fontRef idx="minor">
+            <a:schemeClr val="lt1"/>
+          </a:fontRef>
+        </p:style>
+        <p:txBody>
+          <a:bodyPr rtlCol="0" anchor="ctr"/>
+          <a:lstStyle/>
+          <a:p>
+            <a:pPr algn="ctr"/>
+            <a:r>
+              <a:rPr lang="en-US" sz="1000" dirty="0"/>
+              <a:t>com.tlw8253.service</a:t>
+            </a:r>
+          </a:p>
+          <a:p>
+            <a:pPr algn="ctr"/>
+            <a:r>
+              <a:rPr lang="en-US" dirty="0" err="1" smtClean="0"/>
+              <a:t>Reimbursement</a:t>
+            </a:r>
+            <a:r>
+              <a:rPr lang="en-US" dirty="0" err="1" smtClean="0"/>
+              <a:t>Service</a:t>
+            </a:r>
+            <a:endParaRPr lang="en-US" dirty="0"/>
+          </a:p>
+        </p:txBody>
+      </p:sp>
+      <p:cxnSp>
+        <p:nvCxnSpPr>
+          <p:cNvPr id="95" name="Straight Arrow Connector 94"/>
+          <p:cNvCxnSpPr>
+            <a:stCxn id="32" idx="1"/>
+            <a:endCxn id="90" idx="0"/>
+          </p:cNvCxnSpPr>
+          <p:nvPr/>
+        </p:nvCxnSpPr>
+        <p:spPr>
+          <a:xfrm flipH="1">
+            <a:off x="1202178" y="5031641"/>
+            <a:ext cx="971977" cy="595503"/>
+          </a:xfrm>
+          <a:prstGeom prst="straightConnector1">
+            <a:avLst/>
+          </a:prstGeom>
+          <a:ln>
+            <a:tailEnd type="triangle"/>
+          </a:ln>
+        </p:spPr>
+        <p:style>
+          <a:lnRef idx="1">
+            <a:schemeClr val="accent1"/>
+          </a:lnRef>
+          <a:fillRef idx="0">
+            <a:schemeClr val="accent1"/>
+          </a:fillRef>
+          <a:effectRef idx="0">
+            <a:schemeClr val="accent1"/>
+          </a:effectRef>
+          <a:fontRef idx="minor">
+            <a:schemeClr val="tx1"/>
+          </a:fontRef>
+        </p:style>
+      </p:cxnSp>
+      <p:cxnSp>
+        <p:nvCxnSpPr>
+          <p:cNvPr id="97" name="Straight Arrow Connector 96"/>
+          <p:cNvCxnSpPr>
+            <a:stCxn id="90" idx="0"/>
+            <a:endCxn id="32" idx="1"/>
+          </p:cNvCxnSpPr>
+          <p:nvPr/>
+        </p:nvCxnSpPr>
+        <p:spPr>
+          <a:xfrm flipV="1">
+            <a:off x="1202178" y="5031641"/>
+            <a:ext cx="971977" cy="595503"/>
+          </a:xfrm>
+          <a:prstGeom prst="straightConnector1">
+            <a:avLst/>
+          </a:prstGeom>
+          <a:ln>
+            <a:tailEnd type="triangle"/>
+          </a:ln>
+        </p:spPr>
+        <p:style>
+          <a:lnRef idx="1">
+            <a:schemeClr val="accent1"/>
+          </a:lnRef>
+          <a:fillRef idx="0">
+            <a:schemeClr val="accent1"/>
+          </a:fillRef>
+          <a:effectRef idx="0">
+            <a:schemeClr val="accent1"/>
+          </a:effectRef>
+          <a:fontRef idx="minor">
+            <a:schemeClr val="tx1"/>
+          </a:fontRef>
+        </p:style>
+      </p:cxnSp>
+      <p:cxnSp>
+        <p:nvCxnSpPr>
+          <p:cNvPr id="99" name="Straight Arrow Connector 98"/>
+          <p:cNvCxnSpPr>
+            <a:stCxn id="90" idx="3"/>
+            <a:endCxn id="57" idx="1"/>
+          </p:cNvCxnSpPr>
+          <p:nvPr/>
+        </p:nvCxnSpPr>
+        <p:spPr>
+          <a:xfrm>
+            <a:off x="2041636" y="6122672"/>
+            <a:ext cx="3041285" cy="30705"/>
+          </a:xfrm>
+          <a:prstGeom prst="straightConnector1">
+            <a:avLst/>
+          </a:prstGeom>
+          <a:ln>
+            <a:tailEnd type="triangle"/>
+          </a:ln>
+        </p:spPr>
+        <p:style>
+          <a:lnRef idx="1">
+            <a:schemeClr val="accent1"/>
+          </a:lnRef>
+          <a:fillRef idx="0">
+            <a:schemeClr val="accent1"/>
+          </a:fillRef>
+          <a:effectRef idx="0">
+            <a:schemeClr val="accent1"/>
+          </a:effectRef>
+          <a:fontRef idx="minor">
+            <a:schemeClr val="tx1"/>
+          </a:fontRef>
+        </p:style>
+      </p:cxnSp>
+      <p:cxnSp>
+        <p:nvCxnSpPr>
+          <p:cNvPr id="101" name="Straight Arrow Connector 100"/>
+          <p:cNvCxnSpPr>
+            <a:stCxn id="57" idx="1"/>
+            <a:endCxn id="90" idx="3"/>
+          </p:cNvCxnSpPr>
+          <p:nvPr/>
+        </p:nvCxnSpPr>
+        <p:spPr>
+          <a:xfrm flipH="1" flipV="1">
+            <a:off x="2041636" y="6122672"/>
+            <a:ext cx="3041285" cy="30705"/>
+          </a:xfrm>
+          <a:prstGeom prst="straightConnector1">
+            <a:avLst/>
+          </a:prstGeom>
+          <a:ln>
+            <a:tailEnd type="triangle"/>
+          </a:ln>
+        </p:spPr>
+        <p:style>
+          <a:lnRef idx="1">
+            <a:schemeClr val="accent1"/>
+          </a:lnRef>
+          <a:fillRef idx="0">
+            <a:schemeClr val="accent1"/>
+          </a:fillRef>
+          <a:effectRef idx="0">
+            <a:schemeClr val="accent1"/>
+          </a:effectRef>
+          <a:fontRef idx="minor">
+            <a:schemeClr val="tx1"/>
+          </a:fontRef>
+        </p:style>
+      </p:cxnSp>
+      <p:sp>
+        <p:nvSpPr>
+          <p:cNvPr id="103" name="TextBox 102">
+            <a:extLst>
+              <a:ext uri="{FF2B5EF4-FFF2-40B4-BE49-F238E27FC236}">
+                <a16:creationId xmlns:a16="http://schemas.microsoft.com/office/drawing/2014/main" xmlns="" id="{E0BBD6C8-C8F2-40C5-AA64-85961A11ADC2}"/>
+              </a:ext>
+            </a:extLst>
+          </p:cNvPr>
+          <p:cNvSpPr txBox="1"/>
+          <p:nvPr/>
+        </p:nvSpPr>
+        <p:spPr>
+          <a:xfrm>
+            <a:off x="2609983" y="6122672"/>
+            <a:ext cx="542221" cy="276999"/>
+          </a:xfrm>
+          <a:prstGeom prst="rect">
+            <a:avLst/>
+          </a:prstGeom>
+          <a:noFill/>
+        </p:spPr>
+        <p:txBody>
+          <a:bodyPr wrap="square" rtlCol="0">
+            <a:spAutoFit/>
+          </a:bodyPr>
+          <a:lstStyle/>
+          <a:p>
+            <a:r>
+              <a:rPr lang="en-US" sz="1200" dirty="0"/>
+              <a:t>uses</a:t>
             </a:r>
           </a:p>
         </p:txBody>
@@ -6066,7 +6542,7 @@
           <p:cNvPr id="89" name="Rectangle 88">
             <a:extLst>
               <a:ext uri="{FF2B5EF4-FFF2-40B4-BE49-F238E27FC236}">
-                <a16:creationId xmlns:a16="http://schemas.microsoft.com/office/drawing/2014/main" id="{EED827AB-78FC-41AC-8676-30DA25D7C5FC}"/>
+                <a16:creationId xmlns:a16="http://schemas.microsoft.com/office/drawing/2014/main" xmlns="" id="{EED827AB-78FC-41AC-8676-30DA25D7C5FC}"/>
               </a:ext>
             </a:extLst>
           </p:cNvPr>
@@ -6144,7 +6620,7 @@
           <p:cNvPr id="62" name="Rectangle 61">
             <a:extLst>
               <a:ext uri="{FF2B5EF4-FFF2-40B4-BE49-F238E27FC236}">
-                <a16:creationId xmlns:a16="http://schemas.microsoft.com/office/drawing/2014/main" id="{C3FE7107-D2B1-4448-B03A-F2CE9B45CFD6}"/>
+                <a16:creationId xmlns:a16="http://schemas.microsoft.com/office/drawing/2014/main" xmlns="" id="{C3FE7107-D2B1-4448-B03A-F2CE9B45CFD6}"/>
               </a:ext>
             </a:extLst>
           </p:cNvPr>
@@ -6208,7 +6684,7 @@
           <p:cNvPr id="61" name="Rectangle 60">
             <a:extLst>
               <a:ext uri="{FF2B5EF4-FFF2-40B4-BE49-F238E27FC236}">
-                <a16:creationId xmlns:a16="http://schemas.microsoft.com/office/drawing/2014/main" id="{2F7B40FD-C5BA-431D-AE99-1CB70F1BAB88}"/>
+                <a16:creationId xmlns:a16="http://schemas.microsoft.com/office/drawing/2014/main" xmlns="" id="{2F7B40FD-C5BA-431D-AE99-1CB70F1BAB88}"/>
               </a:ext>
             </a:extLst>
           </p:cNvPr>
@@ -6267,7 +6743,7 @@
           <p:cNvPr id="60" name="Rectangle 59">
             <a:extLst>
               <a:ext uri="{FF2B5EF4-FFF2-40B4-BE49-F238E27FC236}">
-                <a16:creationId xmlns:a16="http://schemas.microsoft.com/office/drawing/2014/main" id="{CF3E4DE9-C6F2-4C11-BE7F-2753CDEFE535}"/>
+                <a16:creationId xmlns:a16="http://schemas.microsoft.com/office/drawing/2014/main" xmlns="" id="{CF3E4DE9-C6F2-4C11-BE7F-2753CDEFE535}"/>
               </a:ext>
             </a:extLst>
           </p:cNvPr>
@@ -6649,7 +7125,7 @@
           <p:cNvPr id="19" name="TextBox 18">
             <a:extLst>
               <a:ext uri="{FF2B5EF4-FFF2-40B4-BE49-F238E27FC236}">
-                <a16:creationId xmlns:a16="http://schemas.microsoft.com/office/drawing/2014/main" id="{E0BBD6C8-C8F2-40C5-AA64-85961A11ADC2}"/>
+                <a16:creationId xmlns:a16="http://schemas.microsoft.com/office/drawing/2014/main" xmlns="" id="{E0BBD6C8-C8F2-40C5-AA64-85961A11ADC2}"/>
               </a:ext>
             </a:extLst>
           </p:cNvPr>
@@ -6779,7 +7255,7 @@
           <p:cNvPr id="23" name="TextBox 22">
             <a:extLst>
               <a:ext uri="{FF2B5EF4-FFF2-40B4-BE49-F238E27FC236}">
-                <a16:creationId xmlns:a16="http://schemas.microsoft.com/office/drawing/2014/main" id="{E0BBD6C8-C8F2-40C5-AA64-85961A11ADC2}"/>
+                <a16:creationId xmlns:a16="http://schemas.microsoft.com/office/drawing/2014/main" xmlns="" id="{E0BBD6C8-C8F2-40C5-AA64-85961A11ADC2}"/>
               </a:ext>
             </a:extLst>
           </p:cNvPr>
@@ -6896,7 +7372,7 @@
           <p:cNvPr id="28" name="TextBox 27">
             <a:extLst>
               <a:ext uri="{FF2B5EF4-FFF2-40B4-BE49-F238E27FC236}">
-                <a16:creationId xmlns:a16="http://schemas.microsoft.com/office/drawing/2014/main" id="{E0BBD6C8-C8F2-40C5-AA64-85961A11ADC2}"/>
+                <a16:creationId xmlns:a16="http://schemas.microsoft.com/office/drawing/2014/main" xmlns="" id="{E0BBD6C8-C8F2-40C5-AA64-85961A11ADC2}"/>
               </a:ext>
             </a:extLst>
           </p:cNvPr>
@@ -7020,7 +7496,7 @@
           <p:cNvPr id="34" name="TextBox 33">
             <a:extLst>
               <a:ext uri="{FF2B5EF4-FFF2-40B4-BE49-F238E27FC236}">
-                <a16:creationId xmlns:a16="http://schemas.microsoft.com/office/drawing/2014/main" id="{E0BBD6C8-C8F2-40C5-AA64-85961A11ADC2}"/>
+                <a16:creationId xmlns:a16="http://schemas.microsoft.com/office/drawing/2014/main" xmlns="" id="{E0BBD6C8-C8F2-40C5-AA64-85961A11ADC2}"/>
               </a:ext>
             </a:extLst>
           </p:cNvPr>
@@ -7146,7 +7622,7 @@
           <p:cNvPr id="38" name="TextBox 37">
             <a:extLst>
               <a:ext uri="{FF2B5EF4-FFF2-40B4-BE49-F238E27FC236}">
-                <a16:creationId xmlns:a16="http://schemas.microsoft.com/office/drawing/2014/main" id="{E0BBD6C8-C8F2-40C5-AA64-85961A11ADC2}"/>
+                <a16:creationId xmlns:a16="http://schemas.microsoft.com/office/drawing/2014/main" xmlns="" id="{E0BBD6C8-C8F2-40C5-AA64-85961A11ADC2}"/>
               </a:ext>
             </a:extLst>
           </p:cNvPr>
@@ -7316,7 +7792,7 @@
           <p:cNvPr id="44" name="TextBox 43">
             <a:extLst>
               <a:ext uri="{FF2B5EF4-FFF2-40B4-BE49-F238E27FC236}">
-                <a16:creationId xmlns:a16="http://schemas.microsoft.com/office/drawing/2014/main" id="{E0BBD6C8-C8F2-40C5-AA64-85961A11ADC2}"/>
+                <a16:creationId xmlns:a16="http://schemas.microsoft.com/office/drawing/2014/main" xmlns="" id="{E0BBD6C8-C8F2-40C5-AA64-85961A11ADC2}"/>
               </a:ext>
             </a:extLst>
           </p:cNvPr>
@@ -7351,7 +7827,7 @@
           <p:cNvPr id="45" name="TextBox 44">
             <a:extLst>
               <a:ext uri="{FF2B5EF4-FFF2-40B4-BE49-F238E27FC236}">
-                <a16:creationId xmlns:a16="http://schemas.microsoft.com/office/drawing/2014/main" id="{E0BBD6C8-C8F2-40C5-AA64-85961A11ADC2}"/>
+                <a16:creationId xmlns:a16="http://schemas.microsoft.com/office/drawing/2014/main" xmlns="" id="{E0BBD6C8-C8F2-40C5-AA64-85961A11ADC2}"/>
               </a:ext>
             </a:extLst>
           </p:cNvPr>
@@ -7398,7 +7874,7 @@
           <p:cNvPr id="26" name="TextBox 25">
             <a:extLst>
               <a:ext uri="{FF2B5EF4-FFF2-40B4-BE49-F238E27FC236}">
-                <a16:creationId xmlns:a16="http://schemas.microsoft.com/office/drawing/2014/main" id="{6C45E26E-8FEE-4439-A34B-789237C9C62C}"/>
+                <a16:creationId xmlns:a16="http://schemas.microsoft.com/office/drawing/2014/main" xmlns="" id="{6C45E26E-8FEE-4439-A34B-789237C9C62C}"/>
               </a:ext>
             </a:extLst>
           </p:cNvPr>
@@ -7433,7 +7909,7 @@
           <p:cNvPr id="31" name="Rectangle 30">
             <a:extLst>
               <a:ext uri="{FF2B5EF4-FFF2-40B4-BE49-F238E27FC236}">
-                <a16:creationId xmlns:a16="http://schemas.microsoft.com/office/drawing/2014/main" id="{6D396BFC-10E0-4935-903B-EDC457BD1755}"/>
+                <a16:creationId xmlns:a16="http://schemas.microsoft.com/office/drawing/2014/main" xmlns="" id="{6D396BFC-10E0-4935-903B-EDC457BD1755}"/>
               </a:ext>
             </a:extLst>
           </p:cNvPr>
@@ -7493,7 +7969,7 @@
           <p:cNvPr id="32" name="Rectangle 31">
             <a:extLst>
               <a:ext uri="{FF2B5EF4-FFF2-40B4-BE49-F238E27FC236}">
-                <a16:creationId xmlns:a16="http://schemas.microsoft.com/office/drawing/2014/main" id="{02A645C8-F11F-438D-92DC-F6FCCA5ECFB8}"/>
+                <a16:creationId xmlns:a16="http://schemas.microsoft.com/office/drawing/2014/main" xmlns="" id="{02A645C8-F11F-438D-92DC-F6FCCA5ECFB8}"/>
               </a:ext>
             </a:extLst>
           </p:cNvPr>
@@ -7553,7 +8029,7 @@
           <p:cNvPr id="12" name="Straight Arrow Connector 11">
             <a:extLst>
               <a:ext uri="{FF2B5EF4-FFF2-40B4-BE49-F238E27FC236}">
-                <a16:creationId xmlns:a16="http://schemas.microsoft.com/office/drawing/2014/main" id="{FF2076CA-F897-4293-B6CD-7408EB452156}"/>
+                <a16:creationId xmlns:a16="http://schemas.microsoft.com/office/drawing/2014/main" xmlns="" id="{FF2076CA-F897-4293-B6CD-7408EB452156}"/>
               </a:ext>
             </a:extLst>
           </p:cNvPr>
@@ -7596,7 +8072,7 @@
           <p:cNvPr id="14" name="Straight Arrow Connector 13">
             <a:extLst>
               <a:ext uri="{FF2B5EF4-FFF2-40B4-BE49-F238E27FC236}">
-                <a16:creationId xmlns:a16="http://schemas.microsoft.com/office/drawing/2014/main" id="{5C625B7B-4A1E-46C5-9082-4FEC89B30DA9}"/>
+                <a16:creationId xmlns:a16="http://schemas.microsoft.com/office/drawing/2014/main" xmlns="" id="{5C625B7B-4A1E-46C5-9082-4FEC89B30DA9}"/>
               </a:ext>
             </a:extLst>
           </p:cNvPr>
@@ -7639,7 +8115,7 @@
           <p:cNvPr id="65" name="Straight Arrow Connector 64">
             <a:extLst>
               <a:ext uri="{FF2B5EF4-FFF2-40B4-BE49-F238E27FC236}">
-                <a16:creationId xmlns:a16="http://schemas.microsoft.com/office/drawing/2014/main" id="{C1C9B843-1D11-4D9F-8CBF-AE00E90AA070}"/>
+                <a16:creationId xmlns:a16="http://schemas.microsoft.com/office/drawing/2014/main" xmlns="" id="{C1C9B843-1D11-4D9F-8CBF-AE00E90AA070}"/>
               </a:ext>
             </a:extLst>
           </p:cNvPr>
@@ -7681,7 +8157,7 @@
           <p:cNvPr id="66" name="TextBox 65">
             <a:extLst>
               <a:ext uri="{FF2B5EF4-FFF2-40B4-BE49-F238E27FC236}">
-                <a16:creationId xmlns:a16="http://schemas.microsoft.com/office/drawing/2014/main" id="{5E4B2700-0522-40EF-B035-166AA1C17D76}"/>
+                <a16:creationId xmlns:a16="http://schemas.microsoft.com/office/drawing/2014/main" xmlns="" id="{5E4B2700-0522-40EF-B035-166AA1C17D76}"/>
               </a:ext>
             </a:extLst>
           </p:cNvPr>
@@ -7805,7 +8281,7 @@
           <p:cNvPr id="48" name="TextBox 47">
             <a:extLst>
               <a:ext uri="{FF2B5EF4-FFF2-40B4-BE49-F238E27FC236}">
-                <a16:creationId xmlns:a16="http://schemas.microsoft.com/office/drawing/2014/main" id="{E0BBD6C8-C8F2-40C5-AA64-85961A11ADC2}"/>
+                <a16:creationId xmlns:a16="http://schemas.microsoft.com/office/drawing/2014/main" xmlns="" id="{E0BBD6C8-C8F2-40C5-AA64-85961A11ADC2}"/>
               </a:ext>
             </a:extLst>
           </p:cNvPr>
@@ -7840,7 +8316,7 @@
           <p:cNvPr id="52" name="Rectangle 51">
             <a:extLst>
               <a:ext uri="{FF2B5EF4-FFF2-40B4-BE49-F238E27FC236}">
-                <a16:creationId xmlns:a16="http://schemas.microsoft.com/office/drawing/2014/main" id="{21B869D6-66CB-4B38-975F-B7FEB6AA9B13}"/>
+                <a16:creationId xmlns:a16="http://schemas.microsoft.com/office/drawing/2014/main" xmlns="" id="{21B869D6-66CB-4B38-975F-B7FEB6AA9B13}"/>
               </a:ext>
             </a:extLst>
           </p:cNvPr>
@@ -7963,7 +8439,7 @@
           <p:cNvPr id="58" name="TextBox 57">
             <a:extLst>
               <a:ext uri="{FF2B5EF4-FFF2-40B4-BE49-F238E27FC236}">
-                <a16:creationId xmlns:a16="http://schemas.microsoft.com/office/drawing/2014/main" id="{E0BBD6C8-C8F2-40C5-AA64-85961A11ADC2}"/>
+                <a16:creationId xmlns:a16="http://schemas.microsoft.com/office/drawing/2014/main" xmlns="" id="{E0BBD6C8-C8F2-40C5-AA64-85961A11ADC2}"/>
               </a:ext>
             </a:extLst>
           </p:cNvPr>
@@ -8071,7 +8547,7 @@
           <p:cNvPr id="94" name="TextBox 93">
             <a:extLst>
               <a:ext uri="{FF2B5EF4-FFF2-40B4-BE49-F238E27FC236}">
-                <a16:creationId xmlns:a16="http://schemas.microsoft.com/office/drawing/2014/main" id="{E0BBD6C8-C8F2-40C5-AA64-85961A11ADC2}"/>
+                <a16:creationId xmlns:a16="http://schemas.microsoft.com/office/drawing/2014/main" xmlns="" id="{E0BBD6C8-C8F2-40C5-AA64-85961A11ADC2}"/>
               </a:ext>
             </a:extLst>
           </p:cNvPr>
@@ -8106,7 +8582,7 @@
           <p:cNvPr id="95" name="TextBox 94">
             <a:extLst>
               <a:ext uri="{FF2B5EF4-FFF2-40B4-BE49-F238E27FC236}">
-                <a16:creationId xmlns:a16="http://schemas.microsoft.com/office/drawing/2014/main" id="{E0BBD6C8-C8F2-40C5-AA64-85961A11ADC2}"/>
+                <a16:creationId xmlns:a16="http://schemas.microsoft.com/office/drawing/2014/main" xmlns="" id="{E0BBD6C8-C8F2-40C5-AA64-85961A11ADC2}"/>
               </a:ext>
             </a:extLst>
           </p:cNvPr>
@@ -8141,7 +8617,7 @@
           <p:cNvPr id="49" name="Rectangle 48">
             <a:extLst>
               <a:ext uri="{FF2B5EF4-FFF2-40B4-BE49-F238E27FC236}">
-                <a16:creationId xmlns:a16="http://schemas.microsoft.com/office/drawing/2014/main" id="{02A645C8-F11F-438D-92DC-F6FCCA5ECFB8}"/>
+                <a16:creationId xmlns:a16="http://schemas.microsoft.com/office/drawing/2014/main" xmlns="" id="{02A645C8-F11F-438D-92DC-F6FCCA5ECFB8}"/>
               </a:ext>
             </a:extLst>
           </p:cNvPr>
@@ -8238,7 +8714,7 @@
           <p:cNvPr id="57" name="Rectangle 56">
             <a:extLst>
               <a:ext uri="{FF2B5EF4-FFF2-40B4-BE49-F238E27FC236}">
-                <a16:creationId xmlns:a16="http://schemas.microsoft.com/office/drawing/2014/main" id="{93FBA679-F71B-47BD-BE29-21E7C2262CEB}"/>
+                <a16:creationId xmlns:a16="http://schemas.microsoft.com/office/drawing/2014/main" xmlns="" id="{93FBA679-F71B-47BD-BE29-21E7C2262CEB}"/>
               </a:ext>
             </a:extLst>
           </p:cNvPr>
@@ -8348,7 +8824,7 @@
           <p:cNvPr id="59" name="TextBox 58">
             <a:extLst>
               <a:ext uri="{FF2B5EF4-FFF2-40B4-BE49-F238E27FC236}">
-                <a16:creationId xmlns:a16="http://schemas.microsoft.com/office/drawing/2014/main" id="{5E4B2700-0522-40EF-B035-166AA1C17D76}"/>
+                <a16:creationId xmlns:a16="http://schemas.microsoft.com/office/drawing/2014/main" xmlns="" id="{5E4B2700-0522-40EF-B035-166AA1C17D76}"/>
               </a:ext>
             </a:extLst>
           </p:cNvPr>
@@ -8421,10 +8897,10 @@
           <p:cNvPr id="12" name="Rectangle 11">
             <a:extLst>
               <a:ext uri="{FF2B5EF4-FFF2-40B4-BE49-F238E27FC236}">
-                <a16:creationId xmlns:a16="http://schemas.microsoft.com/office/drawing/2014/main" id="{6753252F-4873-4F63-801D-CC719279A7D5}"/>
+                <a16:creationId xmlns:a16="http://schemas.microsoft.com/office/drawing/2014/main" xmlns="" id="{6753252F-4873-4F63-801D-CC719279A7D5}"/>
               </a:ext>
               <a:ext uri="{C183D7F6-B498-43B3-948B-1728B52AA6E4}">
-                <adec:decorative xmlns:adec="http://schemas.microsoft.com/office/drawing/2017/decorative" val="1"/>
+                <adec:decorative xmlns:adec="http://schemas.microsoft.com/office/drawing/2017/decorative" xmlns="" val="1"/>
               </a:ext>
             </a:extLst>
           </p:cNvPr>
@@ -8434,7 +8910,7 @@
           <p:nvPr>
             <p:extLst>
               <p:ext uri="{386F3935-93C4-4BCD-93E2-E3B085C9AB24}">
-                <p16:designElem xmlns:p16="http://schemas.microsoft.com/office/powerpoint/2015/main" val="1"/>
+                <p16:designElem xmlns:p16="http://schemas.microsoft.com/office/powerpoint/2015/main" xmlns="" val="1"/>
               </p:ext>
             </p:extLst>
           </p:nvPr>
@@ -8484,10 +8960,10 @@
           <p:cNvPr id="14" name="Rectangle 13">
             <a:extLst>
               <a:ext uri="{FF2B5EF4-FFF2-40B4-BE49-F238E27FC236}">
-                <a16:creationId xmlns:a16="http://schemas.microsoft.com/office/drawing/2014/main" id="{047C8CCB-F95D-4249-92DD-651249D3535A}"/>
+                <a16:creationId xmlns:a16="http://schemas.microsoft.com/office/drawing/2014/main" xmlns="" id="{047C8CCB-F95D-4249-92DD-651249D3535A}"/>
               </a:ext>
               <a:ext uri="{C183D7F6-B498-43B3-948B-1728B52AA6E4}">
-                <adec:decorative xmlns:adec="http://schemas.microsoft.com/office/drawing/2017/decorative" val="1"/>
+                <adec:decorative xmlns:adec="http://schemas.microsoft.com/office/drawing/2017/decorative" xmlns="" val="1"/>
               </a:ext>
             </a:extLst>
           </p:cNvPr>
@@ -8497,7 +8973,7 @@
           <p:nvPr>
             <p:extLst>
               <p:ext uri="{386F3935-93C4-4BCD-93E2-E3B085C9AB24}">
-                <p16:designElem xmlns:p16="http://schemas.microsoft.com/office/powerpoint/2015/main" val="1"/>
+                <p16:designElem xmlns:p16="http://schemas.microsoft.com/office/powerpoint/2015/main" xmlns="" val="1"/>
               </p:ext>
             </p:extLst>
           </p:nvPr>
@@ -8547,7 +9023,7 @@
           <p:cNvPr id="5" name="TextBox 4">
             <a:extLst>
               <a:ext uri="{FF2B5EF4-FFF2-40B4-BE49-F238E27FC236}">
-                <a16:creationId xmlns:a16="http://schemas.microsoft.com/office/drawing/2014/main" id="{6C45E26E-8FEE-4439-A34B-789237C9C62C}"/>
+                <a16:creationId xmlns:a16="http://schemas.microsoft.com/office/drawing/2014/main" xmlns="" id="{6C45E26E-8FEE-4439-A34B-789237C9C62C}"/>
               </a:ext>
             </a:extLst>
           </p:cNvPr>
@@ -8661,7 +9137,7 @@
           <p:cNvPr id="2" name="Title 1">
             <a:extLst>
               <a:ext uri="{FF2B5EF4-FFF2-40B4-BE49-F238E27FC236}">
-                <a16:creationId xmlns:a16="http://schemas.microsoft.com/office/drawing/2014/main" id="{C8A221E1-FAF2-4290-9E9E-12C74FCBDD4A}"/>
+                <a16:creationId xmlns:a16="http://schemas.microsoft.com/office/drawing/2014/main" xmlns="" id="{C8A221E1-FAF2-4290-9E9E-12C74FCBDD4A}"/>
               </a:ext>
             </a:extLst>
           </p:cNvPr>
@@ -8689,7 +9165,7 @@
           <p:cNvPr id="4" name="Content Placeholder 3">
             <a:extLst>
               <a:ext uri="{FF2B5EF4-FFF2-40B4-BE49-F238E27FC236}">
-                <a16:creationId xmlns:a16="http://schemas.microsoft.com/office/drawing/2014/main" id="{CD35AFD6-14E5-4229-AC73-C65241D45091}"/>
+                <a16:creationId xmlns:a16="http://schemas.microsoft.com/office/drawing/2014/main" xmlns="" id="{CD35AFD6-14E5-4229-AC73-C65241D45091}"/>
               </a:ext>
             </a:extLst>
           </p:cNvPr>
@@ -8713,12 +9189,12 @@
           <a:graphicData uri="http://schemas.openxmlformats.org/presentationml/2006/ole">
             <mc:AlternateContent xmlns:mc="http://schemas.openxmlformats.org/markup-compatibility/2006">
               <mc:Choice xmlns:v="urn:schemas-microsoft-com:vml" Requires="v">
-                <p:oleObj name="Worksheet" r:id="rId2" imgW="10449082" imgH="7819875" progId="Excel.Sheet.12">
+                <p:oleObj spid="_x0000_s1028" name="Worksheet" r:id="rId3" imgW="10449082" imgH="7819875" progId="Excel.Sheet.12">
                   <p:embed/>
                 </p:oleObj>
               </mc:Choice>
               <mc:Fallback>
-                <p:oleObj name="Worksheet" r:id="rId2" imgW="10449082" imgH="7819875" progId="Excel.Sheet.12">
+                <p:oleObj name="Worksheet" r:id="rId3" imgW="10449082" imgH="7819875" progId="Excel.Sheet.12">
                   <p:embed/>
                   <p:pic>
                     <p:nvPicPr>
@@ -8727,7 +9203,7 @@
                       <p:nvPr/>
                     </p:nvPicPr>
                     <p:blipFill>
-                      <a:blip r:embed="rId3"/>
+                      <a:blip r:embed="rId4"/>
                       <a:stretch>
                         <a:fillRect/>
                       </a:stretch>

</xml_diff>

<commit_message>
20210827 2321 tlw87 added password encryption.
</commit_message>
<xml_diff>
--- a/docs/ERS.pptx
+++ b/docs/ERS.pptx
@@ -139,7 +139,7 @@
           <p:cNvPr id="2" name="Title 1">
             <a:extLst>
               <a:ext uri="{FF2B5EF4-FFF2-40B4-BE49-F238E27FC236}">
-                <a16:creationId xmlns:a16="http://schemas.microsoft.com/office/drawing/2014/main" xmlns="" id="{67106D7E-D400-44F1-9A1A-D68CE501C73D}"/>
+                <a16:creationId xmlns:a16="http://schemas.microsoft.com/office/drawing/2014/main" id="{67106D7E-D400-44F1-9A1A-D68CE501C73D}"/>
               </a:ext>
             </a:extLst>
           </p:cNvPr>
@@ -176,7 +176,7 @@
           <p:cNvPr id="3" name="Subtitle 2">
             <a:extLst>
               <a:ext uri="{FF2B5EF4-FFF2-40B4-BE49-F238E27FC236}">
-                <a16:creationId xmlns:a16="http://schemas.microsoft.com/office/drawing/2014/main" xmlns="" id="{A5FDE527-E621-4639-A0C7-E1E9B0DFBCEC}"/>
+                <a16:creationId xmlns:a16="http://schemas.microsoft.com/office/drawing/2014/main" id="{A5FDE527-E621-4639-A0C7-E1E9B0DFBCEC}"/>
               </a:ext>
             </a:extLst>
           </p:cNvPr>
@@ -246,7 +246,7 @@
           <p:cNvPr id="4" name="Date Placeholder 3">
             <a:extLst>
               <a:ext uri="{FF2B5EF4-FFF2-40B4-BE49-F238E27FC236}">
-                <a16:creationId xmlns:a16="http://schemas.microsoft.com/office/drawing/2014/main" xmlns="" id="{E109CE88-B989-4109-89C8-36F7C245DB1C}"/>
+                <a16:creationId xmlns:a16="http://schemas.microsoft.com/office/drawing/2014/main" id="{E109CE88-B989-4109-89C8-36F7C245DB1C}"/>
               </a:ext>
             </a:extLst>
           </p:cNvPr>
@@ -275,7 +275,7 @@
           <p:cNvPr id="5" name="Footer Placeholder 4">
             <a:extLst>
               <a:ext uri="{FF2B5EF4-FFF2-40B4-BE49-F238E27FC236}">
-                <a16:creationId xmlns:a16="http://schemas.microsoft.com/office/drawing/2014/main" xmlns="" id="{0841498F-B991-43D3-B408-CC35D8EFCF37}"/>
+                <a16:creationId xmlns:a16="http://schemas.microsoft.com/office/drawing/2014/main" id="{0841498F-B991-43D3-B408-CC35D8EFCF37}"/>
               </a:ext>
             </a:extLst>
           </p:cNvPr>
@@ -300,7 +300,7 @@
           <p:cNvPr id="6" name="Slide Number Placeholder 5">
             <a:extLst>
               <a:ext uri="{FF2B5EF4-FFF2-40B4-BE49-F238E27FC236}">
-                <a16:creationId xmlns:a16="http://schemas.microsoft.com/office/drawing/2014/main" xmlns="" id="{01754CB8-17B1-45A0-AE7D-755EAA1B69D8}"/>
+                <a16:creationId xmlns:a16="http://schemas.microsoft.com/office/drawing/2014/main" id="{01754CB8-17B1-45A0-AE7D-755EAA1B69D8}"/>
               </a:ext>
             </a:extLst>
           </p:cNvPr>
@@ -359,7 +359,7 @@
           <p:cNvPr id="2" name="Title 1">
             <a:extLst>
               <a:ext uri="{FF2B5EF4-FFF2-40B4-BE49-F238E27FC236}">
-                <a16:creationId xmlns:a16="http://schemas.microsoft.com/office/drawing/2014/main" xmlns="" id="{E7A7B055-5DC2-440D-83C1-CAAE8E9A8E14}"/>
+                <a16:creationId xmlns:a16="http://schemas.microsoft.com/office/drawing/2014/main" id="{E7A7B055-5DC2-440D-83C1-CAAE8E9A8E14}"/>
               </a:ext>
             </a:extLst>
           </p:cNvPr>
@@ -387,7 +387,7 @@
           <p:cNvPr id="3" name="Vertical Text Placeholder 2">
             <a:extLst>
               <a:ext uri="{FF2B5EF4-FFF2-40B4-BE49-F238E27FC236}">
-                <a16:creationId xmlns:a16="http://schemas.microsoft.com/office/drawing/2014/main" xmlns="" id="{65710707-423D-4F9D-A49D-6C764C562553}"/>
+                <a16:creationId xmlns:a16="http://schemas.microsoft.com/office/drawing/2014/main" id="{65710707-423D-4F9D-A49D-6C764C562553}"/>
               </a:ext>
             </a:extLst>
           </p:cNvPr>
@@ -444,7 +444,7 @@
           <p:cNvPr id="4" name="Date Placeholder 3">
             <a:extLst>
               <a:ext uri="{FF2B5EF4-FFF2-40B4-BE49-F238E27FC236}">
-                <a16:creationId xmlns:a16="http://schemas.microsoft.com/office/drawing/2014/main" xmlns="" id="{98B6F7EF-D1BE-4437-85F3-99626E37E4EF}"/>
+                <a16:creationId xmlns:a16="http://schemas.microsoft.com/office/drawing/2014/main" id="{98B6F7EF-D1BE-4437-85F3-99626E37E4EF}"/>
               </a:ext>
             </a:extLst>
           </p:cNvPr>
@@ -473,7 +473,7 @@
           <p:cNvPr id="5" name="Footer Placeholder 4">
             <a:extLst>
               <a:ext uri="{FF2B5EF4-FFF2-40B4-BE49-F238E27FC236}">
-                <a16:creationId xmlns:a16="http://schemas.microsoft.com/office/drawing/2014/main" xmlns="" id="{D890AA9B-E479-4209-B245-83608F3D4013}"/>
+                <a16:creationId xmlns:a16="http://schemas.microsoft.com/office/drawing/2014/main" id="{D890AA9B-E479-4209-B245-83608F3D4013}"/>
               </a:ext>
             </a:extLst>
           </p:cNvPr>
@@ -498,7 +498,7 @@
           <p:cNvPr id="6" name="Slide Number Placeholder 5">
             <a:extLst>
               <a:ext uri="{FF2B5EF4-FFF2-40B4-BE49-F238E27FC236}">
-                <a16:creationId xmlns:a16="http://schemas.microsoft.com/office/drawing/2014/main" xmlns="" id="{0E4976E4-E15A-4296-A430-633D2BB9142B}"/>
+                <a16:creationId xmlns:a16="http://schemas.microsoft.com/office/drawing/2014/main" id="{0E4976E4-E15A-4296-A430-633D2BB9142B}"/>
               </a:ext>
             </a:extLst>
           </p:cNvPr>
@@ -557,7 +557,7 @@
           <p:cNvPr id="2" name="Vertical Title 1">
             <a:extLst>
               <a:ext uri="{FF2B5EF4-FFF2-40B4-BE49-F238E27FC236}">
-                <a16:creationId xmlns:a16="http://schemas.microsoft.com/office/drawing/2014/main" xmlns="" id="{66F63CF5-8DEE-4BB2-A2A5-5C16FEBE1AD5}"/>
+                <a16:creationId xmlns:a16="http://schemas.microsoft.com/office/drawing/2014/main" id="{66F63CF5-8DEE-4BB2-A2A5-5C16FEBE1AD5}"/>
               </a:ext>
             </a:extLst>
           </p:cNvPr>
@@ -590,7 +590,7 @@
           <p:cNvPr id="3" name="Vertical Text Placeholder 2">
             <a:extLst>
               <a:ext uri="{FF2B5EF4-FFF2-40B4-BE49-F238E27FC236}">
-                <a16:creationId xmlns:a16="http://schemas.microsoft.com/office/drawing/2014/main" xmlns="" id="{E0D5EBA5-94AF-4373-B032-A40FF73C7575}"/>
+                <a16:creationId xmlns:a16="http://schemas.microsoft.com/office/drawing/2014/main" id="{E0D5EBA5-94AF-4373-B032-A40FF73C7575}"/>
               </a:ext>
             </a:extLst>
           </p:cNvPr>
@@ -652,7 +652,7 @@
           <p:cNvPr id="4" name="Date Placeholder 3">
             <a:extLst>
               <a:ext uri="{FF2B5EF4-FFF2-40B4-BE49-F238E27FC236}">
-                <a16:creationId xmlns:a16="http://schemas.microsoft.com/office/drawing/2014/main" xmlns="" id="{7426B8E1-6758-4F5E-B618-96641332600B}"/>
+                <a16:creationId xmlns:a16="http://schemas.microsoft.com/office/drawing/2014/main" id="{7426B8E1-6758-4F5E-B618-96641332600B}"/>
               </a:ext>
             </a:extLst>
           </p:cNvPr>
@@ -681,7 +681,7 @@
           <p:cNvPr id="5" name="Footer Placeholder 4">
             <a:extLst>
               <a:ext uri="{FF2B5EF4-FFF2-40B4-BE49-F238E27FC236}">
-                <a16:creationId xmlns:a16="http://schemas.microsoft.com/office/drawing/2014/main" xmlns="" id="{F65E330E-2A7E-482D-AE0F-70EA5A29958B}"/>
+                <a16:creationId xmlns:a16="http://schemas.microsoft.com/office/drawing/2014/main" id="{F65E330E-2A7E-482D-AE0F-70EA5A29958B}"/>
               </a:ext>
             </a:extLst>
           </p:cNvPr>
@@ -706,7 +706,7 @@
           <p:cNvPr id="6" name="Slide Number Placeholder 5">
             <a:extLst>
               <a:ext uri="{FF2B5EF4-FFF2-40B4-BE49-F238E27FC236}">
-                <a16:creationId xmlns:a16="http://schemas.microsoft.com/office/drawing/2014/main" xmlns="" id="{B8000005-FC38-4A6C-9D09-7945EFA08160}"/>
+                <a16:creationId xmlns:a16="http://schemas.microsoft.com/office/drawing/2014/main" id="{B8000005-FC38-4A6C-9D09-7945EFA08160}"/>
               </a:ext>
             </a:extLst>
           </p:cNvPr>
@@ -765,7 +765,7 @@
           <p:cNvPr id="2" name="Title 1">
             <a:extLst>
               <a:ext uri="{FF2B5EF4-FFF2-40B4-BE49-F238E27FC236}">
-                <a16:creationId xmlns:a16="http://schemas.microsoft.com/office/drawing/2014/main" xmlns="" id="{91D0002C-766B-44B4-A24C-BE6DE6C7BA4C}"/>
+                <a16:creationId xmlns:a16="http://schemas.microsoft.com/office/drawing/2014/main" id="{91D0002C-766B-44B4-A24C-BE6DE6C7BA4C}"/>
               </a:ext>
             </a:extLst>
           </p:cNvPr>
@@ -793,7 +793,7 @@
           <p:cNvPr id="3" name="Content Placeholder 2">
             <a:extLst>
               <a:ext uri="{FF2B5EF4-FFF2-40B4-BE49-F238E27FC236}">
-                <a16:creationId xmlns:a16="http://schemas.microsoft.com/office/drawing/2014/main" xmlns="" id="{3455BAA9-6C7B-4874-AD76-BD466F64802D}"/>
+                <a16:creationId xmlns:a16="http://schemas.microsoft.com/office/drawing/2014/main" id="{3455BAA9-6C7B-4874-AD76-BD466F64802D}"/>
               </a:ext>
             </a:extLst>
           </p:cNvPr>
@@ -850,7 +850,7 @@
           <p:cNvPr id="4" name="Date Placeholder 3">
             <a:extLst>
               <a:ext uri="{FF2B5EF4-FFF2-40B4-BE49-F238E27FC236}">
-                <a16:creationId xmlns:a16="http://schemas.microsoft.com/office/drawing/2014/main" xmlns="" id="{8776BDAF-D8F2-4A61-904D-094BB4545702}"/>
+                <a16:creationId xmlns:a16="http://schemas.microsoft.com/office/drawing/2014/main" id="{8776BDAF-D8F2-4A61-904D-094BB4545702}"/>
               </a:ext>
             </a:extLst>
           </p:cNvPr>
@@ -879,7 +879,7 @@
           <p:cNvPr id="5" name="Footer Placeholder 4">
             <a:extLst>
               <a:ext uri="{FF2B5EF4-FFF2-40B4-BE49-F238E27FC236}">
-                <a16:creationId xmlns:a16="http://schemas.microsoft.com/office/drawing/2014/main" xmlns="" id="{F89C5665-4384-4706-9BD2-9F42B05C96BC}"/>
+                <a16:creationId xmlns:a16="http://schemas.microsoft.com/office/drawing/2014/main" id="{F89C5665-4384-4706-9BD2-9F42B05C96BC}"/>
               </a:ext>
             </a:extLst>
           </p:cNvPr>
@@ -904,7 +904,7 @@
           <p:cNvPr id="6" name="Slide Number Placeholder 5">
             <a:extLst>
               <a:ext uri="{FF2B5EF4-FFF2-40B4-BE49-F238E27FC236}">
-                <a16:creationId xmlns:a16="http://schemas.microsoft.com/office/drawing/2014/main" xmlns="" id="{7DCAD73E-CAB3-4BA7-905E-D203691D0418}"/>
+                <a16:creationId xmlns:a16="http://schemas.microsoft.com/office/drawing/2014/main" id="{7DCAD73E-CAB3-4BA7-905E-D203691D0418}"/>
               </a:ext>
             </a:extLst>
           </p:cNvPr>
@@ -963,7 +963,7 @@
           <p:cNvPr id="2" name="Title 1">
             <a:extLst>
               <a:ext uri="{FF2B5EF4-FFF2-40B4-BE49-F238E27FC236}">
-                <a16:creationId xmlns:a16="http://schemas.microsoft.com/office/drawing/2014/main" xmlns="" id="{A9880706-F7FA-4EC3-A022-9D6C7CEC3692}"/>
+                <a16:creationId xmlns:a16="http://schemas.microsoft.com/office/drawing/2014/main" id="{A9880706-F7FA-4EC3-A022-9D6C7CEC3692}"/>
               </a:ext>
             </a:extLst>
           </p:cNvPr>
@@ -1000,7 +1000,7 @@
           <p:cNvPr id="3" name="Text Placeholder 2">
             <a:extLst>
               <a:ext uri="{FF2B5EF4-FFF2-40B4-BE49-F238E27FC236}">
-                <a16:creationId xmlns:a16="http://schemas.microsoft.com/office/drawing/2014/main" xmlns="" id="{FA8A65D0-3DF5-448D-82EC-A967682A0DED}"/>
+                <a16:creationId xmlns:a16="http://schemas.microsoft.com/office/drawing/2014/main" id="{FA8A65D0-3DF5-448D-82EC-A967682A0DED}"/>
               </a:ext>
             </a:extLst>
           </p:cNvPr>
@@ -1125,7 +1125,7 @@
           <p:cNvPr id="4" name="Date Placeholder 3">
             <a:extLst>
               <a:ext uri="{FF2B5EF4-FFF2-40B4-BE49-F238E27FC236}">
-                <a16:creationId xmlns:a16="http://schemas.microsoft.com/office/drawing/2014/main" xmlns="" id="{600EA68C-01A6-487D-9D6E-1D1B4EAC0440}"/>
+                <a16:creationId xmlns:a16="http://schemas.microsoft.com/office/drawing/2014/main" id="{600EA68C-01A6-487D-9D6E-1D1B4EAC0440}"/>
               </a:ext>
             </a:extLst>
           </p:cNvPr>
@@ -1154,7 +1154,7 @@
           <p:cNvPr id="5" name="Footer Placeholder 4">
             <a:extLst>
               <a:ext uri="{FF2B5EF4-FFF2-40B4-BE49-F238E27FC236}">
-                <a16:creationId xmlns:a16="http://schemas.microsoft.com/office/drawing/2014/main" xmlns="" id="{6E6527CB-4FFD-4569-A82C-5EDC311B2CF6}"/>
+                <a16:creationId xmlns:a16="http://schemas.microsoft.com/office/drawing/2014/main" id="{6E6527CB-4FFD-4569-A82C-5EDC311B2CF6}"/>
               </a:ext>
             </a:extLst>
           </p:cNvPr>
@@ -1179,7 +1179,7 @@
           <p:cNvPr id="6" name="Slide Number Placeholder 5">
             <a:extLst>
               <a:ext uri="{FF2B5EF4-FFF2-40B4-BE49-F238E27FC236}">
-                <a16:creationId xmlns:a16="http://schemas.microsoft.com/office/drawing/2014/main" xmlns="" id="{24B19E5B-5A98-4381-A01D-01F81FD65792}"/>
+                <a16:creationId xmlns:a16="http://schemas.microsoft.com/office/drawing/2014/main" id="{24B19E5B-5A98-4381-A01D-01F81FD65792}"/>
               </a:ext>
             </a:extLst>
           </p:cNvPr>
@@ -1238,7 +1238,7 @@
           <p:cNvPr id="2" name="Title 1">
             <a:extLst>
               <a:ext uri="{FF2B5EF4-FFF2-40B4-BE49-F238E27FC236}">
-                <a16:creationId xmlns:a16="http://schemas.microsoft.com/office/drawing/2014/main" xmlns="" id="{63228B71-E923-4431-B8D2-FAE724678940}"/>
+                <a16:creationId xmlns:a16="http://schemas.microsoft.com/office/drawing/2014/main" id="{63228B71-E923-4431-B8D2-FAE724678940}"/>
               </a:ext>
             </a:extLst>
           </p:cNvPr>
@@ -1266,7 +1266,7 @@
           <p:cNvPr id="3" name="Content Placeholder 2">
             <a:extLst>
               <a:ext uri="{FF2B5EF4-FFF2-40B4-BE49-F238E27FC236}">
-                <a16:creationId xmlns:a16="http://schemas.microsoft.com/office/drawing/2014/main" xmlns="" id="{B18895E9-B7FF-4A00-955B-206CF8C73E43}"/>
+                <a16:creationId xmlns:a16="http://schemas.microsoft.com/office/drawing/2014/main" id="{B18895E9-B7FF-4A00-955B-206CF8C73E43}"/>
               </a:ext>
             </a:extLst>
           </p:cNvPr>
@@ -1328,7 +1328,7 @@
           <p:cNvPr id="4" name="Content Placeholder 3">
             <a:extLst>
               <a:ext uri="{FF2B5EF4-FFF2-40B4-BE49-F238E27FC236}">
-                <a16:creationId xmlns:a16="http://schemas.microsoft.com/office/drawing/2014/main" xmlns="" id="{DA813955-E3B9-44BC-8E1D-139269C8B48A}"/>
+                <a16:creationId xmlns:a16="http://schemas.microsoft.com/office/drawing/2014/main" id="{DA813955-E3B9-44BC-8E1D-139269C8B48A}"/>
               </a:ext>
             </a:extLst>
           </p:cNvPr>
@@ -1390,7 +1390,7 @@
           <p:cNvPr id="5" name="Date Placeholder 4">
             <a:extLst>
               <a:ext uri="{FF2B5EF4-FFF2-40B4-BE49-F238E27FC236}">
-                <a16:creationId xmlns:a16="http://schemas.microsoft.com/office/drawing/2014/main" xmlns="" id="{7E9B8EF5-28D5-4C4E-A2AB-EEA30D75DAFE}"/>
+                <a16:creationId xmlns:a16="http://schemas.microsoft.com/office/drawing/2014/main" id="{7E9B8EF5-28D5-4C4E-A2AB-EEA30D75DAFE}"/>
               </a:ext>
             </a:extLst>
           </p:cNvPr>
@@ -1419,7 +1419,7 @@
           <p:cNvPr id="6" name="Footer Placeholder 5">
             <a:extLst>
               <a:ext uri="{FF2B5EF4-FFF2-40B4-BE49-F238E27FC236}">
-                <a16:creationId xmlns:a16="http://schemas.microsoft.com/office/drawing/2014/main" xmlns="" id="{5723E678-8CB4-4335-AA04-6BD391748717}"/>
+                <a16:creationId xmlns:a16="http://schemas.microsoft.com/office/drawing/2014/main" id="{5723E678-8CB4-4335-AA04-6BD391748717}"/>
               </a:ext>
             </a:extLst>
           </p:cNvPr>
@@ -1444,7 +1444,7 @@
           <p:cNvPr id="7" name="Slide Number Placeholder 6">
             <a:extLst>
               <a:ext uri="{FF2B5EF4-FFF2-40B4-BE49-F238E27FC236}">
-                <a16:creationId xmlns:a16="http://schemas.microsoft.com/office/drawing/2014/main" xmlns="" id="{887B5567-9F4D-4AE1-92D8-769C9F7EA4F0}"/>
+                <a16:creationId xmlns:a16="http://schemas.microsoft.com/office/drawing/2014/main" id="{887B5567-9F4D-4AE1-92D8-769C9F7EA4F0}"/>
               </a:ext>
             </a:extLst>
           </p:cNvPr>
@@ -1503,7 +1503,7 @@
           <p:cNvPr id="2" name="Title 1">
             <a:extLst>
               <a:ext uri="{FF2B5EF4-FFF2-40B4-BE49-F238E27FC236}">
-                <a16:creationId xmlns:a16="http://schemas.microsoft.com/office/drawing/2014/main" xmlns="" id="{A40320A9-7C0C-45B4-BF2B-3B53B5686EBB}"/>
+                <a16:creationId xmlns:a16="http://schemas.microsoft.com/office/drawing/2014/main" id="{A40320A9-7C0C-45B4-BF2B-3B53B5686EBB}"/>
               </a:ext>
             </a:extLst>
           </p:cNvPr>
@@ -1536,7 +1536,7 @@
           <p:cNvPr id="3" name="Text Placeholder 2">
             <a:extLst>
               <a:ext uri="{FF2B5EF4-FFF2-40B4-BE49-F238E27FC236}">
-                <a16:creationId xmlns:a16="http://schemas.microsoft.com/office/drawing/2014/main" xmlns="" id="{8C440DE1-7DD6-4B1C-B961-CD2079B51F03}"/>
+                <a16:creationId xmlns:a16="http://schemas.microsoft.com/office/drawing/2014/main" id="{8C440DE1-7DD6-4B1C-B961-CD2079B51F03}"/>
               </a:ext>
             </a:extLst>
           </p:cNvPr>
@@ -1607,7 +1607,7 @@
           <p:cNvPr id="4" name="Content Placeholder 3">
             <a:extLst>
               <a:ext uri="{FF2B5EF4-FFF2-40B4-BE49-F238E27FC236}">
-                <a16:creationId xmlns:a16="http://schemas.microsoft.com/office/drawing/2014/main" xmlns="" id="{6FAFE840-CC9A-4D89-B05F-159EF756B427}"/>
+                <a16:creationId xmlns:a16="http://schemas.microsoft.com/office/drawing/2014/main" id="{6FAFE840-CC9A-4D89-B05F-159EF756B427}"/>
               </a:ext>
             </a:extLst>
           </p:cNvPr>
@@ -1669,7 +1669,7 @@
           <p:cNvPr id="5" name="Text Placeholder 4">
             <a:extLst>
               <a:ext uri="{FF2B5EF4-FFF2-40B4-BE49-F238E27FC236}">
-                <a16:creationId xmlns:a16="http://schemas.microsoft.com/office/drawing/2014/main" xmlns="" id="{4B87AADC-3401-48C6-98F6-0AB60F6DF9BE}"/>
+                <a16:creationId xmlns:a16="http://schemas.microsoft.com/office/drawing/2014/main" id="{4B87AADC-3401-48C6-98F6-0AB60F6DF9BE}"/>
               </a:ext>
             </a:extLst>
           </p:cNvPr>
@@ -1740,7 +1740,7 @@
           <p:cNvPr id="6" name="Content Placeholder 5">
             <a:extLst>
               <a:ext uri="{FF2B5EF4-FFF2-40B4-BE49-F238E27FC236}">
-                <a16:creationId xmlns:a16="http://schemas.microsoft.com/office/drawing/2014/main" xmlns="" id="{34BCF1A4-FB52-4DCD-80BC-324BA41C33CD}"/>
+                <a16:creationId xmlns:a16="http://schemas.microsoft.com/office/drawing/2014/main" id="{34BCF1A4-FB52-4DCD-80BC-324BA41C33CD}"/>
               </a:ext>
             </a:extLst>
           </p:cNvPr>
@@ -1802,7 +1802,7 @@
           <p:cNvPr id="7" name="Date Placeholder 6">
             <a:extLst>
               <a:ext uri="{FF2B5EF4-FFF2-40B4-BE49-F238E27FC236}">
-                <a16:creationId xmlns:a16="http://schemas.microsoft.com/office/drawing/2014/main" xmlns="" id="{8CFD4208-60E7-48B1-8CD0-717D5E26B827}"/>
+                <a16:creationId xmlns:a16="http://schemas.microsoft.com/office/drawing/2014/main" id="{8CFD4208-60E7-48B1-8CD0-717D5E26B827}"/>
               </a:ext>
             </a:extLst>
           </p:cNvPr>
@@ -1831,7 +1831,7 @@
           <p:cNvPr id="8" name="Footer Placeholder 7">
             <a:extLst>
               <a:ext uri="{FF2B5EF4-FFF2-40B4-BE49-F238E27FC236}">
-                <a16:creationId xmlns:a16="http://schemas.microsoft.com/office/drawing/2014/main" xmlns="" id="{94E429D1-BEB1-4D8A-91F2-CD4F80157F8D}"/>
+                <a16:creationId xmlns:a16="http://schemas.microsoft.com/office/drawing/2014/main" id="{94E429D1-BEB1-4D8A-91F2-CD4F80157F8D}"/>
               </a:ext>
             </a:extLst>
           </p:cNvPr>
@@ -1856,7 +1856,7 @@
           <p:cNvPr id="9" name="Slide Number Placeholder 8">
             <a:extLst>
               <a:ext uri="{FF2B5EF4-FFF2-40B4-BE49-F238E27FC236}">
-                <a16:creationId xmlns:a16="http://schemas.microsoft.com/office/drawing/2014/main" xmlns="" id="{6F17C19C-8370-4118-A8FC-5DDA6F84230F}"/>
+                <a16:creationId xmlns:a16="http://schemas.microsoft.com/office/drawing/2014/main" id="{6F17C19C-8370-4118-A8FC-5DDA6F84230F}"/>
               </a:ext>
             </a:extLst>
           </p:cNvPr>
@@ -1915,7 +1915,7 @@
           <p:cNvPr id="2" name="Title 1">
             <a:extLst>
               <a:ext uri="{FF2B5EF4-FFF2-40B4-BE49-F238E27FC236}">
-                <a16:creationId xmlns:a16="http://schemas.microsoft.com/office/drawing/2014/main" xmlns="" id="{252CBF36-7F99-45A9-BC35-BD2EC260CBF0}"/>
+                <a16:creationId xmlns:a16="http://schemas.microsoft.com/office/drawing/2014/main" id="{252CBF36-7F99-45A9-BC35-BD2EC260CBF0}"/>
               </a:ext>
             </a:extLst>
           </p:cNvPr>
@@ -1943,7 +1943,7 @@
           <p:cNvPr id="3" name="Date Placeholder 2">
             <a:extLst>
               <a:ext uri="{FF2B5EF4-FFF2-40B4-BE49-F238E27FC236}">
-                <a16:creationId xmlns:a16="http://schemas.microsoft.com/office/drawing/2014/main" xmlns="" id="{0D6F5F83-F07E-4501-B86B-9F96CD43993C}"/>
+                <a16:creationId xmlns:a16="http://schemas.microsoft.com/office/drawing/2014/main" id="{0D6F5F83-F07E-4501-B86B-9F96CD43993C}"/>
               </a:ext>
             </a:extLst>
           </p:cNvPr>
@@ -1972,7 +1972,7 @@
           <p:cNvPr id="4" name="Footer Placeholder 3">
             <a:extLst>
               <a:ext uri="{FF2B5EF4-FFF2-40B4-BE49-F238E27FC236}">
-                <a16:creationId xmlns:a16="http://schemas.microsoft.com/office/drawing/2014/main" xmlns="" id="{2861989B-F8E9-41FD-8E16-687424BCC266}"/>
+                <a16:creationId xmlns:a16="http://schemas.microsoft.com/office/drawing/2014/main" id="{2861989B-F8E9-41FD-8E16-687424BCC266}"/>
               </a:ext>
             </a:extLst>
           </p:cNvPr>
@@ -1997,7 +1997,7 @@
           <p:cNvPr id="5" name="Slide Number Placeholder 4">
             <a:extLst>
               <a:ext uri="{FF2B5EF4-FFF2-40B4-BE49-F238E27FC236}">
-                <a16:creationId xmlns:a16="http://schemas.microsoft.com/office/drawing/2014/main" xmlns="" id="{2026B6D7-7832-4815-95CE-5CEC39502825}"/>
+                <a16:creationId xmlns:a16="http://schemas.microsoft.com/office/drawing/2014/main" id="{2026B6D7-7832-4815-95CE-5CEC39502825}"/>
               </a:ext>
             </a:extLst>
           </p:cNvPr>
@@ -2056,7 +2056,7 @@
           <p:cNvPr id="2" name="Date Placeholder 1">
             <a:extLst>
               <a:ext uri="{FF2B5EF4-FFF2-40B4-BE49-F238E27FC236}">
-                <a16:creationId xmlns:a16="http://schemas.microsoft.com/office/drawing/2014/main" xmlns="" id="{9877919A-C4B6-46FD-A08A-9A4B867FE01A}"/>
+                <a16:creationId xmlns:a16="http://schemas.microsoft.com/office/drawing/2014/main" id="{9877919A-C4B6-46FD-A08A-9A4B867FE01A}"/>
               </a:ext>
             </a:extLst>
           </p:cNvPr>
@@ -2085,7 +2085,7 @@
           <p:cNvPr id="3" name="Footer Placeholder 2">
             <a:extLst>
               <a:ext uri="{FF2B5EF4-FFF2-40B4-BE49-F238E27FC236}">
-                <a16:creationId xmlns:a16="http://schemas.microsoft.com/office/drawing/2014/main" xmlns="" id="{9118539E-383C-4F1C-86F2-14C533A7E9FB}"/>
+                <a16:creationId xmlns:a16="http://schemas.microsoft.com/office/drawing/2014/main" id="{9118539E-383C-4F1C-86F2-14C533A7E9FB}"/>
               </a:ext>
             </a:extLst>
           </p:cNvPr>
@@ -2110,7 +2110,7 @@
           <p:cNvPr id="4" name="Slide Number Placeholder 3">
             <a:extLst>
               <a:ext uri="{FF2B5EF4-FFF2-40B4-BE49-F238E27FC236}">
-                <a16:creationId xmlns:a16="http://schemas.microsoft.com/office/drawing/2014/main" xmlns="" id="{C9A6D4E1-CA83-4214-9942-9E4617AA89BF}"/>
+                <a16:creationId xmlns:a16="http://schemas.microsoft.com/office/drawing/2014/main" id="{C9A6D4E1-CA83-4214-9942-9E4617AA89BF}"/>
               </a:ext>
             </a:extLst>
           </p:cNvPr>
@@ -2169,7 +2169,7 @@
           <p:cNvPr id="2" name="Title 1">
             <a:extLst>
               <a:ext uri="{FF2B5EF4-FFF2-40B4-BE49-F238E27FC236}">
-                <a16:creationId xmlns:a16="http://schemas.microsoft.com/office/drawing/2014/main" xmlns="" id="{046EF9B5-7A2A-4225-8817-86D028D6950C}"/>
+                <a16:creationId xmlns:a16="http://schemas.microsoft.com/office/drawing/2014/main" id="{046EF9B5-7A2A-4225-8817-86D028D6950C}"/>
               </a:ext>
             </a:extLst>
           </p:cNvPr>
@@ -2206,7 +2206,7 @@
           <p:cNvPr id="3" name="Content Placeholder 2">
             <a:extLst>
               <a:ext uri="{FF2B5EF4-FFF2-40B4-BE49-F238E27FC236}">
-                <a16:creationId xmlns:a16="http://schemas.microsoft.com/office/drawing/2014/main" xmlns="" id="{8667C390-5297-41E8-A403-22856007B051}"/>
+                <a16:creationId xmlns:a16="http://schemas.microsoft.com/office/drawing/2014/main" id="{8667C390-5297-41E8-A403-22856007B051}"/>
               </a:ext>
             </a:extLst>
           </p:cNvPr>
@@ -2296,7 +2296,7 @@
           <p:cNvPr id="4" name="Text Placeholder 3">
             <a:extLst>
               <a:ext uri="{FF2B5EF4-FFF2-40B4-BE49-F238E27FC236}">
-                <a16:creationId xmlns:a16="http://schemas.microsoft.com/office/drawing/2014/main" xmlns="" id="{8D0D2F7D-D6CD-4AB1-A3EA-CBFD2A2B3703}"/>
+                <a16:creationId xmlns:a16="http://schemas.microsoft.com/office/drawing/2014/main" id="{8D0D2F7D-D6CD-4AB1-A3EA-CBFD2A2B3703}"/>
               </a:ext>
             </a:extLst>
           </p:cNvPr>
@@ -2367,7 +2367,7 @@
           <p:cNvPr id="5" name="Date Placeholder 4">
             <a:extLst>
               <a:ext uri="{FF2B5EF4-FFF2-40B4-BE49-F238E27FC236}">
-                <a16:creationId xmlns:a16="http://schemas.microsoft.com/office/drawing/2014/main" xmlns="" id="{E17A441D-4FA7-4110-BF24-165CD3C3DAD7}"/>
+                <a16:creationId xmlns:a16="http://schemas.microsoft.com/office/drawing/2014/main" id="{E17A441D-4FA7-4110-BF24-165CD3C3DAD7}"/>
               </a:ext>
             </a:extLst>
           </p:cNvPr>
@@ -2396,7 +2396,7 @@
           <p:cNvPr id="6" name="Footer Placeholder 5">
             <a:extLst>
               <a:ext uri="{FF2B5EF4-FFF2-40B4-BE49-F238E27FC236}">
-                <a16:creationId xmlns:a16="http://schemas.microsoft.com/office/drawing/2014/main" xmlns="" id="{346102C5-5AE3-43CF-A686-1AB72B0790AB}"/>
+                <a16:creationId xmlns:a16="http://schemas.microsoft.com/office/drawing/2014/main" id="{346102C5-5AE3-43CF-A686-1AB72B0790AB}"/>
               </a:ext>
             </a:extLst>
           </p:cNvPr>
@@ -2421,7 +2421,7 @@
           <p:cNvPr id="7" name="Slide Number Placeholder 6">
             <a:extLst>
               <a:ext uri="{FF2B5EF4-FFF2-40B4-BE49-F238E27FC236}">
-                <a16:creationId xmlns:a16="http://schemas.microsoft.com/office/drawing/2014/main" xmlns="" id="{5528B3F7-462C-4500-8836-B3E5CD8DA61A}"/>
+                <a16:creationId xmlns:a16="http://schemas.microsoft.com/office/drawing/2014/main" id="{5528B3F7-462C-4500-8836-B3E5CD8DA61A}"/>
               </a:ext>
             </a:extLst>
           </p:cNvPr>
@@ -2480,7 +2480,7 @@
           <p:cNvPr id="2" name="Title 1">
             <a:extLst>
               <a:ext uri="{FF2B5EF4-FFF2-40B4-BE49-F238E27FC236}">
-                <a16:creationId xmlns:a16="http://schemas.microsoft.com/office/drawing/2014/main" xmlns="" id="{4BA10E59-DA48-4690-A956-9EB8E4E11EE5}"/>
+                <a16:creationId xmlns:a16="http://schemas.microsoft.com/office/drawing/2014/main" id="{4BA10E59-DA48-4690-A956-9EB8E4E11EE5}"/>
               </a:ext>
             </a:extLst>
           </p:cNvPr>
@@ -2517,7 +2517,7 @@
           <p:cNvPr id="3" name="Picture Placeholder 2">
             <a:extLst>
               <a:ext uri="{FF2B5EF4-FFF2-40B4-BE49-F238E27FC236}">
-                <a16:creationId xmlns:a16="http://schemas.microsoft.com/office/drawing/2014/main" xmlns="" id="{AC7AFE1E-67D1-4106-97CA-98302D42CC4D}"/>
+                <a16:creationId xmlns:a16="http://schemas.microsoft.com/office/drawing/2014/main" id="{AC7AFE1E-67D1-4106-97CA-98302D42CC4D}"/>
               </a:ext>
             </a:extLst>
           </p:cNvPr>
@@ -2584,7 +2584,7 @@
           <p:cNvPr id="4" name="Text Placeholder 3">
             <a:extLst>
               <a:ext uri="{FF2B5EF4-FFF2-40B4-BE49-F238E27FC236}">
-                <a16:creationId xmlns:a16="http://schemas.microsoft.com/office/drawing/2014/main" xmlns="" id="{67D8D73B-3D4D-42A7-9A3C-1D508E8A9B45}"/>
+                <a16:creationId xmlns:a16="http://schemas.microsoft.com/office/drawing/2014/main" id="{67D8D73B-3D4D-42A7-9A3C-1D508E8A9B45}"/>
               </a:ext>
             </a:extLst>
           </p:cNvPr>
@@ -2655,7 +2655,7 @@
           <p:cNvPr id="5" name="Date Placeholder 4">
             <a:extLst>
               <a:ext uri="{FF2B5EF4-FFF2-40B4-BE49-F238E27FC236}">
-                <a16:creationId xmlns:a16="http://schemas.microsoft.com/office/drawing/2014/main" xmlns="" id="{48C8945E-A47A-42A2-9DF6-CA6D5002F65F}"/>
+                <a16:creationId xmlns:a16="http://schemas.microsoft.com/office/drawing/2014/main" id="{48C8945E-A47A-42A2-9DF6-CA6D5002F65F}"/>
               </a:ext>
             </a:extLst>
           </p:cNvPr>
@@ -2684,7 +2684,7 @@
           <p:cNvPr id="6" name="Footer Placeholder 5">
             <a:extLst>
               <a:ext uri="{FF2B5EF4-FFF2-40B4-BE49-F238E27FC236}">
-                <a16:creationId xmlns:a16="http://schemas.microsoft.com/office/drawing/2014/main" xmlns="" id="{EB000DB4-2747-4297-B400-42A539FBDB42}"/>
+                <a16:creationId xmlns:a16="http://schemas.microsoft.com/office/drawing/2014/main" id="{EB000DB4-2747-4297-B400-42A539FBDB42}"/>
               </a:ext>
             </a:extLst>
           </p:cNvPr>
@@ -2709,7 +2709,7 @@
           <p:cNvPr id="7" name="Slide Number Placeholder 6">
             <a:extLst>
               <a:ext uri="{FF2B5EF4-FFF2-40B4-BE49-F238E27FC236}">
-                <a16:creationId xmlns:a16="http://schemas.microsoft.com/office/drawing/2014/main" xmlns="" id="{5BAD9222-F141-4803-AF73-E2DD92E2ABBC}"/>
+                <a16:creationId xmlns:a16="http://schemas.microsoft.com/office/drawing/2014/main" id="{5BAD9222-F141-4803-AF73-E2DD92E2ABBC}"/>
               </a:ext>
             </a:extLst>
           </p:cNvPr>
@@ -2773,7 +2773,7 @@
           <p:cNvPr id="2" name="Title Placeholder 1">
             <a:extLst>
               <a:ext uri="{FF2B5EF4-FFF2-40B4-BE49-F238E27FC236}">
-                <a16:creationId xmlns:a16="http://schemas.microsoft.com/office/drawing/2014/main" xmlns="" id="{5BF9D404-795C-4EA4-AD01-26740519239C}"/>
+                <a16:creationId xmlns:a16="http://schemas.microsoft.com/office/drawing/2014/main" id="{5BF9D404-795C-4EA4-AD01-26740519239C}"/>
               </a:ext>
             </a:extLst>
           </p:cNvPr>
@@ -2811,7 +2811,7 @@
           <p:cNvPr id="3" name="Text Placeholder 2">
             <a:extLst>
               <a:ext uri="{FF2B5EF4-FFF2-40B4-BE49-F238E27FC236}">
-                <a16:creationId xmlns:a16="http://schemas.microsoft.com/office/drawing/2014/main" xmlns="" id="{DE3FEC7B-48F8-4348-9BC6-68F83B859EE9}"/>
+                <a16:creationId xmlns:a16="http://schemas.microsoft.com/office/drawing/2014/main" id="{DE3FEC7B-48F8-4348-9BC6-68F83B859EE9}"/>
               </a:ext>
             </a:extLst>
           </p:cNvPr>
@@ -2878,7 +2878,7 @@
           <p:cNvPr id="4" name="Date Placeholder 3">
             <a:extLst>
               <a:ext uri="{FF2B5EF4-FFF2-40B4-BE49-F238E27FC236}">
-                <a16:creationId xmlns:a16="http://schemas.microsoft.com/office/drawing/2014/main" xmlns="" id="{31CA1A1D-E2F5-4161-A025-7B911965C2FE}"/>
+                <a16:creationId xmlns:a16="http://schemas.microsoft.com/office/drawing/2014/main" id="{31CA1A1D-E2F5-4161-A025-7B911965C2FE}"/>
               </a:ext>
             </a:extLst>
           </p:cNvPr>
@@ -2925,7 +2925,7 @@
           <p:cNvPr id="5" name="Footer Placeholder 4">
             <a:extLst>
               <a:ext uri="{FF2B5EF4-FFF2-40B4-BE49-F238E27FC236}">
-                <a16:creationId xmlns:a16="http://schemas.microsoft.com/office/drawing/2014/main" xmlns="" id="{43C7B926-18F3-4C13-AB92-764E10D324FB}"/>
+                <a16:creationId xmlns:a16="http://schemas.microsoft.com/office/drawing/2014/main" id="{43C7B926-18F3-4C13-AB92-764E10D324FB}"/>
               </a:ext>
             </a:extLst>
           </p:cNvPr>
@@ -2968,7 +2968,7 @@
           <p:cNvPr id="6" name="Slide Number Placeholder 5">
             <a:extLst>
               <a:ext uri="{FF2B5EF4-FFF2-40B4-BE49-F238E27FC236}">
-                <a16:creationId xmlns:a16="http://schemas.microsoft.com/office/drawing/2014/main" xmlns="" id="{734FA846-3BF6-46FD-80CF-34B300D244C0}"/>
+                <a16:creationId xmlns:a16="http://schemas.microsoft.com/office/drawing/2014/main" id="{734FA846-3BF6-46FD-80CF-34B300D244C0}"/>
               </a:ext>
             </a:extLst>
           </p:cNvPr>
@@ -3746,7 +3746,7 @@
           <p:cNvPr id="53" name="TextBox 52">
             <a:extLst>
               <a:ext uri="{FF2B5EF4-FFF2-40B4-BE49-F238E27FC236}">
-                <a16:creationId xmlns:a16="http://schemas.microsoft.com/office/drawing/2014/main" xmlns="" id="{CFFD1938-4192-486E-9D53-D9784518AD14}"/>
+                <a16:creationId xmlns:a16="http://schemas.microsoft.com/office/drawing/2014/main" id="{CFFD1938-4192-486E-9D53-D9784518AD14}"/>
               </a:ext>
             </a:extLst>
           </p:cNvPr>
@@ -3781,7 +3781,7 @@
           <p:cNvPr id="2" name="Rectangle 1">
             <a:extLst>
               <a:ext uri="{FF2B5EF4-FFF2-40B4-BE49-F238E27FC236}">
-                <a16:creationId xmlns:a16="http://schemas.microsoft.com/office/drawing/2014/main" xmlns="" id="{AA0ED7A8-1532-4365-90ED-3F304B8440CE}"/>
+                <a16:creationId xmlns:a16="http://schemas.microsoft.com/office/drawing/2014/main" id="{AA0ED7A8-1532-4365-90ED-3F304B8440CE}"/>
               </a:ext>
             </a:extLst>
           </p:cNvPr>
@@ -3840,7 +3840,7 @@
           <p:cNvPr id="4" name="Rectangle 3">
             <a:extLst>
               <a:ext uri="{FF2B5EF4-FFF2-40B4-BE49-F238E27FC236}">
-                <a16:creationId xmlns:a16="http://schemas.microsoft.com/office/drawing/2014/main" xmlns="" id="{21B869D6-66CB-4B38-975F-B7FEB6AA9B13}"/>
+                <a16:creationId xmlns:a16="http://schemas.microsoft.com/office/drawing/2014/main" id="{21B869D6-66CB-4B38-975F-B7FEB6AA9B13}"/>
               </a:ext>
             </a:extLst>
           </p:cNvPr>
@@ -3980,7 +3980,7 @@
           <p:cNvPr id="7" name="TextBox 6">
             <a:extLst>
               <a:ext uri="{FF2B5EF4-FFF2-40B4-BE49-F238E27FC236}">
-                <a16:creationId xmlns:a16="http://schemas.microsoft.com/office/drawing/2014/main" xmlns="" id="{E0BBD6C8-C8F2-40C5-AA64-85961A11ADC2}"/>
+                <a16:creationId xmlns:a16="http://schemas.microsoft.com/office/drawing/2014/main" id="{E0BBD6C8-C8F2-40C5-AA64-85961A11ADC2}"/>
               </a:ext>
             </a:extLst>
           </p:cNvPr>
@@ -4123,7 +4123,7 @@
           <p:cNvPr id="16" name="Rectangle 15">
             <a:extLst>
               <a:ext uri="{FF2B5EF4-FFF2-40B4-BE49-F238E27FC236}">
-                <a16:creationId xmlns:a16="http://schemas.microsoft.com/office/drawing/2014/main" xmlns="" id="{AA0ED7A8-1532-4365-90ED-3F304B8440CE}"/>
+                <a16:creationId xmlns:a16="http://schemas.microsoft.com/office/drawing/2014/main" id="{AA0ED7A8-1532-4365-90ED-3F304B8440CE}"/>
               </a:ext>
             </a:extLst>
           </p:cNvPr>
@@ -4182,7 +4182,7 @@
           <p:cNvPr id="17" name="Rectangle 16">
             <a:extLst>
               <a:ext uri="{FF2B5EF4-FFF2-40B4-BE49-F238E27FC236}">
-                <a16:creationId xmlns:a16="http://schemas.microsoft.com/office/drawing/2014/main" xmlns="" id="{AA0ED7A8-1532-4365-90ED-3F304B8440CE}"/>
+                <a16:creationId xmlns:a16="http://schemas.microsoft.com/office/drawing/2014/main" id="{AA0ED7A8-1532-4365-90ED-3F304B8440CE}"/>
               </a:ext>
             </a:extLst>
           </p:cNvPr>
@@ -4277,7 +4277,7 @@
           <p:cNvPr id="20" name="TextBox 19">
             <a:extLst>
               <a:ext uri="{FF2B5EF4-FFF2-40B4-BE49-F238E27FC236}">
-                <a16:creationId xmlns:a16="http://schemas.microsoft.com/office/drawing/2014/main" xmlns="" id="{E0BBD6C8-C8F2-40C5-AA64-85961A11ADC2}"/>
+                <a16:creationId xmlns:a16="http://schemas.microsoft.com/office/drawing/2014/main" id="{E0BBD6C8-C8F2-40C5-AA64-85961A11ADC2}"/>
               </a:ext>
             </a:extLst>
           </p:cNvPr>
@@ -4312,7 +4312,7 @@
           <p:cNvPr id="21" name="TextBox 20">
             <a:extLst>
               <a:ext uri="{FF2B5EF4-FFF2-40B4-BE49-F238E27FC236}">
-                <a16:creationId xmlns:a16="http://schemas.microsoft.com/office/drawing/2014/main" xmlns="" id="{E0BBD6C8-C8F2-40C5-AA64-85961A11ADC2}"/>
+                <a16:creationId xmlns:a16="http://schemas.microsoft.com/office/drawing/2014/main" id="{E0BBD6C8-C8F2-40C5-AA64-85961A11ADC2}"/>
               </a:ext>
             </a:extLst>
           </p:cNvPr>
@@ -4383,7 +4383,7 @@
           <p:cNvPr id="24" name="TextBox 23">
             <a:extLst>
               <a:ext uri="{FF2B5EF4-FFF2-40B4-BE49-F238E27FC236}">
-                <a16:creationId xmlns:a16="http://schemas.microsoft.com/office/drawing/2014/main" xmlns="" id="{E0BBD6C8-C8F2-40C5-AA64-85961A11ADC2}"/>
+                <a16:creationId xmlns:a16="http://schemas.microsoft.com/office/drawing/2014/main" id="{E0BBD6C8-C8F2-40C5-AA64-85961A11ADC2}"/>
               </a:ext>
             </a:extLst>
           </p:cNvPr>
@@ -4496,7 +4496,7 @@
           <p:cNvPr id="29" name="TextBox 28">
             <a:extLst>
               <a:ext uri="{FF2B5EF4-FFF2-40B4-BE49-F238E27FC236}">
-                <a16:creationId xmlns:a16="http://schemas.microsoft.com/office/drawing/2014/main" xmlns="" id="{E0BBD6C8-C8F2-40C5-AA64-85961A11ADC2}"/>
+                <a16:creationId xmlns:a16="http://schemas.microsoft.com/office/drawing/2014/main" id="{E0BBD6C8-C8F2-40C5-AA64-85961A11ADC2}"/>
               </a:ext>
             </a:extLst>
           </p:cNvPr>
@@ -4537,7 +4537,7 @@
           <p:cNvPr id="30" name="TextBox 29">
             <a:extLst>
               <a:ext uri="{FF2B5EF4-FFF2-40B4-BE49-F238E27FC236}">
-                <a16:creationId xmlns:a16="http://schemas.microsoft.com/office/drawing/2014/main" xmlns="" id="{E0BBD6C8-C8F2-40C5-AA64-85961A11ADC2}"/>
+                <a16:creationId xmlns:a16="http://schemas.microsoft.com/office/drawing/2014/main" id="{E0BBD6C8-C8F2-40C5-AA64-85961A11ADC2}"/>
               </a:ext>
             </a:extLst>
           </p:cNvPr>
@@ -4680,7 +4680,7 @@
           <p:cNvPr id="26" name="TextBox 25">
             <a:extLst>
               <a:ext uri="{FF2B5EF4-FFF2-40B4-BE49-F238E27FC236}">
-                <a16:creationId xmlns:a16="http://schemas.microsoft.com/office/drawing/2014/main" xmlns="" id="{E0BBD6C8-C8F2-40C5-AA64-85961A11ADC2}"/>
+                <a16:creationId xmlns:a16="http://schemas.microsoft.com/office/drawing/2014/main" id="{E0BBD6C8-C8F2-40C5-AA64-85961A11ADC2}"/>
               </a:ext>
             </a:extLst>
           </p:cNvPr>
@@ -4715,7 +4715,7 @@
           <p:cNvPr id="28" name="TextBox 27">
             <a:extLst>
               <a:ext uri="{FF2B5EF4-FFF2-40B4-BE49-F238E27FC236}">
-                <a16:creationId xmlns:a16="http://schemas.microsoft.com/office/drawing/2014/main" xmlns="" id="{E0BBD6C8-C8F2-40C5-AA64-85961A11ADC2}"/>
+                <a16:creationId xmlns:a16="http://schemas.microsoft.com/office/drawing/2014/main" id="{E0BBD6C8-C8F2-40C5-AA64-85961A11ADC2}"/>
               </a:ext>
             </a:extLst>
           </p:cNvPr>
@@ -4966,7 +4966,7 @@
           <p:cNvPr id="55" name="TextBox 54">
             <a:extLst>
               <a:ext uri="{FF2B5EF4-FFF2-40B4-BE49-F238E27FC236}">
-                <a16:creationId xmlns:a16="http://schemas.microsoft.com/office/drawing/2014/main" xmlns="" id="{E0BBD6C8-C8F2-40C5-AA64-85961A11ADC2}"/>
+                <a16:creationId xmlns:a16="http://schemas.microsoft.com/office/drawing/2014/main" id="{E0BBD6C8-C8F2-40C5-AA64-85961A11ADC2}"/>
               </a:ext>
             </a:extLst>
           </p:cNvPr>
@@ -5001,7 +5001,7 @@
           <p:cNvPr id="66" name="TextBox 65">
             <a:extLst>
               <a:ext uri="{FF2B5EF4-FFF2-40B4-BE49-F238E27FC236}">
-                <a16:creationId xmlns:a16="http://schemas.microsoft.com/office/drawing/2014/main" xmlns="" id="{E0BBD6C8-C8F2-40C5-AA64-85961A11ADC2}"/>
+                <a16:creationId xmlns:a16="http://schemas.microsoft.com/office/drawing/2014/main" id="{E0BBD6C8-C8F2-40C5-AA64-85961A11ADC2}"/>
               </a:ext>
             </a:extLst>
           </p:cNvPr>
@@ -5036,7 +5036,7 @@
           <p:cNvPr id="67" name="TextBox 66">
             <a:extLst>
               <a:ext uri="{FF2B5EF4-FFF2-40B4-BE49-F238E27FC236}">
-                <a16:creationId xmlns:a16="http://schemas.microsoft.com/office/drawing/2014/main" xmlns="" id="{E0BBD6C8-C8F2-40C5-AA64-85961A11ADC2}"/>
+                <a16:creationId xmlns:a16="http://schemas.microsoft.com/office/drawing/2014/main" id="{E0BBD6C8-C8F2-40C5-AA64-85961A11ADC2}"/>
               </a:ext>
             </a:extLst>
           </p:cNvPr>
@@ -5107,7 +5107,7 @@
           <p:cNvPr id="70" name="TextBox 69">
             <a:extLst>
               <a:ext uri="{FF2B5EF4-FFF2-40B4-BE49-F238E27FC236}">
-                <a16:creationId xmlns:a16="http://schemas.microsoft.com/office/drawing/2014/main" xmlns="" id="{E0BBD6C8-C8F2-40C5-AA64-85961A11ADC2}"/>
+                <a16:creationId xmlns:a16="http://schemas.microsoft.com/office/drawing/2014/main" id="{E0BBD6C8-C8F2-40C5-AA64-85961A11ADC2}"/>
               </a:ext>
             </a:extLst>
           </p:cNvPr>
@@ -5178,7 +5178,7 @@
           <p:cNvPr id="73" name="TextBox 72">
             <a:extLst>
               <a:ext uri="{FF2B5EF4-FFF2-40B4-BE49-F238E27FC236}">
-                <a16:creationId xmlns:a16="http://schemas.microsoft.com/office/drawing/2014/main" xmlns="" id="{E0BBD6C8-C8F2-40C5-AA64-85961A11ADC2}"/>
+                <a16:creationId xmlns:a16="http://schemas.microsoft.com/office/drawing/2014/main" id="{E0BBD6C8-C8F2-40C5-AA64-85961A11ADC2}"/>
               </a:ext>
             </a:extLst>
           </p:cNvPr>
@@ -5702,7 +5702,7 @@
           <p:cNvPr id="74" name="TextBox 73">
             <a:extLst>
               <a:ext uri="{FF2B5EF4-FFF2-40B4-BE49-F238E27FC236}">
-                <a16:creationId xmlns:a16="http://schemas.microsoft.com/office/drawing/2014/main" xmlns="" id="{E0BBD6C8-C8F2-40C5-AA64-85961A11ADC2}"/>
+                <a16:creationId xmlns:a16="http://schemas.microsoft.com/office/drawing/2014/main" id="{E0BBD6C8-C8F2-40C5-AA64-85961A11ADC2}"/>
               </a:ext>
             </a:extLst>
           </p:cNvPr>
@@ -5783,7 +5783,7 @@
           <p:cNvPr id="76" name="TextBox 75">
             <a:extLst>
               <a:ext uri="{FF2B5EF4-FFF2-40B4-BE49-F238E27FC236}">
-                <a16:creationId xmlns:a16="http://schemas.microsoft.com/office/drawing/2014/main" xmlns="" id="{E0BBD6C8-C8F2-40C5-AA64-85961A11ADC2}"/>
+                <a16:creationId xmlns:a16="http://schemas.microsoft.com/office/drawing/2014/main" id="{E0BBD6C8-C8F2-40C5-AA64-85961A11ADC2}"/>
               </a:ext>
             </a:extLst>
           </p:cNvPr>
@@ -5889,7 +5889,7 @@
           <p:cNvPr id="86" name="TextBox 85">
             <a:extLst>
               <a:ext uri="{FF2B5EF4-FFF2-40B4-BE49-F238E27FC236}">
-                <a16:creationId xmlns:a16="http://schemas.microsoft.com/office/drawing/2014/main" xmlns="" id="{E0BBD6C8-C8F2-40C5-AA64-85961A11ADC2}"/>
+                <a16:creationId xmlns:a16="http://schemas.microsoft.com/office/drawing/2014/main" id="{E0BBD6C8-C8F2-40C5-AA64-85961A11ADC2}"/>
               </a:ext>
             </a:extLst>
           </p:cNvPr>
@@ -5924,7 +5924,7 @@
           <p:cNvPr id="111" name="TextBox 110">
             <a:extLst>
               <a:ext uri="{FF2B5EF4-FFF2-40B4-BE49-F238E27FC236}">
-                <a16:creationId xmlns:a16="http://schemas.microsoft.com/office/drawing/2014/main" xmlns="" id="{E0BBD6C8-C8F2-40C5-AA64-85961A11ADC2}"/>
+                <a16:creationId xmlns:a16="http://schemas.microsoft.com/office/drawing/2014/main" id="{E0BBD6C8-C8F2-40C5-AA64-85961A11ADC2}"/>
               </a:ext>
             </a:extLst>
           </p:cNvPr>
@@ -6119,7 +6119,7 @@
           <a:p>
             <a:pPr algn="ctr"/>
             <a:r>
-              <a:rPr lang="en-US" dirty="0" err="1" smtClean="0"/>
+              <a:rPr lang="en-US" dirty="0" err="1"/>
               <a:t>UserController</a:t>
             </a:r>
             <a:endParaRPr lang="en-US" dirty="0"/>
@@ -6317,12 +6317,8 @@
           <a:p>
             <a:pPr algn="ctr"/>
             <a:r>
-              <a:rPr lang="en-US" dirty="0" err="1" smtClean="0"/>
-              <a:t>Reimbursement</a:t>
-            </a:r>
-            <a:r>
-              <a:rPr lang="en-US" dirty="0" err="1" smtClean="0"/>
-              <a:t>Service</a:t>
+              <a:rPr lang="en-US" dirty="0" err="1"/>
+              <a:t>ReimbursementService</a:t>
             </a:r>
             <a:endParaRPr lang="en-US" dirty="0"/>
           </a:p>
@@ -6477,7 +6473,7 @@
           <p:cNvPr id="103" name="TextBox 102">
             <a:extLst>
               <a:ext uri="{FF2B5EF4-FFF2-40B4-BE49-F238E27FC236}">
-                <a16:creationId xmlns:a16="http://schemas.microsoft.com/office/drawing/2014/main" xmlns="" id="{E0BBD6C8-C8F2-40C5-AA64-85961A11ADC2}"/>
+                <a16:creationId xmlns:a16="http://schemas.microsoft.com/office/drawing/2014/main" id="{E0BBD6C8-C8F2-40C5-AA64-85961A11ADC2}"/>
               </a:ext>
             </a:extLst>
           </p:cNvPr>
@@ -6542,7 +6538,7 @@
           <p:cNvPr id="89" name="Rectangle 88">
             <a:extLst>
               <a:ext uri="{FF2B5EF4-FFF2-40B4-BE49-F238E27FC236}">
-                <a16:creationId xmlns:a16="http://schemas.microsoft.com/office/drawing/2014/main" xmlns="" id="{EED827AB-78FC-41AC-8676-30DA25D7C5FC}"/>
+                <a16:creationId xmlns:a16="http://schemas.microsoft.com/office/drawing/2014/main" id="{EED827AB-78FC-41AC-8676-30DA25D7C5FC}"/>
               </a:ext>
             </a:extLst>
           </p:cNvPr>
@@ -6620,7 +6616,7 @@
           <p:cNvPr id="62" name="Rectangle 61">
             <a:extLst>
               <a:ext uri="{FF2B5EF4-FFF2-40B4-BE49-F238E27FC236}">
-                <a16:creationId xmlns:a16="http://schemas.microsoft.com/office/drawing/2014/main" xmlns="" id="{C3FE7107-D2B1-4448-B03A-F2CE9B45CFD6}"/>
+                <a16:creationId xmlns:a16="http://schemas.microsoft.com/office/drawing/2014/main" id="{C3FE7107-D2B1-4448-B03A-F2CE9B45CFD6}"/>
               </a:ext>
             </a:extLst>
           </p:cNvPr>
@@ -6684,7 +6680,7 @@
           <p:cNvPr id="61" name="Rectangle 60">
             <a:extLst>
               <a:ext uri="{FF2B5EF4-FFF2-40B4-BE49-F238E27FC236}">
-                <a16:creationId xmlns:a16="http://schemas.microsoft.com/office/drawing/2014/main" xmlns="" id="{2F7B40FD-C5BA-431D-AE99-1CB70F1BAB88}"/>
+                <a16:creationId xmlns:a16="http://schemas.microsoft.com/office/drawing/2014/main" id="{2F7B40FD-C5BA-431D-AE99-1CB70F1BAB88}"/>
               </a:ext>
             </a:extLst>
           </p:cNvPr>
@@ -6743,7 +6739,7 @@
           <p:cNvPr id="60" name="Rectangle 59">
             <a:extLst>
               <a:ext uri="{FF2B5EF4-FFF2-40B4-BE49-F238E27FC236}">
-                <a16:creationId xmlns:a16="http://schemas.microsoft.com/office/drawing/2014/main" xmlns="" id="{CF3E4DE9-C6F2-4C11-BE7F-2753CDEFE535}"/>
+                <a16:creationId xmlns:a16="http://schemas.microsoft.com/office/drawing/2014/main" id="{CF3E4DE9-C6F2-4C11-BE7F-2753CDEFE535}"/>
               </a:ext>
             </a:extLst>
           </p:cNvPr>
@@ -7125,7 +7121,7 @@
           <p:cNvPr id="19" name="TextBox 18">
             <a:extLst>
               <a:ext uri="{FF2B5EF4-FFF2-40B4-BE49-F238E27FC236}">
-                <a16:creationId xmlns:a16="http://schemas.microsoft.com/office/drawing/2014/main" xmlns="" id="{E0BBD6C8-C8F2-40C5-AA64-85961A11ADC2}"/>
+                <a16:creationId xmlns:a16="http://schemas.microsoft.com/office/drawing/2014/main" id="{E0BBD6C8-C8F2-40C5-AA64-85961A11ADC2}"/>
               </a:ext>
             </a:extLst>
           </p:cNvPr>
@@ -7255,7 +7251,7 @@
           <p:cNvPr id="23" name="TextBox 22">
             <a:extLst>
               <a:ext uri="{FF2B5EF4-FFF2-40B4-BE49-F238E27FC236}">
-                <a16:creationId xmlns:a16="http://schemas.microsoft.com/office/drawing/2014/main" xmlns="" id="{E0BBD6C8-C8F2-40C5-AA64-85961A11ADC2}"/>
+                <a16:creationId xmlns:a16="http://schemas.microsoft.com/office/drawing/2014/main" id="{E0BBD6C8-C8F2-40C5-AA64-85961A11ADC2}"/>
               </a:ext>
             </a:extLst>
           </p:cNvPr>
@@ -7372,7 +7368,7 @@
           <p:cNvPr id="28" name="TextBox 27">
             <a:extLst>
               <a:ext uri="{FF2B5EF4-FFF2-40B4-BE49-F238E27FC236}">
-                <a16:creationId xmlns:a16="http://schemas.microsoft.com/office/drawing/2014/main" xmlns="" id="{E0BBD6C8-C8F2-40C5-AA64-85961A11ADC2}"/>
+                <a16:creationId xmlns:a16="http://schemas.microsoft.com/office/drawing/2014/main" id="{E0BBD6C8-C8F2-40C5-AA64-85961A11ADC2}"/>
               </a:ext>
             </a:extLst>
           </p:cNvPr>
@@ -7496,7 +7492,7 @@
           <p:cNvPr id="34" name="TextBox 33">
             <a:extLst>
               <a:ext uri="{FF2B5EF4-FFF2-40B4-BE49-F238E27FC236}">
-                <a16:creationId xmlns:a16="http://schemas.microsoft.com/office/drawing/2014/main" xmlns="" id="{E0BBD6C8-C8F2-40C5-AA64-85961A11ADC2}"/>
+                <a16:creationId xmlns:a16="http://schemas.microsoft.com/office/drawing/2014/main" id="{E0BBD6C8-C8F2-40C5-AA64-85961A11ADC2}"/>
               </a:ext>
             </a:extLst>
           </p:cNvPr>
@@ -7622,7 +7618,7 @@
           <p:cNvPr id="38" name="TextBox 37">
             <a:extLst>
               <a:ext uri="{FF2B5EF4-FFF2-40B4-BE49-F238E27FC236}">
-                <a16:creationId xmlns:a16="http://schemas.microsoft.com/office/drawing/2014/main" xmlns="" id="{E0BBD6C8-C8F2-40C5-AA64-85961A11ADC2}"/>
+                <a16:creationId xmlns:a16="http://schemas.microsoft.com/office/drawing/2014/main" id="{E0BBD6C8-C8F2-40C5-AA64-85961A11ADC2}"/>
               </a:ext>
             </a:extLst>
           </p:cNvPr>
@@ -7792,7 +7788,7 @@
           <p:cNvPr id="44" name="TextBox 43">
             <a:extLst>
               <a:ext uri="{FF2B5EF4-FFF2-40B4-BE49-F238E27FC236}">
-                <a16:creationId xmlns:a16="http://schemas.microsoft.com/office/drawing/2014/main" xmlns="" id="{E0BBD6C8-C8F2-40C5-AA64-85961A11ADC2}"/>
+                <a16:creationId xmlns:a16="http://schemas.microsoft.com/office/drawing/2014/main" id="{E0BBD6C8-C8F2-40C5-AA64-85961A11ADC2}"/>
               </a:ext>
             </a:extLst>
           </p:cNvPr>
@@ -7827,7 +7823,7 @@
           <p:cNvPr id="45" name="TextBox 44">
             <a:extLst>
               <a:ext uri="{FF2B5EF4-FFF2-40B4-BE49-F238E27FC236}">
-                <a16:creationId xmlns:a16="http://schemas.microsoft.com/office/drawing/2014/main" xmlns="" id="{E0BBD6C8-C8F2-40C5-AA64-85961A11ADC2}"/>
+                <a16:creationId xmlns:a16="http://schemas.microsoft.com/office/drawing/2014/main" id="{E0BBD6C8-C8F2-40C5-AA64-85961A11ADC2}"/>
               </a:ext>
             </a:extLst>
           </p:cNvPr>
@@ -7874,7 +7870,7 @@
           <p:cNvPr id="26" name="TextBox 25">
             <a:extLst>
               <a:ext uri="{FF2B5EF4-FFF2-40B4-BE49-F238E27FC236}">
-                <a16:creationId xmlns:a16="http://schemas.microsoft.com/office/drawing/2014/main" xmlns="" id="{6C45E26E-8FEE-4439-A34B-789237C9C62C}"/>
+                <a16:creationId xmlns:a16="http://schemas.microsoft.com/office/drawing/2014/main" id="{6C45E26E-8FEE-4439-A34B-789237C9C62C}"/>
               </a:ext>
             </a:extLst>
           </p:cNvPr>
@@ -7909,7 +7905,7 @@
           <p:cNvPr id="31" name="Rectangle 30">
             <a:extLst>
               <a:ext uri="{FF2B5EF4-FFF2-40B4-BE49-F238E27FC236}">
-                <a16:creationId xmlns:a16="http://schemas.microsoft.com/office/drawing/2014/main" xmlns="" id="{6D396BFC-10E0-4935-903B-EDC457BD1755}"/>
+                <a16:creationId xmlns:a16="http://schemas.microsoft.com/office/drawing/2014/main" id="{6D396BFC-10E0-4935-903B-EDC457BD1755}"/>
               </a:ext>
             </a:extLst>
           </p:cNvPr>
@@ -7969,7 +7965,7 @@
           <p:cNvPr id="32" name="Rectangle 31">
             <a:extLst>
               <a:ext uri="{FF2B5EF4-FFF2-40B4-BE49-F238E27FC236}">
-                <a16:creationId xmlns:a16="http://schemas.microsoft.com/office/drawing/2014/main" xmlns="" id="{02A645C8-F11F-438D-92DC-F6FCCA5ECFB8}"/>
+                <a16:creationId xmlns:a16="http://schemas.microsoft.com/office/drawing/2014/main" id="{02A645C8-F11F-438D-92DC-F6FCCA5ECFB8}"/>
               </a:ext>
             </a:extLst>
           </p:cNvPr>
@@ -8029,7 +8025,7 @@
           <p:cNvPr id="12" name="Straight Arrow Connector 11">
             <a:extLst>
               <a:ext uri="{FF2B5EF4-FFF2-40B4-BE49-F238E27FC236}">
-                <a16:creationId xmlns:a16="http://schemas.microsoft.com/office/drawing/2014/main" xmlns="" id="{FF2076CA-F897-4293-B6CD-7408EB452156}"/>
+                <a16:creationId xmlns:a16="http://schemas.microsoft.com/office/drawing/2014/main" id="{FF2076CA-F897-4293-B6CD-7408EB452156}"/>
               </a:ext>
             </a:extLst>
           </p:cNvPr>
@@ -8072,7 +8068,7 @@
           <p:cNvPr id="14" name="Straight Arrow Connector 13">
             <a:extLst>
               <a:ext uri="{FF2B5EF4-FFF2-40B4-BE49-F238E27FC236}">
-                <a16:creationId xmlns:a16="http://schemas.microsoft.com/office/drawing/2014/main" xmlns="" id="{5C625B7B-4A1E-46C5-9082-4FEC89B30DA9}"/>
+                <a16:creationId xmlns:a16="http://schemas.microsoft.com/office/drawing/2014/main" id="{5C625B7B-4A1E-46C5-9082-4FEC89B30DA9}"/>
               </a:ext>
             </a:extLst>
           </p:cNvPr>
@@ -8115,7 +8111,7 @@
           <p:cNvPr id="65" name="Straight Arrow Connector 64">
             <a:extLst>
               <a:ext uri="{FF2B5EF4-FFF2-40B4-BE49-F238E27FC236}">
-                <a16:creationId xmlns:a16="http://schemas.microsoft.com/office/drawing/2014/main" xmlns="" id="{C1C9B843-1D11-4D9F-8CBF-AE00E90AA070}"/>
+                <a16:creationId xmlns:a16="http://schemas.microsoft.com/office/drawing/2014/main" id="{C1C9B843-1D11-4D9F-8CBF-AE00E90AA070}"/>
               </a:ext>
             </a:extLst>
           </p:cNvPr>
@@ -8157,7 +8153,7 @@
           <p:cNvPr id="66" name="TextBox 65">
             <a:extLst>
               <a:ext uri="{FF2B5EF4-FFF2-40B4-BE49-F238E27FC236}">
-                <a16:creationId xmlns:a16="http://schemas.microsoft.com/office/drawing/2014/main" xmlns="" id="{5E4B2700-0522-40EF-B035-166AA1C17D76}"/>
+                <a16:creationId xmlns:a16="http://schemas.microsoft.com/office/drawing/2014/main" id="{5E4B2700-0522-40EF-B035-166AA1C17D76}"/>
               </a:ext>
             </a:extLst>
           </p:cNvPr>
@@ -8281,7 +8277,7 @@
           <p:cNvPr id="48" name="TextBox 47">
             <a:extLst>
               <a:ext uri="{FF2B5EF4-FFF2-40B4-BE49-F238E27FC236}">
-                <a16:creationId xmlns:a16="http://schemas.microsoft.com/office/drawing/2014/main" xmlns="" id="{E0BBD6C8-C8F2-40C5-AA64-85961A11ADC2}"/>
+                <a16:creationId xmlns:a16="http://schemas.microsoft.com/office/drawing/2014/main" id="{E0BBD6C8-C8F2-40C5-AA64-85961A11ADC2}"/>
               </a:ext>
             </a:extLst>
           </p:cNvPr>
@@ -8316,7 +8312,7 @@
           <p:cNvPr id="52" name="Rectangle 51">
             <a:extLst>
               <a:ext uri="{FF2B5EF4-FFF2-40B4-BE49-F238E27FC236}">
-                <a16:creationId xmlns:a16="http://schemas.microsoft.com/office/drawing/2014/main" xmlns="" id="{21B869D6-66CB-4B38-975F-B7FEB6AA9B13}"/>
+                <a16:creationId xmlns:a16="http://schemas.microsoft.com/office/drawing/2014/main" id="{21B869D6-66CB-4B38-975F-B7FEB6AA9B13}"/>
               </a:ext>
             </a:extLst>
           </p:cNvPr>
@@ -8439,7 +8435,7 @@
           <p:cNvPr id="58" name="TextBox 57">
             <a:extLst>
               <a:ext uri="{FF2B5EF4-FFF2-40B4-BE49-F238E27FC236}">
-                <a16:creationId xmlns:a16="http://schemas.microsoft.com/office/drawing/2014/main" xmlns="" id="{E0BBD6C8-C8F2-40C5-AA64-85961A11ADC2}"/>
+                <a16:creationId xmlns:a16="http://schemas.microsoft.com/office/drawing/2014/main" id="{E0BBD6C8-C8F2-40C5-AA64-85961A11ADC2}"/>
               </a:ext>
             </a:extLst>
           </p:cNvPr>
@@ -8547,7 +8543,7 @@
           <p:cNvPr id="94" name="TextBox 93">
             <a:extLst>
               <a:ext uri="{FF2B5EF4-FFF2-40B4-BE49-F238E27FC236}">
-                <a16:creationId xmlns:a16="http://schemas.microsoft.com/office/drawing/2014/main" xmlns="" id="{E0BBD6C8-C8F2-40C5-AA64-85961A11ADC2}"/>
+                <a16:creationId xmlns:a16="http://schemas.microsoft.com/office/drawing/2014/main" id="{E0BBD6C8-C8F2-40C5-AA64-85961A11ADC2}"/>
               </a:ext>
             </a:extLst>
           </p:cNvPr>
@@ -8582,7 +8578,7 @@
           <p:cNvPr id="95" name="TextBox 94">
             <a:extLst>
               <a:ext uri="{FF2B5EF4-FFF2-40B4-BE49-F238E27FC236}">
-                <a16:creationId xmlns:a16="http://schemas.microsoft.com/office/drawing/2014/main" xmlns="" id="{E0BBD6C8-C8F2-40C5-AA64-85961A11ADC2}"/>
+                <a16:creationId xmlns:a16="http://schemas.microsoft.com/office/drawing/2014/main" id="{E0BBD6C8-C8F2-40C5-AA64-85961A11ADC2}"/>
               </a:ext>
             </a:extLst>
           </p:cNvPr>
@@ -8617,7 +8613,7 @@
           <p:cNvPr id="49" name="Rectangle 48">
             <a:extLst>
               <a:ext uri="{FF2B5EF4-FFF2-40B4-BE49-F238E27FC236}">
-                <a16:creationId xmlns:a16="http://schemas.microsoft.com/office/drawing/2014/main" xmlns="" id="{02A645C8-F11F-438D-92DC-F6FCCA5ECFB8}"/>
+                <a16:creationId xmlns:a16="http://schemas.microsoft.com/office/drawing/2014/main" id="{02A645C8-F11F-438D-92DC-F6FCCA5ECFB8}"/>
               </a:ext>
             </a:extLst>
           </p:cNvPr>
@@ -8714,7 +8710,7 @@
           <p:cNvPr id="57" name="Rectangle 56">
             <a:extLst>
               <a:ext uri="{FF2B5EF4-FFF2-40B4-BE49-F238E27FC236}">
-                <a16:creationId xmlns:a16="http://schemas.microsoft.com/office/drawing/2014/main" xmlns="" id="{93FBA679-F71B-47BD-BE29-21E7C2262CEB}"/>
+                <a16:creationId xmlns:a16="http://schemas.microsoft.com/office/drawing/2014/main" id="{93FBA679-F71B-47BD-BE29-21E7C2262CEB}"/>
               </a:ext>
             </a:extLst>
           </p:cNvPr>
@@ -8824,7 +8820,7 @@
           <p:cNvPr id="59" name="TextBox 58">
             <a:extLst>
               <a:ext uri="{FF2B5EF4-FFF2-40B4-BE49-F238E27FC236}">
-                <a16:creationId xmlns:a16="http://schemas.microsoft.com/office/drawing/2014/main" xmlns="" id="{5E4B2700-0522-40EF-B035-166AA1C17D76}"/>
+                <a16:creationId xmlns:a16="http://schemas.microsoft.com/office/drawing/2014/main" id="{5E4B2700-0522-40EF-B035-166AA1C17D76}"/>
               </a:ext>
             </a:extLst>
           </p:cNvPr>
@@ -8897,10 +8893,10 @@
           <p:cNvPr id="12" name="Rectangle 11">
             <a:extLst>
               <a:ext uri="{FF2B5EF4-FFF2-40B4-BE49-F238E27FC236}">
-                <a16:creationId xmlns:a16="http://schemas.microsoft.com/office/drawing/2014/main" xmlns="" id="{6753252F-4873-4F63-801D-CC719279A7D5}"/>
+                <a16:creationId xmlns:a16="http://schemas.microsoft.com/office/drawing/2014/main" id="{6753252F-4873-4F63-801D-CC719279A7D5}"/>
               </a:ext>
               <a:ext uri="{C183D7F6-B498-43B3-948B-1728B52AA6E4}">
-                <adec:decorative xmlns:adec="http://schemas.microsoft.com/office/drawing/2017/decorative" xmlns="" val="1"/>
+                <adec:decorative xmlns:adec="http://schemas.microsoft.com/office/drawing/2017/decorative" val="1"/>
               </a:ext>
             </a:extLst>
           </p:cNvPr>
@@ -8910,7 +8906,7 @@
           <p:nvPr>
             <p:extLst>
               <p:ext uri="{386F3935-93C4-4BCD-93E2-E3B085C9AB24}">
-                <p16:designElem xmlns:p16="http://schemas.microsoft.com/office/powerpoint/2015/main" xmlns="" val="1"/>
+                <p16:designElem xmlns:p16="http://schemas.microsoft.com/office/powerpoint/2015/main" val="1"/>
               </p:ext>
             </p:extLst>
           </p:nvPr>
@@ -8960,10 +8956,10 @@
           <p:cNvPr id="14" name="Rectangle 13">
             <a:extLst>
               <a:ext uri="{FF2B5EF4-FFF2-40B4-BE49-F238E27FC236}">
-                <a16:creationId xmlns:a16="http://schemas.microsoft.com/office/drawing/2014/main" xmlns="" id="{047C8CCB-F95D-4249-92DD-651249D3535A}"/>
+                <a16:creationId xmlns:a16="http://schemas.microsoft.com/office/drawing/2014/main" id="{047C8CCB-F95D-4249-92DD-651249D3535A}"/>
               </a:ext>
               <a:ext uri="{C183D7F6-B498-43B3-948B-1728B52AA6E4}">
-                <adec:decorative xmlns:adec="http://schemas.microsoft.com/office/drawing/2017/decorative" xmlns="" val="1"/>
+                <adec:decorative xmlns:adec="http://schemas.microsoft.com/office/drawing/2017/decorative" val="1"/>
               </a:ext>
             </a:extLst>
           </p:cNvPr>
@@ -8973,7 +8969,7 @@
           <p:nvPr>
             <p:extLst>
               <p:ext uri="{386F3935-93C4-4BCD-93E2-E3B085C9AB24}">
-                <p16:designElem xmlns:p16="http://schemas.microsoft.com/office/powerpoint/2015/main" xmlns="" val="1"/>
+                <p16:designElem xmlns:p16="http://schemas.microsoft.com/office/powerpoint/2015/main" val="1"/>
               </p:ext>
             </p:extLst>
           </p:nvPr>
@@ -9023,7 +9019,7 @@
           <p:cNvPr id="5" name="TextBox 4">
             <a:extLst>
               <a:ext uri="{FF2B5EF4-FFF2-40B4-BE49-F238E27FC236}">
-                <a16:creationId xmlns:a16="http://schemas.microsoft.com/office/drawing/2014/main" xmlns="" id="{6C45E26E-8FEE-4439-A34B-789237C9C62C}"/>
+                <a16:creationId xmlns:a16="http://schemas.microsoft.com/office/drawing/2014/main" id="{6C45E26E-8FEE-4439-A34B-789237C9C62C}"/>
               </a:ext>
             </a:extLst>
           </p:cNvPr>
@@ -9080,7 +9076,13 @@
       </p:sp>
       <p:pic>
         <p:nvPicPr>
-          <p:cNvPr id="6" name="Picture 5"/>
+          <p:cNvPr id="3" name="Picture 2">
+            <a:extLst>
+              <a:ext uri="{FF2B5EF4-FFF2-40B4-BE49-F238E27FC236}">
+                <a16:creationId xmlns:a16="http://schemas.microsoft.com/office/drawing/2014/main" id="{12D9DA51-B0F7-4659-A68F-3BFBDD1C8BFF}"/>
+              </a:ext>
+            </a:extLst>
+          </p:cNvPr>
           <p:cNvPicPr>
             <a:picLocks noChangeAspect="1"/>
           </p:cNvPicPr>
@@ -9094,8 +9096,8 @@
         </p:blipFill>
         <p:spPr>
           <a:xfrm>
-            <a:off x="4133736" y="993024"/>
-            <a:ext cx="6629400" cy="4543425"/>
+            <a:off x="4207741" y="919162"/>
+            <a:ext cx="6362700" cy="5019675"/>
           </a:xfrm>
           <a:prstGeom prst="rect">
             <a:avLst/>
@@ -9137,7 +9139,7 @@
           <p:cNvPr id="2" name="Title 1">
             <a:extLst>
               <a:ext uri="{FF2B5EF4-FFF2-40B4-BE49-F238E27FC236}">
-                <a16:creationId xmlns:a16="http://schemas.microsoft.com/office/drawing/2014/main" xmlns="" id="{C8A221E1-FAF2-4290-9E9E-12C74FCBDD4A}"/>
+                <a16:creationId xmlns:a16="http://schemas.microsoft.com/office/drawing/2014/main" id="{C8A221E1-FAF2-4290-9E9E-12C74FCBDD4A}"/>
               </a:ext>
             </a:extLst>
           </p:cNvPr>
@@ -9165,7 +9167,7 @@
           <p:cNvPr id="4" name="Content Placeholder 3">
             <a:extLst>
               <a:ext uri="{FF2B5EF4-FFF2-40B4-BE49-F238E27FC236}">
-                <a16:creationId xmlns:a16="http://schemas.microsoft.com/office/drawing/2014/main" xmlns="" id="{CD35AFD6-14E5-4229-AC73-C65241D45091}"/>
+                <a16:creationId xmlns:a16="http://schemas.microsoft.com/office/drawing/2014/main" id="{CD35AFD6-14E5-4229-AC73-C65241D45091}"/>
               </a:ext>
             </a:extLst>
           </p:cNvPr>
@@ -9189,12 +9191,12 @@
           <a:graphicData uri="http://schemas.openxmlformats.org/presentationml/2006/ole">
             <mc:AlternateContent xmlns:mc="http://schemas.openxmlformats.org/markup-compatibility/2006">
               <mc:Choice xmlns:v="urn:schemas-microsoft-com:vml" Requires="v">
-                <p:oleObj spid="_x0000_s1028" name="Worksheet" r:id="rId3" imgW="10449082" imgH="7819875" progId="Excel.Sheet.12">
+                <p:oleObj name="Worksheet" r:id="rId2" imgW="10449082" imgH="7819875" progId="Excel.Sheet.12">
                   <p:embed/>
                 </p:oleObj>
               </mc:Choice>
               <mc:Fallback>
-                <p:oleObj name="Worksheet" r:id="rId3" imgW="10449082" imgH="7819875" progId="Excel.Sheet.12">
+                <p:oleObj name="Worksheet" r:id="rId2" imgW="10449082" imgH="7819875" progId="Excel.Sheet.12">
                   <p:embed/>
                   <p:pic>
                     <p:nvPicPr>
@@ -9203,7 +9205,7 @@
                       <p:nvPr/>
                     </p:nvPicPr>
                     <p:blipFill>
-                      <a:blip r:embed="rId4"/>
+                      <a:blip r:embed="rId3"/>
                       <a:stretch>
                         <a:fillRect/>
                       </a:stretch>

</xml_diff>